<commit_message>
feat: add dataset information to presentation
</commit_message>
<xml_diff>
--- a/Сertification/presentation.pptx
+++ b/Сertification/presentation.pptx
@@ -5,7 +5,7 @@
     <p:sldMasterId id="2147483648" r:id="rId1"/>
   </p:sldMasterIdLst>
   <p:notesMasterIdLst>
-    <p:notesMasterId r:id="rId9"/>
+    <p:notesMasterId r:id="rId13"/>
   </p:notesMasterIdLst>
   <p:sldIdLst>
     <p:sldId id="281" r:id="rId2"/>
@@ -13,8 +13,12 @@
     <p:sldId id="286" r:id="rId4"/>
     <p:sldId id="290" r:id="rId5"/>
     <p:sldId id="287" r:id="rId6"/>
-    <p:sldId id="288" r:id="rId7"/>
-    <p:sldId id="289" r:id="rId8"/>
+    <p:sldId id="292" r:id="rId7"/>
+    <p:sldId id="293" r:id="rId8"/>
+    <p:sldId id="294" r:id="rId9"/>
+    <p:sldId id="288" r:id="rId10"/>
+    <p:sldId id="291" r:id="rId11"/>
+    <p:sldId id="289" r:id="rId12"/>
   </p:sldIdLst>
   <p:sldSz cx="12192000" cy="6858000"/>
   <p:notesSz cx="6858000" cy="9144000"/>
@@ -203,7 +207,7 @@
           <a:p>
             <a:fld id="{76ED9429-14B3-664E-B66C-A13779F56E7D}" type="datetimeFigureOut">
               <a:rPr lang="ru-RU" smtClean="0"/>
-              <a:t>19.09.2023</a:t>
+              <a:t>20.09.2023</a:t>
             </a:fld>
             <a:endParaRPr lang="ru-RU"/>
           </a:p>
@@ -617,7 +621,7 @@
           <a:p>
             <a:fld id="{26DB3D39-9350-6749-B0D7-69548AE3DE8E}" type="datetimeFigureOut">
               <a:rPr lang="ru-RU" smtClean="0"/>
-              <a:t>19.09.2023</a:t>
+              <a:t>20.09.2023</a:t>
             </a:fld>
             <a:endParaRPr lang="ru-RU"/>
           </a:p>
@@ -815,7 +819,7 @@
           <a:p>
             <a:fld id="{26DB3D39-9350-6749-B0D7-69548AE3DE8E}" type="datetimeFigureOut">
               <a:rPr lang="ru-RU" smtClean="0"/>
-              <a:t>19.09.2023</a:t>
+              <a:t>20.09.2023</a:t>
             </a:fld>
             <a:endParaRPr lang="ru-RU"/>
           </a:p>
@@ -1023,7 +1027,7 @@
           <a:p>
             <a:fld id="{26DB3D39-9350-6749-B0D7-69548AE3DE8E}" type="datetimeFigureOut">
               <a:rPr lang="ru-RU" smtClean="0"/>
-              <a:t>19.09.2023</a:t>
+              <a:t>20.09.2023</a:t>
             </a:fld>
             <a:endParaRPr lang="ru-RU"/>
           </a:p>
@@ -1221,7 +1225,7 @@
           <a:p>
             <a:fld id="{26DB3D39-9350-6749-B0D7-69548AE3DE8E}" type="datetimeFigureOut">
               <a:rPr lang="ru-RU" smtClean="0"/>
-              <a:t>19.09.2023</a:t>
+              <a:t>20.09.2023</a:t>
             </a:fld>
             <a:endParaRPr lang="ru-RU"/>
           </a:p>
@@ -1496,7 +1500,7 @@
           <a:p>
             <a:fld id="{26DB3D39-9350-6749-B0D7-69548AE3DE8E}" type="datetimeFigureOut">
               <a:rPr lang="ru-RU" smtClean="0"/>
-              <a:t>19.09.2023</a:t>
+              <a:t>20.09.2023</a:t>
             </a:fld>
             <a:endParaRPr lang="ru-RU"/>
           </a:p>
@@ -1761,7 +1765,7 @@
           <a:p>
             <a:fld id="{26DB3D39-9350-6749-B0D7-69548AE3DE8E}" type="datetimeFigureOut">
               <a:rPr lang="ru-RU" smtClean="0"/>
-              <a:t>19.09.2023</a:t>
+              <a:t>20.09.2023</a:t>
             </a:fld>
             <a:endParaRPr lang="ru-RU"/>
           </a:p>
@@ -2173,7 +2177,7 @@
           <a:p>
             <a:fld id="{26DB3D39-9350-6749-B0D7-69548AE3DE8E}" type="datetimeFigureOut">
               <a:rPr lang="ru-RU" smtClean="0"/>
-              <a:t>19.09.2023</a:t>
+              <a:t>20.09.2023</a:t>
             </a:fld>
             <a:endParaRPr lang="ru-RU"/>
           </a:p>
@@ -2314,7 +2318,7 @@
           <a:p>
             <a:fld id="{26DB3D39-9350-6749-B0D7-69548AE3DE8E}" type="datetimeFigureOut">
               <a:rPr lang="ru-RU" smtClean="0"/>
-              <a:t>19.09.2023</a:t>
+              <a:t>20.09.2023</a:t>
             </a:fld>
             <a:endParaRPr lang="ru-RU"/>
           </a:p>
@@ -2427,7 +2431,7 @@
           <a:p>
             <a:fld id="{26DB3D39-9350-6749-B0D7-69548AE3DE8E}" type="datetimeFigureOut">
               <a:rPr lang="ru-RU" smtClean="0"/>
-              <a:t>19.09.2023</a:t>
+              <a:t>20.09.2023</a:t>
             </a:fld>
             <a:endParaRPr lang="ru-RU"/>
           </a:p>
@@ -2738,7 +2742,7 @@
           <a:p>
             <a:fld id="{26DB3D39-9350-6749-B0D7-69548AE3DE8E}" type="datetimeFigureOut">
               <a:rPr lang="ru-RU" smtClean="0"/>
-              <a:t>19.09.2023</a:t>
+              <a:t>20.09.2023</a:t>
             </a:fld>
             <a:endParaRPr lang="ru-RU"/>
           </a:p>
@@ -3026,7 +3030,7 @@
           <a:p>
             <a:fld id="{26DB3D39-9350-6749-B0D7-69548AE3DE8E}" type="datetimeFigureOut">
               <a:rPr lang="ru-RU" smtClean="0"/>
-              <a:t>19.09.2023</a:t>
+              <a:t>20.09.2023</a:t>
             </a:fld>
             <a:endParaRPr lang="ru-RU"/>
           </a:p>
@@ -3270,7 +3274,7 @@
           <a:p>
             <a:fld id="{26DB3D39-9350-6749-B0D7-69548AE3DE8E}" type="datetimeFigureOut">
               <a:rPr lang="ru-RU" smtClean="0"/>
-              <a:t>19.09.2023</a:t>
+              <a:t>20.09.2023</a:t>
             </a:fld>
             <a:endParaRPr lang="ru-RU"/>
           </a:p>
@@ -3832,7 +3836,7 @@
         <p:spPr>
           <a:xfrm>
             <a:off x="439152" y="3963798"/>
-            <a:ext cx="11160127" cy="967701"/>
+            <a:ext cx="11160127" cy="1025922"/>
           </a:xfrm>
           <a:prstGeom prst="rect">
             <a:avLst/>
@@ -3878,7 +3882,29 @@
                 <a:latin typeface="Arial" panose="020B0604020202020204" pitchFamily="34" charset="0"/>
                 <a:cs typeface="Arial" panose="020B0604020202020204" pitchFamily="34" charset="0"/>
               </a:rPr>
-              <a:t>Команда проекта:</a:t>
+              <a:t>Разработал</a:t>
+            </a:r>
+            <a:r>
+              <a:rPr lang="ru-RU" sz="2800" dirty="0" smtClean="0">
+                <a:solidFill>
+                  <a:schemeClr val="bg1"/>
+                </a:solidFill>
+                <a:effectLst/>
+                <a:latin typeface="Arial" panose="020B0604020202020204" pitchFamily="34" charset="0"/>
+                <a:cs typeface="Arial" panose="020B0604020202020204" pitchFamily="34" charset="0"/>
+              </a:rPr>
+              <a:t>:</a:t>
+            </a:r>
+            <a:r>
+              <a:rPr lang="ru-RU" sz="2800" dirty="0" smtClean="0">
+                <a:solidFill>
+                  <a:schemeClr val="bg1"/>
+                </a:solidFill>
+                <a:effectLst/>
+                <a:latin typeface="Arial" panose="020B0604020202020204" pitchFamily="34" charset="0"/>
+                <a:cs typeface="Arial" panose="020B0604020202020204" pitchFamily="34" charset="0"/>
+              </a:rPr>
+              <a:t/>
             </a:r>
             <a:br>
               <a:rPr lang="ru-RU" sz="2800" dirty="0" smtClean="0">
@@ -3915,6 +3941,717 @@
     <p:extLst>
       <p:ext uri="{BB962C8B-B14F-4D97-AF65-F5344CB8AC3E}">
         <p14:creationId xmlns:p14="http://schemas.microsoft.com/office/powerpoint/2010/main" val="3751136118"/>
+      </p:ext>
+    </p:extLst>
+  </p:cSld>
+  <p:clrMapOvr>
+    <a:masterClrMapping/>
+  </p:clrMapOvr>
+  <p:timing>
+    <p:tnLst>
+      <p:par>
+        <p:cTn id="1" dur="indefinite" restart="never" nodeType="tmRoot"/>
+      </p:par>
+    </p:tnLst>
+  </p:timing>
+</p:sld>
+</file>
+
+<file path=ppt/slides/slide10.xml><?xml version="1.0" encoding="utf-8"?>
+<p:sld xmlns:a="http://schemas.openxmlformats.org/drawingml/2006/main" xmlns:r="http://schemas.openxmlformats.org/officeDocument/2006/relationships" xmlns:p="http://schemas.openxmlformats.org/presentationml/2006/main">
+  <p:cSld>
+    <p:bg>
+      <p:bgPr>
+        <a:solidFill>
+          <a:schemeClr val="bg1"/>
+        </a:solidFill>
+        <a:effectLst/>
+      </p:bgPr>
+    </p:bg>
+    <p:spTree>
+      <p:nvGrpSpPr>
+        <p:cNvPr id="1" name=""/>
+        <p:cNvGrpSpPr/>
+        <p:nvPr/>
+      </p:nvGrpSpPr>
+      <p:grpSpPr>
+        <a:xfrm>
+          <a:off x="0" y="0"/>
+          <a:ext cx="0" cy="0"/>
+          <a:chOff x="0" y="0"/>
+          <a:chExt cx="0" cy="0"/>
+        </a:xfrm>
+      </p:grpSpPr>
+      <p:sp>
+        <p:nvSpPr>
+          <p:cNvPr id="11" name="Номер слайда 3">
+            <a:extLst>
+              <a:ext uri="{FF2B5EF4-FFF2-40B4-BE49-F238E27FC236}">
+                <a16:creationId xmlns:a16="http://schemas.microsoft.com/office/drawing/2014/main" id="{7267A4CF-F0C4-43DD-AD58-96564CA7C221}"/>
+              </a:ext>
+            </a:extLst>
+          </p:cNvPr>
+          <p:cNvSpPr>
+            <a:spLocks noGrp="1"/>
+          </p:cNvSpPr>
+          <p:nvPr>
+            <p:ph type="sldNum" sz="quarter" idx="12"/>
+          </p:nvPr>
+        </p:nvSpPr>
+        <p:spPr>
+          <a:xfrm>
+            <a:off x="515939" y="6393284"/>
+            <a:ext cx="2743200" cy="365125"/>
+          </a:xfrm>
+          <a:prstGeom prst="rect">
+            <a:avLst/>
+          </a:prstGeom>
+        </p:spPr>
+        <p:txBody>
+          <a:bodyPr lIns="0" rIns="0"/>
+          <a:lstStyle>
+            <a:lvl1pPr>
+              <a:defRPr sz="1200">
+                <a:solidFill>
+                  <a:schemeClr val="bg1">
+                    <a:lumMod val="75000"/>
+                  </a:schemeClr>
+                </a:solidFill>
+              </a:defRPr>
+            </a:lvl1pPr>
+          </a:lstStyle>
+          <a:p>
+            <a:pPr algn="l"/>
+            <a:fld id="{A4D4834B-A5E3-4581-856C-72DC1D7E0BCC}" type="slidenum">
+              <a:rPr lang="ru-RU" smtClean="0">
+                <a:solidFill>
+                  <a:schemeClr val="tx1"/>
+                </a:solidFill>
+                <a:latin typeface="Rostelecom Basis" panose="020B0503030604040103" pitchFamily="34" charset="0"/>
+              </a:rPr>
+              <a:pPr algn="l"/>
+              <a:t>10</a:t>
+            </a:fld>
+            <a:endParaRPr lang="ru-RU" dirty="0">
+              <a:solidFill>
+                <a:schemeClr val="tx1"/>
+              </a:solidFill>
+              <a:latin typeface="Rostelecom Basis" panose="020B0503030604040103" pitchFamily="34" charset="0"/>
+            </a:endParaRPr>
+          </a:p>
+        </p:txBody>
+      </p:sp>
+      <p:sp>
+        <p:nvSpPr>
+          <p:cNvPr id="5" name="Заголовок 1">
+            <a:extLst>
+              <a:ext uri="{FF2B5EF4-FFF2-40B4-BE49-F238E27FC236}">
+                <a16:creationId xmlns:a16="http://schemas.microsoft.com/office/drawing/2014/main" id="{26F3F6DE-0B95-4A88-A2DE-D547275A4F55}"/>
+              </a:ext>
+            </a:extLst>
+          </p:cNvPr>
+          <p:cNvSpPr txBox="1">
+            <a:spLocks/>
+          </p:cNvSpPr>
+          <p:nvPr/>
+        </p:nvSpPr>
+        <p:spPr>
+          <a:xfrm>
+            <a:off x="439151" y="1333436"/>
+            <a:ext cx="11160127" cy="1538883"/>
+          </a:xfrm>
+          <a:prstGeom prst="rect">
+            <a:avLst/>
+          </a:prstGeom>
+        </p:spPr>
+        <p:txBody>
+          <a:bodyPr lIns="0" tIns="0" rIns="0" bIns="0" anchor="t" anchorCtr="0">
+            <a:spAutoFit/>
+          </a:bodyPr>
+          <a:lstStyle>
+            <a:defPPr>
+              <a:defRPr lang="ru-RU"/>
+            </a:defPPr>
+            <a:lvl1pPr>
+              <a:lnSpc>
+                <a:spcPts val="4000"/>
+              </a:lnSpc>
+              <a:spcBef>
+                <a:spcPct val="0"/>
+              </a:spcBef>
+              <a:buNone/>
+              <a:defRPr sz="2800" b="0">
+                <a:effectLst/>
+                <a:latin typeface="Rostelecom Basis Medium" panose="020B0603030604040103" pitchFamily="34" charset="0"/>
+                <a:ea typeface="+mj-ea"/>
+                <a:cs typeface="+mj-cs"/>
+              </a:defRPr>
+            </a:lvl1pPr>
+          </a:lstStyle>
+          <a:p>
+            <a:pPr marL="457200" indent="-457200">
+              <a:buFont typeface="+mj-lt"/>
+              <a:buAutoNum type="arabicPeriod"/>
+            </a:pPr>
+            <a:r>
+              <a:rPr lang="ru-RU" sz="2000" dirty="0" err="1" smtClean="0">
+                <a:latin typeface="Arial" panose="020B0604020202020204" pitchFamily="34" charset="0"/>
+                <a:cs typeface="Arial" panose="020B0604020202020204" pitchFamily="34" charset="0"/>
+              </a:rPr>
+              <a:t>Гитхаб</a:t>
+            </a:r>
+            <a:r>
+              <a:rPr lang="ru-RU" sz="2000" dirty="0" smtClean="0">
+                <a:latin typeface="Arial" panose="020B0604020202020204" pitchFamily="34" charset="0"/>
+                <a:cs typeface="Arial" panose="020B0604020202020204" pitchFamily="34" charset="0"/>
+              </a:rPr>
+              <a:t> проекта: </a:t>
+            </a:r>
+            <a:r>
+              <a:rPr lang="en-US" sz="2000" dirty="0" smtClean="0">
+                <a:latin typeface="Arial" panose="020B0604020202020204" pitchFamily="34" charset="0"/>
+                <a:cs typeface="Arial" panose="020B0604020202020204" pitchFamily="34" charset="0"/>
+                <a:hlinkClick r:id="rId2"/>
+              </a:rPr>
+              <a:t>https://github.com/Olmeor/Data-engineer_Rostelecom_programming_school</a:t>
+            </a:r>
+            <a:endParaRPr lang="ru-RU" sz="2000" dirty="0" smtClean="0">
+              <a:latin typeface="Arial" panose="020B0604020202020204" pitchFamily="34" charset="0"/>
+              <a:cs typeface="Arial" panose="020B0604020202020204" pitchFamily="34" charset="0"/>
+            </a:endParaRPr>
+          </a:p>
+          <a:p>
+            <a:pPr marL="457200" indent="-457200">
+              <a:buFont typeface="+mj-lt"/>
+              <a:buAutoNum type="arabicPeriod"/>
+            </a:pPr>
+            <a:r>
+              <a:rPr lang="ru-RU" sz="2000" dirty="0" smtClean="0">
+                <a:latin typeface="Arial" panose="020B0604020202020204" pitchFamily="34" charset="0"/>
+                <a:cs typeface="Arial" panose="020B0604020202020204" pitchFamily="34" charset="0"/>
+              </a:rPr>
+              <a:t>Рейтинг популярности телеканалов: </a:t>
+            </a:r>
+            <a:r>
+              <a:rPr lang="en-US" sz="2000" dirty="0">
+                <a:latin typeface="Arial" panose="020B0604020202020204" pitchFamily="34" charset="0"/>
+                <a:cs typeface="Arial" panose="020B0604020202020204" pitchFamily="34" charset="0"/>
+                <a:hlinkClick r:id="rId3"/>
+              </a:rPr>
+              <a:t>https://</a:t>
+            </a:r>
+            <a:r>
+              <a:rPr lang="en-US" sz="2000" dirty="0" smtClean="0">
+                <a:latin typeface="Arial" panose="020B0604020202020204" pitchFamily="34" charset="0"/>
+                <a:cs typeface="Arial" panose="020B0604020202020204" pitchFamily="34" charset="0"/>
+                <a:hlinkClick r:id="rId3"/>
+              </a:rPr>
+              <a:t>www.powernet.com.ru/channels-stat</a:t>
+            </a:r>
+            <a:endParaRPr lang="ru-RU" sz="2000" dirty="0" smtClean="0">
+              <a:latin typeface="Arial" panose="020B0604020202020204" pitchFamily="34" charset="0"/>
+              <a:cs typeface="Arial" panose="020B0604020202020204" pitchFamily="34" charset="0"/>
+            </a:endParaRPr>
+          </a:p>
+          <a:p>
+            <a:pPr marL="457200" indent="-457200">
+              <a:buFont typeface="+mj-lt"/>
+              <a:buAutoNum type="arabicPeriod"/>
+            </a:pPr>
+            <a:r>
+              <a:rPr lang="ru-RU" sz="2000" dirty="0" smtClean="0">
+                <a:latin typeface="Arial" panose="020B0604020202020204" pitchFamily="34" charset="0"/>
+                <a:cs typeface="Arial" panose="020B0604020202020204" pitchFamily="34" charset="0"/>
+              </a:rPr>
+              <a:t>Аналитика просмотров: </a:t>
+            </a:r>
+            <a:r>
+              <a:rPr lang="en-US" sz="2000" dirty="0">
+                <a:latin typeface="Arial" panose="020B0604020202020204" pitchFamily="34" charset="0"/>
+                <a:cs typeface="Arial" panose="020B0604020202020204" pitchFamily="34" charset="0"/>
+                <a:hlinkClick r:id="rId4"/>
+              </a:rPr>
+              <a:t>https://journal.tinkoff.ru/television-stat/</a:t>
+            </a:r>
+            <a:endParaRPr lang="ru-RU" sz="2000" dirty="0">
+              <a:latin typeface="Arial" panose="020B0604020202020204" pitchFamily="34" charset="0"/>
+              <a:cs typeface="Arial" panose="020B0604020202020204" pitchFamily="34" charset="0"/>
+            </a:endParaRPr>
+          </a:p>
+        </p:txBody>
+      </p:sp>
+      <p:sp>
+        <p:nvSpPr>
+          <p:cNvPr id="6" name="Заголовок 1">
+            <a:extLst>
+              <a:ext uri="{FF2B5EF4-FFF2-40B4-BE49-F238E27FC236}">
+                <a16:creationId xmlns:a16="http://schemas.microsoft.com/office/drawing/2014/main" id="{26F3F6DE-0B95-4A88-A2DE-D547275A4F55}"/>
+              </a:ext>
+            </a:extLst>
+          </p:cNvPr>
+          <p:cNvSpPr txBox="1">
+            <a:spLocks/>
+          </p:cNvSpPr>
+          <p:nvPr/>
+        </p:nvSpPr>
+        <p:spPr>
+          <a:xfrm>
+            <a:off x="439151" y="560538"/>
+            <a:ext cx="11160127" cy="523220"/>
+          </a:xfrm>
+          <a:prstGeom prst="rect">
+            <a:avLst/>
+          </a:prstGeom>
+        </p:spPr>
+        <p:txBody>
+          <a:bodyPr lIns="0" tIns="0" rIns="0" bIns="0" anchor="t" anchorCtr="0">
+            <a:spAutoFit/>
+          </a:bodyPr>
+          <a:lstStyle>
+            <a:lvl1pPr algn="l" defTabSz="914400" rtl="0" eaLnBrk="1" latinLnBrk="0" hangingPunct="1">
+              <a:lnSpc>
+                <a:spcPts val="4000"/>
+              </a:lnSpc>
+              <a:spcBef>
+                <a:spcPct val="0"/>
+              </a:spcBef>
+              <a:buNone/>
+              <a:defRPr sz="3600" b="0" kern="1200">
+                <a:solidFill>
+                  <a:schemeClr val="tx1"/>
+                </a:solidFill>
+                <a:effectLst>
+                  <a:outerShdw blurRad="38100" dist="38100" dir="2700000" algn="tl">
+                    <a:srgbClr val="000000">
+                      <a:alpha val="43137"/>
+                    </a:srgbClr>
+                  </a:outerShdw>
+                </a:effectLst>
+                <a:latin typeface="Rostelecom Basis Medium" panose="020B0603030604040103" pitchFamily="34" charset="0"/>
+                <a:ea typeface="+mj-ea"/>
+                <a:cs typeface="+mj-cs"/>
+              </a:defRPr>
+            </a:lvl1pPr>
+          </a:lstStyle>
+          <a:p>
+            <a:r>
+              <a:rPr lang="ru-RU" b="1" dirty="0" smtClean="0">
+                <a:effectLst/>
+                <a:latin typeface="Arial" panose="020B0604020202020204" pitchFamily="34" charset="0"/>
+                <a:cs typeface="Arial" panose="020B0604020202020204" pitchFamily="34" charset="0"/>
+              </a:rPr>
+              <a:t>Список ссылок</a:t>
+            </a:r>
+            <a:endParaRPr lang="ru-RU" b="1" dirty="0">
+              <a:latin typeface="Arial" panose="020B0604020202020204" pitchFamily="34" charset="0"/>
+              <a:cs typeface="Arial" panose="020B0604020202020204" pitchFamily="34" charset="0"/>
+            </a:endParaRPr>
+          </a:p>
+        </p:txBody>
+      </p:sp>
+      <p:pic>
+        <p:nvPicPr>
+          <p:cNvPr id="7" name="Рисунок 6"/>
+          <p:cNvPicPr>
+            <a:picLocks noChangeAspect="1"/>
+          </p:cNvPicPr>
+          <p:nvPr/>
+        </p:nvPicPr>
+        <p:blipFill>
+          <a:blip r:embed="rId5">
+            <a:extLst>
+              <a:ext uri="{28A0092B-C50C-407E-A947-70E740481C1C}">
+                <a14:useLocalDpi xmlns:a14="http://schemas.microsoft.com/office/drawing/2010/main" val="0"/>
+              </a:ext>
+            </a:extLst>
+          </a:blip>
+          <a:stretch>
+            <a:fillRect/>
+          </a:stretch>
+        </p:blipFill>
+        <p:spPr>
+          <a:xfrm>
+            <a:off x="9464774" y="532515"/>
+            <a:ext cx="2134504" cy="551243"/>
+          </a:xfrm>
+          <a:prstGeom prst="rect">
+            <a:avLst/>
+          </a:prstGeom>
+        </p:spPr>
+      </p:pic>
+    </p:spTree>
+    <p:extLst>
+      <p:ext uri="{BB962C8B-B14F-4D97-AF65-F5344CB8AC3E}">
+        <p14:creationId xmlns:p14="http://schemas.microsoft.com/office/powerpoint/2010/main" val="112172180"/>
+      </p:ext>
+    </p:extLst>
+  </p:cSld>
+  <p:clrMapOvr>
+    <a:masterClrMapping/>
+  </p:clrMapOvr>
+  <p:timing>
+    <p:tnLst>
+      <p:par>
+        <p:cTn id="1" dur="indefinite" restart="never" nodeType="tmRoot"/>
+      </p:par>
+    </p:tnLst>
+  </p:timing>
+</p:sld>
+</file>
+
+<file path=ppt/slides/slide11.xml><?xml version="1.0" encoding="utf-8"?>
+<p:sld xmlns:a="http://schemas.openxmlformats.org/drawingml/2006/main" xmlns:r="http://schemas.openxmlformats.org/officeDocument/2006/relationships" xmlns:p="http://schemas.openxmlformats.org/presentationml/2006/main">
+  <p:cSld>
+    <p:bg>
+      <p:bgPr>
+        <a:solidFill>
+          <a:srgbClr val="7700FF"/>
+        </a:solidFill>
+        <a:effectLst/>
+      </p:bgPr>
+    </p:bg>
+    <p:spTree>
+      <p:nvGrpSpPr>
+        <p:cNvPr id="1" name=""/>
+        <p:cNvGrpSpPr/>
+        <p:nvPr/>
+      </p:nvGrpSpPr>
+      <p:grpSpPr>
+        <a:xfrm>
+          <a:off x="0" y="0"/>
+          <a:ext cx="0" cy="0"/>
+          <a:chOff x="0" y="0"/>
+          <a:chExt cx="0" cy="0"/>
+        </a:xfrm>
+      </p:grpSpPr>
+      <p:sp>
+        <p:nvSpPr>
+          <p:cNvPr id="7" name="Заголовок 1">
+            <a:extLst>
+              <a:ext uri="{FF2B5EF4-FFF2-40B4-BE49-F238E27FC236}">
+                <a16:creationId xmlns:a16="http://schemas.microsoft.com/office/drawing/2014/main" id="{26F3F6DE-0B95-4A88-A2DE-D547275A4F55}"/>
+              </a:ext>
+            </a:extLst>
+          </p:cNvPr>
+          <p:cNvSpPr txBox="1">
+            <a:spLocks/>
+          </p:cNvSpPr>
+          <p:nvPr/>
+        </p:nvSpPr>
+        <p:spPr>
+          <a:xfrm>
+            <a:off x="439153" y="1487179"/>
+            <a:ext cx="11160127" cy="2215991"/>
+          </a:xfrm>
+          <a:prstGeom prst="rect">
+            <a:avLst/>
+          </a:prstGeom>
+        </p:spPr>
+        <p:txBody>
+          <a:bodyPr lIns="0" tIns="0" rIns="0" bIns="0" anchor="t" anchorCtr="0">
+            <a:spAutoFit/>
+          </a:bodyPr>
+          <a:lstStyle>
+            <a:lvl1pPr algn="l" defTabSz="914400" rtl="0" eaLnBrk="1" latinLnBrk="0" hangingPunct="1">
+              <a:lnSpc>
+                <a:spcPts val="4000"/>
+              </a:lnSpc>
+              <a:spcBef>
+                <a:spcPct val="0"/>
+              </a:spcBef>
+              <a:buNone/>
+              <a:defRPr sz="3600" b="0" kern="1200">
+                <a:solidFill>
+                  <a:schemeClr val="tx1"/>
+                </a:solidFill>
+                <a:effectLst>
+                  <a:outerShdw blurRad="38100" dist="38100" dir="2700000" algn="tl">
+                    <a:srgbClr val="000000">
+                      <a:alpha val="43137"/>
+                    </a:srgbClr>
+                  </a:outerShdw>
+                </a:effectLst>
+                <a:latin typeface="Rostelecom Basis Medium" panose="020B0603030604040103" pitchFamily="34" charset="0"/>
+                <a:ea typeface="+mj-ea"/>
+                <a:cs typeface="+mj-cs"/>
+              </a:defRPr>
+            </a:lvl1pPr>
+          </a:lstStyle>
+          <a:p>
+            <a:pPr>
+              <a:lnSpc>
+                <a:spcPct val="150000"/>
+              </a:lnSpc>
+            </a:pPr>
+            <a:r>
+              <a:rPr lang="ru-RU" sz="4800" b="1" dirty="0" smtClean="0">
+                <a:solidFill>
+                  <a:schemeClr val="bg1"/>
+                </a:solidFill>
+                <a:effectLst/>
+                <a:latin typeface="Arial" panose="020B0604020202020204" pitchFamily="34" charset="0"/>
+                <a:cs typeface="Arial" panose="020B0604020202020204" pitchFamily="34" charset="0"/>
+              </a:rPr>
+              <a:t>Спасибо за внимание!</a:t>
+            </a:r>
+            <a:br>
+              <a:rPr lang="ru-RU" sz="4800" b="1" dirty="0" smtClean="0">
+                <a:solidFill>
+                  <a:schemeClr val="bg1"/>
+                </a:solidFill>
+                <a:effectLst/>
+                <a:latin typeface="Arial" panose="020B0604020202020204" pitchFamily="34" charset="0"/>
+                <a:cs typeface="Arial" panose="020B0604020202020204" pitchFamily="34" charset="0"/>
+              </a:rPr>
+            </a:br>
+            <a:r>
+              <a:rPr lang="ru-RU" sz="4800" b="1" dirty="0" smtClean="0">
+                <a:solidFill>
+                  <a:schemeClr val="bg1"/>
+                </a:solidFill>
+                <a:effectLst/>
+                <a:latin typeface="Arial" panose="020B0604020202020204" pitchFamily="34" charset="0"/>
+                <a:cs typeface="Arial" panose="020B0604020202020204" pitchFamily="34" charset="0"/>
+              </a:rPr>
+              <a:t>Готовы ответить на ваши вопросы</a:t>
+            </a:r>
+            <a:endParaRPr lang="ru-RU" sz="4800" b="1" dirty="0">
+              <a:solidFill>
+                <a:schemeClr val="bg1"/>
+              </a:solidFill>
+              <a:latin typeface="Arial" panose="020B0604020202020204" pitchFamily="34" charset="0"/>
+              <a:cs typeface="Arial" panose="020B0604020202020204" pitchFamily="34" charset="0"/>
+            </a:endParaRPr>
+          </a:p>
+        </p:txBody>
+      </p:sp>
+      <p:pic>
+        <p:nvPicPr>
+          <p:cNvPr id="2" name="Рисунок 1"/>
+          <p:cNvPicPr>
+            <a:picLocks noChangeAspect="1"/>
+          </p:cNvPicPr>
+          <p:nvPr/>
+        </p:nvPicPr>
+        <p:blipFill>
+          <a:blip r:embed="rId2">
+            <a:extLst>
+              <a:ext uri="{28A0092B-C50C-407E-A947-70E740481C1C}">
+                <a14:useLocalDpi xmlns:a14="http://schemas.microsoft.com/office/drawing/2010/main" val="0"/>
+              </a:ext>
+            </a:extLst>
+          </a:blip>
+          <a:stretch>
+            <a:fillRect/>
+          </a:stretch>
+        </p:blipFill>
+        <p:spPr>
+          <a:xfrm>
+            <a:off x="311493" y="378100"/>
+            <a:ext cx="2780907" cy="762367"/>
+          </a:xfrm>
+          <a:prstGeom prst="rect">
+            <a:avLst/>
+          </a:prstGeom>
+          <a:ln>
+            <a:noFill/>
+          </a:ln>
+          <a:effectLst>
+            <a:outerShdw blurRad="292100" dist="139700" dir="2700000" algn="tl" rotWithShape="0">
+              <a:srgbClr val="333333">
+                <a:alpha val="65000"/>
+              </a:srgbClr>
+            </a:outerShdw>
+          </a:effectLst>
+        </p:spPr>
+      </p:pic>
+      <p:sp>
+        <p:nvSpPr>
+          <p:cNvPr id="8" name="Заголовок 1">
+            <a:extLst>
+              <a:ext uri="{FF2B5EF4-FFF2-40B4-BE49-F238E27FC236}">
+                <a16:creationId xmlns:a16="http://schemas.microsoft.com/office/drawing/2014/main" id="{26F3F6DE-0B95-4A88-A2DE-D547275A4F55}"/>
+              </a:ext>
+            </a:extLst>
+          </p:cNvPr>
+          <p:cNvSpPr txBox="1">
+            <a:spLocks/>
+          </p:cNvSpPr>
+          <p:nvPr/>
+        </p:nvSpPr>
+        <p:spPr>
+          <a:xfrm>
+            <a:off x="439152" y="3963798"/>
+            <a:ext cx="11160127" cy="1538883"/>
+          </a:xfrm>
+          <a:prstGeom prst="rect">
+            <a:avLst/>
+          </a:prstGeom>
+        </p:spPr>
+        <p:txBody>
+          <a:bodyPr lIns="0" tIns="0" rIns="0" bIns="0" anchor="t" anchorCtr="0">
+            <a:spAutoFit/>
+          </a:bodyPr>
+          <a:lstStyle>
+            <a:lvl1pPr algn="l" defTabSz="914400" rtl="0" eaLnBrk="1" latinLnBrk="0" hangingPunct="1">
+              <a:lnSpc>
+                <a:spcPts val="4000"/>
+              </a:lnSpc>
+              <a:spcBef>
+                <a:spcPct val="0"/>
+              </a:spcBef>
+              <a:buNone/>
+              <a:defRPr sz="3600" b="0" kern="1200">
+                <a:solidFill>
+                  <a:schemeClr val="tx1"/>
+                </a:solidFill>
+                <a:effectLst>
+                  <a:outerShdw blurRad="38100" dist="38100" dir="2700000" algn="tl">
+                    <a:srgbClr val="000000">
+                      <a:alpha val="43137"/>
+                    </a:srgbClr>
+                  </a:outerShdw>
+                </a:effectLst>
+                <a:latin typeface="Rostelecom Basis Medium" panose="020B0603030604040103" pitchFamily="34" charset="0"/>
+                <a:ea typeface="+mj-ea"/>
+                <a:cs typeface="+mj-cs"/>
+              </a:defRPr>
+            </a:lvl1pPr>
+          </a:lstStyle>
+          <a:p>
+            <a:r>
+              <a:rPr lang="ru-RU" sz="2800" dirty="0" smtClean="0">
+                <a:solidFill>
+                  <a:schemeClr val="bg1"/>
+                </a:solidFill>
+                <a:effectLst/>
+                <a:latin typeface="Arial" panose="020B0604020202020204" pitchFamily="34" charset="0"/>
+                <a:cs typeface="Arial" panose="020B0604020202020204" pitchFamily="34" charset="0"/>
+              </a:rPr>
+              <a:t>Команда проекта:</a:t>
+            </a:r>
+            <a:br>
+              <a:rPr lang="ru-RU" sz="2800" dirty="0" smtClean="0">
+                <a:solidFill>
+                  <a:schemeClr val="bg1"/>
+                </a:solidFill>
+                <a:effectLst/>
+                <a:latin typeface="Arial" panose="020B0604020202020204" pitchFamily="34" charset="0"/>
+                <a:cs typeface="Arial" panose="020B0604020202020204" pitchFamily="34" charset="0"/>
+              </a:rPr>
+            </a:br>
+            <a:r>
+              <a:rPr lang="ru-RU" sz="2400" dirty="0" smtClean="0">
+                <a:solidFill>
+                  <a:schemeClr val="bg1"/>
+                </a:solidFill>
+                <a:effectLst/>
+                <a:latin typeface="Arial" panose="020B0604020202020204" pitchFamily="34" charset="0"/>
+                <a:cs typeface="Arial" panose="020B0604020202020204" pitchFamily="34" charset="0"/>
+              </a:rPr>
+              <a:t>Фамилия И</a:t>
+            </a:r>
+            <a:r>
+              <a:rPr lang="en-US" sz="2400" dirty="0" smtClean="0">
+                <a:solidFill>
+                  <a:schemeClr val="bg1"/>
+                </a:solidFill>
+                <a:effectLst/>
+                <a:latin typeface="Arial" panose="020B0604020202020204" pitchFamily="34" charset="0"/>
+                <a:cs typeface="Arial" panose="020B0604020202020204" pitchFamily="34" charset="0"/>
+              </a:rPr>
+              <a:t>.</a:t>
+            </a:r>
+            <a:r>
+              <a:rPr lang="ru-RU" sz="2400" dirty="0" smtClean="0">
+                <a:solidFill>
+                  <a:schemeClr val="bg1"/>
+                </a:solidFill>
+                <a:effectLst/>
+                <a:latin typeface="Arial" panose="020B0604020202020204" pitchFamily="34" charset="0"/>
+                <a:cs typeface="Arial" panose="020B0604020202020204" pitchFamily="34" charset="0"/>
+              </a:rPr>
+              <a:t>О</a:t>
+            </a:r>
+            <a:r>
+              <a:rPr lang="en-US" sz="2400" dirty="0" smtClean="0">
+                <a:solidFill>
+                  <a:schemeClr val="bg1"/>
+                </a:solidFill>
+                <a:effectLst/>
+                <a:latin typeface="Arial" panose="020B0604020202020204" pitchFamily="34" charset="0"/>
+                <a:cs typeface="Arial" panose="020B0604020202020204" pitchFamily="34" charset="0"/>
+              </a:rPr>
+              <a:t>.</a:t>
+            </a:r>
+            <a:r>
+              <a:rPr lang="ru-RU" sz="2400" dirty="0" smtClean="0">
+                <a:solidFill>
+                  <a:schemeClr val="bg1"/>
+                </a:solidFill>
+                <a:effectLst/>
+                <a:latin typeface="Arial" panose="020B0604020202020204" pitchFamily="34" charset="0"/>
+                <a:cs typeface="Arial" panose="020B0604020202020204" pitchFamily="34" charset="0"/>
+              </a:rPr>
+              <a:t/>
+            </a:r>
+            <a:br>
+              <a:rPr lang="ru-RU" sz="2400" dirty="0" smtClean="0">
+                <a:solidFill>
+                  <a:schemeClr val="bg1"/>
+                </a:solidFill>
+                <a:effectLst/>
+                <a:latin typeface="Arial" panose="020B0604020202020204" pitchFamily="34" charset="0"/>
+                <a:cs typeface="Arial" panose="020B0604020202020204" pitchFamily="34" charset="0"/>
+              </a:rPr>
+            </a:br>
+            <a:r>
+              <a:rPr lang="ru-RU" sz="2400" dirty="0" smtClean="0">
+                <a:solidFill>
+                  <a:schemeClr val="bg1"/>
+                </a:solidFill>
+                <a:effectLst/>
+                <a:latin typeface="Arial" panose="020B0604020202020204" pitchFamily="34" charset="0"/>
+                <a:cs typeface="Arial" panose="020B0604020202020204" pitchFamily="34" charset="0"/>
+              </a:rPr>
+              <a:t>Фамилия И</a:t>
+            </a:r>
+            <a:r>
+              <a:rPr lang="en-US" sz="2400" dirty="0" smtClean="0">
+                <a:solidFill>
+                  <a:schemeClr val="bg1"/>
+                </a:solidFill>
+                <a:effectLst/>
+                <a:latin typeface="Arial" panose="020B0604020202020204" pitchFamily="34" charset="0"/>
+                <a:cs typeface="Arial" panose="020B0604020202020204" pitchFamily="34" charset="0"/>
+              </a:rPr>
+              <a:t>.</a:t>
+            </a:r>
+            <a:r>
+              <a:rPr lang="ru-RU" sz="2400" dirty="0" smtClean="0">
+                <a:solidFill>
+                  <a:schemeClr val="bg1"/>
+                </a:solidFill>
+                <a:effectLst/>
+                <a:latin typeface="Arial" panose="020B0604020202020204" pitchFamily="34" charset="0"/>
+                <a:cs typeface="Arial" panose="020B0604020202020204" pitchFamily="34" charset="0"/>
+              </a:rPr>
+              <a:t>О</a:t>
+            </a:r>
+            <a:endParaRPr lang="ru-RU" sz="2400" dirty="0">
+              <a:solidFill>
+                <a:schemeClr val="bg1"/>
+              </a:solidFill>
+              <a:latin typeface="Arial" panose="020B0604020202020204" pitchFamily="34" charset="0"/>
+              <a:cs typeface="Arial" panose="020B0604020202020204" pitchFamily="34" charset="0"/>
+            </a:endParaRPr>
+          </a:p>
+        </p:txBody>
+      </p:sp>
+    </p:spTree>
+    <p:extLst>
+      <p:ext uri="{BB962C8B-B14F-4D97-AF65-F5344CB8AC3E}">
+        <p14:creationId xmlns:p14="http://schemas.microsoft.com/office/powerpoint/2010/main" val="449845413"/>
       </p:ext>
     </p:extLst>
   </p:cSld>
@@ -4673,15 +5410,7 @@
                 <a:latin typeface="Arial" panose="020B0604020202020204" pitchFamily="34" charset="0"/>
                 <a:cs typeface="Arial" panose="020B0604020202020204" pitchFamily="34" charset="0"/>
               </a:rPr>
-              <a:t>и агрегация данных с использованием Apache Hive </a:t>
-            </a:r>
-            <a:r>
-              <a:rPr lang="ru-RU" sz="2000" dirty="0">
-                <a:effectLst/>
-                <a:latin typeface="Arial" panose="020B0604020202020204" pitchFamily="34" charset="0"/>
-                <a:cs typeface="Arial" panose="020B0604020202020204" pitchFamily="34" charset="0"/>
-              </a:rPr>
-              <a:t>в</a:t>
+              <a:t>и агрегация данных с использованием Apache Hive в</a:t>
             </a:r>
             <a:r>
               <a:rPr lang="en-US" sz="2000" dirty="0">
@@ -5592,117 +6321,6 @@
       </p:sp>
       <p:sp>
         <p:nvSpPr>
-          <p:cNvPr id="5" name="Заголовок 1">
-            <a:extLst>
-              <a:ext uri="{FF2B5EF4-FFF2-40B4-BE49-F238E27FC236}">
-                <a16:creationId xmlns:a16="http://schemas.microsoft.com/office/drawing/2014/main" id="{26F3F6DE-0B95-4A88-A2DE-D547275A4F55}"/>
-              </a:ext>
-            </a:extLst>
-          </p:cNvPr>
-          <p:cNvSpPr txBox="1">
-            <a:spLocks/>
-          </p:cNvSpPr>
-          <p:nvPr/>
-        </p:nvSpPr>
-        <p:spPr>
-          <a:xfrm>
-            <a:off x="439152" y="2920189"/>
-            <a:ext cx="11160127" cy="2051844"/>
-          </a:xfrm>
-          <a:prstGeom prst="rect">
-            <a:avLst/>
-          </a:prstGeom>
-        </p:spPr>
-        <p:txBody>
-          <a:bodyPr lIns="0" tIns="0" rIns="0" bIns="0" anchor="t" anchorCtr="0">
-            <a:spAutoFit/>
-          </a:bodyPr>
-          <a:lstStyle>
-            <a:defPPr>
-              <a:defRPr lang="ru-RU"/>
-            </a:defPPr>
-            <a:lvl1pPr>
-              <a:lnSpc>
-                <a:spcPts val="4000"/>
-              </a:lnSpc>
-              <a:spcBef>
-                <a:spcPct val="0"/>
-              </a:spcBef>
-              <a:buNone/>
-              <a:defRPr sz="2800" b="0">
-                <a:effectLst/>
-                <a:latin typeface="Rostelecom Basis Medium" panose="020B0603030604040103" pitchFamily="34" charset="0"/>
-                <a:ea typeface="+mj-ea"/>
-                <a:cs typeface="+mj-cs"/>
-              </a:defRPr>
-            </a:lvl1pPr>
-          </a:lstStyle>
-          <a:p>
-            <a:r>
-              <a:rPr lang="ru-RU" dirty="0" smtClean="0">
-                <a:latin typeface="Arial" panose="020B0604020202020204" pitchFamily="34" charset="0"/>
-                <a:cs typeface="Arial" panose="020B0604020202020204" pitchFamily="34" charset="0"/>
-              </a:rPr>
-              <a:t>На слайдах с решением расскажите о том</a:t>
-            </a:r>
-            <a:r>
-              <a:rPr lang="en-US" dirty="0" smtClean="0">
-                <a:latin typeface="Arial" panose="020B0604020202020204" pitchFamily="34" charset="0"/>
-                <a:cs typeface="Arial" panose="020B0604020202020204" pitchFamily="34" charset="0"/>
-              </a:rPr>
-              <a:t>,</a:t>
-            </a:r>
-            <a:r>
-              <a:rPr lang="ru-RU" dirty="0" smtClean="0">
-                <a:latin typeface="Arial" panose="020B0604020202020204" pitchFamily="34" charset="0"/>
-                <a:cs typeface="Arial" panose="020B0604020202020204" pitchFamily="34" charset="0"/>
-              </a:rPr>
-              <a:t> как вы решали поставленные задачи</a:t>
-            </a:r>
-            <a:r>
-              <a:rPr lang="en-US" dirty="0" smtClean="0">
-                <a:latin typeface="Arial" panose="020B0604020202020204" pitchFamily="34" charset="0"/>
-                <a:cs typeface="Arial" panose="020B0604020202020204" pitchFamily="34" charset="0"/>
-              </a:rPr>
-              <a:t>,</a:t>
-            </a:r>
-            <a:r>
-              <a:rPr lang="ru-RU" dirty="0" smtClean="0">
-                <a:latin typeface="Arial" panose="020B0604020202020204" pitchFamily="34" charset="0"/>
-                <a:cs typeface="Arial" panose="020B0604020202020204" pitchFamily="34" charset="0"/>
-              </a:rPr>
-              <a:t> что учитывали и что удалось сделать</a:t>
-            </a:r>
-            <a:r>
-              <a:rPr lang="en-US" dirty="0" smtClean="0">
-                <a:latin typeface="Arial" panose="020B0604020202020204" pitchFamily="34" charset="0"/>
-                <a:cs typeface="Arial" panose="020B0604020202020204" pitchFamily="34" charset="0"/>
-              </a:rPr>
-              <a:t>. </a:t>
-            </a:r>
-            <a:r>
-              <a:rPr lang="ru-RU" dirty="0" smtClean="0">
-                <a:latin typeface="Arial" panose="020B0604020202020204" pitchFamily="34" charset="0"/>
-                <a:cs typeface="Arial" panose="020B0604020202020204" pitchFamily="34" charset="0"/>
-              </a:rPr>
-              <a:t>Здесь можно дать ссылки на репозиторий или приложить некоторые скриншоты</a:t>
-            </a:r>
-            <a:r>
-              <a:rPr lang="en-US" dirty="0" smtClean="0">
-                <a:latin typeface="Arial" panose="020B0604020202020204" pitchFamily="34" charset="0"/>
-                <a:cs typeface="Arial" panose="020B0604020202020204" pitchFamily="34" charset="0"/>
-              </a:rPr>
-              <a:t>. </a:t>
-            </a:r>
-            <a:endParaRPr lang="ru-RU" dirty="0">
-              <a:latin typeface="Arial" panose="020B0604020202020204" pitchFamily="34" charset="0"/>
-              <a:cs typeface="Arial" panose="020B0604020202020204" pitchFamily="34" charset="0"/>
-            </a:endParaRPr>
-          </a:p>
-        </p:txBody>
-      </p:sp>
-      <p:sp>
-        <p:nvSpPr>
           <p:cNvPr id="6" name="Заголовок 1">
             <a:extLst>
               <a:ext uri="{FF2B5EF4-FFF2-40B4-BE49-F238E27FC236}">
@@ -5761,7 +6379,7 @@
                 <a:latin typeface="Arial" panose="020B0604020202020204" pitchFamily="34" charset="0"/>
                 <a:cs typeface="Arial" panose="020B0604020202020204" pitchFamily="34" charset="0"/>
               </a:rPr>
-              <a:t>Решение</a:t>
+              <a:t>Формирование датасета</a:t>
             </a:r>
             <a:endParaRPr lang="ru-RU" b="1" dirty="0">
               <a:latin typeface="Arial" panose="020B0604020202020204" pitchFamily="34" charset="0"/>
@@ -5794,6 +6412,170 @@
           <a:xfrm>
             <a:off x="9464774" y="532515"/>
             <a:ext cx="2134504" cy="551243"/>
+          </a:xfrm>
+          <a:prstGeom prst="rect">
+            <a:avLst/>
+          </a:prstGeom>
+        </p:spPr>
+      </p:pic>
+      <p:pic>
+        <p:nvPicPr>
+          <p:cNvPr id="15" name="Рисунок 14"/>
+          <p:cNvPicPr>
+            <a:picLocks noChangeAspect="1"/>
+          </p:cNvPicPr>
+          <p:nvPr/>
+        </p:nvPicPr>
+        <p:blipFill>
+          <a:blip r:embed="rId3"/>
+          <a:stretch>
+            <a:fillRect/>
+          </a:stretch>
+        </p:blipFill>
+        <p:spPr>
+          <a:xfrm>
+            <a:off x="6508248" y="3134650"/>
+            <a:ext cx="5258534" cy="1181265"/>
+          </a:xfrm>
+          <a:prstGeom prst="rect">
+            <a:avLst/>
+          </a:prstGeom>
+          <a:ln w="15875">
+            <a:solidFill>
+              <a:schemeClr val="accent1"/>
+            </a:solidFill>
+          </a:ln>
+        </p:spPr>
+      </p:pic>
+      <p:pic>
+        <p:nvPicPr>
+          <p:cNvPr id="16" name="Рисунок 15"/>
+          <p:cNvPicPr>
+            <a:picLocks noChangeAspect="1"/>
+          </p:cNvPicPr>
+          <p:nvPr/>
+        </p:nvPicPr>
+        <p:blipFill>
+          <a:blip r:embed="rId4"/>
+          <a:stretch>
+            <a:fillRect/>
+          </a:stretch>
+        </p:blipFill>
+        <p:spPr>
+          <a:xfrm>
+            <a:off x="6508248" y="4768416"/>
+            <a:ext cx="1781424" cy="1381318"/>
+          </a:xfrm>
+          <a:prstGeom prst="rect">
+            <a:avLst/>
+          </a:prstGeom>
+          <a:ln w="15875">
+            <a:solidFill>
+              <a:schemeClr val="accent1"/>
+            </a:solidFill>
+          </a:ln>
+        </p:spPr>
+      </p:pic>
+      <p:pic>
+        <p:nvPicPr>
+          <p:cNvPr id="17" name="Рисунок 16"/>
+          <p:cNvPicPr>
+            <a:picLocks noChangeAspect="1"/>
+          </p:cNvPicPr>
+          <p:nvPr/>
+        </p:nvPicPr>
+        <p:blipFill>
+          <a:blip r:embed="rId5"/>
+          <a:stretch>
+            <a:fillRect/>
+          </a:stretch>
+        </p:blipFill>
+        <p:spPr>
+          <a:xfrm>
+            <a:off x="8956515" y="4758890"/>
+            <a:ext cx="2810267" cy="1390844"/>
+          </a:xfrm>
+          <a:prstGeom prst="rect">
+            <a:avLst/>
+          </a:prstGeom>
+          <a:ln w="15875">
+            <a:solidFill>
+              <a:schemeClr val="accent1"/>
+            </a:solidFill>
+          </a:ln>
+        </p:spPr>
+      </p:pic>
+      <p:pic>
+        <p:nvPicPr>
+          <p:cNvPr id="2" name="Рисунок 1"/>
+          <p:cNvPicPr>
+            <a:picLocks noChangeAspect="1"/>
+          </p:cNvPicPr>
+          <p:nvPr/>
+        </p:nvPicPr>
+        <p:blipFill>
+          <a:blip r:embed="rId6"/>
+          <a:stretch>
+            <a:fillRect/>
+          </a:stretch>
+        </p:blipFill>
+        <p:spPr>
+          <a:xfrm>
+            <a:off x="327586" y="1291306"/>
+            <a:ext cx="5867387" cy="2276647"/>
+          </a:xfrm>
+          <a:prstGeom prst="rect">
+            <a:avLst/>
+          </a:prstGeom>
+        </p:spPr>
+      </p:pic>
+      <p:pic>
+        <p:nvPicPr>
+          <p:cNvPr id="5" name="Рисунок 4"/>
+          <p:cNvPicPr>
+            <a:picLocks noChangeAspect="1"/>
+          </p:cNvPicPr>
+          <p:nvPr/>
+        </p:nvPicPr>
+        <p:blipFill>
+          <a:blip r:embed="rId7"/>
+          <a:stretch>
+            <a:fillRect/>
+          </a:stretch>
+        </p:blipFill>
+        <p:spPr>
+          <a:xfrm>
+            <a:off x="327586" y="3825310"/>
+            <a:ext cx="5830114" cy="2324424"/>
+          </a:xfrm>
+          <a:prstGeom prst="rect">
+            <a:avLst/>
+          </a:prstGeom>
+          <a:ln w="15875">
+            <a:solidFill>
+              <a:schemeClr val="accent1"/>
+            </a:solidFill>
+          </a:ln>
+        </p:spPr>
+      </p:pic>
+      <p:pic>
+        <p:nvPicPr>
+          <p:cNvPr id="8" name="Рисунок 7"/>
+          <p:cNvPicPr>
+            <a:picLocks noChangeAspect="1"/>
+          </p:cNvPicPr>
+          <p:nvPr/>
+        </p:nvPicPr>
+        <p:blipFill>
+          <a:blip r:embed="rId8"/>
+          <a:stretch>
+            <a:fillRect/>
+          </a:stretch>
+        </p:blipFill>
+        <p:spPr>
+          <a:xfrm>
+            <a:off x="6762147" y="1201656"/>
+            <a:ext cx="4620270" cy="1705213"/>
           </a:xfrm>
           <a:prstGeom prst="rect">
             <a:avLst/>
@@ -5906,96 +6688,6 @@
       </p:sp>
       <p:sp>
         <p:nvSpPr>
-          <p:cNvPr id="5" name="Заголовок 1">
-            <a:extLst>
-              <a:ext uri="{FF2B5EF4-FFF2-40B4-BE49-F238E27FC236}">
-                <a16:creationId xmlns:a16="http://schemas.microsoft.com/office/drawing/2014/main" id="{26F3F6DE-0B95-4A88-A2DE-D547275A4F55}"/>
-              </a:ext>
-            </a:extLst>
-          </p:cNvPr>
-          <p:cNvSpPr txBox="1">
-            <a:spLocks/>
-          </p:cNvSpPr>
-          <p:nvPr/>
-        </p:nvSpPr>
-        <p:spPr>
-          <a:xfrm>
-            <a:off x="439152" y="2920189"/>
-            <a:ext cx="11160127" cy="979435"/>
-          </a:xfrm>
-          <a:prstGeom prst="rect">
-            <a:avLst/>
-          </a:prstGeom>
-        </p:spPr>
-        <p:txBody>
-          <a:bodyPr lIns="0" tIns="0" rIns="0" bIns="0" anchor="t" anchorCtr="0">
-            <a:spAutoFit/>
-          </a:bodyPr>
-          <a:lstStyle>
-            <a:defPPr>
-              <a:defRPr lang="ru-RU"/>
-            </a:defPPr>
-            <a:lvl1pPr>
-              <a:lnSpc>
-                <a:spcPts val="4000"/>
-              </a:lnSpc>
-              <a:spcBef>
-                <a:spcPct val="0"/>
-              </a:spcBef>
-              <a:buNone/>
-              <a:defRPr sz="2800" b="0">
-                <a:effectLst/>
-                <a:latin typeface="Rostelecom Basis Medium" panose="020B0603030604040103" pitchFamily="34" charset="0"/>
-                <a:ea typeface="+mj-ea"/>
-                <a:cs typeface="+mj-cs"/>
-              </a:defRPr>
-            </a:lvl1pPr>
-          </a:lstStyle>
-          <a:p>
-            <a:r>
-              <a:rPr lang="ru-RU" dirty="0" smtClean="0">
-                <a:latin typeface="Arial" panose="020B0604020202020204" pitchFamily="34" charset="0"/>
-                <a:cs typeface="Arial" panose="020B0604020202020204" pitchFamily="34" charset="0"/>
-              </a:rPr>
-              <a:t>Основные итоги вашей работы</a:t>
-            </a:r>
-            <a:r>
-              <a:rPr lang="en-US" dirty="0" smtClean="0">
-                <a:latin typeface="Arial" panose="020B0604020202020204" pitchFamily="34" charset="0"/>
-                <a:cs typeface="Arial" panose="020B0604020202020204" pitchFamily="34" charset="0"/>
-              </a:rPr>
-              <a:t>,</a:t>
-            </a:r>
-            <a:r>
-              <a:rPr lang="ru-RU" dirty="0" smtClean="0">
-                <a:latin typeface="Arial" panose="020B0604020202020204" pitchFamily="34" charset="0"/>
-                <a:cs typeface="Arial" panose="020B0604020202020204" pitchFamily="34" charset="0"/>
-              </a:rPr>
-              <a:t> </a:t>
-            </a:r>
-            <a:r>
-              <a:rPr lang="ru-RU" dirty="0" err="1" smtClean="0">
-                <a:latin typeface="Arial" panose="020B0604020202020204" pitchFamily="34" charset="0"/>
-                <a:cs typeface="Arial" panose="020B0604020202020204" pitchFamily="34" charset="0"/>
-              </a:rPr>
-              <a:t>инсайты</a:t>
-            </a:r>
-            <a:r>
-              <a:rPr lang="ru-RU" dirty="0" smtClean="0">
-                <a:latin typeface="Arial" panose="020B0604020202020204" pitchFamily="34" charset="0"/>
-                <a:cs typeface="Arial" panose="020B0604020202020204" pitchFamily="34" charset="0"/>
-              </a:rPr>
-              <a:t> после работы с данными и графики</a:t>
-            </a:r>
-            <a:endParaRPr lang="ru-RU" dirty="0">
-              <a:latin typeface="Arial" panose="020B0604020202020204" pitchFamily="34" charset="0"/>
-              <a:cs typeface="Arial" panose="020B0604020202020204" pitchFamily="34" charset="0"/>
-            </a:endParaRPr>
-          </a:p>
-        </p:txBody>
-      </p:sp>
-      <p:sp>
-        <p:nvSpPr>
           <p:cNvPr id="6" name="Заголовок 1">
             <a:extLst>
               <a:ext uri="{FF2B5EF4-FFF2-40B4-BE49-F238E27FC236}">
@@ -6054,15 +6746,15 @@
                 <a:latin typeface="Arial" panose="020B0604020202020204" pitchFamily="34" charset="0"/>
                 <a:cs typeface="Arial" panose="020B0604020202020204" pitchFamily="34" charset="0"/>
               </a:rPr>
-              <a:t>Итоги и </a:t>
-            </a:r>
-            <a:r>
-              <a:rPr lang="ru-RU" b="1" dirty="0" err="1">
-                <a:effectLst/>
-                <a:latin typeface="Arial" panose="020B0604020202020204" pitchFamily="34" charset="0"/>
-                <a:cs typeface="Arial" panose="020B0604020202020204" pitchFamily="34" charset="0"/>
-              </a:rPr>
-              <a:t>инсайты</a:t>
+              <a:t>Формирование </a:t>
+            </a:r>
+            <a:r>
+              <a:rPr lang="ru-RU" b="1" dirty="0" smtClean="0">
+                <a:effectLst/>
+                <a:latin typeface="Arial" panose="020B0604020202020204" pitchFamily="34" charset="0"/>
+                <a:cs typeface="Arial" panose="020B0604020202020204" pitchFamily="34" charset="0"/>
+              </a:rPr>
+              <a:t>датасета - код</a:t>
             </a:r>
             <a:endParaRPr lang="ru-RU" b="1" dirty="0">
               <a:latin typeface="Arial" panose="020B0604020202020204" pitchFamily="34" charset="0"/>
@@ -6101,10 +6793,58 @@
           </a:prstGeom>
         </p:spPr>
       </p:pic>
+      <p:pic>
+        <p:nvPicPr>
+          <p:cNvPr id="15" name="Рисунок 14"/>
+          <p:cNvPicPr>
+            <a:picLocks noChangeAspect="1"/>
+          </p:cNvPicPr>
+          <p:nvPr/>
+        </p:nvPicPr>
+        <p:blipFill>
+          <a:blip r:embed="rId3"/>
+          <a:stretch>
+            <a:fillRect/>
+          </a:stretch>
+        </p:blipFill>
+        <p:spPr>
+          <a:xfrm>
+            <a:off x="515939" y="1552140"/>
+            <a:ext cx="5405915" cy="4515285"/>
+          </a:xfrm>
+          <a:prstGeom prst="rect">
+            <a:avLst/>
+          </a:prstGeom>
+        </p:spPr>
+      </p:pic>
+      <p:pic>
+        <p:nvPicPr>
+          <p:cNvPr id="16" name="Рисунок 15"/>
+          <p:cNvPicPr>
+            <a:picLocks noChangeAspect="1"/>
+          </p:cNvPicPr>
+          <p:nvPr/>
+        </p:nvPicPr>
+        <p:blipFill>
+          <a:blip r:embed="rId4"/>
+          <a:stretch>
+            <a:fillRect/>
+          </a:stretch>
+        </p:blipFill>
+        <p:spPr>
+          <a:xfrm>
+            <a:off x="6172200" y="1552140"/>
+            <a:ext cx="5427078" cy="4522565"/>
+          </a:xfrm>
+          <a:prstGeom prst="rect">
+            <a:avLst/>
+          </a:prstGeom>
+        </p:spPr>
+      </p:pic>
     </p:spTree>
     <p:extLst>
       <p:ext uri="{BB962C8B-B14F-4D97-AF65-F5344CB8AC3E}">
-        <p14:creationId xmlns:p14="http://schemas.microsoft.com/office/powerpoint/2010/main" val="921795148"/>
+        <p14:creationId xmlns:p14="http://schemas.microsoft.com/office/powerpoint/2010/main" val="2476784764"/>
       </p:ext>
     </p:extLst>
   </p:cSld>
@@ -6127,7 +6867,7 @@
     <p:bg>
       <p:bgPr>
         <a:solidFill>
-          <a:srgbClr val="7700FF"/>
+          <a:schemeClr val="bg1"/>
         </a:solidFill>
         <a:effectLst/>
       </p:bgPr>
@@ -6148,7 +6888,211 @@
       </p:grpSpPr>
       <p:sp>
         <p:nvSpPr>
-          <p:cNvPr id="7" name="Заголовок 1">
+          <p:cNvPr id="3" name="Объект 2"/>
+          <p:cNvSpPr>
+            <a:spLocks noGrp="1"/>
+          </p:cNvSpPr>
+          <p:nvPr>
+            <p:ph sz="half" idx="1"/>
+          </p:nvPr>
+        </p:nvSpPr>
+        <p:spPr>
+          <a:xfrm>
+            <a:off x="439151" y="1362635"/>
+            <a:ext cx="5459625" cy="4814328"/>
+          </a:xfrm>
+        </p:spPr>
+        <p:txBody>
+          <a:bodyPr>
+            <a:normAutofit/>
+          </a:bodyPr>
+          <a:lstStyle/>
+          <a:p>
+            <a:pPr marL="0" indent="0" algn="just">
+              <a:buNone/>
+            </a:pPr>
+            <a:r>
+              <a:rPr lang="ru-RU" dirty="0"/>
+              <a:t>Создание продюсера на Python, который будет симулировать данные </a:t>
+            </a:r>
+            <a:r>
+              <a:rPr lang="ru-RU" dirty="0" smtClean="0"/>
+              <a:t>о</a:t>
+            </a:r>
+            <a:r>
+              <a:rPr lang="en-US" dirty="0" smtClean="0"/>
+              <a:t> </a:t>
+            </a:r>
+            <a:r>
+              <a:rPr lang="ru-RU" dirty="0" smtClean="0"/>
+              <a:t>поведении </a:t>
+            </a:r>
+            <a:r>
+              <a:rPr lang="ru-RU" dirty="0"/>
+              <a:t>пользователей интерактивного телевидения. Например:</a:t>
+            </a:r>
+          </a:p>
+          <a:p>
+            <a:pPr algn="just"/>
+            <a:r>
+              <a:rPr lang="en-US" dirty="0" smtClean="0"/>
+              <a:t>ID </a:t>
+            </a:r>
+            <a:r>
+              <a:rPr lang="ru-RU" dirty="0"/>
+              <a:t>пользователя</a:t>
+            </a:r>
+          </a:p>
+          <a:p>
+            <a:pPr algn="just"/>
+            <a:r>
+              <a:rPr lang="ru-RU" dirty="0" smtClean="0"/>
+              <a:t>время </a:t>
+            </a:r>
+            <a:r>
+              <a:rPr lang="ru-RU" dirty="0"/>
+              <a:t>начала и окончания просмотра</a:t>
+            </a:r>
+          </a:p>
+          <a:p>
+            <a:pPr algn="just"/>
+            <a:r>
+              <a:rPr lang="ru-RU" dirty="0" smtClean="0"/>
+              <a:t>выбранный </a:t>
+            </a:r>
+            <a:r>
+              <a:rPr lang="ru-RU" dirty="0"/>
+              <a:t>контент</a:t>
+            </a:r>
+          </a:p>
+          <a:p>
+            <a:pPr marL="0" indent="0" algn="just">
+              <a:buNone/>
+            </a:pPr>
+            <a:r>
+              <a:rPr lang="ru-RU" dirty="0"/>
+              <a:t>и отправлять их в топик Kafka.</a:t>
+            </a:r>
+          </a:p>
+        </p:txBody>
+      </p:sp>
+      <p:sp>
+        <p:nvSpPr>
+          <p:cNvPr id="4" name="Объект 3"/>
+          <p:cNvSpPr>
+            <a:spLocks noGrp="1"/>
+          </p:cNvSpPr>
+          <p:nvPr>
+            <p:ph sz="half" idx="2"/>
+          </p:nvPr>
+        </p:nvSpPr>
+        <p:spPr>
+          <a:xfrm>
+            <a:off x="6248400" y="1362635"/>
+            <a:ext cx="5350878" cy="4814328"/>
+          </a:xfrm>
+        </p:spPr>
+        <p:txBody>
+          <a:bodyPr>
+            <a:normAutofit/>
+          </a:bodyPr>
+          <a:lstStyle/>
+          <a:p>
+            <a:pPr marL="0" indent="0" algn="just">
+              <a:buNone/>
+            </a:pPr>
+            <a:r>
+              <a:rPr lang="ru-RU" b="1" dirty="0" smtClean="0"/>
+              <a:t>RT.Streaming</a:t>
+            </a:r>
+            <a:r>
+              <a:rPr lang="ru-RU" dirty="0"/>
+              <a:t> </a:t>
+            </a:r>
+            <a:r>
+              <a:rPr lang="ru-RU" dirty="0" smtClean="0"/>
+              <a:t>- инструмент </a:t>
+            </a:r>
+            <a:r>
+              <a:rPr lang="ru-RU" dirty="0"/>
+              <a:t>для эффективного управления процессами изменения, выгрузки и загрузки данных, позволяющий настроить потоковую или пакетную обработку данных из различных источников</a:t>
+            </a:r>
+            <a:r>
+              <a:rPr lang="ru-RU" dirty="0" smtClean="0"/>
+              <a:t>. Состав компонентов:</a:t>
+            </a:r>
+            <a:endParaRPr lang="ru-RU" dirty="0"/>
+          </a:p>
+          <a:p>
+            <a:pPr marL="0" indent="0">
+              <a:buNone/>
+            </a:pPr>
+            <a:endParaRPr lang="ru-RU" dirty="0"/>
+          </a:p>
+        </p:txBody>
+      </p:sp>
+      <p:sp>
+        <p:nvSpPr>
+          <p:cNvPr id="11" name="Номер слайда 3">
+            <a:extLst>
+              <a:ext uri="{FF2B5EF4-FFF2-40B4-BE49-F238E27FC236}">
+                <a16:creationId xmlns:a16="http://schemas.microsoft.com/office/drawing/2014/main" id="{7267A4CF-F0C4-43DD-AD58-96564CA7C221}"/>
+              </a:ext>
+            </a:extLst>
+          </p:cNvPr>
+          <p:cNvSpPr>
+            <a:spLocks noGrp="1"/>
+          </p:cNvSpPr>
+          <p:nvPr>
+            <p:ph type="sldNum" sz="quarter" idx="12"/>
+          </p:nvPr>
+        </p:nvSpPr>
+        <p:spPr>
+          <a:xfrm>
+            <a:off x="515410" y="6356350"/>
+            <a:ext cx="2743200" cy="365125"/>
+          </a:xfrm>
+          <a:prstGeom prst="rect">
+            <a:avLst/>
+          </a:prstGeom>
+        </p:spPr>
+        <p:txBody>
+          <a:bodyPr lIns="0" rIns="0"/>
+          <a:lstStyle>
+            <a:lvl1pPr>
+              <a:defRPr sz="1200">
+                <a:solidFill>
+                  <a:schemeClr val="bg1">
+                    <a:lumMod val="75000"/>
+                  </a:schemeClr>
+                </a:solidFill>
+              </a:defRPr>
+            </a:lvl1pPr>
+          </a:lstStyle>
+          <a:p>
+            <a:pPr algn="l"/>
+            <a:fld id="{A4D4834B-A5E3-4581-856C-72DC1D7E0BCC}" type="slidenum">
+              <a:rPr lang="ru-RU" smtClean="0">
+                <a:solidFill>
+                  <a:schemeClr val="tx1"/>
+                </a:solidFill>
+                <a:latin typeface="Rostelecom Basis" panose="020B0503030604040103" pitchFamily="34" charset="0"/>
+              </a:rPr>
+              <a:pPr algn="l"/>
+              <a:t>7</a:t>
+            </a:fld>
+            <a:endParaRPr lang="ru-RU" dirty="0">
+              <a:solidFill>
+                <a:schemeClr val="tx1"/>
+              </a:solidFill>
+              <a:latin typeface="Rostelecom Basis" panose="020B0503030604040103" pitchFamily="34" charset="0"/>
+            </a:endParaRPr>
+          </a:p>
+        </p:txBody>
+      </p:sp>
+      <p:sp>
+        <p:nvSpPr>
+          <p:cNvPr id="6" name="Заголовок 1">
             <a:extLst>
               <a:ext uri="{FF2B5EF4-FFF2-40B4-BE49-F238E27FC236}">
                 <a16:creationId xmlns:a16="http://schemas.microsoft.com/office/drawing/2014/main" id="{26F3F6DE-0B95-4A88-A2DE-D547275A4F55}"/>
@@ -6162,8 +7106,8 @@
         </p:nvSpPr>
         <p:spPr>
           <a:xfrm>
-            <a:off x="439153" y="1487179"/>
-            <a:ext cx="11160127" cy="2215991"/>
+            <a:off x="439151" y="560538"/>
+            <a:ext cx="11160127" cy="512961"/>
           </a:xfrm>
           <a:prstGeom prst="rect">
             <a:avLst/>
@@ -6200,47 +7144,15 @@
             </a:lvl1pPr>
           </a:lstStyle>
           <a:p>
-            <a:pPr>
-              <a:lnSpc>
-                <a:spcPct val="150000"/>
-              </a:lnSpc>
-            </a:pPr>
-            <a:r>
-              <a:rPr lang="ru-RU" sz="4800" b="1" dirty="0" smtClean="0">
-                <a:solidFill>
-                  <a:schemeClr val="bg1"/>
-                </a:solidFill>
-                <a:effectLst/>
-                <a:latin typeface="Arial" panose="020B0604020202020204" pitchFamily="34" charset="0"/>
-                <a:cs typeface="Arial" panose="020B0604020202020204" pitchFamily="34" charset="0"/>
-              </a:rPr>
-              <a:t>Спасибо за внимание!</a:t>
-            </a:r>
-            <a:br>
-              <a:rPr lang="ru-RU" sz="4800" b="1" dirty="0" smtClean="0">
-                <a:solidFill>
-                  <a:schemeClr val="bg1"/>
-                </a:solidFill>
-                <a:effectLst/>
-                <a:latin typeface="Arial" panose="020B0604020202020204" pitchFamily="34" charset="0"/>
-                <a:cs typeface="Arial" panose="020B0604020202020204" pitchFamily="34" charset="0"/>
-              </a:rPr>
-            </a:br>
-            <a:r>
-              <a:rPr lang="ru-RU" sz="4800" b="1" dirty="0" smtClean="0">
-                <a:solidFill>
-                  <a:schemeClr val="bg1"/>
-                </a:solidFill>
-                <a:effectLst/>
-                <a:latin typeface="Arial" panose="020B0604020202020204" pitchFamily="34" charset="0"/>
-                <a:cs typeface="Arial" panose="020B0604020202020204" pitchFamily="34" charset="0"/>
-              </a:rPr>
-              <a:t>Готовы ответить на ваши вопросы</a:t>
-            </a:r>
-            <a:endParaRPr lang="ru-RU" sz="4800" b="1" dirty="0">
-              <a:solidFill>
-                <a:schemeClr val="bg1"/>
-              </a:solidFill>
+            <a:r>
+              <a:rPr lang="ru-RU" sz="2800" dirty="0"/>
+              <a:t>Сбор данных с использованием </a:t>
+            </a:r>
+            <a:r>
+              <a:rPr lang="ru-RU" sz="2800" dirty="0" smtClean="0"/>
+              <a:t>RT.Streaming</a:t>
+            </a:r>
+            <a:endParaRPr lang="ru-RU" sz="2800" b="1" dirty="0">
               <a:latin typeface="Arial" panose="020B0604020202020204" pitchFamily="34" charset="0"/>
               <a:cs typeface="Arial" panose="020B0604020202020204" pitchFamily="34" charset="0"/>
             </a:endParaRPr>
@@ -6249,7 +7161,7 @@
       </p:sp>
       <p:pic>
         <p:nvPicPr>
-          <p:cNvPr id="2" name="Рисунок 1"/>
+          <p:cNvPr id="7" name="Рисунок 6"/>
           <p:cNvPicPr>
             <a:picLocks noChangeAspect="1"/>
           </p:cNvPicPr>
@@ -6269,27 +7181,145 @@
         </p:blipFill>
         <p:spPr>
           <a:xfrm>
-            <a:off x="311493" y="378100"/>
-            <a:ext cx="2780907" cy="762367"/>
+            <a:off x="9464774" y="532515"/>
+            <a:ext cx="2134504" cy="551243"/>
           </a:xfrm>
           <a:prstGeom prst="rect">
             <a:avLst/>
           </a:prstGeom>
-          <a:ln>
-            <a:noFill/>
-          </a:ln>
-          <a:effectLst>
-            <a:outerShdw blurRad="292100" dist="139700" dir="2700000" algn="tl" rotWithShape="0">
-              <a:srgbClr val="333333">
-                <a:alpha val="65000"/>
-              </a:srgbClr>
-            </a:outerShdw>
-          </a:effectLst>
         </p:spPr>
       </p:pic>
-      <p:sp>
-        <p:nvSpPr>
-          <p:cNvPr id="8" name="Заголовок 1">
+      <p:pic>
+        <p:nvPicPr>
+          <p:cNvPr id="8" name="Рисунок 7"/>
+          <p:cNvPicPr>
+            <a:picLocks noChangeAspect="1"/>
+          </p:cNvPicPr>
+          <p:nvPr/>
+        </p:nvPicPr>
+        <p:blipFill>
+          <a:blip r:embed="rId3"/>
+          <a:stretch>
+            <a:fillRect/>
+          </a:stretch>
+        </p:blipFill>
+        <p:spPr>
+          <a:xfrm>
+            <a:off x="7466310" y="4498716"/>
+            <a:ext cx="2915057" cy="1857634"/>
+          </a:xfrm>
+          <a:prstGeom prst="rect">
+            <a:avLst/>
+          </a:prstGeom>
+        </p:spPr>
+      </p:pic>
+    </p:spTree>
+    <p:extLst>
+      <p:ext uri="{BB962C8B-B14F-4D97-AF65-F5344CB8AC3E}">
+        <p14:creationId xmlns:p14="http://schemas.microsoft.com/office/powerpoint/2010/main" val="2900038033"/>
+      </p:ext>
+    </p:extLst>
+  </p:cSld>
+  <p:clrMapOvr>
+    <a:masterClrMapping/>
+  </p:clrMapOvr>
+  <p:timing>
+    <p:tnLst>
+      <p:par>
+        <p:cTn id="1" dur="indefinite" restart="never" nodeType="tmRoot"/>
+      </p:par>
+    </p:tnLst>
+  </p:timing>
+</p:sld>
+</file>
+
+<file path=ppt/slides/slide8.xml><?xml version="1.0" encoding="utf-8"?>
+<p:sld xmlns:a="http://schemas.openxmlformats.org/drawingml/2006/main" xmlns:r="http://schemas.openxmlformats.org/officeDocument/2006/relationships" xmlns:p="http://schemas.openxmlformats.org/presentationml/2006/main">
+  <p:cSld>
+    <p:bg>
+      <p:bgPr>
+        <a:solidFill>
+          <a:schemeClr val="bg1"/>
+        </a:solidFill>
+        <a:effectLst/>
+      </p:bgPr>
+    </p:bg>
+    <p:spTree>
+      <p:nvGrpSpPr>
+        <p:cNvPr id="1" name=""/>
+        <p:cNvGrpSpPr/>
+        <p:nvPr/>
+      </p:nvGrpSpPr>
+      <p:grpSpPr>
+        <a:xfrm>
+          <a:off x="0" y="0"/>
+          <a:ext cx="0" cy="0"/>
+          <a:chOff x="0" y="0"/>
+          <a:chExt cx="0" cy="0"/>
+        </a:xfrm>
+      </p:grpSpPr>
+      <p:sp>
+        <p:nvSpPr>
+          <p:cNvPr id="11" name="Номер слайда 3">
+            <a:extLst>
+              <a:ext uri="{FF2B5EF4-FFF2-40B4-BE49-F238E27FC236}">
+                <a16:creationId xmlns:a16="http://schemas.microsoft.com/office/drawing/2014/main" id="{7267A4CF-F0C4-43DD-AD58-96564CA7C221}"/>
+              </a:ext>
+            </a:extLst>
+          </p:cNvPr>
+          <p:cNvSpPr>
+            <a:spLocks noGrp="1"/>
+          </p:cNvSpPr>
+          <p:nvPr>
+            <p:ph type="sldNum" sz="quarter" idx="12"/>
+          </p:nvPr>
+        </p:nvSpPr>
+        <p:spPr>
+          <a:xfrm>
+            <a:off x="515939" y="6393284"/>
+            <a:ext cx="2743200" cy="365125"/>
+          </a:xfrm>
+          <a:prstGeom prst="rect">
+            <a:avLst/>
+          </a:prstGeom>
+        </p:spPr>
+        <p:txBody>
+          <a:bodyPr lIns="0" rIns="0"/>
+          <a:lstStyle>
+            <a:lvl1pPr>
+              <a:defRPr sz="1200">
+                <a:solidFill>
+                  <a:schemeClr val="bg1">
+                    <a:lumMod val="75000"/>
+                  </a:schemeClr>
+                </a:solidFill>
+              </a:defRPr>
+            </a:lvl1pPr>
+          </a:lstStyle>
+          <a:p>
+            <a:pPr algn="l"/>
+            <a:fld id="{A4D4834B-A5E3-4581-856C-72DC1D7E0BCC}" type="slidenum">
+              <a:rPr lang="ru-RU" smtClean="0">
+                <a:solidFill>
+                  <a:schemeClr val="tx1"/>
+                </a:solidFill>
+                <a:latin typeface="Rostelecom Basis" panose="020B0503030604040103" pitchFamily="34" charset="0"/>
+              </a:rPr>
+              <a:pPr algn="l"/>
+              <a:t>8</a:t>
+            </a:fld>
+            <a:endParaRPr lang="ru-RU" dirty="0">
+              <a:solidFill>
+                <a:schemeClr val="tx1"/>
+              </a:solidFill>
+              <a:latin typeface="Rostelecom Basis" panose="020B0503030604040103" pitchFamily="34" charset="0"/>
+            </a:endParaRPr>
+          </a:p>
+        </p:txBody>
+      </p:sp>
+      <p:sp>
+        <p:nvSpPr>
+          <p:cNvPr id="5" name="Заголовок 1">
             <a:extLst>
               <a:ext uri="{FF2B5EF4-FFF2-40B4-BE49-F238E27FC236}">
                 <a16:creationId xmlns:a16="http://schemas.microsoft.com/office/drawing/2014/main" id="{26F3F6DE-0B95-4A88-A2DE-D547275A4F55}"/>
@@ -6303,8 +7333,119 @@
         </p:nvSpPr>
         <p:spPr>
           <a:xfrm>
-            <a:off x="439152" y="3963798"/>
-            <a:ext cx="11160127" cy="1538883"/>
+            <a:off x="439152" y="2920189"/>
+            <a:ext cx="11160127" cy="2051844"/>
+          </a:xfrm>
+          <a:prstGeom prst="rect">
+            <a:avLst/>
+          </a:prstGeom>
+        </p:spPr>
+        <p:txBody>
+          <a:bodyPr lIns="0" tIns="0" rIns="0" bIns="0" anchor="t" anchorCtr="0">
+            <a:spAutoFit/>
+          </a:bodyPr>
+          <a:lstStyle>
+            <a:defPPr>
+              <a:defRPr lang="ru-RU"/>
+            </a:defPPr>
+            <a:lvl1pPr>
+              <a:lnSpc>
+                <a:spcPts val="4000"/>
+              </a:lnSpc>
+              <a:spcBef>
+                <a:spcPct val="0"/>
+              </a:spcBef>
+              <a:buNone/>
+              <a:defRPr sz="2800" b="0">
+                <a:effectLst/>
+                <a:latin typeface="Rostelecom Basis Medium" panose="020B0603030604040103" pitchFamily="34" charset="0"/>
+                <a:ea typeface="+mj-ea"/>
+                <a:cs typeface="+mj-cs"/>
+              </a:defRPr>
+            </a:lvl1pPr>
+          </a:lstStyle>
+          <a:p>
+            <a:r>
+              <a:rPr lang="ru-RU" dirty="0" smtClean="0">
+                <a:latin typeface="Arial" panose="020B0604020202020204" pitchFamily="34" charset="0"/>
+                <a:cs typeface="Arial" panose="020B0604020202020204" pitchFamily="34" charset="0"/>
+              </a:rPr>
+              <a:t>На слайдах с решением расскажите о том</a:t>
+            </a:r>
+            <a:r>
+              <a:rPr lang="en-US" dirty="0" smtClean="0">
+                <a:latin typeface="Arial" panose="020B0604020202020204" pitchFamily="34" charset="0"/>
+                <a:cs typeface="Arial" panose="020B0604020202020204" pitchFamily="34" charset="0"/>
+              </a:rPr>
+              <a:t>,</a:t>
+            </a:r>
+            <a:r>
+              <a:rPr lang="ru-RU" dirty="0" smtClean="0">
+                <a:latin typeface="Arial" panose="020B0604020202020204" pitchFamily="34" charset="0"/>
+                <a:cs typeface="Arial" panose="020B0604020202020204" pitchFamily="34" charset="0"/>
+              </a:rPr>
+              <a:t> как вы решали поставленные задачи</a:t>
+            </a:r>
+            <a:r>
+              <a:rPr lang="en-US" dirty="0" smtClean="0">
+                <a:latin typeface="Arial" panose="020B0604020202020204" pitchFamily="34" charset="0"/>
+                <a:cs typeface="Arial" panose="020B0604020202020204" pitchFamily="34" charset="0"/>
+              </a:rPr>
+              <a:t>,</a:t>
+            </a:r>
+            <a:r>
+              <a:rPr lang="ru-RU" dirty="0" smtClean="0">
+                <a:latin typeface="Arial" panose="020B0604020202020204" pitchFamily="34" charset="0"/>
+                <a:cs typeface="Arial" panose="020B0604020202020204" pitchFamily="34" charset="0"/>
+              </a:rPr>
+              <a:t> что учитывали и что удалось сделать</a:t>
+            </a:r>
+            <a:r>
+              <a:rPr lang="en-US" dirty="0" smtClean="0">
+                <a:latin typeface="Arial" panose="020B0604020202020204" pitchFamily="34" charset="0"/>
+                <a:cs typeface="Arial" panose="020B0604020202020204" pitchFamily="34" charset="0"/>
+              </a:rPr>
+              <a:t>. </a:t>
+            </a:r>
+            <a:r>
+              <a:rPr lang="ru-RU" dirty="0" smtClean="0">
+                <a:latin typeface="Arial" panose="020B0604020202020204" pitchFamily="34" charset="0"/>
+                <a:cs typeface="Arial" panose="020B0604020202020204" pitchFamily="34" charset="0"/>
+              </a:rPr>
+              <a:t>Здесь можно дать ссылки на репозиторий или приложить некоторые скриншоты</a:t>
+            </a:r>
+            <a:r>
+              <a:rPr lang="en-US" dirty="0" smtClean="0">
+                <a:latin typeface="Arial" panose="020B0604020202020204" pitchFamily="34" charset="0"/>
+                <a:cs typeface="Arial" panose="020B0604020202020204" pitchFamily="34" charset="0"/>
+              </a:rPr>
+              <a:t>. </a:t>
+            </a:r>
+            <a:endParaRPr lang="ru-RU" dirty="0">
+              <a:latin typeface="Arial" panose="020B0604020202020204" pitchFamily="34" charset="0"/>
+              <a:cs typeface="Arial" panose="020B0604020202020204" pitchFamily="34" charset="0"/>
+            </a:endParaRPr>
+          </a:p>
+        </p:txBody>
+      </p:sp>
+      <p:sp>
+        <p:nvSpPr>
+          <p:cNvPr id="6" name="Заголовок 1">
+            <a:extLst>
+              <a:ext uri="{FF2B5EF4-FFF2-40B4-BE49-F238E27FC236}">
+                <a16:creationId xmlns:a16="http://schemas.microsoft.com/office/drawing/2014/main" id="{26F3F6DE-0B95-4A88-A2DE-D547275A4F55}"/>
+              </a:ext>
+            </a:extLst>
+          </p:cNvPr>
+          <p:cNvSpPr txBox="1">
+            <a:spLocks/>
+          </p:cNvSpPr>
+          <p:nvPr/>
+        </p:nvSpPr>
+        <p:spPr>
+          <a:xfrm>
+            <a:off x="439151" y="560538"/>
+            <a:ext cx="11160127" cy="523220"/>
           </a:xfrm>
           <a:prstGeom prst="rect">
             <a:avLst/>
@@ -6342,138 +7483,333 @@
           </a:lstStyle>
           <a:p>
             <a:r>
-              <a:rPr lang="ru-RU" sz="2800" dirty="0" smtClean="0">
-                <a:solidFill>
-                  <a:schemeClr val="bg1"/>
-                </a:solidFill>
-                <a:effectLst/>
-                <a:latin typeface="Arial" panose="020B0604020202020204" pitchFamily="34" charset="0"/>
-                <a:cs typeface="Arial" panose="020B0604020202020204" pitchFamily="34" charset="0"/>
-              </a:rPr>
-              <a:t>Команда проекта:</a:t>
-            </a:r>
-            <a:br>
-              <a:rPr lang="ru-RU" sz="2800" dirty="0" smtClean="0">
-                <a:solidFill>
-                  <a:schemeClr val="bg1"/>
-                </a:solidFill>
-                <a:effectLst/>
-                <a:latin typeface="Arial" panose="020B0604020202020204" pitchFamily="34" charset="0"/>
-                <a:cs typeface="Arial" panose="020B0604020202020204" pitchFamily="34" charset="0"/>
-              </a:rPr>
-            </a:br>
-            <a:r>
-              <a:rPr lang="ru-RU" sz="2400" dirty="0" smtClean="0">
-                <a:solidFill>
-                  <a:schemeClr val="bg1"/>
-                </a:solidFill>
-                <a:effectLst/>
-                <a:latin typeface="Arial" panose="020B0604020202020204" pitchFamily="34" charset="0"/>
-                <a:cs typeface="Arial" panose="020B0604020202020204" pitchFamily="34" charset="0"/>
-              </a:rPr>
-              <a:t>Фамилия И</a:t>
-            </a:r>
-            <a:r>
-              <a:rPr lang="en-US" sz="2400" dirty="0" smtClean="0">
-                <a:solidFill>
-                  <a:schemeClr val="bg1"/>
-                </a:solidFill>
-                <a:effectLst/>
-                <a:latin typeface="Arial" panose="020B0604020202020204" pitchFamily="34" charset="0"/>
-                <a:cs typeface="Arial" panose="020B0604020202020204" pitchFamily="34" charset="0"/>
-              </a:rPr>
-              <a:t>.</a:t>
-            </a:r>
-            <a:r>
-              <a:rPr lang="ru-RU" sz="2400" dirty="0" smtClean="0">
-                <a:solidFill>
-                  <a:schemeClr val="bg1"/>
-                </a:solidFill>
-                <a:effectLst/>
-                <a:latin typeface="Arial" panose="020B0604020202020204" pitchFamily="34" charset="0"/>
-                <a:cs typeface="Arial" panose="020B0604020202020204" pitchFamily="34" charset="0"/>
-              </a:rPr>
-              <a:t>О</a:t>
-            </a:r>
-            <a:r>
-              <a:rPr lang="en-US" sz="2400" dirty="0" smtClean="0">
-                <a:solidFill>
-                  <a:schemeClr val="bg1"/>
-                </a:solidFill>
-                <a:effectLst/>
-                <a:latin typeface="Arial" panose="020B0604020202020204" pitchFamily="34" charset="0"/>
-                <a:cs typeface="Arial" panose="020B0604020202020204" pitchFamily="34" charset="0"/>
-              </a:rPr>
-              <a:t>.</a:t>
-            </a:r>
-            <a:r>
-              <a:rPr lang="ru-RU" sz="2400" dirty="0" smtClean="0">
-                <a:solidFill>
-                  <a:schemeClr val="bg1"/>
-                </a:solidFill>
-                <a:effectLst/>
-                <a:latin typeface="Arial" panose="020B0604020202020204" pitchFamily="34" charset="0"/>
-                <a:cs typeface="Arial" panose="020B0604020202020204" pitchFamily="34" charset="0"/>
-              </a:rPr>
-              <a:t/>
-            </a:r>
-            <a:br>
-              <a:rPr lang="ru-RU" sz="2400" dirty="0" smtClean="0">
-                <a:solidFill>
-                  <a:schemeClr val="bg1"/>
-                </a:solidFill>
-                <a:effectLst/>
-                <a:latin typeface="Arial" panose="020B0604020202020204" pitchFamily="34" charset="0"/>
-                <a:cs typeface="Arial" panose="020B0604020202020204" pitchFamily="34" charset="0"/>
-              </a:rPr>
-            </a:br>
-            <a:r>
-              <a:rPr lang="ru-RU" sz="2400" dirty="0" smtClean="0">
-                <a:solidFill>
-                  <a:schemeClr val="bg1"/>
-                </a:solidFill>
-                <a:effectLst/>
-                <a:latin typeface="Arial" panose="020B0604020202020204" pitchFamily="34" charset="0"/>
-                <a:cs typeface="Arial" panose="020B0604020202020204" pitchFamily="34" charset="0"/>
-              </a:rPr>
-              <a:t>Фамилия И</a:t>
-            </a:r>
-            <a:r>
-              <a:rPr lang="en-US" sz="2400" dirty="0" smtClean="0">
-                <a:solidFill>
-                  <a:schemeClr val="bg1"/>
-                </a:solidFill>
-                <a:effectLst/>
-                <a:latin typeface="Arial" panose="020B0604020202020204" pitchFamily="34" charset="0"/>
-                <a:cs typeface="Arial" panose="020B0604020202020204" pitchFamily="34" charset="0"/>
-              </a:rPr>
-              <a:t>.</a:t>
-            </a:r>
-            <a:r>
-              <a:rPr lang="ru-RU" sz="2400" dirty="0" smtClean="0">
-                <a:solidFill>
-                  <a:schemeClr val="bg1"/>
-                </a:solidFill>
-                <a:effectLst/>
-                <a:latin typeface="Arial" panose="020B0604020202020204" pitchFamily="34" charset="0"/>
-                <a:cs typeface="Arial" panose="020B0604020202020204" pitchFamily="34" charset="0"/>
-              </a:rPr>
-              <a:t>О</a:t>
-            </a:r>
-            <a:endParaRPr lang="ru-RU" sz="2400" dirty="0">
-              <a:solidFill>
-                <a:schemeClr val="bg1"/>
-              </a:solidFill>
+              <a:rPr lang="ru-RU" b="1" dirty="0" smtClean="0">
+                <a:effectLst/>
+                <a:latin typeface="Arial" panose="020B0604020202020204" pitchFamily="34" charset="0"/>
+                <a:cs typeface="Arial" panose="020B0604020202020204" pitchFamily="34" charset="0"/>
+              </a:rPr>
+              <a:t>Решение</a:t>
+            </a:r>
+            <a:endParaRPr lang="ru-RU" b="1" dirty="0">
               <a:latin typeface="Arial" panose="020B0604020202020204" pitchFamily="34" charset="0"/>
               <a:cs typeface="Arial" panose="020B0604020202020204" pitchFamily="34" charset="0"/>
             </a:endParaRPr>
           </a:p>
         </p:txBody>
       </p:sp>
+      <p:pic>
+        <p:nvPicPr>
+          <p:cNvPr id="7" name="Рисунок 6"/>
+          <p:cNvPicPr>
+            <a:picLocks noChangeAspect="1"/>
+          </p:cNvPicPr>
+          <p:nvPr/>
+        </p:nvPicPr>
+        <p:blipFill>
+          <a:blip r:embed="rId2">
+            <a:extLst>
+              <a:ext uri="{28A0092B-C50C-407E-A947-70E740481C1C}">
+                <a14:useLocalDpi xmlns:a14="http://schemas.microsoft.com/office/drawing/2010/main" val="0"/>
+              </a:ext>
+            </a:extLst>
+          </a:blip>
+          <a:stretch>
+            <a:fillRect/>
+          </a:stretch>
+        </p:blipFill>
+        <p:spPr>
+          <a:xfrm>
+            <a:off x="9464774" y="532515"/>
+            <a:ext cx="2134504" cy="551243"/>
+          </a:xfrm>
+          <a:prstGeom prst="rect">
+            <a:avLst/>
+          </a:prstGeom>
+        </p:spPr>
+      </p:pic>
     </p:spTree>
     <p:extLst>
       <p:ext uri="{BB962C8B-B14F-4D97-AF65-F5344CB8AC3E}">
-        <p14:creationId xmlns:p14="http://schemas.microsoft.com/office/powerpoint/2010/main" val="449845413"/>
+        <p14:creationId xmlns:p14="http://schemas.microsoft.com/office/powerpoint/2010/main" val="1231678755"/>
+      </p:ext>
+    </p:extLst>
+  </p:cSld>
+  <p:clrMapOvr>
+    <a:masterClrMapping/>
+  </p:clrMapOvr>
+  <p:timing>
+    <p:tnLst>
+      <p:par>
+        <p:cTn id="1" dur="indefinite" restart="never" nodeType="tmRoot"/>
+      </p:par>
+    </p:tnLst>
+  </p:timing>
+</p:sld>
+</file>
+
+<file path=ppt/slides/slide9.xml><?xml version="1.0" encoding="utf-8"?>
+<p:sld xmlns:a="http://schemas.openxmlformats.org/drawingml/2006/main" xmlns:r="http://schemas.openxmlformats.org/officeDocument/2006/relationships" xmlns:p="http://schemas.openxmlformats.org/presentationml/2006/main">
+  <p:cSld>
+    <p:bg>
+      <p:bgPr>
+        <a:solidFill>
+          <a:schemeClr val="bg1"/>
+        </a:solidFill>
+        <a:effectLst/>
+      </p:bgPr>
+    </p:bg>
+    <p:spTree>
+      <p:nvGrpSpPr>
+        <p:cNvPr id="1" name=""/>
+        <p:cNvGrpSpPr/>
+        <p:nvPr/>
+      </p:nvGrpSpPr>
+      <p:grpSpPr>
+        <a:xfrm>
+          <a:off x="0" y="0"/>
+          <a:ext cx="0" cy="0"/>
+          <a:chOff x="0" y="0"/>
+          <a:chExt cx="0" cy="0"/>
+        </a:xfrm>
+      </p:grpSpPr>
+      <p:sp>
+        <p:nvSpPr>
+          <p:cNvPr id="11" name="Номер слайда 3">
+            <a:extLst>
+              <a:ext uri="{FF2B5EF4-FFF2-40B4-BE49-F238E27FC236}">
+                <a16:creationId xmlns:a16="http://schemas.microsoft.com/office/drawing/2014/main" id="{7267A4CF-F0C4-43DD-AD58-96564CA7C221}"/>
+              </a:ext>
+            </a:extLst>
+          </p:cNvPr>
+          <p:cNvSpPr>
+            <a:spLocks noGrp="1"/>
+          </p:cNvSpPr>
+          <p:nvPr>
+            <p:ph type="sldNum" sz="quarter" idx="12"/>
+          </p:nvPr>
+        </p:nvSpPr>
+        <p:spPr>
+          <a:xfrm>
+            <a:off x="515939" y="6393284"/>
+            <a:ext cx="2743200" cy="365125"/>
+          </a:xfrm>
+          <a:prstGeom prst="rect">
+            <a:avLst/>
+          </a:prstGeom>
+        </p:spPr>
+        <p:txBody>
+          <a:bodyPr lIns="0" rIns="0"/>
+          <a:lstStyle>
+            <a:lvl1pPr>
+              <a:defRPr sz="1200">
+                <a:solidFill>
+                  <a:schemeClr val="bg1">
+                    <a:lumMod val="75000"/>
+                  </a:schemeClr>
+                </a:solidFill>
+              </a:defRPr>
+            </a:lvl1pPr>
+          </a:lstStyle>
+          <a:p>
+            <a:pPr algn="l"/>
+            <a:fld id="{A4D4834B-A5E3-4581-856C-72DC1D7E0BCC}" type="slidenum">
+              <a:rPr lang="ru-RU" smtClean="0">
+                <a:solidFill>
+                  <a:schemeClr val="tx1"/>
+                </a:solidFill>
+                <a:latin typeface="Rostelecom Basis" panose="020B0503030604040103" pitchFamily="34" charset="0"/>
+              </a:rPr>
+              <a:pPr algn="l"/>
+              <a:t>9</a:t>
+            </a:fld>
+            <a:endParaRPr lang="ru-RU" dirty="0">
+              <a:solidFill>
+                <a:schemeClr val="tx1"/>
+              </a:solidFill>
+              <a:latin typeface="Rostelecom Basis" panose="020B0503030604040103" pitchFamily="34" charset="0"/>
+            </a:endParaRPr>
+          </a:p>
+        </p:txBody>
+      </p:sp>
+      <p:sp>
+        <p:nvSpPr>
+          <p:cNvPr id="5" name="Заголовок 1">
+            <a:extLst>
+              <a:ext uri="{FF2B5EF4-FFF2-40B4-BE49-F238E27FC236}">
+                <a16:creationId xmlns:a16="http://schemas.microsoft.com/office/drawing/2014/main" id="{26F3F6DE-0B95-4A88-A2DE-D547275A4F55}"/>
+              </a:ext>
+            </a:extLst>
+          </p:cNvPr>
+          <p:cNvSpPr txBox="1">
+            <a:spLocks/>
+          </p:cNvSpPr>
+          <p:nvPr/>
+        </p:nvSpPr>
+        <p:spPr>
+          <a:xfrm>
+            <a:off x="439152" y="2920189"/>
+            <a:ext cx="11160127" cy="979435"/>
+          </a:xfrm>
+          <a:prstGeom prst="rect">
+            <a:avLst/>
+          </a:prstGeom>
+        </p:spPr>
+        <p:txBody>
+          <a:bodyPr lIns="0" tIns="0" rIns="0" bIns="0" anchor="t" anchorCtr="0">
+            <a:spAutoFit/>
+          </a:bodyPr>
+          <a:lstStyle>
+            <a:defPPr>
+              <a:defRPr lang="ru-RU"/>
+            </a:defPPr>
+            <a:lvl1pPr>
+              <a:lnSpc>
+                <a:spcPts val="4000"/>
+              </a:lnSpc>
+              <a:spcBef>
+                <a:spcPct val="0"/>
+              </a:spcBef>
+              <a:buNone/>
+              <a:defRPr sz="2800" b="0">
+                <a:effectLst/>
+                <a:latin typeface="Rostelecom Basis Medium" panose="020B0603030604040103" pitchFamily="34" charset="0"/>
+                <a:ea typeface="+mj-ea"/>
+                <a:cs typeface="+mj-cs"/>
+              </a:defRPr>
+            </a:lvl1pPr>
+          </a:lstStyle>
+          <a:p>
+            <a:r>
+              <a:rPr lang="ru-RU" dirty="0" smtClean="0">
+                <a:latin typeface="Arial" panose="020B0604020202020204" pitchFamily="34" charset="0"/>
+                <a:cs typeface="Arial" panose="020B0604020202020204" pitchFamily="34" charset="0"/>
+              </a:rPr>
+              <a:t>Основные итоги вашей работы</a:t>
+            </a:r>
+            <a:r>
+              <a:rPr lang="en-US" dirty="0" smtClean="0">
+                <a:latin typeface="Arial" panose="020B0604020202020204" pitchFamily="34" charset="0"/>
+                <a:cs typeface="Arial" panose="020B0604020202020204" pitchFamily="34" charset="0"/>
+              </a:rPr>
+              <a:t>,</a:t>
+            </a:r>
+            <a:r>
+              <a:rPr lang="ru-RU" dirty="0" smtClean="0">
+                <a:latin typeface="Arial" panose="020B0604020202020204" pitchFamily="34" charset="0"/>
+                <a:cs typeface="Arial" panose="020B0604020202020204" pitchFamily="34" charset="0"/>
+              </a:rPr>
+              <a:t> инсайты после работы с данными и графики</a:t>
+            </a:r>
+            <a:endParaRPr lang="ru-RU" dirty="0">
+              <a:latin typeface="Arial" panose="020B0604020202020204" pitchFamily="34" charset="0"/>
+              <a:cs typeface="Arial" panose="020B0604020202020204" pitchFamily="34" charset="0"/>
+            </a:endParaRPr>
+          </a:p>
+        </p:txBody>
+      </p:sp>
+      <p:sp>
+        <p:nvSpPr>
+          <p:cNvPr id="6" name="Заголовок 1">
+            <a:extLst>
+              <a:ext uri="{FF2B5EF4-FFF2-40B4-BE49-F238E27FC236}">
+                <a16:creationId xmlns:a16="http://schemas.microsoft.com/office/drawing/2014/main" id="{26F3F6DE-0B95-4A88-A2DE-D547275A4F55}"/>
+              </a:ext>
+            </a:extLst>
+          </p:cNvPr>
+          <p:cNvSpPr txBox="1">
+            <a:spLocks/>
+          </p:cNvSpPr>
+          <p:nvPr/>
+        </p:nvSpPr>
+        <p:spPr>
+          <a:xfrm>
+            <a:off x="439151" y="560538"/>
+            <a:ext cx="11160127" cy="523220"/>
+          </a:xfrm>
+          <a:prstGeom prst="rect">
+            <a:avLst/>
+          </a:prstGeom>
+        </p:spPr>
+        <p:txBody>
+          <a:bodyPr lIns="0" tIns="0" rIns="0" bIns="0" anchor="t" anchorCtr="0">
+            <a:spAutoFit/>
+          </a:bodyPr>
+          <a:lstStyle>
+            <a:lvl1pPr algn="l" defTabSz="914400" rtl="0" eaLnBrk="1" latinLnBrk="0" hangingPunct="1">
+              <a:lnSpc>
+                <a:spcPts val="4000"/>
+              </a:lnSpc>
+              <a:spcBef>
+                <a:spcPct val="0"/>
+              </a:spcBef>
+              <a:buNone/>
+              <a:defRPr sz="3600" b="0" kern="1200">
+                <a:solidFill>
+                  <a:schemeClr val="tx1"/>
+                </a:solidFill>
+                <a:effectLst>
+                  <a:outerShdw blurRad="38100" dist="38100" dir="2700000" algn="tl">
+                    <a:srgbClr val="000000">
+                      <a:alpha val="43137"/>
+                    </a:srgbClr>
+                  </a:outerShdw>
+                </a:effectLst>
+                <a:latin typeface="Rostelecom Basis Medium" panose="020B0603030604040103" pitchFamily="34" charset="0"/>
+                <a:ea typeface="+mj-ea"/>
+                <a:cs typeface="+mj-cs"/>
+              </a:defRPr>
+            </a:lvl1pPr>
+          </a:lstStyle>
+          <a:p>
+            <a:r>
+              <a:rPr lang="ru-RU" b="1" dirty="0">
+                <a:effectLst/>
+                <a:latin typeface="Arial" panose="020B0604020202020204" pitchFamily="34" charset="0"/>
+                <a:cs typeface="Arial" panose="020B0604020202020204" pitchFamily="34" charset="0"/>
+              </a:rPr>
+              <a:t>Итоги и инсайты</a:t>
+            </a:r>
+            <a:endParaRPr lang="ru-RU" b="1" dirty="0">
+              <a:latin typeface="Arial" panose="020B0604020202020204" pitchFamily="34" charset="0"/>
+              <a:cs typeface="Arial" panose="020B0604020202020204" pitchFamily="34" charset="0"/>
+            </a:endParaRPr>
+          </a:p>
+        </p:txBody>
+      </p:sp>
+      <p:pic>
+        <p:nvPicPr>
+          <p:cNvPr id="7" name="Рисунок 6"/>
+          <p:cNvPicPr>
+            <a:picLocks noChangeAspect="1"/>
+          </p:cNvPicPr>
+          <p:nvPr/>
+        </p:nvPicPr>
+        <p:blipFill>
+          <a:blip r:embed="rId2">
+            <a:extLst>
+              <a:ext uri="{28A0092B-C50C-407E-A947-70E740481C1C}">
+                <a14:useLocalDpi xmlns:a14="http://schemas.microsoft.com/office/drawing/2010/main" val="0"/>
+              </a:ext>
+            </a:extLst>
+          </a:blip>
+          <a:stretch>
+            <a:fillRect/>
+          </a:stretch>
+        </p:blipFill>
+        <p:spPr>
+          <a:xfrm>
+            <a:off x="9464774" y="532515"/>
+            <a:ext cx="2134504" cy="551243"/>
+          </a:xfrm>
+          <a:prstGeom prst="rect">
+            <a:avLst/>
+          </a:prstGeom>
+        </p:spPr>
+      </p:pic>
+    </p:spTree>
+    <p:extLst>
+      <p:ext uri="{BB962C8B-B14F-4D97-AF65-F5344CB8AC3E}">
+        <p14:creationId xmlns:p14="http://schemas.microsoft.com/office/powerpoint/2010/main" val="921795148"/>
       </p:ext>
     </p:extLst>
   </p:cSld>

</xml_diff>

<commit_message>
refactor: update datasets to current date
</commit_message>
<xml_diff>
--- a/Сertification/presentation.pptx
+++ b/Сertification/presentation.pptx
@@ -207,7 +207,7 @@
           <a:p>
             <a:fld id="{76ED9429-14B3-664E-B66C-A13779F56E7D}" type="datetimeFigureOut">
               <a:rPr lang="ru-RU" smtClean="0"/>
-              <a:t>20.09.2023</a:t>
+              <a:t>23.09.2023</a:t>
             </a:fld>
             <a:endParaRPr lang="ru-RU"/>
           </a:p>
@@ -621,7 +621,7 @@
           <a:p>
             <a:fld id="{26DB3D39-9350-6749-B0D7-69548AE3DE8E}" type="datetimeFigureOut">
               <a:rPr lang="ru-RU" smtClean="0"/>
-              <a:t>20.09.2023</a:t>
+              <a:t>23.09.2023</a:t>
             </a:fld>
             <a:endParaRPr lang="ru-RU"/>
           </a:p>
@@ -819,7 +819,7 @@
           <a:p>
             <a:fld id="{26DB3D39-9350-6749-B0D7-69548AE3DE8E}" type="datetimeFigureOut">
               <a:rPr lang="ru-RU" smtClean="0"/>
-              <a:t>20.09.2023</a:t>
+              <a:t>23.09.2023</a:t>
             </a:fld>
             <a:endParaRPr lang="ru-RU"/>
           </a:p>
@@ -1027,7 +1027,7 @@
           <a:p>
             <a:fld id="{26DB3D39-9350-6749-B0D7-69548AE3DE8E}" type="datetimeFigureOut">
               <a:rPr lang="ru-RU" smtClean="0"/>
-              <a:t>20.09.2023</a:t>
+              <a:t>23.09.2023</a:t>
             </a:fld>
             <a:endParaRPr lang="ru-RU"/>
           </a:p>
@@ -1225,7 +1225,7 @@
           <a:p>
             <a:fld id="{26DB3D39-9350-6749-B0D7-69548AE3DE8E}" type="datetimeFigureOut">
               <a:rPr lang="ru-RU" smtClean="0"/>
-              <a:t>20.09.2023</a:t>
+              <a:t>23.09.2023</a:t>
             </a:fld>
             <a:endParaRPr lang="ru-RU"/>
           </a:p>
@@ -1500,7 +1500,7 @@
           <a:p>
             <a:fld id="{26DB3D39-9350-6749-B0D7-69548AE3DE8E}" type="datetimeFigureOut">
               <a:rPr lang="ru-RU" smtClean="0"/>
-              <a:t>20.09.2023</a:t>
+              <a:t>23.09.2023</a:t>
             </a:fld>
             <a:endParaRPr lang="ru-RU"/>
           </a:p>
@@ -1765,7 +1765,7 @@
           <a:p>
             <a:fld id="{26DB3D39-9350-6749-B0D7-69548AE3DE8E}" type="datetimeFigureOut">
               <a:rPr lang="ru-RU" smtClean="0"/>
-              <a:t>20.09.2023</a:t>
+              <a:t>23.09.2023</a:t>
             </a:fld>
             <a:endParaRPr lang="ru-RU"/>
           </a:p>
@@ -2177,7 +2177,7 @@
           <a:p>
             <a:fld id="{26DB3D39-9350-6749-B0D7-69548AE3DE8E}" type="datetimeFigureOut">
               <a:rPr lang="ru-RU" smtClean="0"/>
-              <a:t>20.09.2023</a:t>
+              <a:t>23.09.2023</a:t>
             </a:fld>
             <a:endParaRPr lang="ru-RU"/>
           </a:p>
@@ -2318,7 +2318,7 @@
           <a:p>
             <a:fld id="{26DB3D39-9350-6749-B0D7-69548AE3DE8E}" type="datetimeFigureOut">
               <a:rPr lang="ru-RU" smtClean="0"/>
-              <a:t>20.09.2023</a:t>
+              <a:t>23.09.2023</a:t>
             </a:fld>
             <a:endParaRPr lang="ru-RU"/>
           </a:p>
@@ -2431,7 +2431,7 @@
           <a:p>
             <a:fld id="{26DB3D39-9350-6749-B0D7-69548AE3DE8E}" type="datetimeFigureOut">
               <a:rPr lang="ru-RU" smtClean="0"/>
-              <a:t>20.09.2023</a:t>
+              <a:t>23.09.2023</a:t>
             </a:fld>
             <a:endParaRPr lang="ru-RU"/>
           </a:p>
@@ -2742,7 +2742,7 @@
           <a:p>
             <a:fld id="{26DB3D39-9350-6749-B0D7-69548AE3DE8E}" type="datetimeFigureOut">
               <a:rPr lang="ru-RU" smtClean="0"/>
-              <a:t>20.09.2023</a:t>
+              <a:t>23.09.2023</a:t>
             </a:fld>
             <a:endParaRPr lang="ru-RU"/>
           </a:p>
@@ -3030,7 +3030,7 @@
           <a:p>
             <a:fld id="{26DB3D39-9350-6749-B0D7-69548AE3DE8E}" type="datetimeFigureOut">
               <a:rPr lang="ru-RU" smtClean="0"/>
-              <a:t>20.09.2023</a:t>
+              <a:t>23.09.2023</a:t>
             </a:fld>
             <a:endParaRPr lang="ru-RU"/>
           </a:p>
@@ -3274,7 +3274,7 @@
           <a:p>
             <a:fld id="{26DB3D39-9350-6749-B0D7-69548AE3DE8E}" type="datetimeFigureOut">
               <a:rPr lang="ru-RU" smtClean="0"/>
-              <a:t>20.09.2023</a:t>
+              <a:t>23.09.2023</a:t>
             </a:fld>
             <a:endParaRPr lang="ru-RU"/>
           </a:p>
@@ -3882,29 +3882,7 @@
                 <a:latin typeface="Arial" panose="020B0604020202020204" pitchFamily="34" charset="0"/>
                 <a:cs typeface="Arial" panose="020B0604020202020204" pitchFamily="34" charset="0"/>
               </a:rPr>
-              <a:t>Разработал</a:t>
-            </a:r>
-            <a:r>
-              <a:rPr lang="ru-RU" sz="2800" dirty="0" smtClean="0">
-                <a:solidFill>
-                  <a:schemeClr val="bg1"/>
-                </a:solidFill>
-                <a:effectLst/>
-                <a:latin typeface="Arial" panose="020B0604020202020204" pitchFamily="34" charset="0"/>
-                <a:cs typeface="Arial" panose="020B0604020202020204" pitchFamily="34" charset="0"/>
-              </a:rPr>
-              <a:t>:</a:t>
-            </a:r>
-            <a:r>
-              <a:rPr lang="ru-RU" sz="2800" dirty="0" smtClean="0">
-                <a:solidFill>
-                  <a:schemeClr val="bg1"/>
-                </a:solidFill>
-                <a:effectLst/>
-                <a:latin typeface="Arial" panose="020B0604020202020204" pitchFamily="34" charset="0"/>
-                <a:cs typeface="Arial" panose="020B0604020202020204" pitchFamily="34" charset="0"/>
-              </a:rPr>
-              <a:t/>
+              <a:t>Разработал:</a:t>
             </a:r>
             <a:br>
               <a:rPr lang="ru-RU" sz="2800" dirty="0" smtClean="0">
@@ -5356,23 +5334,7 @@
                 <a:latin typeface="Arial" panose="020B0604020202020204" pitchFamily="34" charset="0"/>
                 <a:cs typeface="Arial" panose="020B0604020202020204" pitchFamily="34" charset="0"/>
               </a:rPr>
-              <a:t>Parquet </a:t>
-            </a:r>
-            <a:r>
-              <a:rPr lang="en-US" sz="2000" dirty="0">
-                <a:effectLst/>
-                <a:latin typeface="Arial" panose="020B0604020202020204" pitchFamily="34" charset="0"/>
-                <a:cs typeface="Arial" panose="020B0604020202020204" pitchFamily="34" charset="0"/>
-              </a:rPr>
-              <a:t>/ </a:t>
-            </a:r>
-            <a:r>
-              <a:rPr lang="en-US" sz="2000" dirty="0" smtClean="0">
-                <a:effectLst/>
-                <a:latin typeface="Arial" panose="020B0604020202020204" pitchFamily="34" charset="0"/>
-                <a:cs typeface="Arial" panose="020B0604020202020204" pitchFamily="34" charset="0"/>
-              </a:rPr>
-              <a:t>AVRO</a:t>
+              <a:t>CSV</a:t>
             </a:r>
             <a:r>
               <a:rPr lang="ru-RU" sz="2000" dirty="0" smtClean="0">
@@ -6379,7 +6341,7 @@
                 <a:latin typeface="Arial" panose="020B0604020202020204" pitchFamily="34" charset="0"/>
                 <a:cs typeface="Arial" panose="020B0604020202020204" pitchFamily="34" charset="0"/>
               </a:rPr>
-              <a:t>Формирование датасета</a:t>
+              <a:t>Генерация датасета</a:t>
             </a:r>
             <a:endParaRPr lang="ru-RU" b="1" dirty="0">
               <a:latin typeface="Arial" panose="020B0604020202020204" pitchFamily="34" charset="0"/>
@@ -6507,7 +6469,7 @@
       </p:pic>
       <p:pic>
         <p:nvPicPr>
-          <p:cNvPr id="2" name="Рисунок 1"/>
+          <p:cNvPr id="8" name="Рисунок 7"/>
           <p:cNvPicPr>
             <a:picLocks noChangeAspect="1"/>
           </p:cNvPicPr>
@@ -6521,8 +6483,8 @@
         </p:blipFill>
         <p:spPr>
           <a:xfrm>
-            <a:off x="327586" y="1291306"/>
-            <a:ext cx="5867387" cy="2276647"/>
+            <a:off x="6762147" y="1201656"/>
+            <a:ext cx="4620270" cy="1705213"/>
           </a:xfrm>
           <a:prstGeom prst="rect">
             <a:avLst/>
@@ -6531,7 +6493,7 @@
       </p:pic>
       <p:pic>
         <p:nvPicPr>
-          <p:cNvPr id="5" name="Рисунок 4"/>
+          <p:cNvPr id="9" name="Рисунок 8"/>
           <p:cNvPicPr>
             <a:picLocks noChangeAspect="1"/>
           </p:cNvPicPr>
@@ -6545,22 +6507,17 @@
         </p:blipFill>
         <p:spPr>
           <a:xfrm>
-            <a:off x="327586" y="3825310"/>
-            <a:ext cx="5830114" cy="2324424"/>
+            <a:off x="327587" y="1399642"/>
+            <a:ext cx="5891177" cy="2313184"/>
           </a:xfrm>
           <a:prstGeom prst="rect">
             <a:avLst/>
           </a:prstGeom>
-          <a:ln w="15875">
-            <a:solidFill>
-              <a:schemeClr val="accent1"/>
-            </a:solidFill>
-          </a:ln>
         </p:spPr>
       </p:pic>
       <p:pic>
         <p:nvPicPr>
-          <p:cNvPr id="8" name="Рисунок 7"/>
+          <p:cNvPr id="14" name="Рисунок 13"/>
           <p:cNvPicPr>
             <a:picLocks noChangeAspect="1"/>
           </p:cNvPicPr>
@@ -6574,8 +6531,8 @@
         </p:blipFill>
         <p:spPr>
           <a:xfrm>
-            <a:off x="6762147" y="1201656"/>
-            <a:ext cx="4620270" cy="1705213"/>
+            <a:off x="327587" y="3881316"/>
+            <a:ext cx="5877745" cy="2343477"/>
           </a:xfrm>
           <a:prstGeom prst="rect">
             <a:avLst/>
@@ -6741,20 +6698,12 @@
           </a:lstStyle>
           <a:p>
             <a:r>
-              <a:rPr lang="ru-RU" b="1" dirty="0">
-                <a:effectLst/>
-                <a:latin typeface="Arial" panose="020B0604020202020204" pitchFamily="34" charset="0"/>
-                <a:cs typeface="Arial" panose="020B0604020202020204" pitchFamily="34" charset="0"/>
-              </a:rPr>
-              <a:t>Формирование </a:t>
-            </a:r>
-            <a:r>
               <a:rPr lang="ru-RU" b="1" dirty="0" smtClean="0">
                 <a:effectLst/>
                 <a:latin typeface="Arial" panose="020B0604020202020204" pitchFamily="34" charset="0"/>
                 <a:cs typeface="Arial" panose="020B0604020202020204" pitchFamily="34" charset="0"/>
               </a:rPr>
-              <a:t>датасета - код</a:t>
+              <a:t>Генерация датасета - код</a:t>
             </a:r>
             <a:endParaRPr lang="ru-RU" b="1" dirty="0">
               <a:latin typeface="Arial" panose="020B0604020202020204" pitchFamily="34" charset="0"/>

</xml_diff>

<commit_message>
doc: update presentation for task 1 and 2
</commit_message>
<xml_diff>
--- a/Сertification/presentation.pptx
+++ b/Сertification/presentation.pptx
@@ -5,7 +5,7 @@
     <p:sldMasterId id="2147483648" r:id="rId1"/>
   </p:sldMasterIdLst>
   <p:notesMasterIdLst>
-    <p:notesMasterId r:id="rId13"/>
+    <p:notesMasterId r:id="rId16"/>
   </p:notesMasterIdLst>
   <p:sldIdLst>
     <p:sldId id="281" r:id="rId2"/>
@@ -16,9 +16,12 @@
     <p:sldId id="292" r:id="rId7"/>
     <p:sldId id="293" r:id="rId8"/>
     <p:sldId id="294" r:id="rId9"/>
-    <p:sldId id="288" r:id="rId10"/>
-    <p:sldId id="291" r:id="rId11"/>
-    <p:sldId id="289" r:id="rId12"/>
+    <p:sldId id="297" r:id="rId10"/>
+    <p:sldId id="295" r:id="rId11"/>
+    <p:sldId id="296" r:id="rId12"/>
+    <p:sldId id="288" r:id="rId13"/>
+    <p:sldId id="291" r:id="rId14"/>
+    <p:sldId id="289" r:id="rId15"/>
   </p:sldIdLst>
   <p:sldSz cx="12192000" cy="6858000"/>
   <p:notesSz cx="6858000" cy="9144000"/>
@@ -4021,145 +4024,6 @@
       </p:sp>
       <p:sp>
         <p:nvSpPr>
-          <p:cNvPr id="5" name="Заголовок 1">
-            <a:extLst>
-              <a:ext uri="{FF2B5EF4-FFF2-40B4-BE49-F238E27FC236}">
-                <a16:creationId xmlns:a16="http://schemas.microsoft.com/office/drawing/2014/main" id="{26F3F6DE-0B95-4A88-A2DE-D547275A4F55}"/>
-              </a:ext>
-            </a:extLst>
-          </p:cNvPr>
-          <p:cNvSpPr txBox="1">
-            <a:spLocks/>
-          </p:cNvSpPr>
-          <p:nvPr/>
-        </p:nvSpPr>
-        <p:spPr>
-          <a:xfrm>
-            <a:off x="439151" y="1333436"/>
-            <a:ext cx="11160127" cy="1538883"/>
-          </a:xfrm>
-          <a:prstGeom prst="rect">
-            <a:avLst/>
-          </a:prstGeom>
-        </p:spPr>
-        <p:txBody>
-          <a:bodyPr lIns="0" tIns="0" rIns="0" bIns="0" anchor="t" anchorCtr="0">
-            <a:spAutoFit/>
-          </a:bodyPr>
-          <a:lstStyle>
-            <a:defPPr>
-              <a:defRPr lang="ru-RU"/>
-            </a:defPPr>
-            <a:lvl1pPr>
-              <a:lnSpc>
-                <a:spcPts val="4000"/>
-              </a:lnSpc>
-              <a:spcBef>
-                <a:spcPct val="0"/>
-              </a:spcBef>
-              <a:buNone/>
-              <a:defRPr sz="2800" b="0">
-                <a:effectLst/>
-                <a:latin typeface="Rostelecom Basis Medium" panose="020B0603030604040103" pitchFamily="34" charset="0"/>
-                <a:ea typeface="+mj-ea"/>
-                <a:cs typeface="+mj-cs"/>
-              </a:defRPr>
-            </a:lvl1pPr>
-          </a:lstStyle>
-          <a:p>
-            <a:pPr marL="457200" indent="-457200">
-              <a:buFont typeface="+mj-lt"/>
-              <a:buAutoNum type="arabicPeriod"/>
-            </a:pPr>
-            <a:r>
-              <a:rPr lang="ru-RU" sz="2000" dirty="0" err="1" smtClean="0">
-                <a:latin typeface="Arial" panose="020B0604020202020204" pitchFamily="34" charset="0"/>
-                <a:cs typeface="Arial" panose="020B0604020202020204" pitchFamily="34" charset="0"/>
-              </a:rPr>
-              <a:t>Гитхаб</a:t>
-            </a:r>
-            <a:r>
-              <a:rPr lang="ru-RU" sz="2000" dirty="0" smtClean="0">
-                <a:latin typeface="Arial" panose="020B0604020202020204" pitchFamily="34" charset="0"/>
-                <a:cs typeface="Arial" panose="020B0604020202020204" pitchFamily="34" charset="0"/>
-              </a:rPr>
-              <a:t> проекта: </a:t>
-            </a:r>
-            <a:r>
-              <a:rPr lang="en-US" sz="2000" dirty="0" smtClean="0">
-                <a:latin typeface="Arial" panose="020B0604020202020204" pitchFamily="34" charset="0"/>
-                <a:cs typeface="Arial" panose="020B0604020202020204" pitchFamily="34" charset="0"/>
-                <a:hlinkClick r:id="rId2"/>
-              </a:rPr>
-              <a:t>https://github.com/Olmeor/Data-engineer_Rostelecom_programming_school</a:t>
-            </a:r>
-            <a:endParaRPr lang="ru-RU" sz="2000" dirty="0" smtClean="0">
-              <a:latin typeface="Arial" panose="020B0604020202020204" pitchFamily="34" charset="0"/>
-              <a:cs typeface="Arial" panose="020B0604020202020204" pitchFamily="34" charset="0"/>
-            </a:endParaRPr>
-          </a:p>
-          <a:p>
-            <a:pPr marL="457200" indent="-457200">
-              <a:buFont typeface="+mj-lt"/>
-              <a:buAutoNum type="arabicPeriod"/>
-            </a:pPr>
-            <a:r>
-              <a:rPr lang="ru-RU" sz="2000" dirty="0" smtClean="0">
-                <a:latin typeface="Arial" panose="020B0604020202020204" pitchFamily="34" charset="0"/>
-                <a:cs typeface="Arial" panose="020B0604020202020204" pitchFamily="34" charset="0"/>
-              </a:rPr>
-              <a:t>Рейтинг популярности телеканалов: </a:t>
-            </a:r>
-            <a:r>
-              <a:rPr lang="en-US" sz="2000" dirty="0">
-                <a:latin typeface="Arial" panose="020B0604020202020204" pitchFamily="34" charset="0"/>
-                <a:cs typeface="Arial" panose="020B0604020202020204" pitchFamily="34" charset="0"/>
-                <a:hlinkClick r:id="rId3"/>
-              </a:rPr>
-              <a:t>https://</a:t>
-            </a:r>
-            <a:r>
-              <a:rPr lang="en-US" sz="2000" dirty="0" smtClean="0">
-                <a:latin typeface="Arial" panose="020B0604020202020204" pitchFamily="34" charset="0"/>
-                <a:cs typeface="Arial" panose="020B0604020202020204" pitchFamily="34" charset="0"/>
-                <a:hlinkClick r:id="rId3"/>
-              </a:rPr>
-              <a:t>www.powernet.com.ru/channels-stat</a:t>
-            </a:r>
-            <a:endParaRPr lang="ru-RU" sz="2000" dirty="0" smtClean="0">
-              <a:latin typeface="Arial" panose="020B0604020202020204" pitchFamily="34" charset="0"/>
-              <a:cs typeface="Arial" panose="020B0604020202020204" pitchFamily="34" charset="0"/>
-            </a:endParaRPr>
-          </a:p>
-          <a:p>
-            <a:pPr marL="457200" indent="-457200">
-              <a:buFont typeface="+mj-lt"/>
-              <a:buAutoNum type="arabicPeriod"/>
-            </a:pPr>
-            <a:r>
-              <a:rPr lang="ru-RU" sz="2000" dirty="0" smtClean="0">
-                <a:latin typeface="Arial" panose="020B0604020202020204" pitchFamily="34" charset="0"/>
-                <a:cs typeface="Arial" panose="020B0604020202020204" pitchFamily="34" charset="0"/>
-              </a:rPr>
-              <a:t>Аналитика просмотров: </a:t>
-            </a:r>
-            <a:r>
-              <a:rPr lang="en-US" sz="2000" dirty="0">
-                <a:latin typeface="Arial" panose="020B0604020202020204" pitchFamily="34" charset="0"/>
-                <a:cs typeface="Arial" panose="020B0604020202020204" pitchFamily="34" charset="0"/>
-                <a:hlinkClick r:id="rId4"/>
-              </a:rPr>
-              <a:t>https://journal.tinkoff.ru/television-stat/</a:t>
-            </a:r>
-            <a:endParaRPr lang="ru-RU" sz="2000" dirty="0">
-              <a:latin typeface="Arial" panose="020B0604020202020204" pitchFamily="34" charset="0"/>
-              <a:cs typeface="Arial" panose="020B0604020202020204" pitchFamily="34" charset="0"/>
-            </a:endParaRPr>
-          </a:p>
-        </p:txBody>
-      </p:sp>
-      <p:sp>
-        <p:nvSpPr>
           <p:cNvPr id="6" name="Заголовок 1">
             <a:extLst>
               <a:ext uri="{FF2B5EF4-FFF2-40B4-BE49-F238E27FC236}">
@@ -4213,6 +4077,989 @@
           </a:lstStyle>
           <a:p>
             <a:r>
+              <a:rPr lang="ru-RU" sz="3200" dirty="0">
+                <a:effectLst/>
+                <a:latin typeface="Arial" panose="020B0604020202020204" pitchFamily="34" charset="0"/>
+                <a:cs typeface="Arial" panose="020B0604020202020204" pitchFamily="34" charset="0"/>
+              </a:rPr>
+              <a:t>Хранение сырых данных в</a:t>
+            </a:r>
+            <a:r>
+              <a:rPr lang="en-US" sz="3200" dirty="0">
+                <a:effectLst/>
+                <a:latin typeface="Arial" panose="020B0604020202020204" pitchFamily="34" charset="0"/>
+                <a:cs typeface="Arial" panose="020B0604020202020204" pitchFamily="34" charset="0"/>
+              </a:rPr>
+              <a:t> </a:t>
+            </a:r>
+            <a:r>
+              <a:rPr lang="en-US" sz="3200" dirty="0" smtClean="0">
+                <a:effectLst/>
+                <a:latin typeface="Arial" panose="020B0604020202020204" pitchFamily="34" charset="0"/>
+                <a:cs typeface="Arial" panose="020B0604020202020204" pitchFamily="34" charset="0"/>
+              </a:rPr>
+              <a:t>RT.DataLake</a:t>
+            </a:r>
+            <a:r>
+              <a:rPr lang="ru-RU" sz="3200" dirty="0" smtClean="0">
+                <a:effectLst/>
+                <a:latin typeface="Arial" panose="020B0604020202020204" pitchFamily="34" charset="0"/>
+                <a:cs typeface="Arial" panose="020B0604020202020204" pitchFamily="34" charset="0"/>
+              </a:rPr>
+              <a:t> - код</a:t>
+            </a:r>
+            <a:endParaRPr lang="ru-RU" sz="3200" b="1" dirty="0">
+              <a:latin typeface="Arial" panose="020B0604020202020204" pitchFamily="34" charset="0"/>
+              <a:cs typeface="Arial" panose="020B0604020202020204" pitchFamily="34" charset="0"/>
+            </a:endParaRPr>
+          </a:p>
+        </p:txBody>
+      </p:sp>
+      <p:pic>
+        <p:nvPicPr>
+          <p:cNvPr id="7" name="Рисунок 6"/>
+          <p:cNvPicPr>
+            <a:picLocks noChangeAspect="1"/>
+          </p:cNvPicPr>
+          <p:nvPr/>
+        </p:nvPicPr>
+        <p:blipFill>
+          <a:blip r:embed="rId2">
+            <a:extLst>
+              <a:ext uri="{28A0092B-C50C-407E-A947-70E740481C1C}">
+                <a14:useLocalDpi xmlns:a14="http://schemas.microsoft.com/office/drawing/2010/main" val="0"/>
+              </a:ext>
+            </a:extLst>
+          </a:blip>
+          <a:stretch>
+            <a:fillRect/>
+          </a:stretch>
+        </p:blipFill>
+        <p:spPr>
+          <a:xfrm>
+            <a:off x="9464774" y="532515"/>
+            <a:ext cx="2134504" cy="551243"/>
+          </a:xfrm>
+          <a:prstGeom prst="rect">
+            <a:avLst/>
+          </a:prstGeom>
+        </p:spPr>
+      </p:pic>
+      <p:pic>
+        <p:nvPicPr>
+          <p:cNvPr id="3" name="Рисунок 2"/>
+          <p:cNvPicPr>
+            <a:picLocks noChangeAspect="1"/>
+          </p:cNvPicPr>
+          <p:nvPr/>
+        </p:nvPicPr>
+        <p:blipFill>
+          <a:blip r:embed="rId3"/>
+          <a:stretch>
+            <a:fillRect/>
+          </a:stretch>
+        </p:blipFill>
+        <p:spPr>
+          <a:xfrm>
+            <a:off x="2211711" y="1252273"/>
+            <a:ext cx="7461208" cy="5244766"/>
+          </a:xfrm>
+          <a:prstGeom prst="rect">
+            <a:avLst/>
+          </a:prstGeom>
+        </p:spPr>
+      </p:pic>
+    </p:spTree>
+    <p:extLst>
+      <p:ext uri="{BB962C8B-B14F-4D97-AF65-F5344CB8AC3E}">
+        <p14:creationId xmlns:p14="http://schemas.microsoft.com/office/powerpoint/2010/main" val="233078822"/>
+      </p:ext>
+    </p:extLst>
+  </p:cSld>
+  <p:clrMapOvr>
+    <a:masterClrMapping/>
+  </p:clrMapOvr>
+  <p:timing>
+    <p:tnLst>
+      <p:par>
+        <p:cTn id="1" dur="indefinite" restart="never" nodeType="tmRoot"/>
+      </p:par>
+    </p:tnLst>
+  </p:timing>
+</p:sld>
+</file>
+
+<file path=ppt/slides/slide11.xml><?xml version="1.0" encoding="utf-8"?>
+<p:sld xmlns:a="http://schemas.openxmlformats.org/drawingml/2006/main" xmlns:r="http://schemas.openxmlformats.org/officeDocument/2006/relationships" xmlns:p="http://schemas.openxmlformats.org/presentationml/2006/main">
+  <p:cSld>
+    <p:bg>
+      <p:bgPr>
+        <a:solidFill>
+          <a:schemeClr val="bg1"/>
+        </a:solidFill>
+        <a:effectLst/>
+      </p:bgPr>
+    </p:bg>
+    <p:spTree>
+      <p:nvGrpSpPr>
+        <p:cNvPr id="1" name=""/>
+        <p:cNvGrpSpPr/>
+        <p:nvPr/>
+      </p:nvGrpSpPr>
+      <p:grpSpPr>
+        <a:xfrm>
+          <a:off x="0" y="0"/>
+          <a:ext cx="0" cy="0"/>
+          <a:chOff x="0" y="0"/>
+          <a:chExt cx="0" cy="0"/>
+        </a:xfrm>
+      </p:grpSpPr>
+      <p:sp>
+        <p:nvSpPr>
+          <p:cNvPr id="11" name="Номер слайда 3">
+            <a:extLst>
+              <a:ext uri="{FF2B5EF4-FFF2-40B4-BE49-F238E27FC236}">
+                <a16:creationId xmlns:a16="http://schemas.microsoft.com/office/drawing/2014/main" id="{7267A4CF-F0C4-43DD-AD58-96564CA7C221}"/>
+              </a:ext>
+            </a:extLst>
+          </p:cNvPr>
+          <p:cNvSpPr>
+            <a:spLocks noGrp="1"/>
+          </p:cNvSpPr>
+          <p:nvPr>
+            <p:ph type="sldNum" sz="quarter" idx="12"/>
+          </p:nvPr>
+        </p:nvSpPr>
+        <p:spPr>
+          <a:xfrm>
+            <a:off x="515939" y="6393284"/>
+            <a:ext cx="2743200" cy="365125"/>
+          </a:xfrm>
+          <a:prstGeom prst="rect">
+            <a:avLst/>
+          </a:prstGeom>
+        </p:spPr>
+        <p:txBody>
+          <a:bodyPr lIns="0" rIns="0"/>
+          <a:lstStyle>
+            <a:lvl1pPr>
+              <a:defRPr sz="1200">
+                <a:solidFill>
+                  <a:schemeClr val="bg1">
+                    <a:lumMod val="75000"/>
+                  </a:schemeClr>
+                </a:solidFill>
+              </a:defRPr>
+            </a:lvl1pPr>
+          </a:lstStyle>
+          <a:p>
+            <a:pPr algn="l"/>
+            <a:fld id="{A4D4834B-A5E3-4581-856C-72DC1D7E0BCC}" type="slidenum">
+              <a:rPr lang="ru-RU" smtClean="0">
+                <a:solidFill>
+                  <a:schemeClr val="tx1"/>
+                </a:solidFill>
+                <a:latin typeface="Rostelecom Basis" panose="020B0503030604040103" pitchFamily="34" charset="0"/>
+              </a:rPr>
+              <a:pPr algn="l"/>
+              <a:t>11</a:t>
+            </a:fld>
+            <a:endParaRPr lang="ru-RU" dirty="0">
+              <a:solidFill>
+                <a:schemeClr val="tx1"/>
+              </a:solidFill>
+              <a:latin typeface="Rostelecom Basis" panose="020B0503030604040103" pitchFamily="34" charset="0"/>
+            </a:endParaRPr>
+          </a:p>
+        </p:txBody>
+      </p:sp>
+      <p:sp>
+        <p:nvSpPr>
+          <p:cNvPr id="5" name="Заголовок 1">
+            <a:extLst>
+              <a:ext uri="{FF2B5EF4-FFF2-40B4-BE49-F238E27FC236}">
+                <a16:creationId xmlns:a16="http://schemas.microsoft.com/office/drawing/2014/main" id="{26F3F6DE-0B95-4A88-A2DE-D547275A4F55}"/>
+              </a:ext>
+            </a:extLst>
+          </p:cNvPr>
+          <p:cNvSpPr txBox="1">
+            <a:spLocks/>
+          </p:cNvSpPr>
+          <p:nvPr/>
+        </p:nvSpPr>
+        <p:spPr>
+          <a:xfrm>
+            <a:off x="439152" y="2920189"/>
+            <a:ext cx="11160127" cy="2051844"/>
+          </a:xfrm>
+          <a:prstGeom prst="rect">
+            <a:avLst/>
+          </a:prstGeom>
+        </p:spPr>
+        <p:txBody>
+          <a:bodyPr lIns="0" tIns="0" rIns="0" bIns="0" anchor="t" anchorCtr="0">
+            <a:spAutoFit/>
+          </a:bodyPr>
+          <a:lstStyle>
+            <a:defPPr>
+              <a:defRPr lang="ru-RU"/>
+            </a:defPPr>
+            <a:lvl1pPr>
+              <a:lnSpc>
+                <a:spcPts val="4000"/>
+              </a:lnSpc>
+              <a:spcBef>
+                <a:spcPct val="0"/>
+              </a:spcBef>
+              <a:buNone/>
+              <a:defRPr sz="2800" b="0">
+                <a:effectLst/>
+                <a:latin typeface="Rostelecom Basis Medium" panose="020B0603030604040103" pitchFamily="34" charset="0"/>
+                <a:ea typeface="+mj-ea"/>
+                <a:cs typeface="+mj-cs"/>
+              </a:defRPr>
+            </a:lvl1pPr>
+          </a:lstStyle>
+          <a:p>
+            <a:r>
+              <a:rPr lang="ru-RU" dirty="0" smtClean="0">
+                <a:latin typeface="Arial" panose="020B0604020202020204" pitchFamily="34" charset="0"/>
+                <a:cs typeface="Arial" panose="020B0604020202020204" pitchFamily="34" charset="0"/>
+              </a:rPr>
+              <a:t>На слайдах с решением расскажите о том</a:t>
+            </a:r>
+            <a:r>
+              <a:rPr lang="en-US" dirty="0" smtClean="0">
+                <a:latin typeface="Arial" panose="020B0604020202020204" pitchFamily="34" charset="0"/>
+                <a:cs typeface="Arial" panose="020B0604020202020204" pitchFamily="34" charset="0"/>
+              </a:rPr>
+              <a:t>,</a:t>
+            </a:r>
+            <a:r>
+              <a:rPr lang="ru-RU" dirty="0" smtClean="0">
+                <a:latin typeface="Arial" panose="020B0604020202020204" pitchFamily="34" charset="0"/>
+                <a:cs typeface="Arial" panose="020B0604020202020204" pitchFamily="34" charset="0"/>
+              </a:rPr>
+              <a:t> как вы решали поставленные задачи</a:t>
+            </a:r>
+            <a:r>
+              <a:rPr lang="en-US" dirty="0" smtClean="0">
+                <a:latin typeface="Arial" panose="020B0604020202020204" pitchFamily="34" charset="0"/>
+                <a:cs typeface="Arial" panose="020B0604020202020204" pitchFamily="34" charset="0"/>
+              </a:rPr>
+              <a:t>,</a:t>
+            </a:r>
+            <a:r>
+              <a:rPr lang="ru-RU" dirty="0" smtClean="0">
+                <a:latin typeface="Arial" panose="020B0604020202020204" pitchFamily="34" charset="0"/>
+                <a:cs typeface="Arial" panose="020B0604020202020204" pitchFamily="34" charset="0"/>
+              </a:rPr>
+              <a:t> что учитывали и что удалось сделать</a:t>
+            </a:r>
+            <a:r>
+              <a:rPr lang="en-US" dirty="0" smtClean="0">
+                <a:latin typeface="Arial" panose="020B0604020202020204" pitchFamily="34" charset="0"/>
+                <a:cs typeface="Arial" panose="020B0604020202020204" pitchFamily="34" charset="0"/>
+              </a:rPr>
+              <a:t>. </a:t>
+            </a:r>
+            <a:r>
+              <a:rPr lang="ru-RU" dirty="0" smtClean="0">
+                <a:latin typeface="Arial" panose="020B0604020202020204" pitchFamily="34" charset="0"/>
+                <a:cs typeface="Arial" panose="020B0604020202020204" pitchFamily="34" charset="0"/>
+              </a:rPr>
+              <a:t>Здесь можно дать ссылки на репозиторий или приложить некоторые скриншоты</a:t>
+            </a:r>
+            <a:r>
+              <a:rPr lang="en-US" dirty="0" smtClean="0">
+                <a:latin typeface="Arial" panose="020B0604020202020204" pitchFamily="34" charset="0"/>
+                <a:cs typeface="Arial" panose="020B0604020202020204" pitchFamily="34" charset="0"/>
+              </a:rPr>
+              <a:t>. </a:t>
+            </a:r>
+            <a:endParaRPr lang="ru-RU" dirty="0">
+              <a:latin typeface="Arial" panose="020B0604020202020204" pitchFamily="34" charset="0"/>
+              <a:cs typeface="Arial" panose="020B0604020202020204" pitchFamily="34" charset="0"/>
+            </a:endParaRPr>
+          </a:p>
+        </p:txBody>
+      </p:sp>
+      <p:sp>
+        <p:nvSpPr>
+          <p:cNvPr id="6" name="Заголовок 1">
+            <a:extLst>
+              <a:ext uri="{FF2B5EF4-FFF2-40B4-BE49-F238E27FC236}">
+                <a16:creationId xmlns:a16="http://schemas.microsoft.com/office/drawing/2014/main" id="{26F3F6DE-0B95-4A88-A2DE-D547275A4F55}"/>
+              </a:ext>
+            </a:extLst>
+          </p:cNvPr>
+          <p:cNvSpPr txBox="1">
+            <a:spLocks/>
+          </p:cNvSpPr>
+          <p:nvPr/>
+        </p:nvSpPr>
+        <p:spPr>
+          <a:xfrm>
+            <a:off x="439151" y="560538"/>
+            <a:ext cx="11160127" cy="523220"/>
+          </a:xfrm>
+          <a:prstGeom prst="rect">
+            <a:avLst/>
+          </a:prstGeom>
+        </p:spPr>
+        <p:txBody>
+          <a:bodyPr lIns="0" tIns="0" rIns="0" bIns="0" anchor="t" anchorCtr="0">
+            <a:spAutoFit/>
+          </a:bodyPr>
+          <a:lstStyle>
+            <a:lvl1pPr algn="l" defTabSz="914400" rtl="0" eaLnBrk="1" latinLnBrk="0" hangingPunct="1">
+              <a:lnSpc>
+                <a:spcPts val="4000"/>
+              </a:lnSpc>
+              <a:spcBef>
+                <a:spcPct val="0"/>
+              </a:spcBef>
+              <a:buNone/>
+              <a:defRPr sz="3600" b="0" kern="1200">
+                <a:solidFill>
+                  <a:schemeClr val="tx1"/>
+                </a:solidFill>
+                <a:effectLst>
+                  <a:outerShdw blurRad="38100" dist="38100" dir="2700000" algn="tl">
+                    <a:srgbClr val="000000">
+                      <a:alpha val="43137"/>
+                    </a:srgbClr>
+                  </a:outerShdw>
+                </a:effectLst>
+                <a:latin typeface="Rostelecom Basis Medium" panose="020B0603030604040103" pitchFamily="34" charset="0"/>
+                <a:ea typeface="+mj-ea"/>
+                <a:cs typeface="+mj-cs"/>
+              </a:defRPr>
+            </a:lvl1pPr>
+          </a:lstStyle>
+          <a:p>
+            <a:r>
+              <a:rPr lang="ru-RU" b="1" dirty="0" smtClean="0">
+                <a:effectLst/>
+                <a:latin typeface="Arial" panose="020B0604020202020204" pitchFamily="34" charset="0"/>
+                <a:cs typeface="Arial" panose="020B0604020202020204" pitchFamily="34" charset="0"/>
+              </a:rPr>
+              <a:t>Решение</a:t>
+            </a:r>
+            <a:endParaRPr lang="ru-RU" b="1" dirty="0">
+              <a:latin typeface="Arial" panose="020B0604020202020204" pitchFamily="34" charset="0"/>
+              <a:cs typeface="Arial" panose="020B0604020202020204" pitchFamily="34" charset="0"/>
+            </a:endParaRPr>
+          </a:p>
+        </p:txBody>
+      </p:sp>
+      <p:pic>
+        <p:nvPicPr>
+          <p:cNvPr id="7" name="Рисунок 6"/>
+          <p:cNvPicPr>
+            <a:picLocks noChangeAspect="1"/>
+          </p:cNvPicPr>
+          <p:nvPr/>
+        </p:nvPicPr>
+        <p:blipFill>
+          <a:blip r:embed="rId2">
+            <a:extLst>
+              <a:ext uri="{28A0092B-C50C-407E-A947-70E740481C1C}">
+                <a14:useLocalDpi xmlns:a14="http://schemas.microsoft.com/office/drawing/2010/main" val="0"/>
+              </a:ext>
+            </a:extLst>
+          </a:blip>
+          <a:stretch>
+            <a:fillRect/>
+          </a:stretch>
+        </p:blipFill>
+        <p:spPr>
+          <a:xfrm>
+            <a:off x="9464774" y="532515"/>
+            <a:ext cx="2134504" cy="551243"/>
+          </a:xfrm>
+          <a:prstGeom prst="rect">
+            <a:avLst/>
+          </a:prstGeom>
+        </p:spPr>
+      </p:pic>
+    </p:spTree>
+    <p:extLst>
+      <p:ext uri="{BB962C8B-B14F-4D97-AF65-F5344CB8AC3E}">
+        <p14:creationId xmlns:p14="http://schemas.microsoft.com/office/powerpoint/2010/main" val="288046697"/>
+      </p:ext>
+    </p:extLst>
+  </p:cSld>
+  <p:clrMapOvr>
+    <a:masterClrMapping/>
+  </p:clrMapOvr>
+  <p:timing>
+    <p:tnLst>
+      <p:par>
+        <p:cTn id="1" dur="indefinite" restart="never" nodeType="tmRoot"/>
+      </p:par>
+    </p:tnLst>
+  </p:timing>
+</p:sld>
+</file>
+
+<file path=ppt/slides/slide12.xml><?xml version="1.0" encoding="utf-8"?>
+<p:sld xmlns:a="http://schemas.openxmlformats.org/drawingml/2006/main" xmlns:r="http://schemas.openxmlformats.org/officeDocument/2006/relationships" xmlns:p="http://schemas.openxmlformats.org/presentationml/2006/main">
+  <p:cSld>
+    <p:bg>
+      <p:bgPr>
+        <a:solidFill>
+          <a:schemeClr val="bg1"/>
+        </a:solidFill>
+        <a:effectLst/>
+      </p:bgPr>
+    </p:bg>
+    <p:spTree>
+      <p:nvGrpSpPr>
+        <p:cNvPr id="1" name=""/>
+        <p:cNvGrpSpPr/>
+        <p:nvPr/>
+      </p:nvGrpSpPr>
+      <p:grpSpPr>
+        <a:xfrm>
+          <a:off x="0" y="0"/>
+          <a:ext cx="0" cy="0"/>
+          <a:chOff x="0" y="0"/>
+          <a:chExt cx="0" cy="0"/>
+        </a:xfrm>
+      </p:grpSpPr>
+      <p:sp>
+        <p:nvSpPr>
+          <p:cNvPr id="11" name="Номер слайда 3">
+            <a:extLst>
+              <a:ext uri="{FF2B5EF4-FFF2-40B4-BE49-F238E27FC236}">
+                <a16:creationId xmlns:a16="http://schemas.microsoft.com/office/drawing/2014/main" id="{7267A4CF-F0C4-43DD-AD58-96564CA7C221}"/>
+              </a:ext>
+            </a:extLst>
+          </p:cNvPr>
+          <p:cNvSpPr>
+            <a:spLocks noGrp="1"/>
+          </p:cNvSpPr>
+          <p:nvPr>
+            <p:ph type="sldNum" sz="quarter" idx="12"/>
+          </p:nvPr>
+        </p:nvSpPr>
+        <p:spPr>
+          <a:xfrm>
+            <a:off x="515939" y="6393284"/>
+            <a:ext cx="2743200" cy="365125"/>
+          </a:xfrm>
+          <a:prstGeom prst="rect">
+            <a:avLst/>
+          </a:prstGeom>
+        </p:spPr>
+        <p:txBody>
+          <a:bodyPr lIns="0" rIns="0"/>
+          <a:lstStyle>
+            <a:lvl1pPr>
+              <a:defRPr sz="1200">
+                <a:solidFill>
+                  <a:schemeClr val="bg1">
+                    <a:lumMod val="75000"/>
+                  </a:schemeClr>
+                </a:solidFill>
+              </a:defRPr>
+            </a:lvl1pPr>
+          </a:lstStyle>
+          <a:p>
+            <a:pPr algn="l"/>
+            <a:fld id="{A4D4834B-A5E3-4581-856C-72DC1D7E0BCC}" type="slidenum">
+              <a:rPr lang="ru-RU" smtClean="0">
+                <a:solidFill>
+                  <a:schemeClr val="tx1"/>
+                </a:solidFill>
+                <a:latin typeface="Rostelecom Basis" panose="020B0503030604040103" pitchFamily="34" charset="0"/>
+              </a:rPr>
+              <a:pPr algn="l"/>
+              <a:t>12</a:t>
+            </a:fld>
+            <a:endParaRPr lang="ru-RU" dirty="0">
+              <a:solidFill>
+                <a:schemeClr val="tx1"/>
+              </a:solidFill>
+              <a:latin typeface="Rostelecom Basis" panose="020B0503030604040103" pitchFamily="34" charset="0"/>
+            </a:endParaRPr>
+          </a:p>
+        </p:txBody>
+      </p:sp>
+      <p:sp>
+        <p:nvSpPr>
+          <p:cNvPr id="5" name="Заголовок 1">
+            <a:extLst>
+              <a:ext uri="{FF2B5EF4-FFF2-40B4-BE49-F238E27FC236}">
+                <a16:creationId xmlns:a16="http://schemas.microsoft.com/office/drawing/2014/main" id="{26F3F6DE-0B95-4A88-A2DE-D547275A4F55}"/>
+              </a:ext>
+            </a:extLst>
+          </p:cNvPr>
+          <p:cNvSpPr txBox="1">
+            <a:spLocks/>
+          </p:cNvSpPr>
+          <p:nvPr/>
+        </p:nvSpPr>
+        <p:spPr>
+          <a:xfrm>
+            <a:off x="439152" y="2920189"/>
+            <a:ext cx="11160127" cy="979435"/>
+          </a:xfrm>
+          <a:prstGeom prst="rect">
+            <a:avLst/>
+          </a:prstGeom>
+        </p:spPr>
+        <p:txBody>
+          <a:bodyPr lIns="0" tIns="0" rIns="0" bIns="0" anchor="t" anchorCtr="0">
+            <a:spAutoFit/>
+          </a:bodyPr>
+          <a:lstStyle>
+            <a:defPPr>
+              <a:defRPr lang="ru-RU"/>
+            </a:defPPr>
+            <a:lvl1pPr>
+              <a:lnSpc>
+                <a:spcPts val="4000"/>
+              </a:lnSpc>
+              <a:spcBef>
+                <a:spcPct val="0"/>
+              </a:spcBef>
+              <a:buNone/>
+              <a:defRPr sz="2800" b="0">
+                <a:effectLst/>
+                <a:latin typeface="Rostelecom Basis Medium" panose="020B0603030604040103" pitchFamily="34" charset="0"/>
+                <a:ea typeface="+mj-ea"/>
+                <a:cs typeface="+mj-cs"/>
+              </a:defRPr>
+            </a:lvl1pPr>
+          </a:lstStyle>
+          <a:p>
+            <a:r>
+              <a:rPr lang="ru-RU" dirty="0" smtClean="0">
+                <a:latin typeface="Arial" panose="020B0604020202020204" pitchFamily="34" charset="0"/>
+                <a:cs typeface="Arial" panose="020B0604020202020204" pitchFamily="34" charset="0"/>
+              </a:rPr>
+              <a:t>Основные итоги вашей работы</a:t>
+            </a:r>
+            <a:r>
+              <a:rPr lang="en-US" dirty="0" smtClean="0">
+                <a:latin typeface="Arial" panose="020B0604020202020204" pitchFamily="34" charset="0"/>
+                <a:cs typeface="Arial" panose="020B0604020202020204" pitchFamily="34" charset="0"/>
+              </a:rPr>
+              <a:t>,</a:t>
+            </a:r>
+            <a:r>
+              <a:rPr lang="ru-RU" dirty="0" smtClean="0">
+                <a:latin typeface="Arial" panose="020B0604020202020204" pitchFamily="34" charset="0"/>
+                <a:cs typeface="Arial" panose="020B0604020202020204" pitchFamily="34" charset="0"/>
+              </a:rPr>
+              <a:t> инсайты после работы с данными и графики</a:t>
+            </a:r>
+            <a:endParaRPr lang="ru-RU" dirty="0">
+              <a:latin typeface="Arial" panose="020B0604020202020204" pitchFamily="34" charset="0"/>
+              <a:cs typeface="Arial" panose="020B0604020202020204" pitchFamily="34" charset="0"/>
+            </a:endParaRPr>
+          </a:p>
+        </p:txBody>
+      </p:sp>
+      <p:sp>
+        <p:nvSpPr>
+          <p:cNvPr id="6" name="Заголовок 1">
+            <a:extLst>
+              <a:ext uri="{FF2B5EF4-FFF2-40B4-BE49-F238E27FC236}">
+                <a16:creationId xmlns:a16="http://schemas.microsoft.com/office/drawing/2014/main" id="{26F3F6DE-0B95-4A88-A2DE-D547275A4F55}"/>
+              </a:ext>
+            </a:extLst>
+          </p:cNvPr>
+          <p:cNvSpPr txBox="1">
+            <a:spLocks/>
+          </p:cNvSpPr>
+          <p:nvPr/>
+        </p:nvSpPr>
+        <p:spPr>
+          <a:xfrm>
+            <a:off x="439151" y="560538"/>
+            <a:ext cx="11160127" cy="523220"/>
+          </a:xfrm>
+          <a:prstGeom prst="rect">
+            <a:avLst/>
+          </a:prstGeom>
+        </p:spPr>
+        <p:txBody>
+          <a:bodyPr lIns="0" tIns="0" rIns="0" bIns="0" anchor="t" anchorCtr="0">
+            <a:spAutoFit/>
+          </a:bodyPr>
+          <a:lstStyle>
+            <a:lvl1pPr algn="l" defTabSz="914400" rtl="0" eaLnBrk="1" latinLnBrk="0" hangingPunct="1">
+              <a:lnSpc>
+                <a:spcPts val="4000"/>
+              </a:lnSpc>
+              <a:spcBef>
+                <a:spcPct val="0"/>
+              </a:spcBef>
+              <a:buNone/>
+              <a:defRPr sz="3600" b="0" kern="1200">
+                <a:solidFill>
+                  <a:schemeClr val="tx1"/>
+                </a:solidFill>
+                <a:effectLst>
+                  <a:outerShdw blurRad="38100" dist="38100" dir="2700000" algn="tl">
+                    <a:srgbClr val="000000">
+                      <a:alpha val="43137"/>
+                    </a:srgbClr>
+                  </a:outerShdw>
+                </a:effectLst>
+                <a:latin typeface="Rostelecom Basis Medium" panose="020B0603030604040103" pitchFamily="34" charset="0"/>
+                <a:ea typeface="+mj-ea"/>
+                <a:cs typeface="+mj-cs"/>
+              </a:defRPr>
+            </a:lvl1pPr>
+          </a:lstStyle>
+          <a:p>
+            <a:r>
+              <a:rPr lang="ru-RU" b="1" dirty="0">
+                <a:effectLst/>
+                <a:latin typeface="Arial" panose="020B0604020202020204" pitchFamily="34" charset="0"/>
+                <a:cs typeface="Arial" panose="020B0604020202020204" pitchFamily="34" charset="0"/>
+              </a:rPr>
+              <a:t>Итоги и инсайты</a:t>
+            </a:r>
+            <a:endParaRPr lang="ru-RU" b="1" dirty="0">
+              <a:latin typeface="Arial" panose="020B0604020202020204" pitchFamily="34" charset="0"/>
+              <a:cs typeface="Arial" panose="020B0604020202020204" pitchFamily="34" charset="0"/>
+            </a:endParaRPr>
+          </a:p>
+        </p:txBody>
+      </p:sp>
+      <p:pic>
+        <p:nvPicPr>
+          <p:cNvPr id="7" name="Рисунок 6"/>
+          <p:cNvPicPr>
+            <a:picLocks noChangeAspect="1"/>
+          </p:cNvPicPr>
+          <p:nvPr/>
+        </p:nvPicPr>
+        <p:blipFill>
+          <a:blip r:embed="rId2">
+            <a:extLst>
+              <a:ext uri="{28A0092B-C50C-407E-A947-70E740481C1C}">
+                <a14:useLocalDpi xmlns:a14="http://schemas.microsoft.com/office/drawing/2010/main" val="0"/>
+              </a:ext>
+            </a:extLst>
+          </a:blip>
+          <a:stretch>
+            <a:fillRect/>
+          </a:stretch>
+        </p:blipFill>
+        <p:spPr>
+          <a:xfrm>
+            <a:off x="9464774" y="532515"/>
+            <a:ext cx="2134504" cy="551243"/>
+          </a:xfrm>
+          <a:prstGeom prst="rect">
+            <a:avLst/>
+          </a:prstGeom>
+        </p:spPr>
+      </p:pic>
+    </p:spTree>
+    <p:extLst>
+      <p:ext uri="{BB962C8B-B14F-4D97-AF65-F5344CB8AC3E}">
+        <p14:creationId xmlns:p14="http://schemas.microsoft.com/office/powerpoint/2010/main" val="921795148"/>
+      </p:ext>
+    </p:extLst>
+  </p:cSld>
+  <p:clrMapOvr>
+    <a:masterClrMapping/>
+  </p:clrMapOvr>
+  <p:timing>
+    <p:tnLst>
+      <p:par>
+        <p:cTn id="1" dur="indefinite" restart="never" nodeType="tmRoot"/>
+      </p:par>
+    </p:tnLst>
+  </p:timing>
+</p:sld>
+</file>
+
+<file path=ppt/slides/slide13.xml><?xml version="1.0" encoding="utf-8"?>
+<p:sld xmlns:a="http://schemas.openxmlformats.org/drawingml/2006/main" xmlns:r="http://schemas.openxmlformats.org/officeDocument/2006/relationships" xmlns:p="http://schemas.openxmlformats.org/presentationml/2006/main">
+  <p:cSld>
+    <p:bg>
+      <p:bgPr>
+        <a:solidFill>
+          <a:schemeClr val="bg1"/>
+        </a:solidFill>
+        <a:effectLst/>
+      </p:bgPr>
+    </p:bg>
+    <p:spTree>
+      <p:nvGrpSpPr>
+        <p:cNvPr id="1" name=""/>
+        <p:cNvGrpSpPr/>
+        <p:nvPr/>
+      </p:nvGrpSpPr>
+      <p:grpSpPr>
+        <a:xfrm>
+          <a:off x="0" y="0"/>
+          <a:ext cx="0" cy="0"/>
+          <a:chOff x="0" y="0"/>
+          <a:chExt cx="0" cy="0"/>
+        </a:xfrm>
+      </p:grpSpPr>
+      <p:sp>
+        <p:nvSpPr>
+          <p:cNvPr id="11" name="Номер слайда 3">
+            <a:extLst>
+              <a:ext uri="{FF2B5EF4-FFF2-40B4-BE49-F238E27FC236}">
+                <a16:creationId xmlns:a16="http://schemas.microsoft.com/office/drawing/2014/main" id="{7267A4CF-F0C4-43DD-AD58-96564CA7C221}"/>
+              </a:ext>
+            </a:extLst>
+          </p:cNvPr>
+          <p:cNvSpPr>
+            <a:spLocks noGrp="1"/>
+          </p:cNvSpPr>
+          <p:nvPr>
+            <p:ph type="sldNum" sz="quarter" idx="12"/>
+          </p:nvPr>
+        </p:nvSpPr>
+        <p:spPr>
+          <a:xfrm>
+            <a:off x="515939" y="6393284"/>
+            <a:ext cx="2743200" cy="365125"/>
+          </a:xfrm>
+          <a:prstGeom prst="rect">
+            <a:avLst/>
+          </a:prstGeom>
+        </p:spPr>
+        <p:txBody>
+          <a:bodyPr lIns="0" rIns="0"/>
+          <a:lstStyle>
+            <a:lvl1pPr>
+              <a:defRPr sz="1200">
+                <a:solidFill>
+                  <a:schemeClr val="bg1">
+                    <a:lumMod val="75000"/>
+                  </a:schemeClr>
+                </a:solidFill>
+              </a:defRPr>
+            </a:lvl1pPr>
+          </a:lstStyle>
+          <a:p>
+            <a:pPr algn="l"/>
+            <a:fld id="{A4D4834B-A5E3-4581-856C-72DC1D7E0BCC}" type="slidenum">
+              <a:rPr lang="ru-RU" smtClean="0">
+                <a:solidFill>
+                  <a:schemeClr val="tx1"/>
+                </a:solidFill>
+                <a:latin typeface="Rostelecom Basis" panose="020B0503030604040103" pitchFamily="34" charset="0"/>
+              </a:rPr>
+              <a:pPr algn="l"/>
+              <a:t>13</a:t>
+            </a:fld>
+            <a:endParaRPr lang="ru-RU" dirty="0">
+              <a:solidFill>
+                <a:schemeClr val="tx1"/>
+              </a:solidFill>
+              <a:latin typeface="Rostelecom Basis" panose="020B0503030604040103" pitchFamily="34" charset="0"/>
+            </a:endParaRPr>
+          </a:p>
+        </p:txBody>
+      </p:sp>
+      <p:sp>
+        <p:nvSpPr>
+          <p:cNvPr id="5" name="Заголовок 1">
+            <a:extLst>
+              <a:ext uri="{FF2B5EF4-FFF2-40B4-BE49-F238E27FC236}">
+                <a16:creationId xmlns:a16="http://schemas.microsoft.com/office/drawing/2014/main" id="{26F3F6DE-0B95-4A88-A2DE-D547275A4F55}"/>
+              </a:ext>
+            </a:extLst>
+          </p:cNvPr>
+          <p:cNvSpPr txBox="1">
+            <a:spLocks/>
+          </p:cNvSpPr>
+          <p:nvPr/>
+        </p:nvSpPr>
+        <p:spPr>
+          <a:xfrm>
+            <a:off x="439151" y="1333436"/>
+            <a:ext cx="11160127" cy="1538883"/>
+          </a:xfrm>
+          <a:prstGeom prst="rect">
+            <a:avLst/>
+          </a:prstGeom>
+        </p:spPr>
+        <p:txBody>
+          <a:bodyPr lIns="0" tIns="0" rIns="0" bIns="0" anchor="t" anchorCtr="0">
+            <a:spAutoFit/>
+          </a:bodyPr>
+          <a:lstStyle>
+            <a:defPPr>
+              <a:defRPr lang="ru-RU"/>
+            </a:defPPr>
+            <a:lvl1pPr>
+              <a:lnSpc>
+                <a:spcPts val="4000"/>
+              </a:lnSpc>
+              <a:spcBef>
+                <a:spcPct val="0"/>
+              </a:spcBef>
+              <a:buNone/>
+              <a:defRPr sz="2800" b="0">
+                <a:effectLst/>
+                <a:latin typeface="Rostelecom Basis Medium" panose="020B0603030604040103" pitchFamily="34" charset="0"/>
+                <a:ea typeface="+mj-ea"/>
+                <a:cs typeface="+mj-cs"/>
+              </a:defRPr>
+            </a:lvl1pPr>
+          </a:lstStyle>
+          <a:p>
+            <a:pPr marL="457200" indent="-457200">
+              <a:buFont typeface="+mj-lt"/>
+              <a:buAutoNum type="arabicPeriod"/>
+            </a:pPr>
+            <a:r>
+              <a:rPr lang="ru-RU" sz="2000" dirty="0" err="1" smtClean="0">
+                <a:latin typeface="Arial" panose="020B0604020202020204" pitchFamily="34" charset="0"/>
+                <a:cs typeface="Arial" panose="020B0604020202020204" pitchFamily="34" charset="0"/>
+              </a:rPr>
+              <a:t>Гитхаб</a:t>
+            </a:r>
+            <a:r>
+              <a:rPr lang="ru-RU" sz="2000" dirty="0" smtClean="0">
+                <a:latin typeface="Arial" panose="020B0604020202020204" pitchFamily="34" charset="0"/>
+                <a:cs typeface="Arial" panose="020B0604020202020204" pitchFamily="34" charset="0"/>
+              </a:rPr>
+              <a:t> проекта: </a:t>
+            </a:r>
+            <a:r>
+              <a:rPr lang="en-US" sz="2000" dirty="0" smtClean="0">
+                <a:latin typeface="Arial" panose="020B0604020202020204" pitchFamily="34" charset="0"/>
+                <a:cs typeface="Arial" panose="020B0604020202020204" pitchFamily="34" charset="0"/>
+                <a:hlinkClick r:id="rId2"/>
+              </a:rPr>
+              <a:t>https://github.com/Olmeor/Data-engineer_Rostelecom_programming_school</a:t>
+            </a:r>
+            <a:endParaRPr lang="ru-RU" sz="2000" dirty="0" smtClean="0">
+              <a:latin typeface="Arial" panose="020B0604020202020204" pitchFamily="34" charset="0"/>
+              <a:cs typeface="Arial" panose="020B0604020202020204" pitchFamily="34" charset="0"/>
+            </a:endParaRPr>
+          </a:p>
+          <a:p>
+            <a:pPr marL="457200" indent="-457200">
+              <a:buFont typeface="+mj-lt"/>
+              <a:buAutoNum type="arabicPeriod"/>
+            </a:pPr>
+            <a:r>
+              <a:rPr lang="ru-RU" sz="2000" dirty="0" smtClean="0">
+                <a:latin typeface="Arial" panose="020B0604020202020204" pitchFamily="34" charset="0"/>
+                <a:cs typeface="Arial" panose="020B0604020202020204" pitchFamily="34" charset="0"/>
+              </a:rPr>
+              <a:t>Рейтинг популярности телеканалов: </a:t>
+            </a:r>
+            <a:r>
+              <a:rPr lang="en-US" sz="2000" dirty="0">
+                <a:latin typeface="Arial" panose="020B0604020202020204" pitchFamily="34" charset="0"/>
+                <a:cs typeface="Arial" panose="020B0604020202020204" pitchFamily="34" charset="0"/>
+                <a:hlinkClick r:id="rId3"/>
+              </a:rPr>
+              <a:t>https://</a:t>
+            </a:r>
+            <a:r>
+              <a:rPr lang="en-US" sz="2000" dirty="0" smtClean="0">
+                <a:latin typeface="Arial" panose="020B0604020202020204" pitchFamily="34" charset="0"/>
+                <a:cs typeface="Arial" panose="020B0604020202020204" pitchFamily="34" charset="0"/>
+                <a:hlinkClick r:id="rId3"/>
+              </a:rPr>
+              <a:t>www.powernet.com.ru/channels-stat</a:t>
+            </a:r>
+            <a:endParaRPr lang="ru-RU" sz="2000" dirty="0" smtClean="0">
+              <a:latin typeface="Arial" panose="020B0604020202020204" pitchFamily="34" charset="0"/>
+              <a:cs typeface="Arial" panose="020B0604020202020204" pitchFamily="34" charset="0"/>
+            </a:endParaRPr>
+          </a:p>
+          <a:p>
+            <a:pPr marL="457200" indent="-457200">
+              <a:buFont typeface="+mj-lt"/>
+              <a:buAutoNum type="arabicPeriod"/>
+            </a:pPr>
+            <a:r>
+              <a:rPr lang="ru-RU" sz="2000" dirty="0" smtClean="0">
+                <a:latin typeface="Arial" panose="020B0604020202020204" pitchFamily="34" charset="0"/>
+                <a:cs typeface="Arial" panose="020B0604020202020204" pitchFamily="34" charset="0"/>
+              </a:rPr>
+              <a:t>Аналитика просмотров: </a:t>
+            </a:r>
+            <a:r>
+              <a:rPr lang="en-US" sz="2000" dirty="0">
+                <a:latin typeface="Arial" panose="020B0604020202020204" pitchFamily="34" charset="0"/>
+                <a:cs typeface="Arial" panose="020B0604020202020204" pitchFamily="34" charset="0"/>
+                <a:hlinkClick r:id="rId4"/>
+              </a:rPr>
+              <a:t>https://journal.tinkoff.ru/television-stat/</a:t>
+            </a:r>
+            <a:endParaRPr lang="ru-RU" sz="2000" dirty="0">
+              <a:latin typeface="Arial" panose="020B0604020202020204" pitchFamily="34" charset="0"/>
+              <a:cs typeface="Arial" panose="020B0604020202020204" pitchFamily="34" charset="0"/>
+            </a:endParaRPr>
+          </a:p>
+        </p:txBody>
+      </p:sp>
+      <p:sp>
+        <p:nvSpPr>
+          <p:cNvPr id="6" name="Заголовок 1">
+            <a:extLst>
+              <a:ext uri="{FF2B5EF4-FFF2-40B4-BE49-F238E27FC236}">
+                <a16:creationId xmlns:a16="http://schemas.microsoft.com/office/drawing/2014/main" id="{26F3F6DE-0B95-4A88-A2DE-D547275A4F55}"/>
+              </a:ext>
+            </a:extLst>
+          </p:cNvPr>
+          <p:cNvSpPr txBox="1">
+            <a:spLocks/>
+          </p:cNvSpPr>
+          <p:nvPr/>
+        </p:nvSpPr>
+        <p:spPr>
+          <a:xfrm>
+            <a:off x="439151" y="560538"/>
+            <a:ext cx="11160127" cy="523220"/>
+          </a:xfrm>
+          <a:prstGeom prst="rect">
+            <a:avLst/>
+          </a:prstGeom>
+        </p:spPr>
+        <p:txBody>
+          <a:bodyPr lIns="0" tIns="0" rIns="0" bIns="0" anchor="t" anchorCtr="0">
+            <a:spAutoFit/>
+          </a:bodyPr>
+          <a:lstStyle>
+            <a:lvl1pPr algn="l" defTabSz="914400" rtl="0" eaLnBrk="1" latinLnBrk="0" hangingPunct="1">
+              <a:lnSpc>
+                <a:spcPts val="4000"/>
+              </a:lnSpc>
+              <a:spcBef>
+                <a:spcPct val="0"/>
+              </a:spcBef>
+              <a:buNone/>
+              <a:defRPr sz="3600" b="0" kern="1200">
+                <a:solidFill>
+                  <a:schemeClr val="tx1"/>
+                </a:solidFill>
+                <a:effectLst>
+                  <a:outerShdw blurRad="38100" dist="38100" dir="2700000" algn="tl">
+                    <a:srgbClr val="000000">
+                      <a:alpha val="43137"/>
+                    </a:srgbClr>
+                  </a:outerShdw>
+                </a:effectLst>
+                <a:latin typeface="Rostelecom Basis Medium" panose="020B0603030604040103" pitchFamily="34" charset="0"/>
+                <a:ea typeface="+mj-ea"/>
+                <a:cs typeface="+mj-cs"/>
+              </a:defRPr>
+            </a:lvl1pPr>
+          </a:lstStyle>
+          <a:p>
+            <a:r>
               <a:rPr lang="ru-RU" b="1" dirty="0" smtClean="0">
                 <a:effectLst/>
                 <a:latin typeface="Arial" panose="020B0604020202020204" pitchFamily="34" charset="0"/>
@@ -4277,7 +5124,7 @@
 </p:sld>
 </file>
 
-<file path=ppt/slides/slide11.xml><?xml version="1.0" encoding="utf-8"?>
+<file path=ppt/slides/slide14.xml><?xml version="1.0" encoding="utf-8"?>
 <p:sld xmlns:a="http://schemas.openxmlformats.org/drawingml/2006/main" xmlns:r="http://schemas.openxmlformats.org/officeDocument/2006/relationships" xmlns:p="http://schemas.openxmlformats.org/presentationml/2006/main">
   <p:cSld>
     <p:bg>
@@ -6298,7 +7145,7 @@
         <p:spPr>
           <a:xfrm>
             <a:off x="439151" y="560538"/>
-            <a:ext cx="11160127" cy="523220"/>
+            <a:ext cx="11160127" cy="478144"/>
           </a:xfrm>
           <a:prstGeom prst="rect">
             <a:avLst/>
@@ -6336,14 +7183,22 @@
           </a:lstStyle>
           <a:p>
             <a:r>
-              <a:rPr lang="ru-RU" b="1" dirty="0" smtClean="0">
-                <a:effectLst/>
-                <a:latin typeface="Arial" panose="020B0604020202020204" pitchFamily="34" charset="0"/>
-                <a:cs typeface="Arial" panose="020B0604020202020204" pitchFamily="34" charset="0"/>
-              </a:rPr>
-              <a:t>Генерация датасета</a:t>
-            </a:r>
-            <a:endParaRPr lang="ru-RU" b="1" dirty="0">
+              <a:rPr lang="ru-RU" sz="3000" b="1" dirty="0" smtClean="0">
+                <a:effectLst/>
+                <a:latin typeface="Arial" panose="020B0604020202020204" pitchFamily="34" charset="0"/>
+                <a:cs typeface="Arial" panose="020B0604020202020204" pitchFamily="34" charset="0"/>
+              </a:rPr>
+              <a:t>Генерация </a:t>
+            </a:r>
+            <a:r>
+              <a:rPr lang="ru-RU" sz="3000" b="1" dirty="0" smtClean="0">
+                <a:effectLst/>
+                <a:latin typeface="Arial" panose="020B0604020202020204" pitchFamily="34" charset="0"/>
+                <a:cs typeface="Arial" panose="020B0604020202020204" pitchFamily="34" charset="0"/>
+              </a:rPr>
+              <a:t>датасета за предыдущую неделю</a:t>
+            </a:r>
+            <a:endParaRPr lang="ru-RU" sz="3000" b="1" dirty="0">
               <a:latin typeface="Arial" panose="020B0604020202020204" pitchFamily="34" charset="0"/>
               <a:cs typeface="Arial" panose="020B0604020202020204" pitchFamily="34" charset="0"/>
             </a:endParaRPr>
@@ -6382,7 +7237,7 @@
       </p:pic>
       <p:pic>
         <p:nvPicPr>
-          <p:cNvPr id="15" name="Рисунок 14"/>
+          <p:cNvPr id="16" name="Рисунок 15"/>
           <p:cNvPicPr>
             <a:picLocks noChangeAspect="1"/>
           </p:cNvPicPr>
@@ -6396,8 +7251,8 @@
         </p:blipFill>
         <p:spPr>
           <a:xfrm>
-            <a:off x="6508248" y="3134650"/>
-            <a:ext cx="5258534" cy="1181265"/>
+            <a:off x="6508248" y="4768416"/>
+            <a:ext cx="1781424" cy="1381318"/>
           </a:xfrm>
           <a:prstGeom prst="rect">
             <a:avLst/>
@@ -6411,7 +7266,7 @@
       </p:pic>
       <p:pic>
         <p:nvPicPr>
-          <p:cNvPr id="16" name="Рисунок 15"/>
+          <p:cNvPr id="17" name="Рисунок 16"/>
           <p:cNvPicPr>
             <a:picLocks noChangeAspect="1"/>
           </p:cNvPicPr>
@@ -6425,8 +7280,8 @@
         </p:blipFill>
         <p:spPr>
           <a:xfrm>
-            <a:off x="6508248" y="4768416"/>
-            <a:ext cx="1781424" cy="1381318"/>
+            <a:off x="8956515" y="4758890"/>
+            <a:ext cx="2810267" cy="1390844"/>
           </a:xfrm>
           <a:prstGeom prst="rect">
             <a:avLst/>
@@ -6440,7 +7295,7 @@
       </p:pic>
       <p:pic>
         <p:nvPicPr>
-          <p:cNvPr id="17" name="Рисунок 16"/>
+          <p:cNvPr id="8" name="Рисунок 7"/>
           <p:cNvPicPr>
             <a:picLocks noChangeAspect="1"/>
           </p:cNvPicPr>
@@ -6454,22 +7309,17 @@
         </p:blipFill>
         <p:spPr>
           <a:xfrm>
-            <a:off x="8956515" y="4758890"/>
-            <a:ext cx="2810267" cy="1390844"/>
+            <a:off x="6762147" y="1201656"/>
+            <a:ext cx="4620270" cy="1705213"/>
           </a:xfrm>
           <a:prstGeom prst="rect">
             <a:avLst/>
           </a:prstGeom>
-          <a:ln w="15875">
-            <a:solidFill>
-              <a:schemeClr val="accent1"/>
-            </a:solidFill>
-          </a:ln>
         </p:spPr>
       </p:pic>
       <p:pic>
         <p:nvPicPr>
-          <p:cNvPr id="8" name="Рисунок 7"/>
+          <p:cNvPr id="9" name="Рисунок 8"/>
           <p:cNvPicPr>
             <a:picLocks noChangeAspect="1"/>
           </p:cNvPicPr>
@@ -6483,8 +7333,8 @@
         </p:blipFill>
         <p:spPr>
           <a:xfrm>
-            <a:off x="6762147" y="1201656"/>
-            <a:ext cx="4620270" cy="1705213"/>
+            <a:off x="327587" y="1399642"/>
+            <a:ext cx="5891177" cy="2313184"/>
           </a:xfrm>
           <a:prstGeom prst="rect">
             <a:avLst/>
@@ -6493,7 +7343,7 @@
       </p:pic>
       <p:pic>
         <p:nvPicPr>
-          <p:cNvPr id="9" name="Рисунок 8"/>
+          <p:cNvPr id="14" name="Рисунок 13"/>
           <p:cNvPicPr>
             <a:picLocks noChangeAspect="1"/>
           </p:cNvPicPr>
@@ -6507,8 +7357,8 @@
         </p:blipFill>
         <p:spPr>
           <a:xfrm>
-            <a:off x="327587" y="1399642"/>
-            <a:ext cx="5891177" cy="2313184"/>
+            <a:off x="327587" y="3881316"/>
+            <a:ext cx="5877745" cy="2343477"/>
           </a:xfrm>
           <a:prstGeom prst="rect">
             <a:avLst/>
@@ -6517,7 +7367,7 @@
       </p:pic>
       <p:pic>
         <p:nvPicPr>
-          <p:cNvPr id="14" name="Рисунок 13"/>
+          <p:cNvPr id="3" name="Рисунок 2"/>
           <p:cNvPicPr>
             <a:picLocks noChangeAspect="1"/>
           </p:cNvPicPr>
@@ -6531,12 +7381,17 @@
         </p:blipFill>
         <p:spPr>
           <a:xfrm>
-            <a:off x="327587" y="3881316"/>
-            <a:ext cx="5877745" cy="2343477"/>
+            <a:off x="6508248" y="3024767"/>
+            <a:ext cx="5239481" cy="1190791"/>
           </a:xfrm>
           <a:prstGeom prst="rect">
             <a:avLst/>
           </a:prstGeom>
+          <a:ln w="15875">
+            <a:solidFill>
+              <a:schemeClr val="accent1"/>
+            </a:solidFill>
+          </a:ln>
         </p:spPr>
       </p:pic>
     </p:spTree>
@@ -6878,8 +7733,13 @@
             </a:r>
             <a:r>
               <a:rPr lang="ru-RU" dirty="0"/>
-              <a:t>пользователей интерактивного телевидения. Например:</a:t>
-            </a:r>
+              <a:t>пользователей интерактивного </a:t>
+            </a:r>
+            <a:r>
+              <a:rPr lang="ru-RU" dirty="0" smtClean="0"/>
+              <a:t>телевидения. Например:</a:t>
+            </a:r>
+            <a:endParaRPr lang="ru-RU" dirty="0"/>
           </a:p>
           <a:p>
             <a:pPr algn="just"/>
@@ -6951,24 +7811,8 @@
               <a:buNone/>
             </a:pPr>
             <a:r>
-              <a:rPr lang="ru-RU" b="1" dirty="0" smtClean="0"/>
-              <a:t>RT.Streaming</a:t>
-            </a:r>
-            <a:r>
-              <a:rPr lang="ru-RU" dirty="0"/>
-              <a:t> </a:t>
-            </a:r>
-            <a:r>
               <a:rPr lang="ru-RU" dirty="0" smtClean="0"/>
-              <a:t>- инструмент </a:t>
-            </a:r>
-            <a:r>
-              <a:rPr lang="ru-RU" dirty="0"/>
-              <a:t>для эффективного управления процессами изменения, выгрузки и загрузки данных, позволяющий настроить потоковую или пакетную обработку данных из различных источников</a:t>
-            </a:r>
-            <a:r>
-              <a:rPr lang="ru-RU" dirty="0" smtClean="0"/>
-              <a:t>. Состав компонентов:</a:t>
+              <a:t>Генерируем активность 10000 пользователей за текущий день.</a:t>
             </a:r>
             <a:endParaRPr lang="ru-RU" dirty="0"/>
           </a:p>
@@ -7140,7 +7984,7 @@
       </p:pic>
       <p:pic>
         <p:nvPicPr>
-          <p:cNvPr id="8" name="Рисунок 7"/>
+          <p:cNvPr id="5" name="Рисунок 4"/>
           <p:cNvPicPr>
             <a:picLocks noChangeAspect="1"/>
           </p:cNvPicPr>
@@ -7154,8 +7998,8 @@
         </p:blipFill>
         <p:spPr>
           <a:xfrm>
-            <a:off x="7466310" y="4498716"/>
-            <a:ext cx="2915057" cy="1857634"/>
+            <a:off x="6329082" y="2376917"/>
+            <a:ext cx="5342966" cy="3342058"/>
           </a:xfrm>
           <a:prstGeom prst="rect">
             <a:avLst/>
@@ -7268,7 +8112,7 @@
       </p:sp>
       <p:sp>
         <p:nvSpPr>
-          <p:cNvPr id="5" name="Заголовок 1">
+          <p:cNvPr id="6" name="Заголовок 1">
             <a:extLst>
               <a:ext uri="{FF2B5EF4-FFF2-40B4-BE49-F238E27FC236}">
                 <a16:creationId xmlns:a16="http://schemas.microsoft.com/office/drawing/2014/main" id="{26F3F6DE-0B95-4A88-A2DE-D547275A4F55}"/>
@@ -7282,119 +8126,8 @@
         </p:nvSpPr>
         <p:spPr>
           <a:xfrm>
-            <a:off x="439152" y="2920189"/>
-            <a:ext cx="11160127" cy="2051844"/>
-          </a:xfrm>
-          <a:prstGeom prst="rect">
-            <a:avLst/>
-          </a:prstGeom>
-        </p:spPr>
-        <p:txBody>
-          <a:bodyPr lIns="0" tIns="0" rIns="0" bIns="0" anchor="t" anchorCtr="0">
-            <a:spAutoFit/>
-          </a:bodyPr>
-          <a:lstStyle>
-            <a:defPPr>
-              <a:defRPr lang="ru-RU"/>
-            </a:defPPr>
-            <a:lvl1pPr>
-              <a:lnSpc>
-                <a:spcPts val="4000"/>
-              </a:lnSpc>
-              <a:spcBef>
-                <a:spcPct val="0"/>
-              </a:spcBef>
-              <a:buNone/>
-              <a:defRPr sz="2800" b="0">
-                <a:effectLst/>
-                <a:latin typeface="Rostelecom Basis Medium" panose="020B0603030604040103" pitchFamily="34" charset="0"/>
-                <a:ea typeface="+mj-ea"/>
-                <a:cs typeface="+mj-cs"/>
-              </a:defRPr>
-            </a:lvl1pPr>
-          </a:lstStyle>
-          <a:p>
-            <a:r>
-              <a:rPr lang="ru-RU" dirty="0" smtClean="0">
-                <a:latin typeface="Arial" panose="020B0604020202020204" pitchFamily="34" charset="0"/>
-                <a:cs typeface="Arial" panose="020B0604020202020204" pitchFamily="34" charset="0"/>
-              </a:rPr>
-              <a:t>На слайдах с решением расскажите о том</a:t>
-            </a:r>
-            <a:r>
-              <a:rPr lang="en-US" dirty="0" smtClean="0">
-                <a:latin typeface="Arial" panose="020B0604020202020204" pitchFamily="34" charset="0"/>
-                <a:cs typeface="Arial" panose="020B0604020202020204" pitchFamily="34" charset="0"/>
-              </a:rPr>
-              <a:t>,</a:t>
-            </a:r>
-            <a:r>
-              <a:rPr lang="ru-RU" dirty="0" smtClean="0">
-                <a:latin typeface="Arial" panose="020B0604020202020204" pitchFamily="34" charset="0"/>
-                <a:cs typeface="Arial" panose="020B0604020202020204" pitchFamily="34" charset="0"/>
-              </a:rPr>
-              <a:t> как вы решали поставленные задачи</a:t>
-            </a:r>
-            <a:r>
-              <a:rPr lang="en-US" dirty="0" smtClean="0">
-                <a:latin typeface="Arial" panose="020B0604020202020204" pitchFamily="34" charset="0"/>
-                <a:cs typeface="Arial" panose="020B0604020202020204" pitchFamily="34" charset="0"/>
-              </a:rPr>
-              <a:t>,</a:t>
-            </a:r>
-            <a:r>
-              <a:rPr lang="ru-RU" dirty="0" smtClean="0">
-                <a:latin typeface="Arial" panose="020B0604020202020204" pitchFamily="34" charset="0"/>
-                <a:cs typeface="Arial" panose="020B0604020202020204" pitchFamily="34" charset="0"/>
-              </a:rPr>
-              <a:t> что учитывали и что удалось сделать</a:t>
-            </a:r>
-            <a:r>
-              <a:rPr lang="en-US" dirty="0" smtClean="0">
-                <a:latin typeface="Arial" panose="020B0604020202020204" pitchFamily="34" charset="0"/>
-                <a:cs typeface="Arial" panose="020B0604020202020204" pitchFamily="34" charset="0"/>
-              </a:rPr>
-              <a:t>. </a:t>
-            </a:r>
-            <a:r>
-              <a:rPr lang="ru-RU" dirty="0" smtClean="0">
-                <a:latin typeface="Arial" panose="020B0604020202020204" pitchFamily="34" charset="0"/>
-                <a:cs typeface="Arial" panose="020B0604020202020204" pitchFamily="34" charset="0"/>
-              </a:rPr>
-              <a:t>Здесь можно дать ссылки на репозиторий или приложить некоторые скриншоты</a:t>
-            </a:r>
-            <a:r>
-              <a:rPr lang="en-US" dirty="0" smtClean="0">
-                <a:latin typeface="Arial" panose="020B0604020202020204" pitchFamily="34" charset="0"/>
-                <a:cs typeface="Arial" panose="020B0604020202020204" pitchFamily="34" charset="0"/>
-              </a:rPr>
-              <a:t>. </a:t>
-            </a:r>
-            <a:endParaRPr lang="ru-RU" dirty="0">
-              <a:latin typeface="Arial" panose="020B0604020202020204" pitchFamily="34" charset="0"/>
-              <a:cs typeface="Arial" panose="020B0604020202020204" pitchFamily="34" charset="0"/>
-            </a:endParaRPr>
-          </a:p>
-        </p:txBody>
-      </p:sp>
-      <p:sp>
-        <p:nvSpPr>
-          <p:cNvPr id="6" name="Заголовок 1">
-            <a:extLst>
-              <a:ext uri="{FF2B5EF4-FFF2-40B4-BE49-F238E27FC236}">
-                <a16:creationId xmlns:a16="http://schemas.microsoft.com/office/drawing/2014/main" id="{26F3F6DE-0B95-4A88-A2DE-D547275A4F55}"/>
-              </a:ext>
-            </a:extLst>
-          </p:cNvPr>
-          <p:cNvSpPr txBox="1">
-            <a:spLocks/>
-          </p:cNvSpPr>
-          <p:nvPr/>
-        </p:nvSpPr>
-        <p:spPr>
-          <a:xfrm>
             <a:off x="439151" y="560538"/>
-            <a:ext cx="11160127" cy="523220"/>
+            <a:ext cx="11160127" cy="465127"/>
           </a:xfrm>
           <a:prstGeom prst="rect">
             <a:avLst/>
@@ -7432,14 +8165,14 @@
           </a:lstStyle>
           <a:p>
             <a:r>
-              <a:rPr lang="ru-RU" b="1" dirty="0" smtClean="0">
-                <a:effectLst/>
-                <a:latin typeface="Arial" panose="020B0604020202020204" pitchFamily="34" charset="0"/>
-                <a:cs typeface="Arial" panose="020B0604020202020204" pitchFamily="34" charset="0"/>
-              </a:rPr>
-              <a:t>Решение</a:t>
-            </a:r>
-            <a:endParaRPr lang="ru-RU" b="1" dirty="0">
+              <a:rPr lang="ru-RU" sz="2600" dirty="0"/>
+              <a:t>Сбор данных с использованием </a:t>
+            </a:r>
+            <a:r>
+              <a:rPr lang="ru-RU" sz="2600" dirty="0" smtClean="0"/>
+              <a:t>RT.Streaming - код</a:t>
+            </a:r>
+            <a:endParaRPr lang="ru-RU" sz="2600" b="1" dirty="0">
               <a:latin typeface="Arial" panose="020B0604020202020204" pitchFamily="34" charset="0"/>
               <a:cs typeface="Arial" panose="020B0604020202020204" pitchFamily="34" charset="0"/>
             </a:endParaRPr>
@@ -7470,6 +8203,54 @@
           <a:xfrm>
             <a:off x="9464774" y="532515"/>
             <a:ext cx="2134504" cy="551243"/>
+          </a:xfrm>
+          <a:prstGeom prst="rect">
+            <a:avLst/>
+          </a:prstGeom>
+        </p:spPr>
+      </p:pic>
+      <p:pic>
+        <p:nvPicPr>
+          <p:cNvPr id="8" name="Рисунок 7"/>
+          <p:cNvPicPr>
+            <a:picLocks noChangeAspect="1"/>
+          </p:cNvPicPr>
+          <p:nvPr/>
+        </p:nvPicPr>
+        <p:blipFill>
+          <a:blip r:embed="rId3"/>
+          <a:stretch>
+            <a:fillRect/>
+          </a:stretch>
+        </p:blipFill>
+        <p:spPr>
+          <a:xfrm>
+            <a:off x="439151" y="1228166"/>
+            <a:ext cx="5317281" cy="4484454"/>
+          </a:xfrm>
+          <a:prstGeom prst="rect">
+            <a:avLst/>
+          </a:prstGeom>
+        </p:spPr>
+      </p:pic>
+      <p:pic>
+        <p:nvPicPr>
+          <p:cNvPr id="9" name="Рисунок 8"/>
+          <p:cNvPicPr>
+            <a:picLocks noChangeAspect="1"/>
+          </p:cNvPicPr>
+          <p:nvPr/>
+        </p:nvPicPr>
+        <p:blipFill>
+          <a:blip r:embed="rId4"/>
+          <a:stretch>
+            <a:fillRect/>
+          </a:stretch>
+        </p:blipFill>
+        <p:spPr>
+          <a:xfrm>
+            <a:off x="5923110" y="1228167"/>
+            <a:ext cx="5592553" cy="4484454"/>
           </a:xfrm>
           <a:prstGeom prst="rect">
             <a:avLst/>
@@ -7596,15 +8377,15 @@
         </p:nvSpPr>
         <p:spPr>
           <a:xfrm>
-            <a:off x="439152" y="2920189"/>
-            <a:ext cx="11160127" cy="979435"/>
+            <a:off x="107458" y="1512731"/>
+            <a:ext cx="11491820" cy="1154162"/>
           </a:xfrm>
           <a:prstGeom prst="rect">
             <a:avLst/>
           </a:prstGeom>
         </p:spPr>
         <p:txBody>
-          <a:bodyPr lIns="0" tIns="0" rIns="0" bIns="0" anchor="t" anchorCtr="0">
+          <a:bodyPr wrap="square" lIns="0" tIns="0" rIns="0" bIns="0" anchor="t" anchorCtr="0">
             <a:spAutoFit/>
           </a:bodyPr>
           <a:lstStyle>
@@ -7628,26 +8409,31 @@
             </a:lvl1pPr>
           </a:lstStyle>
           <a:p>
-            <a:r>
-              <a:rPr lang="ru-RU" dirty="0" smtClean="0">
-                <a:latin typeface="Arial" panose="020B0604020202020204" pitchFamily="34" charset="0"/>
-                <a:cs typeface="Arial" panose="020B0604020202020204" pitchFamily="34" charset="0"/>
-              </a:rPr>
-              <a:t>Основные итоги вашей работы</a:t>
-            </a:r>
-            <a:r>
-              <a:rPr lang="en-US" dirty="0" smtClean="0">
-                <a:latin typeface="Arial" panose="020B0604020202020204" pitchFamily="34" charset="0"/>
-                <a:cs typeface="Arial" panose="020B0604020202020204" pitchFamily="34" charset="0"/>
-              </a:rPr>
-              <a:t>,</a:t>
-            </a:r>
-            <a:r>
-              <a:rPr lang="ru-RU" dirty="0" smtClean="0">
-                <a:latin typeface="Arial" panose="020B0604020202020204" pitchFamily="34" charset="0"/>
-                <a:cs typeface="Arial" panose="020B0604020202020204" pitchFamily="34" charset="0"/>
-              </a:rPr>
-              <a:t> инсайты после работы с данными и графики</a:t>
+            <a:pPr marL="342000" algn="just">
+              <a:lnSpc>
+                <a:spcPts val="3000"/>
+              </a:lnSpc>
+            </a:pPr>
+            <a:r>
+              <a:rPr lang="ru-RU" dirty="0">
+                <a:latin typeface="Arial" panose="020B0604020202020204" pitchFamily="34" charset="0"/>
+                <a:cs typeface="Arial" panose="020B0604020202020204" pitchFamily="34" charset="0"/>
+              </a:rPr>
+              <a:t>Создание потребителя на Python для RT.Streaming, который будет читать данные и сохранять их в HDFS для долгосрочного хранения в формате </a:t>
+            </a:r>
+            <a:r>
+              <a:rPr lang="en-US" dirty="0">
+                <a:latin typeface="Arial" panose="020B0604020202020204" pitchFamily="34" charset="0"/>
+                <a:cs typeface="Arial" panose="020B0604020202020204" pitchFamily="34" charset="0"/>
+              </a:rPr>
+              <a:t>CSV</a:t>
+            </a:r>
+            <a:r>
+              <a:rPr lang="ru-RU" dirty="0">
+                <a:latin typeface="Arial" panose="020B0604020202020204" pitchFamily="34" charset="0"/>
+                <a:cs typeface="Arial" panose="020B0604020202020204" pitchFamily="34" charset="0"/>
+              </a:rPr>
+              <a:t>.</a:t>
             </a:r>
             <a:endParaRPr lang="ru-RU" dirty="0">
               <a:latin typeface="Arial" panose="020B0604020202020204" pitchFamily="34" charset="0"/>
@@ -7673,7 +8459,7 @@
         <p:spPr>
           <a:xfrm>
             <a:off x="439151" y="560538"/>
-            <a:ext cx="11160127" cy="523220"/>
+            <a:ext cx="11160127" cy="512961"/>
           </a:xfrm>
           <a:prstGeom prst="rect">
             <a:avLst/>
@@ -7711,12 +8497,20 @@
           </a:lstStyle>
           <a:p>
             <a:r>
-              <a:rPr lang="ru-RU" b="1" dirty="0">
-                <a:effectLst/>
-                <a:latin typeface="Arial" panose="020B0604020202020204" pitchFamily="34" charset="0"/>
-                <a:cs typeface="Arial" panose="020B0604020202020204" pitchFamily="34" charset="0"/>
-              </a:rPr>
-              <a:t>Итоги и инсайты</a:t>
+              <a:rPr lang="ru-RU" dirty="0">
+                <a:effectLst/>
+                <a:latin typeface="Arial" panose="020B0604020202020204" pitchFamily="34" charset="0"/>
+                <a:cs typeface="Arial" panose="020B0604020202020204" pitchFamily="34" charset="0"/>
+              </a:rPr>
+              <a:t>Хранение сырых данных в</a:t>
+            </a:r>
+            <a:r>
+              <a:rPr lang="en-US" dirty="0">
+                <a:effectLst/>
+                <a:latin typeface="Arial" panose="020B0604020202020204" pitchFamily="34" charset="0"/>
+                <a:cs typeface="Arial" panose="020B0604020202020204" pitchFamily="34" charset="0"/>
+              </a:rPr>
+              <a:t> RT.DataLake</a:t>
             </a:r>
             <a:endParaRPr lang="ru-RU" b="1" dirty="0">
               <a:latin typeface="Arial" panose="020B0604020202020204" pitchFamily="34" charset="0"/>
@@ -7755,10 +8549,34 @@
           </a:prstGeom>
         </p:spPr>
       </p:pic>
+      <p:pic>
+        <p:nvPicPr>
+          <p:cNvPr id="3" name="Рисунок 2"/>
+          <p:cNvPicPr>
+            <a:picLocks noChangeAspect="1"/>
+          </p:cNvPicPr>
+          <p:nvPr/>
+        </p:nvPicPr>
+        <p:blipFill>
+          <a:blip r:embed="rId3"/>
+          <a:stretch>
+            <a:fillRect/>
+          </a:stretch>
+        </p:blipFill>
+        <p:spPr>
+          <a:xfrm>
+            <a:off x="515939" y="2662928"/>
+            <a:ext cx="11021963" cy="3734321"/>
+          </a:xfrm>
+          <a:prstGeom prst="rect">
+            <a:avLst/>
+          </a:prstGeom>
+        </p:spPr>
+      </p:pic>
     </p:spTree>
     <p:extLst>
       <p:ext uri="{BB962C8B-B14F-4D97-AF65-F5344CB8AC3E}">
-        <p14:creationId xmlns:p14="http://schemas.microsoft.com/office/powerpoint/2010/main" val="921795148"/>
+        <p14:creationId xmlns:p14="http://schemas.microsoft.com/office/powerpoint/2010/main" val="2207802164"/>
       </p:ext>
     </p:extLst>
   </p:cSld>

</xml_diff>

<commit_message>
doc: update presentation for task 3 Hive
</commit_message>
<xml_diff>
--- a/Сertification/presentation.pptx
+++ b/Сertification/presentation.pptx
@@ -5,7 +5,7 @@
     <p:sldMasterId id="2147483648" r:id="rId1"/>
   </p:sldMasterIdLst>
   <p:notesMasterIdLst>
-    <p:notesMasterId r:id="rId16"/>
+    <p:notesMasterId r:id="rId20"/>
   </p:notesMasterIdLst>
   <p:sldIdLst>
     <p:sldId id="281" r:id="rId2"/>
@@ -19,9 +19,13 @@
     <p:sldId id="297" r:id="rId10"/>
     <p:sldId id="295" r:id="rId11"/>
     <p:sldId id="296" r:id="rId12"/>
-    <p:sldId id="288" r:id="rId13"/>
-    <p:sldId id="291" r:id="rId14"/>
-    <p:sldId id="289" r:id="rId15"/>
+    <p:sldId id="302" r:id="rId13"/>
+    <p:sldId id="303" r:id="rId14"/>
+    <p:sldId id="299" r:id="rId15"/>
+    <p:sldId id="298" r:id="rId16"/>
+    <p:sldId id="288" r:id="rId17"/>
+    <p:sldId id="291" r:id="rId18"/>
+    <p:sldId id="289" r:id="rId19"/>
   </p:sldIdLst>
   <p:sldSz cx="12192000" cy="6858000"/>
   <p:notesSz cx="6858000" cy="9144000"/>
@@ -4232,7 +4236,7 @@
         </p:nvSpPr>
         <p:spPr>
           <a:xfrm>
-            <a:off x="515939" y="6393284"/>
+            <a:off x="524435" y="6383617"/>
             <a:ext cx="2743200" cy="365125"/>
           </a:xfrm>
           <a:prstGeom prst="rect">
@@ -4275,7 +4279,7 @@
       </p:sp>
       <p:sp>
         <p:nvSpPr>
-          <p:cNvPr id="5" name="Заголовок 1">
+          <p:cNvPr id="6" name="Заголовок 1">
             <a:extLst>
               <a:ext uri="{FF2B5EF4-FFF2-40B4-BE49-F238E27FC236}">
                 <a16:creationId xmlns:a16="http://schemas.microsoft.com/office/drawing/2014/main" id="{26F3F6DE-0B95-4A88-A2DE-D547275A4F55}"/>
@@ -4289,119 +4293,8 @@
         </p:nvSpPr>
         <p:spPr>
           <a:xfrm>
-            <a:off x="439152" y="2920189"/>
-            <a:ext cx="11160127" cy="2051844"/>
-          </a:xfrm>
-          <a:prstGeom prst="rect">
-            <a:avLst/>
-          </a:prstGeom>
-        </p:spPr>
-        <p:txBody>
-          <a:bodyPr lIns="0" tIns="0" rIns="0" bIns="0" anchor="t" anchorCtr="0">
-            <a:spAutoFit/>
-          </a:bodyPr>
-          <a:lstStyle>
-            <a:defPPr>
-              <a:defRPr lang="ru-RU"/>
-            </a:defPPr>
-            <a:lvl1pPr>
-              <a:lnSpc>
-                <a:spcPts val="4000"/>
-              </a:lnSpc>
-              <a:spcBef>
-                <a:spcPct val="0"/>
-              </a:spcBef>
-              <a:buNone/>
-              <a:defRPr sz="2800" b="0">
-                <a:effectLst/>
-                <a:latin typeface="Rostelecom Basis Medium" panose="020B0603030604040103" pitchFamily="34" charset="0"/>
-                <a:ea typeface="+mj-ea"/>
-                <a:cs typeface="+mj-cs"/>
-              </a:defRPr>
-            </a:lvl1pPr>
-          </a:lstStyle>
-          <a:p>
-            <a:r>
-              <a:rPr lang="ru-RU" dirty="0" smtClean="0">
-                <a:latin typeface="Arial" panose="020B0604020202020204" pitchFamily="34" charset="0"/>
-                <a:cs typeface="Arial" panose="020B0604020202020204" pitchFamily="34" charset="0"/>
-              </a:rPr>
-              <a:t>На слайдах с решением расскажите о том</a:t>
-            </a:r>
-            <a:r>
-              <a:rPr lang="en-US" dirty="0" smtClean="0">
-                <a:latin typeface="Arial" panose="020B0604020202020204" pitchFamily="34" charset="0"/>
-                <a:cs typeface="Arial" panose="020B0604020202020204" pitchFamily="34" charset="0"/>
-              </a:rPr>
-              <a:t>,</a:t>
-            </a:r>
-            <a:r>
-              <a:rPr lang="ru-RU" dirty="0" smtClean="0">
-                <a:latin typeface="Arial" panose="020B0604020202020204" pitchFamily="34" charset="0"/>
-                <a:cs typeface="Arial" panose="020B0604020202020204" pitchFamily="34" charset="0"/>
-              </a:rPr>
-              <a:t> как вы решали поставленные задачи</a:t>
-            </a:r>
-            <a:r>
-              <a:rPr lang="en-US" dirty="0" smtClean="0">
-                <a:latin typeface="Arial" panose="020B0604020202020204" pitchFamily="34" charset="0"/>
-                <a:cs typeface="Arial" panose="020B0604020202020204" pitchFamily="34" charset="0"/>
-              </a:rPr>
-              <a:t>,</a:t>
-            </a:r>
-            <a:r>
-              <a:rPr lang="ru-RU" dirty="0" smtClean="0">
-                <a:latin typeface="Arial" panose="020B0604020202020204" pitchFamily="34" charset="0"/>
-                <a:cs typeface="Arial" panose="020B0604020202020204" pitchFamily="34" charset="0"/>
-              </a:rPr>
-              <a:t> что учитывали и что удалось сделать</a:t>
-            </a:r>
-            <a:r>
-              <a:rPr lang="en-US" dirty="0" smtClean="0">
-                <a:latin typeface="Arial" panose="020B0604020202020204" pitchFamily="34" charset="0"/>
-                <a:cs typeface="Arial" panose="020B0604020202020204" pitchFamily="34" charset="0"/>
-              </a:rPr>
-              <a:t>. </a:t>
-            </a:r>
-            <a:r>
-              <a:rPr lang="ru-RU" dirty="0" smtClean="0">
-                <a:latin typeface="Arial" panose="020B0604020202020204" pitchFamily="34" charset="0"/>
-                <a:cs typeface="Arial" panose="020B0604020202020204" pitchFamily="34" charset="0"/>
-              </a:rPr>
-              <a:t>Здесь можно дать ссылки на репозиторий или приложить некоторые скриншоты</a:t>
-            </a:r>
-            <a:r>
-              <a:rPr lang="en-US" dirty="0" smtClean="0">
-                <a:latin typeface="Arial" panose="020B0604020202020204" pitchFamily="34" charset="0"/>
-                <a:cs typeface="Arial" panose="020B0604020202020204" pitchFamily="34" charset="0"/>
-              </a:rPr>
-              <a:t>. </a:t>
-            </a:r>
-            <a:endParaRPr lang="ru-RU" dirty="0">
-              <a:latin typeface="Arial" panose="020B0604020202020204" pitchFamily="34" charset="0"/>
-              <a:cs typeface="Arial" panose="020B0604020202020204" pitchFamily="34" charset="0"/>
-            </a:endParaRPr>
-          </a:p>
-        </p:txBody>
-      </p:sp>
-      <p:sp>
-        <p:nvSpPr>
-          <p:cNvPr id="6" name="Заголовок 1">
-            <a:extLst>
-              <a:ext uri="{FF2B5EF4-FFF2-40B4-BE49-F238E27FC236}">
-                <a16:creationId xmlns:a16="http://schemas.microsoft.com/office/drawing/2014/main" id="{26F3F6DE-0B95-4A88-A2DE-D547275A4F55}"/>
-              </a:ext>
-            </a:extLst>
-          </p:cNvPr>
-          <p:cNvSpPr txBox="1">
-            <a:spLocks/>
-          </p:cNvSpPr>
-          <p:nvPr/>
-        </p:nvSpPr>
-        <p:spPr>
-          <a:xfrm>
             <a:off x="439151" y="560538"/>
-            <a:ext cx="11160127" cy="523220"/>
+            <a:ext cx="11160127" cy="1025922"/>
           </a:xfrm>
           <a:prstGeom prst="rect">
             <a:avLst/>
@@ -4439,14 +4332,57 @@
           </a:lstStyle>
           <a:p>
             <a:r>
-              <a:rPr lang="ru-RU" b="1" dirty="0" smtClean="0">
-                <a:effectLst/>
-                <a:latin typeface="Arial" panose="020B0604020202020204" pitchFamily="34" charset="0"/>
-                <a:cs typeface="Arial" panose="020B0604020202020204" pitchFamily="34" charset="0"/>
-              </a:rPr>
-              <a:t>Решение</a:t>
-            </a:r>
-            <a:endParaRPr lang="ru-RU" b="1" dirty="0">
+              <a:rPr lang="ru-RU" sz="2800" dirty="0">
+                <a:effectLst/>
+                <a:latin typeface="Arial" panose="020B0604020202020204" pitchFamily="34" charset="0"/>
+                <a:cs typeface="Arial" panose="020B0604020202020204" pitchFamily="34" charset="0"/>
+              </a:rPr>
+              <a:t>Обработка и агрегация данных с </a:t>
+            </a:r>
+            <a:r>
+              <a:rPr lang="ru-RU" sz="2800" dirty="0" smtClean="0">
+                <a:effectLst/>
+                <a:latin typeface="Arial" panose="020B0604020202020204" pitchFamily="34" charset="0"/>
+                <a:cs typeface="Arial" panose="020B0604020202020204" pitchFamily="34" charset="0"/>
+              </a:rPr>
+              <a:t>использованием</a:t>
+            </a:r>
+          </a:p>
+          <a:p>
+            <a:r>
+              <a:rPr lang="ru-RU" sz="2800" dirty="0" smtClean="0">
+                <a:effectLst/>
+                <a:latin typeface="Arial" panose="020B0604020202020204" pitchFamily="34" charset="0"/>
+                <a:cs typeface="Arial" panose="020B0604020202020204" pitchFamily="34" charset="0"/>
+              </a:rPr>
+              <a:t>Apache </a:t>
+            </a:r>
+            <a:r>
+              <a:rPr lang="ru-RU" sz="2800" dirty="0">
+                <a:effectLst/>
+                <a:latin typeface="Arial" panose="020B0604020202020204" pitchFamily="34" charset="0"/>
+                <a:cs typeface="Arial" panose="020B0604020202020204" pitchFamily="34" charset="0"/>
+              </a:rPr>
+              <a:t>Hive </a:t>
+            </a:r>
+            <a:r>
+              <a:rPr lang="ru-RU" sz="2800" dirty="0">
+                <a:effectLst/>
+                <a:latin typeface="Arial" panose="020B0604020202020204" pitchFamily="34" charset="0"/>
+                <a:cs typeface="Arial" panose="020B0604020202020204" pitchFamily="34" charset="0"/>
+              </a:rPr>
+              <a:t>в</a:t>
+            </a:r>
+            <a:r>
+              <a:rPr lang="en-US" sz="2800" dirty="0">
+                <a:effectLst/>
+                <a:latin typeface="Arial" panose="020B0604020202020204" pitchFamily="34" charset="0"/>
+                <a:cs typeface="Arial" panose="020B0604020202020204" pitchFamily="34" charset="0"/>
+              </a:rPr>
+              <a:t> RT.DataLake</a:t>
+            </a:r>
+            <a:endParaRPr lang="ru-RU" sz="2800" dirty="0">
+              <a:effectLst/>
               <a:latin typeface="Arial" panose="020B0604020202020204" pitchFamily="34" charset="0"/>
               <a:cs typeface="Arial" panose="020B0604020202020204" pitchFamily="34" charset="0"/>
             </a:endParaRPr>
@@ -4477,6 +4413,107 @@
           <a:xfrm>
             <a:off x="9464774" y="532515"/>
             <a:ext cx="2134504" cy="551243"/>
+          </a:xfrm>
+          <a:prstGeom prst="rect">
+            <a:avLst/>
+          </a:prstGeom>
+        </p:spPr>
+      </p:pic>
+      <p:pic>
+        <p:nvPicPr>
+          <p:cNvPr id="10" name="Рисунок 9"/>
+          <p:cNvPicPr>
+            <a:picLocks noChangeAspect="1"/>
+          </p:cNvPicPr>
+          <p:nvPr/>
+        </p:nvPicPr>
+        <p:blipFill>
+          <a:blip r:embed="rId3"/>
+          <a:stretch>
+            <a:fillRect/>
+          </a:stretch>
+        </p:blipFill>
+        <p:spPr>
+          <a:xfrm>
+            <a:off x="439151" y="2252527"/>
+            <a:ext cx="8783276" cy="2505425"/>
+          </a:xfrm>
+          <a:prstGeom prst="rect">
+            <a:avLst/>
+          </a:prstGeom>
+        </p:spPr>
+      </p:pic>
+      <p:sp>
+        <p:nvSpPr>
+          <p:cNvPr id="12" name="Прямоугольник 11"/>
+          <p:cNvSpPr/>
+          <p:nvPr/>
+        </p:nvSpPr>
+        <p:spPr>
+          <a:xfrm>
+            <a:off x="350444" y="1783244"/>
+            <a:ext cx="3621761" cy="369332"/>
+          </a:xfrm>
+          <a:prstGeom prst="rect">
+            <a:avLst/>
+          </a:prstGeom>
+        </p:spPr>
+        <p:txBody>
+          <a:bodyPr wrap="none">
+            <a:spAutoFit/>
+          </a:bodyPr>
+          <a:lstStyle/>
+          <a:p>
+            <a:r>
+              <a:rPr lang="ru-RU" dirty="0" smtClean="0">
+                <a:latin typeface="Arial" panose="020B0604020202020204" pitchFamily="34" charset="0"/>
+                <a:cs typeface="Arial" panose="020B0604020202020204" pitchFamily="34" charset="0"/>
+              </a:rPr>
+              <a:t>Создаем таблицы </a:t>
+            </a:r>
+            <a:r>
+              <a:rPr lang="ru-RU" dirty="0">
+                <a:latin typeface="Arial" panose="020B0604020202020204" pitchFamily="34" charset="0"/>
+                <a:cs typeface="Arial" panose="020B0604020202020204" pitchFamily="34" charset="0"/>
+              </a:rPr>
+              <a:t>Hive </a:t>
+            </a:r>
+            <a:r>
+              <a:rPr lang="ru-RU" dirty="0" smtClean="0">
+                <a:latin typeface="Arial" panose="020B0604020202020204" pitchFamily="34" charset="0"/>
+                <a:cs typeface="Arial" panose="020B0604020202020204" pitchFamily="34" charset="0"/>
+              </a:rPr>
+              <a:t>из </a:t>
+            </a:r>
+            <a:r>
+              <a:rPr lang="ru-RU" dirty="0">
+                <a:latin typeface="Arial" panose="020B0604020202020204" pitchFamily="34" charset="0"/>
+                <a:cs typeface="Arial" panose="020B0604020202020204" pitchFamily="34" charset="0"/>
+              </a:rPr>
+              <a:t>HDFS</a:t>
+            </a:r>
+            <a:endParaRPr lang="ru-RU" dirty="0"/>
+          </a:p>
+        </p:txBody>
+      </p:sp>
+      <p:pic>
+        <p:nvPicPr>
+          <p:cNvPr id="13" name="Рисунок 12"/>
+          <p:cNvPicPr>
+            <a:picLocks noChangeAspect="1"/>
+          </p:cNvPicPr>
+          <p:nvPr/>
+        </p:nvPicPr>
+        <p:blipFill>
+          <a:blip r:embed="rId4"/>
+          <a:stretch>
+            <a:fillRect/>
+          </a:stretch>
+        </p:blipFill>
+        <p:spPr>
+          <a:xfrm>
+            <a:off x="2322998" y="5022167"/>
+            <a:ext cx="7392432" cy="1276528"/>
           </a:xfrm>
           <a:prstGeom prst="rect">
             <a:avLst/>
@@ -4589,7 +4626,7 @@
       </p:sp>
       <p:sp>
         <p:nvSpPr>
-          <p:cNvPr id="5" name="Заголовок 1">
+          <p:cNvPr id="6" name="Заголовок 1">
             <a:extLst>
               <a:ext uri="{FF2B5EF4-FFF2-40B4-BE49-F238E27FC236}">
                 <a16:creationId xmlns:a16="http://schemas.microsoft.com/office/drawing/2014/main" id="{26F3F6DE-0B95-4A88-A2DE-D547275A4F55}"/>
@@ -4603,84 +4640,8 @@
         </p:nvSpPr>
         <p:spPr>
           <a:xfrm>
-            <a:off x="439152" y="2920189"/>
-            <a:ext cx="11160127" cy="979435"/>
-          </a:xfrm>
-          <a:prstGeom prst="rect">
-            <a:avLst/>
-          </a:prstGeom>
-        </p:spPr>
-        <p:txBody>
-          <a:bodyPr lIns="0" tIns="0" rIns="0" bIns="0" anchor="t" anchorCtr="0">
-            <a:spAutoFit/>
-          </a:bodyPr>
-          <a:lstStyle>
-            <a:defPPr>
-              <a:defRPr lang="ru-RU"/>
-            </a:defPPr>
-            <a:lvl1pPr>
-              <a:lnSpc>
-                <a:spcPts val="4000"/>
-              </a:lnSpc>
-              <a:spcBef>
-                <a:spcPct val="0"/>
-              </a:spcBef>
-              <a:buNone/>
-              <a:defRPr sz="2800" b="0">
-                <a:effectLst/>
-                <a:latin typeface="Rostelecom Basis Medium" panose="020B0603030604040103" pitchFamily="34" charset="0"/>
-                <a:ea typeface="+mj-ea"/>
-                <a:cs typeface="+mj-cs"/>
-              </a:defRPr>
-            </a:lvl1pPr>
-          </a:lstStyle>
-          <a:p>
-            <a:r>
-              <a:rPr lang="ru-RU" dirty="0" smtClean="0">
-                <a:latin typeface="Arial" panose="020B0604020202020204" pitchFamily="34" charset="0"/>
-                <a:cs typeface="Arial" panose="020B0604020202020204" pitchFamily="34" charset="0"/>
-              </a:rPr>
-              <a:t>Основные итоги вашей работы</a:t>
-            </a:r>
-            <a:r>
-              <a:rPr lang="en-US" dirty="0" smtClean="0">
-                <a:latin typeface="Arial" panose="020B0604020202020204" pitchFamily="34" charset="0"/>
-                <a:cs typeface="Arial" panose="020B0604020202020204" pitchFamily="34" charset="0"/>
-              </a:rPr>
-              <a:t>,</a:t>
-            </a:r>
-            <a:r>
-              <a:rPr lang="ru-RU" dirty="0" smtClean="0">
-                <a:latin typeface="Arial" panose="020B0604020202020204" pitchFamily="34" charset="0"/>
-                <a:cs typeface="Arial" panose="020B0604020202020204" pitchFamily="34" charset="0"/>
-              </a:rPr>
-              <a:t> инсайты после работы с данными и графики</a:t>
-            </a:r>
-            <a:endParaRPr lang="ru-RU" dirty="0">
-              <a:latin typeface="Arial" panose="020B0604020202020204" pitchFamily="34" charset="0"/>
-              <a:cs typeface="Arial" panose="020B0604020202020204" pitchFamily="34" charset="0"/>
-            </a:endParaRPr>
-          </a:p>
-        </p:txBody>
-      </p:sp>
-      <p:sp>
-        <p:nvSpPr>
-          <p:cNvPr id="6" name="Заголовок 1">
-            <a:extLst>
-              <a:ext uri="{FF2B5EF4-FFF2-40B4-BE49-F238E27FC236}">
-                <a16:creationId xmlns:a16="http://schemas.microsoft.com/office/drawing/2014/main" id="{26F3F6DE-0B95-4A88-A2DE-D547275A4F55}"/>
-              </a:ext>
-            </a:extLst>
-          </p:cNvPr>
-          <p:cNvSpPr txBox="1">
-            <a:spLocks/>
-          </p:cNvSpPr>
-          <p:nvPr/>
-        </p:nvSpPr>
-        <p:spPr>
-          <a:xfrm>
             <a:off x="439151" y="560538"/>
-            <a:ext cx="11160127" cy="523220"/>
+            <a:ext cx="11160127" cy="1025922"/>
           </a:xfrm>
           <a:prstGeom prst="rect">
             <a:avLst/>
@@ -4718,14 +4679,33 @@
           </a:lstStyle>
           <a:p>
             <a:r>
-              <a:rPr lang="ru-RU" b="1" dirty="0">
-                <a:effectLst/>
-                <a:latin typeface="Arial" panose="020B0604020202020204" pitchFamily="34" charset="0"/>
-                <a:cs typeface="Arial" panose="020B0604020202020204" pitchFamily="34" charset="0"/>
-              </a:rPr>
-              <a:t>Итоги и инсайты</a:t>
-            </a:r>
-            <a:endParaRPr lang="ru-RU" b="1" dirty="0">
+              <a:rPr lang="ru-RU" sz="2800" dirty="0">
+                <a:effectLst/>
+                <a:latin typeface="Arial" panose="020B0604020202020204" pitchFamily="34" charset="0"/>
+                <a:cs typeface="Arial" panose="020B0604020202020204" pitchFamily="34" charset="0"/>
+              </a:rPr>
+              <a:t>Обработка и агрегация данных с использованием</a:t>
+            </a:r>
+          </a:p>
+          <a:p>
+            <a:r>
+              <a:rPr lang="ru-RU" sz="2800" dirty="0">
+                <a:effectLst/>
+                <a:latin typeface="Arial" panose="020B0604020202020204" pitchFamily="34" charset="0"/>
+                <a:cs typeface="Arial" panose="020B0604020202020204" pitchFamily="34" charset="0"/>
+              </a:rPr>
+              <a:t>Apache Hive в</a:t>
+            </a:r>
+            <a:r>
+              <a:rPr lang="en-US" sz="2800" dirty="0">
+                <a:effectLst/>
+                <a:latin typeface="Arial" panose="020B0604020202020204" pitchFamily="34" charset="0"/>
+                <a:cs typeface="Arial" panose="020B0604020202020204" pitchFamily="34" charset="0"/>
+              </a:rPr>
+              <a:t> RT.DataLake</a:t>
+            </a:r>
+            <a:endParaRPr lang="ru-RU" sz="2800" dirty="0">
+              <a:effectLst/>
               <a:latin typeface="Arial" panose="020B0604020202020204" pitchFamily="34" charset="0"/>
               <a:cs typeface="Arial" panose="020B0604020202020204" pitchFamily="34" charset="0"/>
             </a:endParaRPr>
@@ -4762,10 +4742,58 @@
           </a:prstGeom>
         </p:spPr>
       </p:pic>
+      <p:pic>
+        <p:nvPicPr>
+          <p:cNvPr id="2" name="Рисунок 1"/>
+          <p:cNvPicPr>
+            <a:picLocks noChangeAspect="1"/>
+          </p:cNvPicPr>
+          <p:nvPr/>
+        </p:nvPicPr>
+        <p:blipFill>
+          <a:blip r:embed="rId3"/>
+          <a:stretch>
+            <a:fillRect/>
+          </a:stretch>
+        </p:blipFill>
+        <p:spPr>
+          <a:xfrm>
+            <a:off x="1494783" y="1623760"/>
+            <a:ext cx="9202434" cy="3610479"/>
+          </a:xfrm>
+          <a:prstGeom prst="rect">
+            <a:avLst/>
+          </a:prstGeom>
+        </p:spPr>
+      </p:pic>
+      <p:pic>
+        <p:nvPicPr>
+          <p:cNvPr id="4" name="Рисунок 3"/>
+          <p:cNvPicPr>
+            <a:picLocks noChangeAspect="1"/>
+          </p:cNvPicPr>
+          <p:nvPr/>
+        </p:nvPicPr>
+        <p:blipFill>
+          <a:blip r:embed="rId4"/>
+          <a:stretch>
+            <a:fillRect/>
+          </a:stretch>
+        </p:blipFill>
+        <p:spPr>
+          <a:xfrm>
+            <a:off x="1985389" y="5290423"/>
+            <a:ext cx="8221222" cy="1200318"/>
+          </a:xfrm>
+          <a:prstGeom prst="rect">
+            <a:avLst/>
+          </a:prstGeom>
+        </p:spPr>
+      </p:pic>
     </p:spTree>
     <p:extLst>
       <p:ext uri="{BB962C8B-B14F-4D97-AF65-F5344CB8AC3E}">
-        <p14:creationId xmlns:p14="http://schemas.microsoft.com/office/powerpoint/2010/main" val="921795148"/>
+        <p14:creationId xmlns:p14="http://schemas.microsoft.com/office/powerpoint/2010/main" val="3607580541"/>
       </p:ext>
     </p:extLst>
   </p:cSld>
@@ -4868,7 +4896,7 @@
       </p:sp>
       <p:sp>
         <p:nvSpPr>
-          <p:cNvPr id="5" name="Заголовок 1">
+          <p:cNvPr id="6" name="Заголовок 1">
             <a:extLst>
               <a:ext uri="{FF2B5EF4-FFF2-40B4-BE49-F238E27FC236}">
                 <a16:creationId xmlns:a16="http://schemas.microsoft.com/office/drawing/2014/main" id="{26F3F6DE-0B95-4A88-A2DE-D547275A4F55}"/>
@@ -4882,147 +4910,8 @@
         </p:nvSpPr>
         <p:spPr>
           <a:xfrm>
-            <a:off x="439151" y="1333436"/>
-            <a:ext cx="11160127" cy="1538883"/>
-          </a:xfrm>
-          <a:prstGeom prst="rect">
-            <a:avLst/>
-          </a:prstGeom>
-        </p:spPr>
-        <p:txBody>
-          <a:bodyPr lIns="0" tIns="0" rIns="0" bIns="0" anchor="t" anchorCtr="0">
-            <a:spAutoFit/>
-          </a:bodyPr>
-          <a:lstStyle>
-            <a:defPPr>
-              <a:defRPr lang="ru-RU"/>
-            </a:defPPr>
-            <a:lvl1pPr>
-              <a:lnSpc>
-                <a:spcPts val="4000"/>
-              </a:lnSpc>
-              <a:spcBef>
-                <a:spcPct val="0"/>
-              </a:spcBef>
-              <a:buNone/>
-              <a:defRPr sz="2800" b="0">
-                <a:effectLst/>
-                <a:latin typeface="Rostelecom Basis Medium" panose="020B0603030604040103" pitchFamily="34" charset="0"/>
-                <a:ea typeface="+mj-ea"/>
-                <a:cs typeface="+mj-cs"/>
-              </a:defRPr>
-            </a:lvl1pPr>
-          </a:lstStyle>
-          <a:p>
-            <a:pPr marL="457200" indent="-457200">
-              <a:buFont typeface="+mj-lt"/>
-              <a:buAutoNum type="arabicPeriod"/>
-            </a:pPr>
-            <a:r>
-              <a:rPr lang="ru-RU" sz="2000" dirty="0" err="1" smtClean="0">
-                <a:latin typeface="Arial" panose="020B0604020202020204" pitchFamily="34" charset="0"/>
-                <a:cs typeface="Arial" panose="020B0604020202020204" pitchFamily="34" charset="0"/>
-              </a:rPr>
-              <a:t>Гитхаб</a:t>
-            </a:r>
-            <a:r>
-              <a:rPr lang="ru-RU" sz="2000" dirty="0" smtClean="0">
-                <a:latin typeface="Arial" panose="020B0604020202020204" pitchFamily="34" charset="0"/>
-                <a:cs typeface="Arial" panose="020B0604020202020204" pitchFamily="34" charset="0"/>
-              </a:rPr>
-              <a:t> проекта: </a:t>
-            </a:r>
-            <a:r>
-              <a:rPr lang="en-US" sz="2000" dirty="0" smtClean="0">
-                <a:latin typeface="Arial" panose="020B0604020202020204" pitchFamily="34" charset="0"/>
-                <a:cs typeface="Arial" panose="020B0604020202020204" pitchFamily="34" charset="0"/>
-                <a:hlinkClick r:id="rId2"/>
-              </a:rPr>
-              <a:t>https://github.com/Olmeor/Data-engineer_Rostelecom_programming_school</a:t>
-            </a:r>
-            <a:endParaRPr lang="ru-RU" sz="2000" dirty="0" smtClean="0">
-              <a:latin typeface="Arial" panose="020B0604020202020204" pitchFamily="34" charset="0"/>
-              <a:cs typeface="Arial" panose="020B0604020202020204" pitchFamily="34" charset="0"/>
-            </a:endParaRPr>
-          </a:p>
-          <a:p>
-            <a:pPr marL="457200" indent="-457200">
-              <a:buFont typeface="+mj-lt"/>
-              <a:buAutoNum type="arabicPeriod"/>
-            </a:pPr>
-            <a:r>
-              <a:rPr lang="ru-RU" sz="2000" dirty="0" smtClean="0">
-                <a:latin typeface="Arial" panose="020B0604020202020204" pitchFamily="34" charset="0"/>
-                <a:cs typeface="Arial" panose="020B0604020202020204" pitchFamily="34" charset="0"/>
-              </a:rPr>
-              <a:t>Рейтинг популярности телеканалов: </a:t>
-            </a:r>
-            <a:r>
-              <a:rPr lang="en-US" sz="2000" dirty="0">
-                <a:latin typeface="Arial" panose="020B0604020202020204" pitchFamily="34" charset="0"/>
-                <a:cs typeface="Arial" panose="020B0604020202020204" pitchFamily="34" charset="0"/>
-                <a:hlinkClick r:id="rId3"/>
-              </a:rPr>
-              <a:t>https://</a:t>
-            </a:r>
-            <a:r>
-              <a:rPr lang="en-US" sz="2000" dirty="0" smtClean="0">
-                <a:latin typeface="Arial" panose="020B0604020202020204" pitchFamily="34" charset="0"/>
-                <a:cs typeface="Arial" panose="020B0604020202020204" pitchFamily="34" charset="0"/>
-                <a:hlinkClick r:id="rId3"/>
-              </a:rPr>
-              <a:t>www.powernet.com.ru/channels-stat</a:t>
-            </a:r>
-            <a:endParaRPr lang="ru-RU" sz="2000" dirty="0" smtClean="0">
-              <a:latin typeface="Arial" panose="020B0604020202020204" pitchFamily="34" charset="0"/>
-              <a:cs typeface="Arial" panose="020B0604020202020204" pitchFamily="34" charset="0"/>
-            </a:endParaRPr>
-          </a:p>
-          <a:p>
-            <a:pPr marL="457200" indent="-457200">
-              <a:buFont typeface="+mj-lt"/>
-              <a:buAutoNum type="arabicPeriod"/>
-            </a:pPr>
-            <a:r>
-              <a:rPr lang="ru-RU" sz="2000" dirty="0" smtClean="0">
-                <a:latin typeface="Arial" panose="020B0604020202020204" pitchFamily="34" charset="0"/>
-                <a:cs typeface="Arial" panose="020B0604020202020204" pitchFamily="34" charset="0"/>
-              </a:rPr>
-              <a:t>Аналитика просмотров: </a:t>
-            </a:r>
-            <a:r>
-              <a:rPr lang="en-US" sz="2000" dirty="0">
-                <a:latin typeface="Arial" panose="020B0604020202020204" pitchFamily="34" charset="0"/>
-                <a:cs typeface="Arial" panose="020B0604020202020204" pitchFamily="34" charset="0"/>
-                <a:hlinkClick r:id="rId4"/>
-              </a:rPr>
-              <a:t>https://journal.tinkoff.ru/television-stat/</a:t>
-            </a:r>
-            <a:endParaRPr lang="ru-RU" sz="2000" dirty="0">
-              <a:latin typeface="Arial" panose="020B0604020202020204" pitchFamily="34" charset="0"/>
-              <a:cs typeface="Arial" panose="020B0604020202020204" pitchFamily="34" charset="0"/>
-            </a:endParaRPr>
-          </a:p>
-        </p:txBody>
-      </p:sp>
-      <p:sp>
-        <p:nvSpPr>
-          <p:cNvPr id="6" name="Заголовок 1">
-            <a:extLst>
-              <a:ext uri="{FF2B5EF4-FFF2-40B4-BE49-F238E27FC236}">
-                <a16:creationId xmlns:a16="http://schemas.microsoft.com/office/drawing/2014/main" id="{26F3F6DE-0B95-4A88-A2DE-D547275A4F55}"/>
-              </a:ext>
-            </a:extLst>
-          </p:cNvPr>
-          <p:cNvSpPr txBox="1">
-            <a:spLocks/>
-          </p:cNvSpPr>
-          <p:nvPr/>
-        </p:nvSpPr>
-        <p:spPr>
-          <a:xfrm>
             <a:off x="439151" y="560538"/>
-            <a:ext cx="11160127" cy="523220"/>
+            <a:ext cx="11160127" cy="1025922"/>
           </a:xfrm>
           <a:prstGeom prst="rect">
             <a:avLst/>
@@ -5060,6 +4949,1346 @@
           </a:lstStyle>
           <a:p>
             <a:r>
+              <a:rPr lang="ru-RU" sz="2800" dirty="0">
+                <a:effectLst/>
+                <a:latin typeface="Arial" panose="020B0604020202020204" pitchFamily="34" charset="0"/>
+                <a:cs typeface="Arial" panose="020B0604020202020204" pitchFamily="34" charset="0"/>
+              </a:rPr>
+              <a:t>Обработка и агрегация данных с использованием</a:t>
+            </a:r>
+          </a:p>
+          <a:p>
+            <a:r>
+              <a:rPr lang="ru-RU" sz="2800" dirty="0">
+                <a:effectLst/>
+                <a:latin typeface="Arial" panose="020B0604020202020204" pitchFamily="34" charset="0"/>
+                <a:cs typeface="Arial" panose="020B0604020202020204" pitchFamily="34" charset="0"/>
+              </a:rPr>
+              <a:t>Apache Hive в</a:t>
+            </a:r>
+            <a:r>
+              <a:rPr lang="en-US" sz="2800" dirty="0">
+                <a:effectLst/>
+                <a:latin typeface="Arial" panose="020B0604020202020204" pitchFamily="34" charset="0"/>
+                <a:cs typeface="Arial" panose="020B0604020202020204" pitchFamily="34" charset="0"/>
+              </a:rPr>
+              <a:t> RT.DataLake</a:t>
+            </a:r>
+            <a:endParaRPr lang="ru-RU" sz="2800" dirty="0">
+              <a:effectLst/>
+              <a:latin typeface="Arial" panose="020B0604020202020204" pitchFamily="34" charset="0"/>
+              <a:cs typeface="Arial" panose="020B0604020202020204" pitchFamily="34" charset="0"/>
+            </a:endParaRPr>
+          </a:p>
+        </p:txBody>
+      </p:sp>
+      <p:pic>
+        <p:nvPicPr>
+          <p:cNvPr id="7" name="Рисунок 6"/>
+          <p:cNvPicPr>
+            <a:picLocks noChangeAspect="1"/>
+          </p:cNvPicPr>
+          <p:nvPr/>
+        </p:nvPicPr>
+        <p:blipFill>
+          <a:blip r:embed="rId2">
+            <a:extLst>
+              <a:ext uri="{28A0092B-C50C-407E-A947-70E740481C1C}">
+                <a14:useLocalDpi xmlns:a14="http://schemas.microsoft.com/office/drawing/2010/main" val="0"/>
+              </a:ext>
+            </a:extLst>
+          </a:blip>
+          <a:stretch>
+            <a:fillRect/>
+          </a:stretch>
+        </p:blipFill>
+        <p:spPr>
+          <a:xfrm>
+            <a:off x="9464774" y="532515"/>
+            <a:ext cx="2134504" cy="551243"/>
+          </a:xfrm>
+          <a:prstGeom prst="rect">
+            <a:avLst/>
+          </a:prstGeom>
+        </p:spPr>
+      </p:pic>
+      <p:pic>
+        <p:nvPicPr>
+          <p:cNvPr id="5" name="Рисунок 4"/>
+          <p:cNvPicPr>
+            <a:picLocks noChangeAspect="1"/>
+          </p:cNvPicPr>
+          <p:nvPr/>
+        </p:nvPicPr>
+        <p:blipFill>
+          <a:blip r:embed="rId3"/>
+          <a:stretch>
+            <a:fillRect/>
+          </a:stretch>
+        </p:blipFill>
+        <p:spPr>
+          <a:xfrm>
+            <a:off x="7645851" y="2083225"/>
+            <a:ext cx="3953427" cy="1171739"/>
+          </a:xfrm>
+          <a:prstGeom prst="rect">
+            <a:avLst/>
+          </a:prstGeom>
+        </p:spPr>
+      </p:pic>
+      <p:pic>
+        <p:nvPicPr>
+          <p:cNvPr id="8" name="Рисунок 7"/>
+          <p:cNvPicPr>
+            <a:picLocks noChangeAspect="1"/>
+          </p:cNvPicPr>
+          <p:nvPr/>
+        </p:nvPicPr>
+        <p:blipFill>
+          <a:blip r:embed="rId4"/>
+          <a:stretch>
+            <a:fillRect/>
+          </a:stretch>
+        </p:blipFill>
+        <p:spPr>
+          <a:xfrm>
+            <a:off x="7736351" y="3841376"/>
+            <a:ext cx="3772426" cy="1771897"/>
+          </a:xfrm>
+          <a:prstGeom prst="rect">
+            <a:avLst/>
+          </a:prstGeom>
+        </p:spPr>
+      </p:pic>
+      <p:pic>
+        <p:nvPicPr>
+          <p:cNvPr id="10" name="Рисунок 9"/>
+          <p:cNvPicPr>
+            <a:picLocks noChangeAspect="1"/>
+          </p:cNvPicPr>
+          <p:nvPr/>
+        </p:nvPicPr>
+        <p:blipFill>
+          <a:blip r:embed="rId5"/>
+          <a:stretch>
+            <a:fillRect/>
+          </a:stretch>
+        </p:blipFill>
+        <p:spPr>
+          <a:xfrm>
+            <a:off x="439151" y="2036013"/>
+            <a:ext cx="5334744" cy="3477110"/>
+          </a:xfrm>
+          <a:prstGeom prst="rect">
+            <a:avLst/>
+          </a:prstGeom>
+        </p:spPr>
+      </p:pic>
+    </p:spTree>
+    <p:extLst>
+      <p:ext uri="{BB962C8B-B14F-4D97-AF65-F5344CB8AC3E}">
+        <p14:creationId xmlns:p14="http://schemas.microsoft.com/office/powerpoint/2010/main" val="4232252842"/>
+      </p:ext>
+    </p:extLst>
+  </p:cSld>
+  <p:clrMapOvr>
+    <a:masterClrMapping/>
+  </p:clrMapOvr>
+  <p:timing>
+    <p:tnLst>
+      <p:par>
+        <p:cTn id="1" dur="indefinite" restart="never" nodeType="tmRoot"/>
+      </p:par>
+    </p:tnLst>
+  </p:timing>
+</p:sld>
+</file>
+
+<file path=ppt/slides/slide14.xml><?xml version="1.0" encoding="utf-8"?>
+<p:sld xmlns:a="http://schemas.openxmlformats.org/drawingml/2006/main" xmlns:r="http://schemas.openxmlformats.org/officeDocument/2006/relationships" xmlns:p="http://schemas.openxmlformats.org/presentationml/2006/main">
+  <p:cSld>
+    <p:bg>
+      <p:bgPr>
+        <a:solidFill>
+          <a:schemeClr val="bg1"/>
+        </a:solidFill>
+        <a:effectLst/>
+      </p:bgPr>
+    </p:bg>
+    <p:spTree>
+      <p:nvGrpSpPr>
+        <p:cNvPr id="1" name=""/>
+        <p:cNvGrpSpPr/>
+        <p:nvPr/>
+      </p:nvGrpSpPr>
+      <p:grpSpPr>
+        <a:xfrm>
+          <a:off x="0" y="0"/>
+          <a:ext cx="0" cy="0"/>
+          <a:chOff x="0" y="0"/>
+          <a:chExt cx="0" cy="0"/>
+        </a:xfrm>
+      </p:grpSpPr>
+      <p:sp>
+        <p:nvSpPr>
+          <p:cNvPr id="11" name="Номер слайда 3">
+            <a:extLst>
+              <a:ext uri="{FF2B5EF4-FFF2-40B4-BE49-F238E27FC236}">
+                <a16:creationId xmlns:a16="http://schemas.microsoft.com/office/drawing/2014/main" id="{7267A4CF-F0C4-43DD-AD58-96564CA7C221}"/>
+              </a:ext>
+            </a:extLst>
+          </p:cNvPr>
+          <p:cNvSpPr>
+            <a:spLocks noGrp="1"/>
+          </p:cNvSpPr>
+          <p:nvPr>
+            <p:ph type="sldNum" sz="quarter" idx="12"/>
+          </p:nvPr>
+        </p:nvSpPr>
+        <p:spPr>
+          <a:xfrm>
+            <a:off x="515939" y="6393284"/>
+            <a:ext cx="2743200" cy="365125"/>
+          </a:xfrm>
+          <a:prstGeom prst="rect">
+            <a:avLst/>
+          </a:prstGeom>
+        </p:spPr>
+        <p:txBody>
+          <a:bodyPr lIns="0" rIns="0"/>
+          <a:lstStyle>
+            <a:lvl1pPr>
+              <a:defRPr sz="1200">
+                <a:solidFill>
+                  <a:schemeClr val="bg1">
+                    <a:lumMod val="75000"/>
+                  </a:schemeClr>
+                </a:solidFill>
+              </a:defRPr>
+            </a:lvl1pPr>
+          </a:lstStyle>
+          <a:p>
+            <a:pPr algn="l"/>
+            <a:fld id="{A4D4834B-A5E3-4581-856C-72DC1D7E0BCC}" type="slidenum">
+              <a:rPr lang="ru-RU" smtClean="0">
+                <a:solidFill>
+                  <a:schemeClr val="tx1"/>
+                </a:solidFill>
+                <a:latin typeface="Rostelecom Basis" panose="020B0503030604040103" pitchFamily="34" charset="0"/>
+              </a:rPr>
+              <a:pPr algn="l"/>
+              <a:t>14</a:t>
+            </a:fld>
+            <a:endParaRPr lang="ru-RU" dirty="0">
+              <a:solidFill>
+                <a:schemeClr val="tx1"/>
+              </a:solidFill>
+              <a:latin typeface="Rostelecom Basis" panose="020B0503030604040103" pitchFamily="34" charset="0"/>
+            </a:endParaRPr>
+          </a:p>
+        </p:txBody>
+      </p:sp>
+      <p:sp>
+        <p:nvSpPr>
+          <p:cNvPr id="5" name="Заголовок 1">
+            <a:extLst>
+              <a:ext uri="{FF2B5EF4-FFF2-40B4-BE49-F238E27FC236}">
+                <a16:creationId xmlns:a16="http://schemas.microsoft.com/office/drawing/2014/main" id="{26F3F6DE-0B95-4A88-A2DE-D547275A4F55}"/>
+              </a:ext>
+            </a:extLst>
+          </p:cNvPr>
+          <p:cNvSpPr txBox="1">
+            <a:spLocks/>
+          </p:cNvSpPr>
+          <p:nvPr/>
+        </p:nvSpPr>
+        <p:spPr>
+          <a:xfrm>
+            <a:off x="439152" y="2920189"/>
+            <a:ext cx="11160127" cy="2051844"/>
+          </a:xfrm>
+          <a:prstGeom prst="rect">
+            <a:avLst/>
+          </a:prstGeom>
+        </p:spPr>
+        <p:txBody>
+          <a:bodyPr lIns="0" tIns="0" rIns="0" bIns="0" anchor="t" anchorCtr="0">
+            <a:spAutoFit/>
+          </a:bodyPr>
+          <a:lstStyle>
+            <a:defPPr>
+              <a:defRPr lang="ru-RU"/>
+            </a:defPPr>
+            <a:lvl1pPr>
+              <a:lnSpc>
+                <a:spcPts val="4000"/>
+              </a:lnSpc>
+              <a:spcBef>
+                <a:spcPct val="0"/>
+              </a:spcBef>
+              <a:buNone/>
+              <a:defRPr sz="2800" b="0">
+                <a:effectLst/>
+                <a:latin typeface="Rostelecom Basis Medium" panose="020B0603030604040103" pitchFamily="34" charset="0"/>
+                <a:ea typeface="+mj-ea"/>
+                <a:cs typeface="+mj-cs"/>
+              </a:defRPr>
+            </a:lvl1pPr>
+          </a:lstStyle>
+          <a:p>
+            <a:r>
+              <a:rPr lang="ru-RU" dirty="0" smtClean="0">
+                <a:latin typeface="Arial" panose="020B0604020202020204" pitchFamily="34" charset="0"/>
+                <a:cs typeface="Arial" panose="020B0604020202020204" pitchFamily="34" charset="0"/>
+              </a:rPr>
+              <a:t>На слайдах с решением расскажите о том</a:t>
+            </a:r>
+            <a:r>
+              <a:rPr lang="en-US" dirty="0" smtClean="0">
+                <a:latin typeface="Arial" panose="020B0604020202020204" pitchFamily="34" charset="0"/>
+                <a:cs typeface="Arial" panose="020B0604020202020204" pitchFamily="34" charset="0"/>
+              </a:rPr>
+              <a:t>,</a:t>
+            </a:r>
+            <a:r>
+              <a:rPr lang="ru-RU" dirty="0" smtClean="0">
+                <a:latin typeface="Arial" panose="020B0604020202020204" pitchFamily="34" charset="0"/>
+                <a:cs typeface="Arial" panose="020B0604020202020204" pitchFamily="34" charset="0"/>
+              </a:rPr>
+              <a:t> как вы решали поставленные задачи</a:t>
+            </a:r>
+            <a:r>
+              <a:rPr lang="en-US" dirty="0" smtClean="0">
+                <a:latin typeface="Arial" panose="020B0604020202020204" pitchFamily="34" charset="0"/>
+                <a:cs typeface="Arial" panose="020B0604020202020204" pitchFamily="34" charset="0"/>
+              </a:rPr>
+              <a:t>,</a:t>
+            </a:r>
+            <a:r>
+              <a:rPr lang="ru-RU" dirty="0" smtClean="0">
+                <a:latin typeface="Arial" panose="020B0604020202020204" pitchFamily="34" charset="0"/>
+                <a:cs typeface="Arial" panose="020B0604020202020204" pitchFamily="34" charset="0"/>
+              </a:rPr>
+              <a:t> что учитывали и что удалось сделать</a:t>
+            </a:r>
+            <a:r>
+              <a:rPr lang="en-US" dirty="0" smtClean="0">
+                <a:latin typeface="Arial" panose="020B0604020202020204" pitchFamily="34" charset="0"/>
+                <a:cs typeface="Arial" panose="020B0604020202020204" pitchFamily="34" charset="0"/>
+              </a:rPr>
+              <a:t>. </a:t>
+            </a:r>
+            <a:r>
+              <a:rPr lang="ru-RU" dirty="0" smtClean="0">
+                <a:latin typeface="Arial" panose="020B0604020202020204" pitchFamily="34" charset="0"/>
+                <a:cs typeface="Arial" panose="020B0604020202020204" pitchFamily="34" charset="0"/>
+              </a:rPr>
+              <a:t>Здесь можно дать ссылки на репозиторий или приложить некоторые скриншоты</a:t>
+            </a:r>
+            <a:r>
+              <a:rPr lang="en-US" dirty="0" smtClean="0">
+                <a:latin typeface="Arial" panose="020B0604020202020204" pitchFamily="34" charset="0"/>
+                <a:cs typeface="Arial" panose="020B0604020202020204" pitchFamily="34" charset="0"/>
+              </a:rPr>
+              <a:t>. </a:t>
+            </a:r>
+            <a:endParaRPr lang="ru-RU" dirty="0">
+              <a:latin typeface="Arial" panose="020B0604020202020204" pitchFamily="34" charset="0"/>
+              <a:cs typeface="Arial" panose="020B0604020202020204" pitchFamily="34" charset="0"/>
+            </a:endParaRPr>
+          </a:p>
+        </p:txBody>
+      </p:sp>
+      <p:sp>
+        <p:nvSpPr>
+          <p:cNvPr id="6" name="Заголовок 1">
+            <a:extLst>
+              <a:ext uri="{FF2B5EF4-FFF2-40B4-BE49-F238E27FC236}">
+                <a16:creationId xmlns:a16="http://schemas.microsoft.com/office/drawing/2014/main" id="{26F3F6DE-0B95-4A88-A2DE-D547275A4F55}"/>
+              </a:ext>
+            </a:extLst>
+          </p:cNvPr>
+          <p:cNvSpPr txBox="1">
+            <a:spLocks/>
+          </p:cNvSpPr>
+          <p:nvPr/>
+        </p:nvSpPr>
+        <p:spPr>
+          <a:xfrm>
+            <a:off x="439151" y="560538"/>
+            <a:ext cx="11160127" cy="523220"/>
+          </a:xfrm>
+          <a:prstGeom prst="rect">
+            <a:avLst/>
+          </a:prstGeom>
+        </p:spPr>
+        <p:txBody>
+          <a:bodyPr lIns="0" tIns="0" rIns="0" bIns="0" anchor="t" anchorCtr="0">
+            <a:spAutoFit/>
+          </a:bodyPr>
+          <a:lstStyle>
+            <a:lvl1pPr algn="l" defTabSz="914400" rtl="0" eaLnBrk="1" latinLnBrk="0" hangingPunct="1">
+              <a:lnSpc>
+                <a:spcPts val="4000"/>
+              </a:lnSpc>
+              <a:spcBef>
+                <a:spcPct val="0"/>
+              </a:spcBef>
+              <a:buNone/>
+              <a:defRPr sz="3600" b="0" kern="1200">
+                <a:solidFill>
+                  <a:schemeClr val="tx1"/>
+                </a:solidFill>
+                <a:effectLst>
+                  <a:outerShdw blurRad="38100" dist="38100" dir="2700000" algn="tl">
+                    <a:srgbClr val="000000">
+                      <a:alpha val="43137"/>
+                    </a:srgbClr>
+                  </a:outerShdw>
+                </a:effectLst>
+                <a:latin typeface="Rostelecom Basis Medium" panose="020B0603030604040103" pitchFamily="34" charset="0"/>
+                <a:ea typeface="+mj-ea"/>
+                <a:cs typeface="+mj-cs"/>
+              </a:defRPr>
+            </a:lvl1pPr>
+          </a:lstStyle>
+          <a:p>
+            <a:r>
+              <a:rPr lang="ru-RU" b="1" dirty="0" smtClean="0">
+                <a:effectLst/>
+                <a:latin typeface="Arial" panose="020B0604020202020204" pitchFamily="34" charset="0"/>
+                <a:cs typeface="Arial" panose="020B0604020202020204" pitchFamily="34" charset="0"/>
+              </a:rPr>
+              <a:t>Решение</a:t>
+            </a:r>
+            <a:endParaRPr lang="ru-RU" b="1" dirty="0">
+              <a:latin typeface="Arial" panose="020B0604020202020204" pitchFamily="34" charset="0"/>
+              <a:cs typeface="Arial" panose="020B0604020202020204" pitchFamily="34" charset="0"/>
+            </a:endParaRPr>
+          </a:p>
+        </p:txBody>
+      </p:sp>
+      <p:pic>
+        <p:nvPicPr>
+          <p:cNvPr id="7" name="Рисунок 6"/>
+          <p:cNvPicPr>
+            <a:picLocks noChangeAspect="1"/>
+          </p:cNvPicPr>
+          <p:nvPr/>
+        </p:nvPicPr>
+        <p:blipFill>
+          <a:blip r:embed="rId2">
+            <a:extLst>
+              <a:ext uri="{28A0092B-C50C-407E-A947-70E740481C1C}">
+                <a14:useLocalDpi xmlns:a14="http://schemas.microsoft.com/office/drawing/2010/main" val="0"/>
+              </a:ext>
+            </a:extLst>
+          </a:blip>
+          <a:stretch>
+            <a:fillRect/>
+          </a:stretch>
+        </p:blipFill>
+        <p:spPr>
+          <a:xfrm>
+            <a:off x="9464774" y="532515"/>
+            <a:ext cx="2134504" cy="551243"/>
+          </a:xfrm>
+          <a:prstGeom prst="rect">
+            <a:avLst/>
+          </a:prstGeom>
+        </p:spPr>
+      </p:pic>
+    </p:spTree>
+    <p:extLst>
+      <p:ext uri="{BB962C8B-B14F-4D97-AF65-F5344CB8AC3E}">
+        <p14:creationId xmlns:p14="http://schemas.microsoft.com/office/powerpoint/2010/main" val="1214712092"/>
+      </p:ext>
+    </p:extLst>
+  </p:cSld>
+  <p:clrMapOvr>
+    <a:masterClrMapping/>
+  </p:clrMapOvr>
+  <p:timing>
+    <p:tnLst>
+      <p:par>
+        <p:cTn id="1" dur="indefinite" restart="never" nodeType="tmRoot"/>
+      </p:par>
+    </p:tnLst>
+  </p:timing>
+</p:sld>
+</file>
+
+<file path=ppt/slides/slide15.xml><?xml version="1.0" encoding="utf-8"?>
+<p:sld xmlns:a="http://schemas.openxmlformats.org/drawingml/2006/main" xmlns:r="http://schemas.openxmlformats.org/officeDocument/2006/relationships" xmlns:p="http://schemas.openxmlformats.org/presentationml/2006/main">
+  <p:cSld>
+    <p:bg>
+      <p:bgPr>
+        <a:solidFill>
+          <a:schemeClr val="bg1"/>
+        </a:solidFill>
+        <a:effectLst/>
+      </p:bgPr>
+    </p:bg>
+    <p:spTree>
+      <p:nvGrpSpPr>
+        <p:cNvPr id="1" name=""/>
+        <p:cNvGrpSpPr/>
+        <p:nvPr/>
+      </p:nvGrpSpPr>
+      <p:grpSpPr>
+        <a:xfrm>
+          <a:off x="0" y="0"/>
+          <a:ext cx="0" cy="0"/>
+          <a:chOff x="0" y="0"/>
+          <a:chExt cx="0" cy="0"/>
+        </a:xfrm>
+      </p:grpSpPr>
+      <p:sp>
+        <p:nvSpPr>
+          <p:cNvPr id="11" name="Номер слайда 3">
+            <a:extLst>
+              <a:ext uri="{FF2B5EF4-FFF2-40B4-BE49-F238E27FC236}">
+                <a16:creationId xmlns:a16="http://schemas.microsoft.com/office/drawing/2014/main" id="{7267A4CF-F0C4-43DD-AD58-96564CA7C221}"/>
+              </a:ext>
+            </a:extLst>
+          </p:cNvPr>
+          <p:cNvSpPr>
+            <a:spLocks noGrp="1"/>
+          </p:cNvSpPr>
+          <p:nvPr>
+            <p:ph type="sldNum" sz="quarter" idx="12"/>
+          </p:nvPr>
+        </p:nvSpPr>
+        <p:spPr>
+          <a:xfrm>
+            <a:off x="515939" y="6393284"/>
+            <a:ext cx="2743200" cy="365125"/>
+          </a:xfrm>
+          <a:prstGeom prst="rect">
+            <a:avLst/>
+          </a:prstGeom>
+        </p:spPr>
+        <p:txBody>
+          <a:bodyPr lIns="0" rIns="0"/>
+          <a:lstStyle>
+            <a:lvl1pPr>
+              <a:defRPr sz="1200">
+                <a:solidFill>
+                  <a:schemeClr val="bg1">
+                    <a:lumMod val="75000"/>
+                  </a:schemeClr>
+                </a:solidFill>
+              </a:defRPr>
+            </a:lvl1pPr>
+          </a:lstStyle>
+          <a:p>
+            <a:pPr algn="l"/>
+            <a:fld id="{A4D4834B-A5E3-4581-856C-72DC1D7E0BCC}" type="slidenum">
+              <a:rPr lang="ru-RU" smtClean="0">
+                <a:solidFill>
+                  <a:schemeClr val="tx1"/>
+                </a:solidFill>
+                <a:latin typeface="Rostelecom Basis" panose="020B0503030604040103" pitchFamily="34" charset="0"/>
+              </a:rPr>
+              <a:pPr algn="l"/>
+              <a:t>15</a:t>
+            </a:fld>
+            <a:endParaRPr lang="ru-RU" dirty="0">
+              <a:solidFill>
+                <a:schemeClr val="tx1"/>
+              </a:solidFill>
+              <a:latin typeface="Rostelecom Basis" panose="020B0503030604040103" pitchFamily="34" charset="0"/>
+            </a:endParaRPr>
+          </a:p>
+        </p:txBody>
+      </p:sp>
+      <p:sp>
+        <p:nvSpPr>
+          <p:cNvPr id="5" name="Заголовок 1">
+            <a:extLst>
+              <a:ext uri="{FF2B5EF4-FFF2-40B4-BE49-F238E27FC236}">
+                <a16:creationId xmlns:a16="http://schemas.microsoft.com/office/drawing/2014/main" id="{26F3F6DE-0B95-4A88-A2DE-D547275A4F55}"/>
+              </a:ext>
+            </a:extLst>
+          </p:cNvPr>
+          <p:cNvSpPr txBox="1">
+            <a:spLocks/>
+          </p:cNvSpPr>
+          <p:nvPr/>
+        </p:nvSpPr>
+        <p:spPr>
+          <a:xfrm>
+            <a:off x="439152" y="2920189"/>
+            <a:ext cx="11160127" cy="2051844"/>
+          </a:xfrm>
+          <a:prstGeom prst="rect">
+            <a:avLst/>
+          </a:prstGeom>
+        </p:spPr>
+        <p:txBody>
+          <a:bodyPr lIns="0" tIns="0" rIns="0" bIns="0" anchor="t" anchorCtr="0">
+            <a:spAutoFit/>
+          </a:bodyPr>
+          <a:lstStyle>
+            <a:defPPr>
+              <a:defRPr lang="ru-RU"/>
+            </a:defPPr>
+            <a:lvl1pPr>
+              <a:lnSpc>
+                <a:spcPts val="4000"/>
+              </a:lnSpc>
+              <a:spcBef>
+                <a:spcPct val="0"/>
+              </a:spcBef>
+              <a:buNone/>
+              <a:defRPr sz="2800" b="0">
+                <a:effectLst/>
+                <a:latin typeface="Rostelecom Basis Medium" panose="020B0603030604040103" pitchFamily="34" charset="0"/>
+                <a:ea typeface="+mj-ea"/>
+                <a:cs typeface="+mj-cs"/>
+              </a:defRPr>
+            </a:lvl1pPr>
+          </a:lstStyle>
+          <a:p>
+            <a:r>
+              <a:rPr lang="ru-RU" dirty="0" smtClean="0">
+                <a:latin typeface="Arial" panose="020B0604020202020204" pitchFamily="34" charset="0"/>
+                <a:cs typeface="Arial" panose="020B0604020202020204" pitchFamily="34" charset="0"/>
+              </a:rPr>
+              <a:t>На слайдах с решением расскажите о том</a:t>
+            </a:r>
+            <a:r>
+              <a:rPr lang="en-US" dirty="0" smtClean="0">
+                <a:latin typeface="Arial" panose="020B0604020202020204" pitchFamily="34" charset="0"/>
+                <a:cs typeface="Arial" panose="020B0604020202020204" pitchFamily="34" charset="0"/>
+              </a:rPr>
+              <a:t>,</a:t>
+            </a:r>
+            <a:r>
+              <a:rPr lang="ru-RU" dirty="0" smtClean="0">
+                <a:latin typeface="Arial" panose="020B0604020202020204" pitchFamily="34" charset="0"/>
+                <a:cs typeface="Arial" panose="020B0604020202020204" pitchFamily="34" charset="0"/>
+              </a:rPr>
+              <a:t> как вы решали поставленные задачи</a:t>
+            </a:r>
+            <a:r>
+              <a:rPr lang="en-US" dirty="0" smtClean="0">
+                <a:latin typeface="Arial" panose="020B0604020202020204" pitchFamily="34" charset="0"/>
+                <a:cs typeface="Arial" panose="020B0604020202020204" pitchFamily="34" charset="0"/>
+              </a:rPr>
+              <a:t>,</a:t>
+            </a:r>
+            <a:r>
+              <a:rPr lang="ru-RU" dirty="0" smtClean="0">
+                <a:latin typeface="Arial" panose="020B0604020202020204" pitchFamily="34" charset="0"/>
+                <a:cs typeface="Arial" panose="020B0604020202020204" pitchFamily="34" charset="0"/>
+              </a:rPr>
+              <a:t> что учитывали и что удалось сделать</a:t>
+            </a:r>
+            <a:r>
+              <a:rPr lang="en-US" dirty="0" smtClean="0">
+                <a:latin typeface="Arial" panose="020B0604020202020204" pitchFamily="34" charset="0"/>
+                <a:cs typeface="Arial" panose="020B0604020202020204" pitchFamily="34" charset="0"/>
+              </a:rPr>
+              <a:t>. </a:t>
+            </a:r>
+            <a:r>
+              <a:rPr lang="ru-RU" dirty="0" smtClean="0">
+                <a:latin typeface="Arial" panose="020B0604020202020204" pitchFamily="34" charset="0"/>
+                <a:cs typeface="Arial" panose="020B0604020202020204" pitchFamily="34" charset="0"/>
+              </a:rPr>
+              <a:t>Здесь можно дать ссылки на репозиторий или приложить некоторые скриншоты</a:t>
+            </a:r>
+            <a:r>
+              <a:rPr lang="en-US" dirty="0" smtClean="0">
+                <a:latin typeface="Arial" panose="020B0604020202020204" pitchFamily="34" charset="0"/>
+                <a:cs typeface="Arial" panose="020B0604020202020204" pitchFamily="34" charset="0"/>
+              </a:rPr>
+              <a:t>. </a:t>
+            </a:r>
+            <a:endParaRPr lang="ru-RU" dirty="0">
+              <a:latin typeface="Arial" panose="020B0604020202020204" pitchFamily="34" charset="0"/>
+              <a:cs typeface="Arial" panose="020B0604020202020204" pitchFamily="34" charset="0"/>
+            </a:endParaRPr>
+          </a:p>
+        </p:txBody>
+      </p:sp>
+      <p:sp>
+        <p:nvSpPr>
+          <p:cNvPr id="6" name="Заголовок 1">
+            <a:extLst>
+              <a:ext uri="{FF2B5EF4-FFF2-40B4-BE49-F238E27FC236}">
+                <a16:creationId xmlns:a16="http://schemas.microsoft.com/office/drawing/2014/main" id="{26F3F6DE-0B95-4A88-A2DE-D547275A4F55}"/>
+              </a:ext>
+            </a:extLst>
+          </p:cNvPr>
+          <p:cNvSpPr txBox="1">
+            <a:spLocks/>
+          </p:cNvSpPr>
+          <p:nvPr/>
+        </p:nvSpPr>
+        <p:spPr>
+          <a:xfrm>
+            <a:off x="439151" y="560538"/>
+            <a:ext cx="11160127" cy="523220"/>
+          </a:xfrm>
+          <a:prstGeom prst="rect">
+            <a:avLst/>
+          </a:prstGeom>
+        </p:spPr>
+        <p:txBody>
+          <a:bodyPr lIns="0" tIns="0" rIns="0" bIns="0" anchor="t" anchorCtr="0">
+            <a:spAutoFit/>
+          </a:bodyPr>
+          <a:lstStyle>
+            <a:lvl1pPr algn="l" defTabSz="914400" rtl="0" eaLnBrk="1" latinLnBrk="0" hangingPunct="1">
+              <a:lnSpc>
+                <a:spcPts val="4000"/>
+              </a:lnSpc>
+              <a:spcBef>
+                <a:spcPct val="0"/>
+              </a:spcBef>
+              <a:buNone/>
+              <a:defRPr sz="3600" b="0" kern="1200">
+                <a:solidFill>
+                  <a:schemeClr val="tx1"/>
+                </a:solidFill>
+                <a:effectLst>
+                  <a:outerShdw blurRad="38100" dist="38100" dir="2700000" algn="tl">
+                    <a:srgbClr val="000000">
+                      <a:alpha val="43137"/>
+                    </a:srgbClr>
+                  </a:outerShdw>
+                </a:effectLst>
+                <a:latin typeface="Rostelecom Basis Medium" panose="020B0603030604040103" pitchFamily="34" charset="0"/>
+                <a:ea typeface="+mj-ea"/>
+                <a:cs typeface="+mj-cs"/>
+              </a:defRPr>
+            </a:lvl1pPr>
+          </a:lstStyle>
+          <a:p>
+            <a:r>
+              <a:rPr lang="ru-RU" b="1" dirty="0" smtClean="0">
+                <a:effectLst/>
+                <a:latin typeface="Arial" panose="020B0604020202020204" pitchFamily="34" charset="0"/>
+                <a:cs typeface="Arial" panose="020B0604020202020204" pitchFamily="34" charset="0"/>
+              </a:rPr>
+              <a:t>Решение</a:t>
+            </a:r>
+            <a:endParaRPr lang="ru-RU" b="1" dirty="0">
+              <a:latin typeface="Arial" panose="020B0604020202020204" pitchFamily="34" charset="0"/>
+              <a:cs typeface="Arial" panose="020B0604020202020204" pitchFamily="34" charset="0"/>
+            </a:endParaRPr>
+          </a:p>
+        </p:txBody>
+      </p:sp>
+      <p:pic>
+        <p:nvPicPr>
+          <p:cNvPr id="7" name="Рисунок 6"/>
+          <p:cNvPicPr>
+            <a:picLocks noChangeAspect="1"/>
+          </p:cNvPicPr>
+          <p:nvPr/>
+        </p:nvPicPr>
+        <p:blipFill>
+          <a:blip r:embed="rId2">
+            <a:extLst>
+              <a:ext uri="{28A0092B-C50C-407E-A947-70E740481C1C}">
+                <a14:useLocalDpi xmlns:a14="http://schemas.microsoft.com/office/drawing/2010/main" val="0"/>
+              </a:ext>
+            </a:extLst>
+          </a:blip>
+          <a:stretch>
+            <a:fillRect/>
+          </a:stretch>
+        </p:blipFill>
+        <p:spPr>
+          <a:xfrm>
+            <a:off x="9464774" y="532515"/>
+            <a:ext cx="2134504" cy="551243"/>
+          </a:xfrm>
+          <a:prstGeom prst="rect">
+            <a:avLst/>
+          </a:prstGeom>
+        </p:spPr>
+      </p:pic>
+    </p:spTree>
+    <p:extLst>
+      <p:ext uri="{BB962C8B-B14F-4D97-AF65-F5344CB8AC3E}">
+        <p14:creationId xmlns:p14="http://schemas.microsoft.com/office/powerpoint/2010/main" val="929180253"/>
+      </p:ext>
+    </p:extLst>
+  </p:cSld>
+  <p:clrMapOvr>
+    <a:masterClrMapping/>
+  </p:clrMapOvr>
+  <p:timing>
+    <p:tnLst>
+      <p:par>
+        <p:cTn id="1" dur="indefinite" restart="never" nodeType="tmRoot"/>
+      </p:par>
+    </p:tnLst>
+  </p:timing>
+</p:sld>
+</file>
+
+<file path=ppt/slides/slide16.xml><?xml version="1.0" encoding="utf-8"?>
+<p:sld xmlns:a="http://schemas.openxmlformats.org/drawingml/2006/main" xmlns:r="http://schemas.openxmlformats.org/officeDocument/2006/relationships" xmlns:p="http://schemas.openxmlformats.org/presentationml/2006/main">
+  <p:cSld>
+    <p:bg>
+      <p:bgPr>
+        <a:solidFill>
+          <a:schemeClr val="bg1"/>
+        </a:solidFill>
+        <a:effectLst/>
+      </p:bgPr>
+    </p:bg>
+    <p:spTree>
+      <p:nvGrpSpPr>
+        <p:cNvPr id="1" name=""/>
+        <p:cNvGrpSpPr/>
+        <p:nvPr/>
+      </p:nvGrpSpPr>
+      <p:grpSpPr>
+        <a:xfrm>
+          <a:off x="0" y="0"/>
+          <a:ext cx="0" cy="0"/>
+          <a:chOff x="0" y="0"/>
+          <a:chExt cx="0" cy="0"/>
+        </a:xfrm>
+      </p:grpSpPr>
+      <p:sp>
+        <p:nvSpPr>
+          <p:cNvPr id="11" name="Номер слайда 3">
+            <a:extLst>
+              <a:ext uri="{FF2B5EF4-FFF2-40B4-BE49-F238E27FC236}">
+                <a16:creationId xmlns:a16="http://schemas.microsoft.com/office/drawing/2014/main" id="{7267A4CF-F0C4-43DD-AD58-96564CA7C221}"/>
+              </a:ext>
+            </a:extLst>
+          </p:cNvPr>
+          <p:cNvSpPr>
+            <a:spLocks noGrp="1"/>
+          </p:cNvSpPr>
+          <p:nvPr>
+            <p:ph type="sldNum" sz="quarter" idx="12"/>
+          </p:nvPr>
+        </p:nvSpPr>
+        <p:spPr>
+          <a:xfrm>
+            <a:off x="515939" y="6393284"/>
+            <a:ext cx="2743200" cy="365125"/>
+          </a:xfrm>
+          <a:prstGeom prst="rect">
+            <a:avLst/>
+          </a:prstGeom>
+        </p:spPr>
+        <p:txBody>
+          <a:bodyPr lIns="0" rIns="0"/>
+          <a:lstStyle>
+            <a:lvl1pPr>
+              <a:defRPr sz="1200">
+                <a:solidFill>
+                  <a:schemeClr val="bg1">
+                    <a:lumMod val="75000"/>
+                  </a:schemeClr>
+                </a:solidFill>
+              </a:defRPr>
+            </a:lvl1pPr>
+          </a:lstStyle>
+          <a:p>
+            <a:pPr algn="l"/>
+            <a:fld id="{A4D4834B-A5E3-4581-856C-72DC1D7E0BCC}" type="slidenum">
+              <a:rPr lang="ru-RU" smtClean="0">
+                <a:solidFill>
+                  <a:schemeClr val="tx1"/>
+                </a:solidFill>
+                <a:latin typeface="Rostelecom Basis" panose="020B0503030604040103" pitchFamily="34" charset="0"/>
+              </a:rPr>
+              <a:pPr algn="l"/>
+              <a:t>16</a:t>
+            </a:fld>
+            <a:endParaRPr lang="ru-RU" dirty="0">
+              <a:solidFill>
+                <a:schemeClr val="tx1"/>
+              </a:solidFill>
+              <a:latin typeface="Rostelecom Basis" panose="020B0503030604040103" pitchFamily="34" charset="0"/>
+            </a:endParaRPr>
+          </a:p>
+        </p:txBody>
+      </p:sp>
+      <p:sp>
+        <p:nvSpPr>
+          <p:cNvPr id="5" name="Заголовок 1">
+            <a:extLst>
+              <a:ext uri="{FF2B5EF4-FFF2-40B4-BE49-F238E27FC236}">
+                <a16:creationId xmlns:a16="http://schemas.microsoft.com/office/drawing/2014/main" id="{26F3F6DE-0B95-4A88-A2DE-D547275A4F55}"/>
+              </a:ext>
+            </a:extLst>
+          </p:cNvPr>
+          <p:cNvSpPr txBox="1">
+            <a:spLocks/>
+          </p:cNvSpPr>
+          <p:nvPr/>
+        </p:nvSpPr>
+        <p:spPr>
+          <a:xfrm>
+            <a:off x="439152" y="2920189"/>
+            <a:ext cx="11160127" cy="979435"/>
+          </a:xfrm>
+          <a:prstGeom prst="rect">
+            <a:avLst/>
+          </a:prstGeom>
+        </p:spPr>
+        <p:txBody>
+          <a:bodyPr lIns="0" tIns="0" rIns="0" bIns="0" anchor="t" anchorCtr="0">
+            <a:spAutoFit/>
+          </a:bodyPr>
+          <a:lstStyle>
+            <a:defPPr>
+              <a:defRPr lang="ru-RU"/>
+            </a:defPPr>
+            <a:lvl1pPr>
+              <a:lnSpc>
+                <a:spcPts val="4000"/>
+              </a:lnSpc>
+              <a:spcBef>
+                <a:spcPct val="0"/>
+              </a:spcBef>
+              <a:buNone/>
+              <a:defRPr sz="2800" b="0">
+                <a:effectLst/>
+                <a:latin typeface="Rostelecom Basis Medium" panose="020B0603030604040103" pitchFamily="34" charset="0"/>
+                <a:ea typeface="+mj-ea"/>
+                <a:cs typeface="+mj-cs"/>
+              </a:defRPr>
+            </a:lvl1pPr>
+          </a:lstStyle>
+          <a:p>
+            <a:r>
+              <a:rPr lang="ru-RU" dirty="0" smtClean="0">
+                <a:latin typeface="Arial" panose="020B0604020202020204" pitchFamily="34" charset="0"/>
+                <a:cs typeface="Arial" panose="020B0604020202020204" pitchFamily="34" charset="0"/>
+              </a:rPr>
+              <a:t>Основные итоги вашей работы</a:t>
+            </a:r>
+            <a:r>
+              <a:rPr lang="en-US" dirty="0" smtClean="0">
+                <a:latin typeface="Arial" panose="020B0604020202020204" pitchFamily="34" charset="0"/>
+                <a:cs typeface="Arial" panose="020B0604020202020204" pitchFamily="34" charset="0"/>
+              </a:rPr>
+              <a:t>,</a:t>
+            </a:r>
+            <a:r>
+              <a:rPr lang="ru-RU" dirty="0" smtClean="0">
+                <a:latin typeface="Arial" panose="020B0604020202020204" pitchFamily="34" charset="0"/>
+                <a:cs typeface="Arial" panose="020B0604020202020204" pitchFamily="34" charset="0"/>
+              </a:rPr>
+              <a:t> инсайты после работы с данными и графики</a:t>
+            </a:r>
+            <a:endParaRPr lang="ru-RU" dirty="0">
+              <a:latin typeface="Arial" panose="020B0604020202020204" pitchFamily="34" charset="0"/>
+              <a:cs typeface="Arial" panose="020B0604020202020204" pitchFamily="34" charset="0"/>
+            </a:endParaRPr>
+          </a:p>
+        </p:txBody>
+      </p:sp>
+      <p:sp>
+        <p:nvSpPr>
+          <p:cNvPr id="6" name="Заголовок 1">
+            <a:extLst>
+              <a:ext uri="{FF2B5EF4-FFF2-40B4-BE49-F238E27FC236}">
+                <a16:creationId xmlns:a16="http://schemas.microsoft.com/office/drawing/2014/main" id="{26F3F6DE-0B95-4A88-A2DE-D547275A4F55}"/>
+              </a:ext>
+            </a:extLst>
+          </p:cNvPr>
+          <p:cNvSpPr txBox="1">
+            <a:spLocks/>
+          </p:cNvSpPr>
+          <p:nvPr/>
+        </p:nvSpPr>
+        <p:spPr>
+          <a:xfrm>
+            <a:off x="439151" y="560538"/>
+            <a:ext cx="11160127" cy="523220"/>
+          </a:xfrm>
+          <a:prstGeom prst="rect">
+            <a:avLst/>
+          </a:prstGeom>
+        </p:spPr>
+        <p:txBody>
+          <a:bodyPr lIns="0" tIns="0" rIns="0" bIns="0" anchor="t" anchorCtr="0">
+            <a:spAutoFit/>
+          </a:bodyPr>
+          <a:lstStyle>
+            <a:lvl1pPr algn="l" defTabSz="914400" rtl="0" eaLnBrk="1" latinLnBrk="0" hangingPunct="1">
+              <a:lnSpc>
+                <a:spcPts val="4000"/>
+              </a:lnSpc>
+              <a:spcBef>
+                <a:spcPct val="0"/>
+              </a:spcBef>
+              <a:buNone/>
+              <a:defRPr sz="3600" b="0" kern="1200">
+                <a:solidFill>
+                  <a:schemeClr val="tx1"/>
+                </a:solidFill>
+                <a:effectLst>
+                  <a:outerShdw blurRad="38100" dist="38100" dir="2700000" algn="tl">
+                    <a:srgbClr val="000000">
+                      <a:alpha val="43137"/>
+                    </a:srgbClr>
+                  </a:outerShdw>
+                </a:effectLst>
+                <a:latin typeface="Rostelecom Basis Medium" panose="020B0603030604040103" pitchFamily="34" charset="0"/>
+                <a:ea typeface="+mj-ea"/>
+                <a:cs typeface="+mj-cs"/>
+              </a:defRPr>
+            </a:lvl1pPr>
+          </a:lstStyle>
+          <a:p>
+            <a:r>
+              <a:rPr lang="ru-RU" b="1" dirty="0">
+                <a:effectLst/>
+                <a:latin typeface="Arial" panose="020B0604020202020204" pitchFamily="34" charset="0"/>
+                <a:cs typeface="Arial" panose="020B0604020202020204" pitchFamily="34" charset="0"/>
+              </a:rPr>
+              <a:t>Итоги и инсайты</a:t>
+            </a:r>
+            <a:endParaRPr lang="ru-RU" b="1" dirty="0">
+              <a:latin typeface="Arial" panose="020B0604020202020204" pitchFamily="34" charset="0"/>
+              <a:cs typeface="Arial" panose="020B0604020202020204" pitchFamily="34" charset="0"/>
+            </a:endParaRPr>
+          </a:p>
+        </p:txBody>
+      </p:sp>
+      <p:pic>
+        <p:nvPicPr>
+          <p:cNvPr id="7" name="Рисунок 6"/>
+          <p:cNvPicPr>
+            <a:picLocks noChangeAspect="1"/>
+          </p:cNvPicPr>
+          <p:nvPr/>
+        </p:nvPicPr>
+        <p:blipFill>
+          <a:blip r:embed="rId2">
+            <a:extLst>
+              <a:ext uri="{28A0092B-C50C-407E-A947-70E740481C1C}">
+                <a14:useLocalDpi xmlns:a14="http://schemas.microsoft.com/office/drawing/2010/main" val="0"/>
+              </a:ext>
+            </a:extLst>
+          </a:blip>
+          <a:stretch>
+            <a:fillRect/>
+          </a:stretch>
+        </p:blipFill>
+        <p:spPr>
+          <a:xfrm>
+            <a:off x="9464774" y="532515"/>
+            <a:ext cx="2134504" cy="551243"/>
+          </a:xfrm>
+          <a:prstGeom prst="rect">
+            <a:avLst/>
+          </a:prstGeom>
+        </p:spPr>
+      </p:pic>
+    </p:spTree>
+    <p:extLst>
+      <p:ext uri="{BB962C8B-B14F-4D97-AF65-F5344CB8AC3E}">
+        <p14:creationId xmlns:p14="http://schemas.microsoft.com/office/powerpoint/2010/main" val="921795148"/>
+      </p:ext>
+    </p:extLst>
+  </p:cSld>
+  <p:clrMapOvr>
+    <a:masterClrMapping/>
+  </p:clrMapOvr>
+  <p:timing>
+    <p:tnLst>
+      <p:par>
+        <p:cTn id="1" dur="indefinite" restart="never" nodeType="tmRoot"/>
+      </p:par>
+    </p:tnLst>
+  </p:timing>
+</p:sld>
+</file>
+
+<file path=ppt/slides/slide17.xml><?xml version="1.0" encoding="utf-8"?>
+<p:sld xmlns:a="http://schemas.openxmlformats.org/drawingml/2006/main" xmlns:r="http://schemas.openxmlformats.org/officeDocument/2006/relationships" xmlns:p="http://schemas.openxmlformats.org/presentationml/2006/main">
+  <p:cSld>
+    <p:bg>
+      <p:bgPr>
+        <a:solidFill>
+          <a:schemeClr val="bg1"/>
+        </a:solidFill>
+        <a:effectLst/>
+      </p:bgPr>
+    </p:bg>
+    <p:spTree>
+      <p:nvGrpSpPr>
+        <p:cNvPr id="1" name=""/>
+        <p:cNvGrpSpPr/>
+        <p:nvPr/>
+      </p:nvGrpSpPr>
+      <p:grpSpPr>
+        <a:xfrm>
+          <a:off x="0" y="0"/>
+          <a:ext cx="0" cy="0"/>
+          <a:chOff x="0" y="0"/>
+          <a:chExt cx="0" cy="0"/>
+        </a:xfrm>
+      </p:grpSpPr>
+      <p:sp>
+        <p:nvSpPr>
+          <p:cNvPr id="11" name="Номер слайда 3">
+            <a:extLst>
+              <a:ext uri="{FF2B5EF4-FFF2-40B4-BE49-F238E27FC236}">
+                <a16:creationId xmlns:a16="http://schemas.microsoft.com/office/drawing/2014/main" id="{7267A4CF-F0C4-43DD-AD58-96564CA7C221}"/>
+              </a:ext>
+            </a:extLst>
+          </p:cNvPr>
+          <p:cNvSpPr>
+            <a:spLocks noGrp="1"/>
+          </p:cNvSpPr>
+          <p:nvPr>
+            <p:ph type="sldNum" sz="quarter" idx="12"/>
+          </p:nvPr>
+        </p:nvSpPr>
+        <p:spPr>
+          <a:xfrm>
+            <a:off x="515939" y="6393284"/>
+            <a:ext cx="2743200" cy="365125"/>
+          </a:xfrm>
+          <a:prstGeom prst="rect">
+            <a:avLst/>
+          </a:prstGeom>
+        </p:spPr>
+        <p:txBody>
+          <a:bodyPr lIns="0" rIns="0"/>
+          <a:lstStyle>
+            <a:lvl1pPr>
+              <a:defRPr sz="1200">
+                <a:solidFill>
+                  <a:schemeClr val="bg1">
+                    <a:lumMod val="75000"/>
+                  </a:schemeClr>
+                </a:solidFill>
+              </a:defRPr>
+            </a:lvl1pPr>
+          </a:lstStyle>
+          <a:p>
+            <a:pPr algn="l"/>
+            <a:fld id="{A4D4834B-A5E3-4581-856C-72DC1D7E0BCC}" type="slidenum">
+              <a:rPr lang="ru-RU" smtClean="0">
+                <a:solidFill>
+                  <a:schemeClr val="tx1"/>
+                </a:solidFill>
+                <a:latin typeface="Rostelecom Basis" panose="020B0503030604040103" pitchFamily="34" charset="0"/>
+              </a:rPr>
+              <a:pPr algn="l"/>
+              <a:t>17</a:t>
+            </a:fld>
+            <a:endParaRPr lang="ru-RU" dirty="0">
+              <a:solidFill>
+                <a:schemeClr val="tx1"/>
+              </a:solidFill>
+              <a:latin typeface="Rostelecom Basis" panose="020B0503030604040103" pitchFamily="34" charset="0"/>
+            </a:endParaRPr>
+          </a:p>
+        </p:txBody>
+      </p:sp>
+      <p:sp>
+        <p:nvSpPr>
+          <p:cNvPr id="5" name="Заголовок 1">
+            <a:extLst>
+              <a:ext uri="{FF2B5EF4-FFF2-40B4-BE49-F238E27FC236}">
+                <a16:creationId xmlns:a16="http://schemas.microsoft.com/office/drawing/2014/main" id="{26F3F6DE-0B95-4A88-A2DE-D547275A4F55}"/>
+              </a:ext>
+            </a:extLst>
+          </p:cNvPr>
+          <p:cNvSpPr txBox="1">
+            <a:spLocks/>
+          </p:cNvSpPr>
+          <p:nvPr/>
+        </p:nvSpPr>
+        <p:spPr>
+          <a:xfrm>
+            <a:off x="439151" y="1333436"/>
+            <a:ext cx="11160127" cy="1538883"/>
+          </a:xfrm>
+          <a:prstGeom prst="rect">
+            <a:avLst/>
+          </a:prstGeom>
+        </p:spPr>
+        <p:txBody>
+          <a:bodyPr lIns="0" tIns="0" rIns="0" bIns="0" anchor="t" anchorCtr="0">
+            <a:spAutoFit/>
+          </a:bodyPr>
+          <a:lstStyle>
+            <a:defPPr>
+              <a:defRPr lang="ru-RU"/>
+            </a:defPPr>
+            <a:lvl1pPr>
+              <a:lnSpc>
+                <a:spcPts val="4000"/>
+              </a:lnSpc>
+              <a:spcBef>
+                <a:spcPct val="0"/>
+              </a:spcBef>
+              <a:buNone/>
+              <a:defRPr sz="2800" b="0">
+                <a:effectLst/>
+                <a:latin typeface="Rostelecom Basis Medium" panose="020B0603030604040103" pitchFamily="34" charset="0"/>
+                <a:ea typeface="+mj-ea"/>
+                <a:cs typeface="+mj-cs"/>
+              </a:defRPr>
+            </a:lvl1pPr>
+          </a:lstStyle>
+          <a:p>
+            <a:pPr marL="457200" indent="-457200">
+              <a:buFont typeface="+mj-lt"/>
+              <a:buAutoNum type="arabicPeriod"/>
+            </a:pPr>
+            <a:r>
+              <a:rPr lang="ru-RU" sz="2000" dirty="0" err="1" smtClean="0">
+                <a:latin typeface="Arial" panose="020B0604020202020204" pitchFamily="34" charset="0"/>
+                <a:cs typeface="Arial" panose="020B0604020202020204" pitchFamily="34" charset="0"/>
+              </a:rPr>
+              <a:t>Гитхаб</a:t>
+            </a:r>
+            <a:r>
+              <a:rPr lang="ru-RU" sz="2000" dirty="0" smtClean="0">
+                <a:latin typeface="Arial" panose="020B0604020202020204" pitchFamily="34" charset="0"/>
+                <a:cs typeface="Arial" panose="020B0604020202020204" pitchFamily="34" charset="0"/>
+              </a:rPr>
+              <a:t> проекта: </a:t>
+            </a:r>
+            <a:r>
+              <a:rPr lang="en-US" sz="2000" dirty="0" smtClean="0">
+                <a:latin typeface="Arial" panose="020B0604020202020204" pitchFamily="34" charset="0"/>
+                <a:cs typeface="Arial" panose="020B0604020202020204" pitchFamily="34" charset="0"/>
+                <a:hlinkClick r:id="rId2"/>
+              </a:rPr>
+              <a:t>https://github.com/Olmeor/Data-engineer_Rostelecom_programming_school</a:t>
+            </a:r>
+            <a:endParaRPr lang="ru-RU" sz="2000" dirty="0" smtClean="0">
+              <a:latin typeface="Arial" panose="020B0604020202020204" pitchFamily="34" charset="0"/>
+              <a:cs typeface="Arial" panose="020B0604020202020204" pitchFamily="34" charset="0"/>
+            </a:endParaRPr>
+          </a:p>
+          <a:p>
+            <a:pPr marL="457200" indent="-457200">
+              <a:buFont typeface="+mj-lt"/>
+              <a:buAutoNum type="arabicPeriod"/>
+            </a:pPr>
+            <a:r>
+              <a:rPr lang="ru-RU" sz="2000" dirty="0" smtClean="0">
+                <a:latin typeface="Arial" panose="020B0604020202020204" pitchFamily="34" charset="0"/>
+                <a:cs typeface="Arial" panose="020B0604020202020204" pitchFamily="34" charset="0"/>
+              </a:rPr>
+              <a:t>Рейтинг популярности телеканалов: </a:t>
+            </a:r>
+            <a:r>
+              <a:rPr lang="en-US" sz="2000" dirty="0">
+                <a:latin typeface="Arial" panose="020B0604020202020204" pitchFamily="34" charset="0"/>
+                <a:cs typeface="Arial" panose="020B0604020202020204" pitchFamily="34" charset="0"/>
+                <a:hlinkClick r:id="rId3"/>
+              </a:rPr>
+              <a:t>https://</a:t>
+            </a:r>
+            <a:r>
+              <a:rPr lang="en-US" sz="2000" dirty="0" smtClean="0">
+                <a:latin typeface="Arial" panose="020B0604020202020204" pitchFamily="34" charset="0"/>
+                <a:cs typeface="Arial" panose="020B0604020202020204" pitchFamily="34" charset="0"/>
+                <a:hlinkClick r:id="rId3"/>
+              </a:rPr>
+              <a:t>www.powernet.com.ru/channels-stat</a:t>
+            </a:r>
+            <a:endParaRPr lang="ru-RU" sz="2000" dirty="0" smtClean="0">
+              <a:latin typeface="Arial" panose="020B0604020202020204" pitchFamily="34" charset="0"/>
+              <a:cs typeface="Arial" panose="020B0604020202020204" pitchFamily="34" charset="0"/>
+            </a:endParaRPr>
+          </a:p>
+          <a:p>
+            <a:pPr marL="457200" indent="-457200">
+              <a:buFont typeface="+mj-lt"/>
+              <a:buAutoNum type="arabicPeriod"/>
+            </a:pPr>
+            <a:r>
+              <a:rPr lang="ru-RU" sz="2000" dirty="0" smtClean="0">
+                <a:latin typeface="Arial" panose="020B0604020202020204" pitchFamily="34" charset="0"/>
+                <a:cs typeface="Arial" panose="020B0604020202020204" pitchFamily="34" charset="0"/>
+              </a:rPr>
+              <a:t>Аналитика просмотров: </a:t>
+            </a:r>
+            <a:r>
+              <a:rPr lang="en-US" sz="2000" dirty="0">
+                <a:latin typeface="Arial" panose="020B0604020202020204" pitchFamily="34" charset="0"/>
+                <a:cs typeface="Arial" panose="020B0604020202020204" pitchFamily="34" charset="0"/>
+                <a:hlinkClick r:id="rId4"/>
+              </a:rPr>
+              <a:t>https://journal.tinkoff.ru/television-stat/</a:t>
+            </a:r>
+            <a:endParaRPr lang="ru-RU" sz="2000" dirty="0">
+              <a:latin typeface="Arial" panose="020B0604020202020204" pitchFamily="34" charset="0"/>
+              <a:cs typeface="Arial" panose="020B0604020202020204" pitchFamily="34" charset="0"/>
+            </a:endParaRPr>
+          </a:p>
+        </p:txBody>
+      </p:sp>
+      <p:sp>
+        <p:nvSpPr>
+          <p:cNvPr id="6" name="Заголовок 1">
+            <a:extLst>
+              <a:ext uri="{FF2B5EF4-FFF2-40B4-BE49-F238E27FC236}">
+                <a16:creationId xmlns:a16="http://schemas.microsoft.com/office/drawing/2014/main" id="{26F3F6DE-0B95-4A88-A2DE-D547275A4F55}"/>
+              </a:ext>
+            </a:extLst>
+          </p:cNvPr>
+          <p:cNvSpPr txBox="1">
+            <a:spLocks/>
+          </p:cNvSpPr>
+          <p:nvPr/>
+        </p:nvSpPr>
+        <p:spPr>
+          <a:xfrm>
+            <a:off x="439151" y="560538"/>
+            <a:ext cx="11160127" cy="523220"/>
+          </a:xfrm>
+          <a:prstGeom prst="rect">
+            <a:avLst/>
+          </a:prstGeom>
+        </p:spPr>
+        <p:txBody>
+          <a:bodyPr lIns="0" tIns="0" rIns="0" bIns="0" anchor="t" anchorCtr="0">
+            <a:spAutoFit/>
+          </a:bodyPr>
+          <a:lstStyle>
+            <a:lvl1pPr algn="l" defTabSz="914400" rtl="0" eaLnBrk="1" latinLnBrk="0" hangingPunct="1">
+              <a:lnSpc>
+                <a:spcPts val="4000"/>
+              </a:lnSpc>
+              <a:spcBef>
+                <a:spcPct val="0"/>
+              </a:spcBef>
+              <a:buNone/>
+              <a:defRPr sz="3600" b="0" kern="1200">
+                <a:solidFill>
+                  <a:schemeClr val="tx1"/>
+                </a:solidFill>
+                <a:effectLst>
+                  <a:outerShdw blurRad="38100" dist="38100" dir="2700000" algn="tl">
+                    <a:srgbClr val="000000">
+                      <a:alpha val="43137"/>
+                    </a:srgbClr>
+                  </a:outerShdw>
+                </a:effectLst>
+                <a:latin typeface="Rostelecom Basis Medium" panose="020B0603030604040103" pitchFamily="34" charset="0"/>
+                <a:ea typeface="+mj-ea"/>
+                <a:cs typeface="+mj-cs"/>
+              </a:defRPr>
+            </a:lvl1pPr>
+          </a:lstStyle>
+          <a:p>
+            <a:r>
               <a:rPr lang="ru-RU" b="1" dirty="0" smtClean="0">
                 <a:effectLst/>
                 <a:latin typeface="Arial" panose="020B0604020202020204" pitchFamily="34" charset="0"/>
@@ -5124,7 +6353,7 @@
 </p:sld>
 </file>
 
-<file path=ppt/slides/slide14.xml><?xml version="1.0" encoding="utf-8"?>
+<file path=ppt/slides/slide18.xml><?xml version="1.0" encoding="utf-8"?>
 <p:sld xmlns:a="http://schemas.openxmlformats.org/drawingml/2006/main" xmlns:r="http://schemas.openxmlformats.org/officeDocument/2006/relationships" xmlns:p="http://schemas.openxmlformats.org/presentationml/2006/main">
   <p:cSld>
     <p:bg>
@@ -7188,15 +8417,7 @@
                 <a:latin typeface="Arial" panose="020B0604020202020204" pitchFamily="34" charset="0"/>
                 <a:cs typeface="Arial" panose="020B0604020202020204" pitchFamily="34" charset="0"/>
               </a:rPr>
-              <a:t>Генерация </a:t>
-            </a:r>
-            <a:r>
-              <a:rPr lang="ru-RU" sz="3000" b="1" dirty="0" smtClean="0">
-                <a:effectLst/>
-                <a:latin typeface="Arial" panose="020B0604020202020204" pitchFamily="34" charset="0"/>
-                <a:cs typeface="Arial" panose="020B0604020202020204" pitchFamily="34" charset="0"/>
-              </a:rPr>
-              <a:t>датасета за предыдущую неделю</a:t>
+              <a:t>Генерация датасета за предыдущую неделю</a:t>
             </a:r>
             <a:endParaRPr lang="ru-RU" sz="3000" b="1" dirty="0">
               <a:latin typeface="Arial" panose="020B0604020202020204" pitchFamily="34" charset="0"/>
@@ -8435,10 +9656,6 @@
               </a:rPr>
               <a:t>.</a:t>
             </a:r>
-            <a:endParaRPr lang="ru-RU" dirty="0">
-              <a:latin typeface="Arial" panose="020B0604020202020204" pitchFamily="34" charset="0"/>
-              <a:cs typeface="Arial" panose="020B0604020202020204" pitchFamily="34" charset="0"/>
-            </a:endParaRPr>
           </a:p>
         </p:txBody>
       </p:sp>

</xml_diff>

<commit_message>
doc: update presentation for task 5 Spark
</commit_message>
<xml_diff>
--- a/Сertification/presentation.pptx
+++ b/Сertification/presentation.pptx
@@ -5,7 +5,7 @@
     <p:sldMasterId id="2147483648" r:id="rId1"/>
   </p:sldMasterIdLst>
   <p:notesMasterIdLst>
-    <p:notesMasterId r:id="rId20"/>
+    <p:notesMasterId r:id="rId21"/>
   </p:notesMasterIdLst>
   <p:sldIdLst>
     <p:sldId id="281" r:id="rId2"/>
@@ -23,9 +23,10 @@
     <p:sldId id="303" r:id="rId14"/>
     <p:sldId id="299" r:id="rId15"/>
     <p:sldId id="298" r:id="rId16"/>
-    <p:sldId id="288" r:id="rId17"/>
-    <p:sldId id="291" r:id="rId18"/>
-    <p:sldId id="289" r:id="rId19"/>
+    <p:sldId id="304" r:id="rId17"/>
+    <p:sldId id="288" r:id="rId18"/>
+    <p:sldId id="291" r:id="rId19"/>
+    <p:sldId id="289" r:id="rId20"/>
   </p:sldIdLst>
   <p:sldSz cx="12192000" cy="6858000"/>
   <p:notesSz cx="6858000" cy="9144000"/>
@@ -214,7 +215,7 @@
           <a:p>
             <a:fld id="{76ED9429-14B3-664E-B66C-A13779F56E7D}" type="datetimeFigureOut">
               <a:rPr lang="ru-RU" smtClean="0"/>
-              <a:t>23.09.2023</a:t>
+              <a:t>24.09.2023</a:t>
             </a:fld>
             <a:endParaRPr lang="ru-RU"/>
           </a:p>
@@ -628,7 +629,7 @@
           <a:p>
             <a:fld id="{26DB3D39-9350-6749-B0D7-69548AE3DE8E}" type="datetimeFigureOut">
               <a:rPr lang="ru-RU" smtClean="0"/>
-              <a:t>23.09.2023</a:t>
+              <a:t>24.09.2023</a:t>
             </a:fld>
             <a:endParaRPr lang="ru-RU"/>
           </a:p>
@@ -826,7 +827,7 @@
           <a:p>
             <a:fld id="{26DB3D39-9350-6749-B0D7-69548AE3DE8E}" type="datetimeFigureOut">
               <a:rPr lang="ru-RU" smtClean="0"/>
-              <a:t>23.09.2023</a:t>
+              <a:t>24.09.2023</a:t>
             </a:fld>
             <a:endParaRPr lang="ru-RU"/>
           </a:p>
@@ -1034,7 +1035,7 @@
           <a:p>
             <a:fld id="{26DB3D39-9350-6749-B0D7-69548AE3DE8E}" type="datetimeFigureOut">
               <a:rPr lang="ru-RU" smtClean="0"/>
-              <a:t>23.09.2023</a:t>
+              <a:t>24.09.2023</a:t>
             </a:fld>
             <a:endParaRPr lang="ru-RU"/>
           </a:p>
@@ -1232,7 +1233,7 @@
           <a:p>
             <a:fld id="{26DB3D39-9350-6749-B0D7-69548AE3DE8E}" type="datetimeFigureOut">
               <a:rPr lang="ru-RU" smtClean="0"/>
-              <a:t>23.09.2023</a:t>
+              <a:t>24.09.2023</a:t>
             </a:fld>
             <a:endParaRPr lang="ru-RU"/>
           </a:p>
@@ -1507,7 +1508,7 @@
           <a:p>
             <a:fld id="{26DB3D39-9350-6749-B0D7-69548AE3DE8E}" type="datetimeFigureOut">
               <a:rPr lang="ru-RU" smtClean="0"/>
-              <a:t>23.09.2023</a:t>
+              <a:t>24.09.2023</a:t>
             </a:fld>
             <a:endParaRPr lang="ru-RU"/>
           </a:p>
@@ -1772,7 +1773,7 @@
           <a:p>
             <a:fld id="{26DB3D39-9350-6749-B0D7-69548AE3DE8E}" type="datetimeFigureOut">
               <a:rPr lang="ru-RU" smtClean="0"/>
-              <a:t>23.09.2023</a:t>
+              <a:t>24.09.2023</a:t>
             </a:fld>
             <a:endParaRPr lang="ru-RU"/>
           </a:p>
@@ -2184,7 +2185,7 @@
           <a:p>
             <a:fld id="{26DB3D39-9350-6749-B0D7-69548AE3DE8E}" type="datetimeFigureOut">
               <a:rPr lang="ru-RU" smtClean="0"/>
-              <a:t>23.09.2023</a:t>
+              <a:t>24.09.2023</a:t>
             </a:fld>
             <a:endParaRPr lang="ru-RU"/>
           </a:p>
@@ -2325,7 +2326,7 @@
           <a:p>
             <a:fld id="{26DB3D39-9350-6749-B0D7-69548AE3DE8E}" type="datetimeFigureOut">
               <a:rPr lang="ru-RU" smtClean="0"/>
-              <a:t>23.09.2023</a:t>
+              <a:t>24.09.2023</a:t>
             </a:fld>
             <a:endParaRPr lang="ru-RU"/>
           </a:p>
@@ -2438,7 +2439,7 @@
           <a:p>
             <a:fld id="{26DB3D39-9350-6749-B0D7-69548AE3DE8E}" type="datetimeFigureOut">
               <a:rPr lang="ru-RU" smtClean="0"/>
-              <a:t>23.09.2023</a:t>
+              <a:t>24.09.2023</a:t>
             </a:fld>
             <a:endParaRPr lang="ru-RU"/>
           </a:p>
@@ -2749,7 +2750,7 @@
           <a:p>
             <a:fld id="{26DB3D39-9350-6749-B0D7-69548AE3DE8E}" type="datetimeFigureOut">
               <a:rPr lang="ru-RU" smtClean="0"/>
-              <a:t>23.09.2023</a:t>
+              <a:t>24.09.2023</a:t>
             </a:fld>
             <a:endParaRPr lang="ru-RU"/>
           </a:p>
@@ -3037,7 +3038,7 @@
           <a:p>
             <a:fld id="{26DB3D39-9350-6749-B0D7-69548AE3DE8E}" type="datetimeFigureOut">
               <a:rPr lang="ru-RU" smtClean="0"/>
-              <a:t>23.09.2023</a:t>
+              <a:t>24.09.2023</a:t>
             </a:fld>
             <a:endParaRPr lang="ru-RU"/>
           </a:p>
@@ -3281,7 +3282,7 @@
           <a:p>
             <a:fld id="{26DB3D39-9350-6749-B0D7-69548AE3DE8E}" type="datetimeFigureOut">
               <a:rPr lang="ru-RU" smtClean="0"/>
-              <a:t>23.09.2023</a:t>
+              <a:t>24.09.2023</a:t>
             </a:fld>
             <a:endParaRPr lang="ru-RU"/>
           </a:p>
@@ -4363,15 +4364,7 @@
                 <a:latin typeface="Arial" panose="020B0604020202020204" pitchFamily="34" charset="0"/>
                 <a:cs typeface="Arial" panose="020B0604020202020204" pitchFamily="34" charset="0"/>
               </a:rPr>
-              <a:t>Hive </a:t>
-            </a:r>
-            <a:r>
-              <a:rPr lang="ru-RU" sz="2800" dirty="0">
-                <a:effectLst/>
-                <a:latin typeface="Arial" panose="020B0604020202020204" pitchFamily="34" charset="0"/>
-                <a:cs typeface="Arial" panose="020B0604020202020204" pitchFamily="34" charset="0"/>
-              </a:rPr>
-              <a:t>в</a:t>
+              <a:t>Hive в</a:t>
             </a:r>
             <a:r>
               <a:rPr lang="en-US" sz="2800" dirty="0">
@@ -5518,15 +5511,15 @@
         </p:nvSpPr>
         <p:spPr>
           <a:xfrm>
-            <a:off x="439152" y="2920189"/>
-            <a:ext cx="11160127" cy="2051844"/>
+            <a:off x="439151" y="1252752"/>
+            <a:ext cx="4930708" cy="512961"/>
           </a:xfrm>
           <a:prstGeom prst="rect">
             <a:avLst/>
           </a:prstGeom>
         </p:spPr>
         <p:txBody>
-          <a:bodyPr lIns="0" tIns="0" rIns="0" bIns="0" anchor="t" anchorCtr="0">
+          <a:bodyPr wrap="square" lIns="0" tIns="0" rIns="0" bIns="0" anchor="t" anchorCtr="0">
             <a:spAutoFit/>
           </a:bodyPr>
           <a:lstStyle>
@@ -5551,62 +5544,20 @@
           </a:lstStyle>
           <a:p>
             <a:r>
-              <a:rPr lang="ru-RU" dirty="0" smtClean="0">
-                <a:latin typeface="Arial" panose="020B0604020202020204" pitchFamily="34" charset="0"/>
-                <a:cs typeface="Arial" panose="020B0604020202020204" pitchFamily="34" charset="0"/>
-              </a:rPr>
-              <a:t>На слайдах с решением расскажите о том</a:t>
-            </a:r>
-            <a:r>
-              <a:rPr lang="en-US" dirty="0" smtClean="0">
-                <a:latin typeface="Arial" panose="020B0604020202020204" pitchFamily="34" charset="0"/>
-                <a:cs typeface="Arial" panose="020B0604020202020204" pitchFamily="34" charset="0"/>
-              </a:rPr>
-              <a:t>,</a:t>
-            </a:r>
-            <a:r>
-              <a:rPr lang="ru-RU" dirty="0" smtClean="0">
-                <a:latin typeface="Arial" panose="020B0604020202020204" pitchFamily="34" charset="0"/>
-                <a:cs typeface="Arial" panose="020B0604020202020204" pitchFamily="34" charset="0"/>
-              </a:rPr>
-              <a:t> как вы решали поставленные задачи</a:t>
-            </a:r>
-            <a:r>
-              <a:rPr lang="en-US" dirty="0" smtClean="0">
-                <a:latin typeface="Arial" panose="020B0604020202020204" pitchFamily="34" charset="0"/>
-                <a:cs typeface="Arial" panose="020B0604020202020204" pitchFamily="34" charset="0"/>
-              </a:rPr>
-              <a:t>,</a:t>
-            </a:r>
-            <a:r>
-              <a:rPr lang="ru-RU" dirty="0" smtClean="0">
-                <a:latin typeface="Arial" panose="020B0604020202020204" pitchFamily="34" charset="0"/>
-                <a:cs typeface="Arial" panose="020B0604020202020204" pitchFamily="34" charset="0"/>
-              </a:rPr>
-              <a:t> что учитывали и что удалось сделать</a:t>
-            </a:r>
-            <a:r>
-              <a:rPr lang="en-US" dirty="0" smtClean="0">
-                <a:latin typeface="Arial" panose="020B0604020202020204" pitchFamily="34" charset="0"/>
-                <a:cs typeface="Arial" panose="020B0604020202020204" pitchFamily="34" charset="0"/>
-              </a:rPr>
-              <a:t>. </a:t>
-            </a:r>
-            <a:r>
-              <a:rPr lang="ru-RU" dirty="0" smtClean="0">
-                <a:latin typeface="Arial" panose="020B0604020202020204" pitchFamily="34" charset="0"/>
-                <a:cs typeface="Arial" panose="020B0604020202020204" pitchFamily="34" charset="0"/>
-              </a:rPr>
-              <a:t>Здесь можно дать ссылки на репозиторий или приложить некоторые скриншоты</a:t>
-            </a:r>
-            <a:r>
-              <a:rPr lang="en-US" dirty="0" smtClean="0">
-                <a:latin typeface="Arial" panose="020B0604020202020204" pitchFamily="34" charset="0"/>
-                <a:cs typeface="Arial" panose="020B0604020202020204" pitchFamily="34" charset="0"/>
-              </a:rPr>
-              <a:t>. </a:t>
-            </a:r>
-            <a:endParaRPr lang="ru-RU" dirty="0">
+              <a:rPr lang="ru-RU" sz="2000" dirty="0" smtClean="0">
+                <a:latin typeface="Arial" panose="020B0604020202020204" pitchFamily="34" charset="0"/>
+                <a:cs typeface="Arial" panose="020B0604020202020204" pitchFamily="34" charset="0"/>
+              </a:rPr>
+              <a:t>Загружаем виртуальную таблицу из </a:t>
+            </a:r>
+            <a:r>
+              <a:rPr lang="en-US" sz="2000" dirty="0" smtClean="0">
+                <a:latin typeface="Arial" panose="020B0604020202020204" pitchFamily="34" charset="0"/>
+                <a:cs typeface="Arial" panose="020B0604020202020204" pitchFamily="34" charset="0"/>
+              </a:rPr>
+              <a:t>Hive</a:t>
+            </a:r>
+            <a:endParaRPr lang="ru-RU" sz="2000" dirty="0">
               <a:latin typeface="Arial" panose="020B0604020202020204" pitchFamily="34" charset="0"/>
               <a:cs typeface="Arial" panose="020B0604020202020204" pitchFamily="34" charset="0"/>
             </a:endParaRPr>
@@ -5630,7 +5581,7 @@
         <p:spPr>
           <a:xfrm>
             <a:off x="439151" y="560538"/>
-            <a:ext cx="11160127" cy="523220"/>
+            <a:ext cx="11160127" cy="512961"/>
           </a:xfrm>
           <a:prstGeom prst="rect">
             <a:avLst/>
@@ -5668,14 +5619,38 @@
           </a:lstStyle>
           <a:p>
             <a:r>
-              <a:rPr lang="ru-RU" b="1" dirty="0" smtClean="0">
-                <a:effectLst/>
-                <a:latin typeface="Arial" panose="020B0604020202020204" pitchFamily="34" charset="0"/>
-                <a:cs typeface="Arial" panose="020B0604020202020204" pitchFamily="34" charset="0"/>
-              </a:rPr>
-              <a:t>Решение</a:t>
-            </a:r>
-            <a:endParaRPr lang="ru-RU" b="1" dirty="0">
+              <a:rPr lang="ru-RU" sz="3200" dirty="0">
+                <a:effectLst/>
+                <a:latin typeface="Arial" panose="020B0604020202020204" pitchFamily="34" charset="0"/>
+                <a:cs typeface="Arial" panose="020B0604020202020204" pitchFamily="34" charset="0"/>
+              </a:rPr>
+              <a:t>Аналитика </a:t>
+            </a:r>
+            <a:r>
+              <a:rPr lang="ru-RU" sz="3200" dirty="0" smtClean="0">
+                <a:effectLst/>
+                <a:latin typeface="Arial" panose="020B0604020202020204" pitchFamily="34" charset="0"/>
+                <a:cs typeface="Arial" panose="020B0604020202020204" pitchFamily="34" charset="0"/>
+              </a:rPr>
+              <a:t>(</a:t>
+            </a:r>
+            <a:r>
+              <a:rPr lang="ru-RU" sz="3200" dirty="0">
+                <a:effectLst/>
+                <a:latin typeface="Arial" panose="020B0604020202020204" pitchFamily="34" charset="0"/>
+                <a:cs typeface="Arial" panose="020B0604020202020204" pitchFamily="34" charset="0"/>
+              </a:rPr>
+              <a:t>Apache Zeppelin + Apache </a:t>
+            </a:r>
+            <a:r>
+              <a:rPr lang="ru-RU" sz="3200" dirty="0" smtClean="0">
+                <a:effectLst/>
+                <a:latin typeface="Arial" panose="020B0604020202020204" pitchFamily="34" charset="0"/>
+                <a:cs typeface="Arial" panose="020B0604020202020204" pitchFamily="34" charset="0"/>
+              </a:rPr>
+              <a:t>Spark)</a:t>
+            </a:r>
+            <a:endParaRPr lang="ru-RU" sz="3200" b="1" dirty="0">
               <a:latin typeface="Arial" panose="020B0604020202020204" pitchFamily="34" charset="0"/>
               <a:cs typeface="Arial" panose="020B0604020202020204" pitchFamily="34" charset="0"/>
             </a:endParaRPr>
@@ -5706,6 +5681,54 @@
           <a:xfrm>
             <a:off x="9464774" y="532515"/>
             <a:ext cx="2134504" cy="551243"/>
+          </a:xfrm>
+          <a:prstGeom prst="rect">
+            <a:avLst/>
+          </a:prstGeom>
+        </p:spPr>
+      </p:pic>
+      <p:pic>
+        <p:nvPicPr>
+          <p:cNvPr id="4" name="Рисунок 3"/>
+          <p:cNvPicPr>
+            <a:picLocks noChangeAspect="1"/>
+          </p:cNvPicPr>
+          <p:nvPr/>
+        </p:nvPicPr>
+        <p:blipFill>
+          <a:blip r:embed="rId3"/>
+          <a:stretch>
+            <a:fillRect/>
+          </a:stretch>
+        </p:blipFill>
+        <p:spPr>
+          <a:xfrm>
+            <a:off x="439151" y="2359407"/>
+            <a:ext cx="4982270" cy="3896269"/>
+          </a:xfrm>
+          <a:prstGeom prst="rect">
+            <a:avLst/>
+          </a:prstGeom>
+        </p:spPr>
+      </p:pic>
+      <p:pic>
+        <p:nvPicPr>
+          <p:cNvPr id="8" name="Рисунок 7"/>
+          <p:cNvPicPr>
+            <a:picLocks noChangeAspect="1"/>
+          </p:cNvPicPr>
+          <p:nvPr/>
+        </p:nvPicPr>
+        <p:blipFill>
+          <a:blip r:embed="rId4"/>
+          <a:stretch>
+            <a:fillRect/>
+          </a:stretch>
+        </p:blipFill>
+        <p:spPr>
+          <a:xfrm>
+            <a:off x="5931112" y="1696804"/>
+            <a:ext cx="5668166" cy="4696480"/>
           </a:xfrm>
           <a:prstGeom prst="rect">
             <a:avLst/>
@@ -5818,7 +5841,7 @@
       </p:sp>
       <p:sp>
         <p:nvSpPr>
-          <p:cNvPr id="5" name="Заголовок 1">
+          <p:cNvPr id="6" name="Заголовок 1">
             <a:extLst>
               <a:ext uri="{FF2B5EF4-FFF2-40B4-BE49-F238E27FC236}">
                 <a16:creationId xmlns:a16="http://schemas.microsoft.com/office/drawing/2014/main" id="{26F3F6DE-0B95-4A88-A2DE-D547275A4F55}"/>
@@ -5832,84 +5855,8 @@
         </p:nvSpPr>
         <p:spPr>
           <a:xfrm>
-            <a:off x="439152" y="2920189"/>
-            <a:ext cx="11160127" cy="979435"/>
-          </a:xfrm>
-          <a:prstGeom prst="rect">
-            <a:avLst/>
-          </a:prstGeom>
-        </p:spPr>
-        <p:txBody>
-          <a:bodyPr lIns="0" tIns="0" rIns="0" bIns="0" anchor="t" anchorCtr="0">
-            <a:spAutoFit/>
-          </a:bodyPr>
-          <a:lstStyle>
-            <a:defPPr>
-              <a:defRPr lang="ru-RU"/>
-            </a:defPPr>
-            <a:lvl1pPr>
-              <a:lnSpc>
-                <a:spcPts val="4000"/>
-              </a:lnSpc>
-              <a:spcBef>
-                <a:spcPct val="0"/>
-              </a:spcBef>
-              <a:buNone/>
-              <a:defRPr sz="2800" b="0">
-                <a:effectLst/>
-                <a:latin typeface="Rostelecom Basis Medium" panose="020B0603030604040103" pitchFamily="34" charset="0"/>
-                <a:ea typeface="+mj-ea"/>
-                <a:cs typeface="+mj-cs"/>
-              </a:defRPr>
-            </a:lvl1pPr>
-          </a:lstStyle>
-          <a:p>
-            <a:r>
-              <a:rPr lang="ru-RU" dirty="0" smtClean="0">
-                <a:latin typeface="Arial" panose="020B0604020202020204" pitchFamily="34" charset="0"/>
-                <a:cs typeface="Arial" panose="020B0604020202020204" pitchFamily="34" charset="0"/>
-              </a:rPr>
-              <a:t>Основные итоги вашей работы</a:t>
-            </a:r>
-            <a:r>
-              <a:rPr lang="en-US" dirty="0" smtClean="0">
-                <a:latin typeface="Arial" panose="020B0604020202020204" pitchFamily="34" charset="0"/>
-                <a:cs typeface="Arial" panose="020B0604020202020204" pitchFamily="34" charset="0"/>
-              </a:rPr>
-              <a:t>,</a:t>
-            </a:r>
-            <a:r>
-              <a:rPr lang="ru-RU" dirty="0" smtClean="0">
-                <a:latin typeface="Arial" panose="020B0604020202020204" pitchFamily="34" charset="0"/>
-                <a:cs typeface="Arial" panose="020B0604020202020204" pitchFamily="34" charset="0"/>
-              </a:rPr>
-              <a:t> инсайты после работы с данными и графики</a:t>
-            </a:r>
-            <a:endParaRPr lang="ru-RU" dirty="0">
-              <a:latin typeface="Arial" panose="020B0604020202020204" pitchFamily="34" charset="0"/>
-              <a:cs typeface="Arial" panose="020B0604020202020204" pitchFamily="34" charset="0"/>
-            </a:endParaRPr>
-          </a:p>
-        </p:txBody>
-      </p:sp>
-      <p:sp>
-        <p:nvSpPr>
-          <p:cNvPr id="6" name="Заголовок 1">
-            <a:extLst>
-              <a:ext uri="{FF2B5EF4-FFF2-40B4-BE49-F238E27FC236}">
-                <a16:creationId xmlns:a16="http://schemas.microsoft.com/office/drawing/2014/main" id="{26F3F6DE-0B95-4A88-A2DE-D547275A4F55}"/>
-              </a:ext>
-            </a:extLst>
-          </p:cNvPr>
-          <p:cNvSpPr txBox="1">
-            <a:spLocks/>
-          </p:cNvSpPr>
-          <p:nvPr/>
-        </p:nvSpPr>
-        <p:spPr>
-          <a:xfrm>
             <a:off x="439151" y="560538"/>
-            <a:ext cx="11160127" cy="523220"/>
+            <a:ext cx="11160127" cy="512961"/>
           </a:xfrm>
           <a:prstGeom prst="rect">
             <a:avLst/>
@@ -5947,14 +5894,14 @@
           </a:lstStyle>
           <a:p>
             <a:r>
-              <a:rPr lang="ru-RU" b="1" dirty="0">
-                <a:effectLst/>
-                <a:latin typeface="Arial" panose="020B0604020202020204" pitchFamily="34" charset="0"/>
-                <a:cs typeface="Arial" panose="020B0604020202020204" pitchFamily="34" charset="0"/>
-              </a:rPr>
-              <a:t>Итоги и инсайты</a:t>
-            </a:r>
-            <a:endParaRPr lang="ru-RU" b="1" dirty="0">
+              <a:rPr lang="ru-RU" sz="3200" dirty="0">
+                <a:effectLst/>
+                <a:latin typeface="Arial" panose="020B0604020202020204" pitchFamily="34" charset="0"/>
+                <a:cs typeface="Arial" panose="020B0604020202020204" pitchFamily="34" charset="0"/>
+              </a:rPr>
+              <a:t>Аналитика (Apache Zeppelin + Apache Spark)</a:t>
+            </a:r>
+            <a:endParaRPr lang="ru-RU" sz="3200" b="1" dirty="0">
               <a:latin typeface="Arial" panose="020B0604020202020204" pitchFamily="34" charset="0"/>
               <a:cs typeface="Arial" panose="020B0604020202020204" pitchFamily="34" charset="0"/>
             </a:endParaRPr>
@@ -5991,10 +5938,106 @@
           </a:prstGeom>
         </p:spPr>
       </p:pic>
+      <p:pic>
+        <p:nvPicPr>
+          <p:cNvPr id="4" name="Рисунок 3"/>
+          <p:cNvPicPr>
+            <a:picLocks noChangeAspect="1"/>
+          </p:cNvPicPr>
+          <p:nvPr/>
+        </p:nvPicPr>
+        <p:blipFill>
+          <a:blip r:embed="rId3"/>
+          <a:stretch>
+            <a:fillRect/>
+          </a:stretch>
+        </p:blipFill>
+        <p:spPr>
+          <a:xfrm>
+            <a:off x="439151" y="1324792"/>
+            <a:ext cx="4315427" cy="1495634"/>
+          </a:xfrm>
+          <a:prstGeom prst="rect">
+            <a:avLst/>
+          </a:prstGeom>
+        </p:spPr>
+      </p:pic>
+      <p:pic>
+        <p:nvPicPr>
+          <p:cNvPr id="8" name="Рисунок 7"/>
+          <p:cNvPicPr>
+            <a:picLocks noChangeAspect="1"/>
+          </p:cNvPicPr>
+          <p:nvPr/>
+        </p:nvPicPr>
+        <p:blipFill>
+          <a:blip r:embed="rId4"/>
+          <a:stretch>
+            <a:fillRect/>
+          </a:stretch>
+        </p:blipFill>
+        <p:spPr>
+          <a:xfrm>
+            <a:off x="724940" y="2955841"/>
+            <a:ext cx="3743847" cy="3620005"/>
+          </a:xfrm>
+          <a:prstGeom prst="rect">
+            <a:avLst/>
+          </a:prstGeom>
+        </p:spPr>
+      </p:pic>
+      <p:pic>
+        <p:nvPicPr>
+          <p:cNvPr id="9" name="Рисунок 8"/>
+          <p:cNvPicPr>
+            <a:picLocks noChangeAspect="1"/>
+          </p:cNvPicPr>
+          <p:nvPr/>
+        </p:nvPicPr>
+        <p:blipFill>
+          <a:blip r:embed="rId5"/>
+          <a:stretch>
+            <a:fillRect/>
+          </a:stretch>
+        </p:blipFill>
+        <p:spPr>
+          <a:xfrm>
+            <a:off x="5909313" y="1324792"/>
+            <a:ext cx="5572903" cy="1324160"/>
+          </a:xfrm>
+          <a:prstGeom prst="rect">
+            <a:avLst/>
+          </a:prstGeom>
+        </p:spPr>
+      </p:pic>
+      <p:pic>
+        <p:nvPicPr>
+          <p:cNvPr id="10" name="Рисунок 9"/>
+          <p:cNvPicPr>
+            <a:picLocks noChangeAspect="1"/>
+          </p:cNvPicPr>
+          <p:nvPr/>
+        </p:nvPicPr>
+        <p:blipFill>
+          <a:blip r:embed="rId6"/>
+          <a:stretch>
+            <a:fillRect/>
+          </a:stretch>
+        </p:blipFill>
+        <p:spPr>
+          <a:xfrm>
+            <a:off x="5909313" y="2820426"/>
+            <a:ext cx="5830114" cy="3715268"/>
+          </a:xfrm>
+          <a:prstGeom prst="rect">
+            <a:avLst/>
+          </a:prstGeom>
+        </p:spPr>
+      </p:pic>
     </p:spTree>
     <p:extLst>
       <p:ext uri="{BB962C8B-B14F-4D97-AF65-F5344CB8AC3E}">
-        <p14:creationId xmlns:p14="http://schemas.microsoft.com/office/powerpoint/2010/main" val="921795148"/>
+        <p14:creationId xmlns:p14="http://schemas.microsoft.com/office/powerpoint/2010/main" val="2997639442"/>
       </p:ext>
     </p:extLst>
   </p:cSld>
@@ -6111,8 +6154,8 @@
         </p:nvSpPr>
         <p:spPr>
           <a:xfrm>
-            <a:off x="439151" y="1333436"/>
-            <a:ext cx="11160127" cy="1538883"/>
+            <a:off x="439152" y="2920189"/>
+            <a:ext cx="11160127" cy="979435"/>
           </a:xfrm>
           <a:prstGeom prst="rect">
             <a:avLst/>
@@ -6143,91 +6186,28 @@
             </a:lvl1pPr>
           </a:lstStyle>
           <a:p>
-            <a:pPr marL="457200" indent="-457200">
-              <a:buFont typeface="+mj-lt"/>
-              <a:buAutoNum type="arabicPeriod"/>
-            </a:pPr>
-            <a:r>
-              <a:rPr lang="ru-RU" sz="2000" dirty="0" err="1" smtClean="0">
-                <a:latin typeface="Arial" panose="020B0604020202020204" pitchFamily="34" charset="0"/>
-                <a:cs typeface="Arial" panose="020B0604020202020204" pitchFamily="34" charset="0"/>
-              </a:rPr>
-              <a:t>Гитхаб</a:t>
-            </a:r>
-            <a:r>
-              <a:rPr lang="ru-RU" sz="2000" dirty="0" smtClean="0">
-                <a:latin typeface="Arial" panose="020B0604020202020204" pitchFamily="34" charset="0"/>
-                <a:cs typeface="Arial" panose="020B0604020202020204" pitchFamily="34" charset="0"/>
-              </a:rPr>
-              <a:t> проекта: </a:t>
-            </a:r>
-            <a:r>
-              <a:rPr lang="en-US" sz="2000" dirty="0" smtClean="0">
-                <a:latin typeface="Arial" panose="020B0604020202020204" pitchFamily="34" charset="0"/>
-                <a:cs typeface="Arial" panose="020B0604020202020204" pitchFamily="34" charset="0"/>
-                <a:hlinkClick r:id="rId2"/>
-              </a:rPr>
-              <a:t>https://github.com/Olmeor/Data-engineer_Rostelecom_programming_school</a:t>
-            </a:r>
-            <a:endParaRPr lang="ru-RU" sz="2000" dirty="0" smtClean="0">
-              <a:latin typeface="Arial" panose="020B0604020202020204" pitchFamily="34" charset="0"/>
-              <a:cs typeface="Arial" panose="020B0604020202020204" pitchFamily="34" charset="0"/>
-            </a:endParaRPr>
-          </a:p>
-          <a:p>
-            <a:pPr marL="457200" indent="-457200">
-              <a:buFont typeface="+mj-lt"/>
-              <a:buAutoNum type="arabicPeriod"/>
-            </a:pPr>
-            <a:r>
-              <a:rPr lang="ru-RU" sz="2000" dirty="0" smtClean="0">
-                <a:latin typeface="Arial" panose="020B0604020202020204" pitchFamily="34" charset="0"/>
-                <a:cs typeface="Arial" panose="020B0604020202020204" pitchFamily="34" charset="0"/>
-              </a:rPr>
-              <a:t>Рейтинг популярности телеканалов: </a:t>
-            </a:r>
-            <a:r>
-              <a:rPr lang="en-US" sz="2000" dirty="0">
-                <a:latin typeface="Arial" panose="020B0604020202020204" pitchFamily="34" charset="0"/>
-                <a:cs typeface="Arial" panose="020B0604020202020204" pitchFamily="34" charset="0"/>
-                <a:hlinkClick r:id="rId3"/>
-              </a:rPr>
-              <a:t>https://</a:t>
-            </a:r>
-            <a:r>
-              <a:rPr lang="en-US" sz="2000" dirty="0" smtClean="0">
-                <a:latin typeface="Arial" panose="020B0604020202020204" pitchFamily="34" charset="0"/>
-                <a:cs typeface="Arial" panose="020B0604020202020204" pitchFamily="34" charset="0"/>
-                <a:hlinkClick r:id="rId3"/>
-              </a:rPr>
-              <a:t>www.powernet.com.ru/channels-stat</a:t>
-            </a:r>
-            <a:endParaRPr lang="ru-RU" sz="2000" dirty="0" smtClean="0">
-              <a:latin typeface="Arial" panose="020B0604020202020204" pitchFamily="34" charset="0"/>
-              <a:cs typeface="Arial" panose="020B0604020202020204" pitchFamily="34" charset="0"/>
-            </a:endParaRPr>
-          </a:p>
-          <a:p>
-            <a:pPr marL="457200" indent="-457200">
-              <a:buFont typeface="+mj-lt"/>
-              <a:buAutoNum type="arabicPeriod"/>
-            </a:pPr>
-            <a:r>
-              <a:rPr lang="ru-RU" sz="2000" dirty="0" smtClean="0">
-                <a:latin typeface="Arial" panose="020B0604020202020204" pitchFamily="34" charset="0"/>
-                <a:cs typeface="Arial" panose="020B0604020202020204" pitchFamily="34" charset="0"/>
-              </a:rPr>
-              <a:t>Аналитика просмотров: </a:t>
-            </a:r>
-            <a:r>
-              <a:rPr lang="en-US" sz="2000" dirty="0">
-                <a:latin typeface="Arial" panose="020B0604020202020204" pitchFamily="34" charset="0"/>
-                <a:cs typeface="Arial" panose="020B0604020202020204" pitchFamily="34" charset="0"/>
-                <a:hlinkClick r:id="rId4"/>
-              </a:rPr>
-              <a:t>https://journal.tinkoff.ru/television-stat/</a:t>
-            </a:r>
-            <a:endParaRPr lang="ru-RU" sz="2000" dirty="0">
+            <a:r>
+              <a:rPr lang="ru-RU" dirty="0" smtClean="0">
+                <a:latin typeface="Arial" panose="020B0604020202020204" pitchFamily="34" charset="0"/>
+                <a:cs typeface="Arial" panose="020B0604020202020204" pitchFamily="34" charset="0"/>
+              </a:rPr>
+              <a:t>Основные итоги вашей работы</a:t>
+            </a:r>
+            <a:r>
+              <a:rPr lang="en-US" dirty="0" smtClean="0">
+                <a:latin typeface="Arial" panose="020B0604020202020204" pitchFamily="34" charset="0"/>
+                <a:cs typeface="Arial" panose="020B0604020202020204" pitchFamily="34" charset="0"/>
+              </a:rPr>
+              <a:t>,</a:t>
+            </a:r>
+            <a:r>
+              <a:rPr lang="ru-RU" dirty="0" smtClean="0">
+                <a:latin typeface="Arial" panose="020B0604020202020204" pitchFamily="34" charset="0"/>
+                <a:cs typeface="Arial" panose="020B0604020202020204" pitchFamily="34" charset="0"/>
+              </a:rPr>
+              <a:t> инсайты после работы с данными и графики</a:t>
+            </a:r>
+            <a:endParaRPr lang="ru-RU" dirty="0">
               <a:latin typeface="Arial" panose="020B0604020202020204" pitchFamily="34" charset="0"/>
               <a:cs typeface="Arial" panose="020B0604020202020204" pitchFamily="34" charset="0"/>
             </a:endParaRPr>
@@ -6289,6 +6269,348 @@
           </a:lstStyle>
           <a:p>
             <a:r>
+              <a:rPr lang="ru-RU" b="1" dirty="0">
+                <a:effectLst/>
+                <a:latin typeface="Arial" panose="020B0604020202020204" pitchFamily="34" charset="0"/>
+                <a:cs typeface="Arial" panose="020B0604020202020204" pitchFamily="34" charset="0"/>
+              </a:rPr>
+              <a:t>Итоги и инсайты</a:t>
+            </a:r>
+            <a:endParaRPr lang="ru-RU" b="1" dirty="0">
+              <a:latin typeface="Arial" panose="020B0604020202020204" pitchFamily="34" charset="0"/>
+              <a:cs typeface="Arial" panose="020B0604020202020204" pitchFamily="34" charset="0"/>
+            </a:endParaRPr>
+          </a:p>
+        </p:txBody>
+      </p:sp>
+      <p:pic>
+        <p:nvPicPr>
+          <p:cNvPr id="7" name="Рисунок 6"/>
+          <p:cNvPicPr>
+            <a:picLocks noChangeAspect="1"/>
+          </p:cNvPicPr>
+          <p:nvPr/>
+        </p:nvPicPr>
+        <p:blipFill>
+          <a:blip r:embed="rId2">
+            <a:extLst>
+              <a:ext uri="{28A0092B-C50C-407E-A947-70E740481C1C}">
+                <a14:useLocalDpi xmlns:a14="http://schemas.microsoft.com/office/drawing/2010/main" val="0"/>
+              </a:ext>
+            </a:extLst>
+          </a:blip>
+          <a:stretch>
+            <a:fillRect/>
+          </a:stretch>
+        </p:blipFill>
+        <p:spPr>
+          <a:xfrm>
+            <a:off x="9464774" y="532515"/>
+            <a:ext cx="2134504" cy="551243"/>
+          </a:xfrm>
+          <a:prstGeom prst="rect">
+            <a:avLst/>
+          </a:prstGeom>
+        </p:spPr>
+      </p:pic>
+    </p:spTree>
+    <p:extLst>
+      <p:ext uri="{BB962C8B-B14F-4D97-AF65-F5344CB8AC3E}">
+        <p14:creationId xmlns:p14="http://schemas.microsoft.com/office/powerpoint/2010/main" val="921795148"/>
+      </p:ext>
+    </p:extLst>
+  </p:cSld>
+  <p:clrMapOvr>
+    <a:masterClrMapping/>
+  </p:clrMapOvr>
+  <p:timing>
+    <p:tnLst>
+      <p:par>
+        <p:cTn id="1" dur="indefinite" restart="never" nodeType="tmRoot"/>
+      </p:par>
+    </p:tnLst>
+  </p:timing>
+</p:sld>
+</file>
+
+<file path=ppt/slides/slide18.xml><?xml version="1.0" encoding="utf-8"?>
+<p:sld xmlns:a="http://schemas.openxmlformats.org/drawingml/2006/main" xmlns:r="http://schemas.openxmlformats.org/officeDocument/2006/relationships" xmlns:p="http://schemas.openxmlformats.org/presentationml/2006/main">
+  <p:cSld>
+    <p:bg>
+      <p:bgPr>
+        <a:solidFill>
+          <a:schemeClr val="bg1"/>
+        </a:solidFill>
+        <a:effectLst/>
+      </p:bgPr>
+    </p:bg>
+    <p:spTree>
+      <p:nvGrpSpPr>
+        <p:cNvPr id="1" name=""/>
+        <p:cNvGrpSpPr/>
+        <p:nvPr/>
+      </p:nvGrpSpPr>
+      <p:grpSpPr>
+        <a:xfrm>
+          <a:off x="0" y="0"/>
+          <a:ext cx="0" cy="0"/>
+          <a:chOff x="0" y="0"/>
+          <a:chExt cx="0" cy="0"/>
+        </a:xfrm>
+      </p:grpSpPr>
+      <p:sp>
+        <p:nvSpPr>
+          <p:cNvPr id="11" name="Номер слайда 3">
+            <a:extLst>
+              <a:ext uri="{FF2B5EF4-FFF2-40B4-BE49-F238E27FC236}">
+                <a16:creationId xmlns:a16="http://schemas.microsoft.com/office/drawing/2014/main" id="{7267A4CF-F0C4-43DD-AD58-96564CA7C221}"/>
+              </a:ext>
+            </a:extLst>
+          </p:cNvPr>
+          <p:cNvSpPr>
+            <a:spLocks noGrp="1"/>
+          </p:cNvSpPr>
+          <p:nvPr>
+            <p:ph type="sldNum" sz="quarter" idx="12"/>
+          </p:nvPr>
+        </p:nvSpPr>
+        <p:spPr>
+          <a:xfrm>
+            <a:off x="515939" y="6393284"/>
+            <a:ext cx="2743200" cy="365125"/>
+          </a:xfrm>
+          <a:prstGeom prst="rect">
+            <a:avLst/>
+          </a:prstGeom>
+        </p:spPr>
+        <p:txBody>
+          <a:bodyPr lIns="0" rIns="0"/>
+          <a:lstStyle>
+            <a:lvl1pPr>
+              <a:defRPr sz="1200">
+                <a:solidFill>
+                  <a:schemeClr val="bg1">
+                    <a:lumMod val="75000"/>
+                  </a:schemeClr>
+                </a:solidFill>
+              </a:defRPr>
+            </a:lvl1pPr>
+          </a:lstStyle>
+          <a:p>
+            <a:pPr algn="l"/>
+            <a:fld id="{A4D4834B-A5E3-4581-856C-72DC1D7E0BCC}" type="slidenum">
+              <a:rPr lang="ru-RU" smtClean="0">
+                <a:solidFill>
+                  <a:schemeClr val="tx1"/>
+                </a:solidFill>
+                <a:latin typeface="Rostelecom Basis" panose="020B0503030604040103" pitchFamily="34" charset="0"/>
+              </a:rPr>
+              <a:pPr algn="l"/>
+              <a:t>18</a:t>
+            </a:fld>
+            <a:endParaRPr lang="ru-RU" dirty="0">
+              <a:solidFill>
+                <a:schemeClr val="tx1"/>
+              </a:solidFill>
+              <a:latin typeface="Rostelecom Basis" panose="020B0503030604040103" pitchFamily="34" charset="0"/>
+            </a:endParaRPr>
+          </a:p>
+        </p:txBody>
+      </p:sp>
+      <p:sp>
+        <p:nvSpPr>
+          <p:cNvPr id="5" name="Заголовок 1">
+            <a:extLst>
+              <a:ext uri="{FF2B5EF4-FFF2-40B4-BE49-F238E27FC236}">
+                <a16:creationId xmlns:a16="http://schemas.microsoft.com/office/drawing/2014/main" id="{26F3F6DE-0B95-4A88-A2DE-D547275A4F55}"/>
+              </a:ext>
+            </a:extLst>
+          </p:cNvPr>
+          <p:cNvSpPr txBox="1">
+            <a:spLocks/>
+          </p:cNvSpPr>
+          <p:nvPr/>
+        </p:nvSpPr>
+        <p:spPr>
+          <a:xfrm>
+            <a:off x="439151" y="1333436"/>
+            <a:ext cx="11160127" cy="1538883"/>
+          </a:xfrm>
+          <a:prstGeom prst="rect">
+            <a:avLst/>
+          </a:prstGeom>
+        </p:spPr>
+        <p:txBody>
+          <a:bodyPr lIns="0" tIns="0" rIns="0" bIns="0" anchor="t" anchorCtr="0">
+            <a:spAutoFit/>
+          </a:bodyPr>
+          <a:lstStyle>
+            <a:defPPr>
+              <a:defRPr lang="ru-RU"/>
+            </a:defPPr>
+            <a:lvl1pPr>
+              <a:lnSpc>
+                <a:spcPts val="4000"/>
+              </a:lnSpc>
+              <a:spcBef>
+                <a:spcPct val="0"/>
+              </a:spcBef>
+              <a:buNone/>
+              <a:defRPr sz="2800" b="0">
+                <a:effectLst/>
+                <a:latin typeface="Rostelecom Basis Medium" panose="020B0603030604040103" pitchFamily="34" charset="0"/>
+                <a:ea typeface="+mj-ea"/>
+                <a:cs typeface="+mj-cs"/>
+              </a:defRPr>
+            </a:lvl1pPr>
+          </a:lstStyle>
+          <a:p>
+            <a:pPr marL="457200" indent="-457200">
+              <a:buFont typeface="+mj-lt"/>
+              <a:buAutoNum type="arabicPeriod"/>
+            </a:pPr>
+            <a:r>
+              <a:rPr lang="ru-RU" sz="2000" dirty="0" err="1" smtClean="0">
+                <a:latin typeface="Arial" panose="020B0604020202020204" pitchFamily="34" charset="0"/>
+                <a:cs typeface="Arial" panose="020B0604020202020204" pitchFamily="34" charset="0"/>
+              </a:rPr>
+              <a:t>Гитхаб</a:t>
+            </a:r>
+            <a:r>
+              <a:rPr lang="ru-RU" sz="2000" dirty="0" smtClean="0">
+                <a:latin typeface="Arial" panose="020B0604020202020204" pitchFamily="34" charset="0"/>
+                <a:cs typeface="Arial" panose="020B0604020202020204" pitchFamily="34" charset="0"/>
+              </a:rPr>
+              <a:t> проекта: </a:t>
+            </a:r>
+            <a:r>
+              <a:rPr lang="en-US" sz="2000" dirty="0" smtClean="0">
+                <a:latin typeface="Arial" panose="020B0604020202020204" pitchFamily="34" charset="0"/>
+                <a:cs typeface="Arial" panose="020B0604020202020204" pitchFamily="34" charset="0"/>
+                <a:hlinkClick r:id="rId2"/>
+              </a:rPr>
+              <a:t>https://github.com/Olmeor/Data-engineer_Rostelecom_programming_school</a:t>
+            </a:r>
+            <a:endParaRPr lang="ru-RU" sz="2000" dirty="0" smtClean="0">
+              <a:latin typeface="Arial" panose="020B0604020202020204" pitchFamily="34" charset="0"/>
+              <a:cs typeface="Arial" panose="020B0604020202020204" pitchFamily="34" charset="0"/>
+            </a:endParaRPr>
+          </a:p>
+          <a:p>
+            <a:pPr marL="457200" indent="-457200">
+              <a:buFont typeface="+mj-lt"/>
+              <a:buAutoNum type="arabicPeriod"/>
+            </a:pPr>
+            <a:r>
+              <a:rPr lang="ru-RU" sz="2000" dirty="0" smtClean="0">
+                <a:latin typeface="Arial" panose="020B0604020202020204" pitchFamily="34" charset="0"/>
+                <a:cs typeface="Arial" panose="020B0604020202020204" pitchFamily="34" charset="0"/>
+              </a:rPr>
+              <a:t>Рейтинг популярности телеканалов: </a:t>
+            </a:r>
+            <a:r>
+              <a:rPr lang="en-US" sz="2000" dirty="0">
+                <a:latin typeface="Arial" panose="020B0604020202020204" pitchFamily="34" charset="0"/>
+                <a:cs typeface="Arial" panose="020B0604020202020204" pitchFamily="34" charset="0"/>
+                <a:hlinkClick r:id="rId3"/>
+              </a:rPr>
+              <a:t>https://</a:t>
+            </a:r>
+            <a:r>
+              <a:rPr lang="en-US" sz="2000" dirty="0" smtClean="0">
+                <a:latin typeface="Arial" panose="020B0604020202020204" pitchFamily="34" charset="0"/>
+                <a:cs typeface="Arial" panose="020B0604020202020204" pitchFamily="34" charset="0"/>
+                <a:hlinkClick r:id="rId3"/>
+              </a:rPr>
+              <a:t>www.powernet.com.ru/channels-stat</a:t>
+            </a:r>
+            <a:endParaRPr lang="ru-RU" sz="2000" dirty="0" smtClean="0">
+              <a:latin typeface="Arial" panose="020B0604020202020204" pitchFamily="34" charset="0"/>
+              <a:cs typeface="Arial" panose="020B0604020202020204" pitchFamily="34" charset="0"/>
+            </a:endParaRPr>
+          </a:p>
+          <a:p>
+            <a:pPr marL="457200" indent="-457200">
+              <a:buFont typeface="+mj-lt"/>
+              <a:buAutoNum type="arabicPeriod"/>
+            </a:pPr>
+            <a:r>
+              <a:rPr lang="ru-RU" sz="2000" dirty="0" smtClean="0">
+                <a:latin typeface="Arial" panose="020B0604020202020204" pitchFamily="34" charset="0"/>
+                <a:cs typeface="Arial" panose="020B0604020202020204" pitchFamily="34" charset="0"/>
+              </a:rPr>
+              <a:t>Аналитика просмотров: </a:t>
+            </a:r>
+            <a:r>
+              <a:rPr lang="en-US" sz="2000" dirty="0">
+                <a:latin typeface="Arial" panose="020B0604020202020204" pitchFamily="34" charset="0"/>
+                <a:cs typeface="Arial" panose="020B0604020202020204" pitchFamily="34" charset="0"/>
+                <a:hlinkClick r:id="rId4"/>
+              </a:rPr>
+              <a:t>https://journal.tinkoff.ru/television-stat/</a:t>
+            </a:r>
+            <a:endParaRPr lang="ru-RU" sz="2000" dirty="0">
+              <a:latin typeface="Arial" panose="020B0604020202020204" pitchFamily="34" charset="0"/>
+              <a:cs typeface="Arial" panose="020B0604020202020204" pitchFamily="34" charset="0"/>
+            </a:endParaRPr>
+          </a:p>
+        </p:txBody>
+      </p:sp>
+      <p:sp>
+        <p:nvSpPr>
+          <p:cNvPr id="6" name="Заголовок 1">
+            <a:extLst>
+              <a:ext uri="{FF2B5EF4-FFF2-40B4-BE49-F238E27FC236}">
+                <a16:creationId xmlns:a16="http://schemas.microsoft.com/office/drawing/2014/main" id="{26F3F6DE-0B95-4A88-A2DE-D547275A4F55}"/>
+              </a:ext>
+            </a:extLst>
+          </p:cNvPr>
+          <p:cNvSpPr txBox="1">
+            <a:spLocks/>
+          </p:cNvSpPr>
+          <p:nvPr/>
+        </p:nvSpPr>
+        <p:spPr>
+          <a:xfrm>
+            <a:off x="439151" y="560538"/>
+            <a:ext cx="11160127" cy="523220"/>
+          </a:xfrm>
+          <a:prstGeom prst="rect">
+            <a:avLst/>
+          </a:prstGeom>
+        </p:spPr>
+        <p:txBody>
+          <a:bodyPr lIns="0" tIns="0" rIns="0" bIns="0" anchor="t" anchorCtr="0">
+            <a:spAutoFit/>
+          </a:bodyPr>
+          <a:lstStyle>
+            <a:lvl1pPr algn="l" defTabSz="914400" rtl="0" eaLnBrk="1" latinLnBrk="0" hangingPunct="1">
+              <a:lnSpc>
+                <a:spcPts val="4000"/>
+              </a:lnSpc>
+              <a:spcBef>
+                <a:spcPct val="0"/>
+              </a:spcBef>
+              <a:buNone/>
+              <a:defRPr sz="3600" b="0" kern="1200">
+                <a:solidFill>
+                  <a:schemeClr val="tx1"/>
+                </a:solidFill>
+                <a:effectLst>
+                  <a:outerShdw blurRad="38100" dist="38100" dir="2700000" algn="tl">
+                    <a:srgbClr val="000000">
+                      <a:alpha val="43137"/>
+                    </a:srgbClr>
+                  </a:outerShdw>
+                </a:effectLst>
+                <a:latin typeface="Rostelecom Basis Medium" panose="020B0603030604040103" pitchFamily="34" charset="0"/>
+                <a:ea typeface="+mj-ea"/>
+                <a:cs typeface="+mj-cs"/>
+              </a:defRPr>
+            </a:lvl1pPr>
+          </a:lstStyle>
+          <a:p>
+            <a:r>
               <a:rPr lang="ru-RU" b="1" dirty="0" smtClean="0">
                 <a:effectLst/>
                 <a:latin typeface="Arial" panose="020B0604020202020204" pitchFamily="34" charset="0"/>
@@ -6353,7 +6675,7 @@
 </p:sld>
 </file>
 
-<file path=ppt/slides/slide18.xml><?xml version="1.0" encoding="utf-8"?>
+<file path=ppt/slides/slide19.xml><?xml version="1.0" encoding="utf-8"?>
 <p:sld xmlns:a="http://schemas.openxmlformats.org/drawingml/2006/main" xmlns:r="http://schemas.openxmlformats.org/officeDocument/2006/relationships" xmlns:p="http://schemas.openxmlformats.org/presentationml/2006/main">
   <p:cSld>
     <p:bg>
@@ -7394,7 +7716,15 @@
                 <a:latin typeface="Arial" panose="020B0604020202020204" pitchFamily="34" charset="0"/>
                 <a:cs typeface="Arial" panose="020B0604020202020204" pitchFamily="34" charset="0"/>
               </a:rPr>
-              <a:t>и сохранять их в HDFS для долгосрочного хранения в </a:t>
+              <a:t>и сохранять их в HDFS </a:t>
+            </a:r>
+            <a:r>
+              <a:rPr lang="ru-RU" sz="2000" dirty="0" smtClean="0">
+                <a:effectLst/>
+                <a:latin typeface="Arial" panose="020B0604020202020204" pitchFamily="34" charset="0"/>
+                <a:cs typeface="Arial" panose="020B0604020202020204" pitchFamily="34" charset="0"/>
+              </a:rPr>
+              <a:t>в </a:t>
             </a:r>
             <a:r>
               <a:rPr lang="ru-RU" sz="2000" dirty="0" smtClean="0">
@@ -9599,7 +9929,7 @@
         <p:spPr>
           <a:xfrm>
             <a:off x="107458" y="1512731"/>
-            <a:ext cx="11491820" cy="1154162"/>
+            <a:ext cx="11491820" cy="769441"/>
           </a:xfrm>
           <a:prstGeom prst="rect">
             <a:avLst/>
@@ -9640,7 +9970,21 @@
                 <a:latin typeface="Arial" panose="020B0604020202020204" pitchFamily="34" charset="0"/>
                 <a:cs typeface="Arial" panose="020B0604020202020204" pitchFamily="34" charset="0"/>
               </a:rPr>
-              <a:t>Создание потребителя на Python для RT.Streaming, который будет читать данные и сохранять их в HDFS для долгосрочного хранения в формате </a:t>
+              <a:t>Создание потребителя на Python для RT.Streaming, который будет читать данные и сохранять их в HDFS </a:t>
+            </a:r>
+            <a:r>
+              <a:rPr lang="ru-RU" dirty="0" smtClean="0">
+                <a:latin typeface="Arial" panose="020B0604020202020204" pitchFamily="34" charset="0"/>
+                <a:cs typeface="Arial" panose="020B0604020202020204" pitchFamily="34" charset="0"/>
+              </a:rPr>
+              <a:t>в </a:t>
+            </a:r>
+            <a:r>
+              <a:rPr lang="ru-RU" dirty="0">
+                <a:latin typeface="Arial" panose="020B0604020202020204" pitchFamily="34" charset="0"/>
+                <a:cs typeface="Arial" panose="020B0604020202020204" pitchFamily="34" charset="0"/>
+              </a:rPr>
+              <a:t>формате </a:t>
             </a:r>
             <a:r>
               <a:rPr lang="en-US" dirty="0">

</xml_diff>

<commit_message>
fix: add mv to Hive for work in GP
</commit_message>
<xml_diff>
--- a/Сertification/presentation.pptx
+++ b/Сertification/presentation.pptx
@@ -4737,7 +4737,7 @@
       </p:pic>
       <p:pic>
         <p:nvPicPr>
-          <p:cNvPr id="2" name="Рисунок 1"/>
+          <p:cNvPr id="4" name="Рисунок 3"/>
           <p:cNvPicPr>
             <a:picLocks noChangeAspect="1"/>
           </p:cNvPicPr>
@@ -4751,8 +4751,8 @@
         </p:blipFill>
         <p:spPr>
           <a:xfrm>
-            <a:off x="1494783" y="1623760"/>
-            <a:ext cx="9202434" cy="3610479"/>
+            <a:off x="1985389" y="5290423"/>
+            <a:ext cx="8221222" cy="1200318"/>
           </a:xfrm>
           <a:prstGeom prst="rect">
             <a:avLst/>
@@ -4761,7 +4761,7 @@
       </p:pic>
       <p:pic>
         <p:nvPicPr>
-          <p:cNvPr id="4" name="Рисунок 3"/>
+          <p:cNvPr id="3" name="Рисунок 2"/>
           <p:cNvPicPr>
             <a:picLocks noChangeAspect="1"/>
           </p:cNvPicPr>
@@ -4775,14 +4775,54 @@
         </p:blipFill>
         <p:spPr>
           <a:xfrm>
-            <a:off x="1985389" y="5290423"/>
-            <a:ext cx="8221222" cy="1200318"/>
+            <a:off x="471114" y="1609908"/>
+            <a:ext cx="6306430" cy="3581900"/>
           </a:xfrm>
           <a:prstGeom prst="rect">
             <a:avLst/>
           </a:prstGeom>
         </p:spPr>
       </p:pic>
+      <p:sp>
+        <p:nvSpPr>
+          <p:cNvPr id="8" name="Прямоугольник 7"/>
+          <p:cNvSpPr/>
+          <p:nvPr/>
+        </p:nvSpPr>
+        <p:spPr>
+          <a:xfrm>
+            <a:off x="8001062" y="2536280"/>
+            <a:ext cx="3647815" cy="646331"/>
+          </a:xfrm>
+          <a:prstGeom prst="rect">
+            <a:avLst/>
+          </a:prstGeom>
+        </p:spPr>
+        <p:txBody>
+          <a:bodyPr wrap="square">
+            <a:spAutoFit/>
+          </a:bodyPr>
+          <a:lstStyle/>
+          <a:p>
+            <a:pPr algn="r"/>
+            <a:r>
+              <a:rPr lang="ru-RU" dirty="0" smtClean="0">
+                <a:latin typeface="Arial" panose="020B0604020202020204" pitchFamily="34" charset="0"/>
+                <a:cs typeface="Arial" panose="020B0604020202020204" pitchFamily="34" charset="0"/>
+              </a:rPr>
+              <a:t>Создаем </a:t>
+            </a:r>
+            <a:r>
+              <a:rPr lang="ru-RU" dirty="0">
+                <a:latin typeface="Arial" panose="020B0604020202020204" pitchFamily="34" charset="0"/>
+                <a:cs typeface="Arial" panose="020B0604020202020204" pitchFamily="34" charset="0"/>
+              </a:rPr>
+              <a:t>материализованное представление</a:t>
+            </a:r>
+            <a:endParaRPr lang="ru-RU" dirty="0"/>
+          </a:p>
+        </p:txBody>
+      </p:sp>
     </p:spTree>
     <p:extLst>
       <p:ext uri="{BB962C8B-B14F-4D97-AF65-F5344CB8AC3E}">
@@ -5055,7 +5095,7 @@
       </p:pic>
       <p:pic>
         <p:nvPicPr>
-          <p:cNvPr id="10" name="Рисунок 9"/>
+          <p:cNvPr id="3" name="Рисунок 2"/>
           <p:cNvPicPr>
             <a:picLocks noChangeAspect="1"/>
           </p:cNvPicPr>
@@ -5069,8 +5109,8 @@
         </p:blipFill>
         <p:spPr>
           <a:xfrm>
-            <a:off x="439151" y="2036013"/>
-            <a:ext cx="5334744" cy="3477110"/>
+            <a:off x="439151" y="2083225"/>
+            <a:ext cx="5268060" cy="3296110"/>
           </a:xfrm>
           <a:prstGeom prst="rect">
             <a:avLst/>
@@ -5689,7 +5729,7 @@
       </p:pic>
       <p:pic>
         <p:nvPicPr>
-          <p:cNvPr id="4" name="Рисунок 3"/>
+          <p:cNvPr id="8" name="Рисунок 7"/>
           <p:cNvPicPr>
             <a:picLocks noChangeAspect="1"/>
           </p:cNvPicPr>
@@ -5703,8 +5743,8 @@
         </p:blipFill>
         <p:spPr>
           <a:xfrm>
-            <a:off x="439151" y="2359407"/>
-            <a:ext cx="4982270" cy="3896269"/>
+            <a:off x="5931112" y="1696804"/>
+            <a:ext cx="5668166" cy="4696480"/>
           </a:xfrm>
           <a:prstGeom prst="rect">
             <a:avLst/>
@@ -5713,7 +5753,7 @@
       </p:pic>
       <p:pic>
         <p:nvPicPr>
-          <p:cNvPr id="8" name="Рисунок 7"/>
+          <p:cNvPr id="9" name="Рисунок 8"/>
           <p:cNvPicPr>
             <a:picLocks noChangeAspect="1"/>
           </p:cNvPicPr>
@@ -5727,8 +5767,8 @@
         </p:blipFill>
         <p:spPr>
           <a:xfrm>
-            <a:off x="5931112" y="1696804"/>
-            <a:ext cx="5668166" cy="4696480"/>
+            <a:off x="439151" y="2386573"/>
+            <a:ext cx="4981575" cy="3895725"/>
           </a:xfrm>
           <a:prstGeom prst="rect">
             <a:avLst/>
@@ -7724,15 +7764,7 @@
                 <a:latin typeface="Arial" panose="020B0604020202020204" pitchFamily="34" charset="0"/>
                 <a:cs typeface="Arial" panose="020B0604020202020204" pitchFamily="34" charset="0"/>
               </a:rPr>
-              <a:t>в </a:t>
-            </a:r>
-            <a:r>
-              <a:rPr lang="ru-RU" sz="2000" dirty="0" smtClean="0">
-                <a:effectLst/>
-                <a:latin typeface="Arial" panose="020B0604020202020204" pitchFamily="34" charset="0"/>
-                <a:cs typeface="Arial" panose="020B0604020202020204" pitchFamily="34" charset="0"/>
-              </a:rPr>
-              <a:t>формате </a:t>
+              <a:t>в формате </a:t>
             </a:r>
             <a:r>
               <a:rPr lang="en-US" sz="2000" dirty="0" smtClean="0">

</xml_diff>

<commit_message>
feat: add task 4 solutions and update presentation
</commit_message>
<xml_diff>
--- a/Сertification/presentation.pptx
+++ b/Сertification/presentation.pptx
@@ -5,7 +5,7 @@
     <p:sldMasterId id="2147483648" r:id="rId1"/>
   </p:sldMasterIdLst>
   <p:notesMasterIdLst>
-    <p:notesMasterId r:id="rId21"/>
+    <p:notesMasterId r:id="rId22"/>
   </p:notesMasterIdLst>
   <p:sldIdLst>
     <p:sldId id="281" r:id="rId2"/>
@@ -22,11 +22,12 @@
     <p:sldId id="302" r:id="rId13"/>
     <p:sldId id="303" r:id="rId14"/>
     <p:sldId id="299" r:id="rId15"/>
-    <p:sldId id="298" r:id="rId16"/>
-    <p:sldId id="304" r:id="rId17"/>
-    <p:sldId id="288" r:id="rId18"/>
-    <p:sldId id="291" r:id="rId19"/>
-    <p:sldId id="289" r:id="rId20"/>
+    <p:sldId id="288" r:id="rId16"/>
+    <p:sldId id="298" r:id="rId17"/>
+    <p:sldId id="304" r:id="rId18"/>
+    <p:sldId id="305" r:id="rId19"/>
+    <p:sldId id="291" r:id="rId20"/>
+    <p:sldId id="289" r:id="rId21"/>
   </p:sldIdLst>
   <p:sldSz cx="12192000" cy="6858000"/>
   <p:notesSz cx="6858000" cy="9144000"/>
@@ -4759,9 +4760,49 @@
           </a:prstGeom>
         </p:spPr>
       </p:pic>
+      <p:sp>
+        <p:nvSpPr>
+          <p:cNvPr id="8" name="Прямоугольник 7"/>
+          <p:cNvSpPr/>
+          <p:nvPr/>
+        </p:nvSpPr>
+        <p:spPr>
+          <a:xfrm>
+            <a:off x="8001062" y="2536280"/>
+            <a:ext cx="3647815" cy="830997"/>
+          </a:xfrm>
+          <a:prstGeom prst="rect">
+            <a:avLst/>
+          </a:prstGeom>
+        </p:spPr>
+        <p:txBody>
+          <a:bodyPr wrap="square">
+            <a:spAutoFit/>
+          </a:bodyPr>
+          <a:lstStyle/>
+          <a:p>
+            <a:pPr algn="r"/>
+            <a:r>
+              <a:rPr lang="ru-RU" sz="2400" dirty="0" smtClean="0">
+                <a:latin typeface="Arial" panose="020B0604020202020204" pitchFamily="34" charset="0"/>
+                <a:cs typeface="Arial" panose="020B0604020202020204" pitchFamily="34" charset="0"/>
+              </a:rPr>
+              <a:t>Создаем </a:t>
+            </a:r>
+            <a:r>
+              <a:rPr lang="ru-RU" sz="2400" dirty="0" smtClean="0">
+                <a:latin typeface="Arial" panose="020B0604020202020204" pitchFamily="34" charset="0"/>
+                <a:cs typeface="Arial" panose="020B0604020202020204" pitchFamily="34" charset="0"/>
+              </a:rPr>
+              <a:t>виртуальную таблицу</a:t>
+            </a:r>
+            <a:endParaRPr lang="ru-RU" sz="2400" dirty="0"/>
+          </a:p>
+        </p:txBody>
+      </p:sp>
       <p:pic>
         <p:nvPicPr>
-          <p:cNvPr id="3" name="Рисунок 2"/>
+          <p:cNvPr id="5" name="Рисунок 4"/>
           <p:cNvPicPr>
             <a:picLocks noChangeAspect="1"/>
           </p:cNvPicPr>
@@ -4775,54 +4816,14 @@
         </p:blipFill>
         <p:spPr>
           <a:xfrm>
-            <a:off x="471114" y="1609908"/>
-            <a:ext cx="6306430" cy="3581900"/>
+            <a:off x="439151" y="1614483"/>
+            <a:ext cx="6382641" cy="3572374"/>
           </a:xfrm>
           <a:prstGeom prst="rect">
             <a:avLst/>
           </a:prstGeom>
         </p:spPr>
       </p:pic>
-      <p:sp>
-        <p:nvSpPr>
-          <p:cNvPr id="8" name="Прямоугольник 7"/>
-          <p:cNvSpPr/>
-          <p:nvPr/>
-        </p:nvSpPr>
-        <p:spPr>
-          <a:xfrm>
-            <a:off x="8001062" y="2536280"/>
-            <a:ext cx="3647815" cy="646331"/>
-          </a:xfrm>
-          <a:prstGeom prst="rect">
-            <a:avLst/>
-          </a:prstGeom>
-        </p:spPr>
-        <p:txBody>
-          <a:bodyPr wrap="square">
-            <a:spAutoFit/>
-          </a:bodyPr>
-          <a:lstStyle/>
-          <a:p>
-            <a:pPr algn="r"/>
-            <a:r>
-              <a:rPr lang="ru-RU" dirty="0" smtClean="0">
-                <a:latin typeface="Arial" panose="020B0604020202020204" pitchFamily="34" charset="0"/>
-                <a:cs typeface="Arial" panose="020B0604020202020204" pitchFamily="34" charset="0"/>
-              </a:rPr>
-              <a:t>Создаем </a:t>
-            </a:r>
-            <a:r>
-              <a:rPr lang="ru-RU" dirty="0">
-                <a:latin typeface="Arial" panose="020B0604020202020204" pitchFamily="34" charset="0"/>
-                <a:cs typeface="Arial" panose="020B0604020202020204" pitchFamily="34" charset="0"/>
-              </a:rPr>
-              <a:t>материализованное представление</a:t>
-            </a:r>
-            <a:endParaRPr lang="ru-RU" dirty="0"/>
-          </a:p>
-        </p:txBody>
-      </p:sp>
     </p:spTree>
     <p:extLst>
       <p:ext uri="{BB962C8B-B14F-4D97-AF65-F5344CB8AC3E}">
@@ -5095,7 +5096,7 @@
       </p:pic>
       <p:pic>
         <p:nvPicPr>
-          <p:cNvPr id="3" name="Рисунок 2"/>
+          <p:cNvPr id="2" name="Рисунок 1"/>
           <p:cNvPicPr>
             <a:picLocks noChangeAspect="1"/>
           </p:cNvPicPr>
@@ -5109,8 +5110,8 @@
         </p:blipFill>
         <p:spPr>
           <a:xfrm>
-            <a:off x="439151" y="2083225"/>
-            <a:ext cx="5268060" cy="3296110"/>
+            <a:off x="693996" y="2150183"/>
+            <a:ext cx="5325218" cy="3238952"/>
           </a:xfrm>
           <a:prstGeom prst="rect">
             <a:avLst/>
@@ -5223,7 +5224,7 @@
       </p:sp>
       <p:sp>
         <p:nvSpPr>
-          <p:cNvPr id="5" name="Заголовок 1">
+          <p:cNvPr id="6" name="Заголовок 1">
             <a:extLst>
               <a:ext uri="{FF2B5EF4-FFF2-40B4-BE49-F238E27FC236}">
                 <a16:creationId xmlns:a16="http://schemas.microsoft.com/office/drawing/2014/main" id="{26F3F6DE-0B95-4A88-A2DE-D547275A4F55}"/>
@@ -5237,119 +5238,8 @@
         </p:nvSpPr>
         <p:spPr>
           <a:xfrm>
-            <a:off x="439152" y="2920189"/>
-            <a:ext cx="11160127" cy="2051844"/>
-          </a:xfrm>
-          <a:prstGeom prst="rect">
-            <a:avLst/>
-          </a:prstGeom>
-        </p:spPr>
-        <p:txBody>
-          <a:bodyPr lIns="0" tIns="0" rIns="0" bIns="0" anchor="t" anchorCtr="0">
-            <a:spAutoFit/>
-          </a:bodyPr>
-          <a:lstStyle>
-            <a:defPPr>
-              <a:defRPr lang="ru-RU"/>
-            </a:defPPr>
-            <a:lvl1pPr>
-              <a:lnSpc>
-                <a:spcPts val="4000"/>
-              </a:lnSpc>
-              <a:spcBef>
-                <a:spcPct val="0"/>
-              </a:spcBef>
-              <a:buNone/>
-              <a:defRPr sz="2800" b="0">
-                <a:effectLst/>
-                <a:latin typeface="Rostelecom Basis Medium" panose="020B0603030604040103" pitchFamily="34" charset="0"/>
-                <a:ea typeface="+mj-ea"/>
-                <a:cs typeface="+mj-cs"/>
-              </a:defRPr>
-            </a:lvl1pPr>
-          </a:lstStyle>
-          <a:p>
-            <a:r>
-              <a:rPr lang="ru-RU" dirty="0" smtClean="0">
-                <a:latin typeface="Arial" panose="020B0604020202020204" pitchFamily="34" charset="0"/>
-                <a:cs typeface="Arial" panose="020B0604020202020204" pitchFamily="34" charset="0"/>
-              </a:rPr>
-              <a:t>На слайдах с решением расскажите о том</a:t>
-            </a:r>
-            <a:r>
-              <a:rPr lang="en-US" dirty="0" smtClean="0">
-                <a:latin typeface="Arial" panose="020B0604020202020204" pitchFamily="34" charset="0"/>
-                <a:cs typeface="Arial" panose="020B0604020202020204" pitchFamily="34" charset="0"/>
-              </a:rPr>
-              <a:t>,</a:t>
-            </a:r>
-            <a:r>
-              <a:rPr lang="ru-RU" dirty="0" smtClean="0">
-                <a:latin typeface="Arial" panose="020B0604020202020204" pitchFamily="34" charset="0"/>
-                <a:cs typeface="Arial" panose="020B0604020202020204" pitchFamily="34" charset="0"/>
-              </a:rPr>
-              <a:t> как вы решали поставленные задачи</a:t>
-            </a:r>
-            <a:r>
-              <a:rPr lang="en-US" dirty="0" smtClean="0">
-                <a:latin typeface="Arial" panose="020B0604020202020204" pitchFamily="34" charset="0"/>
-                <a:cs typeface="Arial" panose="020B0604020202020204" pitchFamily="34" charset="0"/>
-              </a:rPr>
-              <a:t>,</a:t>
-            </a:r>
-            <a:r>
-              <a:rPr lang="ru-RU" dirty="0" smtClean="0">
-                <a:latin typeface="Arial" panose="020B0604020202020204" pitchFamily="34" charset="0"/>
-                <a:cs typeface="Arial" panose="020B0604020202020204" pitchFamily="34" charset="0"/>
-              </a:rPr>
-              <a:t> что учитывали и что удалось сделать</a:t>
-            </a:r>
-            <a:r>
-              <a:rPr lang="en-US" dirty="0" smtClean="0">
-                <a:latin typeface="Arial" panose="020B0604020202020204" pitchFamily="34" charset="0"/>
-                <a:cs typeface="Arial" panose="020B0604020202020204" pitchFamily="34" charset="0"/>
-              </a:rPr>
-              <a:t>. </a:t>
-            </a:r>
-            <a:r>
-              <a:rPr lang="ru-RU" dirty="0" smtClean="0">
-                <a:latin typeface="Arial" panose="020B0604020202020204" pitchFamily="34" charset="0"/>
-                <a:cs typeface="Arial" panose="020B0604020202020204" pitchFamily="34" charset="0"/>
-              </a:rPr>
-              <a:t>Здесь можно дать ссылки на репозиторий или приложить некоторые скриншоты</a:t>
-            </a:r>
-            <a:r>
-              <a:rPr lang="en-US" dirty="0" smtClean="0">
-                <a:latin typeface="Arial" panose="020B0604020202020204" pitchFamily="34" charset="0"/>
-                <a:cs typeface="Arial" panose="020B0604020202020204" pitchFamily="34" charset="0"/>
-              </a:rPr>
-              <a:t>. </a:t>
-            </a:r>
-            <a:endParaRPr lang="ru-RU" dirty="0">
-              <a:latin typeface="Arial" panose="020B0604020202020204" pitchFamily="34" charset="0"/>
-              <a:cs typeface="Arial" panose="020B0604020202020204" pitchFamily="34" charset="0"/>
-            </a:endParaRPr>
-          </a:p>
-        </p:txBody>
-      </p:sp>
-      <p:sp>
-        <p:nvSpPr>
-          <p:cNvPr id="6" name="Заголовок 1">
-            <a:extLst>
-              <a:ext uri="{FF2B5EF4-FFF2-40B4-BE49-F238E27FC236}">
-                <a16:creationId xmlns:a16="http://schemas.microsoft.com/office/drawing/2014/main" id="{26F3F6DE-0B95-4A88-A2DE-D547275A4F55}"/>
-              </a:ext>
-            </a:extLst>
-          </p:cNvPr>
-          <p:cNvSpPr txBox="1">
-            <a:spLocks/>
-          </p:cNvSpPr>
-          <p:nvPr/>
-        </p:nvSpPr>
-        <p:spPr>
-          <a:xfrm>
             <a:off x="439151" y="560538"/>
-            <a:ext cx="11160127" cy="523220"/>
+            <a:ext cx="11160127" cy="512961"/>
           </a:xfrm>
           <a:prstGeom prst="rect">
             <a:avLst/>
@@ -5387,14 +5277,13 @@
           </a:lstStyle>
           <a:p>
             <a:r>
-              <a:rPr lang="ru-RU" b="1" dirty="0" smtClean="0">
-                <a:effectLst/>
-                <a:latin typeface="Arial" panose="020B0604020202020204" pitchFamily="34" charset="0"/>
-                <a:cs typeface="Arial" panose="020B0604020202020204" pitchFamily="34" charset="0"/>
-              </a:rPr>
-              <a:t>Решение</a:t>
-            </a:r>
-            <a:endParaRPr lang="ru-RU" b="1" dirty="0">
+              <a:rPr lang="ru-RU" sz="2800" dirty="0">
+                <a:effectLst/>
+              </a:rPr>
+              <a:t>Перенос данных в GreenPlum (RT.Warehouse)</a:t>
+            </a:r>
+            <a:endParaRPr lang="ru-RU" sz="2800" b="1" dirty="0">
+              <a:effectLst/>
               <a:latin typeface="Arial" panose="020B0604020202020204" pitchFamily="34" charset="0"/>
               <a:cs typeface="Arial" panose="020B0604020202020204" pitchFamily="34" charset="0"/>
             </a:endParaRPr>
@@ -5425,6 +5314,173 @@
           <a:xfrm>
             <a:off x="9464774" y="532515"/>
             <a:ext cx="2134504" cy="551243"/>
+          </a:xfrm>
+          <a:prstGeom prst="rect">
+            <a:avLst/>
+          </a:prstGeom>
+        </p:spPr>
+      </p:pic>
+      <p:sp>
+        <p:nvSpPr>
+          <p:cNvPr id="8" name="Заголовок 1">
+            <a:extLst>
+              <a:ext uri="{FF2B5EF4-FFF2-40B4-BE49-F238E27FC236}">
+                <a16:creationId xmlns:a16="http://schemas.microsoft.com/office/drawing/2014/main" id="{26F3F6DE-0B95-4A88-A2DE-D547275A4F55}"/>
+              </a:ext>
+            </a:extLst>
+          </p:cNvPr>
+          <p:cNvSpPr txBox="1">
+            <a:spLocks/>
+          </p:cNvSpPr>
+          <p:nvPr/>
+        </p:nvSpPr>
+        <p:spPr>
+          <a:xfrm>
+            <a:off x="501903" y="1191169"/>
+            <a:ext cx="4930708" cy="769441"/>
+          </a:xfrm>
+          <a:prstGeom prst="rect">
+            <a:avLst/>
+          </a:prstGeom>
+        </p:spPr>
+        <p:txBody>
+          <a:bodyPr wrap="square" lIns="0" tIns="0" rIns="0" bIns="0" anchor="t" anchorCtr="0">
+            <a:spAutoFit/>
+          </a:bodyPr>
+          <a:lstStyle>
+            <a:defPPr>
+              <a:defRPr lang="ru-RU"/>
+            </a:defPPr>
+            <a:lvl1pPr>
+              <a:lnSpc>
+                <a:spcPts val="4000"/>
+              </a:lnSpc>
+              <a:spcBef>
+                <a:spcPct val="0"/>
+              </a:spcBef>
+              <a:buNone/>
+              <a:defRPr sz="2800" b="0">
+                <a:effectLst/>
+                <a:latin typeface="Rostelecom Basis Medium" panose="020B0603030604040103" pitchFamily="34" charset="0"/>
+                <a:ea typeface="+mj-ea"/>
+                <a:cs typeface="+mj-cs"/>
+              </a:defRPr>
+            </a:lvl1pPr>
+          </a:lstStyle>
+          <a:p>
+            <a:pPr>
+              <a:lnSpc>
+                <a:spcPts val="3000"/>
+              </a:lnSpc>
+            </a:pPr>
+            <a:r>
+              <a:rPr lang="ru-RU" sz="2000" dirty="0" smtClean="0">
+                <a:latin typeface="Arial" panose="020B0604020202020204" pitchFamily="34" charset="0"/>
+                <a:cs typeface="Arial" panose="020B0604020202020204" pitchFamily="34" charset="0"/>
+              </a:rPr>
+              <a:t>Переносим </a:t>
+            </a:r>
+            <a:r>
+              <a:rPr lang="ru-RU" sz="2000" dirty="0" smtClean="0">
+                <a:latin typeface="Arial" panose="020B0604020202020204" pitchFamily="34" charset="0"/>
+                <a:cs typeface="Arial" panose="020B0604020202020204" pitchFamily="34" charset="0"/>
+              </a:rPr>
+              <a:t>обработанные из </a:t>
+            </a:r>
+            <a:r>
+              <a:rPr lang="en-US" sz="2000" dirty="0" smtClean="0">
+                <a:latin typeface="Arial" panose="020B0604020202020204" pitchFamily="34" charset="0"/>
+                <a:cs typeface="Arial" panose="020B0604020202020204" pitchFamily="34" charset="0"/>
+              </a:rPr>
+              <a:t>Hive</a:t>
+            </a:r>
+            <a:r>
+              <a:rPr lang="ru-RU" sz="2000" dirty="0" smtClean="0">
+                <a:latin typeface="Arial" panose="020B0604020202020204" pitchFamily="34" charset="0"/>
+                <a:cs typeface="Arial" panose="020B0604020202020204" pitchFamily="34" charset="0"/>
+              </a:rPr>
+              <a:t> в </a:t>
+            </a:r>
+            <a:r>
+              <a:rPr lang="en-US" sz="2000" dirty="0" smtClean="0">
+                <a:latin typeface="Arial" panose="020B0604020202020204" pitchFamily="34" charset="0"/>
+                <a:cs typeface="Arial" panose="020B0604020202020204" pitchFamily="34" charset="0"/>
+              </a:rPr>
+              <a:t>GreenPlum</a:t>
+            </a:r>
+            <a:endParaRPr lang="ru-RU" sz="2000" dirty="0">
+              <a:latin typeface="Arial" panose="020B0604020202020204" pitchFamily="34" charset="0"/>
+              <a:cs typeface="Arial" panose="020B0604020202020204" pitchFamily="34" charset="0"/>
+            </a:endParaRPr>
+          </a:p>
+        </p:txBody>
+      </p:sp>
+      <p:pic>
+        <p:nvPicPr>
+          <p:cNvPr id="5" name="Рисунок 4"/>
+          <p:cNvPicPr>
+            <a:picLocks noChangeAspect="1"/>
+          </p:cNvPicPr>
+          <p:nvPr/>
+        </p:nvPicPr>
+        <p:blipFill>
+          <a:blip r:embed="rId3"/>
+          <a:stretch>
+            <a:fillRect/>
+          </a:stretch>
+        </p:blipFill>
+        <p:spPr>
+          <a:xfrm>
+            <a:off x="501903" y="1961295"/>
+            <a:ext cx="4429743" cy="4467849"/>
+          </a:xfrm>
+          <a:prstGeom prst="rect">
+            <a:avLst/>
+          </a:prstGeom>
+        </p:spPr>
+      </p:pic>
+      <p:pic>
+        <p:nvPicPr>
+          <p:cNvPr id="9" name="Рисунок 8"/>
+          <p:cNvPicPr>
+            <a:picLocks noChangeAspect="1"/>
+          </p:cNvPicPr>
+          <p:nvPr/>
+        </p:nvPicPr>
+        <p:blipFill>
+          <a:blip r:embed="rId4"/>
+          <a:stretch>
+            <a:fillRect/>
+          </a:stretch>
+        </p:blipFill>
+        <p:spPr>
+          <a:xfrm>
+            <a:off x="9293906" y="1404936"/>
+            <a:ext cx="2305372" cy="4677428"/>
+          </a:xfrm>
+          <a:prstGeom prst="rect">
+            <a:avLst/>
+          </a:prstGeom>
+        </p:spPr>
+      </p:pic>
+      <p:pic>
+        <p:nvPicPr>
+          <p:cNvPr id="12" name="Рисунок 11"/>
+          <p:cNvPicPr>
+            <a:picLocks noChangeAspect="1"/>
+          </p:cNvPicPr>
+          <p:nvPr/>
+        </p:nvPicPr>
+        <p:blipFill>
+          <a:blip r:embed="rId5"/>
+          <a:stretch>
+            <a:fillRect/>
+          </a:stretch>
+        </p:blipFill>
+        <p:spPr>
+          <a:xfrm>
+            <a:off x="5326589" y="3210641"/>
+            <a:ext cx="3572374" cy="1781424"/>
           </a:xfrm>
           <a:prstGeom prst="rect">
             <a:avLst/>
@@ -5537,75 +5593,6 @@
       </p:sp>
       <p:sp>
         <p:nvSpPr>
-          <p:cNvPr id="5" name="Заголовок 1">
-            <a:extLst>
-              <a:ext uri="{FF2B5EF4-FFF2-40B4-BE49-F238E27FC236}">
-                <a16:creationId xmlns:a16="http://schemas.microsoft.com/office/drawing/2014/main" id="{26F3F6DE-0B95-4A88-A2DE-D547275A4F55}"/>
-              </a:ext>
-            </a:extLst>
-          </p:cNvPr>
-          <p:cNvSpPr txBox="1">
-            <a:spLocks/>
-          </p:cNvSpPr>
-          <p:nvPr/>
-        </p:nvSpPr>
-        <p:spPr>
-          <a:xfrm>
-            <a:off x="439151" y="1252752"/>
-            <a:ext cx="4930708" cy="512961"/>
-          </a:xfrm>
-          <a:prstGeom prst="rect">
-            <a:avLst/>
-          </a:prstGeom>
-        </p:spPr>
-        <p:txBody>
-          <a:bodyPr wrap="square" lIns="0" tIns="0" rIns="0" bIns="0" anchor="t" anchorCtr="0">
-            <a:spAutoFit/>
-          </a:bodyPr>
-          <a:lstStyle>
-            <a:defPPr>
-              <a:defRPr lang="ru-RU"/>
-            </a:defPPr>
-            <a:lvl1pPr>
-              <a:lnSpc>
-                <a:spcPts val="4000"/>
-              </a:lnSpc>
-              <a:spcBef>
-                <a:spcPct val="0"/>
-              </a:spcBef>
-              <a:buNone/>
-              <a:defRPr sz="2800" b="0">
-                <a:effectLst/>
-                <a:latin typeface="Rostelecom Basis Medium" panose="020B0603030604040103" pitchFamily="34" charset="0"/>
-                <a:ea typeface="+mj-ea"/>
-                <a:cs typeface="+mj-cs"/>
-              </a:defRPr>
-            </a:lvl1pPr>
-          </a:lstStyle>
-          <a:p>
-            <a:r>
-              <a:rPr lang="ru-RU" sz="2000" dirty="0" smtClean="0">
-                <a:latin typeface="Arial" panose="020B0604020202020204" pitchFamily="34" charset="0"/>
-                <a:cs typeface="Arial" panose="020B0604020202020204" pitchFamily="34" charset="0"/>
-              </a:rPr>
-              <a:t>Загружаем виртуальную таблицу из </a:t>
-            </a:r>
-            <a:r>
-              <a:rPr lang="en-US" sz="2000" dirty="0" smtClean="0">
-                <a:latin typeface="Arial" panose="020B0604020202020204" pitchFamily="34" charset="0"/>
-                <a:cs typeface="Arial" panose="020B0604020202020204" pitchFamily="34" charset="0"/>
-              </a:rPr>
-              <a:t>Hive</a:t>
-            </a:r>
-            <a:endParaRPr lang="ru-RU" sz="2000" dirty="0">
-              <a:latin typeface="Arial" panose="020B0604020202020204" pitchFamily="34" charset="0"/>
-              <a:cs typeface="Arial" panose="020B0604020202020204" pitchFamily="34" charset="0"/>
-            </a:endParaRPr>
-          </a:p>
-        </p:txBody>
-      </p:sp>
-      <p:sp>
-        <p:nvSpPr>
           <p:cNvPr id="6" name="Заголовок 1">
             <a:extLst>
               <a:ext uri="{FF2B5EF4-FFF2-40B4-BE49-F238E27FC236}">
@@ -5659,38 +5646,13 @@
           </a:lstStyle>
           <a:p>
             <a:r>
-              <a:rPr lang="ru-RU" sz="3200" dirty="0">
-                <a:effectLst/>
-                <a:latin typeface="Arial" panose="020B0604020202020204" pitchFamily="34" charset="0"/>
-                <a:cs typeface="Arial" panose="020B0604020202020204" pitchFamily="34" charset="0"/>
-              </a:rPr>
-              <a:t>Аналитика </a:t>
-            </a:r>
-            <a:r>
-              <a:rPr lang="ru-RU" sz="3200" dirty="0" smtClean="0">
-                <a:effectLst/>
-                <a:latin typeface="Arial" panose="020B0604020202020204" pitchFamily="34" charset="0"/>
-                <a:cs typeface="Arial" panose="020B0604020202020204" pitchFamily="34" charset="0"/>
-              </a:rPr>
-              <a:t>(</a:t>
-            </a:r>
-            <a:r>
-              <a:rPr lang="ru-RU" sz="3200" dirty="0">
-                <a:effectLst/>
-                <a:latin typeface="Arial" panose="020B0604020202020204" pitchFamily="34" charset="0"/>
-                <a:cs typeface="Arial" panose="020B0604020202020204" pitchFamily="34" charset="0"/>
-              </a:rPr>
-              <a:t>Apache Zeppelin + Apache </a:t>
-            </a:r>
-            <a:r>
-              <a:rPr lang="ru-RU" sz="3200" dirty="0" smtClean="0">
-                <a:effectLst/>
-                <a:latin typeface="Arial" panose="020B0604020202020204" pitchFamily="34" charset="0"/>
-                <a:cs typeface="Arial" panose="020B0604020202020204" pitchFamily="34" charset="0"/>
-              </a:rPr>
-              <a:t>Spark)</a:t>
-            </a:r>
-            <a:endParaRPr lang="ru-RU" sz="3200" b="1" dirty="0">
+              <a:rPr lang="ru-RU" sz="2800" dirty="0">
+                <a:effectLst/>
+              </a:rPr>
+              <a:t>Перенос данных в GreenPlum (RT.Warehouse)</a:t>
+            </a:r>
+            <a:endParaRPr lang="ru-RU" sz="2800" b="1" dirty="0">
+              <a:effectLst/>
               <a:latin typeface="Arial" panose="020B0604020202020204" pitchFamily="34" charset="0"/>
               <a:cs typeface="Arial" panose="020B0604020202020204" pitchFamily="34" charset="0"/>
             </a:endParaRPr>
@@ -5729,7 +5691,7 @@
       </p:pic>
       <p:pic>
         <p:nvPicPr>
-          <p:cNvPr id="8" name="Рисунок 7"/>
+          <p:cNvPr id="2" name="Рисунок 1"/>
           <p:cNvPicPr>
             <a:picLocks noChangeAspect="1"/>
           </p:cNvPicPr>
@@ -5743,8 +5705,8 @@
         </p:blipFill>
         <p:spPr>
           <a:xfrm>
-            <a:off x="5931112" y="1696804"/>
-            <a:ext cx="5668166" cy="4696480"/>
+            <a:off x="515939" y="1073499"/>
+            <a:ext cx="4752573" cy="5242976"/>
           </a:xfrm>
           <a:prstGeom prst="rect">
             <a:avLst/>
@@ -5753,7 +5715,7 @@
       </p:pic>
       <p:pic>
         <p:nvPicPr>
-          <p:cNvPr id="9" name="Рисунок 8"/>
+          <p:cNvPr id="3" name="Рисунок 2"/>
           <p:cNvPicPr>
             <a:picLocks noChangeAspect="1"/>
           </p:cNvPicPr>
@@ -5767,8 +5729,8 @@
         </p:blipFill>
         <p:spPr>
           <a:xfrm>
-            <a:off x="439151" y="2386573"/>
-            <a:ext cx="4981575" cy="3895725"/>
+            <a:off x="6650964" y="1538310"/>
+            <a:ext cx="4948314" cy="4313354"/>
           </a:xfrm>
           <a:prstGeom prst="rect">
             <a:avLst/>
@@ -5778,7 +5740,7 @@
     </p:spTree>
     <p:extLst>
       <p:ext uri="{BB962C8B-B14F-4D97-AF65-F5344CB8AC3E}">
-        <p14:creationId xmlns:p14="http://schemas.microsoft.com/office/powerpoint/2010/main" val="929180253"/>
+        <p14:creationId xmlns:p14="http://schemas.microsoft.com/office/powerpoint/2010/main" val="921795148"/>
       </p:ext>
     </p:extLst>
   </p:cSld>
@@ -5881,6 +5843,89 @@
       </p:sp>
       <p:sp>
         <p:nvSpPr>
+          <p:cNvPr id="5" name="Заголовок 1">
+            <a:extLst>
+              <a:ext uri="{FF2B5EF4-FFF2-40B4-BE49-F238E27FC236}">
+                <a16:creationId xmlns:a16="http://schemas.microsoft.com/office/drawing/2014/main" id="{26F3F6DE-0B95-4A88-A2DE-D547275A4F55}"/>
+              </a:ext>
+            </a:extLst>
+          </p:cNvPr>
+          <p:cNvSpPr txBox="1">
+            <a:spLocks/>
+          </p:cNvSpPr>
+          <p:nvPr/>
+        </p:nvSpPr>
+        <p:spPr>
+          <a:xfrm>
+            <a:off x="439151" y="1189997"/>
+            <a:ext cx="4930708" cy="512961"/>
+          </a:xfrm>
+          <a:prstGeom prst="rect">
+            <a:avLst/>
+          </a:prstGeom>
+        </p:spPr>
+        <p:txBody>
+          <a:bodyPr wrap="square" lIns="0" tIns="0" rIns="0" bIns="0" anchor="t" anchorCtr="0">
+            <a:spAutoFit/>
+          </a:bodyPr>
+          <a:lstStyle>
+            <a:defPPr>
+              <a:defRPr lang="ru-RU"/>
+            </a:defPPr>
+            <a:lvl1pPr>
+              <a:lnSpc>
+                <a:spcPts val="4000"/>
+              </a:lnSpc>
+              <a:spcBef>
+                <a:spcPct val="0"/>
+              </a:spcBef>
+              <a:buNone/>
+              <a:defRPr sz="2800" b="0">
+                <a:effectLst/>
+                <a:latin typeface="Rostelecom Basis Medium" panose="020B0603030604040103" pitchFamily="34" charset="0"/>
+                <a:ea typeface="+mj-ea"/>
+                <a:cs typeface="+mj-cs"/>
+              </a:defRPr>
+            </a:lvl1pPr>
+          </a:lstStyle>
+          <a:p>
+            <a:r>
+              <a:rPr lang="ru-RU" sz="2000" dirty="0" smtClean="0">
+                <a:latin typeface="Arial" panose="020B0604020202020204" pitchFamily="34" charset="0"/>
+                <a:cs typeface="Arial" panose="020B0604020202020204" pitchFamily="34" charset="0"/>
+              </a:rPr>
+              <a:t>Загружаем </a:t>
+            </a:r>
+            <a:r>
+              <a:rPr lang="ru-RU" sz="2000" dirty="0" smtClean="0">
+                <a:latin typeface="Arial" panose="020B0604020202020204" pitchFamily="34" charset="0"/>
+                <a:cs typeface="Arial" panose="020B0604020202020204" pitchFamily="34" charset="0"/>
+              </a:rPr>
+              <a:t>виртуальную таблицу </a:t>
+            </a:r>
+            <a:r>
+              <a:rPr lang="ru-RU" sz="2000" dirty="0" smtClean="0">
+                <a:latin typeface="Arial" panose="020B0604020202020204" pitchFamily="34" charset="0"/>
+                <a:cs typeface="Arial" panose="020B0604020202020204" pitchFamily="34" charset="0"/>
+              </a:rPr>
+              <a:t>из </a:t>
+            </a:r>
+            <a:r>
+              <a:rPr lang="en-US" sz="2000" dirty="0" smtClean="0">
+                <a:latin typeface="Arial" panose="020B0604020202020204" pitchFamily="34" charset="0"/>
+                <a:cs typeface="Arial" panose="020B0604020202020204" pitchFamily="34" charset="0"/>
+              </a:rPr>
+              <a:t>Hive</a:t>
+            </a:r>
+            <a:endParaRPr lang="ru-RU" sz="2000" dirty="0">
+              <a:latin typeface="Arial" panose="020B0604020202020204" pitchFamily="34" charset="0"/>
+              <a:cs typeface="Arial" panose="020B0604020202020204" pitchFamily="34" charset="0"/>
+            </a:endParaRPr>
+          </a:p>
+        </p:txBody>
+      </p:sp>
+      <p:sp>
+        <p:nvSpPr>
           <p:cNvPr id="6" name="Заголовок 1">
             <a:extLst>
               <a:ext uri="{FF2B5EF4-FFF2-40B4-BE49-F238E27FC236}">
@@ -5939,7 +5984,31 @@
                 <a:latin typeface="Arial" panose="020B0604020202020204" pitchFamily="34" charset="0"/>
                 <a:cs typeface="Arial" panose="020B0604020202020204" pitchFamily="34" charset="0"/>
               </a:rPr>
-              <a:t>Аналитика (Apache Zeppelin + Apache Spark)</a:t>
+              <a:t>Аналитика </a:t>
+            </a:r>
+            <a:r>
+              <a:rPr lang="ru-RU" sz="3200" dirty="0" smtClean="0">
+                <a:effectLst/>
+                <a:latin typeface="Arial" panose="020B0604020202020204" pitchFamily="34" charset="0"/>
+                <a:cs typeface="Arial" panose="020B0604020202020204" pitchFamily="34" charset="0"/>
+              </a:rPr>
+              <a:t>(</a:t>
+            </a:r>
+            <a:r>
+              <a:rPr lang="ru-RU" sz="3200" dirty="0">
+                <a:effectLst/>
+                <a:latin typeface="Arial" panose="020B0604020202020204" pitchFamily="34" charset="0"/>
+                <a:cs typeface="Arial" panose="020B0604020202020204" pitchFamily="34" charset="0"/>
+              </a:rPr>
+              <a:t>Apache Zeppelin + Apache </a:t>
+            </a:r>
+            <a:r>
+              <a:rPr lang="ru-RU" sz="3200" dirty="0" smtClean="0">
+                <a:effectLst/>
+                <a:latin typeface="Arial" panose="020B0604020202020204" pitchFamily="34" charset="0"/>
+                <a:cs typeface="Arial" panose="020B0604020202020204" pitchFamily="34" charset="0"/>
+              </a:rPr>
+              <a:t>Spark)</a:t>
             </a:r>
             <a:endParaRPr lang="ru-RU" sz="3200" b="1" dirty="0">
               <a:latin typeface="Arial" panose="020B0604020202020204" pitchFamily="34" charset="0"/>
@@ -5980,7 +6049,7 @@
       </p:pic>
       <p:pic>
         <p:nvPicPr>
-          <p:cNvPr id="4" name="Рисунок 3"/>
+          <p:cNvPr id="8" name="Рисунок 7"/>
           <p:cNvPicPr>
             <a:picLocks noChangeAspect="1"/>
           </p:cNvPicPr>
@@ -5994,8 +6063,8 @@
         </p:blipFill>
         <p:spPr>
           <a:xfrm>
-            <a:off x="439151" y="1324792"/>
-            <a:ext cx="4315427" cy="1495634"/>
+            <a:off x="5931112" y="1696804"/>
+            <a:ext cx="5668166" cy="4696480"/>
           </a:xfrm>
           <a:prstGeom prst="rect">
             <a:avLst/>
@@ -6004,7 +6073,7 @@
       </p:pic>
       <p:pic>
         <p:nvPicPr>
-          <p:cNvPr id="8" name="Рисунок 7"/>
+          <p:cNvPr id="2" name="Рисунок 1"/>
           <p:cNvPicPr>
             <a:picLocks noChangeAspect="1"/>
           </p:cNvPicPr>
@@ -6018,56 +6087,8 @@
         </p:blipFill>
         <p:spPr>
           <a:xfrm>
-            <a:off x="724940" y="2955841"/>
-            <a:ext cx="3743847" cy="3620005"/>
-          </a:xfrm>
-          <a:prstGeom prst="rect">
-            <a:avLst/>
-          </a:prstGeom>
-        </p:spPr>
-      </p:pic>
-      <p:pic>
-        <p:nvPicPr>
-          <p:cNvPr id="9" name="Рисунок 8"/>
-          <p:cNvPicPr>
-            <a:picLocks noChangeAspect="1"/>
-          </p:cNvPicPr>
-          <p:nvPr/>
-        </p:nvPicPr>
-        <p:blipFill>
-          <a:blip r:embed="rId5"/>
-          <a:stretch>
-            <a:fillRect/>
-          </a:stretch>
-        </p:blipFill>
-        <p:spPr>
-          <a:xfrm>
-            <a:off x="5909313" y="1324792"/>
-            <a:ext cx="5572903" cy="1324160"/>
-          </a:xfrm>
-          <a:prstGeom prst="rect">
-            <a:avLst/>
-          </a:prstGeom>
-        </p:spPr>
-      </p:pic>
-      <p:pic>
-        <p:nvPicPr>
-          <p:cNvPr id="10" name="Рисунок 9"/>
-          <p:cNvPicPr>
-            <a:picLocks noChangeAspect="1"/>
-          </p:cNvPicPr>
-          <p:nvPr/>
-        </p:nvPicPr>
-        <p:blipFill>
-          <a:blip r:embed="rId6"/>
-          <a:stretch>
-            <a:fillRect/>
-          </a:stretch>
-        </p:blipFill>
-        <p:spPr>
-          <a:xfrm>
-            <a:off x="5909313" y="2820426"/>
-            <a:ext cx="5830114" cy="3715268"/>
+            <a:off x="439151" y="2039751"/>
+            <a:ext cx="5001323" cy="4353533"/>
           </a:xfrm>
           <a:prstGeom prst="rect">
             <a:avLst/>
@@ -6077,7 +6098,7 @@
     </p:spTree>
     <p:extLst>
       <p:ext uri="{BB962C8B-B14F-4D97-AF65-F5344CB8AC3E}">
-        <p14:creationId xmlns:p14="http://schemas.microsoft.com/office/powerpoint/2010/main" val="2997639442"/>
+        <p14:creationId xmlns:p14="http://schemas.microsoft.com/office/powerpoint/2010/main" val="929180253"/>
       </p:ext>
     </p:extLst>
   </p:cSld>
@@ -6180,7 +6201,7 @@
       </p:sp>
       <p:sp>
         <p:nvSpPr>
-          <p:cNvPr id="5" name="Заголовок 1">
+          <p:cNvPr id="6" name="Заголовок 1">
             <a:extLst>
               <a:ext uri="{FF2B5EF4-FFF2-40B4-BE49-F238E27FC236}">
                 <a16:creationId xmlns:a16="http://schemas.microsoft.com/office/drawing/2014/main" id="{26F3F6DE-0B95-4A88-A2DE-D547275A4F55}"/>
@@ -6194,84 +6215,8 @@
         </p:nvSpPr>
         <p:spPr>
           <a:xfrm>
-            <a:off x="439152" y="2920189"/>
-            <a:ext cx="11160127" cy="979435"/>
-          </a:xfrm>
-          <a:prstGeom prst="rect">
-            <a:avLst/>
-          </a:prstGeom>
-        </p:spPr>
-        <p:txBody>
-          <a:bodyPr lIns="0" tIns="0" rIns="0" bIns="0" anchor="t" anchorCtr="0">
-            <a:spAutoFit/>
-          </a:bodyPr>
-          <a:lstStyle>
-            <a:defPPr>
-              <a:defRPr lang="ru-RU"/>
-            </a:defPPr>
-            <a:lvl1pPr>
-              <a:lnSpc>
-                <a:spcPts val="4000"/>
-              </a:lnSpc>
-              <a:spcBef>
-                <a:spcPct val="0"/>
-              </a:spcBef>
-              <a:buNone/>
-              <a:defRPr sz="2800" b="0">
-                <a:effectLst/>
-                <a:latin typeface="Rostelecom Basis Medium" panose="020B0603030604040103" pitchFamily="34" charset="0"/>
-                <a:ea typeface="+mj-ea"/>
-                <a:cs typeface="+mj-cs"/>
-              </a:defRPr>
-            </a:lvl1pPr>
-          </a:lstStyle>
-          <a:p>
-            <a:r>
-              <a:rPr lang="ru-RU" dirty="0" smtClean="0">
-                <a:latin typeface="Arial" panose="020B0604020202020204" pitchFamily="34" charset="0"/>
-                <a:cs typeface="Arial" panose="020B0604020202020204" pitchFamily="34" charset="0"/>
-              </a:rPr>
-              <a:t>Основные итоги вашей работы</a:t>
-            </a:r>
-            <a:r>
-              <a:rPr lang="en-US" dirty="0" smtClean="0">
-                <a:latin typeface="Arial" panose="020B0604020202020204" pitchFamily="34" charset="0"/>
-                <a:cs typeface="Arial" panose="020B0604020202020204" pitchFamily="34" charset="0"/>
-              </a:rPr>
-              <a:t>,</a:t>
-            </a:r>
-            <a:r>
-              <a:rPr lang="ru-RU" dirty="0" smtClean="0">
-                <a:latin typeface="Arial" panose="020B0604020202020204" pitchFamily="34" charset="0"/>
-                <a:cs typeface="Arial" panose="020B0604020202020204" pitchFamily="34" charset="0"/>
-              </a:rPr>
-              <a:t> инсайты после работы с данными и графики</a:t>
-            </a:r>
-            <a:endParaRPr lang="ru-RU" dirty="0">
-              <a:latin typeface="Arial" panose="020B0604020202020204" pitchFamily="34" charset="0"/>
-              <a:cs typeface="Arial" panose="020B0604020202020204" pitchFamily="34" charset="0"/>
-            </a:endParaRPr>
-          </a:p>
-        </p:txBody>
-      </p:sp>
-      <p:sp>
-        <p:nvSpPr>
-          <p:cNvPr id="6" name="Заголовок 1">
-            <a:extLst>
-              <a:ext uri="{FF2B5EF4-FFF2-40B4-BE49-F238E27FC236}">
-                <a16:creationId xmlns:a16="http://schemas.microsoft.com/office/drawing/2014/main" id="{26F3F6DE-0B95-4A88-A2DE-D547275A4F55}"/>
-              </a:ext>
-            </a:extLst>
-          </p:cNvPr>
-          <p:cNvSpPr txBox="1">
-            <a:spLocks/>
-          </p:cNvSpPr>
-          <p:nvPr/>
-        </p:nvSpPr>
-        <p:spPr>
-          <a:xfrm>
             <a:off x="439151" y="560538"/>
-            <a:ext cx="11160127" cy="523220"/>
+            <a:ext cx="11160127" cy="512961"/>
           </a:xfrm>
           <a:prstGeom prst="rect">
             <a:avLst/>
@@ -6309,14 +6254,14 @@
           </a:lstStyle>
           <a:p>
             <a:r>
-              <a:rPr lang="ru-RU" b="1" dirty="0">
-                <a:effectLst/>
-                <a:latin typeface="Arial" panose="020B0604020202020204" pitchFamily="34" charset="0"/>
-                <a:cs typeface="Arial" panose="020B0604020202020204" pitchFamily="34" charset="0"/>
-              </a:rPr>
-              <a:t>Итоги и инсайты</a:t>
-            </a:r>
-            <a:endParaRPr lang="ru-RU" b="1" dirty="0">
+              <a:rPr lang="ru-RU" sz="3200" dirty="0">
+                <a:effectLst/>
+                <a:latin typeface="Arial" panose="020B0604020202020204" pitchFamily="34" charset="0"/>
+                <a:cs typeface="Arial" panose="020B0604020202020204" pitchFamily="34" charset="0"/>
+              </a:rPr>
+              <a:t>Аналитика (Apache Zeppelin + Apache Spark)</a:t>
+            </a:r>
+            <a:endParaRPr lang="ru-RU" sz="3200" b="1" dirty="0">
               <a:latin typeface="Arial" panose="020B0604020202020204" pitchFamily="34" charset="0"/>
               <a:cs typeface="Arial" panose="020B0604020202020204" pitchFamily="34" charset="0"/>
             </a:endParaRPr>
@@ -6353,10 +6298,106 @@
           </a:prstGeom>
         </p:spPr>
       </p:pic>
+      <p:pic>
+        <p:nvPicPr>
+          <p:cNvPr id="4" name="Рисунок 3"/>
+          <p:cNvPicPr>
+            <a:picLocks noChangeAspect="1"/>
+          </p:cNvPicPr>
+          <p:nvPr/>
+        </p:nvPicPr>
+        <p:blipFill>
+          <a:blip r:embed="rId3"/>
+          <a:stretch>
+            <a:fillRect/>
+          </a:stretch>
+        </p:blipFill>
+        <p:spPr>
+          <a:xfrm>
+            <a:off x="439151" y="1324792"/>
+            <a:ext cx="4315427" cy="1495634"/>
+          </a:xfrm>
+          <a:prstGeom prst="rect">
+            <a:avLst/>
+          </a:prstGeom>
+        </p:spPr>
+      </p:pic>
+      <p:pic>
+        <p:nvPicPr>
+          <p:cNvPr id="8" name="Рисунок 7"/>
+          <p:cNvPicPr>
+            <a:picLocks noChangeAspect="1"/>
+          </p:cNvPicPr>
+          <p:nvPr/>
+        </p:nvPicPr>
+        <p:blipFill>
+          <a:blip r:embed="rId4"/>
+          <a:stretch>
+            <a:fillRect/>
+          </a:stretch>
+        </p:blipFill>
+        <p:spPr>
+          <a:xfrm>
+            <a:off x="724940" y="2955841"/>
+            <a:ext cx="3743847" cy="3620005"/>
+          </a:xfrm>
+          <a:prstGeom prst="rect">
+            <a:avLst/>
+          </a:prstGeom>
+        </p:spPr>
+      </p:pic>
+      <p:pic>
+        <p:nvPicPr>
+          <p:cNvPr id="9" name="Рисунок 8"/>
+          <p:cNvPicPr>
+            <a:picLocks noChangeAspect="1"/>
+          </p:cNvPicPr>
+          <p:nvPr/>
+        </p:nvPicPr>
+        <p:blipFill>
+          <a:blip r:embed="rId5"/>
+          <a:stretch>
+            <a:fillRect/>
+          </a:stretch>
+        </p:blipFill>
+        <p:spPr>
+          <a:xfrm>
+            <a:off x="5909313" y="1324792"/>
+            <a:ext cx="5572903" cy="1324160"/>
+          </a:xfrm>
+          <a:prstGeom prst="rect">
+            <a:avLst/>
+          </a:prstGeom>
+        </p:spPr>
+      </p:pic>
+      <p:pic>
+        <p:nvPicPr>
+          <p:cNvPr id="10" name="Рисунок 9"/>
+          <p:cNvPicPr>
+            <a:picLocks noChangeAspect="1"/>
+          </p:cNvPicPr>
+          <p:nvPr/>
+        </p:nvPicPr>
+        <p:blipFill>
+          <a:blip r:embed="rId6"/>
+          <a:stretch>
+            <a:fillRect/>
+          </a:stretch>
+        </p:blipFill>
+        <p:spPr>
+          <a:xfrm>
+            <a:off x="5909313" y="2820426"/>
+            <a:ext cx="5830114" cy="3715268"/>
+          </a:xfrm>
+          <a:prstGeom prst="rect">
+            <a:avLst/>
+          </a:prstGeom>
+        </p:spPr>
+      </p:pic>
     </p:spTree>
     <p:extLst>
       <p:ext uri="{BB962C8B-B14F-4D97-AF65-F5344CB8AC3E}">
-        <p14:creationId xmlns:p14="http://schemas.microsoft.com/office/powerpoint/2010/main" val="921795148"/>
+        <p14:creationId xmlns:p14="http://schemas.microsoft.com/office/powerpoint/2010/main" val="2997639442"/>
       </p:ext>
     </p:extLst>
   </p:cSld>
@@ -6473,8 +6514,8 @@
         </p:nvSpPr>
         <p:spPr>
           <a:xfrm>
-            <a:off x="439151" y="1333436"/>
-            <a:ext cx="11160127" cy="1538883"/>
+            <a:off x="439152" y="2920189"/>
+            <a:ext cx="11160127" cy="979435"/>
           </a:xfrm>
           <a:prstGeom prst="rect">
             <a:avLst/>
@@ -6505,91 +6546,28 @@
             </a:lvl1pPr>
           </a:lstStyle>
           <a:p>
-            <a:pPr marL="457200" indent="-457200">
-              <a:buFont typeface="+mj-lt"/>
-              <a:buAutoNum type="arabicPeriod"/>
-            </a:pPr>
-            <a:r>
-              <a:rPr lang="ru-RU" sz="2000" dirty="0" err="1" smtClean="0">
-                <a:latin typeface="Arial" panose="020B0604020202020204" pitchFamily="34" charset="0"/>
-                <a:cs typeface="Arial" panose="020B0604020202020204" pitchFamily="34" charset="0"/>
-              </a:rPr>
-              <a:t>Гитхаб</a:t>
-            </a:r>
-            <a:r>
-              <a:rPr lang="ru-RU" sz="2000" dirty="0" smtClean="0">
-                <a:latin typeface="Arial" panose="020B0604020202020204" pitchFamily="34" charset="0"/>
-                <a:cs typeface="Arial" panose="020B0604020202020204" pitchFamily="34" charset="0"/>
-              </a:rPr>
-              <a:t> проекта: </a:t>
-            </a:r>
-            <a:r>
-              <a:rPr lang="en-US" sz="2000" dirty="0" smtClean="0">
-                <a:latin typeface="Arial" panose="020B0604020202020204" pitchFamily="34" charset="0"/>
-                <a:cs typeface="Arial" panose="020B0604020202020204" pitchFamily="34" charset="0"/>
-                <a:hlinkClick r:id="rId2"/>
-              </a:rPr>
-              <a:t>https://github.com/Olmeor/Data-engineer_Rostelecom_programming_school</a:t>
-            </a:r>
-            <a:endParaRPr lang="ru-RU" sz="2000" dirty="0" smtClean="0">
-              <a:latin typeface="Arial" panose="020B0604020202020204" pitchFamily="34" charset="0"/>
-              <a:cs typeface="Arial" panose="020B0604020202020204" pitchFamily="34" charset="0"/>
-            </a:endParaRPr>
-          </a:p>
-          <a:p>
-            <a:pPr marL="457200" indent="-457200">
-              <a:buFont typeface="+mj-lt"/>
-              <a:buAutoNum type="arabicPeriod"/>
-            </a:pPr>
-            <a:r>
-              <a:rPr lang="ru-RU" sz="2000" dirty="0" smtClean="0">
-                <a:latin typeface="Arial" panose="020B0604020202020204" pitchFamily="34" charset="0"/>
-                <a:cs typeface="Arial" panose="020B0604020202020204" pitchFamily="34" charset="0"/>
-              </a:rPr>
-              <a:t>Рейтинг популярности телеканалов: </a:t>
-            </a:r>
-            <a:r>
-              <a:rPr lang="en-US" sz="2000" dirty="0">
-                <a:latin typeface="Arial" panose="020B0604020202020204" pitchFamily="34" charset="0"/>
-                <a:cs typeface="Arial" panose="020B0604020202020204" pitchFamily="34" charset="0"/>
-                <a:hlinkClick r:id="rId3"/>
-              </a:rPr>
-              <a:t>https://</a:t>
-            </a:r>
-            <a:r>
-              <a:rPr lang="en-US" sz="2000" dirty="0" smtClean="0">
-                <a:latin typeface="Arial" panose="020B0604020202020204" pitchFamily="34" charset="0"/>
-                <a:cs typeface="Arial" panose="020B0604020202020204" pitchFamily="34" charset="0"/>
-                <a:hlinkClick r:id="rId3"/>
-              </a:rPr>
-              <a:t>www.powernet.com.ru/channels-stat</a:t>
-            </a:r>
-            <a:endParaRPr lang="ru-RU" sz="2000" dirty="0" smtClean="0">
-              <a:latin typeface="Arial" panose="020B0604020202020204" pitchFamily="34" charset="0"/>
-              <a:cs typeface="Arial" panose="020B0604020202020204" pitchFamily="34" charset="0"/>
-            </a:endParaRPr>
-          </a:p>
-          <a:p>
-            <a:pPr marL="457200" indent="-457200">
-              <a:buFont typeface="+mj-lt"/>
-              <a:buAutoNum type="arabicPeriod"/>
-            </a:pPr>
-            <a:r>
-              <a:rPr lang="ru-RU" sz="2000" dirty="0" smtClean="0">
-                <a:latin typeface="Arial" panose="020B0604020202020204" pitchFamily="34" charset="0"/>
-                <a:cs typeface="Arial" panose="020B0604020202020204" pitchFamily="34" charset="0"/>
-              </a:rPr>
-              <a:t>Аналитика просмотров: </a:t>
-            </a:r>
-            <a:r>
-              <a:rPr lang="en-US" sz="2000" dirty="0">
-                <a:latin typeface="Arial" panose="020B0604020202020204" pitchFamily="34" charset="0"/>
-                <a:cs typeface="Arial" panose="020B0604020202020204" pitchFamily="34" charset="0"/>
-                <a:hlinkClick r:id="rId4"/>
-              </a:rPr>
-              <a:t>https://journal.tinkoff.ru/television-stat/</a:t>
-            </a:r>
-            <a:endParaRPr lang="ru-RU" sz="2000" dirty="0">
+            <a:r>
+              <a:rPr lang="ru-RU" dirty="0" smtClean="0">
+                <a:latin typeface="Arial" panose="020B0604020202020204" pitchFamily="34" charset="0"/>
+                <a:cs typeface="Arial" panose="020B0604020202020204" pitchFamily="34" charset="0"/>
+              </a:rPr>
+              <a:t>Основные итоги вашей работы</a:t>
+            </a:r>
+            <a:r>
+              <a:rPr lang="en-US" dirty="0" smtClean="0">
+                <a:latin typeface="Arial" panose="020B0604020202020204" pitchFamily="34" charset="0"/>
+                <a:cs typeface="Arial" panose="020B0604020202020204" pitchFamily="34" charset="0"/>
+              </a:rPr>
+              <a:t>,</a:t>
+            </a:r>
+            <a:r>
+              <a:rPr lang="ru-RU" dirty="0" smtClean="0">
+                <a:latin typeface="Arial" panose="020B0604020202020204" pitchFamily="34" charset="0"/>
+                <a:cs typeface="Arial" panose="020B0604020202020204" pitchFamily="34" charset="0"/>
+              </a:rPr>
+              <a:t> инсайты после работы с данными и графики</a:t>
+            </a:r>
+            <a:endParaRPr lang="ru-RU" dirty="0">
               <a:latin typeface="Arial" panose="020B0604020202020204" pitchFamily="34" charset="0"/>
               <a:cs typeface="Arial" panose="020B0604020202020204" pitchFamily="34" charset="0"/>
             </a:endParaRPr>
@@ -6651,12 +6629,12 @@
           </a:lstStyle>
           <a:p>
             <a:r>
-              <a:rPr lang="ru-RU" b="1" dirty="0" smtClean="0">
-                <a:effectLst/>
-                <a:latin typeface="Arial" panose="020B0604020202020204" pitchFamily="34" charset="0"/>
-                <a:cs typeface="Arial" panose="020B0604020202020204" pitchFamily="34" charset="0"/>
-              </a:rPr>
-              <a:t>Список ссылок</a:t>
+              <a:rPr lang="ru-RU" b="1" dirty="0">
+                <a:effectLst/>
+                <a:latin typeface="Arial" panose="020B0604020202020204" pitchFamily="34" charset="0"/>
+                <a:cs typeface="Arial" panose="020B0604020202020204" pitchFamily="34" charset="0"/>
+              </a:rPr>
+              <a:t>Итоги и инсайты</a:t>
             </a:r>
             <a:endParaRPr lang="ru-RU" b="1" dirty="0">
               <a:latin typeface="Arial" panose="020B0604020202020204" pitchFamily="34" charset="0"/>
@@ -6674,7 +6652,7 @@
           <p:nvPr/>
         </p:nvPicPr>
         <p:blipFill>
-          <a:blip r:embed="rId5">
+          <a:blip r:embed="rId2">
             <a:extLst>
               <a:ext uri="{28A0092B-C50C-407E-A947-70E740481C1C}">
                 <a14:useLocalDpi xmlns:a14="http://schemas.microsoft.com/office/drawing/2010/main" val="0"/>
@@ -6698,7 +6676,7 @@
     </p:spTree>
     <p:extLst>
       <p:ext uri="{BB962C8B-B14F-4D97-AF65-F5344CB8AC3E}">
-        <p14:creationId xmlns:p14="http://schemas.microsoft.com/office/powerpoint/2010/main" val="112172180"/>
+        <p14:creationId xmlns:p14="http://schemas.microsoft.com/office/powerpoint/2010/main" val="4091612681"/>
       </p:ext>
     </p:extLst>
   </p:cSld>
@@ -6721,7 +6699,7 @@
     <p:bg>
       <p:bgPr>
         <a:solidFill>
-          <a:srgbClr val="7700FF"/>
+          <a:schemeClr val="bg1"/>
         </a:solidFill>
         <a:effectLst/>
       </p:bgPr>
@@ -6742,7 +6720,66 @@
       </p:grpSpPr>
       <p:sp>
         <p:nvSpPr>
-          <p:cNvPr id="7" name="Заголовок 1">
+          <p:cNvPr id="11" name="Номер слайда 3">
+            <a:extLst>
+              <a:ext uri="{FF2B5EF4-FFF2-40B4-BE49-F238E27FC236}">
+                <a16:creationId xmlns:a16="http://schemas.microsoft.com/office/drawing/2014/main" id="{7267A4CF-F0C4-43DD-AD58-96564CA7C221}"/>
+              </a:ext>
+            </a:extLst>
+          </p:cNvPr>
+          <p:cNvSpPr>
+            <a:spLocks noGrp="1"/>
+          </p:cNvSpPr>
+          <p:nvPr>
+            <p:ph type="sldNum" sz="quarter" idx="12"/>
+          </p:nvPr>
+        </p:nvSpPr>
+        <p:spPr>
+          <a:xfrm>
+            <a:off x="515939" y="6393284"/>
+            <a:ext cx="2743200" cy="365125"/>
+          </a:xfrm>
+          <a:prstGeom prst="rect">
+            <a:avLst/>
+          </a:prstGeom>
+        </p:spPr>
+        <p:txBody>
+          <a:bodyPr lIns="0" rIns="0"/>
+          <a:lstStyle>
+            <a:lvl1pPr>
+              <a:defRPr sz="1200">
+                <a:solidFill>
+                  <a:schemeClr val="bg1">
+                    <a:lumMod val="75000"/>
+                  </a:schemeClr>
+                </a:solidFill>
+              </a:defRPr>
+            </a:lvl1pPr>
+          </a:lstStyle>
+          <a:p>
+            <a:pPr algn="l"/>
+            <a:fld id="{A4D4834B-A5E3-4581-856C-72DC1D7E0BCC}" type="slidenum">
+              <a:rPr lang="ru-RU" smtClean="0">
+                <a:solidFill>
+                  <a:schemeClr val="tx1"/>
+                </a:solidFill>
+                <a:latin typeface="Rostelecom Basis" panose="020B0503030604040103" pitchFamily="34" charset="0"/>
+              </a:rPr>
+              <a:pPr algn="l"/>
+              <a:t>19</a:t>
+            </a:fld>
+            <a:endParaRPr lang="ru-RU" dirty="0">
+              <a:solidFill>
+                <a:schemeClr val="tx1"/>
+              </a:solidFill>
+              <a:latin typeface="Rostelecom Basis" panose="020B0503030604040103" pitchFamily="34" charset="0"/>
+            </a:endParaRPr>
+          </a:p>
+        </p:txBody>
+      </p:sp>
+      <p:sp>
+        <p:nvSpPr>
+          <p:cNvPr id="5" name="Заголовок 1">
             <a:extLst>
               <a:ext uri="{FF2B5EF4-FFF2-40B4-BE49-F238E27FC236}">
                 <a16:creationId xmlns:a16="http://schemas.microsoft.com/office/drawing/2014/main" id="{26F3F6DE-0B95-4A88-A2DE-D547275A4F55}"/>
@@ -6756,8 +6793,212 @@
         </p:nvSpPr>
         <p:spPr>
           <a:xfrm>
-            <a:off x="439153" y="1487179"/>
-            <a:ext cx="11160127" cy="2215991"/>
+            <a:off x="439151" y="1333436"/>
+            <a:ext cx="11160127" cy="3077766"/>
+          </a:xfrm>
+          <a:prstGeom prst="rect">
+            <a:avLst/>
+          </a:prstGeom>
+        </p:spPr>
+        <p:txBody>
+          <a:bodyPr lIns="0" tIns="0" rIns="0" bIns="0" anchor="t" anchorCtr="0">
+            <a:spAutoFit/>
+          </a:bodyPr>
+          <a:lstStyle>
+            <a:defPPr>
+              <a:defRPr lang="ru-RU"/>
+            </a:defPPr>
+            <a:lvl1pPr>
+              <a:lnSpc>
+                <a:spcPts val="4000"/>
+              </a:lnSpc>
+              <a:spcBef>
+                <a:spcPct val="0"/>
+              </a:spcBef>
+              <a:buNone/>
+              <a:defRPr sz="2800" b="0">
+                <a:effectLst/>
+                <a:latin typeface="Rostelecom Basis Medium" panose="020B0603030604040103" pitchFamily="34" charset="0"/>
+                <a:ea typeface="+mj-ea"/>
+                <a:cs typeface="+mj-cs"/>
+              </a:defRPr>
+            </a:lvl1pPr>
+          </a:lstStyle>
+          <a:p>
+            <a:pPr marL="457200" indent="-457200">
+              <a:buFont typeface="+mj-lt"/>
+              <a:buAutoNum type="arabicPeriod"/>
+            </a:pPr>
+            <a:r>
+              <a:rPr lang="ru-RU" sz="2000" dirty="0" err="1" smtClean="0">
+                <a:latin typeface="Arial" panose="020B0604020202020204" pitchFamily="34" charset="0"/>
+                <a:cs typeface="Arial" panose="020B0604020202020204" pitchFamily="34" charset="0"/>
+              </a:rPr>
+              <a:t>Гитхаб</a:t>
+            </a:r>
+            <a:r>
+              <a:rPr lang="ru-RU" sz="2000" dirty="0" smtClean="0">
+                <a:latin typeface="Arial" panose="020B0604020202020204" pitchFamily="34" charset="0"/>
+                <a:cs typeface="Arial" panose="020B0604020202020204" pitchFamily="34" charset="0"/>
+              </a:rPr>
+              <a:t> проекта: </a:t>
+            </a:r>
+            <a:r>
+              <a:rPr lang="en-US" sz="2000" dirty="0" smtClean="0">
+                <a:latin typeface="Arial" panose="020B0604020202020204" pitchFamily="34" charset="0"/>
+                <a:cs typeface="Arial" panose="020B0604020202020204" pitchFamily="34" charset="0"/>
+                <a:hlinkClick r:id="rId2"/>
+              </a:rPr>
+              <a:t>https://github.com/Olmeor/Data-engineer_Rostelecom_programming_school</a:t>
+            </a:r>
+            <a:endParaRPr lang="ru-RU" sz="2000" dirty="0" smtClean="0">
+              <a:latin typeface="Arial" panose="020B0604020202020204" pitchFamily="34" charset="0"/>
+              <a:cs typeface="Arial" panose="020B0604020202020204" pitchFamily="34" charset="0"/>
+            </a:endParaRPr>
+          </a:p>
+          <a:p>
+            <a:pPr marL="457200" indent="-457200">
+              <a:buFont typeface="+mj-lt"/>
+              <a:buAutoNum type="arabicPeriod"/>
+            </a:pPr>
+            <a:r>
+              <a:rPr lang="ru-RU" sz="2000" dirty="0" smtClean="0">
+                <a:latin typeface="Arial" panose="020B0604020202020204" pitchFamily="34" charset="0"/>
+                <a:cs typeface="Arial" panose="020B0604020202020204" pitchFamily="34" charset="0"/>
+              </a:rPr>
+              <a:t>Рейтинг популярности телеканалов: </a:t>
+            </a:r>
+            <a:r>
+              <a:rPr lang="en-US" sz="2000" dirty="0">
+                <a:latin typeface="Arial" panose="020B0604020202020204" pitchFamily="34" charset="0"/>
+                <a:cs typeface="Arial" panose="020B0604020202020204" pitchFamily="34" charset="0"/>
+                <a:hlinkClick r:id="rId3"/>
+              </a:rPr>
+              <a:t>https://</a:t>
+            </a:r>
+            <a:r>
+              <a:rPr lang="en-US" sz="2000" dirty="0" smtClean="0">
+                <a:latin typeface="Arial" panose="020B0604020202020204" pitchFamily="34" charset="0"/>
+                <a:cs typeface="Arial" panose="020B0604020202020204" pitchFamily="34" charset="0"/>
+                <a:hlinkClick r:id="rId3"/>
+              </a:rPr>
+              <a:t>www.powernet.com.ru/channels-stat</a:t>
+            </a:r>
+            <a:endParaRPr lang="ru-RU" sz="2000" dirty="0" smtClean="0">
+              <a:latin typeface="Arial" panose="020B0604020202020204" pitchFamily="34" charset="0"/>
+              <a:cs typeface="Arial" panose="020B0604020202020204" pitchFamily="34" charset="0"/>
+            </a:endParaRPr>
+          </a:p>
+          <a:p>
+            <a:pPr marL="457200" indent="-457200">
+              <a:buFont typeface="+mj-lt"/>
+              <a:buAutoNum type="arabicPeriod"/>
+            </a:pPr>
+            <a:r>
+              <a:rPr lang="ru-RU" sz="2000" dirty="0" smtClean="0">
+                <a:latin typeface="Arial" panose="020B0604020202020204" pitchFamily="34" charset="0"/>
+                <a:cs typeface="Arial" panose="020B0604020202020204" pitchFamily="34" charset="0"/>
+              </a:rPr>
+              <a:t>Аналитика просмотров: </a:t>
+            </a:r>
+            <a:r>
+              <a:rPr lang="en-US" sz="2000" dirty="0">
+                <a:latin typeface="Arial" panose="020B0604020202020204" pitchFamily="34" charset="0"/>
+                <a:cs typeface="Arial" panose="020B0604020202020204" pitchFamily="34" charset="0"/>
+                <a:hlinkClick r:id="rId4"/>
+              </a:rPr>
+              <a:t>https://journal.tinkoff.ru/television-stat</a:t>
+            </a:r>
+            <a:r>
+              <a:rPr lang="en-US" sz="2000" dirty="0" smtClean="0">
+                <a:latin typeface="Arial" panose="020B0604020202020204" pitchFamily="34" charset="0"/>
+                <a:cs typeface="Arial" panose="020B0604020202020204" pitchFamily="34" charset="0"/>
+                <a:hlinkClick r:id="rId4"/>
+              </a:rPr>
+              <a:t>/</a:t>
+            </a:r>
+            <a:endParaRPr lang="en-US" sz="2000" dirty="0" smtClean="0">
+              <a:latin typeface="Arial" panose="020B0604020202020204" pitchFamily="34" charset="0"/>
+              <a:cs typeface="Arial" panose="020B0604020202020204" pitchFamily="34" charset="0"/>
+            </a:endParaRPr>
+          </a:p>
+          <a:p>
+            <a:pPr marL="457200" indent="-457200">
+              <a:buFont typeface="+mj-lt"/>
+              <a:buAutoNum type="arabicPeriod"/>
+            </a:pPr>
+            <a:r>
+              <a:rPr lang="en-US" sz="2000" dirty="0">
+                <a:latin typeface="Arial" panose="020B0604020202020204" pitchFamily="34" charset="0"/>
+                <a:cs typeface="Arial" panose="020B0604020202020204" pitchFamily="34" charset="0"/>
+              </a:rPr>
+              <a:t>Spark notebook - </a:t>
+            </a:r>
+            <a:r>
+              <a:rPr lang="en-US" sz="2000" dirty="0">
+                <a:latin typeface="Arial" panose="020B0604020202020204" pitchFamily="34" charset="0"/>
+                <a:cs typeface="Arial" panose="020B0604020202020204" pitchFamily="34" charset="0"/>
+                <a:hlinkClick r:id="rId5"/>
+              </a:rPr>
+              <a:t>http://vm-dlake2-m-2:8180/#/</a:t>
+            </a:r>
+            <a:r>
+              <a:rPr lang="en-US" sz="2000" dirty="0" smtClean="0">
+                <a:latin typeface="Arial" panose="020B0604020202020204" pitchFamily="34" charset="0"/>
+                <a:cs typeface="Arial" panose="020B0604020202020204" pitchFamily="34" charset="0"/>
+                <a:hlinkClick r:id="rId5"/>
+              </a:rPr>
+              <a:t>notebook/2JBN33XNC</a:t>
+            </a:r>
+            <a:r>
+              <a:rPr lang="en-US" sz="2000" dirty="0" smtClean="0">
+                <a:latin typeface="Arial" panose="020B0604020202020204" pitchFamily="34" charset="0"/>
+                <a:cs typeface="Arial" panose="020B0604020202020204" pitchFamily="34" charset="0"/>
+              </a:rPr>
+              <a:t> (</a:t>
+            </a:r>
+            <a:r>
+              <a:rPr lang="ru-RU" sz="2000" dirty="0" smtClean="0">
+                <a:latin typeface="Arial" panose="020B0604020202020204" pitchFamily="34" charset="0"/>
+                <a:cs typeface="Arial" panose="020B0604020202020204" pitchFamily="34" charset="0"/>
+              </a:rPr>
+              <a:t>только внутри кластера)</a:t>
+            </a:r>
+            <a:endParaRPr lang="en-US" sz="2000" dirty="0" smtClean="0">
+              <a:latin typeface="Arial" panose="020B0604020202020204" pitchFamily="34" charset="0"/>
+              <a:cs typeface="Arial" panose="020B0604020202020204" pitchFamily="34" charset="0"/>
+            </a:endParaRPr>
+          </a:p>
+          <a:p>
+            <a:pPr marL="457200" indent="-457200">
+              <a:buFont typeface="+mj-lt"/>
+              <a:buAutoNum type="arabicPeriod"/>
+            </a:pPr>
+            <a:endParaRPr lang="ru-RU" sz="2000" dirty="0">
+              <a:latin typeface="Arial" panose="020B0604020202020204" pitchFamily="34" charset="0"/>
+              <a:cs typeface="Arial" panose="020B0604020202020204" pitchFamily="34" charset="0"/>
+            </a:endParaRPr>
+          </a:p>
+        </p:txBody>
+      </p:sp>
+      <p:sp>
+        <p:nvSpPr>
+          <p:cNvPr id="6" name="Заголовок 1">
+            <a:extLst>
+              <a:ext uri="{FF2B5EF4-FFF2-40B4-BE49-F238E27FC236}">
+                <a16:creationId xmlns:a16="http://schemas.microsoft.com/office/drawing/2014/main" id="{26F3F6DE-0B95-4A88-A2DE-D547275A4F55}"/>
+              </a:ext>
+            </a:extLst>
+          </p:cNvPr>
+          <p:cNvSpPr txBox="1">
+            <a:spLocks/>
+          </p:cNvSpPr>
+          <p:nvPr/>
+        </p:nvSpPr>
+        <p:spPr>
+          <a:xfrm>
+            <a:off x="439151" y="560538"/>
+            <a:ext cx="11160127" cy="523220"/>
           </a:xfrm>
           <a:prstGeom prst="rect">
             <a:avLst/>
@@ -6794,47 +7035,15 @@
             </a:lvl1pPr>
           </a:lstStyle>
           <a:p>
-            <a:pPr>
-              <a:lnSpc>
-                <a:spcPct val="150000"/>
-              </a:lnSpc>
-            </a:pPr>
-            <a:r>
-              <a:rPr lang="ru-RU" sz="4800" b="1" dirty="0" smtClean="0">
-                <a:solidFill>
-                  <a:schemeClr val="bg1"/>
-                </a:solidFill>
-                <a:effectLst/>
-                <a:latin typeface="Arial" panose="020B0604020202020204" pitchFamily="34" charset="0"/>
-                <a:cs typeface="Arial" panose="020B0604020202020204" pitchFamily="34" charset="0"/>
-              </a:rPr>
-              <a:t>Спасибо за внимание!</a:t>
-            </a:r>
-            <a:br>
-              <a:rPr lang="ru-RU" sz="4800" b="1" dirty="0" smtClean="0">
-                <a:solidFill>
-                  <a:schemeClr val="bg1"/>
-                </a:solidFill>
-                <a:effectLst/>
-                <a:latin typeface="Arial" panose="020B0604020202020204" pitchFamily="34" charset="0"/>
-                <a:cs typeface="Arial" panose="020B0604020202020204" pitchFamily="34" charset="0"/>
-              </a:rPr>
-            </a:br>
-            <a:r>
-              <a:rPr lang="ru-RU" sz="4800" b="1" dirty="0" smtClean="0">
-                <a:solidFill>
-                  <a:schemeClr val="bg1"/>
-                </a:solidFill>
-                <a:effectLst/>
-                <a:latin typeface="Arial" panose="020B0604020202020204" pitchFamily="34" charset="0"/>
-                <a:cs typeface="Arial" panose="020B0604020202020204" pitchFamily="34" charset="0"/>
-              </a:rPr>
-              <a:t>Готовы ответить на ваши вопросы</a:t>
-            </a:r>
-            <a:endParaRPr lang="ru-RU" sz="4800" b="1" dirty="0">
-              <a:solidFill>
-                <a:schemeClr val="bg1"/>
-              </a:solidFill>
+            <a:r>
+              <a:rPr lang="ru-RU" b="1" dirty="0" smtClean="0">
+                <a:effectLst/>
+                <a:latin typeface="Arial" panose="020B0604020202020204" pitchFamily="34" charset="0"/>
+                <a:cs typeface="Arial" panose="020B0604020202020204" pitchFamily="34" charset="0"/>
+              </a:rPr>
+              <a:t>Список ссылок</a:t>
+            </a:r>
+            <a:endParaRPr lang="ru-RU" b="1" dirty="0">
               <a:latin typeface="Arial" panose="020B0604020202020204" pitchFamily="34" charset="0"/>
               <a:cs typeface="Arial" panose="020B0604020202020204" pitchFamily="34" charset="0"/>
             </a:endParaRPr>
@@ -6843,14 +7052,14 @@
       </p:sp>
       <p:pic>
         <p:nvPicPr>
-          <p:cNvPr id="2" name="Рисунок 1"/>
+          <p:cNvPr id="7" name="Рисунок 6"/>
           <p:cNvPicPr>
             <a:picLocks noChangeAspect="1"/>
           </p:cNvPicPr>
           <p:nvPr/>
         </p:nvPicPr>
         <p:blipFill>
-          <a:blip r:embed="rId2">
+          <a:blip r:embed="rId6">
             <a:extLst>
               <a:ext uri="{28A0092B-C50C-407E-A947-70E740481C1C}">
                 <a14:useLocalDpi xmlns:a14="http://schemas.microsoft.com/office/drawing/2010/main" val="0"/>
@@ -6863,211 +7072,18 @@
         </p:blipFill>
         <p:spPr>
           <a:xfrm>
-            <a:off x="311493" y="378100"/>
-            <a:ext cx="2780907" cy="762367"/>
+            <a:off x="9464774" y="532515"/>
+            <a:ext cx="2134504" cy="551243"/>
           </a:xfrm>
           <a:prstGeom prst="rect">
             <a:avLst/>
           </a:prstGeom>
-          <a:ln>
-            <a:noFill/>
-          </a:ln>
-          <a:effectLst>
-            <a:outerShdw blurRad="292100" dist="139700" dir="2700000" algn="tl" rotWithShape="0">
-              <a:srgbClr val="333333">
-                <a:alpha val="65000"/>
-              </a:srgbClr>
-            </a:outerShdw>
-          </a:effectLst>
         </p:spPr>
       </p:pic>
-      <p:sp>
-        <p:nvSpPr>
-          <p:cNvPr id="8" name="Заголовок 1">
-            <a:extLst>
-              <a:ext uri="{FF2B5EF4-FFF2-40B4-BE49-F238E27FC236}">
-                <a16:creationId xmlns:a16="http://schemas.microsoft.com/office/drawing/2014/main" id="{26F3F6DE-0B95-4A88-A2DE-D547275A4F55}"/>
-              </a:ext>
-            </a:extLst>
-          </p:cNvPr>
-          <p:cNvSpPr txBox="1">
-            <a:spLocks/>
-          </p:cNvSpPr>
-          <p:nvPr/>
-        </p:nvSpPr>
-        <p:spPr>
-          <a:xfrm>
-            <a:off x="439152" y="3963798"/>
-            <a:ext cx="11160127" cy="1538883"/>
-          </a:xfrm>
-          <a:prstGeom prst="rect">
-            <a:avLst/>
-          </a:prstGeom>
-        </p:spPr>
-        <p:txBody>
-          <a:bodyPr lIns="0" tIns="0" rIns="0" bIns="0" anchor="t" anchorCtr="0">
-            <a:spAutoFit/>
-          </a:bodyPr>
-          <a:lstStyle>
-            <a:lvl1pPr algn="l" defTabSz="914400" rtl="0" eaLnBrk="1" latinLnBrk="0" hangingPunct="1">
-              <a:lnSpc>
-                <a:spcPts val="4000"/>
-              </a:lnSpc>
-              <a:spcBef>
-                <a:spcPct val="0"/>
-              </a:spcBef>
-              <a:buNone/>
-              <a:defRPr sz="3600" b="0" kern="1200">
-                <a:solidFill>
-                  <a:schemeClr val="tx1"/>
-                </a:solidFill>
-                <a:effectLst>
-                  <a:outerShdw blurRad="38100" dist="38100" dir="2700000" algn="tl">
-                    <a:srgbClr val="000000">
-                      <a:alpha val="43137"/>
-                    </a:srgbClr>
-                  </a:outerShdw>
-                </a:effectLst>
-                <a:latin typeface="Rostelecom Basis Medium" panose="020B0603030604040103" pitchFamily="34" charset="0"/>
-                <a:ea typeface="+mj-ea"/>
-                <a:cs typeface="+mj-cs"/>
-              </a:defRPr>
-            </a:lvl1pPr>
-          </a:lstStyle>
-          <a:p>
-            <a:r>
-              <a:rPr lang="ru-RU" sz="2800" dirty="0" smtClean="0">
-                <a:solidFill>
-                  <a:schemeClr val="bg1"/>
-                </a:solidFill>
-                <a:effectLst/>
-                <a:latin typeface="Arial" panose="020B0604020202020204" pitchFamily="34" charset="0"/>
-                <a:cs typeface="Arial" panose="020B0604020202020204" pitchFamily="34" charset="0"/>
-              </a:rPr>
-              <a:t>Команда проекта:</a:t>
-            </a:r>
-            <a:br>
-              <a:rPr lang="ru-RU" sz="2800" dirty="0" smtClean="0">
-                <a:solidFill>
-                  <a:schemeClr val="bg1"/>
-                </a:solidFill>
-                <a:effectLst/>
-                <a:latin typeface="Arial" panose="020B0604020202020204" pitchFamily="34" charset="0"/>
-                <a:cs typeface="Arial" panose="020B0604020202020204" pitchFamily="34" charset="0"/>
-              </a:rPr>
-            </a:br>
-            <a:r>
-              <a:rPr lang="ru-RU" sz="2400" dirty="0" smtClean="0">
-                <a:solidFill>
-                  <a:schemeClr val="bg1"/>
-                </a:solidFill>
-                <a:effectLst/>
-                <a:latin typeface="Arial" panose="020B0604020202020204" pitchFamily="34" charset="0"/>
-                <a:cs typeface="Arial" panose="020B0604020202020204" pitchFamily="34" charset="0"/>
-              </a:rPr>
-              <a:t>Фамилия И</a:t>
-            </a:r>
-            <a:r>
-              <a:rPr lang="en-US" sz="2400" dirty="0" smtClean="0">
-                <a:solidFill>
-                  <a:schemeClr val="bg1"/>
-                </a:solidFill>
-                <a:effectLst/>
-                <a:latin typeface="Arial" panose="020B0604020202020204" pitchFamily="34" charset="0"/>
-                <a:cs typeface="Arial" panose="020B0604020202020204" pitchFamily="34" charset="0"/>
-              </a:rPr>
-              <a:t>.</a:t>
-            </a:r>
-            <a:r>
-              <a:rPr lang="ru-RU" sz="2400" dirty="0" smtClean="0">
-                <a:solidFill>
-                  <a:schemeClr val="bg1"/>
-                </a:solidFill>
-                <a:effectLst/>
-                <a:latin typeface="Arial" panose="020B0604020202020204" pitchFamily="34" charset="0"/>
-                <a:cs typeface="Arial" panose="020B0604020202020204" pitchFamily="34" charset="0"/>
-              </a:rPr>
-              <a:t>О</a:t>
-            </a:r>
-            <a:r>
-              <a:rPr lang="en-US" sz="2400" dirty="0" smtClean="0">
-                <a:solidFill>
-                  <a:schemeClr val="bg1"/>
-                </a:solidFill>
-                <a:effectLst/>
-                <a:latin typeface="Arial" panose="020B0604020202020204" pitchFamily="34" charset="0"/>
-                <a:cs typeface="Arial" panose="020B0604020202020204" pitchFamily="34" charset="0"/>
-              </a:rPr>
-              <a:t>.</a:t>
-            </a:r>
-            <a:r>
-              <a:rPr lang="ru-RU" sz="2400" dirty="0" smtClean="0">
-                <a:solidFill>
-                  <a:schemeClr val="bg1"/>
-                </a:solidFill>
-                <a:effectLst/>
-                <a:latin typeface="Arial" panose="020B0604020202020204" pitchFamily="34" charset="0"/>
-                <a:cs typeface="Arial" panose="020B0604020202020204" pitchFamily="34" charset="0"/>
-              </a:rPr>
-              <a:t/>
-            </a:r>
-            <a:br>
-              <a:rPr lang="ru-RU" sz="2400" dirty="0" smtClean="0">
-                <a:solidFill>
-                  <a:schemeClr val="bg1"/>
-                </a:solidFill>
-                <a:effectLst/>
-                <a:latin typeface="Arial" panose="020B0604020202020204" pitchFamily="34" charset="0"/>
-                <a:cs typeface="Arial" panose="020B0604020202020204" pitchFamily="34" charset="0"/>
-              </a:rPr>
-            </a:br>
-            <a:r>
-              <a:rPr lang="ru-RU" sz="2400" dirty="0" smtClean="0">
-                <a:solidFill>
-                  <a:schemeClr val="bg1"/>
-                </a:solidFill>
-                <a:effectLst/>
-                <a:latin typeface="Arial" panose="020B0604020202020204" pitchFamily="34" charset="0"/>
-                <a:cs typeface="Arial" panose="020B0604020202020204" pitchFamily="34" charset="0"/>
-              </a:rPr>
-              <a:t>Фамилия И</a:t>
-            </a:r>
-            <a:r>
-              <a:rPr lang="en-US" sz="2400" dirty="0" smtClean="0">
-                <a:solidFill>
-                  <a:schemeClr val="bg1"/>
-                </a:solidFill>
-                <a:effectLst/>
-                <a:latin typeface="Arial" panose="020B0604020202020204" pitchFamily="34" charset="0"/>
-                <a:cs typeface="Arial" panose="020B0604020202020204" pitchFamily="34" charset="0"/>
-              </a:rPr>
-              <a:t>.</a:t>
-            </a:r>
-            <a:r>
-              <a:rPr lang="ru-RU" sz="2400" dirty="0" smtClean="0">
-                <a:solidFill>
-                  <a:schemeClr val="bg1"/>
-                </a:solidFill>
-                <a:effectLst/>
-                <a:latin typeface="Arial" panose="020B0604020202020204" pitchFamily="34" charset="0"/>
-                <a:cs typeface="Arial" panose="020B0604020202020204" pitchFamily="34" charset="0"/>
-              </a:rPr>
-              <a:t>О</a:t>
-            </a:r>
-            <a:endParaRPr lang="ru-RU" sz="2400" dirty="0">
-              <a:solidFill>
-                <a:schemeClr val="bg1"/>
-              </a:solidFill>
-              <a:latin typeface="Arial" panose="020B0604020202020204" pitchFamily="34" charset="0"/>
-              <a:cs typeface="Arial" panose="020B0604020202020204" pitchFamily="34" charset="0"/>
-            </a:endParaRPr>
-          </a:p>
-        </p:txBody>
-      </p:sp>
     </p:spTree>
     <p:extLst>
       <p:ext uri="{BB962C8B-B14F-4D97-AF65-F5344CB8AC3E}">
-        <p14:creationId xmlns:p14="http://schemas.microsoft.com/office/powerpoint/2010/main" val="449845413"/>
+        <p14:creationId xmlns:p14="http://schemas.microsoft.com/office/powerpoint/2010/main" val="112172180"/>
       </p:ext>
     </p:extLst>
   </p:cSld>
@@ -7403,6 +7419,375 @@
     <p:extLst>
       <p:ext uri="{BB962C8B-B14F-4D97-AF65-F5344CB8AC3E}">
         <p14:creationId xmlns:p14="http://schemas.microsoft.com/office/powerpoint/2010/main" val="1637725935"/>
+      </p:ext>
+    </p:extLst>
+  </p:cSld>
+  <p:clrMapOvr>
+    <a:masterClrMapping/>
+  </p:clrMapOvr>
+  <p:timing>
+    <p:tnLst>
+      <p:par>
+        <p:cTn id="1" dur="indefinite" restart="never" nodeType="tmRoot"/>
+      </p:par>
+    </p:tnLst>
+  </p:timing>
+</p:sld>
+</file>
+
+<file path=ppt/slides/slide20.xml><?xml version="1.0" encoding="utf-8"?>
+<p:sld xmlns:a="http://schemas.openxmlformats.org/drawingml/2006/main" xmlns:r="http://schemas.openxmlformats.org/officeDocument/2006/relationships" xmlns:p="http://schemas.openxmlformats.org/presentationml/2006/main">
+  <p:cSld>
+    <p:bg>
+      <p:bgPr>
+        <a:solidFill>
+          <a:srgbClr val="7700FF"/>
+        </a:solidFill>
+        <a:effectLst/>
+      </p:bgPr>
+    </p:bg>
+    <p:spTree>
+      <p:nvGrpSpPr>
+        <p:cNvPr id="1" name=""/>
+        <p:cNvGrpSpPr/>
+        <p:nvPr/>
+      </p:nvGrpSpPr>
+      <p:grpSpPr>
+        <a:xfrm>
+          <a:off x="0" y="0"/>
+          <a:ext cx="0" cy="0"/>
+          <a:chOff x="0" y="0"/>
+          <a:chExt cx="0" cy="0"/>
+        </a:xfrm>
+      </p:grpSpPr>
+      <p:sp>
+        <p:nvSpPr>
+          <p:cNvPr id="7" name="Заголовок 1">
+            <a:extLst>
+              <a:ext uri="{FF2B5EF4-FFF2-40B4-BE49-F238E27FC236}">
+                <a16:creationId xmlns:a16="http://schemas.microsoft.com/office/drawing/2014/main" id="{26F3F6DE-0B95-4A88-A2DE-D547275A4F55}"/>
+              </a:ext>
+            </a:extLst>
+          </p:cNvPr>
+          <p:cNvSpPr txBox="1">
+            <a:spLocks/>
+          </p:cNvSpPr>
+          <p:nvPr/>
+        </p:nvSpPr>
+        <p:spPr>
+          <a:xfrm>
+            <a:off x="439153" y="1487179"/>
+            <a:ext cx="11160127" cy="2215991"/>
+          </a:xfrm>
+          <a:prstGeom prst="rect">
+            <a:avLst/>
+          </a:prstGeom>
+        </p:spPr>
+        <p:txBody>
+          <a:bodyPr lIns="0" tIns="0" rIns="0" bIns="0" anchor="t" anchorCtr="0">
+            <a:spAutoFit/>
+          </a:bodyPr>
+          <a:lstStyle>
+            <a:lvl1pPr algn="l" defTabSz="914400" rtl="0" eaLnBrk="1" latinLnBrk="0" hangingPunct="1">
+              <a:lnSpc>
+                <a:spcPts val="4000"/>
+              </a:lnSpc>
+              <a:spcBef>
+                <a:spcPct val="0"/>
+              </a:spcBef>
+              <a:buNone/>
+              <a:defRPr sz="3600" b="0" kern="1200">
+                <a:solidFill>
+                  <a:schemeClr val="tx1"/>
+                </a:solidFill>
+                <a:effectLst>
+                  <a:outerShdw blurRad="38100" dist="38100" dir="2700000" algn="tl">
+                    <a:srgbClr val="000000">
+                      <a:alpha val="43137"/>
+                    </a:srgbClr>
+                  </a:outerShdw>
+                </a:effectLst>
+                <a:latin typeface="Rostelecom Basis Medium" panose="020B0603030604040103" pitchFamily="34" charset="0"/>
+                <a:ea typeface="+mj-ea"/>
+                <a:cs typeface="+mj-cs"/>
+              </a:defRPr>
+            </a:lvl1pPr>
+          </a:lstStyle>
+          <a:p>
+            <a:pPr>
+              <a:lnSpc>
+                <a:spcPct val="150000"/>
+              </a:lnSpc>
+            </a:pPr>
+            <a:r>
+              <a:rPr lang="ru-RU" sz="4800" b="1" dirty="0" smtClean="0">
+                <a:solidFill>
+                  <a:schemeClr val="bg1"/>
+                </a:solidFill>
+                <a:effectLst/>
+                <a:latin typeface="Arial" panose="020B0604020202020204" pitchFamily="34" charset="0"/>
+                <a:cs typeface="Arial" panose="020B0604020202020204" pitchFamily="34" charset="0"/>
+              </a:rPr>
+              <a:t>Спасибо за внимание!</a:t>
+            </a:r>
+            <a:br>
+              <a:rPr lang="ru-RU" sz="4800" b="1" dirty="0" smtClean="0">
+                <a:solidFill>
+                  <a:schemeClr val="bg1"/>
+                </a:solidFill>
+                <a:effectLst/>
+                <a:latin typeface="Arial" panose="020B0604020202020204" pitchFamily="34" charset="0"/>
+                <a:cs typeface="Arial" panose="020B0604020202020204" pitchFamily="34" charset="0"/>
+              </a:rPr>
+            </a:br>
+            <a:r>
+              <a:rPr lang="ru-RU" sz="4800" b="1" dirty="0" smtClean="0">
+                <a:solidFill>
+                  <a:schemeClr val="bg1"/>
+                </a:solidFill>
+                <a:effectLst/>
+                <a:latin typeface="Arial" panose="020B0604020202020204" pitchFamily="34" charset="0"/>
+                <a:cs typeface="Arial" panose="020B0604020202020204" pitchFamily="34" charset="0"/>
+              </a:rPr>
+              <a:t>Готовы ответить на ваши вопросы</a:t>
+            </a:r>
+            <a:endParaRPr lang="ru-RU" sz="4800" b="1" dirty="0">
+              <a:solidFill>
+                <a:schemeClr val="bg1"/>
+              </a:solidFill>
+              <a:latin typeface="Arial" panose="020B0604020202020204" pitchFamily="34" charset="0"/>
+              <a:cs typeface="Arial" panose="020B0604020202020204" pitchFamily="34" charset="0"/>
+            </a:endParaRPr>
+          </a:p>
+        </p:txBody>
+      </p:sp>
+      <p:pic>
+        <p:nvPicPr>
+          <p:cNvPr id="2" name="Рисунок 1"/>
+          <p:cNvPicPr>
+            <a:picLocks noChangeAspect="1"/>
+          </p:cNvPicPr>
+          <p:nvPr/>
+        </p:nvPicPr>
+        <p:blipFill>
+          <a:blip r:embed="rId2">
+            <a:extLst>
+              <a:ext uri="{28A0092B-C50C-407E-A947-70E740481C1C}">
+                <a14:useLocalDpi xmlns:a14="http://schemas.microsoft.com/office/drawing/2010/main" val="0"/>
+              </a:ext>
+            </a:extLst>
+          </a:blip>
+          <a:stretch>
+            <a:fillRect/>
+          </a:stretch>
+        </p:blipFill>
+        <p:spPr>
+          <a:xfrm>
+            <a:off x="311493" y="378100"/>
+            <a:ext cx="2780907" cy="762367"/>
+          </a:xfrm>
+          <a:prstGeom prst="rect">
+            <a:avLst/>
+          </a:prstGeom>
+          <a:ln>
+            <a:noFill/>
+          </a:ln>
+          <a:effectLst>
+            <a:outerShdw blurRad="292100" dist="139700" dir="2700000" algn="tl" rotWithShape="0">
+              <a:srgbClr val="333333">
+                <a:alpha val="65000"/>
+              </a:srgbClr>
+            </a:outerShdw>
+          </a:effectLst>
+        </p:spPr>
+      </p:pic>
+      <p:sp>
+        <p:nvSpPr>
+          <p:cNvPr id="8" name="Заголовок 1">
+            <a:extLst>
+              <a:ext uri="{FF2B5EF4-FFF2-40B4-BE49-F238E27FC236}">
+                <a16:creationId xmlns:a16="http://schemas.microsoft.com/office/drawing/2014/main" id="{26F3F6DE-0B95-4A88-A2DE-D547275A4F55}"/>
+              </a:ext>
+            </a:extLst>
+          </p:cNvPr>
+          <p:cNvSpPr txBox="1">
+            <a:spLocks/>
+          </p:cNvSpPr>
+          <p:nvPr/>
+        </p:nvSpPr>
+        <p:spPr>
+          <a:xfrm>
+            <a:off x="439152" y="3963798"/>
+            <a:ext cx="11160127" cy="1538883"/>
+          </a:xfrm>
+          <a:prstGeom prst="rect">
+            <a:avLst/>
+          </a:prstGeom>
+        </p:spPr>
+        <p:txBody>
+          <a:bodyPr lIns="0" tIns="0" rIns="0" bIns="0" anchor="t" anchorCtr="0">
+            <a:spAutoFit/>
+          </a:bodyPr>
+          <a:lstStyle>
+            <a:lvl1pPr algn="l" defTabSz="914400" rtl="0" eaLnBrk="1" latinLnBrk="0" hangingPunct="1">
+              <a:lnSpc>
+                <a:spcPts val="4000"/>
+              </a:lnSpc>
+              <a:spcBef>
+                <a:spcPct val="0"/>
+              </a:spcBef>
+              <a:buNone/>
+              <a:defRPr sz="3600" b="0" kern="1200">
+                <a:solidFill>
+                  <a:schemeClr val="tx1"/>
+                </a:solidFill>
+                <a:effectLst>
+                  <a:outerShdw blurRad="38100" dist="38100" dir="2700000" algn="tl">
+                    <a:srgbClr val="000000">
+                      <a:alpha val="43137"/>
+                    </a:srgbClr>
+                  </a:outerShdw>
+                </a:effectLst>
+                <a:latin typeface="Rostelecom Basis Medium" panose="020B0603030604040103" pitchFamily="34" charset="0"/>
+                <a:ea typeface="+mj-ea"/>
+                <a:cs typeface="+mj-cs"/>
+              </a:defRPr>
+            </a:lvl1pPr>
+          </a:lstStyle>
+          <a:p>
+            <a:r>
+              <a:rPr lang="ru-RU" sz="2800" dirty="0" smtClean="0">
+                <a:solidFill>
+                  <a:schemeClr val="bg1"/>
+                </a:solidFill>
+                <a:effectLst/>
+                <a:latin typeface="Arial" panose="020B0604020202020204" pitchFamily="34" charset="0"/>
+                <a:cs typeface="Arial" panose="020B0604020202020204" pitchFamily="34" charset="0"/>
+              </a:rPr>
+              <a:t>Команда проекта:</a:t>
+            </a:r>
+            <a:br>
+              <a:rPr lang="ru-RU" sz="2800" dirty="0" smtClean="0">
+                <a:solidFill>
+                  <a:schemeClr val="bg1"/>
+                </a:solidFill>
+                <a:effectLst/>
+                <a:latin typeface="Arial" panose="020B0604020202020204" pitchFamily="34" charset="0"/>
+                <a:cs typeface="Arial" panose="020B0604020202020204" pitchFamily="34" charset="0"/>
+              </a:rPr>
+            </a:br>
+            <a:r>
+              <a:rPr lang="ru-RU" sz="2400" dirty="0" smtClean="0">
+                <a:solidFill>
+                  <a:schemeClr val="bg1"/>
+                </a:solidFill>
+                <a:effectLst/>
+                <a:latin typeface="Arial" panose="020B0604020202020204" pitchFamily="34" charset="0"/>
+                <a:cs typeface="Arial" panose="020B0604020202020204" pitchFamily="34" charset="0"/>
+              </a:rPr>
+              <a:t>Фамилия И</a:t>
+            </a:r>
+            <a:r>
+              <a:rPr lang="en-US" sz="2400" dirty="0" smtClean="0">
+                <a:solidFill>
+                  <a:schemeClr val="bg1"/>
+                </a:solidFill>
+                <a:effectLst/>
+                <a:latin typeface="Arial" panose="020B0604020202020204" pitchFamily="34" charset="0"/>
+                <a:cs typeface="Arial" panose="020B0604020202020204" pitchFamily="34" charset="0"/>
+              </a:rPr>
+              <a:t>.</a:t>
+            </a:r>
+            <a:r>
+              <a:rPr lang="ru-RU" sz="2400" dirty="0" smtClean="0">
+                <a:solidFill>
+                  <a:schemeClr val="bg1"/>
+                </a:solidFill>
+                <a:effectLst/>
+                <a:latin typeface="Arial" panose="020B0604020202020204" pitchFamily="34" charset="0"/>
+                <a:cs typeface="Arial" panose="020B0604020202020204" pitchFamily="34" charset="0"/>
+              </a:rPr>
+              <a:t>О</a:t>
+            </a:r>
+            <a:r>
+              <a:rPr lang="en-US" sz="2400" dirty="0" smtClean="0">
+                <a:solidFill>
+                  <a:schemeClr val="bg1"/>
+                </a:solidFill>
+                <a:effectLst/>
+                <a:latin typeface="Arial" panose="020B0604020202020204" pitchFamily="34" charset="0"/>
+                <a:cs typeface="Arial" panose="020B0604020202020204" pitchFamily="34" charset="0"/>
+              </a:rPr>
+              <a:t>.</a:t>
+            </a:r>
+            <a:r>
+              <a:rPr lang="ru-RU" sz="2400" dirty="0" smtClean="0">
+                <a:solidFill>
+                  <a:schemeClr val="bg1"/>
+                </a:solidFill>
+                <a:effectLst/>
+                <a:latin typeface="Arial" panose="020B0604020202020204" pitchFamily="34" charset="0"/>
+                <a:cs typeface="Arial" panose="020B0604020202020204" pitchFamily="34" charset="0"/>
+              </a:rPr>
+              <a:t/>
+            </a:r>
+            <a:br>
+              <a:rPr lang="ru-RU" sz="2400" dirty="0" smtClean="0">
+                <a:solidFill>
+                  <a:schemeClr val="bg1"/>
+                </a:solidFill>
+                <a:effectLst/>
+                <a:latin typeface="Arial" panose="020B0604020202020204" pitchFamily="34" charset="0"/>
+                <a:cs typeface="Arial" panose="020B0604020202020204" pitchFamily="34" charset="0"/>
+              </a:rPr>
+            </a:br>
+            <a:r>
+              <a:rPr lang="ru-RU" sz="2400" dirty="0" smtClean="0">
+                <a:solidFill>
+                  <a:schemeClr val="bg1"/>
+                </a:solidFill>
+                <a:effectLst/>
+                <a:latin typeface="Arial" panose="020B0604020202020204" pitchFamily="34" charset="0"/>
+                <a:cs typeface="Arial" panose="020B0604020202020204" pitchFamily="34" charset="0"/>
+              </a:rPr>
+              <a:t>Фамилия И</a:t>
+            </a:r>
+            <a:r>
+              <a:rPr lang="en-US" sz="2400" dirty="0" smtClean="0">
+                <a:solidFill>
+                  <a:schemeClr val="bg1"/>
+                </a:solidFill>
+                <a:effectLst/>
+                <a:latin typeface="Arial" panose="020B0604020202020204" pitchFamily="34" charset="0"/>
+                <a:cs typeface="Arial" panose="020B0604020202020204" pitchFamily="34" charset="0"/>
+              </a:rPr>
+              <a:t>.</a:t>
+            </a:r>
+            <a:r>
+              <a:rPr lang="ru-RU" sz="2400" dirty="0" smtClean="0">
+                <a:solidFill>
+                  <a:schemeClr val="bg1"/>
+                </a:solidFill>
+                <a:effectLst/>
+                <a:latin typeface="Arial" panose="020B0604020202020204" pitchFamily="34" charset="0"/>
+                <a:cs typeface="Arial" panose="020B0604020202020204" pitchFamily="34" charset="0"/>
+              </a:rPr>
+              <a:t>О</a:t>
+            </a:r>
+            <a:endParaRPr lang="ru-RU" sz="2400" dirty="0">
+              <a:solidFill>
+                <a:schemeClr val="bg1"/>
+              </a:solidFill>
+              <a:latin typeface="Arial" panose="020B0604020202020204" pitchFamily="34" charset="0"/>
+              <a:cs typeface="Arial" panose="020B0604020202020204" pitchFamily="34" charset="0"/>
+            </a:endParaRPr>
+          </a:p>
+        </p:txBody>
+      </p:sp>
+    </p:spTree>
+    <p:extLst>
+      <p:ext uri="{BB962C8B-B14F-4D97-AF65-F5344CB8AC3E}">
+        <p14:creationId xmlns:p14="http://schemas.microsoft.com/office/powerpoint/2010/main" val="449845413"/>
       </p:ext>
     </p:extLst>
   </p:cSld>

</xml_diff>

<commit_message>
feat: add task 6 solutions and update presentation
</commit_message>
<xml_diff>
--- a/Сertification/presentation.pptx
+++ b/Сertification/presentation.pptx
@@ -5,29 +5,32 @@
     <p:sldMasterId id="2147483648" r:id="rId1"/>
   </p:sldMasterIdLst>
   <p:notesMasterIdLst>
-    <p:notesMasterId r:id="rId22"/>
+    <p:notesMasterId r:id="rId25"/>
   </p:notesMasterIdLst>
   <p:sldIdLst>
     <p:sldId id="281" r:id="rId2"/>
     <p:sldId id="282" r:id="rId3"/>
     <p:sldId id="286" r:id="rId4"/>
     <p:sldId id="290" r:id="rId5"/>
-    <p:sldId id="287" r:id="rId6"/>
-    <p:sldId id="292" r:id="rId7"/>
-    <p:sldId id="293" r:id="rId8"/>
-    <p:sldId id="294" r:id="rId9"/>
-    <p:sldId id="297" r:id="rId10"/>
-    <p:sldId id="295" r:id="rId11"/>
-    <p:sldId id="296" r:id="rId12"/>
-    <p:sldId id="302" r:id="rId13"/>
-    <p:sldId id="303" r:id="rId14"/>
-    <p:sldId id="299" r:id="rId15"/>
-    <p:sldId id="288" r:id="rId16"/>
-    <p:sldId id="298" r:id="rId17"/>
-    <p:sldId id="304" r:id="rId18"/>
-    <p:sldId id="305" r:id="rId19"/>
-    <p:sldId id="291" r:id="rId20"/>
-    <p:sldId id="289" r:id="rId21"/>
+    <p:sldId id="308" r:id="rId6"/>
+    <p:sldId id="287" r:id="rId7"/>
+    <p:sldId id="292" r:id="rId8"/>
+    <p:sldId id="293" r:id="rId9"/>
+    <p:sldId id="294" r:id="rId10"/>
+    <p:sldId id="297" r:id="rId11"/>
+    <p:sldId id="295" r:id="rId12"/>
+    <p:sldId id="296" r:id="rId13"/>
+    <p:sldId id="302" r:id="rId14"/>
+    <p:sldId id="303" r:id="rId15"/>
+    <p:sldId id="299" r:id="rId16"/>
+    <p:sldId id="288" r:id="rId17"/>
+    <p:sldId id="298" r:id="rId18"/>
+    <p:sldId id="304" r:id="rId19"/>
+    <p:sldId id="305" r:id="rId20"/>
+    <p:sldId id="307" r:id="rId21"/>
+    <p:sldId id="306" r:id="rId22"/>
+    <p:sldId id="291" r:id="rId23"/>
+    <p:sldId id="289" r:id="rId24"/>
   </p:sldIdLst>
   <p:sldSz cx="12192000" cy="6858000"/>
   <p:notesSz cx="6858000" cy="9144000"/>
@@ -4030,7 +4033,7 @@
       </p:sp>
       <p:sp>
         <p:nvSpPr>
-          <p:cNvPr id="6" name="Заголовок 1">
+          <p:cNvPr id="5" name="Заголовок 1">
             <a:extLst>
               <a:ext uri="{FF2B5EF4-FFF2-40B4-BE49-F238E27FC236}">
                 <a16:creationId xmlns:a16="http://schemas.microsoft.com/office/drawing/2014/main" id="{26F3F6DE-0B95-4A88-A2DE-D547275A4F55}"/>
@@ -4044,8 +4047,99 @@
         </p:nvSpPr>
         <p:spPr>
           <a:xfrm>
+            <a:off x="107458" y="1512731"/>
+            <a:ext cx="11491820" cy="769441"/>
+          </a:xfrm>
+          <a:prstGeom prst="rect">
+            <a:avLst/>
+          </a:prstGeom>
+        </p:spPr>
+        <p:txBody>
+          <a:bodyPr wrap="square" lIns="0" tIns="0" rIns="0" bIns="0" anchor="t" anchorCtr="0">
+            <a:spAutoFit/>
+          </a:bodyPr>
+          <a:lstStyle>
+            <a:defPPr>
+              <a:defRPr lang="ru-RU"/>
+            </a:defPPr>
+            <a:lvl1pPr>
+              <a:lnSpc>
+                <a:spcPts val="4000"/>
+              </a:lnSpc>
+              <a:spcBef>
+                <a:spcPct val="0"/>
+              </a:spcBef>
+              <a:buNone/>
+              <a:defRPr sz="2800" b="0">
+                <a:effectLst/>
+                <a:latin typeface="Rostelecom Basis Medium" panose="020B0603030604040103" pitchFamily="34" charset="0"/>
+                <a:ea typeface="+mj-ea"/>
+                <a:cs typeface="+mj-cs"/>
+              </a:defRPr>
+            </a:lvl1pPr>
+          </a:lstStyle>
+          <a:p>
+            <a:pPr marL="342000" algn="just">
+              <a:lnSpc>
+                <a:spcPts val="3000"/>
+              </a:lnSpc>
+            </a:pPr>
+            <a:r>
+              <a:rPr lang="ru-RU" dirty="0">
+                <a:latin typeface="Arial" panose="020B0604020202020204" pitchFamily="34" charset="0"/>
+                <a:cs typeface="Arial" panose="020B0604020202020204" pitchFamily="34" charset="0"/>
+              </a:rPr>
+              <a:t>Создание потребителя на Python для RT.Streaming, который будет читать данные и сохранять их в HDFS </a:t>
+            </a:r>
+            <a:r>
+              <a:rPr lang="ru-RU" dirty="0" smtClean="0">
+                <a:latin typeface="Arial" panose="020B0604020202020204" pitchFamily="34" charset="0"/>
+                <a:cs typeface="Arial" panose="020B0604020202020204" pitchFamily="34" charset="0"/>
+              </a:rPr>
+              <a:t>в </a:t>
+            </a:r>
+            <a:r>
+              <a:rPr lang="ru-RU" dirty="0">
+                <a:latin typeface="Arial" panose="020B0604020202020204" pitchFamily="34" charset="0"/>
+                <a:cs typeface="Arial" panose="020B0604020202020204" pitchFamily="34" charset="0"/>
+              </a:rPr>
+              <a:t>формате </a:t>
+            </a:r>
+            <a:r>
+              <a:rPr lang="en-US" dirty="0">
+                <a:latin typeface="Arial" panose="020B0604020202020204" pitchFamily="34" charset="0"/>
+                <a:cs typeface="Arial" panose="020B0604020202020204" pitchFamily="34" charset="0"/>
+              </a:rPr>
+              <a:t>CSV</a:t>
+            </a:r>
+            <a:r>
+              <a:rPr lang="ru-RU" dirty="0">
+                <a:latin typeface="Arial" panose="020B0604020202020204" pitchFamily="34" charset="0"/>
+                <a:cs typeface="Arial" panose="020B0604020202020204" pitchFamily="34" charset="0"/>
+              </a:rPr>
+              <a:t>.</a:t>
+            </a:r>
+          </a:p>
+        </p:txBody>
+      </p:sp>
+      <p:sp>
+        <p:nvSpPr>
+          <p:cNvPr id="6" name="Заголовок 1">
+            <a:extLst>
+              <a:ext uri="{FF2B5EF4-FFF2-40B4-BE49-F238E27FC236}">
+                <a16:creationId xmlns:a16="http://schemas.microsoft.com/office/drawing/2014/main" id="{26F3F6DE-0B95-4A88-A2DE-D547275A4F55}"/>
+              </a:ext>
+            </a:extLst>
+          </p:cNvPr>
+          <p:cNvSpPr txBox="1">
+            <a:spLocks/>
+          </p:cNvSpPr>
+          <p:nvPr/>
+        </p:nvSpPr>
+        <p:spPr>
+          <a:xfrm>
             <a:off x="439151" y="560538"/>
-            <a:ext cx="11160127" cy="523220"/>
+            <a:ext cx="11160127" cy="512961"/>
           </a:xfrm>
           <a:prstGeom prst="rect">
             <a:avLst/>
@@ -4083,7 +4177,7 @@
           </a:lstStyle>
           <a:p>
             <a:r>
-              <a:rPr lang="ru-RU" sz="3200" dirty="0">
+              <a:rPr lang="ru-RU" dirty="0">
                 <a:effectLst/>
                 <a:latin typeface="Arial" panose="020B0604020202020204" pitchFamily="34" charset="0"/>
                 <a:cs typeface="Arial" panose="020B0604020202020204" pitchFamily="34" charset="0"/>
@@ -4091,30 +4185,14 @@
               <a:t>Хранение сырых данных в</a:t>
             </a:r>
             <a:r>
-              <a:rPr lang="en-US" sz="3200" dirty="0">
-                <a:effectLst/>
-                <a:latin typeface="Arial" panose="020B0604020202020204" pitchFamily="34" charset="0"/>
-                <a:cs typeface="Arial" panose="020B0604020202020204" pitchFamily="34" charset="0"/>
-              </a:rPr>
-              <a:t> </a:t>
-            </a:r>
-            <a:r>
-              <a:rPr lang="en-US" sz="3200" dirty="0" smtClean="0">
-                <a:effectLst/>
-                <a:latin typeface="Arial" panose="020B0604020202020204" pitchFamily="34" charset="0"/>
-                <a:cs typeface="Arial" panose="020B0604020202020204" pitchFamily="34" charset="0"/>
-              </a:rPr>
-              <a:t>RT.DataLake</a:t>
-            </a:r>
-            <a:r>
-              <a:rPr lang="ru-RU" sz="3200" dirty="0" smtClean="0">
-                <a:effectLst/>
-                <a:latin typeface="Arial" panose="020B0604020202020204" pitchFamily="34" charset="0"/>
-                <a:cs typeface="Arial" panose="020B0604020202020204" pitchFamily="34" charset="0"/>
-              </a:rPr>
-              <a:t> - код</a:t>
-            </a:r>
-            <a:endParaRPr lang="ru-RU" sz="3200" b="1" dirty="0">
+              <a:rPr lang="en-US" dirty="0">
+                <a:effectLst/>
+                <a:latin typeface="Arial" panose="020B0604020202020204" pitchFamily="34" charset="0"/>
+                <a:cs typeface="Arial" panose="020B0604020202020204" pitchFamily="34" charset="0"/>
+              </a:rPr>
+              <a:t> RT.DataLake</a:t>
+            </a:r>
+            <a:endParaRPr lang="ru-RU" b="1" dirty="0">
               <a:latin typeface="Arial" panose="020B0604020202020204" pitchFamily="34" charset="0"/>
               <a:cs typeface="Arial" panose="020B0604020202020204" pitchFamily="34" charset="0"/>
             </a:endParaRPr>
@@ -4167,8 +4245,8 @@
         </p:blipFill>
         <p:spPr>
           <a:xfrm>
-            <a:off x="2211711" y="1252273"/>
-            <a:ext cx="7461208" cy="5244766"/>
+            <a:off x="515939" y="2662928"/>
+            <a:ext cx="11021963" cy="3734321"/>
           </a:xfrm>
           <a:prstGeom prst="rect">
             <a:avLst/>
@@ -4178,7 +4256,7 @@
     </p:spTree>
     <p:extLst>
       <p:ext uri="{BB962C8B-B14F-4D97-AF65-F5344CB8AC3E}">
-        <p14:creationId xmlns:p14="http://schemas.microsoft.com/office/powerpoint/2010/main" val="233078822"/>
+        <p14:creationId xmlns:p14="http://schemas.microsoft.com/office/powerpoint/2010/main" val="2207802164"/>
       </p:ext>
     </p:extLst>
   </p:cSld>
@@ -4238,7 +4316,7 @@
         </p:nvSpPr>
         <p:spPr>
           <a:xfrm>
-            <a:off x="524435" y="6383617"/>
+            <a:off x="515939" y="6393284"/>
             <a:ext cx="2743200" cy="365125"/>
           </a:xfrm>
           <a:prstGeom prst="rect">
@@ -4296,7 +4374,7 @@
         <p:spPr>
           <a:xfrm>
             <a:off x="439151" y="560538"/>
-            <a:ext cx="11160127" cy="1025922"/>
+            <a:ext cx="11160127" cy="523220"/>
           </a:xfrm>
           <a:prstGeom prst="rect">
             <a:avLst/>
@@ -4334,49 +4412,38 @@
           </a:lstStyle>
           <a:p>
             <a:r>
-              <a:rPr lang="ru-RU" sz="2800" dirty="0">
-                <a:effectLst/>
-                <a:latin typeface="Arial" panose="020B0604020202020204" pitchFamily="34" charset="0"/>
-                <a:cs typeface="Arial" panose="020B0604020202020204" pitchFamily="34" charset="0"/>
-              </a:rPr>
-              <a:t>Обработка и агрегация данных с </a:t>
-            </a:r>
-            <a:r>
-              <a:rPr lang="ru-RU" sz="2800" dirty="0" smtClean="0">
-                <a:effectLst/>
-                <a:latin typeface="Arial" panose="020B0604020202020204" pitchFamily="34" charset="0"/>
-                <a:cs typeface="Arial" panose="020B0604020202020204" pitchFamily="34" charset="0"/>
-              </a:rPr>
-              <a:t>использованием</a:t>
-            </a:r>
-          </a:p>
-          <a:p>
-            <a:r>
-              <a:rPr lang="ru-RU" sz="2800" dirty="0" smtClean="0">
-                <a:effectLst/>
-                <a:latin typeface="Arial" panose="020B0604020202020204" pitchFamily="34" charset="0"/>
-                <a:cs typeface="Arial" panose="020B0604020202020204" pitchFamily="34" charset="0"/>
-              </a:rPr>
-              <a:t>Apache </a:t>
-            </a:r>
-            <a:r>
-              <a:rPr lang="ru-RU" sz="2800" dirty="0">
-                <a:effectLst/>
-                <a:latin typeface="Arial" panose="020B0604020202020204" pitchFamily="34" charset="0"/>
-                <a:cs typeface="Arial" panose="020B0604020202020204" pitchFamily="34" charset="0"/>
-              </a:rPr>
-              <a:t>Hive в</a:t>
-            </a:r>
-            <a:r>
-              <a:rPr lang="en-US" sz="2800" dirty="0">
-                <a:effectLst/>
-                <a:latin typeface="Arial" panose="020B0604020202020204" pitchFamily="34" charset="0"/>
-                <a:cs typeface="Arial" panose="020B0604020202020204" pitchFamily="34" charset="0"/>
-              </a:rPr>
-              <a:t> RT.DataLake</a:t>
-            </a:r>
-            <a:endParaRPr lang="ru-RU" sz="2800" dirty="0">
-              <a:effectLst/>
+              <a:rPr lang="ru-RU" sz="3200" dirty="0">
+                <a:effectLst/>
+                <a:latin typeface="Arial" panose="020B0604020202020204" pitchFamily="34" charset="0"/>
+                <a:cs typeface="Arial" panose="020B0604020202020204" pitchFamily="34" charset="0"/>
+              </a:rPr>
+              <a:t>Хранение сырых данных в</a:t>
+            </a:r>
+            <a:r>
+              <a:rPr lang="en-US" sz="3200" dirty="0">
+                <a:effectLst/>
+                <a:latin typeface="Arial" panose="020B0604020202020204" pitchFamily="34" charset="0"/>
+                <a:cs typeface="Arial" panose="020B0604020202020204" pitchFamily="34" charset="0"/>
+              </a:rPr>
+              <a:t> </a:t>
+            </a:r>
+            <a:r>
+              <a:rPr lang="en-US" sz="3200" dirty="0" smtClean="0">
+                <a:effectLst/>
+                <a:latin typeface="Arial" panose="020B0604020202020204" pitchFamily="34" charset="0"/>
+                <a:cs typeface="Arial" panose="020B0604020202020204" pitchFamily="34" charset="0"/>
+              </a:rPr>
+              <a:t>RT.DataLake</a:t>
+            </a:r>
+            <a:r>
+              <a:rPr lang="ru-RU" sz="3200" dirty="0" smtClean="0">
+                <a:effectLst/>
+                <a:latin typeface="Arial" panose="020B0604020202020204" pitchFamily="34" charset="0"/>
+                <a:cs typeface="Arial" panose="020B0604020202020204" pitchFamily="34" charset="0"/>
+              </a:rPr>
+              <a:t> - код</a:t>
+            </a:r>
+            <a:endParaRPr lang="ru-RU" sz="3200" b="1" dirty="0">
               <a:latin typeface="Arial" panose="020B0604020202020204" pitchFamily="34" charset="0"/>
               <a:cs typeface="Arial" panose="020B0604020202020204" pitchFamily="34" charset="0"/>
             </a:endParaRPr>
@@ -4415,7 +4482,7 @@
       </p:pic>
       <p:pic>
         <p:nvPicPr>
-          <p:cNvPr id="10" name="Рисунок 9"/>
+          <p:cNvPr id="3" name="Рисунок 2"/>
           <p:cNvPicPr>
             <a:picLocks noChangeAspect="1"/>
           </p:cNvPicPr>
@@ -4429,85 +4496,8 @@
         </p:blipFill>
         <p:spPr>
           <a:xfrm>
-            <a:off x="439151" y="2252527"/>
-            <a:ext cx="8783276" cy="2505425"/>
-          </a:xfrm>
-          <a:prstGeom prst="rect">
-            <a:avLst/>
-          </a:prstGeom>
-        </p:spPr>
-      </p:pic>
-      <p:sp>
-        <p:nvSpPr>
-          <p:cNvPr id="12" name="Прямоугольник 11"/>
-          <p:cNvSpPr/>
-          <p:nvPr/>
-        </p:nvSpPr>
-        <p:spPr>
-          <a:xfrm>
-            <a:off x="350444" y="1783244"/>
-            <a:ext cx="3621761" cy="369332"/>
-          </a:xfrm>
-          <a:prstGeom prst="rect">
-            <a:avLst/>
-          </a:prstGeom>
-        </p:spPr>
-        <p:txBody>
-          <a:bodyPr wrap="none">
-            <a:spAutoFit/>
-          </a:bodyPr>
-          <a:lstStyle/>
-          <a:p>
-            <a:r>
-              <a:rPr lang="ru-RU" dirty="0" smtClean="0">
-                <a:latin typeface="Arial" panose="020B0604020202020204" pitchFamily="34" charset="0"/>
-                <a:cs typeface="Arial" panose="020B0604020202020204" pitchFamily="34" charset="0"/>
-              </a:rPr>
-              <a:t>Создаем таблицы </a:t>
-            </a:r>
-            <a:r>
-              <a:rPr lang="ru-RU" dirty="0">
-                <a:latin typeface="Arial" panose="020B0604020202020204" pitchFamily="34" charset="0"/>
-                <a:cs typeface="Arial" panose="020B0604020202020204" pitchFamily="34" charset="0"/>
-              </a:rPr>
-              <a:t>Hive </a:t>
-            </a:r>
-            <a:r>
-              <a:rPr lang="ru-RU" dirty="0" smtClean="0">
-                <a:latin typeface="Arial" panose="020B0604020202020204" pitchFamily="34" charset="0"/>
-                <a:cs typeface="Arial" panose="020B0604020202020204" pitchFamily="34" charset="0"/>
-              </a:rPr>
-              <a:t>из </a:t>
-            </a:r>
-            <a:r>
-              <a:rPr lang="ru-RU" dirty="0">
-                <a:latin typeface="Arial" panose="020B0604020202020204" pitchFamily="34" charset="0"/>
-                <a:cs typeface="Arial" panose="020B0604020202020204" pitchFamily="34" charset="0"/>
-              </a:rPr>
-              <a:t>HDFS</a:t>
-            </a:r>
-            <a:endParaRPr lang="ru-RU" dirty="0"/>
-          </a:p>
-        </p:txBody>
-      </p:sp>
-      <p:pic>
-        <p:nvPicPr>
-          <p:cNvPr id="13" name="Рисунок 12"/>
-          <p:cNvPicPr>
-            <a:picLocks noChangeAspect="1"/>
-          </p:cNvPicPr>
-          <p:nvPr/>
-        </p:nvPicPr>
-        <p:blipFill>
-          <a:blip r:embed="rId4"/>
-          <a:stretch>
-            <a:fillRect/>
-          </a:stretch>
-        </p:blipFill>
-        <p:spPr>
-          <a:xfrm>
-            <a:off x="2322998" y="5022167"/>
-            <a:ext cx="7392432" cy="1276528"/>
+            <a:off x="2211711" y="1252273"/>
+            <a:ext cx="7461208" cy="5244766"/>
           </a:xfrm>
           <a:prstGeom prst="rect">
             <a:avLst/>
@@ -4517,7 +4507,7 @@
     </p:spTree>
     <p:extLst>
       <p:ext uri="{BB962C8B-B14F-4D97-AF65-F5344CB8AC3E}">
-        <p14:creationId xmlns:p14="http://schemas.microsoft.com/office/powerpoint/2010/main" val="288046697"/>
+        <p14:creationId xmlns:p14="http://schemas.microsoft.com/office/powerpoint/2010/main" val="233078822"/>
       </p:ext>
     </p:extLst>
   </p:cSld>
@@ -4577,7 +4567,7 @@
         </p:nvSpPr>
         <p:spPr>
           <a:xfrm>
-            <a:off x="515939" y="6393284"/>
+            <a:off x="524435" y="6383617"/>
             <a:ext cx="2743200" cy="365125"/>
           </a:xfrm>
           <a:prstGeom prst="rect">
@@ -4678,17 +4668,33 @@
                 <a:latin typeface="Arial" panose="020B0604020202020204" pitchFamily="34" charset="0"/>
                 <a:cs typeface="Arial" panose="020B0604020202020204" pitchFamily="34" charset="0"/>
               </a:rPr>
-              <a:t>Обработка и агрегация данных с использованием</a:t>
-            </a:r>
-          </a:p>
-          <a:p>
+              <a:t>Обработка и агрегация данных с </a:t>
+            </a:r>
+            <a:r>
+              <a:rPr lang="ru-RU" sz="2800" dirty="0" smtClean="0">
+                <a:effectLst/>
+                <a:latin typeface="Arial" panose="020B0604020202020204" pitchFamily="34" charset="0"/>
+                <a:cs typeface="Arial" panose="020B0604020202020204" pitchFamily="34" charset="0"/>
+              </a:rPr>
+              <a:t>использованием</a:t>
+            </a:r>
+          </a:p>
+          <a:p>
+            <a:r>
+              <a:rPr lang="ru-RU" sz="2800" dirty="0" smtClean="0">
+                <a:effectLst/>
+                <a:latin typeface="Arial" panose="020B0604020202020204" pitchFamily="34" charset="0"/>
+                <a:cs typeface="Arial" panose="020B0604020202020204" pitchFamily="34" charset="0"/>
+              </a:rPr>
+              <a:t>Apache </a:t>
+            </a:r>
             <a:r>
               <a:rPr lang="ru-RU" sz="2800" dirty="0">
                 <a:effectLst/>
                 <a:latin typeface="Arial" panose="020B0604020202020204" pitchFamily="34" charset="0"/>
                 <a:cs typeface="Arial" panose="020B0604020202020204" pitchFamily="34" charset="0"/>
               </a:rPr>
-              <a:t>Apache Hive в</a:t>
+              <a:t>Hive в</a:t>
             </a:r>
             <a:r>
               <a:rPr lang="en-US" sz="2800" dirty="0">
@@ -4738,7 +4744,7 @@
       </p:pic>
       <p:pic>
         <p:nvPicPr>
-          <p:cNvPr id="4" name="Рисунок 3"/>
+          <p:cNvPr id="10" name="Рисунок 9"/>
           <p:cNvPicPr>
             <a:picLocks noChangeAspect="1"/>
           </p:cNvPicPr>
@@ -4752,8 +4758,8 @@
         </p:blipFill>
         <p:spPr>
           <a:xfrm>
-            <a:off x="1985389" y="5290423"/>
-            <a:ext cx="8221222" cy="1200318"/>
+            <a:off x="439151" y="2252527"/>
+            <a:ext cx="8783276" cy="2505425"/>
           </a:xfrm>
           <a:prstGeom prst="rect">
             <a:avLst/>
@@ -4762,47 +4768,60 @@
       </p:pic>
       <p:sp>
         <p:nvSpPr>
-          <p:cNvPr id="8" name="Прямоугольник 7"/>
+          <p:cNvPr id="12" name="Прямоугольник 11"/>
           <p:cNvSpPr/>
           <p:nvPr/>
         </p:nvSpPr>
         <p:spPr>
           <a:xfrm>
-            <a:off x="8001062" y="2536280"/>
-            <a:ext cx="3647815" cy="830997"/>
-          </a:xfrm>
-          <a:prstGeom prst="rect">
-            <a:avLst/>
-          </a:prstGeom>
-        </p:spPr>
-        <p:txBody>
-          <a:bodyPr wrap="square">
+            <a:off x="350444" y="1783244"/>
+            <a:ext cx="3621761" cy="369332"/>
+          </a:xfrm>
+          <a:prstGeom prst="rect">
+            <a:avLst/>
+          </a:prstGeom>
+        </p:spPr>
+        <p:txBody>
+          <a:bodyPr wrap="none">
             <a:spAutoFit/>
           </a:bodyPr>
           <a:lstStyle/>
           <a:p>
-            <a:pPr algn="r"/>
-            <a:r>
-              <a:rPr lang="ru-RU" sz="2400" dirty="0" smtClean="0">
-                <a:latin typeface="Arial" panose="020B0604020202020204" pitchFamily="34" charset="0"/>
-                <a:cs typeface="Arial" panose="020B0604020202020204" pitchFamily="34" charset="0"/>
-              </a:rPr>
-              <a:t>Создаем </a:t>
-            </a:r>
-            <a:r>
-              <a:rPr lang="ru-RU" sz="2400" dirty="0" smtClean="0">
-                <a:latin typeface="Arial" panose="020B0604020202020204" pitchFamily="34" charset="0"/>
-                <a:cs typeface="Arial" panose="020B0604020202020204" pitchFamily="34" charset="0"/>
-              </a:rPr>
-              <a:t>виртуальную таблицу</a:t>
-            </a:r>
-            <a:endParaRPr lang="ru-RU" sz="2400" dirty="0"/>
+            <a:r>
+              <a:rPr lang="ru-RU" dirty="0" smtClean="0">
+                <a:latin typeface="Arial" panose="020B0604020202020204" pitchFamily="34" charset="0"/>
+                <a:cs typeface="Arial" panose="020B0604020202020204" pitchFamily="34" charset="0"/>
+              </a:rPr>
+              <a:t>Создаем таблицы </a:t>
+            </a:r>
+            <a:r>
+              <a:rPr lang="ru-RU" dirty="0">
+                <a:latin typeface="Arial" panose="020B0604020202020204" pitchFamily="34" charset="0"/>
+                <a:cs typeface="Arial" panose="020B0604020202020204" pitchFamily="34" charset="0"/>
+              </a:rPr>
+              <a:t>Hive </a:t>
+            </a:r>
+            <a:r>
+              <a:rPr lang="ru-RU" dirty="0" smtClean="0">
+                <a:latin typeface="Arial" panose="020B0604020202020204" pitchFamily="34" charset="0"/>
+                <a:cs typeface="Arial" panose="020B0604020202020204" pitchFamily="34" charset="0"/>
+              </a:rPr>
+              <a:t>из </a:t>
+            </a:r>
+            <a:r>
+              <a:rPr lang="ru-RU" dirty="0">
+                <a:latin typeface="Arial" panose="020B0604020202020204" pitchFamily="34" charset="0"/>
+                <a:cs typeface="Arial" panose="020B0604020202020204" pitchFamily="34" charset="0"/>
+              </a:rPr>
+              <a:t>HDFS</a:t>
+            </a:r>
+            <a:endParaRPr lang="ru-RU" dirty="0"/>
           </a:p>
         </p:txBody>
       </p:sp>
       <p:pic>
         <p:nvPicPr>
-          <p:cNvPr id="5" name="Рисунок 4"/>
+          <p:cNvPr id="13" name="Рисунок 12"/>
           <p:cNvPicPr>
             <a:picLocks noChangeAspect="1"/>
           </p:cNvPicPr>
@@ -4816,8 +4835,8 @@
         </p:blipFill>
         <p:spPr>
           <a:xfrm>
-            <a:off x="439151" y="1614483"/>
-            <a:ext cx="6382641" cy="3572374"/>
+            <a:off x="2322998" y="5022167"/>
+            <a:ext cx="7392432" cy="1276528"/>
           </a:xfrm>
           <a:prstGeom prst="rect">
             <a:avLst/>
@@ -4827,7 +4846,7 @@
     </p:spTree>
     <p:extLst>
       <p:ext uri="{BB962C8B-B14F-4D97-AF65-F5344CB8AC3E}">
-        <p14:creationId xmlns:p14="http://schemas.microsoft.com/office/powerpoint/2010/main" val="3607580541"/>
+        <p14:creationId xmlns:p14="http://schemas.microsoft.com/office/powerpoint/2010/main" val="288046697"/>
       </p:ext>
     </p:extLst>
   </p:cSld>
@@ -5048,7 +5067,7 @@
       </p:pic>
       <p:pic>
         <p:nvPicPr>
-          <p:cNvPr id="5" name="Рисунок 4"/>
+          <p:cNvPr id="4" name="Рисунок 3"/>
           <p:cNvPicPr>
             <a:picLocks noChangeAspect="1"/>
           </p:cNvPicPr>
@@ -5062,17 +5081,50 @@
         </p:blipFill>
         <p:spPr>
           <a:xfrm>
-            <a:off x="7645851" y="2083225"/>
-            <a:ext cx="3953427" cy="1171739"/>
+            <a:off x="1985389" y="5290423"/>
+            <a:ext cx="8221222" cy="1200318"/>
           </a:xfrm>
           <a:prstGeom prst="rect">
             <a:avLst/>
           </a:prstGeom>
         </p:spPr>
       </p:pic>
+      <p:sp>
+        <p:nvSpPr>
+          <p:cNvPr id="8" name="Прямоугольник 7"/>
+          <p:cNvSpPr/>
+          <p:nvPr/>
+        </p:nvSpPr>
+        <p:spPr>
+          <a:xfrm>
+            <a:off x="8001062" y="2536280"/>
+            <a:ext cx="3647815" cy="830997"/>
+          </a:xfrm>
+          <a:prstGeom prst="rect">
+            <a:avLst/>
+          </a:prstGeom>
+        </p:spPr>
+        <p:txBody>
+          <a:bodyPr wrap="square">
+            <a:spAutoFit/>
+          </a:bodyPr>
+          <a:lstStyle/>
+          <a:p>
+            <a:pPr algn="r"/>
+            <a:r>
+              <a:rPr lang="ru-RU" sz="2400" dirty="0" smtClean="0">
+                <a:latin typeface="Arial" panose="020B0604020202020204" pitchFamily="34" charset="0"/>
+                <a:cs typeface="Arial" panose="020B0604020202020204" pitchFamily="34" charset="0"/>
+              </a:rPr>
+              <a:t>Создаем виртуальную таблицу</a:t>
+            </a:r>
+            <a:endParaRPr lang="ru-RU" sz="2400" dirty="0"/>
+          </a:p>
+        </p:txBody>
+      </p:sp>
       <p:pic>
         <p:nvPicPr>
-          <p:cNvPr id="8" name="Рисунок 7"/>
+          <p:cNvPr id="5" name="Рисунок 4"/>
           <p:cNvPicPr>
             <a:picLocks noChangeAspect="1"/>
           </p:cNvPicPr>
@@ -5086,32 +5138,8 @@
         </p:blipFill>
         <p:spPr>
           <a:xfrm>
-            <a:off x="7736351" y="3841376"/>
-            <a:ext cx="3772426" cy="1771897"/>
-          </a:xfrm>
-          <a:prstGeom prst="rect">
-            <a:avLst/>
-          </a:prstGeom>
-        </p:spPr>
-      </p:pic>
-      <p:pic>
-        <p:nvPicPr>
-          <p:cNvPr id="2" name="Рисунок 1"/>
-          <p:cNvPicPr>
-            <a:picLocks noChangeAspect="1"/>
-          </p:cNvPicPr>
-          <p:nvPr/>
-        </p:nvPicPr>
-        <p:blipFill>
-          <a:blip r:embed="rId5"/>
-          <a:stretch>
-            <a:fillRect/>
-          </a:stretch>
-        </p:blipFill>
-        <p:spPr>
-          <a:xfrm>
-            <a:off x="693996" y="2150183"/>
-            <a:ext cx="5325218" cy="3238952"/>
+            <a:off x="439151" y="1614483"/>
+            <a:ext cx="6382641" cy="3572374"/>
           </a:xfrm>
           <a:prstGeom prst="rect">
             <a:avLst/>
@@ -5121,7 +5149,7 @@
     </p:spTree>
     <p:extLst>
       <p:ext uri="{BB962C8B-B14F-4D97-AF65-F5344CB8AC3E}">
-        <p14:creationId xmlns:p14="http://schemas.microsoft.com/office/powerpoint/2010/main" val="4232252842"/>
+        <p14:creationId xmlns:p14="http://schemas.microsoft.com/office/powerpoint/2010/main" val="3607580541"/>
       </p:ext>
     </p:extLst>
   </p:cSld>
@@ -5239,7 +5267,7 @@
         <p:spPr>
           <a:xfrm>
             <a:off x="439151" y="560538"/>
-            <a:ext cx="11160127" cy="512961"/>
+            <a:ext cx="11160127" cy="1025922"/>
           </a:xfrm>
           <a:prstGeom prst="rect">
             <a:avLst/>
@@ -5279,10 +5307,30 @@
             <a:r>
               <a:rPr lang="ru-RU" sz="2800" dirty="0">
                 <a:effectLst/>
-              </a:rPr>
-              <a:t>Перенос данных в GreenPlum (RT.Warehouse)</a:t>
-            </a:r>
-            <a:endParaRPr lang="ru-RU" sz="2800" b="1" dirty="0">
+                <a:latin typeface="Arial" panose="020B0604020202020204" pitchFamily="34" charset="0"/>
+                <a:cs typeface="Arial" panose="020B0604020202020204" pitchFamily="34" charset="0"/>
+              </a:rPr>
+              <a:t>Обработка и агрегация данных с использованием</a:t>
+            </a:r>
+          </a:p>
+          <a:p>
+            <a:r>
+              <a:rPr lang="ru-RU" sz="2800" dirty="0">
+                <a:effectLst/>
+                <a:latin typeface="Arial" panose="020B0604020202020204" pitchFamily="34" charset="0"/>
+                <a:cs typeface="Arial" panose="020B0604020202020204" pitchFamily="34" charset="0"/>
+              </a:rPr>
+              <a:t>Apache Hive в</a:t>
+            </a:r>
+            <a:r>
+              <a:rPr lang="en-US" sz="2800" dirty="0">
+                <a:effectLst/>
+                <a:latin typeface="Arial" panose="020B0604020202020204" pitchFamily="34" charset="0"/>
+                <a:cs typeface="Arial" panose="020B0604020202020204" pitchFamily="34" charset="0"/>
+              </a:rPr>
+              <a:t> RT.DataLake</a:t>
+            </a:r>
+            <a:endParaRPr lang="ru-RU" sz="2800" dirty="0">
               <a:effectLst/>
               <a:latin typeface="Arial" panose="020B0604020202020204" pitchFamily="34" charset="0"/>
               <a:cs typeface="Arial" panose="020B0604020202020204" pitchFamily="34" charset="0"/>
@@ -5320,101 +5368,6 @@
           </a:prstGeom>
         </p:spPr>
       </p:pic>
-      <p:sp>
-        <p:nvSpPr>
-          <p:cNvPr id="8" name="Заголовок 1">
-            <a:extLst>
-              <a:ext uri="{FF2B5EF4-FFF2-40B4-BE49-F238E27FC236}">
-                <a16:creationId xmlns:a16="http://schemas.microsoft.com/office/drawing/2014/main" id="{26F3F6DE-0B95-4A88-A2DE-D547275A4F55}"/>
-              </a:ext>
-            </a:extLst>
-          </p:cNvPr>
-          <p:cNvSpPr txBox="1">
-            <a:spLocks/>
-          </p:cNvSpPr>
-          <p:nvPr/>
-        </p:nvSpPr>
-        <p:spPr>
-          <a:xfrm>
-            <a:off x="501903" y="1191169"/>
-            <a:ext cx="4930708" cy="769441"/>
-          </a:xfrm>
-          <a:prstGeom prst="rect">
-            <a:avLst/>
-          </a:prstGeom>
-        </p:spPr>
-        <p:txBody>
-          <a:bodyPr wrap="square" lIns="0" tIns="0" rIns="0" bIns="0" anchor="t" anchorCtr="0">
-            <a:spAutoFit/>
-          </a:bodyPr>
-          <a:lstStyle>
-            <a:defPPr>
-              <a:defRPr lang="ru-RU"/>
-            </a:defPPr>
-            <a:lvl1pPr>
-              <a:lnSpc>
-                <a:spcPts val="4000"/>
-              </a:lnSpc>
-              <a:spcBef>
-                <a:spcPct val="0"/>
-              </a:spcBef>
-              <a:buNone/>
-              <a:defRPr sz="2800" b="0">
-                <a:effectLst/>
-                <a:latin typeface="Rostelecom Basis Medium" panose="020B0603030604040103" pitchFamily="34" charset="0"/>
-                <a:ea typeface="+mj-ea"/>
-                <a:cs typeface="+mj-cs"/>
-              </a:defRPr>
-            </a:lvl1pPr>
-          </a:lstStyle>
-          <a:p>
-            <a:pPr>
-              <a:lnSpc>
-                <a:spcPts val="3000"/>
-              </a:lnSpc>
-            </a:pPr>
-            <a:r>
-              <a:rPr lang="ru-RU" sz="2000" dirty="0" smtClean="0">
-                <a:latin typeface="Arial" panose="020B0604020202020204" pitchFamily="34" charset="0"/>
-                <a:cs typeface="Arial" panose="020B0604020202020204" pitchFamily="34" charset="0"/>
-              </a:rPr>
-              <a:t>Переносим </a:t>
-            </a:r>
-            <a:r>
-              <a:rPr lang="ru-RU" sz="2000" dirty="0" smtClean="0">
-                <a:latin typeface="Arial" panose="020B0604020202020204" pitchFamily="34" charset="0"/>
-                <a:cs typeface="Arial" panose="020B0604020202020204" pitchFamily="34" charset="0"/>
-              </a:rPr>
-              <a:t>обработанные из </a:t>
-            </a:r>
-            <a:r>
-              <a:rPr lang="en-US" sz="2000" dirty="0" smtClean="0">
-                <a:latin typeface="Arial" panose="020B0604020202020204" pitchFamily="34" charset="0"/>
-                <a:cs typeface="Arial" panose="020B0604020202020204" pitchFamily="34" charset="0"/>
-              </a:rPr>
-              <a:t>Hive</a:t>
-            </a:r>
-            <a:r>
-              <a:rPr lang="ru-RU" sz="2000" dirty="0" smtClean="0">
-                <a:latin typeface="Arial" panose="020B0604020202020204" pitchFamily="34" charset="0"/>
-                <a:cs typeface="Arial" panose="020B0604020202020204" pitchFamily="34" charset="0"/>
-              </a:rPr>
-              <a:t> в </a:t>
-            </a:r>
-            <a:r>
-              <a:rPr lang="en-US" sz="2000" dirty="0" smtClean="0">
-                <a:latin typeface="Arial" panose="020B0604020202020204" pitchFamily="34" charset="0"/>
-                <a:cs typeface="Arial" panose="020B0604020202020204" pitchFamily="34" charset="0"/>
-              </a:rPr>
-              <a:t>GreenPlum</a:t>
-            </a:r>
-            <a:endParaRPr lang="ru-RU" sz="2000" dirty="0">
-              <a:latin typeface="Arial" panose="020B0604020202020204" pitchFamily="34" charset="0"/>
-              <a:cs typeface="Arial" panose="020B0604020202020204" pitchFamily="34" charset="0"/>
-            </a:endParaRPr>
-          </a:p>
-        </p:txBody>
-      </p:sp>
       <p:pic>
         <p:nvPicPr>
           <p:cNvPr id="5" name="Рисунок 4"/>
@@ -5431,8 +5384,8 @@
         </p:blipFill>
         <p:spPr>
           <a:xfrm>
-            <a:off x="501903" y="1961295"/>
-            <a:ext cx="4429743" cy="4467849"/>
+            <a:off x="7645851" y="2083225"/>
+            <a:ext cx="3953427" cy="1171739"/>
           </a:xfrm>
           <a:prstGeom prst="rect">
             <a:avLst/>
@@ -5441,7 +5394,7 @@
       </p:pic>
       <p:pic>
         <p:nvPicPr>
-          <p:cNvPr id="9" name="Рисунок 8"/>
+          <p:cNvPr id="8" name="Рисунок 7"/>
           <p:cNvPicPr>
             <a:picLocks noChangeAspect="1"/>
           </p:cNvPicPr>
@@ -5455,8 +5408,8 @@
         </p:blipFill>
         <p:spPr>
           <a:xfrm>
-            <a:off x="9293906" y="1404936"/>
-            <a:ext cx="2305372" cy="4677428"/>
+            <a:off x="7736351" y="3841376"/>
+            <a:ext cx="3772426" cy="1771897"/>
           </a:xfrm>
           <a:prstGeom prst="rect">
             <a:avLst/>
@@ -5465,7 +5418,7 @@
       </p:pic>
       <p:pic>
         <p:nvPicPr>
-          <p:cNvPr id="12" name="Рисунок 11"/>
+          <p:cNvPr id="2" name="Рисунок 1"/>
           <p:cNvPicPr>
             <a:picLocks noChangeAspect="1"/>
           </p:cNvPicPr>
@@ -5479,8 +5432,8 @@
         </p:blipFill>
         <p:spPr>
           <a:xfrm>
-            <a:off x="5326589" y="3210641"/>
-            <a:ext cx="3572374" cy="1781424"/>
+            <a:off x="693996" y="2150183"/>
+            <a:ext cx="5325218" cy="3238952"/>
           </a:xfrm>
           <a:prstGeom prst="rect">
             <a:avLst/>
@@ -5490,7 +5443,7 @@
     </p:spTree>
     <p:extLst>
       <p:ext uri="{BB962C8B-B14F-4D97-AF65-F5344CB8AC3E}">
-        <p14:creationId xmlns:p14="http://schemas.microsoft.com/office/powerpoint/2010/main" val="1214712092"/>
+        <p14:creationId xmlns:p14="http://schemas.microsoft.com/office/powerpoint/2010/main" val="4232252842"/>
       </p:ext>
     </p:extLst>
   </p:cSld>
@@ -5689,9 +5642,97 @@
           </a:prstGeom>
         </p:spPr>
       </p:pic>
+      <p:sp>
+        <p:nvSpPr>
+          <p:cNvPr id="8" name="Заголовок 1">
+            <a:extLst>
+              <a:ext uri="{FF2B5EF4-FFF2-40B4-BE49-F238E27FC236}">
+                <a16:creationId xmlns:a16="http://schemas.microsoft.com/office/drawing/2014/main" id="{26F3F6DE-0B95-4A88-A2DE-D547275A4F55}"/>
+              </a:ext>
+            </a:extLst>
+          </p:cNvPr>
+          <p:cNvSpPr txBox="1">
+            <a:spLocks/>
+          </p:cNvSpPr>
+          <p:nvPr/>
+        </p:nvSpPr>
+        <p:spPr>
+          <a:xfrm>
+            <a:off x="1527644" y="1212575"/>
+            <a:ext cx="5585132" cy="384721"/>
+          </a:xfrm>
+          <a:prstGeom prst="rect">
+            <a:avLst/>
+          </a:prstGeom>
+        </p:spPr>
+        <p:txBody>
+          <a:bodyPr wrap="square" lIns="0" tIns="0" rIns="0" bIns="0" anchor="t" anchorCtr="0">
+            <a:spAutoFit/>
+          </a:bodyPr>
+          <a:lstStyle>
+            <a:defPPr>
+              <a:defRPr lang="ru-RU"/>
+            </a:defPPr>
+            <a:lvl1pPr>
+              <a:lnSpc>
+                <a:spcPts val="4000"/>
+              </a:lnSpc>
+              <a:spcBef>
+                <a:spcPct val="0"/>
+              </a:spcBef>
+              <a:buNone/>
+              <a:defRPr sz="2800" b="0">
+                <a:effectLst/>
+                <a:latin typeface="Rostelecom Basis Medium" panose="020B0603030604040103" pitchFamily="34" charset="0"/>
+                <a:ea typeface="+mj-ea"/>
+                <a:cs typeface="+mj-cs"/>
+              </a:defRPr>
+            </a:lvl1pPr>
+          </a:lstStyle>
+          <a:p>
+            <a:pPr>
+              <a:lnSpc>
+                <a:spcPts val="3000"/>
+              </a:lnSpc>
+            </a:pPr>
+            <a:r>
+              <a:rPr lang="ru-RU" sz="2000" dirty="0" smtClean="0">
+                <a:latin typeface="Arial" panose="020B0604020202020204" pitchFamily="34" charset="0"/>
+                <a:cs typeface="Arial" panose="020B0604020202020204" pitchFamily="34" charset="0"/>
+              </a:rPr>
+              <a:t>Переносим обработанные из </a:t>
+            </a:r>
+            <a:r>
+              <a:rPr lang="en-US" sz="2000" dirty="0" smtClean="0">
+                <a:latin typeface="Arial" panose="020B0604020202020204" pitchFamily="34" charset="0"/>
+                <a:cs typeface="Arial" panose="020B0604020202020204" pitchFamily="34" charset="0"/>
+              </a:rPr>
+              <a:t>Hive</a:t>
+            </a:r>
+            <a:r>
+              <a:rPr lang="ru-RU" sz="2000" dirty="0" smtClean="0">
+                <a:latin typeface="Arial" panose="020B0604020202020204" pitchFamily="34" charset="0"/>
+                <a:cs typeface="Arial" panose="020B0604020202020204" pitchFamily="34" charset="0"/>
+              </a:rPr>
+              <a:t> в </a:t>
+            </a:r>
+            <a:r>
+              <a:rPr lang="en-US" sz="2000" dirty="0" smtClean="0">
+                <a:latin typeface="Arial" panose="020B0604020202020204" pitchFamily="34" charset="0"/>
+                <a:cs typeface="Arial" panose="020B0604020202020204" pitchFamily="34" charset="0"/>
+              </a:rPr>
+              <a:t>GreenPlum</a:t>
+            </a:r>
+            <a:endParaRPr lang="ru-RU" sz="2000" dirty="0">
+              <a:latin typeface="Arial" panose="020B0604020202020204" pitchFamily="34" charset="0"/>
+              <a:cs typeface="Arial" panose="020B0604020202020204" pitchFamily="34" charset="0"/>
+            </a:endParaRPr>
+          </a:p>
+        </p:txBody>
+      </p:sp>
       <p:pic>
         <p:nvPicPr>
-          <p:cNvPr id="2" name="Рисунок 1"/>
+          <p:cNvPr id="5" name="Рисунок 4"/>
           <p:cNvPicPr>
             <a:picLocks noChangeAspect="1"/>
           </p:cNvPicPr>
@@ -5705,8 +5746,8 @@
         </p:blipFill>
         <p:spPr>
           <a:xfrm>
-            <a:off x="515939" y="1073499"/>
-            <a:ext cx="4752573" cy="5242976"/>
+            <a:off x="501903" y="1961295"/>
+            <a:ext cx="4429743" cy="4467849"/>
           </a:xfrm>
           <a:prstGeom prst="rect">
             <a:avLst/>
@@ -5715,7 +5756,7 @@
       </p:pic>
       <p:pic>
         <p:nvPicPr>
-          <p:cNvPr id="3" name="Рисунок 2"/>
+          <p:cNvPr id="9" name="Рисунок 8"/>
           <p:cNvPicPr>
             <a:picLocks noChangeAspect="1"/>
           </p:cNvPicPr>
@@ -5729,8 +5770,32 @@
         </p:blipFill>
         <p:spPr>
           <a:xfrm>
-            <a:off x="6650964" y="1538310"/>
-            <a:ext cx="4948314" cy="4313354"/>
+            <a:off x="9293906" y="1404936"/>
+            <a:ext cx="2305372" cy="4677428"/>
+          </a:xfrm>
+          <a:prstGeom prst="rect">
+            <a:avLst/>
+          </a:prstGeom>
+        </p:spPr>
+      </p:pic>
+      <p:pic>
+        <p:nvPicPr>
+          <p:cNvPr id="12" name="Рисунок 11"/>
+          <p:cNvPicPr>
+            <a:picLocks noChangeAspect="1"/>
+          </p:cNvPicPr>
+          <p:nvPr/>
+        </p:nvPicPr>
+        <p:blipFill>
+          <a:blip r:embed="rId5"/>
+          <a:stretch>
+            <a:fillRect/>
+          </a:stretch>
+        </p:blipFill>
+        <p:spPr>
+          <a:xfrm>
+            <a:off x="5326589" y="3210641"/>
+            <a:ext cx="3572374" cy="1781424"/>
           </a:xfrm>
           <a:prstGeom prst="rect">
             <a:avLst/>
@@ -5740,7 +5805,7 @@
     </p:spTree>
     <p:extLst>
       <p:ext uri="{BB962C8B-B14F-4D97-AF65-F5344CB8AC3E}">
-        <p14:creationId xmlns:p14="http://schemas.microsoft.com/office/powerpoint/2010/main" val="921795148"/>
+        <p14:creationId xmlns:p14="http://schemas.microsoft.com/office/powerpoint/2010/main" val="1214712092"/>
       </p:ext>
     </p:extLst>
   </p:cSld>
@@ -5843,89 +5908,6 @@
       </p:sp>
       <p:sp>
         <p:nvSpPr>
-          <p:cNvPr id="5" name="Заголовок 1">
-            <a:extLst>
-              <a:ext uri="{FF2B5EF4-FFF2-40B4-BE49-F238E27FC236}">
-                <a16:creationId xmlns:a16="http://schemas.microsoft.com/office/drawing/2014/main" id="{26F3F6DE-0B95-4A88-A2DE-D547275A4F55}"/>
-              </a:ext>
-            </a:extLst>
-          </p:cNvPr>
-          <p:cNvSpPr txBox="1">
-            <a:spLocks/>
-          </p:cNvSpPr>
-          <p:nvPr/>
-        </p:nvSpPr>
-        <p:spPr>
-          <a:xfrm>
-            <a:off x="439151" y="1189997"/>
-            <a:ext cx="4930708" cy="512961"/>
-          </a:xfrm>
-          <a:prstGeom prst="rect">
-            <a:avLst/>
-          </a:prstGeom>
-        </p:spPr>
-        <p:txBody>
-          <a:bodyPr wrap="square" lIns="0" tIns="0" rIns="0" bIns="0" anchor="t" anchorCtr="0">
-            <a:spAutoFit/>
-          </a:bodyPr>
-          <a:lstStyle>
-            <a:defPPr>
-              <a:defRPr lang="ru-RU"/>
-            </a:defPPr>
-            <a:lvl1pPr>
-              <a:lnSpc>
-                <a:spcPts val="4000"/>
-              </a:lnSpc>
-              <a:spcBef>
-                <a:spcPct val="0"/>
-              </a:spcBef>
-              <a:buNone/>
-              <a:defRPr sz="2800" b="0">
-                <a:effectLst/>
-                <a:latin typeface="Rostelecom Basis Medium" panose="020B0603030604040103" pitchFamily="34" charset="0"/>
-                <a:ea typeface="+mj-ea"/>
-                <a:cs typeface="+mj-cs"/>
-              </a:defRPr>
-            </a:lvl1pPr>
-          </a:lstStyle>
-          <a:p>
-            <a:r>
-              <a:rPr lang="ru-RU" sz="2000" dirty="0" smtClean="0">
-                <a:latin typeface="Arial" panose="020B0604020202020204" pitchFamily="34" charset="0"/>
-                <a:cs typeface="Arial" panose="020B0604020202020204" pitchFamily="34" charset="0"/>
-              </a:rPr>
-              <a:t>Загружаем </a:t>
-            </a:r>
-            <a:r>
-              <a:rPr lang="ru-RU" sz="2000" dirty="0" smtClean="0">
-                <a:latin typeface="Arial" panose="020B0604020202020204" pitchFamily="34" charset="0"/>
-                <a:cs typeface="Arial" panose="020B0604020202020204" pitchFamily="34" charset="0"/>
-              </a:rPr>
-              <a:t>виртуальную таблицу </a:t>
-            </a:r>
-            <a:r>
-              <a:rPr lang="ru-RU" sz="2000" dirty="0" smtClean="0">
-                <a:latin typeface="Arial" panose="020B0604020202020204" pitchFamily="34" charset="0"/>
-                <a:cs typeface="Arial" panose="020B0604020202020204" pitchFamily="34" charset="0"/>
-              </a:rPr>
-              <a:t>из </a:t>
-            </a:r>
-            <a:r>
-              <a:rPr lang="en-US" sz="2000" dirty="0" smtClean="0">
-                <a:latin typeface="Arial" panose="020B0604020202020204" pitchFamily="34" charset="0"/>
-                <a:cs typeface="Arial" panose="020B0604020202020204" pitchFamily="34" charset="0"/>
-              </a:rPr>
-              <a:t>Hive</a:t>
-            </a:r>
-            <a:endParaRPr lang="ru-RU" sz="2000" dirty="0">
-              <a:latin typeface="Arial" panose="020B0604020202020204" pitchFamily="34" charset="0"/>
-              <a:cs typeface="Arial" panose="020B0604020202020204" pitchFamily="34" charset="0"/>
-            </a:endParaRPr>
-          </a:p>
-        </p:txBody>
-      </p:sp>
-      <p:sp>
-        <p:nvSpPr>
           <p:cNvPr id="6" name="Заголовок 1">
             <a:extLst>
               <a:ext uri="{FF2B5EF4-FFF2-40B4-BE49-F238E27FC236}">
@@ -5979,38 +5961,13 @@
           </a:lstStyle>
           <a:p>
             <a:r>
-              <a:rPr lang="ru-RU" sz="3200" dirty="0">
-                <a:effectLst/>
-                <a:latin typeface="Arial" panose="020B0604020202020204" pitchFamily="34" charset="0"/>
-                <a:cs typeface="Arial" panose="020B0604020202020204" pitchFamily="34" charset="0"/>
-              </a:rPr>
-              <a:t>Аналитика </a:t>
-            </a:r>
-            <a:r>
-              <a:rPr lang="ru-RU" sz="3200" dirty="0" smtClean="0">
-                <a:effectLst/>
-                <a:latin typeface="Arial" panose="020B0604020202020204" pitchFamily="34" charset="0"/>
-                <a:cs typeface="Arial" panose="020B0604020202020204" pitchFamily="34" charset="0"/>
-              </a:rPr>
-              <a:t>(</a:t>
-            </a:r>
-            <a:r>
-              <a:rPr lang="ru-RU" sz="3200" dirty="0">
-                <a:effectLst/>
-                <a:latin typeface="Arial" panose="020B0604020202020204" pitchFamily="34" charset="0"/>
-                <a:cs typeface="Arial" panose="020B0604020202020204" pitchFamily="34" charset="0"/>
-              </a:rPr>
-              <a:t>Apache Zeppelin + Apache </a:t>
-            </a:r>
-            <a:r>
-              <a:rPr lang="ru-RU" sz="3200" dirty="0" smtClean="0">
-                <a:effectLst/>
-                <a:latin typeface="Arial" panose="020B0604020202020204" pitchFamily="34" charset="0"/>
-                <a:cs typeface="Arial" panose="020B0604020202020204" pitchFamily="34" charset="0"/>
-              </a:rPr>
-              <a:t>Spark)</a:t>
-            </a:r>
-            <a:endParaRPr lang="ru-RU" sz="3200" b="1" dirty="0">
+              <a:rPr lang="ru-RU" sz="2800" dirty="0">
+                <a:effectLst/>
+              </a:rPr>
+              <a:t>Перенос данных в GreenPlum (RT.Warehouse)</a:t>
+            </a:r>
+            <a:endParaRPr lang="ru-RU" sz="2800" b="1" dirty="0">
+              <a:effectLst/>
               <a:latin typeface="Arial" panose="020B0604020202020204" pitchFamily="34" charset="0"/>
               <a:cs typeface="Arial" panose="020B0604020202020204" pitchFamily="34" charset="0"/>
             </a:endParaRPr>
@@ -6049,7 +6006,7 @@
       </p:pic>
       <p:pic>
         <p:nvPicPr>
-          <p:cNvPr id="8" name="Рисунок 7"/>
+          <p:cNvPr id="2" name="Рисунок 1"/>
           <p:cNvPicPr>
             <a:picLocks noChangeAspect="1"/>
           </p:cNvPicPr>
@@ -6063,8 +6020,8 @@
         </p:blipFill>
         <p:spPr>
           <a:xfrm>
-            <a:off x="5931112" y="1696804"/>
-            <a:ext cx="5668166" cy="4696480"/>
+            <a:off x="515939" y="1073499"/>
+            <a:ext cx="4752573" cy="5242976"/>
           </a:xfrm>
           <a:prstGeom prst="rect">
             <a:avLst/>
@@ -6073,7 +6030,7 @@
       </p:pic>
       <p:pic>
         <p:nvPicPr>
-          <p:cNvPr id="2" name="Рисунок 1"/>
+          <p:cNvPr id="3" name="Рисунок 2"/>
           <p:cNvPicPr>
             <a:picLocks noChangeAspect="1"/>
           </p:cNvPicPr>
@@ -6087,8 +6044,8 @@
         </p:blipFill>
         <p:spPr>
           <a:xfrm>
-            <a:off x="439151" y="2039751"/>
-            <a:ext cx="5001323" cy="4353533"/>
+            <a:off x="6650964" y="1538310"/>
+            <a:ext cx="4948314" cy="4313354"/>
           </a:xfrm>
           <a:prstGeom prst="rect">
             <a:avLst/>
@@ -6098,7 +6055,7 @@
     </p:spTree>
     <p:extLst>
       <p:ext uri="{BB962C8B-B14F-4D97-AF65-F5344CB8AC3E}">
-        <p14:creationId xmlns:p14="http://schemas.microsoft.com/office/powerpoint/2010/main" val="929180253"/>
+        <p14:creationId xmlns:p14="http://schemas.microsoft.com/office/powerpoint/2010/main" val="921795148"/>
       </p:ext>
     </p:extLst>
   </p:cSld>
@@ -6201,6 +6158,75 @@
       </p:sp>
       <p:sp>
         <p:nvSpPr>
+          <p:cNvPr id="5" name="Заголовок 1">
+            <a:extLst>
+              <a:ext uri="{FF2B5EF4-FFF2-40B4-BE49-F238E27FC236}">
+                <a16:creationId xmlns:a16="http://schemas.microsoft.com/office/drawing/2014/main" id="{26F3F6DE-0B95-4A88-A2DE-D547275A4F55}"/>
+              </a:ext>
+            </a:extLst>
+          </p:cNvPr>
+          <p:cNvSpPr txBox="1">
+            <a:spLocks/>
+          </p:cNvSpPr>
+          <p:nvPr/>
+        </p:nvSpPr>
+        <p:spPr>
+          <a:xfrm>
+            <a:off x="439151" y="1189997"/>
+            <a:ext cx="4930708" cy="512961"/>
+          </a:xfrm>
+          <a:prstGeom prst="rect">
+            <a:avLst/>
+          </a:prstGeom>
+        </p:spPr>
+        <p:txBody>
+          <a:bodyPr wrap="square" lIns="0" tIns="0" rIns="0" bIns="0" anchor="t" anchorCtr="0">
+            <a:spAutoFit/>
+          </a:bodyPr>
+          <a:lstStyle>
+            <a:defPPr>
+              <a:defRPr lang="ru-RU"/>
+            </a:defPPr>
+            <a:lvl1pPr>
+              <a:lnSpc>
+                <a:spcPts val="4000"/>
+              </a:lnSpc>
+              <a:spcBef>
+                <a:spcPct val="0"/>
+              </a:spcBef>
+              <a:buNone/>
+              <a:defRPr sz="2800" b="0">
+                <a:effectLst/>
+                <a:latin typeface="Rostelecom Basis Medium" panose="020B0603030604040103" pitchFamily="34" charset="0"/>
+                <a:ea typeface="+mj-ea"/>
+                <a:cs typeface="+mj-cs"/>
+              </a:defRPr>
+            </a:lvl1pPr>
+          </a:lstStyle>
+          <a:p>
+            <a:r>
+              <a:rPr lang="ru-RU" sz="2000" dirty="0" smtClean="0">
+                <a:latin typeface="Arial" panose="020B0604020202020204" pitchFamily="34" charset="0"/>
+                <a:cs typeface="Arial" panose="020B0604020202020204" pitchFamily="34" charset="0"/>
+              </a:rPr>
+              <a:t>Загружаем виртуальную таблицу из </a:t>
+            </a:r>
+            <a:r>
+              <a:rPr lang="en-US" sz="2000" dirty="0" smtClean="0">
+                <a:latin typeface="Arial" panose="020B0604020202020204" pitchFamily="34" charset="0"/>
+                <a:cs typeface="Arial" panose="020B0604020202020204" pitchFamily="34" charset="0"/>
+              </a:rPr>
+              <a:t>Hive</a:t>
+            </a:r>
+            <a:endParaRPr lang="ru-RU" sz="2000" dirty="0">
+              <a:latin typeface="Arial" panose="020B0604020202020204" pitchFamily="34" charset="0"/>
+              <a:cs typeface="Arial" panose="020B0604020202020204" pitchFamily="34" charset="0"/>
+            </a:endParaRPr>
+          </a:p>
+        </p:txBody>
+      </p:sp>
+      <p:sp>
+        <p:nvSpPr>
           <p:cNvPr id="6" name="Заголовок 1">
             <a:extLst>
               <a:ext uri="{FF2B5EF4-FFF2-40B4-BE49-F238E27FC236}">
@@ -6259,7 +6285,31 @@
                 <a:latin typeface="Arial" panose="020B0604020202020204" pitchFamily="34" charset="0"/>
                 <a:cs typeface="Arial" panose="020B0604020202020204" pitchFamily="34" charset="0"/>
               </a:rPr>
-              <a:t>Аналитика (Apache Zeppelin + Apache Spark)</a:t>
+              <a:t>Аналитика </a:t>
+            </a:r>
+            <a:r>
+              <a:rPr lang="ru-RU" sz="3200" dirty="0" smtClean="0">
+                <a:effectLst/>
+                <a:latin typeface="Arial" panose="020B0604020202020204" pitchFamily="34" charset="0"/>
+                <a:cs typeface="Arial" panose="020B0604020202020204" pitchFamily="34" charset="0"/>
+              </a:rPr>
+              <a:t>(</a:t>
+            </a:r>
+            <a:r>
+              <a:rPr lang="ru-RU" sz="3200" dirty="0">
+                <a:effectLst/>
+                <a:latin typeface="Arial" panose="020B0604020202020204" pitchFamily="34" charset="0"/>
+                <a:cs typeface="Arial" panose="020B0604020202020204" pitchFamily="34" charset="0"/>
+              </a:rPr>
+              <a:t>Apache Zeppelin + Apache </a:t>
+            </a:r>
+            <a:r>
+              <a:rPr lang="ru-RU" sz="3200" dirty="0" smtClean="0">
+                <a:effectLst/>
+                <a:latin typeface="Arial" panose="020B0604020202020204" pitchFamily="34" charset="0"/>
+                <a:cs typeface="Arial" panose="020B0604020202020204" pitchFamily="34" charset="0"/>
+              </a:rPr>
+              <a:t>Spark)</a:t>
             </a:r>
             <a:endParaRPr lang="ru-RU" sz="3200" b="1" dirty="0">
               <a:latin typeface="Arial" panose="020B0604020202020204" pitchFamily="34" charset="0"/>
@@ -6300,7 +6350,7 @@
       </p:pic>
       <p:pic>
         <p:nvPicPr>
-          <p:cNvPr id="4" name="Рисунок 3"/>
+          <p:cNvPr id="8" name="Рисунок 7"/>
           <p:cNvPicPr>
             <a:picLocks noChangeAspect="1"/>
           </p:cNvPicPr>
@@ -6314,8 +6364,8 @@
         </p:blipFill>
         <p:spPr>
           <a:xfrm>
-            <a:off x="439151" y="1324792"/>
-            <a:ext cx="4315427" cy="1495634"/>
+            <a:off x="5931112" y="1696804"/>
+            <a:ext cx="5668166" cy="4696480"/>
           </a:xfrm>
           <a:prstGeom prst="rect">
             <a:avLst/>
@@ -6324,7 +6374,7 @@
       </p:pic>
       <p:pic>
         <p:nvPicPr>
-          <p:cNvPr id="8" name="Рисунок 7"/>
+          <p:cNvPr id="2" name="Рисунок 1"/>
           <p:cNvPicPr>
             <a:picLocks noChangeAspect="1"/>
           </p:cNvPicPr>
@@ -6338,56 +6388,8 @@
         </p:blipFill>
         <p:spPr>
           <a:xfrm>
-            <a:off x="724940" y="2955841"/>
-            <a:ext cx="3743847" cy="3620005"/>
-          </a:xfrm>
-          <a:prstGeom prst="rect">
-            <a:avLst/>
-          </a:prstGeom>
-        </p:spPr>
-      </p:pic>
-      <p:pic>
-        <p:nvPicPr>
-          <p:cNvPr id="9" name="Рисунок 8"/>
-          <p:cNvPicPr>
-            <a:picLocks noChangeAspect="1"/>
-          </p:cNvPicPr>
-          <p:nvPr/>
-        </p:nvPicPr>
-        <p:blipFill>
-          <a:blip r:embed="rId5"/>
-          <a:stretch>
-            <a:fillRect/>
-          </a:stretch>
-        </p:blipFill>
-        <p:spPr>
-          <a:xfrm>
-            <a:off x="5909313" y="1324792"/>
-            <a:ext cx="5572903" cy="1324160"/>
-          </a:xfrm>
-          <a:prstGeom prst="rect">
-            <a:avLst/>
-          </a:prstGeom>
-        </p:spPr>
-      </p:pic>
-      <p:pic>
-        <p:nvPicPr>
-          <p:cNvPr id="10" name="Рисунок 9"/>
-          <p:cNvPicPr>
-            <a:picLocks noChangeAspect="1"/>
-          </p:cNvPicPr>
-          <p:nvPr/>
-        </p:nvPicPr>
-        <p:blipFill>
-          <a:blip r:embed="rId6"/>
-          <a:stretch>
-            <a:fillRect/>
-          </a:stretch>
-        </p:blipFill>
-        <p:spPr>
-          <a:xfrm>
-            <a:off x="5909313" y="2820426"/>
-            <a:ext cx="5830114" cy="3715268"/>
+            <a:off x="439151" y="2039751"/>
+            <a:ext cx="5001323" cy="4353533"/>
           </a:xfrm>
           <a:prstGeom prst="rect">
             <a:avLst/>
@@ -6397,7 +6399,7 @@
     </p:spTree>
     <p:extLst>
       <p:ext uri="{BB962C8B-B14F-4D97-AF65-F5344CB8AC3E}">
-        <p14:creationId xmlns:p14="http://schemas.microsoft.com/office/powerpoint/2010/main" val="2997639442"/>
+        <p14:creationId xmlns:p14="http://schemas.microsoft.com/office/powerpoint/2010/main" val="929180253"/>
       </p:ext>
     </p:extLst>
   </p:cSld>
@@ -6500,7 +6502,7 @@
       </p:sp>
       <p:sp>
         <p:nvSpPr>
-          <p:cNvPr id="5" name="Заголовок 1">
+          <p:cNvPr id="6" name="Заголовок 1">
             <a:extLst>
               <a:ext uri="{FF2B5EF4-FFF2-40B4-BE49-F238E27FC236}">
                 <a16:creationId xmlns:a16="http://schemas.microsoft.com/office/drawing/2014/main" id="{26F3F6DE-0B95-4A88-A2DE-D547275A4F55}"/>
@@ -6514,84 +6516,8 @@
         </p:nvSpPr>
         <p:spPr>
           <a:xfrm>
-            <a:off x="439152" y="2920189"/>
-            <a:ext cx="11160127" cy="979435"/>
-          </a:xfrm>
-          <a:prstGeom prst="rect">
-            <a:avLst/>
-          </a:prstGeom>
-        </p:spPr>
-        <p:txBody>
-          <a:bodyPr lIns="0" tIns="0" rIns="0" bIns="0" anchor="t" anchorCtr="0">
-            <a:spAutoFit/>
-          </a:bodyPr>
-          <a:lstStyle>
-            <a:defPPr>
-              <a:defRPr lang="ru-RU"/>
-            </a:defPPr>
-            <a:lvl1pPr>
-              <a:lnSpc>
-                <a:spcPts val="4000"/>
-              </a:lnSpc>
-              <a:spcBef>
-                <a:spcPct val="0"/>
-              </a:spcBef>
-              <a:buNone/>
-              <a:defRPr sz="2800" b="0">
-                <a:effectLst/>
-                <a:latin typeface="Rostelecom Basis Medium" panose="020B0603030604040103" pitchFamily="34" charset="0"/>
-                <a:ea typeface="+mj-ea"/>
-                <a:cs typeface="+mj-cs"/>
-              </a:defRPr>
-            </a:lvl1pPr>
-          </a:lstStyle>
-          <a:p>
-            <a:r>
-              <a:rPr lang="ru-RU" dirty="0" smtClean="0">
-                <a:latin typeface="Arial" panose="020B0604020202020204" pitchFamily="34" charset="0"/>
-                <a:cs typeface="Arial" panose="020B0604020202020204" pitchFamily="34" charset="0"/>
-              </a:rPr>
-              <a:t>Основные итоги вашей работы</a:t>
-            </a:r>
-            <a:r>
-              <a:rPr lang="en-US" dirty="0" smtClean="0">
-                <a:latin typeface="Arial" panose="020B0604020202020204" pitchFamily="34" charset="0"/>
-                <a:cs typeface="Arial" panose="020B0604020202020204" pitchFamily="34" charset="0"/>
-              </a:rPr>
-              <a:t>,</a:t>
-            </a:r>
-            <a:r>
-              <a:rPr lang="ru-RU" dirty="0" smtClean="0">
-                <a:latin typeface="Arial" panose="020B0604020202020204" pitchFamily="34" charset="0"/>
-                <a:cs typeface="Arial" panose="020B0604020202020204" pitchFamily="34" charset="0"/>
-              </a:rPr>
-              <a:t> инсайты после работы с данными и графики</a:t>
-            </a:r>
-            <a:endParaRPr lang="ru-RU" dirty="0">
-              <a:latin typeface="Arial" panose="020B0604020202020204" pitchFamily="34" charset="0"/>
-              <a:cs typeface="Arial" panose="020B0604020202020204" pitchFamily="34" charset="0"/>
-            </a:endParaRPr>
-          </a:p>
-        </p:txBody>
-      </p:sp>
-      <p:sp>
-        <p:nvSpPr>
-          <p:cNvPr id="6" name="Заголовок 1">
-            <a:extLst>
-              <a:ext uri="{FF2B5EF4-FFF2-40B4-BE49-F238E27FC236}">
-                <a16:creationId xmlns:a16="http://schemas.microsoft.com/office/drawing/2014/main" id="{26F3F6DE-0B95-4A88-A2DE-D547275A4F55}"/>
-              </a:ext>
-            </a:extLst>
-          </p:cNvPr>
-          <p:cNvSpPr txBox="1">
-            <a:spLocks/>
-          </p:cNvSpPr>
-          <p:nvPr/>
-        </p:nvSpPr>
-        <p:spPr>
-          <a:xfrm>
             <a:off x="439151" y="560538"/>
-            <a:ext cx="11160127" cy="523220"/>
+            <a:ext cx="11160127" cy="512961"/>
           </a:xfrm>
           <a:prstGeom prst="rect">
             <a:avLst/>
@@ -6629,14 +6555,14 @@
           </a:lstStyle>
           <a:p>
             <a:r>
-              <a:rPr lang="ru-RU" b="1" dirty="0">
-                <a:effectLst/>
-                <a:latin typeface="Arial" panose="020B0604020202020204" pitchFamily="34" charset="0"/>
-                <a:cs typeface="Arial" panose="020B0604020202020204" pitchFamily="34" charset="0"/>
-              </a:rPr>
-              <a:t>Итоги и инсайты</a:t>
-            </a:r>
-            <a:endParaRPr lang="ru-RU" b="1" dirty="0">
+              <a:rPr lang="ru-RU" sz="3200" dirty="0">
+                <a:effectLst/>
+                <a:latin typeface="Arial" panose="020B0604020202020204" pitchFamily="34" charset="0"/>
+                <a:cs typeface="Arial" panose="020B0604020202020204" pitchFamily="34" charset="0"/>
+              </a:rPr>
+              <a:t>Аналитика (Apache Zeppelin + Apache Spark)</a:t>
+            </a:r>
+            <a:endParaRPr lang="ru-RU" sz="3200" b="1" dirty="0">
               <a:latin typeface="Arial" panose="020B0604020202020204" pitchFamily="34" charset="0"/>
               <a:cs typeface="Arial" panose="020B0604020202020204" pitchFamily="34" charset="0"/>
             </a:endParaRPr>
@@ -6673,10 +6599,106 @@
           </a:prstGeom>
         </p:spPr>
       </p:pic>
+      <p:pic>
+        <p:nvPicPr>
+          <p:cNvPr id="9" name="Рисунок 8"/>
+          <p:cNvPicPr>
+            <a:picLocks noChangeAspect="1"/>
+          </p:cNvPicPr>
+          <p:nvPr/>
+        </p:nvPicPr>
+        <p:blipFill>
+          <a:blip r:embed="rId3"/>
+          <a:stretch>
+            <a:fillRect/>
+          </a:stretch>
+        </p:blipFill>
+        <p:spPr>
+          <a:xfrm>
+            <a:off x="5909313" y="1324792"/>
+            <a:ext cx="5572903" cy="1324160"/>
+          </a:xfrm>
+          <a:prstGeom prst="rect">
+            <a:avLst/>
+          </a:prstGeom>
+        </p:spPr>
+      </p:pic>
+      <p:pic>
+        <p:nvPicPr>
+          <p:cNvPr id="10" name="Рисунок 9"/>
+          <p:cNvPicPr>
+            <a:picLocks noChangeAspect="1"/>
+          </p:cNvPicPr>
+          <p:nvPr/>
+        </p:nvPicPr>
+        <p:blipFill>
+          <a:blip r:embed="rId4"/>
+          <a:stretch>
+            <a:fillRect/>
+          </a:stretch>
+        </p:blipFill>
+        <p:spPr>
+          <a:xfrm>
+            <a:off x="5909313" y="2820426"/>
+            <a:ext cx="5830114" cy="3715268"/>
+          </a:xfrm>
+          <a:prstGeom prst="rect">
+            <a:avLst/>
+          </a:prstGeom>
+        </p:spPr>
+      </p:pic>
+      <p:pic>
+        <p:nvPicPr>
+          <p:cNvPr id="3" name="Рисунок 2"/>
+          <p:cNvPicPr>
+            <a:picLocks noChangeAspect="1"/>
+          </p:cNvPicPr>
+          <p:nvPr/>
+        </p:nvPicPr>
+        <p:blipFill>
+          <a:blip r:embed="rId5"/>
+          <a:stretch>
+            <a:fillRect/>
+          </a:stretch>
+        </p:blipFill>
+        <p:spPr>
+          <a:xfrm>
+            <a:off x="515939" y="1220003"/>
+            <a:ext cx="4277322" cy="1428949"/>
+          </a:xfrm>
+          <a:prstGeom prst="rect">
+            <a:avLst/>
+          </a:prstGeom>
+        </p:spPr>
+      </p:pic>
+      <p:pic>
+        <p:nvPicPr>
+          <p:cNvPr id="5" name="Рисунок 4"/>
+          <p:cNvPicPr>
+            <a:picLocks noChangeAspect="1"/>
+          </p:cNvPicPr>
+          <p:nvPr/>
+        </p:nvPicPr>
+        <p:blipFill>
+          <a:blip r:embed="rId6"/>
+          <a:stretch>
+            <a:fillRect/>
+          </a:stretch>
+        </p:blipFill>
+        <p:spPr>
+          <a:xfrm>
+            <a:off x="963676" y="2939747"/>
+            <a:ext cx="3381847" cy="3162741"/>
+          </a:xfrm>
+          <a:prstGeom prst="rect">
+            <a:avLst/>
+          </a:prstGeom>
+        </p:spPr>
+      </p:pic>
     </p:spTree>
     <p:extLst>
       <p:ext uri="{BB962C8B-B14F-4D97-AF65-F5344CB8AC3E}">
-        <p14:creationId xmlns:p14="http://schemas.microsoft.com/office/powerpoint/2010/main" val="4091612681"/>
+        <p14:creationId xmlns:p14="http://schemas.microsoft.com/office/powerpoint/2010/main" val="2997639442"/>
       </p:ext>
     </p:extLst>
   </p:cSld>
@@ -6779,7 +6801,7 @@
       </p:sp>
       <p:sp>
         <p:nvSpPr>
-          <p:cNvPr id="5" name="Заголовок 1">
+          <p:cNvPr id="6" name="Заголовок 1">
             <a:extLst>
               <a:ext uri="{FF2B5EF4-FFF2-40B4-BE49-F238E27FC236}">
                 <a16:creationId xmlns:a16="http://schemas.microsoft.com/office/drawing/2014/main" id="{26F3F6DE-0B95-4A88-A2DE-D547275A4F55}"/>
@@ -6793,212 +6815,8 @@
         </p:nvSpPr>
         <p:spPr>
           <a:xfrm>
-            <a:off x="439151" y="1333436"/>
-            <a:ext cx="11160127" cy="3077766"/>
-          </a:xfrm>
-          <a:prstGeom prst="rect">
-            <a:avLst/>
-          </a:prstGeom>
-        </p:spPr>
-        <p:txBody>
-          <a:bodyPr lIns="0" tIns="0" rIns="0" bIns="0" anchor="t" anchorCtr="0">
-            <a:spAutoFit/>
-          </a:bodyPr>
-          <a:lstStyle>
-            <a:defPPr>
-              <a:defRPr lang="ru-RU"/>
-            </a:defPPr>
-            <a:lvl1pPr>
-              <a:lnSpc>
-                <a:spcPts val="4000"/>
-              </a:lnSpc>
-              <a:spcBef>
-                <a:spcPct val="0"/>
-              </a:spcBef>
-              <a:buNone/>
-              <a:defRPr sz="2800" b="0">
-                <a:effectLst/>
-                <a:latin typeface="Rostelecom Basis Medium" panose="020B0603030604040103" pitchFamily="34" charset="0"/>
-                <a:ea typeface="+mj-ea"/>
-                <a:cs typeface="+mj-cs"/>
-              </a:defRPr>
-            </a:lvl1pPr>
-          </a:lstStyle>
-          <a:p>
-            <a:pPr marL="457200" indent="-457200">
-              <a:buFont typeface="+mj-lt"/>
-              <a:buAutoNum type="arabicPeriod"/>
-            </a:pPr>
-            <a:r>
-              <a:rPr lang="ru-RU" sz="2000" dirty="0" err="1" smtClean="0">
-                <a:latin typeface="Arial" panose="020B0604020202020204" pitchFamily="34" charset="0"/>
-                <a:cs typeface="Arial" panose="020B0604020202020204" pitchFamily="34" charset="0"/>
-              </a:rPr>
-              <a:t>Гитхаб</a:t>
-            </a:r>
-            <a:r>
-              <a:rPr lang="ru-RU" sz="2000" dirty="0" smtClean="0">
-                <a:latin typeface="Arial" panose="020B0604020202020204" pitchFamily="34" charset="0"/>
-                <a:cs typeface="Arial" panose="020B0604020202020204" pitchFamily="34" charset="0"/>
-              </a:rPr>
-              <a:t> проекта: </a:t>
-            </a:r>
-            <a:r>
-              <a:rPr lang="en-US" sz="2000" dirty="0" smtClean="0">
-                <a:latin typeface="Arial" panose="020B0604020202020204" pitchFamily="34" charset="0"/>
-                <a:cs typeface="Arial" panose="020B0604020202020204" pitchFamily="34" charset="0"/>
-                <a:hlinkClick r:id="rId2"/>
-              </a:rPr>
-              <a:t>https://github.com/Olmeor/Data-engineer_Rostelecom_programming_school</a:t>
-            </a:r>
-            <a:endParaRPr lang="ru-RU" sz="2000" dirty="0" smtClean="0">
-              <a:latin typeface="Arial" panose="020B0604020202020204" pitchFamily="34" charset="0"/>
-              <a:cs typeface="Arial" panose="020B0604020202020204" pitchFamily="34" charset="0"/>
-            </a:endParaRPr>
-          </a:p>
-          <a:p>
-            <a:pPr marL="457200" indent="-457200">
-              <a:buFont typeface="+mj-lt"/>
-              <a:buAutoNum type="arabicPeriod"/>
-            </a:pPr>
-            <a:r>
-              <a:rPr lang="ru-RU" sz="2000" dirty="0" smtClean="0">
-                <a:latin typeface="Arial" panose="020B0604020202020204" pitchFamily="34" charset="0"/>
-                <a:cs typeface="Arial" panose="020B0604020202020204" pitchFamily="34" charset="0"/>
-              </a:rPr>
-              <a:t>Рейтинг популярности телеканалов: </a:t>
-            </a:r>
-            <a:r>
-              <a:rPr lang="en-US" sz="2000" dirty="0">
-                <a:latin typeface="Arial" panose="020B0604020202020204" pitchFamily="34" charset="0"/>
-                <a:cs typeface="Arial" panose="020B0604020202020204" pitchFamily="34" charset="0"/>
-                <a:hlinkClick r:id="rId3"/>
-              </a:rPr>
-              <a:t>https://</a:t>
-            </a:r>
-            <a:r>
-              <a:rPr lang="en-US" sz="2000" dirty="0" smtClean="0">
-                <a:latin typeface="Arial" panose="020B0604020202020204" pitchFamily="34" charset="0"/>
-                <a:cs typeface="Arial" panose="020B0604020202020204" pitchFamily="34" charset="0"/>
-                <a:hlinkClick r:id="rId3"/>
-              </a:rPr>
-              <a:t>www.powernet.com.ru/channels-stat</a:t>
-            </a:r>
-            <a:endParaRPr lang="ru-RU" sz="2000" dirty="0" smtClean="0">
-              <a:latin typeface="Arial" panose="020B0604020202020204" pitchFamily="34" charset="0"/>
-              <a:cs typeface="Arial" panose="020B0604020202020204" pitchFamily="34" charset="0"/>
-            </a:endParaRPr>
-          </a:p>
-          <a:p>
-            <a:pPr marL="457200" indent="-457200">
-              <a:buFont typeface="+mj-lt"/>
-              <a:buAutoNum type="arabicPeriod"/>
-            </a:pPr>
-            <a:r>
-              <a:rPr lang="ru-RU" sz="2000" dirty="0" smtClean="0">
-                <a:latin typeface="Arial" panose="020B0604020202020204" pitchFamily="34" charset="0"/>
-                <a:cs typeface="Arial" panose="020B0604020202020204" pitchFamily="34" charset="0"/>
-              </a:rPr>
-              <a:t>Аналитика просмотров: </a:t>
-            </a:r>
-            <a:r>
-              <a:rPr lang="en-US" sz="2000" dirty="0">
-                <a:latin typeface="Arial" panose="020B0604020202020204" pitchFamily="34" charset="0"/>
-                <a:cs typeface="Arial" panose="020B0604020202020204" pitchFamily="34" charset="0"/>
-                <a:hlinkClick r:id="rId4"/>
-              </a:rPr>
-              <a:t>https://journal.tinkoff.ru/television-stat</a:t>
-            </a:r>
-            <a:r>
-              <a:rPr lang="en-US" sz="2000" dirty="0" smtClean="0">
-                <a:latin typeface="Arial" panose="020B0604020202020204" pitchFamily="34" charset="0"/>
-                <a:cs typeface="Arial" panose="020B0604020202020204" pitchFamily="34" charset="0"/>
-                <a:hlinkClick r:id="rId4"/>
-              </a:rPr>
-              <a:t>/</a:t>
-            </a:r>
-            <a:endParaRPr lang="en-US" sz="2000" dirty="0" smtClean="0">
-              <a:latin typeface="Arial" panose="020B0604020202020204" pitchFamily="34" charset="0"/>
-              <a:cs typeface="Arial" panose="020B0604020202020204" pitchFamily="34" charset="0"/>
-            </a:endParaRPr>
-          </a:p>
-          <a:p>
-            <a:pPr marL="457200" indent="-457200">
-              <a:buFont typeface="+mj-lt"/>
-              <a:buAutoNum type="arabicPeriod"/>
-            </a:pPr>
-            <a:r>
-              <a:rPr lang="en-US" sz="2000" dirty="0">
-                <a:latin typeface="Arial" panose="020B0604020202020204" pitchFamily="34" charset="0"/>
-                <a:cs typeface="Arial" panose="020B0604020202020204" pitchFamily="34" charset="0"/>
-              </a:rPr>
-              <a:t>Spark notebook - </a:t>
-            </a:r>
-            <a:r>
-              <a:rPr lang="en-US" sz="2000" dirty="0">
-                <a:latin typeface="Arial" panose="020B0604020202020204" pitchFamily="34" charset="0"/>
-                <a:cs typeface="Arial" panose="020B0604020202020204" pitchFamily="34" charset="0"/>
-                <a:hlinkClick r:id="rId5"/>
-              </a:rPr>
-              <a:t>http://vm-dlake2-m-2:8180/#/</a:t>
-            </a:r>
-            <a:r>
-              <a:rPr lang="en-US" sz="2000" dirty="0" smtClean="0">
-                <a:latin typeface="Arial" panose="020B0604020202020204" pitchFamily="34" charset="0"/>
-                <a:cs typeface="Arial" panose="020B0604020202020204" pitchFamily="34" charset="0"/>
-                <a:hlinkClick r:id="rId5"/>
-              </a:rPr>
-              <a:t>notebook/2JBN33XNC</a:t>
-            </a:r>
-            <a:r>
-              <a:rPr lang="en-US" sz="2000" dirty="0" smtClean="0">
-                <a:latin typeface="Arial" panose="020B0604020202020204" pitchFamily="34" charset="0"/>
-                <a:cs typeface="Arial" panose="020B0604020202020204" pitchFamily="34" charset="0"/>
-              </a:rPr>
-              <a:t> (</a:t>
-            </a:r>
-            <a:r>
-              <a:rPr lang="ru-RU" sz="2000" dirty="0" smtClean="0">
-                <a:latin typeface="Arial" panose="020B0604020202020204" pitchFamily="34" charset="0"/>
-                <a:cs typeface="Arial" panose="020B0604020202020204" pitchFamily="34" charset="0"/>
-              </a:rPr>
-              <a:t>только внутри кластера)</a:t>
-            </a:r>
-            <a:endParaRPr lang="en-US" sz="2000" dirty="0" smtClean="0">
-              <a:latin typeface="Arial" panose="020B0604020202020204" pitchFamily="34" charset="0"/>
-              <a:cs typeface="Arial" panose="020B0604020202020204" pitchFamily="34" charset="0"/>
-            </a:endParaRPr>
-          </a:p>
-          <a:p>
-            <a:pPr marL="457200" indent="-457200">
-              <a:buFont typeface="+mj-lt"/>
-              <a:buAutoNum type="arabicPeriod"/>
-            </a:pPr>
-            <a:endParaRPr lang="ru-RU" sz="2000" dirty="0">
-              <a:latin typeface="Arial" panose="020B0604020202020204" pitchFamily="34" charset="0"/>
-              <a:cs typeface="Arial" panose="020B0604020202020204" pitchFamily="34" charset="0"/>
-            </a:endParaRPr>
-          </a:p>
-        </p:txBody>
-      </p:sp>
-      <p:sp>
-        <p:nvSpPr>
-          <p:cNvPr id="6" name="Заголовок 1">
-            <a:extLst>
-              <a:ext uri="{FF2B5EF4-FFF2-40B4-BE49-F238E27FC236}">
-                <a16:creationId xmlns:a16="http://schemas.microsoft.com/office/drawing/2014/main" id="{26F3F6DE-0B95-4A88-A2DE-D547275A4F55}"/>
-              </a:ext>
-            </a:extLst>
-          </p:cNvPr>
-          <p:cNvSpPr txBox="1">
-            <a:spLocks/>
-          </p:cNvSpPr>
-          <p:nvPr/>
-        </p:nvSpPr>
-        <p:spPr>
-          <a:xfrm>
             <a:off x="439151" y="560538"/>
-            <a:ext cx="11160127" cy="523220"/>
+            <a:ext cx="11160127" cy="512961"/>
           </a:xfrm>
           <a:prstGeom prst="rect">
             <a:avLst/>
@@ -7036,14 +6854,25 @@
           </a:lstStyle>
           <a:p>
             <a:r>
-              <a:rPr lang="ru-RU" b="1" dirty="0" smtClean="0">
-                <a:effectLst/>
-                <a:latin typeface="Arial" panose="020B0604020202020204" pitchFamily="34" charset="0"/>
-                <a:cs typeface="Arial" panose="020B0604020202020204" pitchFamily="34" charset="0"/>
-              </a:rPr>
-              <a:t>Список ссылок</a:t>
-            </a:r>
-            <a:endParaRPr lang="ru-RU" b="1" dirty="0">
+              <a:rPr lang="ru-RU" sz="3200" dirty="0">
+                <a:effectLst/>
+              </a:rPr>
+              <a:t>Визуализация данных </a:t>
+            </a:r>
+            <a:r>
+              <a:rPr lang="ru-RU" sz="3200" dirty="0" smtClean="0">
+                <a:effectLst/>
+              </a:rPr>
+              <a:t>в Apache </a:t>
+            </a:r>
+            <a:r>
+              <a:rPr lang="ru-RU" sz="3200" dirty="0">
+                <a:effectLst/>
+              </a:rPr>
+              <a:t>Superset</a:t>
+            </a:r>
+            <a:endParaRPr lang="ru-RU" sz="3200" b="1" dirty="0">
+              <a:effectLst/>
               <a:latin typeface="Arial" panose="020B0604020202020204" pitchFamily="34" charset="0"/>
               <a:cs typeface="Arial" panose="020B0604020202020204" pitchFamily="34" charset="0"/>
             </a:endParaRPr>
@@ -7059,7 +6888,7 @@
           <p:nvPr/>
         </p:nvPicPr>
         <p:blipFill>
-          <a:blip r:embed="rId6">
+          <a:blip r:embed="rId2">
             <a:extLst>
               <a:ext uri="{28A0092B-C50C-407E-A947-70E740481C1C}">
                 <a14:useLocalDpi xmlns:a14="http://schemas.microsoft.com/office/drawing/2010/main" val="0"/>
@@ -7080,10 +6909,34 @@
           </a:prstGeom>
         </p:spPr>
       </p:pic>
+      <p:pic>
+        <p:nvPicPr>
+          <p:cNvPr id="2" name="Рисунок 1"/>
+          <p:cNvPicPr>
+            <a:picLocks noChangeAspect="1"/>
+          </p:cNvPicPr>
+          <p:nvPr/>
+        </p:nvPicPr>
+        <p:blipFill>
+          <a:blip r:embed="rId3"/>
+          <a:stretch>
+            <a:fillRect/>
+          </a:stretch>
+        </p:blipFill>
+        <p:spPr>
+          <a:xfrm>
+            <a:off x="439151" y="1456555"/>
+            <a:ext cx="11160127" cy="4832034"/>
+          </a:xfrm>
+          <a:prstGeom prst="rect">
+            <a:avLst/>
+          </a:prstGeom>
+        </p:spPr>
+      </p:pic>
     </p:spTree>
     <p:extLst>
       <p:ext uri="{BB962C8B-B14F-4D97-AF65-F5344CB8AC3E}">
-        <p14:creationId xmlns:p14="http://schemas.microsoft.com/office/powerpoint/2010/main" val="112172180"/>
+        <p14:creationId xmlns:p14="http://schemas.microsoft.com/office/powerpoint/2010/main" val="4091612681"/>
       </p:ext>
     </p:extLst>
   </p:cSld>
@@ -7441,7 +7294,7 @@
     <p:bg>
       <p:bgPr>
         <a:solidFill>
-          <a:srgbClr val="7700FF"/>
+          <a:schemeClr val="bg1"/>
         </a:solidFill>
         <a:effectLst/>
       </p:bgPr>
@@ -7462,7 +7315,66 @@
       </p:grpSpPr>
       <p:sp>
         <p:nvSpPr>
-          <p:cNvPr id="7" name="Заголовок 1">
+          <p:cNvPr id="11" name="Номер слайда 3">
+            <a:extLst>
+              <a:ext uri="{FF2B5EF4-FFF2-40B4-BE49-F238E27FC236}">
+                <a16:creationId xmlns:a16="http://schemas.microsoft.com/office/drawing/2014/main" id="{7267A4CF-F0C4-43DD-AD58-96564CA7C221}"/>
+              </a:ext>
+            </a:extLst>
+          </p:cNvPr>
+          <p:cNvSpPr>
+            <a:spLocks noGrp="1"/>
+          </p:cNvSpPr>
+          <p:nvPr>
+            <p:ph type="sldNum" sz="quarter" idx="12"/>
+          </p:nvPr>
+        </p:nvSpPr>
+        <p:spPr>
+          <a:xfrm>
+            <a:off x="515939" y="6393284"/>
+            <a:ext cx="2743200" cy="365125"/>
+          </a:xfrm>
+          <a:prstGeom prst="rect">
+            <a:avLst/>
+          </a:prstGeom>
+        </p:spPr>
+        <p:txBody>
+          <a:bodyPr lIns="0" rIns="0"/>
+          <a:lstStyle>
+            <a:lvl1pPr>
+              <a:defRPr sz="1200">
+                <a:solidFill>
+                  <a:schemeClr val="bg1">
+                    <a:lumMod val="75000"/>
+                  </a:schemeClr>
+                </a:solidFill>
+              </a:defRPr>
+            </a:lvl1pPr>
+          </a:lstStyle>
+          <a:p>
+            <a:pPr algn="l"/>
+            <a:fld id="{A4D4834B-A5E3-4581-856C-72DC1D7E0BCC}" type="slidenum">
+              <a:rPr lang="ru-RU" smtClean="0">
+                <a:solidFill>
+                  <a:schemeClr val="tx1"/>
+                </a:solidFill>
+                <a:latin typeface="Rostelecom Basis" panose="020B0503030604040103" pitchFamily="34" charset="0"/>
+              </a:rPr>
+              <a:pPr algn="l"/>
+              <a:t>20</a:t>
+            </a:fld>
+            <a:endParaRPr lang="ru-RU" dirty="0">
+              <a:solidFill>
+                <a:schemeClr val="tx1"/>
+              </a:solidFill>
+              <a:latin typeface="Rostelecom Basis" panose="020B0503030604040103" pitchFamily="34" charset="0"/>
+            </a:endParaRPr>
+          </a:p>
+        </p:txBody>
+      </p:sp>
+      <p:sp>
+        <p:nvSpPr>
+          <p:cNvPr id="6" name="Заголовок 1">
             <a:extLst>
               <a:ext uri="{FF2B5EF4-FFF2-40B4-BE49-F238E27FC236}">
                 <a16:creationId xmlns:a16="http://schemas.microsoft.com/office/drawing/2014/main" id="{26F3F6DE-0B95-4A88-A2DE-D547275A4F55}"/>
@@ -7476,8 +7388,8 @@
         </p:nvSpPr>
         <p:spPr>
           <a:xfrm>
-            <a:off x="439153" y="1487179"/>
-            <a:ext cx="11160127" cy="2215991"/>
+            <a:off x="439151" y="560538"/>
+            <a:ext cx="11160127" cy="512961"/>
           </a:xfrm>
           <a:prstGeom prst="rect">
             <a:avLst/>
@@ -7514,53 +7426,50 @@
             </a:lvl1pPr>
           </a:lstStyle>
           <a:p>
-            <a:pPr>
-              <a:lnSpc>
-                <a:spcPct val="150000"/>
-              </a:lnSpc>
-            </a:pPr>
-            <a:r>
-              <a:rPr lang="ru-RU" sz="4800" b="1" dirty="0" smtClean="0">
-                <a:solidFill>
-                  <a:schemeClr val="bg1"/>
-                </a:solidFill>
-                <a:effectLst/>
-                <a:latin typeface="Arial" panose="020B0604020202020204" pitchFamily="34" charset="0"/>
-                <a:cs typeface="Arial" panose="020B0604020202020204" pitchFamily="34" charset="0"/>
-              </a:rPr>
-              <a:t>Спасибо за внимание!</a:t>
-            </a:r>
-            <a:br>
-              <a:rPr lang="ru-RU" sz="4800" b="1" dirty="0" smtClean="0">
-                <a:solidFill>
-                  <a:schemeClr val="bg1"/>
-                </a:solidFill>
-                <a:effectLst/>
-                <a:latin typeface="Arial" panose="020B0604020202020204" pitchFamily="34" charset="0"/>
-                <a:cs typeface="Arial" panose="020B0604020202020204" pitchFamily="34" charset="0"/>
-              </a:rPr>
-            </a:br>
-            <a:r>
-              <a:rPr lang="ru-RU" sz="4800" b="1" dirty="0" smtClean="0">
-                <a:solidFill>
-                  <a:schemeClr val="bg1"/>
-                </a:solidFill>
-                <a:effectLst/>
-                <a:latin typeface="Arial" panose="020B0604020202020204" pitchFamily="34" charset="0"/>
-                <a:cs typeface="Arial" panose="020B0604020202020204" pitchFamily="34" charset="0"/>
-              </a:rPr>
-              <a:t>Готовы ответить на ваши вопросы</a:t>
-            </a:r>
-            <a:endParaRPr lang="ru-RU" sz="4800" b="1" dirty="0">
-              <a:solidFill>
-                <a:schemeClr val="bg1"/>
-              </a:solidFill>
+            <a:r>
+              <a:rPr lang="ru-RU" sz="3200">
+                <a:effectLst/>
+              </a:rPr>
+              <a:t>Визуализация данных в Apache Superset</a:t>
+            </a:r>
+            <a:endParaRPr lang="ru-RU" sz="3200" b="1" dirty="0">
+              <a:effectLst/>
               <a:latin typeface="Arial" panose="020B0604020202020204" pitchFamily="34" charset="0"/>
               <a:cs typeface="Arial" panose="020B0604020202020204" pitchFamily="34" charset="0"/>
             </a:endParaRPr>
           </a:p>
         </p:txBody>
       </p:sp>
+      <p:pic>
+        <p:nvPicPr>
+          <p:cNvPr id="7" name="Рисунок 6"/>
+          <p:cNvPicPr>
+            <a:picLocks noChangeAspect="1"/>
+          </p:cNvPicPr>
+          <p:nvPr/>
+        </p:nvPicPr>
+        <p:blipFill>
+          <a:blip r:embed="rId2">
+            <a:extLst>
+              <a:ext uri="{28A0092B-C50C-407E-A947-70E740481C1C}">
+                <a14:useLocalDpi xmlns:a14="http://schemas.microsoft.com/office/drawing/2010/main" val="0"/>
+              </a:ext>
+            </a:extLst>
+          </a:blip>
+          <a:stretch>
+            <a:fillRect/>
+          </a:stretch>
+        </p:blipFill>
+        <p:spPr>
+          <a:xfrm>
+            <a:off x="9464774" y="532515"/>
+            <a:ext cx="2134504" cy="551243"/>
+          </a:xfrm>
+          <a:prstGeom prst="rect">
+            <a:avLst/>
+          </a:prstGeom>
+        </p:spPr>
+      </p:pic>
       <p:pic>
         <p:nvPicPr>
           <p:cNvPr id="2" name="Рисунок 1"/>
@@ -7570,40 +7479,128 @@
           <p:nvPr/>
         </p:nvPicPr>
         <p:blipFill>
-          <a:blip r:embed="rId2">
-            <a:extLst>
-              <a:ext uri="{28A0092B-C50C-407E-A947-70E740481C1C}">
-                <a14:useLocalDpi xmlns:a14="http://schemas.microsoft.com/office/drawing/2010/main" val="0"/>
-              </a:ext>
-            </a:extLst>
-          </a:blip>
+          <a:blip r:embed="rId3"/>
           <a:stretch>
             <a:fillRect/>
           </a:stretch>
         </p:blipFill>
         <p:spPr>
           <a:xfrm>
-            <a:off x="311493" y="378100"/>
-            <a:ext cx="2780907" cy="762367"/>
-          </a:xfrm>
-          <a:prstGeom prst="rect">
-            <a:avLst/>
-          </a:prstGeom>
-          <a:ln>
-            <a:noFill/>
-          </a:ln>
-          <a:effectLst>
-            <a:outerShdw blurRad="292100" dist="139700" dir="2700000" algn="tl" rotWithShape="0">
-              <a:srgbClr val="333333">
-                <a:alpha val="65000"/>
-              </a:srgbClr>
-            </a:outerShdw>
-          </a:effectLst>
+            <a:off x="515939" y="1417491"/>
+            <a:ext cx="11083339" cy="4840998"/>
+          </a:xfrm>
+          <a:prstGeom prst="rect">
+            <a:avLst/>
+          </a:prstGeom>
         </p:spPr>
       </p:pic>
-      <p:sp>
-        <p:nvSpPr>
-          <p:cNvPr id="8" name="Заголовок 1">
+    </p:spTree>
+    <p:extLst>
+      <p:ext uri="{BB962C8B-B14F-4D97-AF65-F5344CB8AC3E}">
+        <p14:creationId xmlns:p14="http://schemas.microsoft.com/office/powerpoint/2010/main" val="2529837485"/>
+      </p:ext>
+    </p:extLst>
+  </p:cSld>
+  <p:clrMapOvr>
+    <a:masterClrMapping/>
+  </p:clrMapOvr>
+  <p:timing>
+    <p:tnLst>
+      <p:par>
+        <p:cTn id="1" dur="indefinite" restart="never" nodeType="tmRoot"/>
+      </p:par>
+    </p:tnLst>
+  </p:timing>
+</p:sld>
+</file>
+
+<file path=ppt/slides/slide21.xml><?xml version="1.0" encoding="utf-8"?>
+<p:sld xmlns:a="http://schemas.openxmlformats.org/drawingml/2006/main" xmlns:r="http://schemas.openxmlformats.org/officeDocument/2006/relationships" xmlns:p="http://schemas.openxmlformats.org/presentationml/2006/main">
+  <p:cSld>
+    <p:bg>
+      <p:bgPr>
+        <a:solidFill>
+          <a:schemeClr val="bg1"/>
+        </a:solidFill>
+        <a:effectLst/>
+      </p:bgPr>
+    </p:bg>
+    <p:spTree>
+      <p:nvGrpSpPr>
+        <p:cNvPr id="1" name=""/>
+        <p:cNvGrpSpPr/>
+        <p:nvPr/>
+      </p:nvGrpSpPr>
+      <p:grpSpPr>
+        <a:xfrm>
+          <a:off x="0" y="0"/>
+          <a:ext cx="0" cy="0"/>
+          <a:chOff x="0" y="0"/>
+          <a:chExt cx="0" cy="0"/>
+        </a:xfrm>
+      </p:grpSpPr>
+      <p:sp>
+        <p:nvSpPr>
+          <p:cNvPr id="11" name="Номер слайда 3">
+            <a:extLst>
+              <a:ext uri="{FF2B5EF4-FFF2-40B4-BE49-F238E27FC236}">
+                <a16:creationId xmlns:a16="http://schemas.microsoft.com/office/drawing/2014/main" id="{7267A4CF-F0C4-43DD-AD58-96564CA7C221}"/>
+              </a:ext>
+            </a:extLst>
+          </p:cNvPr>
+          <p:cNvSpPr>
+            <a:spLocks noGrp="1"/>
+          </p:cNvSpPr>
+          <p:nvPr>
+            <p:ph type="sldNum" sz="quarter" idx="12"/>
+          </p:nvPr>
+        </p:nvSpPr>
+        <p:spPr>
+          <a:xfrm>
+            <a:off x="515939" y="6393284"/>
+            <a:ext cx="2743200" cy="365125"/>
+          </a:xfrm>
+          <a:prstGeom prst="rect">
+            <a:avLst/>
+          </a:prstGeom>
+        </p:spPr>
+        <p:txBody>
+          <a:bodyPr lIns="0" rIns="0"/>
+          <a:lstStyle>
+            <a:lvl1pPr>
+              <a:defRPr sz="1200">
+                <a:solidFill>
+                  <a:schemeClr val="bg1">
+                    <a:lumMod val="75000"/>
+                  </a:schemeClr>
+                </a:solidFill>
+              </a:defRPr>
+            </a:lvl1pPr>
+          </a:lstStyle>
+          <a:p>
+            <a:pPr algn="l"/>
+            <a:fld id="{A4D4834B-A5E3-4581-856C-72DC1D7E0BCC}" type="slidenum">
+              <a:rPr lang="ru-RU" smtClean="0">
+                <a:solidFill>
+                  <a:schemeClr val="tx1"/>
+                </a:solidFill>
+                <a:latin typeface="Rostelecom Basis" panose="020B0503030604040103" pitchFamily="34" charset="0"/>
+              </a:rPr>
+              <a:pPr algn="l"/>
+              <a:t>21</a:t>
+            </a:fld>
+            <a:endParaRPr lang="ru-RU" dirty="0">
+              <a:solidFill>
+                <a:schemeClr val="tx1"/>
+              </a:solidFill>
+              <a:latin typeface="Rostelecom Basis" panose="020B0503030604040103" pitchFamily="34" charset="0"/>
+            </a:endParaRPr>
+          </a:p>
+        </p:txBody>
+      </p:sp>
+      <p:sp>
+        <p:nvSpPr>
+          <p:cNvPr id="5" name="Заголовок 1">
             <a:extLst>
               <a:ext uri="{FF2B5EF4-FFF2-40B4-BE49-F238E27FC236}">
                 <a16:creationId xmlns:a16="http://schemas.microsoft.com/office/drawing/2014/main" id="{26F3F6DE-0B95-4A88-A2DE-D547275A4F55}"/>
@@ -7617,8 +7614,150 @@
         </p:nvSpPr>
         <p:spPr>
           <a:xfrm>
-            <a:off x="439152" y="3963798"/>
-            <a:ext cx="11160127" cy="1538883"/>
+            <a:off x="515939" y="1369295"/>
+            <a:ext cx="11160127" cy="4231928"/>
+          </a:xfrm>
+          <a:prstGeom prst="rect">
+            <a:avLst/>
+          </a:prstGeom>
+        </p:spPr>
+        <p:txBody>
+          <a:bodyPr lIns="0" tIns="0" rIns="0" bIns="0" anchor="t" anchorCtr="0">
+            <a:spAutoFit/>
+          </a:bodyPr>
+          <a:lstStyle>
+            <a:defPPr>
+              <a:defRPr lang="ru-RU"/>
+            </a:defPPr>
+            <a:lvl1pPr>
+              <a:lnSpc>
+                <a:spcPts val="4000"/>
+              </a:lnSpc>
+              <a:spcBef>
+                <a:spcPct val="0"/>
+              </a:spcBef>
+              <a:buNone/>
+              <a:defRPr sz="2800" b="0">
+                <a:effectLst/>
+                <a:latin typeface="Rostelecom Basis Medium" panose="020B0603030604040103" pitchFamily="34" charset="0"/>
+                <a:ea typeface="+mj-ea"/>
+                <a:cs typeface="+mj-cs"/>
+              </a:defRPr>
+            </a:lvl1pPr>
+          </a:lstStyle>
+          <a:p>
+            <a:pPr algn="just">
+              <a:lnSpc>
+                <a:spcPts val="3000"/>
+              </a:lnSpc>
+            </a:pPr>
+            <a:r>
+              <a:rPr lang="ru-RU" sz="2400" dirty="0" smtClean="0">
+                <a:latin typeface="Arial" panose="020B0604020202020204" pitchFamily="34" charset="0"/>
+                <a:cs typeface="Arial" panose="020B0604020202020204" pitchFamily="34" charset="0"/>
+              </a:rPr>
+              <a:t>По итогам работы удалось реализовать систему анализа и сбора данных услуги интерактивного телевидения с использованием продуктов платформы управления данными</a:t>
+            </a:r>
+            <a:r>
+              <a:rPr lang="en-US" sz="2400" dirty="0" smtClean="0">
+                <a:latin typeface="Arial" panose="020B0604020202020204" pitchFamily="34" charset="0"/>
+                <a:cs typeface="Arial" panose="020B0604020202020204" pitchFamily="34" charset="0"/>
+              </a:rPr>
+              <a:t> </a:t>
+            </a:r>
+            <a:r>
+              <a:rPr lang="ru-RU" sz="2400" dirty="0" smtClean="0">
+                <a:latin typeface="Arial" panose="020B0604020202020204" pitchFamily="34" charset="0"/>
+                <a:cs typeface="Arial" panose="020B0604020202020204" pitchFamily="34" charset="0"/>
+              </a:rPr>
+              <a:t>ПАО «Ростелеком»</a:t>
+            </a:r>
+            <a:r>
+              <a:rPr lang="en-US" sz="2400" dirty="0" smtClean="0">
+                <a:latin typeface="Arial" panose="020B0604020202020204" pitchFamily="34" charset="0"/>
+                <a:cs typeface="Arial" panose="020B0604020202020204" pitchFamily="34" charset="0"/>
+              </a:rPr>
+              <a:t>.</a:t>
+            </a:r>
+          </a:p>
+          <a:p>
+            <a:pPr algn="just">
+              <a:lnSpc>
+                <a:spcPts val="3000"/>
+              </a:lnSpc>
+            </a:pPr>
+            <a:endParaRPr lang="en-US" sz="2400" dirty="0">
+              <a:latin typeface="Arial" panose="020B0604020202020204" pitchFamily="34" charset="0"/>
+              <a:cs typeface="Arial" panose="020B0604020202020204" pitchFamily="34" charset="0"/>
+            </a:endParaRPr>
+          </a:p>
+          <a:p>
+            <a:pPr algn="just">
+              <a:lnSpc>
+                <a:spcPts val="3000"/>
+              </a:lnSpc>
+            </a:pPr>
+            <a:r>
+              <a:rPr lang="ru-RU" sz="2400" dirty="0" smtClean="0">
+                <a:latin typeface="Arial" panose="020B0604020202020204" pitchFamily="34" charset="0"/>
+                <a:cs typeface="Arial" panose="020B0604020202020204" pitchFamily="34" charset="0"/>
+              </a:rPr>
+              <a:t>При помощи аналитических инструментов выявлены наиболее популярные каналы у пользователе как по количеству, так и по длительности просмотра. А так же каналы аутсайдеры. Выявлено использование услуги интерактивного телевидения в разрезе часов, дней недели.</a:t>
+            </a:r>
+            <a:endParaRPr lang="en-US" sz="2400" dirty="0" smtClean="0">
+              <a:latin typeface="Arial" panose="020B0604020202020204" pitchFamily="34" charset="0"/>
+              <a:cs typeface="Arial" panose="020B0604020202020204" pitchFamily="34" charset="0"/>
+            </a:endParaRPr>
+          </a:p>
+          <a:p>
+            <a:pPr algn="just">
+              <a:lnSpc>
+                <a:spcPts val="3000"/>
+              </a:lnSpc>
+            </a:pPr>
+            <a:endParaRPr lang="en-US" sz="2400" dirty="0">
+              <a:latin typeface="Arial" panose="020B0604020202020204" pitchFamily="34" charset="0"/>
+              <a:cs typeface="Arial" panose="020B0604020202020204" pitchFamily="34" charset="0"/>
+            </a:endParaRPr>
+          </a:p>
+          <a:p>
+            <a:pPr algn="just">
+              <a:lnSpc>
+                <a:spcPts val="3000"/>
+              </a:lnSpc>
+            </a:pPr>
+            <a:r>
+              <a:rPr lang="ru-RU" sz="2400" dirty="0" smtClean="0">
+                <a:latin typeface="Arial" panose="020B0604020202020204" pitchFamily="34" charset="0"/>
+                <a:cs typeface="Arial" panose="020B0604020202020204" pitchFamily="34" charset="0"/>
+              </a:rPr>
+              <a:t>На основании запросов были построены аналитические графики, витрина данных.</a:t>
+            </a:r>
+            <a:endParaRPr lang="ru-RU" sz="2400" dirty="0">
+              <a:latin typeface="Arial" panose="020B0604020202020204" pitchFamily="34" charset="0"/>
+              <a:cs typeface="Arial" panose="020B0604020202020204" pitchFamily="34" charset="0"/>
+            </a:endParaRPr>
+          </a:p>
+        </p:txBody>
+      </p:sp>
+      <p:sp>
+        <p:nvSpPr>
+          <p:cNvPr id="6" name="Заголовок 1">
+            <a:extLst>
+              <a:ext uri="{FF2B5EF4-FFF2-40B4-BE49-F238E27FC236}">
+                <a16:creationId xmlns:a16="http://schemas.microsoft.com/office/drawing/2014/main" id="{26F3F6DE-0B95-4A88-A2DE-D547275A4F55}"/>
+              </a:ext>
+            </a:extLst>
+          </p:cNvPr>
+          <p:cNvSpPr txBox="1">
+            <a:spLocks/>
+          </p:cNvSpPr>
+          <p:nvPr/>
+        </p:nvSpPr>
+        <p:spPr>
+          <a:xfrm>
+            <a:off x="439151" y="560538"/>
+            <a:ext cx="11160127" cy="523220"/>
           </a:xfrm>
           <a:prstGeom prst="rect">
             <a:avLst/>
@@ -7656,7 +7795,660 @@
           </a:lstStyle>
           <a:p>
             <a:r>
-              <a:rPr lang="ru-RU" sz="2800" dirty="0" smtClean="0">
+              <a:rPr lang="ru-RU" dirty="0">
+                <a:effectLst/>
+                <a:latin typeface="Arial" panose="020B0604020202020204" pitchFamily="34" charset="0"/>
+                <a:cs typeface="Arial" panose="020B0604020202020204" pitchFamily="34" charset="0"/>
+              </a:rPr>
+              <a:t>Итоги и инсайты</a:t>
+            </a:r>
+            <a:endParaRPr lang="ru-RU" dirty="0">
+              <a:latin typeface="Arial" panose="020B0604020202020204" pitchFamily="34" charset="0"/>
+              <a:cs typeface="Arial" panose="020B0604020202020204" pitchFamily="34" charset="0"/>
+            </a:endParaRPr>
+          </a:p>
+        </p:txBody>
+      </p:sp>
+      <p:pic>
+        <p:nvPicPr>
+          <p:cNvPr id="7" name="Рисунок 6"/>
+          <p:cNvPicPr>
+            <a:picLocks noChangeAspect="1"/>
+          </p:cNvPicPr>
+          <p:nvPr/>
+        </p:nvPicPr>
+        <p:blipFill>
+          <a:blip r:embed="rId2">
+            <a:extLst>
+              <a:ext uri="{28A0092B-C50C-407E-A947-70E740481C1C}">
+                <a14:useLocalDpi xmlns:a14="http://schemas.microsoft.com/office/drawing/2010/main" val="0"/>
+              </a:ext>
+            </a:extLst>
+          </a:blip>
+          <a:stretch>
+            <a:fillRect/>
+          </a:stretch>
+        </p:blipFill>
+        <p:spPr>
+          <a:xfrm>
+            <a:off x="9464774" y="532515"/>
+            <a:ext cx="2134504" cy="551243"/>
+          </a:xfrm>
+          <a:prstGeom prst="rect">
+            <a:avLst/>
+          </a:prstGeom>
+        </p:spPr>
+      </p:pic>
+    </p:spTree>
+    <p:extLst>
+      <p:ext uri="{BB962C8B-B14F-4D97-AF65-F5344CB8AC3E}">
+        <p14:creationId xmlns:p14="http://schemas.microsoft.com/office/powerpoint/2010/main" val="2679751434"/>
+      </p:ext>
+    </p:extLst>
+  </p:cSld>
+  <p:clrMapOvr>
+    <a:masterClrMapping/>
+  </p:clrMapOvr>
+  <p:timing>
+    <p:tnLst>
+      <p:par>
+        <p:cTn id="1" dur="indefinite" restart="never" nodeType="tmRoot"/>
+      </p:par>
+    </p:tnLst>
+  </p:timing>
+</p:sld>
+</file>
+
+<file path=ppt/slides/slide22.xml><?xml version="1.0" encoding="utf-8"?>
+<p:sld xmlns:a="http://schemas.openxmlformats.org/drawingml/2006/main" xmlns:r="http://schemas.openxmlformats.org/officeDocument/2006/relationships" xmlns:p="http://schemas.openxmlformats.org/presentationml/2006/main">
+  <p:cSld>
+    <p:bg>
+      <p:bgPr>
+        <a:solidFill>
+          <a:schemeClr val="bg1"/>
+        </a:solidFill>
+        <a:effectLst/>
+      </p:bgPr>
+    </p:bg>
+    <p:spTree>
+      <p:nvGrpSpPr>
+        <p:cNvPr id="1" name=""/>
+        <p:cNvGrpSpPr/>
+        <p:nvPr/>
+      </p:nvGrpSpPr>
+      <p:grpSpPr>
+        <a:xfrm>
+          <a:off x="0" y="0"/>
+          <a:ext cx="0" cy="0"/>
+          <a:chOff x="0" y="0"/>
+          <a:chExt cx="0" cy="0"/>
+        </a:xfrm>
+      </p:grpSpPr>
+      <p:sp>
+        <p:nvSpPr>
+          <p:cNvPr id="11" name="Номер слайда 3">
+            <a:extLst>
+              <a:ext uri="{FF2B5EF4-FFF2-40B4-BE49-F238E27FC236}">
+                <a16:creationId xmlns:a16="http://schemas.microsoft.com/office/drawing/2014/main" id="{7267A4CF-F0C4-43DD-AD58-96564CA7C221}"/>
+              </a:ext>
+            </a:extLst>
+          </p:cNvPr>
+          <p:cNvSpPr>
+            <a:spLocks noGrp="1"/>
+          </p:cNvSpPr>
+          <p:nvPr>
+            <p:ph type="sldNum" sz="quarter" idx="12"/>
+          </p:nvPr>
+        </p:nvSpPr>
+        <p:spPr>
+          <a:xfrm>
+            <a:off x="515939" y="6393284"/>
+            <a:ext cx="2743200" cy="365125"/>
+          </a:xfrm>
+          <a:prstGeom prst="rect">
+            <a:avLst/>
+          </a:prstGeom>
+        </p:spPr>
+        <p:txBody>
+          <a:bodyPr lIns="0" rIns="0"/>
+          <a:lstStyle>
+            <a:lvl1pPr>
+              <a:defRPr sz="1200">
+                <a:solidFill>
+                  <a:schemeClr val="bg1">
+                    <a:lumMod val="75000"/>
+                  </a:schemeClr>
+                </a:solidFill>
+              </a:defRPr>
+            </a:lvl1pPr>
+          </a:lstStyle>
+          <a:p>
+            <a:pPr algn="l"/>
+            <a:fld id="{A4D4834B-A5E3-4581-856C-72DC1D7E0BCC}" type="slidenum">
+              <a:rPr lang="ru-RU" smtClean="0">
+                <a:solidFill>
+                  <a:schemeClr val="tx1"/>
+                </a:solidFill>
+                <a:latin typeface="Rostelecom Basis" panose="020B0503030604040103" pitchFamily="34" charset="0"/>
+              </a:rPr>
+              <a:pPr algn="l"/>
+              <a:t>22</a:t>
+            </a:fld>
+            <a:endParaRPr lang="ru-RU" dirty="0">
+              <a:solidFill>
+                <a:schemeClr val="tx1"/>
+              </a:solidFill>
+              <a:latin typeface="Rostelecom Basis" panose="020B0503030604040103" pitchFamily="34" charset="0"/>
+            </a:endParaRPr>
+          </a:p>
+        </p:txBody>
+      </p:sp>
+      <p:sp>
+        <p:nvSpPr>
+          <p:cNvPr id="5" name="Заголовок 1">
+            <a:extLst>
+              <a:ext uri="{FF2B5EF4-FFF2-40B4-BE49-F238E27FC236}">
+                <a16:creationId xmlns:a16="http://schemas.microsoft.com/office/drawing/2014/main" id="{26F3F6DE-0B95-4A88-A2DE-D547275A4F55}"/>
+              </a:ext>
+            </a:extLst>
+          </p:cNvPr>
+          <p:cNvSpPr txBox="1">
+            <a:spLocks/>
+          </p:cNvSpPr>
+          <p:nvPr/>
+        </p:nvSpPr>
+        <p:spPr>
+          <a:xfrm>
+            <a:off x="439151" y="1333436"/>
+            <a:ext cx="11160127" cy="4616648"/>
+          </a:xfrm>
+          <a:prstGeom prst="rect">
+            <a:avLst/>
+          </a:prstGeom>
+        </p:spPr>
+        <p:txBody>
+          <a:bodyPr lIns="0" tIns="0" rIns="0" bIns="0" anchor="t" anchorCtr="0">
+            <a:spAutoFit/>
+          </a:bodyPr>
+          <a:lstStyle>
+            <a:defPPr>
+              <a:defRPr lang="ru-RU"/>
+            </a:defPPr>
+            <a:lvl1pPr>
+              <a:lnSpc>
+                <a:spcPts val="4000"/>
+              </a:lnSpc>
+              <a:spcBef>
+                <a:spcPct val="0"/>
+              </a:spcBef>
+              <a:buNone/>
+              <a:defRPr sz="2800" b="0">
+                <a:effectLst/>
+                <a:latin typeface="Rostelecom Basis Medium" panose="020B0603030604040103" pitchFamily="34" charset="0"/>
+                <a:ea typeface="+mj-ea"/>
+                <a:cs typeface="+mj-cs"/>
+              </a:defRPr>
+            </a:lvl1pPr>
+          </a:lstStyle>
+          <a:p>
+            <a:pPr marL="457200" indent="-457200">
+              <a:buFont typeface="+mj-lt"/>
+              <a:buAutoNum type="arabicPeriod"/>
+            </a:pPr>
+            <a:r>
+              <a:rPr lang="en-US" sz="2000" dirty="0" err="1" smtClean="0">
+                <a:latin typeface="Arial" panose="020B0604020202020204" pitchFamily="34" charset="0"/>
+                <a:cs typeface="Arial" panose="020B0604020202020204" pitchFamily="34" charset="0"/>
+              </a:rPr>
+              <a:t>Github</a:t>
+            </a:r>
+            <a:r>
+              <a:rPr lang="ru-RU" sz="2000" dirty="0" smtClean="0">
+                <a:latin typeface="Arial" panose="020B0604020202020204" pitchFamily="34" charset="0"/>
+                <a:cs typeface="Arial" panose="020B0604020202020204" pitchFamily="34" charset="0"/>
+              </a:rPr>
+              <a:t> </a:t>
+            </a:r>
+            <a:r>
+              <a:rPr lang="ru-RU" sz="2000" dirty="0" smtClean="0">
+                <a:latin typeface="Arial" panose="020B0604020202020204" pitchFamily="34" charset="0"/>
+                <a:cs typeface="Arial" panose="020B0604020202020204" pitchFamily="34" charset="0"/>
+              </a:rPr>
+              <a:t>проекта: </a:t>
+            </a:r>
+            <a:r>
+              <a:rPr lang="en-US" sz="2000" dirty="0" smtClean="0">
+                <a:latin typeface="Arial" panose="020B0604020202020204" pitchFamily="34" charset="0"/>
+                <a:cs typeface="Arial" panose="020B0604020202020204" pitchFamily="34" charset="0"/>
+                <a:hlinkClick r:id="rId2"/>
+              </a:rPr>
+              <a:t>https://github.com/Olmeor/Data-engineer_Rostelecom_programming_school</a:t>
+            </a:r>
+            <a:endParaRPr lang="ru-RU" sz="2000" dirty="0" smtClean="0">
+              <a:latin typeface="Arial" panose="020B0604020202020204" pitchFamily="34" charset="0"/>
+              <a:cs typeface="Arial" panose="020B0604020202020204" pitchFamily="34" charset="0"/>
+            </a:endParaRPr>
+          </a:p>
+          <a:p>
+            <a:pPr marL="457200" indent="-457200">
+              <a:buFont typeface="+mj-lt"/>
+              <a:buAutoNum type="arabicPeriod"/>
+            </a:pPr>
+            <a:r>
+              <a:rPr lang="ru-RU" sz="2000" dirty="0" smtClean="0">
+                <a:latin typeface="Arial" panose="020B0604020202020204" pitchFamily="34" charset="0"/>
+                <a:cs typeface="Arial" panose="020B0604020202020204" pitchFamily="34" charset="0"/>
+              </a:rPr>
+              <a:t>Рейтинг популярности телеканалов: </a:t>
+            </a:r>
+            <a:r>
+              <a:rPr lang="en-US" sz="2000" dirty="0">
+                <a:latin typeface="Arial" panose="020B0604020202020204" pitchFamily="34" charset="0"/>
+                <a:cs typeface="Arial" panose="020B0604020202020204" pitchFamily="34" charset="0"/>
+                <a:hlinkClick r:id="rId3"/>
+              </a:rPr>
+              <a:t>https://</a:t>
+            </a:r>
+            <a:r>
+              <a:rPr lang="en-US" sz="2000" dirty="0" smtClean="0">
+                <a:latin typeface="Arial" panose="020B0604020202020204" pitchFamily="34" charset="0"/>
+                <a:cs typeface="Arial" panose="020B0604020202020204" pitchFamily="34" charset="0"/>
+                <a:hlinkClick r:id="rId3"/>
+              </a:rPr>
+              <a:t>www.powernet.com.ru/channels-stat</a:t>
+            </a:r>
+            <a:endParaRPr lang="ru-RU" sz="2000" dirty="0" smtClean="0">
+              <a:latin typeface="Arial" panose="020B0604020202020204" pitchFamily="34" charset="0"/>
+              <a:cs typeface="Arial" panose="020B0604020202020204" pitchFamily="34" charset="0"/>
+            </a:endParaRPr>
+          </a:p>
+          <a:p>
+            <a:pPr marL="457200" indent="-457200">
+              <a:buFont typeface="+mj-lt"/>
+              <a:buAutoNum type="arabicPeriod"/>
+            </a:pPr>
+            <a:r>
+              <a:rPr lang="ru-RU" sz="2000" dirty="0" smtClean="0">
+                <a:latin typeface="Arial" panose="020B0604020202020204" pitchFamily="34" charset="0"/>
+                <a:cs typeface="Arial" panose="020B0604020202020204" pitchFamily="34" charset="0"/>
+              </a:rPr>
+              <a:t>Аналитика просмотров: </a:t>
+            </a:r>
+            <a:r>
+              <a:rPr lang="en-US" sz="2000" dirty="0">
+                <a:latin typeface="Arial" panose="020B0604020202020204" pitchFamily="34" charset="0"/>
+                <a:cs typeface="Arial" panose="020B0604020202020204" pitchFamily="34" charset="0"/>
+                <a:hlinkClick r:id="rId4"/>
+              </a:rPr>
+              <a:t>https://journal.tinkoff.ru/television-stat</a:t>
+            </a:r>
+            <a:r>
+              <a:rPr lang="en-US" sz="2000" dirty="0" smtClean="0">
+                <a:latin typeface="Arial" panose="020B0604020202020204" pitchFamily="34" charset="0"/>
+                <a:cs typeface="Arial" panose="020B0604020202020204" pitchFamily="34" charset="0"/>
+                <a:hlinkClick r:id="rId4"/>
+              </a:rPr>
+              <a:t>/</a:t>
+            </a:r>
+            <a:endParaRPr lang="en-US" sz="2000" dirty="0" smtClean="0">
+              <a:latin typeface="Arial" panose="020B0604020202020204" pitchFamily="34" charset="0"/>
+              <a:cs typeface="Arial" panose="020B0604020202020204" pitchFamily="34" charset="0"/>
+            </a:endParaRPr>
+          </a:p>
+          <a:p>
+            <a:pPr marL="457200" indent="-457200">
+              <a:buFont typeface="+mj-lt"/>
+              <a:buAutoNum type="arabicPeriod"/>
+            </a:pPr>
+            <a:r>
+              <a:rPr lang="en-US" sz="2000" dirty="0">
+                <a:latin typeface="Arial" panose="020B0604020202020204" pitchFamily="34" charset="0"/>
+                <a:cs typeface="Arial" panose="020B0604020202020204" pitchFamily="34" charset="0"/>
+              </a:rPr>
+              <a:t>Spark notebook - </a:t>
+            </a:r>
+            <a:r>
+              <a:rPr lang="en-US" sz="2000" dirty="0">
+                <a:latin typeface="Arial" panose="020B0604020202020204" pitchFamily="34" charset="0"/>
+                <a:cs typeface="Arial" panose="020B0604020202020204" pitchFamily="34" charset="0"/>
+                <a:hlinkClick r:id="rId5"/>
+              </a:rPr>
+              <a:t>http://vm-dlake2-m-2:8180/#/</a:t>
+            </a:r>
+            <a:r>
+              <a:rPr lang="en-US" sz="2000" dirty="0" smtClean="0">
+                <a:latin typeface="Arial" panose="020B0604020202020204" pitchFamily="34" charset="0"/>
+                <a:cs typeface="Arial" panose="020B0604020202020204" pitchFamily="34" charset="0"/>
+                <a:hlinkClick r:id="rId5"/>
+              </a:rPr>
+              <a:t>notebook/2JBN33XNC</a:t>
+            </a:r>
+            <a:r>
+              <a:rPr lang="en-US" sz="2000" dirty="0" smtClean="0">
+                <a:latin typeface="Arial" panose="020B0604020202020204" pitchFamily="34" charset="0"/>
+                <a:cs typeface="Arial" panose="020B0604020202020204" pitchFamily="34" charset="0"/>
+              </a:rPr>
+              <a:t> (</a:t>
+            </a:r>
+            <a:r>
+              <a:rPr lang="ru-RU" sz="2000" dirty="0" smtClean="0">
+                <a:latin typeface="Arial" panose="020B0604020202020204" pitchFamily="34" charset="0"/>
+                <a:cs typeface="Arial" panose="020B0604020202020204" pitchFamily="34" charset="0"/>
+              </a:rPr>
+              <a:t>только внутри кластера</a:t>
+            </a:r>
+            <a:r>
+              <a:rPr lang="ru-RU" sz="2000" dirty="0" smtClean="0">
+                <a:latin typeface="Arial" panose="020B0604020202020204" pitchFamily="34" charset="0"/>
+                <a:cs typeface="Arial" panose="020B0604020202020204" pitchFamily="34" charset="0"/>
+              </a:rPr>
+              <a:t>)</a:t>
+            </a:r>
+            <a:endParaRPr lang="en-US" sz="2000" dirty="0" smtClean="0">
+              <a:latin typeface="Arial" panose="020B0604020202020204" pitchFamily="34" charset="0"/>
+              <a:cs typeface="Arial" panose="020B0604020202020204" pitchFamily="34" charset="0"/>
+            </a:endParaRPr>
+          </a:p>
+          <a:p>
+            <a:pPr marL="457200" indent="-457200">
+              <a:buFont typeface="+mj-lt"/>
+              <a:buAutoNum type="arabicPeriod"/>
+            </a:pPr>
+            <a:r>
+              <a:rPr lang="en-US" sz="2000" dirty="0" smtClean="0">
+                <a:latin typeface="Arial" panose="020B0604020202020204" pitchFamily="34" charset="0"/>
+                <a:cs typeface="Arial" panose="020B0604020202020204" pitchFamily="34" charset="0"/>
+              </a:rPr>
+              <a:t>Superset </a:t>
+            </a:r>
+            <a:r>
+              <a:rPr lang="en-US" sz="2000" dirty="0" smtClean="0">
+                <a:latin typeface="Arial" panose="020B0604020202020204" pitchFamily="34" charset="0"/>
+                <a:cs typeface="Arial" panose="020B0604020202020204" pitchFamily="34" charset="0"/>
+                <a:hlinkClick r:id="rId6"/>
+              </a:rPr>
+              <a:t>http</a:t>
+            </a:r>
+            <a:r>
+              <a:rPr lang="en-US" sz="2000" dirty="0">
+                <a:latin typeface="Arial" panose="020B0604020202020204" pitchFamily="34" charset="0"/>
+                <a:cs typeface="Arial" panose="020B0604020202020204" pitchFamily="34" charset="0"/>
+                <a:hlinkClick r:id="rId6"/>
+              </a:rPr>
+              <a:t>://vm-datavision.test.local:8090/superset/dashboard/p/rYymq0Yxn3R/</a:t>
+            </a:r>
+            <a:r>
+              <a:rPr lang="en-US" sz="2000" dirty="0">
+                <a:latin typeface="Arial" panose="020B0604020202020204" pitchFamily="34" charset="0"/>
+                <a:cs typeface="Arial" panose="020B0604020202020204" pitchFamily="34" charset="0"/>
+              </a:rPr>
+              <a:t> (</a:t>
+            </a:r>
+            <a:r>
+              <a:rPr lang="ru-RU" sz="2000" dirty="0">
+                <a:latin typeface="Arial" panose="020B0604020202020204" pitchFamily="34" charset="0"/>
+                <a:cs typeface="Arial" panose="020B0604020202020204" pitchFamily="34" charset="0"/>
+              </a:rPr>
+              <a:t>только внутри кластера</a:t>
+            </a:r>
+            <a:r>
+              <a:rPr lang="ru-RU" sz="2000" dirty="0" smtClean="0">
+                <a:latin typeface="Arial" panose="020B0604020202020204" pitchFamily="34" charset="0"/>
+                <a:cs typeface="Arial" panose="020B0604020202020204" pitchFamily="34" charset="0"/>
+              </a:rPr>
+              <a:t>)</a:t>
+            </a:r>
+          </a:p>
+          <a:p>
+            <a:pPr marL="457200" indent="-457200">
+              <a:buFont typeface="+mj-lt"/>
+              <a:buAutoNum type="arabicPeriod"/>
+            </a:pPr>
+            <a:r>
+              <a:rPr lang="ru-RU" sz="2000" dirty="0" smtClean="0">
+                <a:latin typeface="Arial" panose="020B0604020202020204" pitchFamily="34" charset="0"/>
+                <a:cs typeface="Arial" panose="020B0604020202020204" pitchFamily="34" charset="0"/>
+              </a:rPr>
+              <a:t>Платформа управления данными ПАО «Ростелеком» </a:t>
+            </a:r>
+            <a:r>
+              <a:rPr lang="en-US" sz="2000" dirty="0">
+                <a:latin typeface="Arial" panose="020B0604020202020204" pitchFamily="34" charset="0"/>
+                <a:cs typeface="Arial" panose="020B0604020202020204" pitchFamily="34" charset="0"/>
+                <a:hlinkClick r:id="rId7"/>
+              </a:rPr>
+              <a:t>https://</a:t>
+            </a:r>
+            <a:r>
+              <a:rPr lang="en-US" sz="2000" dirty="0" smtClean="0">
+                <a:latin typeface="Arial" panose="020B0604020202020204" pitchFamily="34" charset="0"/>
+                <a:cs typeface="Arial" panose="020B0604020202020204" pitchFamily="34" charset="0"/>
+                <a:hlinkClick r:id="rId7"/>
+              </a:rPr>
+              <a:t>data.rt.ru/products</a:t>
+            </a:r>
+            <a:endParaRPr lang="ru-RU" sz="2000" dirty="0" smtClean="0">
+              <a:latin typeface="Arial" panose="020B0604020202020204" pitchFamily="34" charset="0"/>
+              <a:cs typeface="Arial" panose="020B0604020202020204" pitchFamily="34" charset="0"/>
+            </a:endParaRPr>
+          </a:p>
+          <a:p>
+            <a:pPr marL="457200" indent="-457200">
+              <a:buFont typeface="+mj-lt"/>
+              <a:buAutoNum type="arabicPeriod"/>
+            </a:pPr>
+            <a:endParaRPr lang="ru-RU" sz="2000" dirty="0">
+              <a:latin typeface="Arial" panose="020B0604020202020204" pitchFamily="34" charset="0"/>
+              <a:cs typeface="Arial" panose="020B0604020202020204" pitchFamily="34" charset="0"/>
+            </a:endParaRPr>
+          </a:p>
+        </p:txBody>
+      </p:sp>
+      <p:sp>
+        <p:nvSpPr>
+          <p:cNvPr id="6" name="Заголовок 1">
+            <a:extLst>
+              <a:ext uri="{FF2B5EF4-FFF2-40B4-BE49-F238E27FC236}">
+                <a16:creationId xmlns:a16="http://schemas.microsoft.com/office/drawing/2014/main" id="{26F3F6DE-0B95-4A88-A2DE-D547275A4F55}"/>
+              </a:ext>
+            </a:extLst>
+          </p:cNvPr>
+          <p:cNvSpPr txBox="1">
+            <a:spLocks/>
+          </p:cNvSpPr>
+          <p:nvPr/>
+        </p:nvSpPr>
+        <p:spPr>
+          <a:xfrm>
+            <a:off x="439151" y="560538"/>
+            <a:ext cx="11160127" cy="523220"/>
+          </a:xfrm>
+          <a:prstGeom prst="rect">
+            <a:avLst/>
+          </a:prstGeom>
+        </p:spPr>
+        <p:txBody>
+          <a:bodyPr lIns="0" tIns="0" rIns="0" bIns="0" anchor="t" anchorCtr="0">
+            <a:spAutoFit/>
+          </a:bodyPr>
+          <a:lstStyle>
+            <a:lvl1pPr algn="l" defTabSz="914400" rtl="0" eaLnBrk="1" latinLnBrk="0" hangingPunct="1">
+              <a:lnSpc>
+                <a:spcPts val="4000"/>
+              </a:lnSpc>
+              <a:spcBef>
+                <a:spcPct val="0"/>
+              </a:spcBef>
+              <a:buNone/>
+              <a:defRPr sz="3600" b="0" kern="1200">
+                <a:solidFill>
+                  <a:schemeClr val="tx1"/>
+                </a:solidFill>
+                <a:effectLst>
+                  <a:outerShdw blurRad="38100" dist="38100" dir="2700000" algn="tl">
+                    <a:srgbClr val="000000">
+                      <a:alpha val="43137"/>
+                    </a:srgbClr>
+                  </a:outerShdw>
+                </a:effectLst>
+                <a:latin typeface="Rostelecom Basis Medium" panose="020B0603030604040103" pitchFamily="34" charset="0"/>
+                <a:ea typeface="+mj-ea"/>
+                <a:cs typeface="+mj-cs"/>
+              </a:defRPr>
+            </a:lvl1pPr>
+          </a:lstStyle>
+          <a:p>
+            <a:r>
+              <a:rPr lang="ru-RU" b="1" dirty="0" smtClean="0">
+                <a:effectLst/>
+                <a:latin typeface="Arial" panose="020B0604020202020204" pitchFamily="34" charset="0"/>
+                <a:cs typeface="Arial" panose="020B0604020202020204" pitchFamily="34" charset="0"/>
+              </a:rPr>
+              <a:t>Список ссылок</a:t>
+            </a:r>
+            <a:endParaRPr lang="ru-RU" b="1" dirty="0">
+              <a:latin typeface="Arial" panose="020B0604020202020204" pitchFamily="34" charset="0"/>
+              <a:cs typeface="Arial" panose="020B0604020202020204" pitchFamily="34" charset="0"/>
+            </a:endParaRPr>
+          </a:p>
+        </p:txBody>
+      </p:sp>
+      <p:pic>
+        <p:nvPicPr>
+          <p:cNvPr id="7" name="Рисунок 6"/>
+          <p:cNvPicPr>
+            <a:picLocks noChangeAspect="1"/>
+          </p:cNvPicPr>
+          <p:nvPr/>
+        </p:nvPicPr>
+        <p:blipFill>
+          <a:blip r:embed="rId8">
+            <a:extLst>
+              <a:ext uri="{28A0092B-C50C-407E-A947-70E740481C1C}">
+                <a14:useLocalDpi xmlns:a14="http://schemas.microsoft.com/office/drawing/2010/main" val="0"/>
+              </a:ext>
+            </a:extLst>
+          </a:blip>
+          <a:stretch>
+            <a:fillRect/>
+          </a:stretch>
+        </p:blipFill>
+        <p:spPr>
+          <a:xfrm>
+            <a:off x="9464774" y="532515"/>
+            <a:ext cx="2134504" cy="551243"/>
+          </a:xfrm>
+          <a:prstGeom prst="rect">
+            <a:avLst/>
+          </a:prstGeom>
+        </p:spPr>
+      </p:pic>
+    </p:spTree>
+    <p:extLst>
+      <p:ext uri="{BB962C8B-B14F-4D97-AF65-F5344CB8AC3E}">
+        <p14:creationId xmlns:p14="http://schemas.microsoft.com/office/powerpoint/2010/main" val="112172180"/>
+      </p:ext>
+    </p:extLst>
+  </p:cSld>
+  <p:clrMapOvr>
+    <a:masterClrMapping/>
+  </p:clrMapOvr>
+  <p:timing>
+    <p:tnLst>
+      <p:par>
+        <p:cTn id="1" dur="indefinite" restart="never" nodeType="tmRoot"/>
+      </p:par>
+    </p:tnLst>
+  </p:timing>
+</p:sld>
+</file>
+
+<file path=ppt/slides/slide23.xml><?xml version="1.0" encoding="utf-8"?>
+<p:sld xmlns:a="http://schemas.openxmlformats.org/drawingml/2006/main" xmlns:r="http://schemas.openxmlformats.org/officeDocument/2006/relationships" xmlns:p="http://schemas.openxmlformats.org/presentationml/2006/main">
+  <p:cSld>
+    <p:bg>
+      <p:bgPr>
+        <a:solidFill>
+          <a:srgbClr val="7700FF"/>
+        </a:solidFill>
+        <a:effectLst/>
+      </p:bgPr>
+    </p:bg>
+    <p:spTree>
+      <p:nvGrpSpPr>
+        <p:cNvPr id="1" name=""/>
+        <p:cNvGrpSpPr/>
+        <p:nvPr/>
+      </p:nvGrpSpPr>
+      <p:grpSpPr>
+        <a:xfrm>
+          <a:off x="0" y="0"/>
+          <a:ext cx="0" cy="0"/>
+          <a:chOff x="0" y="0"/>
+          <a:chExt cx="0" cy="0"/>
+        </a:xfrm>
+      </p:grpSpPr>
+      <p:sp>
+        <p:nvSpPr>
+          <p:cNvPr id="7" name="Заголовок 1">
+            <a:extLst>
+              <a:ext uri="{FF2B5EF4-FFF2-40B4-BE49-F238E27FC236}">
+                <a16:creationId xmlns:a16="http://schemas.microsoft.com/office/drawing/2014/main" id="{26F3F6DE-0B95-4A88-A2DE-D547275A4F55}"/>
+              </a:ext>
+            </a:extLst>
+          </p:cNvPr>
+          <p:cNvSpPr txBox="1">
+            <a:spLocks/>
+          </p:cNvSpPr>
+          <p:nvPr/>
+        </p:nvSpPr>
+        <p:spPr>
+          <a:xfrm>
+            <a:off x="439153" y="1487179"/>
+            <a:ext cx="11160127" cy="2215991"/>
+          </a:xfrm>
+          <a:prstGeom prst="rect">
+            <a:avLst/>
+          </a:prstGeom>
+        </p:spPr>
+        <p:txBody>
+          <a:bodyPr lIns="0" tIns="0" rIns="0" bIns="0" anchor="t" anchorCtr="0">
+            <a:spAutoFit/>
+          </a:bodyPr>
+          <a:lstStyle>
+            <a:lvl1pPr algn="l" defTabSz="914400" rtl="0" eaLnBrk="1" latinLnBrk="0" hangingPunct="1">
+              <a:lnSpc>
+                <a:spcPts val="4000"/>
+              </a:lnSpc>
+              <a:spcBef>
+                <a:spcPct val="0"/>
+              </a:spcBef>
+              <a:buNone/>
+              <a:defRPr sz="3600" b="0" kern="1200">
+                <a:solidFill>
+                  <a:schemeClr val="tx1"/>
+                </a:solidFill>
+                <a:effectLst>
+                  <a:outerShdw blurRad="38100" dist="38100" dir="2700000" algn="tl">
+                    <a:srgbClr val="000000">
+                      <a:alpha val="43137"/>
+                    </a:srgbClr>
+                  </a:outerShdw>
+                </a:effectLst>
+                <a:latin typeface="Rostelecom Basis Medium" panose="020B0603030604040103" pitchFamily="34" charset="0"/>
+                <a:ea typeface="+mj-ea"/>
+                <a:cs typeface="+mj-cs"/>
+              </a:defRPr>
+            </a:lvl1pPr>
+          </a:lstStyle>
+          <a:p>
+            <a:pPr>
+              <a:lnSpc>
+                <a:spcPct val="150000"/>
+              </a:lnSpc>
+            </a:pPr>
+            <a:r>
+              <a:rPr lang="ru-RU" sz="4800" b="1" dirty="0" smtClean="0">
                 <a:solidFill>
                   <a:schemeClr val="bg1"/>
                 </a:solidFill>
@@ -7664,10 +8456,10 @@
                 <a:latin typeface="Arial" panose="020B0604020202020204" pitchFamily="34" charset="0"/>
                 <a:cs typeface="Arial" panose="020B0604020202020204" pitchFamily="34" charset="0"/>
               </a:rPr>
-              <a:t>Команда проекта:</a:t>
+              <a:t>Спасибо за внимание!</a:t>
             </a:r>
             <a:br>
-              <a:rPr lang="ru-RU" sz="2800" dirty="0" smtClean="0">
+              <a:rPr lang="ru-RU" sz="4800" b="1" dirty="0" smtClean="0">
                 <a:solidFill>
                   <a:schemeClr val="bg1"/>
                 </a:solidFill>
@@ -7677,7 +8469,7 @@
               </a:rPr>
             </a:br>
             <a:r>
-              <a:rPr lang="ru-RU" sz="2400" dirty="0" smtClean="0">
+              <a:rPr lang="ru-RU" sz="4800" b="1" dirty="0" smtClean="0">
                 <a:solidFill>
                   <a:schemeClr val="bg1"/>
                 </a:solidFill>
@@ -7685,10 +8477,10 @@
                 <a:latin typeface="Arial" panose="020B0604020202020204" pitchFamily="34" charset="0"/>
                 <a:cs typeface="Arial" panose="020B0604020202020204" pitchFamily="34" charset="0"/>
               </a:rPr>
-              <a:t>Фамилия И</a:t>
-            </a:r>
-            <a:r>
-              <a:rPr lang="en-US" sz="2400" dirty="0" smtClean="0">
+              <a:t>Готов </a:t>
+            </a:r>
+            <a:r>
+              <a:rPr lang="ru-RU" sz="4800" b="1" dirty="0" smtClean="0">
                 <a:solidFill>
                   <a:schemeClr val="bg1"/>
                 </a:solidFill>
@@ -7696,10 +8488,114 @@
                 <a:latin typeface="Arial" panose="020B0604020202020204" pitchFamily="34" charset="0"/>
                 <a:cs typeface="Arial" panose="020B0604020202020204" pitchFamily="34" charset="0"/>
               </a:rPr>
-              <a:t>.</a:t>
-            </a:r>
-            <a:r>
-              <a:rPr lang="ru-RU" sz="2400" dirty="0" smtClean="0">
+              <a:t>ответить на ваши вопросы</a:t>
+            </a:r>
+            <a:endParaRPr lang="ru-RU" sz="4800" b="1" dirty="0">
+              <a:solidFill>
+                <a:schemeClr val="bg1"/>
+              </a:solidFill>
+              <a:latin typeface="Arial" panose="020B0604020202020204" pitchFamily="34" charset="0"/>
+              <a:cs typeface="Arial" panose="020B0604020202020204" pitchFamily="34" charset="0"/>
+            </a:endParaRPr>
+          </a:p>
+        </p:txBody>
+      </p:sp>
+      <p:pic>
+        <p:nvPicPr>
+          <p:cNvPr id="2" name="Рисунок 1"/>
+          <p:cNvPicPr>
+            <a:picLocks noChangeAspect="1"/>
+          </p:cNvPicPr>
+          <p:nvPr/>
+        </p:nvPicPr>
+        <p:blipFill>
+          <a:blip r:embed="rId2">
+            <a:extLst>
+              <a:ext uri="{28A0092B-C50C-407E-A947-70E740481C1C}">
+                <a14:useLocalDpi xmlns:a14="http://schemas.microsoft.com/office/drawing/2010/main" val="0"/>
+              </a:ext>
+            </a:extLst>
+          </a:blip>
+          <a:stretch>
+            <a:fillRect/>
+          </a:stretch>
+        </p:blipFill>
+        <p:spPr>
+          <a:xfrm>
+            <a:off x="311493" y="378100"/>
+            <a:ext cx="2780907" cy="762367"/>
+          </a:xfrm>
+          <a:prstGeom prst="rect">
+            <a:avLst/>
+          </a:prstGeom>
+          <a:ln>
+            <a:noFill/>
+          </a:ln>
+          <a:effectLst>
+            <a:outerShdw blurRad="292100" dist="139700" dir="2700000" algn="tl" rotWithShape="0">
+              <a:srgbClr val="333333">
+                <a:alpha val="65000"/>
+              </a:srgbClr>
+            </a:outerShdw>
+          </a:effectLst>
+        </p:spPr>
+      </p:pic>
+      <p:sp>
+        <p:nvSpPr>
+          <p:cNvPr id="8" name="Заголовок 1">
+            <a:extLst>
+              <a:ext uri="{FF2B5EF4-FFF2-40B4-BE49-F238E27FC236}">
+                <a16:creationId xmlns:a16="http://schemas.microsoft.com/office/drawing/2014/main" id="{26F3F6DE-0B95-4A88-A2DE-D547275A4F55}"/>
+              </a:ext>
+            </a:extLst>
+          </p:cNvPr>
+          <p:cNvSpPr txBox="1">
+            <a:spLocks/>
+          </p:cNvSpPr>
+          <p:nvPr/>
+        </p:nvSpPr>
+        <p:spPr>
+          <a:xfrm>
+            <a:off x="439152" y="3963798"/>
+            <a:ext cx="11160127" cy="979435"/>
+          </a:xfrm>
+          <a:prstGeom prst="rect">
+            <a:avLst/>
+          </a:prstGeom>
+        </p:spPr>
+        <p:txBody>
+          <a:bodyPr lIns="0" tIns="0" rIns="0" bIns="0" anchor="t" anchorCtr="0">
+            <a:spAutoFit/>
+          </a:bodyPr>
+          <a:lstStyle>
+            <a:lvl1pPr algn="l" defTabSz="914400" rtl="0" eaLnBrk="1" latinLnBrk="0" hangingPunct="1">
+              <a:lnSpc>
+                <a:spcPts val="4000"/>
+              </a:lnSpc>
+              <a:spcBef>
+                <a:spcPct val="0"/>
+              </a:spcBef>
+              <a:buNone/>
+              <a:defRPr sz="3600" b="0" kern="1200">
+                <a:solidFill>
+                  <a:schemeClr val="tx1"/>
+                </a:solidFill>
+                <a:effectLst>
+                  <a:outerShdw blurRad="38100" dist="38100" dir="2700000" algn="tl">
+                    <a:srgbClr val="000000">
+                      <a:alpha val="43137"/>
+                    </a:srgbClr>
+                  </a:outerShdw>
+                </a:effectLst>
+                <a:latin typeface="Rostelecom Basis Medium" panose="020B0603030604040103" pitchFamily="34" charset="0"/>
+                <a:ea typeface="+mj-ea"/>
+                <a:cs typeface="+mj-cs"/>
+              </a:defRPr>
+            </a:lvl1pPr>
+          </a:lstStyle>
+          <a:p>
+            <a:r>
+              <a:rPr lang="ru-RU" sz="3200" dirty="0">
                 <a:solidFill>
                   <a:schemeClr val="bg1"/>
                 </a:solidFill>
@@ -7707,10 +8603,10 @@
                 <a:latin typeface="Arial" panose="020B0604020202020204" pitchFamily="34" charset="0"/>
                 <a:cs typeface="Arial" panose="020B0604020202020204" pitchFamily="34" charset="0"/>
               </a:rPr>
-              <a:t>О</a:t>
-            </a:r>
-            <a:r>
-              <a:rPr lang="en-US" sz="2400" dirty="0" smtClean="0">
+              <a:t>Разработал:</a:t>
+            </a:r>
+            <a:br>
+              <a:rPr lang="ru-RU" sz="3200" dirty="0">
                 <a:solidFill>
                   <a:schemeClr val="bg1"/>
                 </a:solidFill>
@@ -7718,10 +8614,9 @@
                 <a:latin typeface="Arial" panose="020B0604020202020204" pitchFamily="34" charset="0"/>
                 <a:cs typeface="Arial" panose="020B0604020202020204" pitchFamily="34" charset="0"/>
               </a:rPr>
-              <a:t>.</a:t>
-            </a:r>
-            <a:r>
-              <a:rPr lang="ru-RU" sz="2400" dirty="0" smtClean="0">
+            </a:br>
+            <a:r>
+              <a:rPr lang="ru-RU" sz="2800" dirty="0">
                 <a:solidFill>
                   <a:schemeClr val="bg1"/>
                 </a:solidFill>
@@ -7729,52 +8624,9 @@
                 <a:latin typeface="Arial" panose="020B0604020202020204" pitchFamily="34" charset="0"/>
                 <a:cs typeface="Arial" panose="020B0604020202020204" pitchFamily="34" charset="0"/>
               </a:rPr>
-              <a:t/>
-            </a:r>
-            <a:br>
-              <a:rPr lang="ru-RU" sz="2400" dirty="0" smtClean="0">
-                <a:solidFill>
-                  <a:schemeClr val="bg1"/>
-                </a:solidFill>
-                <a:effectLst/>
-                <a:latin typeface="Arial" panose="020B0604020202020204" pitchFamily="34" charset="0"/>
-                <a:cs typeface="Arial" panose="020B0604020202020204" pitchFamily="34" charset="0"/>
-              </a:rPr>
-            </a:br>
-            <a:r>
-              <a:rPr lang="ru-RU" sz="2400" dirty="0" smtClean="0">
-                <a:solidFill>
-                  <a:schemeClr val="bg1"/>
-                </a:solidFill>
-                <a:effectLst/>
-                <a:latin typeface="Arial" panose="020B0604020202020204" pitchFamily="34" charset="0"/>
-                <a:cs typeface="Arial" panose="020B0604020202020204" pitchFamily="34" charset="0"/>
-              </a:rPr>
-              <a:t>Фамилия И</a:t>
-            </a:r>
-            <a:r>
-              <a:rPr lang="en-US" sz="2400" dirty="0" smtClean="0">
-                <a:solidFill>
-                  <a:schemeClr val="bg1"/>
-                </a:solidFill>
-                <a:effectLst/>
-                <a:latin typeface="Arial" panose="020B0604020202020204" pitchFamily="34" charset="0"/>
-                <a:cs typeface="Arial" panose="020B0604020202020204" pitchFamily="34" charset="0"/>
-              </a:rPr>
-              <a:t>.</a:t>
-            </a:r>
-            <a:r>
-              <a:rPr lang="ru-RU" sz="2400" dirty="0" smtClean="0">
-                <a:solidFill>
-                  <a:schemeClr val="bg1"/>
-                </a:solidFill>
-                <a:effectLst/>
-                <a:latin typeface="Arial" panose="020B0604020202020204" pitchFamily="34" charset="0"/>
-                <a:cs typeface="Arial" panose="020B0604020202020204" pitchFamily="34" charset="0"/>
-              </a:rPr>
-              <a:t>О</a:t>
-            </a:r>
-            <a:endParaRPr lang="ru-RU" sz="2400" dirty="0">
+              <a:t>Олейников Михаил Николаевич</a:t>
+            </a:r>
+            <a:endParaRPr lang="ru-RU" sz="2800" dirty="0">
               <a:solidFill>
                 <a:schemeClr val="bg1"/>
               </a:solidFill>
@@ -9121,7 +9973,7 @@
         <p:spPr>
           <a:xfrm>
             <a:off x="439151" y="560538"/>
-            <a:ext cx="11160127" cy="478144"/>
+            <a:ext cx="11160127" cy="523220"/>
           </a:xfrm>
           <a:prstGeom prst="rect">
             <a:avLst/>
@@ -9159,14 +10011,14 @@
           </a:lstStyle>
           <a:p>
             <a:r>
-              <a:rPr lang="ru-RU" sz="3000" b="1" dirty="0" smtClean="0">
-                <a:effectLst/>
-                <a:latin typeface="Arial" panose="020B0604020202020204" pitchFamily="34" charset="0"/>
-                <a:cs typeface="Arial" panose="020B0604020202020204" pitchFamily="34" charset="0"/>
-              </a:rPr>
-              <a:t>Генерация датасета за предыдущую неделю</a:t>
-            </a:r>
-            <a:endParaRPr lang="ru-RU" sz="3000" b="1" dirty="0">
+              <a:rPr lang="ru-RU" b="1" dirty="0">
+                <a:effectLst/>
+                <a:latin typeface="Arial" panose="020B0604020202020204" pitchFamily="34" charset="0"/>
+                <a:cs typeface="Arial" panose="020B0604020202020204" pitchFamily="34" charset="0"/>
+              </a:rPr>
+              <a:t>Поставленные задачи</a:t>
+            </a:r>
+            <a:endParaRPr lang="ru-RU" b="1" dirty="0">
               <a:latin typeface="Arial" panose="020B0604020202020204" pitchFamily="34" charset="0"/>
               <a:cs typeface="Arial" panose="020B0604020202020204" pitchFamily="34" charset="0"/>
             </a:endParaRPr>
@@ -9205,167 +10057,38 @@
       </p:pic>
       <p:pic>
         <p:nvPicPr>
-          <p:cNvPr id="16" name="Рисунок 15"/>
+          <p:cNvPr id="2" name="Рисунок 1"/>
           <p:cNvPicPr>
             <a:picLocks noChangeAspect="1"/>
           </p:cNvPicPr>
           <p:nvPr/>
         </p:nvPicPr>
         <p:blipFill>
-          <a:blip r:embed="rId3"/>
+          <a:blip r:embed="rId3">
+            <a:extLst>
+              <a:ext uri="{28A0092B-C50C-407E-A947-70E740481C1C}">
+                <a14:useLocalDpi xmlns:a14="http://schemas.microsoft.com/office/drawing/2010/main" val="0"/>
+              </a:ext>
+            </a:extLst>
+          </a:blip>
           <a:stretch>
             <a:fillRect/>
           </a:stretch>
         </p:blipFill>
         <p:spPr>
           <a:xfrm>
-            <a:off x="6508248" y="4768416"/>
-            <a:ext cx="1781424" cy="1381318"/>
-          </a:xfrm>
-          <a:prstGeom prst="rect">
-            <a:avLst/>
-          </a:prstGeom>
-          <a:ln w="15875">
-            <a:solidFill>
-              <a:schemeClr val="accent1"/>
-            </a:solidFill>
-          </a:ln>
-        </p:spPr>
-      </p:pic>
-      <p:pic>
-        <p:nvPicPr>
-          <p:cNvPr id="17" name="Рисунок 16"/>
-          <p:cNvPicPr>
-            <a:picLocks noChangeAspect="1"/>
-          </p:cNvPicPr>
-          <p:nvPr/>
-        </p:nvPicPr>
-        <p:blipFill>
-          <a:blip r:embed="rId4"/>
-          <a:stretch>
-            <a:fillRect/>
-          </a:stretch>
-        </p:blipFill>
-        <p:spPr>
-          <a:xfrm>
-            <a:off x="8956515" y="4758890"/>
-            <a:ext cx="2810267" cy="1390844"/>
-          </a:xfrm>
-          <a:prstGeom prst="rect">
-            <a:avLst/>
-          </a:prstGeom>
-          <a:ln w="15875">
-            <a:solidFill>
-              <a:schemeClr val="accent1"/>
-            </a:solidFill>
-          </a:ln>
-        </p:spPr>
-      </p:pic>
-      <p:pic>
-        <p:nvPicPr>
-          <p:cNvPr id="8" name="Рисунок 7"/>
-          <p:cNvPicPr>
-            <a:picLocks noChangeAspect="1"/>
-          </p:cNvPicPr>
-          <p:nvPr/>
-        </p:nvPicPr>
-        <p:blipFill>
-          <a:blip r:embed="rId5"/>
-          <a:stretch>
-            <a:fillRect/>
-          </a:stretch>
-        </p:blipFill>
-        <p:spPr>
-          <a:xfrm>
-            <a:off x="6762147" y="1201656"/>
-            <a:ext cx="4620270" cy="1705213"/>
-          </a:xfrm>
-          <a:prstGeom prst="rect">
-            <a:avLst/>
-          </a:prstGeom>
-        </p:spPr>
-      </p:pic>
-      <p:pic>
-        <p:nvPicPr>
-          <p:cNvPr id="9" name="Рисунок 8"/>
-          <p:cNvPicPr>
-            <a:picLocks noChangeAspect="1"/>
-          </p:cNvPicPr>
-          <p:nvPr/>
-        </p:nvPicPr>
-        <p:blipFill>
-          <a:blip r:embed="rId6"/>
-          <a:stretch>
-            <a:fillRect/>
-          </a:stretch>
-        </p:blipFill>
-        <p:spPr>
-          <a:xfrm>
-            <a:off x="327587" y="1399642"/>
-            <a:ext cx="5891177" cy="2313184"/>
-          </a:xfrm>
-          <a:prstGeom prst="rect">
-            <a:avLst/>
-          </a:prstGeom>
-        </p:spPr>
-      </p:pic>
-      <p:pic>
-        <p:nvPicPr>
-          <p:cNvPr id="14" name="Рисунок 13"/>
-          <p:cNvPicPr>
-            <a:picLocks noChangeAspect="1"/>
-          </p:cNvPicPr>
-          <p:nvPr/>
-        </p:nvPicPr>
-        <p:blipFill>
-          <a:blip r:embed="rId7"/>
-          <a:stretch>
-            <a:fillRect/>
-          </a:stretch>
-        </p:blipFill>
-        <p:spPr>
-          <a:xfrm>
-            <a:off x="327587" y="3881316"/>
-            <a:ext cx="5877745" cy="2343477"/>
-          </a:xfrm>
-          <a:prstGeom prst="rect">
-            <a:avLst/>
-          </a:prstGeom>
-        </p:spPr>
-      </p:pic>
-      <p:pic>
-        <p:nvPicPr>
-          <p:cNvPr id="3" name="Рисунок 2"/>
-          <p:cNvPicPr>
-            <a:picLocks noChangeAspect="1"/>
-          </p:cNvPicPr>
-          <p:nvPr/>
-        </p:nvPicPr>
-        <p:blipFill>
-          <a:blip r:embed="rId8"/>
-          <a:stretch>
-            <a:fillRect/>
-          </a:stretch>
-        </p:blipFill>
-        <p:spPr>
-          <a:xfrm>
-            <a:off x="6508248" y="3024767"/>
-            <a:ext cx="5239481" cy="1190791"/>
-          </a:xfrm>
-          <a:prstGeom prst="rect">
-            <a:avLst/>
-          </a:prstGeom>
-          <a:ln w="15875">
-            <a:solidFill>
-              <a:schemeClr val="accent1"/>
-            </a:solidFill>
-          </a:ln>
+            <a:off x="1887539" y="1311512"/>
+            <a:ext cx="9025623" cy="5081772"/>
+          </a:xfrm>
+          <a:prstGeom prst="rect">
+            <a:avLst/>
+          </a:prstGeom>
         </p:spPr>
       </p:pic>
     </p:spTree>
     <p:extLst>
       <p:ext uri="{BB962C8B-B14F-4D97-AF65-F5344CB8AC3E}">
-        <p14:creationId xmlns:p14="http://schemas.microsoft.com/office/powerpoint/2010/main" val="797357854"/>
+        <p14:creationId xmlns:p14="http://schemas.microsoft.com/office/powerpoint/2010/main" val="2172172576"/>
       </p:ext>
     </p:extLst>
   </p:cSld>
@@ -9483,7 +10206,7 @@
         <p:spPr>
           <a:xfrm>
             <a:off x="439151" y="560538"/>
-            <a:ext cx="11160127" cy="523220"/>
+            <a:ext cx="11160127" cy="478144"/>
           </a:xfrm>
           <a:prstGeom prst="rect">
             <a:avLst/>
@@ -9521,14 +10244,14 @@
           </a:lstStyle>
           <a:p>
             <a:r>
-              <a:rPr lang="ru-RU" b="1" dirty="0" smtClean="0">
-                <a:effectLst/>
-                <a:latin typeface="Arial" panose="020B0604020202020204" pitchFamily="34" charset="0"/>
-                <a:cs typeface="Arial" panose="020B0604020202020204" pitchFamily="34" charset="0"/>
-              </a:rPr>
-              <a:t>Генерация датасета - код</a:t>
-            </a:r>
-            <a:endParaRPr lang="ru-RU" b="1" dirty="0">
+              <a:rPr lang="ru-RU" sz="3000" b="1" dirty="0" smtClean="0">
+                <a:effectLst/>
+                <a:latin typeface="Arial" panose="020B0604020202020204" pitchFamily="34" charset="0"/>
+                <a:cs typeface="Arial" panose="020B0604020202020204" pitchFamily="34" charset="0"/>
+              </a:rPr>
+              <a:t>Генерация датасета за предыдущую неделю</a:t>
+            </a:r>
+            <a:endParaRPr lang="ru-RU" sz="3000" b="1" dirty="0">
               <a:latin typeface="Arial" panose="020B0604020202020204" pitchFamily="34" charset="0"/>
               <a:cs typeface="Arial" panose="020B0604020202020204" pitchFamily="34" charset="0"/>
             </a:endParaRPr>
@@ -9567,7 +10290,7 @@
       </p:pic>
       <p:pic>
         <p:nvPicPr>
-          <p:cNvPr id="15" name="Рисунок 14"/>
+          <p:cNvPr id="16" name="Рисунок 15"/>
           <p:cNvPicPr>
             <a:picLocks noChangeAspect="1"/>
           </p:cNvPicPr>
@@ -9581,17 +10304,22 @@
         </p:blipFill>
         <p:spPr>
           <a:xfrm>
-            <a:off x="515939" y="1552140"/>
-            <a:ext cx="5405915" cy="4515285"/>
-          </a:xfrm>
-          <a:prstGeom prst="rect">
-            <a:avLst/>
-          </a:prstGeom>
+            <a:off x="6508248" y="4768416"/>
+            <a:ext cx="1781424" cy="1381318"/>
+          </a:xfrm>
+          <a:prstGeom prst="rect">
+            <a:avLst/>
+          </a:prstGeom>
+          <a:ln w="15875">
+            <a:solidFill>
+              <a:schemeClr val="accent1"/>
+            </a:solidFill>
+          </a:ln>
         </p:spPr>
       </p:pic>
       <p:pic>
         <p:nvPicPr>
-          <p:cNvPr id="16" name="Рисунок 15"/>
+          <p:cNvPr id="17" name="Рисунок 16"/>
           <p:cNvPicPr>
             <a:picLocks noChangeAspect="1"/>
           </p:cNvPicPr>
@@ -9605,18 +10333,124 @@
         </p:blipFill>
         <p:spPr>
           <a:xfrm>
-            <a:off x="6172200" y="1552140"/>
-            <a:ext cx="5427078" cy="4522565"/>
-          </a:xfrm>
-          <a:prstGeom prst="rect">
-            <a:avLst/>
-          </a:prstGeom>
+            <a:off x="8956515" y="4758890"/>
+            <a:ext cx="2810267" cy="1390844"/>
+          </a:xfrm>
+          <a:prstGeom prst="rect">
+            <a:avLst/>
+          </a:prstGeom>
+          <a:ln w="15875">
+            <a:solidFill>
+              <a:schemeClr val="accent1"/>
+            </a:solidFill>
+          </a:ln>
+        </p:spPr>
+      </p:pic>
+      <p:pic>
+        <p:nvPicPr>
+          <p:cNvPr id="8" name="Рисунок 7"/>
+          <p:cNvPicPr>
+            <a:picLocks noChangeAspect="1"/>
+          </p:cNvPicPr>
+          <p:nvPr/>
+        </p:nvPicPr>
+        <p:blipFill>
+          <a:blip r:embed="rId5"/>
+          <a:stretch>
+            <a:fillRect/>
+          </a:stretch>
+        </p:blipFill>
+        <p:spPr>
+          <a:xfrm>
+            <a:off x="6762147" y="1201656"/>
+            <a:ext cx="4620270" cy="1705213"/>
+          </a:xfrm>
+          <a:prstGeom prst="rect">
+            <a:avLst/>
+          </a:prstGeom>
+        </p:spPr>
+      </p:pic>
+      <p:pic>
+        <p:nvPicPr>
+          <p:cNvPr id="9" name="Рисунок 8"/>
+          <p:cNvPicPr>
+            <a:picLocks noChangeAspect="1"/>
+          </p:cNvPicPr>
+          <p:nvPr/>
+        </p:nvPicPr>
+        <p:blipFill>
+          <a:blip r:embed="rId6"/>
+          <a:stretch>
+            <a:fillRect/>
+          </a:stretch>
+        </p:blipFill>
+        <p:spPr>
+          <a:xfrm>
+            <a:off x="327587" y="1399642"/>
+            <a:ext cx="5891177" cy="2313184"/>
+          </a:xfrm>
+          <a:prstGeom prst="rect">
+            <a:avLst/>
+          </a:prstGeom>
+        </p:spPr>
+      </p:pic>
+      <p:pic>
+        <p:nvPicPr>
+          <p:cNvPr id="14" name="Рисунок 13"/>
+          <p:cNvPicPr>
+            <a:picLocks noChangeAspect="1"/>
+          </p:cNvPicPr>
+          <p:nvPr/>
+        </p:nvPicPr>
+        <p:blipFill>
+          <a:blip r:embed="rId7"/>
+          <a:stretch>
+            <a:fillRect/>
+          </a:stretch>
+        </p:blipFill>
+        <p:spPr>
+          <a:xfrm>
+            <a:off x="327587" y="3881316"/>
+            <a:ext cx="5877745" cy="2343477"/>
+          </a:xfrm>
+          <a:prstGeom prst="rect">
+            <a:avLst/>
+          </a:prstGeom>
+        </p:spPr>
+      </p:pic>
+      <p:pic>
+        <p:nvPicPr>
+          <p:cNvPr id="3" name="Рисунок 2"/>
+          <p:cNvPicPr>
+            <a:picLocks noChangeAspect="1"/>
+          </p:cNvPicPr>
+          <p:nvPr/>
+        </p:nvPicPr>
+        <p:blipFill>
+          <a:blip r:embed="rId8"/>
+          <a:stretch>
+            <a:fillRect/>
+          </a:stretch>
+        </p:blipFill>
+        <p:spPr>
+          <a:xfrm>
+            <a:off x="6508248" y="3024767"/>
+            <a:ext cx="5239481" cy="1190791"/>
+          </a:xfrm>
+          <a:prstGeom prst="rect">
+            <a:avLst/>
+          </a:prstGeom>
+          <a:ln w="15875">
+            <a:solidFill>
+              <a:schemeClr val="accent1"/>
+            </a:solidFill>
+          </a:ln>
         </p:spPr>
       </p:pic>
     </p:spTree>
     <p:extLst>
       <p:ext uri="{BB962C8B-B14F-4D97-AF65-F5344CB8AC3E}">
-        <p14:creationId xmlns:p14="http://schemas.microsoft.com/office/powerpoint/2010/main" val="2476784764"/>
+        <p14:creationId xmlns:p14="http://schemas.microsoft.com/office/powerpoint/2010/main" val="797357854"/>
       </p:ext>
     </p:extLst>
   </p:cSld>
@@ -9660,140 +10494,6 @@
       </p:grpSpPr>
       <p:sp>
         <p:nvSpPr>
-          <p:cNvPr id="3" name="Объект 2"/>
-          <p:cNvSpPr>
-            <a:spLocks noGrp="1"/>
-          </p:cNvSpPr>
-          <p:nvPr>
-            <p:ph sz="half" idx="1"/>
-          </p:nvPr>
-        </p:nvSpPr>
-        <p:spPr>
-          <a:xfrm>
-            <a:off x="439151" y="1362635"/>
-            <a:ext cx="5459625" cy="4814328"/>
-          </a:xfrm>
-        </p:spPr>
-        <p:txBody>
-          <a:bodyPr>
-            <a:normAutofit/>
-          </a:bodyPr>
-          <a:lstStyle/>
-          <a:p>
-            <a:pPr marL="0" indent="0" algn="just">
-              <a:buNone/>
-            </a:pPr>
-            <a:r>
-              <a:rPr lang="ru-RU" dirty="0"/>
-              <a:t>Создание продюсера на Python, который будет симулировать данные </a:t>
-            </a:r>
-            <a:r>
-              <a:rPr lang="ru-RU" dirty="0" smtClean="0"/>
-              <a:t>о</a:t>
-            </a:r>
-            <a:r>
-              <a:rPr lang="en-US" dirty="0" smtClean="0"/>
-              <a:t> </a:t>
-            </a:r>
-            <a:r>
-              <a:rPr lang="ru-RU" dirty="0" smtClean="0"/>
-              <a:t>поведении </a:t>
-            </a:r>
-            <a:r>
-              <a:rPr lang="ru-RU" dirty="0"/>
-              <a:t>пользователей интерактивного </a:t>
-            </a:r>
-            <a:r>
-              <a:rPr lang="ru-RU" dirty="0" smtClean="0"/>
-              <a:t>телевидения. Например:</a:t>
-            </a:r>
-            <a:endParaRPr lang="ru-RU" dirty="0"/>
-          </a:p>
-          <a:p>
-            <a:pPr algn="just"/>
-            <a:r>
-              <a:rPr lang="en-US" dirty="0" smtClean="0"/>
-              <a:t>ID </a:t>
-            </a:r>
-            <a:r>
-              <a:rPr lang="ru-RU" dirty="0"/>
-              <a:t>пользователя</a:t>
-            </a:r>
-          </a:p>
-          <a:p>
-            <a:pPr algn="just"/>
-            <a:r>
-              <a:rPr lang="ru-RU" dirty="0" smtClean="0"/>
-              <a:t>время </a:t>
-            </a:r>
-            <a:r>
-              <a:rPr lang="ru-RU" dirty="0"/>
-              <a:t>начала и окончания просмотра</a:t>
-            </a:r>
-          </a:p>
-          <a:p>
-            <a:pPr algn="just"/>
-            <a:r>
-              <a:rPr lang="ru-RU" dirty="0" smtClean="0"/>
-              <a:t>выбранный </a:t>
-            </a:r>
-            <a:r>
-              <a:rPr lang="ru-RU" dirty="0"/>
-              <a:t>контент</a:t>
-            </a:r>
-          </a:p>
-          <a:p>
-            <a:pPr marL="0" indent="0" algn="just">
-              <a:buNone/>
-            </a:pPr>
-            <a:r>
-              <a:rPr lang="ru-RU" dirty="0"/>
-              <a:t>и отправлять их в топик Kafka.</a:t>
-            </a:r>
-          </a:p>
-        </p:txBody>
-      </p:sp>
-      <p:sp>
-        <p:nvSpPr>
-          <p:cNvPr id="4" name="Объект 3"/>
-          <p:cNvSpPr>
-            <a:spLocks noGrp="1"/>
-          </p:cNvSpPr>
-          <p:nvPr>
-            <p:ph sz="half" idx="2"/>
-          </p:nvPr>
-        </p:nvSpPr>
-        <p:spPr>
-          <a:xfrm>
-            <a:off x="6248400" y="1362635"/>
-            <a:ext cx="5350878" cy="4814328"/>
-          </a:xfrm>
-        </p:spPr>
-        <p:txBody>
-          <a:bodyPr>
-            <a:normAutofit/>
-          </a:bodyPr>
-          <a:lstStyle/>
-          <a:p>
-            <a:pPr marL="0" indent="0" algn="just">
-              <a:buNone/>
-            </a:pPr>
-            <a:r>
-              <a:rPr lang="ru-RU" dirty="0" smtClean="0"/>
-              <a:t>Генерируем активность 10000 пользователей за текущий день.</a:t>
-            </a:r>
-            <a:endParaRPr lang="ru-RU" dirty="0"/>
-          </a:p>
-          <a:p>
-            <a:pPr marL="0" indent="0">
-              <a:buNone/>
-            </a:pPr>
-            <a:endParaRPr lang="ru-RU" dirty="0"/>
-          </a:p>
-        </p:txBody>
-      </p:sp>
-      <p:sp>
-        <p:nvSpPr>
           <p:cNvPr id="11" name="Номер слайда 3">
             <a:extLst>
               <a:ext uri="{FF2B5EF4-FFF2-40B4-BE49-F238E27FC236}">
@@ -9810,7 +10510,7 @@
         </p:nvSpPr>
         <p:spPr>
           <a:xfrm>
-            <a:off x="515410" y="6356350"/>
+            <a:off x="515939" y="6393284"/>
             <a:ext cx="2743200" cy="365125"/>
           </a:xfrm>
           <a:prstGeom prst="rect">
@@ -9868,7 +10568,7 @@
         <p:spPr>
           <a:xfrm>
             <a:off x="439151" y="560538"/>
-            <a:ext cx="11160127" cy="512961"/>
+            <a:ext cx="11160127" cy="523220"/>
           </a:xfrm>
           <a:prstGeom prst="rect">
             <a:avLst/>
@@ -9906,14 +10606,14 @@
           </a:lstStyle>
           <a:p>
             <a:r>
-              <a:rPr lang="ru-RU" sz="2800" dirty="0"/>
-              <a:t>Сбор данных с использованием </a:t>
-            </a:r>
-            <a:r>
-              <a:rPr lang="ru-RU" sz="2800" dirty="0" smtClean="0"/>
-              <a:t>RT.Streaming</a:t>
-            </a:r>
-            <a:endParaRPr lang="ru-RU" sz="2800" b="1" dirty="0">
+              <a:rPr lang="ru-RU" b="1" dirty="0" smtClean="0">
+                <a:effectLst/>
+                <a:latin typeface="Arial" panose="020B0604020202020204" pitchFamily="34" charset="0"/>
+                <a:cs typeface="Arial" panose="020B0604020202020204" pitchFamily="34" charset="0"/>
+              </a:rPr>
+              <a:t>Генерация датасета - код</a:t>
+            </a:r>
+            <a:endParaRPr lang="ru-RU" b="1" dirty="0">
               <a:latin typeface="Arial" panose="020B0604020202020204" pitchFamily="34" charset="0"/>
               <a:cs typeface="Arial" panose="020B0604020202020204" pitchFamily="34" charset="0"/>
             </a:endParaRPr>
@@ -9952,7 +10652,7 @@
       </p:pic>
       <p:pic>
         <p:nvPicPr>
-          <p:cNvPr id="5" name="Рисунок 4"/>
+          <p:cNvPr id="15" name="Рисунок 14"/>
           <p:cNvPicPr>
             <a:picLocks noChangeAspect="1"/>
           </p:cNvPicPr>
@@ -9966,8 +10666,32 @@
         </p:blipFill>
         <p:spPr>
           <a:xfrm>
-            <a:off x="6329082" y="2376917"/>
-            <a:ext cx="5342966" cy="3342058"/>
+            <a:off x="515939" y="1552140"/>
+            <a:ext cx="5405915" cy="4515285"/>
+          </a:xfrm>
+          <a:prstGeom prst="rect">
+            <a:avLst/>
+          </a:prstGeom>
+        </p:spPr>
+      </p:pic>
+      <p:pic>
+        <p:nvPicPr>
+          <p:cNvPr id="16" name="Рисунок 15"/>
+          <p:cNvPicPr>
+            <a:picLocks noChangeAspect="1"/>
+          </p:cNvPicPr>
+          <p:nvPr/>
+        </p:nvPicPr>
+        <p:blipFill>
+          <a:blip r:embed="rId4"/>
+          <a:stretch>
+            <a:fillRect/>
+          </a:stretch>
+        </p:blipFill>
+        <p:spPr>
+          <a:xfrm>
+            <a:off x="6172200" y="1552140"/>
+            <a:ext cx="5427078" cy="4522565"/>
           </a:xfrm>
           <a:prstGeom prst="rect">
             <a:avLst/>
@@ -9977,7 +10701,7 @@
     </p:spTree>
     <p:extLst>
       <p:ext uri="{BB962C8B-B14F-4D97-AF65-F5344CB8AC3E}">
-        <p14:creationId xmlns:p14="http://schemas.microsoft.com/office/powerpoint/2010/main" val="2900038033"/>
+        <p14:creationId xmlns:p14="http://schemas.microsoft.com/office/powerpoint/2010/main" val="2476784764"/>
       </p:ext>
     </p:extLst>
   </p:cSld>
@@ -10021,6 +10745,140 @@
       </p:grpSpPr>
       <p:sp>
         <p:nvSpPr>
+          <p:cNvPr id="3" name="Объект 2"/>
+          <p:cNvSpPr>
+            <a:spLocks noGrp="1"/>
+          </p:cNvSpPr>
+          <p:nvPr>
+            <p:ph sz="half" idx="1"/>
+          </p:nvPr>
+        </p:nvSpPr>
+        <p:spPr>
+          <a:xfrm>
+            <a:off x="439151" y="1362635"/>
+            <a:ext cx="5459625" cy="4814328"/>
+          </a:xfrm>
+        </p:spPr>
+        <p:txBody>
+          <a:bodyPr>
+            <a:normAutofit/>
+          </a:bodyPr>
+          <a:lstStyle/>
+          <a:p>
+            <a:pPr marL="0" indent="0" algn="just">
+              <a:buNone/>
+            </a:pPr>
+            <a:r>
+              <a:rPr lang="ru-RU" dirty="0"/>
+              <a:t>Создание продюсера на Python, который будет симулировать данные </a:t>
+            </a:r>
+            <a:r>
+              <a:rPr lang="ru-RU" dirty="0" smtClean="0"/>
+              <a:t>о</a:t>
+            </a:r>
+            <a:r>
+              <a:rPr lang="en-US" dirty="0" smtClean="0"/>
+              <a:t> </a:t>
+            </a:r>
+            <a:r>
+              <a:rPr lang="ru-RU" dirty="0" smtClean="0"/>
+              <a:t>поведении </a:t>
+            </a:r>
+            <a:r>
+              <a:rPr lang="ru-RU" dirty="0"/>
+              <a:t>пользователей интерактивного </a:t>
+            </a:r>
+            <a:r>
+              <a:rPr lang="ru-RU" dirty="0" smtClean="0"/>
+              <a:t>телевидения. Например:</a:t>
+            </a:r>
+            <a:endParaRPr lang="ru-RU" dirty="0"/>
+          </a:p>
+          <a:p>
+            <a:pPr algn="just"/>
+            <a:r>
+              <a:rPr lang="en-US" dirty="0" smtClean="0"/>
+              <a:t>ID </a:t>
+            </a:r>
+            <a:r>
+              <a:rPr lang="ru-RU" dirty="0"/>
+              <a:t>пользователя</a:t>
+            </a:r>
+          </a:p>
+          <a:p>
+            <a:pPr algn="just"/>
+            <a:r>
+              <a:rPr lang="ru-RU" dirty="0" smtClean="0"/>
+              <a:t>время </a:t>
+            </a:r>
+            <a:r>
+              <a:rPr lang="ru-RU" dirty="0"/>
+              <a:t>начала и окончания просмотра</a:t>
+            </a:r>
+          </a:p>
+          <a:p>
+            <a:pPr algn="just"/>
+            <a:r>
+              <a:rPr lang="ru-RU" dirty="0" smtClean="0"/>
+              <a:t>выбранный </a:t>
+            </a:r>
+            <a:r>
+              <a:rPr lang="ru-RU" dirty="0"/>
+              <a:t>контент</a:t>
+            </a:r>
+          </a:p>
+          <a:p>
+            <a:pPr marL="0" indent="0" algn="just">
+              <a:buNone/>
+            </a:pPr>
+            <a:r>
+              <a:rPr lang="ru-RU" dirty="0"/>
+              <a:t>и отправлять их в топик Kafka.</a:t>
+            </a:r>
+          </a:p>
+        </p:txBody>
+      </p:sp>
+      <p:sp>
+        <p:nvSpPr>
+          <p:cNvPr id="4" name="Объект 3"/>
+          <p:cNvSpPr>
+            <a:spLocks noGrp="1"/>
+          </p:cNvSpPr>
+          <p:nvPr>
+            <p:ph sz="half" idx="2"/>
+          </p:nvPr>
+        </p:nvSpPr>
+        <p:spPr>
+          <a:xfrm>
+            <a:off x="6248400" y="1362635"/>
+            <a:ext cx="5350878" cy="4814328"/>
+          </a:xfrm>
+        </p:spPr>
+        <p:txBody>
+          <a:bodyPr>
+            <a:normAutofit/>
+          </a:bodyPr>
+          <a:lstStyle/>
+          <a:p>
+            <a:pPr marL="0" indent="0" algn="just">
+              <a:buNone/>
+            </a:pPr>
+            <a:r>
+              <a:rPr lang="ru-RU" dirty="0" smtClean="0"/>
+              <a:t>Генерируем активность 10000 пользователей за текущий день.</a:t>
+            </a:r>
+            <a:endParaRPr lang="ru-RU" dirty="0"/>
+          </a:p>
+          <a:p>
+            <a:pPr marL="0" indent="0">
+              <a:buNone/>
+            </a:pPr>
+            <a:endParaRPr lang="ru-RU" dirty="0"/>
+          </a:p>
+        </p:txBody>
+      </p:sp>
+      <p:sp>
+        <p:nvSpPr>
           <p:cNvPr id="11" name="Номер слайда 3">
             <a:extLst>
               <a:ext uri="{FF2B5EF4-FFF2-40B4-BE49-F238E27FC236}">
@@ -10037,7 +10895,7 @@
         </p:nvSpPr>
         <p:spPr>
           <a:xfrm>
-            <a:off x="515939" y="6393284"/>
+            <a:off x="515410" y="6356350"/>
             <a:ext cx="2743200" cy="365125"/>
           </a:xfrm>
           <a:prstGeom prst="rect">
@@ -10095,7 +10953,7 @@
         <p:spPr>
           <a:xfrm>
             <a:off x="439151" y="560538"/>
-            <a:ext cx="11160127" cy="465127"/>
+            <a:ext cx="11160127" cy="512961"/>
           </a:xfrm>
           <a:prstGeom prst="rect">
             <a:avLst/>
@@ -10133,14 +10991,14 @@
           </a:lstStyle>
           <a:p>
             <a:r>
-              <a:rPr lang="ru-RU" sz="2600" dirty="0"/>
+              <a:rPr lang="ru-RU" sz="2800" dirty="0"/>
               <a:t>Сбор данных с использованием </a:t>
             </a:r>
             <a:r>
-              <a:rPr lang="ru-RU" sz="2600" dirty="0" smtClean="0"/>
-              <a:t>RT.Streaming - код</a:t>
-            </a:r>
-            <a:endParaRPr lang="ru-RU" sz="2600" b="1" dirty="0">
+              <a:rPr lang="ru-RU" sz="2800" dirty="0" smtClean="0"/>
+              <a:t>RT.Streaming</a:t>
+            </a:r>
+            <a:endParaRPr lang="ru-RU" sz="2800" b="1" dirty="0">
               <a:latin typeface="Arial" panose="020B0604020202020204" pitchFamily="34" charset="0"/>
               <a:cs typeface="Arial" panose="020B0604020202020204" pitchFamily="34" charset="0"/>
             </a:endParaRPr>
@@ -10179,7 +11037,7 @@
       </p:pic>
       <p:pic>
         <p:nvPicPr>
-          <p:cNvPr id="8" name="Рисунок 7"/>
+          <p:cNvPr id="5" name="Рисунок 4"/>
           <p:cNvPicPr>
             <a:picLocks noChangeAspect="1"/>
           </p:cNvPicPr>
@@ -10193,32 +11051,8 @@
         </p:blipFill>
         <p:spPr>
           <a:xfrm>
-            <a:off x="439151" y="1228166"/>
-            <a:ext cx="5317281" cy="4484454"/>
-          </a:xfrm>
-          <a:prstGeom prst="rect">
-            <a:avLst/>
-          </a:prstGeom>
-        </p:spPr>
-      </p:pic>
-      <p:pic>
-        <p:nvPicPr>
-          <p:cNvPr id="9" name="Рисунок 8"/>
-          <p:cNvPicPr>
-            <a:picLocks noChangeAspect="1"/>
-          </p:cNvPicPr>
-          <p:nvPr/>
-        </p:nvPicPr>
-        <p:blipFill>
-          <a:blip r:embed="rId4"/>
-          <a:stretch>
-            <a:fillRect/>
-          </a:stretch>
-        </p:blipFill>
-        <p:spPr>
-          <a:xfrm>
-            <a:off x="5923110" y="1228167"/>
-            <a:ext cx="5592553" cy="4484454"/>
+            <a:off x="6329082" y="2376917"/>
+            <a:ext cx="5342966" cy="3342058"/>
           </a:xfrm>
           <a:prstGeom prst="rect">
             <a:avLst/>
@@ -10228,7 +11062,7 @@
     </p:spTree>
     <p:extLst>
       <p:ext uri="{BB962C8B-B14F-4D97-AF65-F5344CB8AC3E}">
-        <p14:creationId xmlns:p14="http://schemas.microsoft.com/office/powerpoint/2010/main" val="1231678755"/>
+        <p14:creationId xmlns:p14="http://schemas.microsoft.com/office/powerpoint/2010/main" val="2900038033"/>
       </p:ext>
     </p:extLst>
   </p:cSld>
@@ -10331,7 +11165,7 @@
       </p:sp>
       <p:sp>
         <p:nvSpPr>
-          <p:cNvPr id="5" name="Заголовок 1">
+          <p:cNvPr id="6" name="Заголовок 1">
             <a:extLst>
               <a:ext uri="{FF2B5EF4-FFF2-40B4-BE49-F238E27FC236}">
                 <a16:creationId xmlns:a16="http://schemas.microsoft.com/office/drawing/2014/main" id="{26F3F6DE-0B95-4A88-A2DE-D547275A4F55}"/>
@@ -10345,99 +11179,8 @@
         </p:nvSpPr>
         <p:spPr>
           <a:xfrm>
-            <a:off x="107458" y="1512731"/>
-            <a:ext cx="11491820" cy="769441"/>
-          </a:xfrm>
-          <a:prstGeom prst="rect">
-            <a:avLst/>
-          </a:prstGeom>
-        </p:spPr>
-        <p:txBody>
-          <a:bodyPr wrap="square" lIns="0" tIns="0" rIns="0" bIns="0" anchor="t" anchorCtr="0">
-            <a:spAutoFit/>
-          </a:bodyPr>
-          <a:lstStyle>
-            <a:defPPr>
-              <a:defRPr lang="ru-RU"/>
-            </a:defPPr>
-            <a:lvl1pPr>
-              <a:lnSpc>
-                <a:spcPts val="4000"/>
-              </a:lnSpc>
-              <a:spcBef>
-                <a:spcPct val="0"/>
-              </a:spcBef>
-              <a:buNone/>
-              <a:defRPr sz="2800" b="0">
-                <a:effectLst/>
-                <a:latin typeface="Rostelecom Basis Medium" panose="020B0603030604040103" pitchFamily="34" charset="0"/>
-                <a:ea typeface="+mj-ea"/>
-                <a:cs typeface="+mj-cs"/>
-              </a:defRPr>
-            </a:lvl1pPr>
-          </a:lstStyle>
-          <a:p>
-            <a:pPr marL="342000" algn="just">
-              <a:lnSpc>
-                <a:spcPts val="3000"/>
-              </a:lnSpc>
-            </a:pPr>
-            <a:r>
-              <a:rPr lang="ru-RU" dirty="0">
-                <a:latin typeface="Arial" panose="020B0604020202020204" pitchFamily="34" charset="0"/>
-                <a:cs typeface="Arial" panose="020B0604020202020204" pitchFamily="34" charset="0"/>
-              </a:rPr>
-              <a:t>Создание потребителя на Python для RT.Streaming, который будет читать данные и сохранять их в HDFS </a:t>
-            </a:r>
-            <a:r>
-              <a:rPr lang="ru-RU" dirty="0" smtClean="0">
-                <a:latin typeface="Arial" panose="020B0604020202020204" pitchFamily="34" charset="0"/>
-                <a:cs typeface="Arial" panose="020B0604020202020204" pitchFamily="34" charset="0"/>
-              </a:rPr>
-              <a:t>в </a:t>
-            </a:r>
-            <a:r>
-              <a:rPr lang="ru-RU" dirty="0">
-                <a:latin typeface="Arial" panose="020B0604020202020204" pitchFamily="34" charset="0"/>
-                <a:cs typeface="Arial" panose="020B0604020202020204" pitchFamily="34" charset="0"/>
-              </a:rPr>
-              <a:t>формате </a:t>
-            </a:r>
-            <a:r>
-              <a:rPr lang="en-US" dirty="0">
-                <a:latin typeface="Arial" panose="020B0604020202020204" pitchFamily="34" charset="0"/>
-                <a:cs typeface="Arial" panose="020B0604020202020204" pitchFamily="34" charset="0"/>
-              </a:rPr>
-              <a:t>CSV</a:t>
-            </a:r>
-            <a:r>
-              <a:rPr lang="ru-RU" dirty="0">
-                <a:latin typeface="Arial" panose="020B0604020202020204" pitchFamily="34" charset="0"/>
-                <a:cs typeface="Arial" panose="020B0604020202020204" pitchFamily="34" charset="0"/>
-              </a:rPr>
-              <a:t>.</a:t>
-            </a:r>
-          </a:p>
-        </p:txBody>
-      </p:sp>
-      <p:sp>
-        <p:nvSpPr>
-          <p:cNvPr id="6" name="Заголовок 1">
-            <a:extLst>
-              <a:ext uri="{FF2B5EF4-FFF2-40B4-BE49-F238E27FC236}">
-                <a16:creationId xmlns:a16="http://schemas.microsoft.com/office/drawing/2014/main" id="{26F3F6DE-0B95-4A88-A2DE-D547275A4F55}"/>
-              </a:ext>
-            </a:extLst>
-          </p:cNvPr>
-          <p:cNvSpPr txBox="1">
-            <a:spLocks/>
-          </p:cNvSpPr>
-          <p:nvPr/>
-        </p:nvSpPr>
-        <p:spPr>
-          <a:xfrm>
             <a:off x="439151" y="560538"/>
-            <a:ext cx="11160127" cy="512961"/>
+            <a:ext cx="11160127" cy="465127"/>
           </a:xfrm>
           <a:prstGeom prst="rect">
             <a:avLst/>
@@ -10475,22 +11218,14 @@
           </a:lstStyle>
           <a:p>
             <a:r>
-              <a:rPr lang="ru-RU" dirty="0">
-                <a:effectLst/>
-                <a:latin typeface="Arial" panose="020B0604020202020204" pitchFamily="34" charset="0"/>
-                <a:cs typeface="Arial" panose="020B0604020202020204" pitchFamily="34" charset="0"/>
-              </a:rPr>
-              <a:t>Хранение сырых данных в</a:t>
-            </a:r>
-            <a:r>
-              <a:rPr lang="en-US" dirty="0">
-                <a:effectLst/>
-                <a:latin typeface="Arial" panose="020B0604020202020204" pitchFamily="34" charset="0"/>
-                <a:cs typeface="Arial" panose="020B0604020202020204" pitchFamily="34" charset="0"/>
-              </a:rPr>
-              <a:t> RT.DataLake</a:t>
-            </a:r>
-            <a:endParaRPr lang="ru-RU" b="1" dirty="0">
+              <a:rPr lang="ru-RU" sz="2600" dirty="0"/>
+              <a:t>Сбор данных с использованием </a:t>
+            </a:r>
+            <a:r>
+              <a:rPr lang="ru-RU" sz="2600" dirty="0" smtClean="0"/>
+              <a:t>RT.Streaming - код</a:t>
+            </a:r>
+            <a:endParaRPr lang="ru-RU" sz="2600" b="1" dirty="0">
               <a:latin typeface="Arial" panose="020B0604020202020204" pitchFamily="34" charset="0"/>
               <a:cs typeface="Arial" panose="020B0604020202020204" pitchFamily="34" charset="0"/>
             </a:endParaRPr>
@@ -10529,7 +11264,7 @@
       </p:pic>
       <p:pic>
         <p:nvPicPr>
-          <p:cNvPr id="3" name="Рисунок 2"/>
+          <p:cNvPr id="8" name="Рисунок 7"/>
           <p:cNvPicPr>
             <a:picLocks noChangeAspect="1"/>
           </p:cNvPicPr>
@@ -10543,8 +11278,32 @@
         </p:blipFill>
         <p:spPr>
           <a:xfrm>
-            <a:off x="515939" y="2662928"/>
-            <a:ext cx="11021963" cy="3734321"/>
+            <a:off x="439151" y="1228166"/>
+            <a:ext cx="5317281" cy="4484454"/>
+          </a:xfrm>
+          <a:prstGeom prst="rect">
+            <a:avLst/>
+          </a:prstGeom>
+        </p:spPr>
+      </p:pic>
+      <p:pic>
+        <p:nvPicPr>
+          <p:cNvPr id="9" name="Рисунок 8"/>
+          <p:cNvPicPr>
+            <a:picLocks noChangeAspect="1"/>
+          </p:cNvPicPr>
+          <p:nvPr/>
+        </p:nvPicPr>
+        <p:blipFill>
+          <a:blip r:embed="rId4"/>
+          <a:stretch>
+            <a:fillRect/>
+          </a:stretch>
+        </p:blipFill>
+        <p:spPr>
+          <a:xfrm>
+            <a:off x="5923110" y="1228167"/>
+            <a:ext cx="5592553" cy="4484454"/>
           </a:xfrm>
           <a:prstGeom prst="rect">
             <a:avLst/>
@@ -10554,7 +11313,7 @@
     </p:spTree>
     <p:extLst>
       <p:ext uri="{BB962C8B-B14F-4D97-AF65-F5344CB8AC3E}">
-        <p14:creationId xmlns:p14="http://schemas.microsoft.com/office/powerpoint/2010/main" val="2207802164"/>
+        <p14:creationId xmlns:p14="http://schemas.microsoft.com/office/powerpoint/2010/main" val="1231678755"/>
       </p:ext>
     </p:extLst>
   </p:cSld>

</xml_diff>

<commit_message>
feat: update presentetion for report
</commit_message>
<xml_diff>
--- a/Сertification/presentation.pptx
+++ b/Сertification/presentation.pptx
@@ -219,7 +219,7 @@
           <a:p>
             <a:fld id="{76ED9429-14B3-664E-B66C-A13779F56E7D}" type="datetimeFigureOut">
               <a:rPr lang="ru-RU" smtClean="0"/>
-              <a:t>27.09.2023</a:t>
+              <a:t>28.09.2023</a:t>
             </a:fld>
             <a:endParaRPr lang="ru-RU"/>
           </a:p>
@@ -633,7 +633,7 @@
           <a:p>
             <a:fld id="{26DB3D39-9350-6749-B0D7-69548AE3DE8E}" type="datetimeFigureOut">
               <a:rPr lang="ru-RU" smtClean="0"/>
-              <a:t>27.09.2023</a:t>
+              <a:t>28.09.2023</a:t>
             </a:fld>
             <a:endParaRPr lang="ru-RU"/>
           </a:p>
@@ -831,7 +831,7 @@
           <a:p>
             <a:fld id="{26DB3D39-9350-6749-B0D7-69548AE3DE8E}" type="datetimeFigureOut">
               <a:rPr lang="ru-RU" smtClean="0"/>
-              <a:t>27.09.2023</a:t>
+              <a:t>28.09.2023</a:t>
             </a:fld>
             <a:endParaRPr lang="ru-RU"/>
           </a:p>
@@ -1039,7 +1039,7 @@
           <a:p>
             <a:fld id="{26DB3D39-9350-6749-B0D7-69548AE3DE8E}" type="datetimeFigureOut">
               <a:rPr lang="ru-RU" smtClean="0"/>
-              <a:t>27.09.2023</a:t>
+              <a:t>28.09.2023</a:t>
             </a:fld>
             <a:endParaRPr lang="ru-RU"/>
           </a:p>
@@ -1237,7 +1237,7 @@
           <a:p>
             <a:fld id="{26DB3D39-9350-6749-B0D7-69548AE3DE8E}" type="datetimeFigureOut">
               <a:rPr lang="ru-RU" smtClean="0"/>
-              <a:t>27.09.2023</a:t>
+              <a:t>28.09.2023</a:t>
             </a:fld>
             <a:endParaRPr lang="ru-RU"/>
           </a:p>
@@ -1512,7 +1512,7 @@
           <a:p>
             <a:fld id="{26DB3D39-9350-6749-B0D7-69548AE3DE8E}" type="datetimeFigureOut">
               <a:rPr lang="ru-RU" smtClean="0"/>
-              <a:t>27.09.2023</a:t>
+              <a:t>28.09.2023</a:t>
             </a:fld>
             <a:endParaRPr lang="ru-RU"/>
           </a:p>
@@ -1777,7 +1777,7 @@
           <a:p>
             <a:fld id="{26DB3D39-9350-6749-B0D7-69548AE3DE8E}" type="datetimeFigureOut">
               <a:rPr lang="ru-RU" smtClean="0"/>
-              <a:t>27.09.2023</a:t>
+              <a:t>28.09.2023</a:t>
             </a:fld>
             <a:endParaRPr lang="ru-RU"/>
           </a:p>
@@ -2189,7 +2189,7 @@
           <a:p>
             <a:fld id="{26DB3D39-9350-6749-B0D7-69548AE3DE8E}" type="datetimeFigureOut">
               <a:rPr lang="ru-RU" smtClean="0"/>
-              <a:t>27.09.2023</a:t>
+              <a:t>28.09.2023</a:t>
             </a:fld>
             <a:endParaRPr lang="ru-RU"/>
           </a:p>
@@ -2330,7 +2330,7 @@
           <a:p>
             <a:fld id="{26DB3D39-9350-6749-B0D7-69548AE3DE8E}" type="datetimeFigureOut">
               <a:rPr lang="ru-RU" smtClean="0"/>
-              <a:t>27.09.2023</a:t>
+              <a:t>28.09.2023</a:t>
             </a:fld>
             <a:endParaRPr lang="ru-RU"/>
           </a:p>
@@ -2443,7 +2443,7 @@
           <a:p>
             <a:fld id="{26DB3D39-9350-6749-B0D7-69548AE3DE8E}" type="datetimeFigureOut">
               <a:rPr lang="ru-RU" smtClean="0"/>
-              <a:t>27.09.2023</a:t>
+              <a:t>28.09.2023</a:t>
             </a:fld>
             <a:endParaRPr lang="ru-RU"/>
           </a:p>
@@ -2754,7 +2754,7 @@
           <a:p>
             <a:fld id="{26DB3D39-9350-6749-B0D7-69548AE3DE8E}" type="datetimeFigureOut">
               <a:rPr lang="ru-RU" smtClean="0"/>
-              <a:t>27.09.2023</a:t>
+              <a:t>28.09.2023</a:t>
             </a:fld>
             <a:endParaRPr lang="ru-RU"/>
           </a:p>
@@ -3042,7 +3042,7 @@
           <a:p>
             <a:fld id="{26DB3D39-9350-6749-B0D7-69548AE3DE8E}" type="datetimeFigureOut">
               <a:rPr lang="ru-RU" smtClean="0"/>
-              <a:t>27.09.2023</a:t>
+              <a:t>28.09.2023</a:t>
             </a:fld>
             <a:endParaRPr lang="ru-RU"/>
           </a:p>
@@ -3286,7 +3286,7 @@
           <a:p>
             <a:fld id="{26DB3D39-9350-6749-B0D7-69548AE3DE8E}" type="datetimeFigureOut">
               <a:rPr lang="ru-RU" smtClean="0"/>
-              <a:t>27.09.2023</a:t>
+              <a:t>28.09.2023</a:t>
             </a:fld>
             <a:endParaRPr lang="ru-RU"/>
           </a:p>
@@ -4047,8 +4047,8 @@
         </p:nvSpPr>
         <p:spPr>
           <a:xfrm>
-            <a:off x="107458" y="1512731"/>
-            <a:ext cx="11491820" cy="769441"/>
+            <a:off x="107458" y="1301711"/>
+            <a:ext cx="11491820" cy="1923604"/>
           </a:xfrm>
           <a:prstGeom prst="rect">
             <a:avLst/>
@@ -4085,40 +4085,69 @@
               </a:lnSpc>
             </a:pPr>
             <a:r>
-              <a:rPr lang="ru-RU" dirty="0">
-                <a:latin typeface="Arial" panose="020B0604020202020204" pitchFamily="34" charset="0"/>
-                <a:cs typeface="Arial" panose="020B0604020202020204" pitchFamily="34" charset="0"/>
-              </a:rPr>
-              <a:t>Создание потребителя на Python для RT.Streaming, который будет читать данные и сохранять их в HDFS </a:t>
-            </a:r>
-            <a:r>
-              <a:rPr lang="ru-RU" dirty="0" smtClean="0">
-                <a:latin typeface="Arial" panose="020B0604020202020204" pitchFamily="34" charset="0"/>
-                <a:cs typeface="Arial" panose="020B0604020202020204" pitchFamily="34" charset="0"/>
-              </a:rPr>
-              <a:t>в </a:t>
-            </a:r>
-            <a:r>
-              <a:rPr lang="ru-RU" dirty="0">
-                <a:latin typeface="Arial" panose="020B0604020202020204" pitchFamily="34" charset="0"/>
-                <a:cs typeface="Arial" panose="020B0604020202020204" pitchFamily="34" charset="0"/>
-              </a:rPr>
-              <a:t>формате </a:t>
-            </a:r>
-            <a:r>
-              <a:rPr lang="en-US" dirty="0">
-                <a:latin typeface="Arial" panose="020B0604020202020204" pitchFamily="34" charset="0"/>
-                <a:cs typeface="Arial" panose="020B0604020202020204" pitchFamily="34" charset="0"/>
-              </a:rPr>
+              <a:rPr lang="ru-RU" sz="2400" dirty="0" smtClean="0"/>
+              <a:t>Хранение </a:t>
+            </a:r>
+            <a:r>
+              <a:rPr lang="ru-RU" sz="2400" dirty="0"/>
+              <a:t>собранных данных </a:t>
+            </a:r>
+            <a:r>
+              <a:rPr lang="ru-RU" sz="2400" dirty="0" smtClean="0"/>
+              <a:t>реализовано в </a:t>
+            </a:r>
+            <a:r>
+              <a:rPr lang="ru-RU" sz="2400" dirty="0"/>
+              <a:t>распределенной файловой системе </a:t>
+            </a:r>
+            <a:r>
+              <a:rPr lang="en-US" sz="2400" dirty="0"/>
+              <a:t>HDFS</a:t>
+            </a:r>
+            <a:r>
+              <a:rPr lang="ru-RU" sz="2400" dirty="0"/>
+              <a:t>, являющейся элементом корпоративного хранилища данных </a:t>
+            </a:r>
+            <a:r>
+              <a:rPr lang="en-US" sz="2400" dirty="0"/>
+              <a:t>RT</a:t>
+            </a:r>
+            <a:r>
+              <a:rPr lang="ru-RU" sz="2400" dirty="0"/>
+              <a:t>.</a:t>
+            </a:r>
+            <a:r>
+              <a:rPr lang="en-US" sz="2400" dirty="0" err="1" smtClean="0"/>
+              <a:t>DataLake</a:t>
+            </a:r>
+            <a:r>
+              <a:rPr lang="ru-RU" sz="2400" dirty="0" smtClean="0"/>
+              <a:t>. Хранение </a:t>
+            </a:r>
+            <a:r>
+              <a:rPr lang="ru-RU" sz="2400" dirty="0"/>
+              <a:t>осуществляется с помощью потребителя на Python, который читает данные с </a:t>
+            </a:r>
+            <a:r>
+              <a:rPr lang="en-US" sz="2400" dirty="0"/>
+              <a:t>Kafka </a:t>
+            </a:r>
+            <a:r>
+              <a:rPr lang="ru-RU" sz="2400" dirty="0"/>
+              <a:t>и сохраняет их в HDFS в формате </a:t>
+            </a:r>
+            <a:r>
+              <a:rPr lang="en-US" sz="2400" dirty="0" smtClean="0"/>
               <a:t>CSV</a:t>
             </a:r>
             <a:r>
-              <a:rPr lang="ru-RU" dirty="0">
-                <a:latin typeface="Arial" panose="020B0604020202020204" pitchFamily="34" charset="0"/>
-                <a:cs typeface="Arial" panose="020B0604020202020204" pitchFamily="34" charset="0"/>
-              </a:rPr>
+              <a:rPr lang="ru-RU" sz="2400" dirty="0" smtClean="0"/>
               <a:t>.</a:t>
             </a:r>
+            <a:endParaRPr lang="ru-RU" sz="2400" dirty="0">
+              <a:latin typeface="Arial" panose="020B0604020202020204" pitchFamily="34" charset="0"/>
+              <a:cs typeface="Arial" panose="020B0604020202020204" pitchFamily="34" charset="0"/>
+            </a:endParaRPr>
           </a:p>
         </p:txBody>
       </p:sp>
@@ -4231,7 +4260,7 @@
       </p:pic>
       <p:pic>
         <p:nvPicPr>
-          <p:cNvPr id="3" name="Рисунок 2"/>
+          <p:cNvPr id="2" name="Рисунок 1"/>
           <p:cNvPicPr>
             <a:picLocks noChangeAspect="1"/>
           </p:cNvPicPr>
@@ -4245,8 +4274,8 @@
         </p:blipFill>
         <p:spPr>
           <a:xfrm>
-            <a:off x="515939" y="2662928"/>
-            <a:ext cx="11021963" cy="3734321"/>
+            <a:off x="597903" y="3453527"/>
+            <a:ext cx="11001375" cy="2705100"/>
           </a:xfrm>
           <a:prstGeom prst="rect">
             <a:avLst/>
@@ -4744,7 +4773,7 @@
       </p:pic>
       <p:pic>
         <p:nvPicPr>
-          <p:cNvPr id="10" name="Рисунок 9"/>
+          <p:cNvPr id="13" name="Рисунок 12"/>
           <p:cNvPicPr>
             <a:picLocks noChangeAspect="1"/>
           </p:cNvPicPr>
@@ -4758,70 +4787,17 @@
         </p:blipFill>
         <p:spPr>
           <a:xfrm>
-            <a:off x="439151" y="2252527"/>
-            <a:ext cx="8783276" cy="2505425"/>
+            <a:off x="2322998" y="5022167"/>
+            <a:ext cx="7392432" cy="1276528"/>
           </a:xfrm>
           <a:prstGeom prst="rect">
             <a:avLst/>
           </a:prstGeom>
         </p:spPr>
       </p:pic>
-      <p:sp>
-        <p:nvSpPr>
-          <p:cNvPr id="12" name="Прямоугольник 11"/>
-          <p:cNvSpPr/>
-          <p:nvPr/>
-        </p:nvSpPr>
-        <p:spPr>
-          <a:xfrm>
-            <a:off x="350444" y="1783244"/>
-            <a:ext cx="3621761" cy="369332"/>
-          </a:xfrm>
-          <a:prstGeom prst="rect">
-            <a:avLst/>
-          </a:prstGeom>
-        </p:spPr>
-        <p:txBody>
-          <a:bodyPr wrap="none">
-            <a:spAutoFit/>
-          </a:bodyPr>
-          <a:lstStyle/>
-          <a:p>
-            <a:r>
-              <a:rPr lang="ru-RU" dirty="0" smtClean="0">
-                <a:latin typeface="Arial" panose="020B0604020202020204" pitchFamily="34" charset="0"/>
-                <a:cs typeface="Arial" panose="020B0604020202020204" pitchFamily="34" charset="0"/>
-              </a:rPr>
-              <a:t>Создаем таблицы </a:t>
-            </a:r>
-            <a:r>
-              <a:rPr lang="ru-RU" dirty="0">
-                <a:latin typeface="Arial" panose="020B0604020202020204" pitchFamily="34" charset="0"/>
-                <a:cs typeface="Arial" panose="020B0604020202020204" pitchFamily="34" charset="0"/>
-              </a:rPr>
-              <a:t>Hive </a:t>
-            </a:r>
-            <a:r>
-              <a:rPr lang="ru-RU" dirty="0" smtClean="0">
-                <a:latin typeface="Arial" panose="020B0604020202020204" pitchFamily="34" charset="0"/>
-                <a:cs typeface="Arial" panose="020B0604020202020204" pitchFamily="34" charset="0"/>
-              </a:rPr>
-              <a:t>из </a:t>
-            </a:r>
-            <a:r>
-              <a:rPr lang="ru-RU" dirty="0">
-                <a:latin typeface="Arial" panose="020B0604020202020204" pitchFamily="34" charset="0"/>
-                <a:cs typeface="Arial" panose="020B0604020202020204" pitchFamily="34" charset="0"/>
-              </a:rPr>
-              <a:t>HDFS</a:t>
-            </a:r>
-            <a:endParaRPr lang="ru-RU" dirty="0"/>
-          </a:p>
-        </p:txBody>
-      </p:sp>
       <p:pic>
         <p:nvPicPr>
-          <p:cNvPr id="13" name="Рисунок 12"/>
+          <p:cNvPr id="2" name="Рисунок 1"/>
           <p:cNvPicPr>
             <a:picLocks noChangeAspect="1"/>
           </p:cNvPicPr>
@@ -4835,14 +4811,91 @@
         </p:blipFill>
         <p:spPr>
           <a:xfrm>
-            <a:off x="2322998" y="5022167"/>
-            <a:ext cx="7392432" cy="1276528"/>
+            <a:off x="436048" y="1671382"/>
+            <a:ext cx="4959124" cy="2970956"/>
           </a:xfrm>
           <a:prstGeom prst="rect">
             <a:avLst/>
           </a:prstGeom>
         </p:spPr>
       </p:pic>
+      <p:sp>
+        <p:nvSpPr>
+          <p:cNvPr id="9" name="Объект 2"/>
+          <p:cNvSpPr>
+            <a:spLocks noGrp="1"/>
+          </p:cNvSpPr>
+          <p:nvPr>
+            <p:ph sz="half" idx="1"/>
+          </p:nvPr>
+        </p:nvSpPr>
+        <p:spPr>
+          <a:xfrm>
+            <a:off x="5880295" y="1459735"/>
+            <a:ext cx="5718983" cy="3378177"/>
+          </a:xfrm>
+        </p:spPr>
+        <p:txBody>
+          <a:bodyPr>
+            <a:noAutofit/>
+          </a:bodyPr>
+          <a:lstStyle/>
+          <a:p>
+            <a:pPr marL="0" indent="0" algn="just">
+              <a:buNone/>
+            </a:pPr>
+            <a:r>
+              <a:rPr lang="ru-RU" dirty="0" smtClean="0"/>
+              <a:t>Обработка </a:t>
+            </a:r>
+            <a:r>
+              <a:rPr lang="ru-RU" dirty="0"/>
+              <a:t>и агрегации данных </a:t>
+            </a:r>
+            <a:r>
+              <a:rPr lang="ru-RU" dirty="0" smtClean="0"/>
+              <a:t>реализована с </a:t>
+            </a:r>
+            <a:r>
+              <a:rPr lang="ru-RU" dirty="0"/>
+              <a:t>использованием СУБД Apache Hive, являющейся компонентом корпоративного хранилища данных </a:t>
+            </a:r>
+            <a:r>
+              <a:rPr lang="en-US" dirty="0"/>
+              <a:t>RT</a:t>
+            </a:r>
+            <a:r>
+              <a:rPr lang="ru-RU" dirty="0"/>
+              <a:t>.</a:t>
+            </a:r>
+            <a:r>
+              <a:rPr lang="en-US" dirty="0" err="1"/>
+              <a:t>DataLake</a:t>
+            </a:r>
+            <a:r>
+              <a:rPr lang="ru-RU" dirty="0" smtClean="0"/>
+              <a:t>. При это расположенные на </a:t>
+            </a:r>
+            <a:r>
+              <a:rPr lang="en-US" dirty="0" smtClean="0"/>
+              <a:t>HDFS </a:t>
+            </a:r>
+            <a:r>
+              <a:rPr lang="ru-RU" dirty="0" smtClean="0"/>
+              <a:t>сырые данные загружаются и преобразовываются в таблицы </a:t>
+            </a:r>
+            <a:r>
+              <a:rPr lang="en-US" dirty="0" smtClean="0"/>
+              <a:t>Hive</a:t>
+            </a:r>
+            <a:r>
+              <a:rPr lang="ru-RU" dirty="0" smtClean="0"/>
+              <a:t>.</a:t>
+            </a:r>
+            <a:endParaRPr lang="ru-RU" dirty="0"/>
+          </a:p>
+        </p:txBody>
+      </p:sp>
     </p:spTree>
     <p:extLst>
       <p:ext uri="{BB962C8B-B14F-4D97-AF65-F5344CB8AC3E}">
@@ -5658,8 +5711,8 @@
         </p:nvSpPr>
         <p:spPr>
           <a:xfrm>
-            <a:off x="1527644" y="1212575"/>
-            <a:ext cx="5585132" cy="384721"/>
+            <a:off x="515939" y="1212575"/>
+            <a:ext cx="8276369" cy="3050450"/>
           </a:xfrm>
           <a:prstGeom prst="rect">
             <a:avLst/>
@@ -5696,34 +5749,90 @@
               </a:lnSpc>
             </a:pPr>
             <a:r>
-              <a:rPr lang="ru-RU" sz="2000" dirty="0" smtClean="0">
-                <a:latin typeface="Arial" panose="020B0604020202020204" pitchFamily="34" charset="0"/>
-                <a:cs typeface="Arial" panose="020B0604020202020204" pitchFamily="34" charset="0"/>
-              </a:rPr>
-              <a:t>Переносим обработанные из </a:t>
-            </a:r>
-            <a:r>
-              <a:rPr lang="en-US" sz="2000" dirty="0" smtClean="0">
-                <a:latin typeface="Arial" panose="020B0604020202020204" pitchFamily="34" charset="0"/>
-                <a:cs typeface="Arial" panose="020B0604020202020204" pitchFamily="34" charset="0"/>
-              </a:rPr>
-              <a:t>Hive</a:t>
-            </a:r>
-            <a:r>
-              <a:rPr lang="ru-RU" sz="2000" dirty="0" smtClean="0">
-                <a:latin typeface="Arial" panose="020B0604020202020204" pitchFamily="34" charset="0"/>
-                <a:cs typeface="Arial" panose="020B0604020202020204" pitchFamily="34" charset="0"/>
-              </a:rPr>
-              <a:t> в </a:t>
-            </a:r>
-            <a:r>
-              <a:rPr lang="en-US" sz="2000" dirty="0" smtClean="0">
-                <a:latin typeface="Arial" panose="020B0604020202020204" pitchFamily="34" charset="0"/>
-                <a:cs typeface="Arial" panose="020B0604020202020204" pitchFamily="34" charset="0"/>
-              </a:rPr>
+              <a:rPr lang="ru-RU" sz="2400" dirty="0"/>
+              <a:t>П</a:t>
+            </a:r>
+            <a:r>
+              <a:rPr lang="ru-RU" sz="2400" dirty="0" smtClean="0"/>
+              <a:t>ереноса </a:t>
+            </a:r>
+            <a:r>
+              <a:rPr lang="ru-RU" sz="2400" dirty="0"/>
+              <a:t>обработанных данных из </a:t>
+            </a:r>
+            <a:r>
+              <a:rPr lang="en-US" sz="2400" dirty="0"/>
+              <a:t>Hive </a:t>
+            </a:r>
+            <a:r>
+              <a:rPr lang="ru-RU" sz="2400" dirty="0"/>
+              <a:t>в массивно-параллельную СУБД </a:t>
+            </a:r>
+            <a:r>
+              <a:rPr lang="en-US" sz="2400" dirty="0"/>
               <a:t>GreenPlum</a:t>
             </a:r>
-            <a:endParaRPr lang="ru-RU" sz="2000" dirty="0">
+            <a:r>
+              <a:rPr lang="ru-RU" sz="2400" dirty="0"/>
+              <a:t> (компонент </a:t>
+            </a:r>
+            <a:r>
+              <a:rPr lang="en-US" sz="2400" dirty="0"/>
+              <a:t>RT</a:t>
+            </a:r>
+            <a:r>
+              <a:rPr lang="ru-RU" sz="2400" dirty="0"/>
+              <a:t>.</a:t>
+            </a:r>
+            <a:r>
+              <a:rPr lang="en-US" sz="2400" dirty="0"/>
+              <a:t>Warehouse</a:t>
+            </a:r>
+            <a:r>
+              <a:rPr lang="ru-RU" sz="2400" dirty="0"/>
+              <a:t>) </a:t>
+            </a:r>
+            <a:r>
+              <a:rPr lang="ru-RU" sz="2400" dirty="0" smtClean="0"/>
+              <a:t> реализован при </a:t>
+            </a:r>
+            <a:r>
+              <a:rPr lang="ru-RU" sz="2400" dirty="0"/>
+              <a:t>помощи </a:t>
+            </a:r>
+            <a:r>
+              <a:rPr lang="en-US" sz="2400" dirty="0"/>
+              <a:t>ETL</a:t>
+            </a:r>
+            <a:r>
+              <a:rPr lang="ru-RU" sz="2400" dirty="0"/>
+              <a:t> процесса – ориентированного ациклического графа </a:t>
+            </a:r>
+            <a:r>
+              <a:rPr lang="en-US" sz="2400" dirty="0"/>
+              <a:t>Airflow </a:t>
+            </a:r>
+            <a:r>
+              <a:rPr lang="en-US" sz="2400" dirty="0" smtClean="0"/>
+              <a:t>DAG</a:t>
+            </a:r>
+            <a:r>
+              <a:rPr lang="ru-RU" sz="2400" dirty="0" smtClean="0"/>
+              <a:t>. В </a:t>
+            </a:r>
+            <a:r>
+              <a:rPr lang="en-US" sz="2400" dirty="0" err="1" smtClean="0"/>
+              <a:t>Greenplum</a:t>
+            </a:r>
+            <a:r>
+              <a:rPr lang="en-US" sz="2400" dirty="0" smtClean="0"/>
+              <a:t> SQL</a:t>
+            </a:r>
+            <a:r>
+              <a:rPr lang="ru-RU" sz="2400" dirty="0" smtClean="0"/>
+              <a:t>-диалект свежее и можно построить более сложный запрос – например распределение количества просмотров в разрезе каждого часа.</a:t>
+            </a:r>
+            <a:endParaRPr lang="ru-RU" sz="2400" dirty="0">
               <a:latin typeface="Arial" panose="020B0604020202020204" pitchFamily="34" charset="0"/>
               <a:cs typeface="Arial" panose="020B0604020202020204" pitchFamily="34" charset="0"/>
             </a:endParaRPr>
@@ -5732,7 +5841,7 @@
       </p:sp>
       <p:pic>
         <p:nvPicPr>
-          <p:cNvPr id="5" name="Рисунок 4"/>
+          <p:cNvPr id="9" name="Рисунок 8"/>
           <p:cNvPicPr>
             <a:picLocks noChangeAspect="1"/>
           </p:cNvPicPr>
@@ -5746,8 +5855,8 @@
         </p:blipFill>
         <p:spPr>
           <a:xfrm>
-            <a:off x="501903" y="1961295"/>
-            <a:ext cx="4429743" cy="4467849"/>
+            <a:off x="9293906" y="1404936"/>
+            <a:ext cx="2305372" cy="4677428"/>
           </a:xfrm>
           <a:prstGeom prst="rect">
             <a:avLst/>
@@ -5756,7 +5865,7 @@
       </p:pic>
       <p:pic>
         <p:nvPicPr>
-          <p:cNvPr id="9" name="Рисунок 8"/>
+          <p:cNvPr id="12" name="Рисунок 11"/>
           <p:cNvPicPr>
             <a:picLocks noChangeAspect="1"/>
           </p:cNvPicPr>
@@ -5770,8 +5879,8 @@
         </p:blipFill>
         <p:spPr>
           <a:xfrm>
-            <a:off x="9293906" y="1404936"/>
-            <a:ext cx="2305372" cy="4677428"/>
+            <a:off x="5326589" y="4330721"/>
+            <a:ext cx="3572374" cy="1781424"/>
           </a:xfrm>
           <a:prstGeom prst="rect">
             <a:avLst/>
@@ -5780,7 +5889,7 @@
       </p:pic>
       <p:pic>
         <p:nvPicPr>
-          <p:cNvPr id="12" name="Рисунок 11"/>
+          <p:cNvPr id="3" name="Рисунок 2"/>
           <p:cNvPicPr>
             <a:picLocks noChangeAspect="1"/>
           </p:cNvPicPr>
@@ -5794,8 +5903,8 @@
         </p:blipFill>
         <p:spPr>
           <a:xfrm>
-            <a:off x="5326589" y="3210641"/>
-            <a:ext cx="3572374" cy="1781424"/>
+            <a:off x="515939" y="4330721"/>
+            <a:ext cx="4419600" cy="2162175"/>
           </a:xfrm>
           <a:prstGeom prst="rect">
             <a:avLst/>
@@ -10072,34 +10181,621 @@
       </p:pic>
       <p:pic>
         <p:nvPicPr>
-          <p:cNvPr id="2" name="Рисунок 1"/>
+          <p:cNvPr id="3" name="Рисунок 2"/>
           <p:cNvPicPr>
             <a:picLocks noChangeAspect="1"/>
           </p:cNvPicPr>
           <p:nvPr/>
         </p:nvPicPr>
         <p:blipFill>
-          <a:blip r:embed="rId3">
-            <a:extLst>
-              <a:ext uri="{28A0092B-C50C-407E-A947-70E740481C1C}">
-                <a14:useLocalDpi xmlns:a14="http://schemas.microsoft.com/office/drawing/2010/main" val="0"/>
-              </a:ext>
-            </a:extLst>
-          </a:blip>
+          <a:blip r:embed="rId3"/>
           <a:stretch>
             <a:fillRect/>
           </a:stretch>
         </p:blipFill>
         <p:spPr>
           <a:xfrm>
-            <a:off x="1887539" y="1311512"/>
-            <a:ext cx="9025623" cy="5081772"/>
+            <a:off x="515940" y="1406769"/>
+            <a:ext cx="3624230" cy="2686929"/>
           </a:xfrm>
           <a:prstGeom prst="rect">
             <a:avLst/>
           </a:prstGeom>
         </p:spPr>
       </p:pic>
+      <p:sp>
+        <p:nvSpPr>
+          <p:cNvPr id="8" name="Объект 2"/>
+          <p:cNvSpPr txBox="1">
+            <a:spLocks/>
+          </p:cNvSpPr>
+          <p:nvPr/>
+        </p:nvSpPr>
+        <p:spPr>
+          <a:xfrm>
+            <a:off x="4262512" y="1203059"/>
+            <a:ext cx="7456778" cy="3376247"/>
+          </a:xfrm>
+          <a:prstGeom prst="rect">
+            <a:avLst/>
+          </a:prstGeom>
+        </p:spPr>
+        <p:txBody>
+          <a:bodyPr>
+            <a:normAutofit/>
+          </a:bodyPr>
+          <a:lstStyle>
+            <a:lvl1pPr marL="228600" indent="-228600" algn="l" defTabSz="914400" rtl="0" eaLnBrk="1" latinLnBrk="0" hangingPunct="1">
+              <a:lnSpc>
+                <a:spcPct val="90000"/>
+              </a:lnSpc>
+              <a:spcBef>
+                <a:spcPts val="1000"/>
+              </a:spcBef>
+              <a:buFont typeface="Arial" panose="020B0604020202020204" pitchFamily="34" charset="0"/>
+              <a:buChar char="•"/>
+              <a:defRPr sz="2800" kern="1200">
+                <a:solidFill>
+                  <a:schemeClr val="tx1"/>
+                </a:solidFill>
+                <a:latin typeface="+mn-lt"/>
+                <a:ea typeface="+mn-ea"/>
+                <a:cs typeface="+mn-cs"/>
+              </a:defRPr>
+            </a:lvl1pPr>
+            <a:lvl2pPr marL="685800" indent="-228600" algn="l" defTabSz="914400" rtl="0" eaLnBrk="1" latinLnBrk="0" hangingPunct="1">
+              <a:lnSpc>
+                <a:spcPct val="90000"/>
+              </a:lnSpc>
+              <a:spcBef>
+                <a:spcPts val="500"/>
+              </a:spcBef>
+              <a:buFont typeface="Arial" panose="020B0604020202020204" pitchFamily="34" charset="0"/>
+              <a:buChar char="•"/>
+              <a:defRPr sz="2400" kern="1200">
+                <a:solidFill>
+                  <a:schemeClr val="tx1"/>
+                </a:solidFill>
+                <a:latin typeface="+mn-lt"/>
+                <a:ea typeface="+mn-ea"/>
+                <a:cs typeface="+mn-cs"/>
+              </a:defRPr>
+            </a:lvl2pPr>
+            <a:lvl3pPr marL="1143000" indent="-228600" algn="l" defTabSz="914400" rtl="0" eaLnBrk="1" latinLnBrk="0" hangingPunct="1">
+              <a:lnSpc>
+                <a:spcPct val="90000"/>
+              </a:lnSpc>
+              <a:spcBef>
+                <a:spcPts val="500"/>
+              </a:spcBef>
+              <a:buFont typeface="Arial" panose="020B0604020202020204" pitchFamily="34" charset="0"/>
+              <a:buChar char="•"/>
+              <a:defRPr sz="2000" kern="1200">
+                <a:solidFill>
+                  <a:schemeClr val="tx1"/>
+                </a:solidFill>
+                <a:latin typeface="+mn-lt"/>
+                <a:ea typeface="+mn-ea"/>
+                <a:cs typeface="+mn-cs"/>
+              </a:defRPr>
+            </a:lvl3pPr>
+            <a:lvl4pPr marL="1600200" indent="-228600" algn="l" defTabSz="914400" rtl="0" eaLnBrk="1" latinLnBrk="0" hangingPunct="1">
+              <a:lnSpc>
+                <a:spcPct val="90000"/>
+              </a:lnSpc>
+              <a:spcBef>
+                <a:spcPts val="500"/>
+              </a:spcBef>
+              <a:buFont typeface="Arial" panose="020B0604020202020204" pitchFamily="34" charset="0"/>
+              <a:buChar char="•"/>
+              <a:defRPr sz="1800" kern="1200">
+                <a:solidFill>
+                  <a:schemeClr val="tx1"/>
+                </a:solidFill>
+                <a:latin typeface="+mn-lt"/>
+                <a:ea typeface="+mn-ea"/>
+                <a:cs typeface="+mn-cs"/>
+              </a:defRPr>
+            </a:lvl4pPr>
+            <a:lvl5pPr marL="2057400" indent="-228600" algn="l" defTabSz="914400" rtl="0" eaLnBrk="1" latinLnBrk="0" hangingPunct="1">
+              <a:lnSpc>
+                <a:spcPct val="90000"/>
+              </a:lnSpc>
+              <a:spcBef>
+                <a:spcPts val="500"/>
+              </a:spcBef>
+              <a:buFont typeface="Arial" panose="020B0604020202020204" pitchFamily="34" charset="0"/>
+              <a:buChar char="•"/>
+              <a:defRPr sz="1800" kern="1200">
+                <a:solidFill>
+                  <a:schemeClr val="tx1"/>
+                </a:solidFill>
+                <a:latin typeface="+mn-lt"/>
+                <a:ea typeface="+mn-ea"/>
+                <a:cs typeface="+mn-cs"/>
+              </a:defRPr>
+            </a:lvl5pPr>
+            <a:lvl6pPr marL="2514600" indent="-228600" algn="l" defTabSz="914400" rtl="0" eaLnBrk="1" latinLnBrk="0" hangingPunct="1">
+              <a:lnSpc>
+                <a:spcPct val="90000"/>
+              </a:lnSpc>
+              <a:spcBef>
+                <a:spcPts val="500"/>
+              </a:spcBef>
+              <a:buFont typeface="Arial" panose="020B0604020202020204" pitchFamily="34" charset="0"/>
+              <a:buChar char="•"/>
+              <a:defRPr sz="1800" kern="1200">
+                <a:solidFill>
+                  <a:schemeClr val="tx1"/>
+                </a:solidFill>
+                <a:latin typeface="+mn-lt"/>
+                <a:ea typeface="+mn-ea"/>
+                <a:cs typeface="+mn-cs"/>
+              </a:defRPr>
+            </a:lvl6pPr>
+            <a:lvl7pPr marL="2971800" indent="-228600" algn="l" defTabSz="914400" rtl="0" eaLnBrk="1" latinLnBrk="0" hangingPunct="1">
+              <a:lnSpc>
+                <a:spcPct val="90000"/>
+              </a:lnSpc>
+              <a:spcBef>
+                <a:spcPts val="500"/>
+              </a:spcBef>
+              <a:buFont typeface="Arial" panose="020B0604020202020204" pitchFamily="34" charset="0"/>
+              <a:buChar char="•"/>
+              <a:defRPr sz="1800" kern="1200">
+                <a:solidFill>
+                  <a:schemeClr val="tx1"/>
+                </a:solidFill>
+                <a:latin typeface="+mn-lt"/>
+                <a:ea typeface="+mn-ea"/>
+                <a:cs typeface="+mn-cs"/>
+              </a:defRPr>
+            </a:lvl7pPr>
+            <a:lvl8pPr marL="3429000" indent="-228600" algn="l" defTabSz="914400" rtl="0" eaLnBrk="1" latinLnBrk="0" hangingPunct="1">
+              <a:lnSpc>
+                <a:spcPct val="90000"/>
+              </a:lnSpc>
+              <a:spcBef>
+                <a:spcPts val="500"/>
+              </a:spcBef>
+              <a:buFont typeface="Arial" panose="020B0604020202020204" pitchFamily="34" charset="0"/>
+              <a:buChar char="•"/>
+              <a:defRPr sz="1800" kern="1200">
+                <a:solidFill>
+                  <a:schemeClr val="tx1"/>
+                </a:solidFill>
+                <a:latin typeface="+mn-lt"/>
+                <a:ea typeface="+mn-ea"/>
+                <a:cs typeface="+mn-cs"/>
+              </a:defRPr>
+            </a:lvl8pPr>
+            <a:lvl9pPr marL="3886200" indent="-228600" algn="l" defTabSz="914400" rtl="0" eaLnBrk="1" latinLnBrk="0" hangingPunct="1">
+              <a:lnSpc>
+                <a:spcPct val="90000"/>
+              </a:lnSpc>
+              <a:spcBef>
+                <a:spcPts val="500"/>
+              </a:spcBef>
+              <a:buFont typeface="Arial" panose="020B0604020202020204" pitchFamily="34" charset="0"/>
+              <a:buChar char="•"/>
+              <a:defRPr sz="1800" kern="1200">
+                <a:solidFill>
+                  <a:schemeClr val="tx1"/>
+                </a:solidFill>
+                <a:latin typeface="+mn-lt"/>
+                <a:ea typeface="+mn-ea"/>
+                <a:cs typeface="+mn-cs"/>
+              </a:defRPr>
+            </a:lvl9pPr>
+          </a:lstStyle>
+          <a:p>
+            <a:pPr lvl="0">
+              <a:spcBef>
+                <a:spcPts val="600"/>
+              </a:spcBef>
+            </a:pPr>
+            <a:r>
+              <a:rPr lang="ru-RU" sz="2400" dirty="0"/>
+              <a:t>сбор данных с использованием распределенного программного брокера сообщений </a:t>
+            </a:r>
+            <a:r>
+              <a:rPr lang="en-US" sz="2400" dirty="0"/>
+              <a:t>Apache Kafka</a:t>
+            </a:r>
+            <a:r>
+              <a:rPr lang="ru-RU" sz="2400" dirty="0"/>
+              <a:t>, являющегося компонентом продукта </a:t>
+            </a:r>
+            <a:r>
+              <a:rPr lang="en-US" sz="2400" dirty="0"/>
+              <a:t>RT</a:t>
+            </a:r>
+            <a:r>
+              <a:rPr lang="ru-RU" sz="2400" dirty="0"/>
+              <a:t>.</a:t>
+            </a:r>
+            <a:r>
+              <a:rPr lang="en-US" sz="2400" dirty="0"/>
+              <a:t>Streaming</a:t>
+            </a:r>
+            <a:r>
+              <a:rPr lang="ru-RU" sz="2400" dirty="0"/>
+              <a:t>;</a:t>
+            </a:r>
+          </a:p>
+          <a:p>
+            <a:pPr lvl="0">
+              <a:spcBef>
+                <a:spcPts val="600"/>
+              </a:spcBef>
+            </a:pPr>
+            <a:r>
+              <a:rPr lang="ru-RU" sz="2400" dirty="0"/>
+              <a:t>хранение собранных данных в распределенной файловой системе </a:t>
+            </a:r>
+            <a:r>
+              <a:rPr lang="en-US" sz="2400" dirty="0"/>
+              <a:t>HDFS</a:t>
+            </a:r>
+            <a:r>
+              <a:rPr lang="ru-RU" sz="2400" dirty="0"/>
+              <a:t>, являющейся элементом корпоративного хранилища данных </a:t>
+            </a:r>
+            <a:r>
+              <a:rPr lang="en-US" sz="2400" dirty="0"/>
+              <a:t>RT</a:t>
+            </a:r>
+            <a:r>
+              <a:rPr lang="ru-RU" sz="2400" dirty="0"/>
+              <a:t>.</a:t>
+            </a:r>
+            <a:r>
+              <a:rPr lang="en-US" sz="2400" dirty="0" err="1"/>
+              <a:t>DataLake</a:t>
+            </a:r>
+            <a:r>
+              <a:rPr lang="ru-RU" sz="2400" dirty="0"/>
+              <a:t>;</a:t>
+            </a:r>
+          </a:p>
+          <a:p>
+            <a:pPr lvl="0">
+              <a:spcBef>
+                <a:spcPts val="600"/>
+              </a:spcBef>
+            </a:pPr>
+            <a:r>
+              <a:rPr lang="ru-RU" sz="2400" dirty="0"/>
+              <a:t>обработка и агрегация данных с использованием СУБД Apache Hive, так же являющейся компонентом корпоративного хранилища данных </a:t>
+            </a:r>
+            <a:r>
+              <a:rPr lang="en-US" sz="2400" dirty="0"/>
+              <a:t>RT</a:t>
+            </a:r>
+            <a:r>
+              <a:rPr lang="ru-RU" sz="2400" dirty="0"/>
+              <a:t>.</a:t>
+            </a:r>
+            <a:r>
+              <a:rPr lang="en-US" sz="2400" dirty="0" err="1"/>
+              <a:t>DataLake</a:t>
+            </a:r>
+            <a:r>
+              <a:rPr lang="ru-RU" sz="2400" dirty="0" smtClean="0"/>
+              <a:t>;</a:t>
+            </a:r>
+            <a:endParaRPr lang="ru-RU" sz="2400" dirty="0"/>
+          </a:p>
+        </p:txBody>
+      </p:sp>
+      <p:sp>
+        <p:nvSpPr>
+          <p:cNvPr id="9" name="Объект 2"/>
+          <p:cNvSpPr txBox="1">
+            <a:spLocks/>
+          </p:cNvSpPr>
+          <p:nvPr/>
+        </p:nvSpPr>
+        <p:spPr>
+          <a:xfrm>
+            <a:off x="534123" y="4458910"/>
+            <a:ext cx="11065155" cy="2383928"/>
+          </a:xfrm>
+          <a:prstGeom prst="rect">
+            <a:avLst/>
+          </a:prstGeom>
+        </p:spPr>
+        <p:txBody>
+          <a:bodyPr>
+            <a:normAutofit/>
+          </a:bodyPr>
+          <a:lstStyle>
+            <a:lvl1pPr marL="228600" indent="-228600" algn="l" defTabSz="914400" rtl="0" eaLnBrk="1" latinLnBrk="0" hangingPunct="1">
+              <a:lnSpc>
+                <a:spcPct val="90000"/>
+              </a:lnSpc>
+              <a:spcBef>
+                <a:spcPts val="1000"/>
+              </a:spcBef>
+              <a:buFont typeface="Arial" panose="020B0604020202020204" pitchFamily="34" charset="0"/>
+              <a:buChar char="•"/>
+              <a:defRPr sz="2800" kern="1200">
+                <a:solidFill>
+                  <a:schemeClr val="tx1"/>
+                </a:solidFill>
+                <a:latin typeface="+mn-lt"/>
+                <a:ea typeface="+mn-ea"/>
+                <a:cs typeface="+mn-cs"/>
+              </a:defRPr>
+            </a:lvl1pPr>
+            <a:lvl2pPr marL="685800" indent="-228600" algn="l" defTabSz="914400" rtl="0" eaLnBrk="1" latinLnBrk="0" hangingPunct="1">
+              <a:lnSpc>
+                <a:spcPct val="90000"/>
+              </a:lnSpc>
+              <a:spcBef>
+                <a:spcPts val="500"/>
+              </a:spcBef>
+              <a:buFont typeface="Arial" panose="020B0604020202020204" pitchFamily="34" charset="0"/>
+              <a:buChar char="•"/>
+              <a:defRPr sz="2400" kern="1200">
+                <a:solidFill>
+                  <a:schemeClr val="tx1"/>
+                </a:solidFill>
+                <a:latin typeface="+mn-lt"/>
+                <a:ea typeface="+mn-ea"/>
+                <a:cs typeface="+mn-cs"/>
+              </a:defRPr>
+            </a:lvl2pPr>
+            <a:lvl3pPr marL="1143000" indent="-228600" algn="l" defTabSz="914400" rtl="0" eaLnBrk="1" latinLnBrk="0" hangingPunct="1">
+              <a:lnSpc>
+                <a:spcPct val="90000"/>
+              </a:lnSpc>
+              <a:spcBef>
+                <a:spcPts val="500"/>
+              </a:spcBef>
+              <a:buFont typeface="Arial" panose="020B0604020202020204" pitchFamily="34" charset="0"/>
+              <a:buChar char="•"/>
+              <a:defRPr sz="2000" kern="1200">
+                <a:solidFill>
+                  <a:schemeClr val="tx1"/>
+                </a:solidFill>
+                <a:latin typeface="+mn-lt"/>
+                <a:ea typeface="+mn-ea"/>
+                <a:cs typeface="+mn-cs"/>
+              </a:defRPr>
+            </a:lvl3pPr>
+            <a:lvl4pPr marL="1600200" indent="-228600" algn="l" defTabSz="914400" rtl="0" eaLnBrk="1" latinLnBrk="0" hangingPunct="1">
+              <a:lnSpc>
+                <a:spcPct val="90000"/>
+              </a:lnSpc>
+              <a:spcBef>
+                <a:spcPts val="500"/>
+              </a:spcBef>
+              <a:buFont typeface="Arial" panose="020B0604020202020204" pitchFamily="34" charset="0"/>
+              <a:buChar char="•"/>
+              <a:defRPr sz="1800" kern="1200">
+                <a:solidFill>
+                  <a:schemeClr val="tx1"/>
+                </a:solidFill>
+                <a:latin typeface="+mn-lt"/>
+                <a:ea typeface="+mn-ea"/>
+                <a:cs typeface="+mn-cs"/>
+              </a:defRPr>
+            </a:lvl4pPr>
+            <a:lvl5pPr marL="2057400" indent="-228600" algn="l" defTabSz="914400" rtl="0" eaLnBrk="1" latinLnBrk="0" hangingPunct="1">
+              <a:lnSpc>
+                <a:spcPct val="90000"/>
+              </a:lnSpc>
+              <a:spcBef>
+                <a:spcPts val="500"/>
+              </a:spcBef>
+              <a:buFont typeface="Arial" panose="020B0604020202020204" pitchFamily="34" charset="0"/>
+              <a:buChar char="•"/>
+              <a:defRPr sz="1800" kern="1200">
+                <a:solidFill>
+                  <a:schemeClr val="tx1"/>
+                </a:solidFill>
+                <a:latin typeface="+mn-lt"/>
+                <a:ea typeface="+mn-ea"/>
+                <a:cs typeface="+mn-cs"/>
+              </a:defRPr>
+            </a:lvl5pPr>
+            <a:lvl6pPr marL="2514600" indent="-228600" algn="l" defTabSz="914400" rtl="0" eaLnBrk="1" latinLnBrk="0" hangingPunct="1">
+              <a:lnSpc>
+                <a:spcPct val="90000"/>
+              </a:lnSpc>
+              <a:spcBef>
+                <a:spcPts val="500"/>
+              </a:spcBef>
+              <a:buFont typeface="Arial" panose="020B0604020202020204" pitchFamily="34" charset="0"/>
+              <a:buChar char="•"/>
+              <a:defRPr sz="1800" kern="1200">
+                <a:solidFill>
+                  <a:schemeClr val="tx1"/>
+                </a:solidFill>
+                <a:latin typeface="+mn-lt"/>
+                <a:ea typeface="+mn-ea"/>
+                <a:cs typeface="+mn-cs"/>
+              </a:defRPr>
+            </a:lvl6pPr>
+            <a:lvl7pPr marL="2971800" indent="-228600" algn="l" defTabSz="914400" rtl="0" eaLnBrk="1" latinLnBrk="0" hangingPunct="1">
+              <a:lnSpc>
+                <a:spcPct val="90000"/>
+              </a:lnSpc>
+              <a:spcBef>
+                <a:spcPts val="500"/>
+              </a:spcBef>
+              <a:buFont typeface="Arial" panose="020B0604020202020204" pitchFamily="34" charset="0"/>
+              <a:buChar char="•"/>
+              <a:defRPr sz="1800" kern="1200">
+                <a:solidFill>
+                  <a:schemeClr val="tx1"/>
+                </a:solidFill>
+                <a:latin typeface="+mn-lt"/>
+                <a:ea typeface="+mn-ea"/>
+                <a:cs typeface="+mn-cs"/>
+              </a:defRPr>
+            </a:lvl7pPr>
+            <a:lvl8pPr marL="3429000" indent="-228600" algn="l" defTabSz="914400" rtl="0" eaLnBrk="1" latinLnBrk="0" hangingPunct="1">
+              <a:lnSpc>
+                <a:spcPct val="90000"/>
+              </a:lnSpc>
+              <a:spcBef>
+                <a:spcPts val="500"/>
+              </a:spcBef>
+              <a:buFont typeface="Arial" panose="020B0604020202020204" pitchFamily="34" charset="0"/>
+              <a:buChar char="•"/>
+              <a:defRPr sz="1800" kern="1200">
+                <a:solidFill>
+                  <a:schemeClr val="tx1"/>
+                </a:solidFill>
+                <a:latin typeface="+mn-lt"/>
+                <a:ea typeface="+mn-ea"/>
+                <a:cs typeface="+mn-cs"/>
+              </a:defRPr>
+            </a:lvl8pPr>
+            <a:lvl9pPr marL="3886200" indent="-228600" algn="l" defTabSz="914400" rtl="0" eaLnBrk="1" latinLnBrk="0" hangingPunct="1">
+              <a:lnSpc>
+                <a:spcPct val="90000"/>
+              </a:lnSpc>
+              <a:spcBef>
+                <a:spcPts val="500"/>
+              </a:spcBef>
+              <a:buFont typeface="Arial" panose="020B0604020202020204" pitchFamily="34" charset="0"/>
+              <a:buChar char="•"/>
+              <a:defRPr sz="1800" kern="1200">
+                <a:solidFill>
+                  <a:schemeClr val="tx1"/>
+                </a:solidFill>
+                <a:latin typeface="+mn-lt"/>
+                <a:ea typeface="+mn-ea"/>
+                <a:cs typeface="+mn-cs"/>
+              </a:defRPr>
+            </a:lvl9pPr>
+          </a:lstStyle>
+          <a:p>
+            <a:pPr lvl="0">
+              <a:spcBef>
+                <a:spcPts val="600"/>
+              </a:spcBef>
+            </a:pPr>
+            <a:r>
+              <a:rPr lang="ru-RU" sz="2400" dirty="0"/>
+              <a:t>перенос данных в массивно-параллельную СУБД </a:t>
+            </a:r>
+            <a:r>
+              <a:rPr lang="en-US" sz="2400" dirty="0"/>
+              <a:t>GreenPlum</a:t>
+            </a:r>
+            <a:r>
+              <a:rPr lang="ru-RU" sz="2400" dirty="0"/>
+              <a:t> (компонент </a:t>
+            </a:r>
+            <a:r>
+              <a:rPr lang="en-US" sz="2400" dirty="0"/>
+              <a:t>RT</a:t>
+            </a:r>
+            <a:r>
+              <a:rPr lang="ru-RU" sz="2400" dirty="0"/>
+              <a:t>.</a:t>
+            </a:r>
+            <a:r>
+              <a:rPr lang="en-US" sz="2400" dirty="0"/>
+              <a:t>Warehouse</a:t>
+            </a:r>
+            <a:r>
+              <a:rPr lang="ru-RU" sz="2400" dirty="0"/>
+              <a:t>);</a:t>
+            </a:r>
+          </a:p>
+          <a:p>
+            <a:pPr lvl="0">
+              <a:spcBef>
+                <a:spcPts val="600"/>
+              </a:spcBef>
+            </a:pPr>
+            <a:r>
+              <a:rPr lang="ru-RU" sz="2400" dirty="0"/>
+              <a:t>аналитика с помощью </a:t>
+            </a:r>
+            <a:r>
+              <a:rPr lang="ru-RU" sz="2400" dirty="0" err="1"/>
+              <a:t>фреймворка</a:t>
+            </a:r>
+            <a:r>
+              <a:rPr lang="ru-RU" sz="2400" dirty="0"/>
+              <a:t> </a:t>
+            </a:r>
+            <a:r>
+              <a:rPr lang="en-US" sz="2400" dirty="0"/>
+              <a:t>Apache Spark</a:t>
+            </a:r>
+            <a:r>
+              <a:rPr lang="ru-RU" sz="2400" dirty="0"/>
+              <a:t>, так же являющимся элементом корпоративного хранилища данных </a:t>
+            </a:r>
+            <a:r>
+              <a:rPr lang="en-US" sz="2400" dirty="0"/>
+              <a:t>RT</a:t>
+            </a:r>
+            <a:r>
+              <a:rPr lang="ru-RU" sz="2400" dirty="0"/>
+              <a:t>.</a:t>
+            </a:r>
+            <a:r>
+              <a:rPr lang="en-US" sz="2400" dirty="0" err="1"/>
+              <a:t>DataLake</a:t>
+            </a:r>
+            <a:r>
+              <a:rPr lang="ru-RU" sz="2400" dirty="0"/>
+              <a:t>;</a:t>
+            </a:r>
+          </a:p>
+          <a:p>
+            <a:pPr lvl="0">
+              <a:spcBef>
+                <a:spcPts val="600"/>
+              </a:spcBef>
+            </a:pPr>
+            <a:r>
+              <a:rPr lang="ru-RU" sz="2400" dirty="0"/>
+              <a:t>визуализация и построение </a:t>
+            </a:r>
+            <a:r>
+              <a:rPr lang="ru-RU" sz="2400" dirty="0" err="1"/>
+              <a:t>дашборда</a:t>
+            </a:r>
+            <a:r>
+              <a:rPr lang="ru-RU" sz="2400" dirty="0"/>
+              <a:t> при помощи платформы </a:t>
+            </a:r>
+            <a:r>
+              <a:rPr lang="en-US" sz="2400" dirty="0"/>
+              <a:t>Apache Superset</a:t>
+            </a:r>
+            <a:r>
+              <a:rPr lang="ru-RU" sz="2400" dirty="0"/>
+              <a:t>, являющейся компонентом продукта </a:t>
+            </a:r>
+            <a:r>
+              <a:rPr lang="en-US" sz="2400" dirty="0"/>
+              <a:t>RT</a:t>
+            </a:r>
+            <a:r>
+              <a:rPr lang="ru-RU" sz="2400" dirty="0"/>
+              <a:t>.</a:t>
+            </a:r>
+            <a:r>
+              <a:rPr lang="en-US" sz="2400" dirty="0" err="1"/>
+              <a:t>Datavision</a:t>
+            </a:r>
+            <a:r>
+              <a:rPr lang="ru-RU" sz="2400" dirty="0"/>
+              <a:t>.</a:t>
+            </a:r>
+          </a:p>
+        </p:txBody>
+      </p:sp>
     </p:spTree>
     <p:extLst>
       <p:ext uri="{BB962C8B-B14F-4D97-AF65-F5344CB8AC3E}">
@@ -10776,7 +11472,7 @@
         </p:spPr>
         <p:txBody>
           <a:bodyPr>
-            <a:normAutofit/>
+            <a:normAutofit lnSpcReduction="10000"/>
           </a:bodyPr>
           <a:lstStyle/>
           <a:p>
@@ -10784,72 +11480,58 @@
               <a:buNone/>
             </a:pPr>
             <a:r>
+              <a:rPr lang="ru-RU" dirty="0" smtClean="0"/>
+              <a:t>Сбор </a:t>
+            </a:r>
+            <a:r>
               <a:rPr lang="ru-RU" dirty="0"/>
-              <a:t>Создание продюсера на Python, который будет симулировать данные </a:t>
+              <a:t>данных </a:t>
             </a:r>
             <a:r>
               <a:rPr lang="ru-RU" dirty="0" smtClean="0"/>
-              <a:t>о</a:t>
-            </a:r>
-            <a:r>
-              <a:rPr lang="en-US" dirty="0" smtClean="0"/>
-              <a:t> </a:t>
+              <a:t>реализован с </a:t>
+            </a:r>
+            <a:r>
+              <a:rPr lang="ru-RU" dirty="0"/>
+              <a:t>использованием распределенного программного брокера сообщений </a:t>
+            </a:r>
+            <a:r>
+              <a:rPr lang="en-US" dirty="0"/>
+              <a:t>Apache Kafka</a:t>
+            </a:r>
+            <a:r>
+              <a:rPr lang="ru-RU" dirty="0"/>
+              <a:t>, являющегося компонентом продукта </a:t>
+            </a:r>
+            <a:r>
+              <a:rPr lang="en-US" dirty="0"/>
+              <a:t>RT</a:t>
+            </a:r>
+            <a:r>
+              <a:rPr lang="ru-RU" dirty="0"/>
+              <a:t>.</a:t>
+            </a:r>
+            <a:r>
+              <a:rPr lang="en-US" dirty="0"/>
+              <a:t>Streaming</a:t>
+            </a:r>
+            <a:r>
+              <a:rPr lang="ru-RU" dirty="0"/>
+              <a:t>. Сбор данных реализован на языке </a:t>
+            </a:r>
+            <a:r>
+              <a:rPr lang="en-US" dirty="0"/>
+              <a:t>Python</a:t>
+            </a:r>
+            <a:r>
+              <a:rPr lang="ru-RU" dirty="0"/>
+              <a:t>. Для этого был создан продюсер, который симулирует данные о поведении 10000 пользователей интерактивного телевидения и отправляет их в топик </a:t>
             </a:r>
             <a:r>
               <a:rPr lang="ru-RU" dirty="0" smtClean="0"/>
-              <a:t>поведении </a:t>
-            </a:r>
-            <a:r>
-              <a:rPr lang="ru-RU" dirty="0"/>
-              <a:t>пользователей интерактивного </a:t>
-            </a:r>
-            <a:r>
-              <a:rPr lang="ru-RU" dirty="0" smtClean="0"/>
-              <a:t>телевидения. Например:</a:t>
+              <a:t>Kafka.</a:t>
             </a:r>
             <a:endParaRPr lang="ru-RU" dirty="0"/>
-          </a:p>
-          <a:p>
-            <a:pPr algn="just"/>
-            <a:r>
-              <a:rPr lang="en-US" dirty="0" smtClean="0"/>
-              <a:t>ID </a:t>
-            </a:r>
-            <a:r>
-              <a:rPr lang="ru-RU" dirty="0"/>
-              <a:t>пользователя</a:t>
-            </a:r>
-          </a:p>
-          <a:p>
-            <a:pPr algn="just"/>
-            <a:r>
-              <a:rPr lang="ru-RU" dirty="0" smtClean="0"/>
-              <a:t>время </a:t>
-            </a:r>
-            <a:r>
-              <a:rPr lang="ru-RU" dirty="0"/>
-              <a:t>начала и окончания просмотра</a:t>
-            </a:r>
-          </a:p>
-          <a:p>
-            <a:pPr algn="just"/>
-            <a:r>
-              <a:rPr lang="ru-RU" dirty="0" smtClean="0"/>
-              <a:t>выбранный </a:t>
-            </a:r>
-            <a:r>
-              <a:rPr lang="ru-RU" dirty="0"/>
-              <a:t>контент</a:t>
-            </a:r>
-          </a:p>
-          <a:p>
-            <a:pPr marL="0" indent="0" algn="just">
-              <a:buNone/>
-            </a:pPr>
-            <a:r>
-              <a:rPr lang="ru-RU" dirty="0"/>
-              <a:t>и отправлять их в топик Kafka.</a:t>
-            </a:r>
           </a:p>
         </p:txBody>
       </p:sp>
@@ -10871,7 +11553,7 @@
         </p:spPr>
         <p:txBody>
           <a:bodyPr>
-            <a:normAutofit/>
+            <a:normAutofit lnSpcReduction="10000"/>
           </a:bodyPr>
           <a:lstStyle/>
           <a:p>

</xml_diff>

<commit_message>
fix: update report & presentation
</commit_message>
<xml_diff>
--- a/Сertification/presentation.pptx
+++ b/Сertification/presentation.pptx
@@ -5150,8 +5150,8 @@
         </p:nvSpPr>
         <p:spPr>
           <a:xfrm>
-            <a:off x="8001062" y="2536280"/>
-            <a:ext cx="3647815" cy="830997"/>
+            <a:off x="7188591" y="1586460"/>
+            <a:ext cx="4410687" cy="3046988"/>
           </a:xfrm>
           <a:prstGeom prst="rect">
             <a:avLst/>
@@ -5165,11 +5165,48 @@
           <a:p>
             <a:pPr algn="r"/>
             <a:r>
-              <a:rPr lang="ru-RU" sz="2400" dirty="0" smtClean="0">
-                <a:latin typeface="Arial" panose="020B0604020202020204" pitchFamily="34" charset="0"/>
-                <a:cs typeface="Arial" panose="020B0604020202020204" pitchFamily="34" charset="0"/>
-              </a:rPr>
-              <a:t>Создаем виртуальную таблицу</a:t>
+              <a:rPr lang="ru-RU" sz="2400" dirty="0"/>
+              <a:t>Для агрегации нескольких таблиц в одну </a:t>
+            </a:r>
+            <a:r>
+              <a:rPr lang="ru-RU" sz="2400" dirty="0" smtClean="0"/>
+              <a:t>используется виртуальная таблица. </a:t>
+            </a:r>
+            <a:r>
+              <a:rPr lang="ru-RU" sz="2400" dirty="0"/>
+              <a:t>В ней уже нет колонки со статусом начала и конца сессии, а </a:t>
+            </a:r>
+            <a:r>
+              <a:rPr lang="ru-RU" sz="2400" dirty="0" smtClean="0"/>
+              <a:t> </a:t>
+            </a:r>
+            <a:r>
+              <a:rPr lang="ru-RU" sz="2400" dirty="0"/>
+              <a:t>непосредственно указаны </a:t>
+            </a:r>
+            <a:r>
+              <a:rPr lang="ru-RU" sz="2400" dirty="0" smtClean="0"/>
+              <a:t>ее время </a:t>
+            </a:r>
+            <a:r>
+              <a:rPr lang="ru-RU" sz="2400" dirty="0"/>
+              <a:t>начали и конца. </a:t>
+            </a:r>
+            <a:r>
+              <a:rPr lang="ru-RU" sz="2400" dirty="0" smtClean="0"/>
+              <a:t>Вместо </a:t>
+            </a:r>
+            <a:r>
+              <a:rPr lang="en-US" sz="2400" dirty="0" smtClean="0"/>
+              <a:t>id</a:t>
+            </a:r>
+            <a:r>
+              <a:rPr lang="ru-RU" sz="2400" dirty="0" smtClean="0"/>
+              <a:t> </a:t>
+            </a:r>
+            <a:r>
+              <a:rPr lang="ru-RU" sz="2400" dirty="0"/>
+              <a:t>канала стоит его название.</a:t>
             </a:r>
             <a:endParaRPr lang="ru-RU" sz="2400" dirty="0"/>
           </a:p>
@@ -5381,7 +5418,23 @@
                 <a:latin typeface="Arial" panose="020B0604020202020204" pitchFamily="34" charset="0"/>
                 <a:cs typeface="Arial" panose="020B0604020202020204" pitchFamily="34" charset="0"/>
               </a:rPr>
-              <a:t> RT.DataLake</a:t>
+              <a:t> </a:t>
+            </a:r>
+            <a:r>
+              <a:rPr lang="en-US" sz="2800" dirty="0" smtClean="0">
+                <a:effectLst/>
+                <a:latin typeface="Arial" panose="020B0604020202020204" pitchFamily="34" charset="0"/>
+                <a:cs typeface="Arial" panose="020B0604020202020204" pitchFamily="34" charset="0"/>
+              </a:rPr>
+              <a:t>RT.DataLake</a:t>
+            </a:r>
+            <a:r>
+              <a:rPr lang="ru-RU" sz="2800" dirty="0" smtClean="0">
+                <a:effectLst/>
+                <a:latin typeface="Arial" panose="020B0604020202020204" pitchFamily="34" charset="0"/>
+                <a:cs typeface="Arial" panose="020B0604020202020204" pitchFamily="34" charset="0"/>
+              </a:rPr>
+              <a:t>. Аналитические запросы.</a:t>
             </a:r>
             <a:endParaRPr lang="ru-RU" sz="2800" dirty="0">
               <a:effectLst/>
@@ -5749,12 +5802,8 @@
               </a:lnSpc>
             </a:pPr>
             <a:r>
-              <a:rPr lang="ru-RU" sz="2400" dirty="0"/>
-              <a:t>П</a:t>
-            </a:r>
-            <a:r>
               <a:rPr lang="ru-RU" sz="2400" dirty="0" smtClean="0"/>
-              <a:t>ереноса </a:t>
+              <a:t>Перенос </a:t>
             </a:r>
             <a:r>
               <a:rPr lang="ru-RU" sz="2400" dirty="0"/>
@@ -5789,12 +5838,12 @@
               <a:t>Warehouse</a:t>
             </a:r>
             <a:r>
-              <a:rPr lang="ru-RU" sz="2400" dirty="0"/>
+              <a:rPr lang="ru-RU" sz="2400" dirty="0" smtClean="0"/>
               <a:t>) </a:t>
             </a:r>
             <a:r>
               <a:rPr lang="ru-RU" sz="2400" dirty="0" smtClean="0"/>
-              <a:t> реализован при </a:t>
+              <a:t>реализован при </a:t>
             </a:r>
             <a:r>
               <a:rPr lang="ru-RU" sz="2400" dirty="0"/>

</xml_diff>

<commit_message>
feat: update presentation for extended part
</commit_message>
<xml_diff>
--- a/Сertification/presentation.pptx
+++ b/Сertification/presentation.pptx
@@ -13,22 +13,22 @@
     <p:sldId id="286" r:id="rId4"/>
     <p:sldId id="290" r:id="rId5"/>
     <p:sldId id="308" r:id="rId6"/>
-    <p:sldId id="287" r:id="rId7"/>
-    <p:sldId id="292" r:id="rId8"/>
+    <p:sldId id="309" r:id="rId7"/>
+    <p:sldId id="287" r:id="rId8"/>
     <p:sldId id="293" r:id="rId9"/>
-    <p:sldId id="294" r:id="rId10"/>
-    <p:sldId id="297" r:id="rId11"/>
-    <p:sldId id="295" r:id="rId12"/>
-    <p:sldId id="296" r:id="rId13"/>
-    <p:sldId id="302" r:id="rId14"/>
-    <p:sldId id="303" r:id="rId15"/>
-    <p:sldId id="299" r:id="rId16"/>
-    <p:sldId id="288" r:id="rId17"/>
-    <p:sldId id="298" r:id="rId18"/>
-    <p:sldId id="304" r:id="rId19"/>
-    <p:sldId id="305" r:id="rId20"/>
-    <p:sldId id="307" r:id="rId21"/>
-    <p:sldId id="306" r:id="rId22"/>
+    <p:sldId id="297" r:id="rId10"/>
+    <p:sldId id="296" r:id="rId11"/>
+    <p:sldId id="302" r:id="rId12"/>
+    <p:sldId id="303" r:id="rId13"/>
+    <p:sldId id="299" r:id="rId14"/>
+    <p:sldId id="298" r:id="rId15"/>
+    <p:sldId id="304" r:id="rId16"/>
+    <p:sldId id="305" r:id="rId17"/>
+    <p:sldId id="307" r:id="rId18"/>
+    <p:sldId id="312" r:id="rId19"/>
+    <p:sldId id="310" r:id="rId20"/>
+    <p:sldId id="313" r:id="rId21"/>
+    <p:sldId id="311" r:id="rId22"/>
     <p:sldId id="291" r:id="rId23"/>
     <p:sldId id="289" r:id="rId24"/>
   </p:sldIdLst>
@@ -219,7 +219,7 @@
           <a:p>
             <a:fld id="{76ED9429-14B3-664E-B66C-A13779F56E7D}" type="datetimeFigureOut">
               <a:rPr lang="ru-RU" smtClean="0"/>
-              <a:t>28.09.2023</a:t>
+              <a:t>03.10.2023</a:t>
             </a:fld>
             <a:endParaRPr lang="ru-RU"/>
           </a:p>
@@ -633,7 +633,7 @@
           <a:p>
             <a:fld id="{26DB3D39-9350-6749-B0D7-69548AE3DE8E}" type="datetimeFigureOut">
               <a:rPr lang="ru-RU" smtClean="0"/>
-              <a:t>28.09.2023</a:t>
+              <a:t>03.10.2023</a:t>
             </a:fld>
             <a:endParaRPr lang="ru-RU"/>
           </a:p>
@@ -831,7 +831,7 @@
           <a:p>
             <a:fld id="{26DB3D39-9350-6749-B0D7-69548AE3DE8E}" type="datetimeFigureOut">
               <a:rPr lang="ru-RU" smtClean="0"/>
-              <a:t>28.09.2023</a:t>
+              <a:t>03.10.2023</a:t>
             </a:fld>
             <a:endParaRPr lang="ru-RU"/>
           </a:p>
@@ -1039,7 +1039,7 @@
           <a:p>
             <a:fld id="{26DB3D39-9350-6749-B0D7-69548AE3DE8E}" type="datetimeFigureOut">
               <a:rPr lang="ru-RU" smtClean="0"/>
-              <a:t>28.09.2023</a:t>
+              <a:t>03.10.2023</a:t>
             </a:fld>
             <a:endParaRPr lang="ru-RU"/>
           </a:p>
@@ -1237,7 +1237,7 @@
           <a:p>
             <a:fld id="{26DB3D39-9350-6749-B0D7-69548AE3DE8E}" type="datetimeFigureOut">
               <a:rPr lang="ru-RU" smtClean="0"/>
-              <a:t>28.09.2023</a:t>
+              <a:t>03.10.2023</a:t>
             </a:fld>
             <a:endParaRPr lang="ru-RU"/>
           </a:p>
@@ -1512,7 +1512,7 @@
           <a:p>
             <a:fld id="{26DB3D39-9350-6749-B0D7-69548AE3DE8E}" type="datetimeFigureOut">
               <a:rPr lang="ru-RU" smtClean="0"/>
-              <a:t>28.09.2023</a:t>
+              <a:t>03.10.2023</a:t>
             </a:fld>
             <a:endParaRPr lang="ru-RU"/>
           </a:p>
@@ -1777,7 +1777,7 @@
           <a:p>
             <a:fld id="{26DB3D39-9350-6749-B0D7-69548AE3DE8E}" type="datetimeFigureOut">
               <a:rPr lang="ru-RU" smtClean="0"/>
-              <a:t>28.09.2023</a:t>
+              <a:t>03.10.2023</a:t>
             </a:fld>
             <a:endParaRPr lang="ru-RU"/>
           </a:p>
@@ -2189,7 +2189,7 @@
           <a:p>
             <a:fld id="{26DB3D39-9350-6749-B0D7-69548AE3DE8E}" type="datetimeFigureOut">
               <a:rPr lang="ru-RU" smtClean="0"/>
-              <a:t>28.09.2023</a:t>
+              <a:t>03.10.2023</a:t>
             </a:fld>
             <a:endParaRPr lang="ru-RU"/>
           </a:p>
@@ -2330,7 +2330,7 @@
           <a:p>
             <a:fld id="{26DB3D39-9350-6749-B0D7-69548AE3DE8E}" type="datetimeFigureOut">
               <a:rPr lang="ru-RU" smtClean="0"/>
-              <a:t>28.09.2023</a:t>
+              <a:t>03.10.2023</a:t>
             </a:fld>
             <a:endParaRPr lang="ru-RU"/>
           </a:p>
@@ -2443,7 +2443,7 @@
           <a:p>
             <a:fld id="{26DB3D39-9350-6749-B0D7-69548AE3DE8E}" type="datetimeFigureOut">
               <a:rPr lang="ru-RU" smtClean="0"/>
-              <a:t>28.09.2023</a:t>
+              <a:t>03.10.2023</a:t>
             </a:fld>
             <a:endParaRPr lang="ru-RU"/>
           </a:p>
@@ -2754,7 +2754,7 @@
           <a:p>
             <a:fld id="{26DB3D39-9350-6749-B0D7-69548AE3DE8E}" type="datetimeFigureOut">
               <a:rPr lang="ru-RU" smtClean="0"/>
-              <a:t>28.09.2023</a:t>
+              <a:t>03.10.2023</a:t>
             </a:fld>
             <a:endParaRPr lang="ru-RU"/>
           </a:p>
@@ -3042,7 +3042,7 @@
           <a:p>
             <a:fld id="{26DB3D39-9350-6749-B0D7-69548AE3DE8E}" type="datetimeFigureOut">
               <a:rPr lang="ru-RU" smtClean="0"/>
-              <a:t>28.09.2023</a:t>
+              <a:t>03.10.2023</a:t>
             </a:fld>
             <a:endParaRPr lang="ru-RU"/>
           </a:p>
@@ -3286,7 +3286,7 @@
           <a:p>
             <a:fld id="{26DB3D39-9350-6749-B0D7-69548AE3DE8E}" type="datetimeFigureOut">
               <a:rPr lang="ru-RU" smtClean="0"/>
-              <a:t>28.09.2023</a:t>
+              <a:t>03.10.2023</a:t>
             </a:fld>
             <a:endParaRPr lang="ru-RU"/>
           </a:p>
@@ -3990,7 +3990,7 @@
         </p:nvSpPr>
         <p:spPr>
           <a:xfrm>
-            <a:off x="515939" y="6393284"/>
+            <a:off x="524435" y="6383617"/>
             <a:ext cx="2743200" cy="365125"/>
           </a:xfrm>
           <a:prstGeom prst="rect">
@@ -4033,7 +4033,7 @@
       </p:sp>
       <p:sp>
         <p:nvSpPr>
-          <p:cNvPr id="5" name="Заголовок 1">
+          <p:cNvPr id="6" name="Заголовок 1">
             <a:extLst>
               <a:ext uri="{FF2B5EF4-FFF2-40B4-BE49-F238E27FC236}">
                 <a16:creationId xmlns:a16="http://schemas.microsoft.com/office/drawing/2014/main" id="{26F3F6DE-0B95-4A88-A2DE-D547275A4F55}"/>
@@ -4047,128 +4047,8 @@
         </p:nvSpPr>
         <p:spPr>
           <a:xfrm>
-            <a:off x="107458" y="1301711"/>
-            <a:ext cx="11491820" cy="1923604"/>
-          </a:xfrm>
-          <a:prstGeom prst="rect">
-            <a:avLst/>
-          </a:prstGeom>
-        </p:spPr>
-        <p:txBody>
-          <a:bodyPr wrap="square" lIns="0" tIns="0" rIns="0" bIns="0" anchor="t" anchorCtr="0">
-            <a:spAutoFit/>
-          </a:bodyPr>
-          <a:lstStyle>
-            <a:defPPr>
-              <a:defRPr lang="ru-RU"/>
-            </a:defPPr>
-            <a:lvl1pPr>
-              <a:lnSpc>
-                <a:spcPts val="4000"/>
-              </a:lnSpc>
-              <a:spcBef>
-                <a:spcPct val="0"/>
-              </a:spcBef>
-              <a:buNone/>
-              <a:defRPr sz="2800" b="0">
-                <a:effectLst/>
-                <a:latin typeface="Rostelecom Basis Medium" panose="020B0603030604040103" pitchFamily="34" charset="0"/>
-                <a:ea typeface="+mj-ea"/>
-                <a:cs typeface="+mj-cs"/>
-              </a:defRPr>
-            </a:lvl1pPr>
-          </a:lstStyle>
-          <a:p>
-            <a:pPr marL="342000" algn="just">
-              <a:lnSpc>
-                <a:spcPts val="3000"/>
-              </a:lnSpc>
-            </a:pPr>
-            <a:r>
-              <a:rPr lang="ru-RU" sz="2400" dirty="0" smtClean="0"/>
-              <a:t>Хранение </a:t>
-            </a:r>
-            <a:r>
-              <a:rPr lang="ru-RU" sz="2400" dirty="0"/>
-              <a:t>собранных данных </a:t>
-            </a:r>
-            <a:r>
-              <a:rPr lang="ru-RU" sz="2400" dirty="0" smtClean="0"/>
-              <a:t>реализовано в </a:t>
-            </a:r>
-            <a:r>
-              <a:rPr lang="ru-RU" sz="2400" dirty="0"/>
-              <a:t>распределенной файловой системе </a:t>
-            </a:r>
-            <a:r>
-              <a:rPr lang="en-US" sz="2400" dirty="0"/>
-              <a:t>HDFS</a:t>
-            </a:r>
-            <a:r>
-              <a:rPr lang="ru-RU" sz="2400" dirty="0"/>
-              <a:t>, являющейся элементом корпоративного хранилища данных </a:t>
-            </a:r>
-            <a:r>
-              <a:rPr lang="en-US" sz="2400" dirty="0"/>
-              <a:t>RT</a:t>
-            </a:r>
-            <a:r>
-              <a:rPr lang="ru-RU" sz="2400" dirty="0"/>
-              <a:t>.</a:t>
-            </a:r>
-            <a:r>
-              <a:rPr lang="en-US" sz="2400" dirty="0" err="1" smtClean="0"/>
-              <a:t>DataLake</a:t>
-            </a:r>
-            <a:r>
-              <a:rPr lang="ru-RU" sz="2400" dirty="0" smtClean="0"/>
-              <a:t>. Хранение </a:t>
-            </a:r>
-            <a:r>
-              <a:rPr lang="ru-RU" sz="2400" dirty="0"/>
-              <a:t>осуществляется с помощью потребителя на Python, который читает данные с </a:t>
-            </a:r>
-            <a:r>
-              <a:rPr lang="en-US" sz="2400" dirty="0"/>
-              <a:t>Kafka </a:t>
-            </a:r>
-            <a:r>
-              <a:rPr lang="ru-RU" sz="2400" dirty="0"/>
-              <a:t>и сохраняет их в HDFS в формате </a:t>
-            </a:r>
-            <a:r>
-              <a:rPr lang="en-US" sz="2400" dirty="0" smtClean="0"/>
-              <a:t>CSV</a:t>
-            </a:r>
-            <a:r>
-              <a:rPr lang="ru-RU" sz="2400" dirty="0" smtClean="0"/>
-              <a:t>.</a:t>
-            </a:r>
-            <a:endParaRPr lang="ru-RU" sz="2400" dirty="0">
-              <a:latin typeface="Arial" panose="020B0604020202020204" pitchFamily="34" charset="0"/>
-              <a:cs typeface="Arial" panose="020B0604020202020204" pitchFamily="34" charset="0"/>
-            </a:endParaRPr>
-          </a:p>
-        </p:txBody>
-      </p:sp>
-      <p:sp>
-        <p:nvSpPr>
-          <p:cNvPr id="6" name="Заголовок 1">
-            <a:extLst>
-              <a:ext uri="{FF2B5EF4-FFF2-40B4-BE49-F238E27FC236}">
-                <a16:creationId xmlns:a16="http://schemas.microsoft.com/office/drawing/2014/main" id="{26F3F6DE-0B95-4A88-A2DE-D547275A4F55}"/>
-              </a:ext>
-            </a:extLst>
-          </p:cNvPr>
-          <p:cNvSpPr txBox="1">
-            <a:spLocks/>
-          </p:cNvSpPr>
-          <p:nvPr/>
-        </p:nvSpPr>
-        <p:spPr>
-          <a:xfrm>
             <a:off x="439151" y="560538"/>
-            <a:ext cx="11160127" cy="512961"/>
+            <a:ext cx="11160127" cy="979435"/>
           </a:xfrm>
           <a:prstGeom prst="rect">
             <a:avLst/>
@@ -4206,22 +4086,86 @@
           </a:lstStyle>
           <a:p>
             <a:r>
-              <a:rPr lang="ru-RU" dirty="0">
-                <a:effectLst/>
-                <a:latin typeface="Arial" panose="020B0604020202020204" pitchFamily="34" charset="0"/>
-                <a:cs typeface="Arial" panose="020B0604020202020204" pitchFamily="34" charset="0"/>
-              </a:rPr>
-              <a:t>Хранение сырых данных в</a:t>
-            </a:r>
-            <a:r>
-              <a:rPr lang="en-US" dirty="0">
-                <a:effectLst/>
-                <a:latin typeface="Arial" panose="020B0604020202020204" pitchFamily="34" charset="0"/>
-                <a:cs typeface="Arial" panose="020B0604020202020204" pitchFamily="34" charset="0"/>
-              </a:rPr>
-              <a:t> RT.DataLake</a:t>
-            </a:r>
-            <a:endParaRPr lang="ru-RU" b="1" dirty="0">
+              <a:rPr lang="ru-RU" sz="2800" dirty="0" smtClean="0">
+                <a:effectLst/>
+                <a:latin typeface="Arial" panose="020B0604020202020204" pitchFamily="34" charset="0"/>
+                <a:cs typeface="Arial" panose="020B0604020202020204" pitchFamily="34" charset="0"/>
+              </a:rPr>
+              <a:t>Обработка </a:t>
+            </a:r>
+            <a:r>
+              <a:rPr lang="ru-RU" sz="2800" dirty="0">
+                <a:effectLst/>
+                <a:latin typeface="Arial" panose="020B0604020202020204" pitchFamily="34" charset="0"/>
+                <a:cs typeface="Arial" panose="020B0604020202020204" pitchFamily="34" charset="0"/>
+              </a:rPr>
+              <a:t>данных с </a:t>
+            </a:r>
+            <a:r>
+              <a:rPr lang="ru-RU" sz="2800" dirty="0" smtClean="0">
+                <a:effectLst/>
+                <a:latin typeface="Arial" panose="020B0604020202020204" pitchFamily="34" charset="0"/>
+                <a:cs typeface="Arial" panose="020B0604020202020204" pitchFamily="34" charset="0"/>
+              </a:rPr>
+              <a:t>использованием </a:t>
+            </a:r>
+            <a:r>
+              <a:rPr lang="ru-RU" sz="2800" dirty="0" err="1" smtClean="0">
+                <a:effectLst/>
+                <a:latin typeface="Arial" panose="020B0604020202020204" pitchFamily="34" charset="0"/>
+                <a:cs typeface="Arial" panose="020B0604020202020204" pitchFamily="34" charset="0"/>
+              </a:rPr>
+              <a:t>Apache</a:t>
+            </a:r>
+            <a:r>
+              <a:rPr lang="ru-RU" sz="2800" dirty="0" smtClean="0">
+                <a:effectLst/>
+                <a:latin typeface="Arial" panose="020B0604020202020204" pitchFamily="34" charset="0"/>
+                <a:cs typeface="Arial" panose="020B0604020202020204" pitchFamily="34" charset="0"/>
+              </a:rPr>
+              <a:t> </a:t>
+            </a:r>
+            <a:r>
+              <a:rPr lang="ru-RU" sz="2800" dirty="0" err="1" smtClean="0">
+                <a:effectLst/>
+                <a:latin typeface="Arial" panose="020B0604020202020204" pitchFamily="34" charset="0"/>
+                <a:cs typeface="Arial" panose="020B0604020202020204" pitchFamily="34" charset="0"/>
+              </a:rPr>
+              <a:t>Hive</a:t>
+            </a:r>
+            <a:endParaRPr lang="ru-RU" sz="2800" dirty="0" smtClean="0">
+              <a:effectLst/>
+              <a:latin typeface="Arial" panose="020B0604020202020204" pitchFamily="34" charset="0"/>
+              <a:cs typeface="Arial" panose="020B0604020202020204" pitchFamily="34" charset="0"/>
+            </a:endParaRPr>
+          </a:p>
+          <a:p>
+            <a:r>
+              <a:rPr lang="ru-RU" sz="2800" dirty="0" smtClean="0">
+                <a:effectLst/>
+                <a:latin typeface="Arial" panose="020B0604020202020204" pitchFamily="34" charset="0"/>
+                <a:cs typeface="Arial" panose="020B0604020202020204" pitchFamily="34" charset="0"/>
+              </a:rPr>
+              <a:t>в</a:t>
+            </a:r>
+            <a:r>
+              <a:rPr lang="en-US" sz="2800" dirty="0" smtClean="0">
+                <a:effectLst/>
+                <a:latin typeface="Arial" panose="020B0604020202020204" pitchFamily="34" charset="0"/>
+                <a:cs typeface="Arial" panose="020B0604020202020204" pitchFamily="34" charset="0"/>
+              </a:rPr>
+              <a:t> </a:t>
+            </a:r>
+            <a:r>
+              <a:rPr lang="en-US" sz="2800" dirty="0">
+                <a:effectLst/>
+                <a:latin typeface="Arial" panose="020B0604020202020204" pitchFamily="34" charset="0"/>
+                <a:cs typeface="Arial" panose="020B0604020202020204" pitchFamily="34" charset="0"/>
+              </a:rPr>
+              <a:t>RT.DataLake</a:t>
+            </a:r>
+            <a:endParaRPr lang="ru-RU" sz="2800" dirty="0">
+              <a:effectLst/>
               <a:latin typeface="Arial" panose="020B0604020202020204" pitchFamily="34" charset="0"/>
               <a:cs typeface="Arial" panose="020B0604020202020204" pitchFamily="34" charset="0"/>
             </a:endParaRPr>
@@ -4260,7 +4204,7 @@
       </p:pic>
       <p:pic>
         <p:nvPicPr>
-          <p:cNvPr id="2" name="Рисунок 1"/>
+          <p:cNvPr id="13" name="Рисунок 12"/>
           <p:cNvPicPr>
             <a:picLocks noChangeAspect="1"/>
           </p:cNvPicPr>
@@ -4274,18 +4218,131 @@
         </p:blipFill>
         <p:spPr>
           <a:xfrm>
-            <a:off x="597903" y="3453527"/>
-            <a:ext cx="11001375" cy="2705100"/>
+            <a:off x="2322998" y="5022167"/>
+            <a:ext cx="7392432" cy="1276528"/>
           </a:xfrm>
           <a:prstGeom prst="rect">
             <a:avLst/>
           </a:prstGeom>
         </p:spPr>
       </p:pic>
+      <p:pic>
+        <p:nvPicPr>
+          <p:cNvPr id="2" name="Рисунок 1"/>
+          <p:cNvPicPr>
+            <a:picLocks noChangeAspect="1"/>
+          </p:cNvPicPr>
+          <p:nvPr/>
+        </p:nvPicPr>
+        <p:blipFill>
+          <a:blip r:embed="rId4"/>
+          <a:stretch>
+            <a:fillRect/>
+          </a:stretch>
+        </p:blipFill>
+        <p:spPr>
+          <a:xfrm>
+            <a:off x="436048" y="1671382"/>
+            <a:ext cx="4959124" cy="2970956"/>
+          </a:xfrm>
+          <a:prstGeom prst="rect">
+            <a:avLst/>
+          </a:prstGeom>
+        </p:spPr>
+      </p:pic>
+      <p:sp>
+        <p:nvSpPr>
+          <p:cNvPr id="9" name="Объект 2"/>
+          <p:cNvSpPr>
+            <a:spLocks noGrp="1"/>
+          </p:cNvSpPr>
+          <p:nvPr>
+            <p:ph sz="half" idx="1"/>
+          </p:nvPr>
+        </p:nvSpPr>
+        <p:spPr>
+          <a:xfrm>
+            <a:off x="5621867" y="1380712"/>
+            <a:ext cx="5977411" cy="3378177"/>
+          </a:xfrm>
+        </p:spPr>
+        <p:txBody>
+          <a:bodyPr>
+            <a:noAutofit/>
+          </a:bodyPr>
+          <a:lstStyle/>
+          <a:p>
+            <a:pPr marL="0" indent="0" algn="just">
+              <a:buNone/>
+            </a:pPr>
+            <a:r>
+              <a:rPr lang="ru-RU" sz="2400" dirty="0" smtClean="0"/>
+              <a:t>Обработка</a:t>
+            </a:r>
+            <a:r>
+              <a:rPr lang="ru-RU" dirty="0" smtClean="0"/>
+              <a:t> </a:t>
+            </a:r>
+            <a:r>
+              <a:rPr lang="ru-RU" dirty="0"/>
+              <a:t>и агрегации данных </a:t>
+            </a:r>
+            <a:r>
+              <a:rPr lang="ru-RU" dirty="0" smtClean="0"/>
+              <a:t>с </a:t>
+            </a:r>
+            <a:r>
+              <a:rPr lang="ru-RU" dirty="0"/>
+              <a:t>использованием СУБД Apache Hive, являющейся компонентом корпоративного хранилища данных </a:t>
+            </a:r>
+            <a:r>
+              <a:rPr lang="en-US" dirty="0"/>
+              <a:t>RT</a:t>
+            </a:r>
+            <a:r>
+              <a:rPr lang="ru-RU" dirty="0"/>
+              <a:t>.</a:t>
+            </a:r>
+            <a:r>
+              <a:rPr lang="en-US" dirty="0" err="1"/>
+              <a:t>DataLake</a:t>
+            </a:r>
+            <a:r>
+              <a:rPr lang="ru-RU" dirty="0" smtClean="0"/>
+              <a:t>. При этом расположенные на </a:t>
+            </a:r>
+            <a:r>
+              <a:rPr lang="en-US" dirty="0" smtClean="0"/>
+              <a:t>HDFS </a:t>
+            </a:r>
+            <a:r>
+              <a:rPr lang="ru-RU" dirty="0" smtClean="0"/>
+              <a:t>сырые данные, полученные в результате генерации и </a:t>
+            </a:r>
+            <a:r>
+              <a:rPr lang="ru-RU" dirty="0" err="1" smtClean="0"/>
+              <a:t>стриминга</a:t>
+            </a:r>
+            <a:r>
+              <a:rPr lang="ru-RU" dirty="0" smtClean="0"/>
+              <a:t> загружаются и преобразовываются в таблицы </a:t>
+            </a:r>
+            <a:r>
+              <a:rPr lang="en-US" dirty="0" smtClean="0"/>
+              <a:t>Hive</a:t>
+            </a:r>
+            <a:r>
+              <a:rPr lang="ru-RU" dirty="0" smtClean="0"/>
+              <a:t>.</a:t>
+            </a:r>
+            <a:endParaRPr lang="ru-RU" dirty="0"/>
+          </a:p>
+        </p:txBody>
+      </p:sp>
     </p:spTree>
     <p:extLst>
       <p:ext uri="{BB962C8B-B14F-4D97-AF65-F5344CB8AC3E}">
-        <p14:creationId xmlns:p14="http://schemas.microsoft.com/office/powerpoint/2010/main" val="2207802164"/>
+        <p14:creationId xmlns:p14="http://schemas.microsoft.com/office/powerpoint/2010/main" val="288046697"/>
       </p:ext>
     </p:extLst>
   </p:cSld>
@@ -4403,7 +4460,7 @@
         <p:spPr>
           <a:xfrm>
             <a:off x="439151" y="560538"/>
-            <a:ext cx="11160127" cy="523220"/>
+            <a:ext cx="11160127" cy="979435"/>
           </a:xfrm>
           <a:prstGeom prst="rect">
             <a:avLst/>
@@ -4441,15 +4498,47 @@
           </a:lstStyle>
           <a:p>
             <a:r>
-              <a:rPr lang="ru-RU" sz="3200" dirty="0">
-                <a:effectLst/>
-                <a:latin typeface="Arial" panose="020B0604020202020204" pitchFamily="34" charset="0"/>
-                <a:cs typeface="Arial" panose="020B0604020202020204" pitchFamily="34" charset="0"/>
-              </a:rPr>
-              <a:t>Хранение сырых данных в</a:t>
-            </a:r>
-            <a:r>
-              <a:rPr lang="en-US" sz="3200" dirty="0">
+              <a:rPr lang="ru-RU" sz="2800" dirty="0">
+                <a:effectLst/>
+                <a:latin typeface="Arial" panose="020B0604020202020204" pitchFamily="34" charset="0"/>
+                <a:cs typeface="Arial" panose="020B0604020202020204" pitchFamily="34" charset="0"/>
+              </a:rPr>
+              <a:t>А</a:t>
+            </a:r>
+            <a:r>
+              <a:rPr lang="ru-RU" sz="2800" dirty="0" smtClean="0">
+                <a:effectLst/>
+                <a:latin typeface="Arial" panose="020B0604020202020204" pitchFamily="34" charset="0"/>
+                <a:cs typeface="Arial" panose="020B0604020202020204" pitchFamily="34" charset="0"/>
+              </a:rPr>
+              <a:t>грегация </a:t>
+            </a:r>
+            <a:r>
+              <a:rPr lang="ru-RU" sz="2800" dirty="0">
+                <a:effectLst/>
+                <a:latin typeface="Arial" panose="020B0604020202020204" pitchFamily="34" charset="0"/>
+                <a:cs typeface="Arial" panose="020B0604020202020204" pitchFamily="34" charset="0"/>
+              </a:rPr>
+              <a:t>данных с </a:t>
+            </a:r>
+            <a:r>
+              <a:rPr lang="ru-RU" sz="2800" dirty="0" smtClean="0">
+                <a:effectLst/>
+                <a:latin typeface="Arial" panose="020B0604020202020204" pitchFamily="34" charset="0"/>
+                <a:cs typeface="Arial" panose="020B0604020202020204" pitchFamily="34" charset="0"/>
+              </a:rPr>
+              <a:t>использованием </a:t>
+            </a:r>
+            <a:r>
+              <a:rPr lang="ru-RU" sz="2800" dirty="0" err="1" smtClean="0">
+                <a:effectLst/>
+                <a:latin typeface="Arial" panose="020B0604020202020204" pitchFamily="34" charset="0"/>
+                <a:cs typeface="Arial" panose="020B0604020202020204" pitchFamily="34" charset="0"/>
+              </a:rPr>
+              <a:t>Apache</a:t>
+            </a:r>
+            <a:r>
+              <a:rPr lang="ru-RU" sz="2800" dirty="0" smtClean="0">
                 <a:effectLst/>
                 <a:latin typeface="Arial" panose="020B0604020202020204" pitchFamily="34" charset="0"/>
                 <a:cs typeface="Arial" panose="020B0604020202020204" pitchFamily="34" charset="0"/>
@@ -4457,22 +4546,46 @@
               <a:t> </a:t>
             </a:r>
             <a:r>
-              <a:rPr lang="en-US" sz="3200" dirty="0" smtClean="0">
+              <a:rPr lang="ru-RU" sz="2800" dirty="0" err="1" smtClean="0">
+                <a:effectLst/>
+                <a:latin typeface="Arial" panose="020B0604020202020204" pitchFamily="34" charset="0"/>
+                <a:cs typeface="Arial" panose="020B0604020202020204" pitchFamily="34" charset="0"/>
+              </a:rPr>
+              <a:t>Hive</a:t>
+            </a:r>
+            <a:endParaRPr lang="ru-RU" sz="2800" dirty="0" smtClean="0">
+              <a:effectLst/>
+              <a:latin typeface="Arial" panose="020B0604020202020204" pitchFamily="34" charset="0"/>
+              <a:cs typeface="Arial" panose="020B0604020202020204" pitchFamily="34" charset="0"/>
+            </a:endParaRPr>
+          </a:p>
+          <a:p>
+            <a:r>
+              <a:rPr lang="ru-RU" sz="2800" dirty="0" smtClean="0">
+                <a:effectLst/>
+                <a:latin typeface="Arial" panose="020B0604020202020204" pitchFamily="34" charset="0"/>
+                <a:cs typeface="Arial" panose="020B0604020202020204" pitchFamily="34" charset="0"/>
+              </a:rPr>
+              <a:t>в</a:t>
+            </a:r>
+            <a:r>
+              <a:rPr lang="en-US" sz="2800" dirty="0" smtClean="0">
+                <a:effectLst/>
+                <a:latin typeface="Arial" panose="020B0604020202020204" pitchFamily="34" charset="0"/>
+                <a:cs typeface="Arial" panose="020B0604020202020204" pitchFamily="34" charset="0"/>
+              </a:rPr>
+              <a:t> </a:t>
+            </a:r>
+            <a:r>
+              <a:rPr lang="en-US" sz="2800" dirty="0">
                 <a:effectLst/>
                 <a:latin typeface="Arial" panose="020B0604020202020204" pitchFamily="34" charset="0"/>
                 <a:cs typeface="Arial" panose="020B0604020202020204" pitchFamily="34" charset="0"/>
               </a:rPr>
               <a:t>RT.DataLake</a:t>
             </a:r>
-            <a:r>
-              <a:rPr lang="ru-RU" sz="3200" dirty="0" smtClean="0">
-                <a:effectLst/>
-                <a:latin typeface="Arial" panose="020B0604020202020204" pitchFamily="34" charset="0"/>
-                <a:cs typeface="Arial" panose="020B0604020202020204" pitchFamily="34" charset="0"/>
-              </a:rPr>
-              <a:t> - код</a:t>
-            </a:r>
-            <a:endParaRPr lang="ru-RU" sz="3200" b="1" dirty="0">
+            <a:endParaRPr lang="ru-RU" sz="2800" dirty="0">
+              <a:effectLst/>
               <a:latin typeface="Arial" panose="020B0604020202020204" pitchFamily="34" charset="0"/>
               <a:cs typeface="Arial" panose="020B0604020202020204" pitchFamily="34" charset="0"/>
             </a:endParaRPr>
@@ -4511,7 +4624,7 @@
       </p:pic>
       <p:pic>
         <p:nvPicPr>
-          <p:cNvPr id="3" name="Рисунок 2"/>
+          <p:cNvPr id="4" name="Рисунок 3"/>
           <p:cNvPicPr>
             <a:picLocks noChangeAspect="1"/>
           </p:cNvPicPr>
@@ -4525,8 +4638,109 @@
         </p:blipFill>
         <p:spPr>
           <a:xfrm>
-            <a:off x="2211711" y="1252273"/>
-            <a:ext cx="7461208" cy="5244766"/>
+            <a:off x="1985389" y="5290423"/>
+            <a:ext cx="8221222" cy="1200318"/>
+          </a:xfrm>
+          <a:prstGeom prst="rect">
+            <a:avLst/>
+          </a:prstGeom>
+        </p:spPr>
+      </p:pic>
+      <p:sp>
+        <p:nvSpPr>
+          <p:cNvPr id="8" name="Прямоугольник 7"/>
+          <p:cNvSpPr/>
+          <p:nvPr/>
+        </p:nvSpPr>
+        <p:spPr>
+          <a:xfrm>
+            <a:off x="7190046" y="1879971"/>
+            <a:ext cx="4410687" cy="2677656"/>
+          </a:xfrm>
+          <a:prstGeom prst="rect">
+            <a:avLst/>
+          </a:prstGeom>
+        </p:spPr>
+        <p:txBody>
+          <a:bodyPr wrap="square">
+            <a:spAutoFit/>
+          </a:bodyPr>
+          <a:lstStyle/>
+          <a:p>
+            <a:pPr algn="r"/>
+            <a:r>
+              <a:rPr lang="ru-RU" sz="2400" dirty="0"/>
+              <a:t>Для агрегации нескольких таблиц в одну </a:t>
+            </a:r>
+            <a:r>
+              <a:rPr lang="ru-RU" sz="2400" dirty="0" smtClean="0"/>
+              <a:t>используется виртуальная таблица. </a:t>
+            </a:r>
+            <a:r>
+              <a:rPr lang="ru-RU" sz="2400" dirty="0"/>
+              <a:t>В ней уже нет колонки со статусом </a:t>
+            </a:r>
+            <a:r>
+              <a:rPr lang="ru-RU" sz="2400" dirty="0" smtClean="0"/>
+              <a:t>сессии</a:t>
+            </a:r>
+            <a:r>
+              <a:rPr lang="ru-RU" sz="2400" dirty="0"/>
+              <a:t>, а </a:t>
+            </a:r>
+            <a:r>
+              <a:rPr lang="ru-RU" sz="2400" dirty="0" smtClean="0"/>
+              <a:t> </a:t>
+            </a:r>
+            <a:r>
+              <a:rPr lang="ru-RU" sz="2400" dirty="0"/>
+              <a:t>непосредственно указаны </a:t>
+            </a:r>
+            <a:r>
+              <a:rPr lang="ru-RU" sz="2400" dirty="0" smtClean="0"/>
+              <a:t>ее время </a:t>
+            </a:r>
+            <a:r>
+              <a:rPr lang="ru-RU" sz="2400" dirty="0"/>
+              <a:t>начали и конца. </a:t>
+            </a:r>
+            <a:r>
+              <a:rPr lang="ru-RU" sz="2400" dirty="0" smtClean="0"/>
+              <a:t>Вместо </a:t>
+            </a:r>
+            <a:r>
+              <a:rPr lang="en-US" sz="2400" dirty="0" smtClean="0"/>
+              <a:t>id</a:t>
+            </a:r>
+            <a:r>
+              <a:rPr lang="ru-RU" sz="2400" dirty="0" smtClean="0"/>
+              <a:t> </a:t>
+            </a:r>
+            <a:r>
+              <a:rPr lang="ru-RU" sz="2400" dirty="0"/>
+              <a:t>канала стоит его название.</a:t>
+            </a:r>
+          </a:p>
+        </p:txBody>
+      </p:sp>
+      <p:pic>
+        <p:nvPicPr>
+          <p:cNvPr id="5" name="Рисунок 4"/>
+          <p:cNvPicPr>
+            <a:picLocks noChangeAspect="1"/>
+          </p:cNvPicPr>
+          <p:nvPr/>
+        </p:nvPicPr>
+        <p:blipFill>
+          <a:blip r:embed="rId4"/>
+          <a:stretch>
+            <a:fillRect/>
+          </a:stretch>
+        </p:blipFill>
+        <p:spPr>
+          <a:xfrm>
+            <a:off x="439151" y="1614483"/>
+            <a:ext cx="6382641" cy="3572374"/>
           </a:xfrm>
           <a:prstGeom prst="rect">
             <a:avLst/>
@@ -4536,7 +4750,7 @@
     </p:spTree>
     <p:extLst>
       <p:ext uri="{BB962C8B-B14F-4D97-AF65-F5344CB8AC3E}">
-        <p14:creationId xmlns:p14="http://schemas.microsoft.com/office/powerpoint/2010/main" val="233078822"/>
+        <p14:creationId xmlns:p14="http://schemas.microsoft.com/office/powerpoint/2010/main" val="3607580541"/>
       </p:ext>
     </p:extLst>
   </p:cSld>
@@ -4596,7 +4810,7 @@
         </p:nvSpPr>
         <p:spPr>
           <a:xfrm>
-            <a:off x="524435" y="6383617"/>
+            <a:off x="515939" y="6393284"/>
             <a:ext cx="2743200" cy="365125"/>
           </a:xfrm>
           <a:prstGeom prst="rect">
@@ -4697,7 +4911,33 @@
                 <a:latin typeface="Arial" panose="020B0604020202020204" pitchFamily="34" charset="0"/>
                 <a:cs typeface="Arial" panose="020B0604020202020204" pitchFamily="34" charset="0"/>
               </a:rPr>
-              <a:t>Обработка и агрегация данных с </a:t>
+              <a:t>Аналитические запросы с использованием</a:t>
+            </a:r>
+          </a:p>
+          <a:p>
+            <a:r>
+              <a:rPr lang="ru-RU" sz="2800" dirty="0">
+                <a:effectLst/>
+                <a:latin typeface="Arial" panose="020B0604020202020204" pitchFamily="34" charset="0"/>
+                <a:cs typeface="Arial" panose="020B0604020202020204" pitchFamily="34" charset="0"/>
+              </a:rPr>
+              <a:t>Apache Hive в</a:t>
+            </a:r>
+            <a:r>
+              <a:rPr lang="en-US" sz="2800" dirty="0">
+                <a:effectLst/>
+                <a:latin typeface="Arial" panose="020B0604020202020204" pitchFamily="34" charset="0"/>
+                <a:cs typeface="Arial" panose="020B0604020202020204" pitchFamily="34" charset="0"/>
+              </a:rPr>
+              <a:t> </a:t>
+            </a:r>
+            <a:r>
+              <a:rPr lang="en-US" sz="2800" dirty="0" err="1" smtClean="0">
+                <a:effectLst/>
+                <a:latin typeface="Arial" panose="020B0604020202020204" pitchFamily="34" charset="0"/>
+                <a:cs typeface="Arial" panose="020B0604020202020204" pitchFamily="34" charset="0"/>
+              </a:rPr>
+              <a:t>RT.DataLake</a:t>
             </a:r>
             <a:r>
               <a:rPr lang="ru-RU" sz="2800" dirty="0" smtClean="0">
@@ -4705,33 +4945,7 @@
                 <a:latin typeface="Arial" panose="020B0604020202020204" pitchFamily="34" charset="0"/>
                 <a:cs typeface="Arial" panose="020B0604020202020204" pitchFamily="34" charset="0"/>
               </a:rPr>
-              <a:t>использованием</a:t>
-            </a:r>
-          </a:p>
-          <a:p>
-            <a:r>
-              <a:rPr lang="ru-RU" sz="2800" dirty="0" smtClean="0">
-                <a:effectLst/>
-                <a:latin typeface="Arial" panose="020B0604020202020204" pitchFamily="34" charset="0"/>
-                <a:cs typeface="Arial" panose="020B0604020202020204" pitchFamily="34" charset="0"/>
-              </a:rPr>
-              <a:t>Apache </a:t>
-            </a:r>
-            <a:r>
-              <a:rPr lang="ru-RU" sz="2800" dirty="0">
-                <a:effectLst/>
-                <a:latin typeface="Arial" panose="020B0604020202020204" pitchFamily="34" charset="0"/>
-                <a:cs typeface="Arial" panose="020B0604020202020204" pitchFamily="34" charset="0"/>
-              </a:rPr>
-              <a:t>Hive в</a:t>
-            </a:r>
-            <a:r>
-              <a:rPr lang="en-US" sz="2800" dirty="0">
-                <a:effectLst/>
-                <a:latin typeface="Arial" panose="020B0604020202020204" pitchFamily="34" charset="0"/>
-                <a:cs typeface="Arial" panose="020B0604020202020204" pitchFamily="34" charset="0"/>
-              </a:rPr>
-              <a:t> RT.DataLake</a:t>
+              <a:t>.</a:t>
             </a:r>
             <a:endParaRPr lang="ru-RU" sz="2800" dirty="0">
               <a:effectLst/>
@@ -4773,7 +4987,7 @@
       </p:pic>
       <p:pic>
         <p:nvPicPr>
-          <p:cNvPr id="13" name="Рисунок 12"/>
+          <p:cNvPr id="5" name="Рисунок 4"/>
           <p:cNvPicPr>
             <a:picLocks noChangeAspect="1"/>
           </p:cNvPicPr>
@@ -4787,8 +5001,8 @@
         </p:blipFill>
         <p:spPr>
           <a:xfrm>
-            <a:off x="2322998" y="5022167"/>
-            <a:ext cx="7392432" cy="1276528"/>
+            <a:off x="7645851" y="2083225"/>
+            <a:ext cx="3953427" cy="1171739"/>
           </a:xfrm>
           <a:prstGeom prst="rect">
             <a:avLst/>
@@ -4797,7 +5011,7 @@
       </p:pic>
       <p:pic>
         <p:nvPicPr>
-          <p:cNvPr id="2" name="Рисунок 1"/>
+          <p:cNvPr id="8" name="Рисунок 7"/>
           <p:cNvPicPr>
             <a:picLocks noChangeAspect="1"/>
           </p:cNvPicPr>
@@ -4811,95 +5025,42 @@
         </p:blipFill>
         <p:spPr>
           <a:xfrm>
-            <a:off x="436048" y="1671382"/>
-            <a:ext cx="4959124" cy="2970956"/>
+            <a:off x="7736351" y="3841376"/>
+            <a:ext cx="3772426" cy="1771897"/>
           </a:xfrm>
           <a:prstGeom prst="rect">
             <a:avLst/>
           </a:prstGeom>
         </p:spPr>
       </p:pic>
-      <p:sp>
-        <p:nvSpPr>
-          <p:cNvPr id="9" name="Объект 2"/>
-          <p:cNvSpPr>
-            <a:spLocks noGrp="1"/>
-          </p:cNvSpPr>
-          <p:nvPr>
-            <p:ph sz="half" idx="1"/>
-          </p:nvPr>
-        </p:nvSpPr>
-        <p:spPr>
-          <a:xfrm>
-            <a:off x="5880295" y="1459735"/>
-            <a:ext cx="5718983" cy="3378177"/>
-          </a:xfrm>
-        </p:spPr>
-        <p:txBody>
-          <a:bodyPr>
-            <a:noAutofit/>
-          </a:bodyPr>
-          <a:lstStyle/>
-          <a:p>
-            <a:pPr marL="0" indent="0" algn="just">
-              <a:buNone/>
-            </a:pPr>
-            <a:r>
-              <a:rPr lang="ru-RU" dirty="0" smtClean="0"/>
-              <a:t>Обработка </a:t>
-            </a:r>
-            <a:r>
-              <a:rPr lang="ru-RU" dirty="0"/>
-              <a:t>и агрегации данных </a:t>
-            </a:r>
-            <a:r>
-              <a:rPr lang="ru-RU" dirty="0" smtClean="0"/>
-              <a:t>реализована с </a:t>
-            </a:r>
-            <a:r>
-              <a:rPr lang="ru-RU" dirty="0"/>
-              <a:t>использованием СУБД Apache Hive, являющейся компонентом корпоративного хранилища данных </a:t>
-            </a:r>
-            <a:r>
-              <a:rPr lang="en-US" dirty="0"/>
-              <a:t>RT</a:t>
-            </a:r>
-            <a:r>
-              <a:rPr lang="ru-RU" dirty="0"/>
-              <a:t>.</a:t>
-            </a:r>
-            <a:r>
-              <a:rPr lang="en-US" dirty="0" err="1"/>
-              <a:t>DataLake</a:t>
-            </a:r>
-            <a:r>
-              <a:rPr lang="ru-RU" dirty="0" smtClean="0"/>
-              <a:t>. При это расположенные на </a:t>
-            </a:r>
-            <a:r>
-              <a:rPr lang="en-US" dirty="0" smtClean="0"/>
-              <a:t>HDFS </a:t>
-            </a:r>
-            <a:r>
-              <a:rPr lang="ru-RU" dirty="0" smtClean="0"/>
-              <a:t>сырые данные загружаются и преобразовываются в таблицы </a:t>
-            </a:r>
-            <a:r>
-              <a:rPr lang="en-US" dirty="0" smtClean="0"/>
-              <a:t>Hive</a:t>
-            </a:r>
-            <a:r>
-              <a:rPr lang="ru-RU" dirty="0" smtClean="0"/>
-              <a:t>.</a:t>
-            </a:r>
-            <a:endParaRPr lang="ru-RU" dirty="0"/>
-          </a:p>
-        </p:txBody>
-      </p:sp>
+      <p:pic>
+        <p:nvPicPr>
+          <p:cNvPr id="2" name="Рисунок 1"/>
+          <p:cNvPicPr>
+            <a:picLocks noChangeAspect="1"/>
+          </p:cNvPicPr>
+          <p:nvPr/>
+        </p:nvPicPr>
+        <p:blipFill>
+          <a:blip r:embed="rId5"/>
+          <a:stretch>
+            <a:fillRect/>
+          </a:stretch>
+        </p:blipFill>
+        <p:spPr>
+          <a:xfrm>
+            <a:off x="693996" y="2150183"/>
+            <a:ext cx="5325218" cy="3238952"/>
+          </a:xfrm>
+          <a:prstGeom prst="rect">
+            <a:avLst/>
+          </a:prstGeom>
+        </p:spPr>
+      </p:pic>
     </p:spTree>
     <p:extLst>
       <p:ext uri="{BB962C8B-B14F-4D97-AF65-F5344CB8AC3E}">
-        <p14:creationId xmlns:p14="http://schemas.microsoft.com/office/powerpoint/2010/main" val="288046697"/>
+        <p14:creationId xmlns:p14="http://schemas.microsoft.com/office/powerpoint/2010/main" val="4232252842"/>
       </p:ext>
     </p:extLst>
   </p:cSld>
@@ -5017,7 +5178,7 @@
         <p:spPr>
           <a:xfrm>
             <a:off x="439151" y="560538"/>
-            <a:ext cx="11160127" cy="1025922"/>
+            <a:ext cx="11160127" cy="512961"/>
           </a:xfrm>
           <a:prstGeom prst="rect">
             <a:avLst/>
@@ -5057,30 +5218,10 @@
             <a:r>
               <a:rPr lang="ru-RU" sz="2800" dirty="0">
                 <a:effectLst/>
-                <a:latin typeface="Arial" panose="020B0604020202020204" pitchFamily="34" charset="0"/>
-                <a:cs typeface="Arial" panose="020B0604020202020204" pitchFamily="34" charset="0"/>
-              </a:rPr>
-              <a:t>Обработка и агрегация данных с использованием</a:t>
-            </a:r>
-          </a:p>
-          <a:p>
-            <a:r>
-              <a:rPr lang="ru-RU" sz="2800" dirty="0">
-                <a:effectLst/>
-                <a:latin typeface="Arial" panose="020B0604020202020204" pitchFamily="34" charset="0"/>
-                <a:cs typeface="Arial" panose="020B0604020202020204" pitchFamily="34" charset="0"/>
-              </a:rPr>
-              <a:t>Apache Hive в</a:t>
-            </a:r>
-            <a:r>
-              <a:rPr lang="en-US" sz="2800" dirty="0">
-                <a:effectLst/>
-                <a:latin typeface="Arial" panose="020B0604020202020204" pitchFamily="34" charset="0"/>
-                <a:cs typeface="Arial" panose="020B0604020202020204" pitchFamily="34" charset="0"/>
-              </a:rPr>
-              <a:t> RT.DataLake</a:t>
-            </a:r>
-            <a:endParaRPr lang="ru-RU" sz="2800" dirty="0">
+              </a:rPr>
+              <a:t>Перенос данных в GreenPlum (RT.Warehouse)</a:t>
+            </a:r>
+            <a:endParaRPr lang="ru-RU" sz="2800" b="1" dirty="0">
               <a:effectLst/>
               <a:latin typeface="Arial" panose="020B0604020202020204" pitchFamily="34" charset="0"/>
               <a:cs typeface="Arial" panose="020B0604020202020204" pitchFamily="34" charset="0"/>
@@ -5118,9 +5259,145 @@
           </a:prstGeom>
         </p:spPr>
       </p:pic>
+      <p:sp>
+        <p:nvSpPr>
+          <p:cNvPr id="8" name="Заголовок 1">
+            <a:extLst>
+              <a:ext uri="{FF2B5EF4-FFF2-40B4-BE49-F238E27FC236}">
+                <a16:creationId xmlns:a16="http://schemas.microsoft.com/office/drawing/2014/main" id="{26F3F6DE-0B95-4A88-A2DE-D547275A4F55}"/>
+              </a:ext>
+            </a:extLst>
+          </p:cNvPr>
+          <p:cNvSpPr txBox="1">
+            <a:spLocks/>
+          </p:cNvSpPr>
+          <p:nvPr/>
+        </p:nvSpPr>
+        <p:spPr>
+          <a:xfrm>
+            <a:off x="515939" y="1212575"/>
+            <a:ext cx="8276369" cy="3050450"/>
+          </a:xfrm>
+          <a:prstGeom prst="rect">
+            <a:avLst/>
+          </a:prstGeom>
+        </p:spPr>
+        <p:txBody>
+          <a:bodyPr wrap="square" lIns="0" tIns="0" rIns="0" bIns="0" anchor="t" anchorCtr="0">
+            <a:spAutoFit/>
+          </a:bodyPr>
+          <a:lstStyle>
+            <a:defPPr>
+              <a:defRPr lang="ru-RU"/>
+            </a:defPPr>
+            <a:lvl1pPr>
+              <a:lnSpc>
+                <a:spcPts val="4000"/>
+              </a:lnSpc>
+              <a:spcBef>
+                <a:spcPct val="0"/>
+              </a:spcBef>
+              <a:buNone/>
+              <a:defRPr sz="2800" b="0">
+                <a:effectLst/>
+                <a:latin typeface="Rostelecom Basis Medium" panose="020B0603030604040103" pitchFamily="34" charset="0"/>
+                <a:ea typeface="+mj-ea"/>
+                <a:cs typeface="+mj-cs"/>
+              </a:defRPr>
+            </a:lvl1pPr>
+          </a:lstStyle>
+          <a:p>
+            <a:pPr>
+              <a:lnSpc>
+                <a:spcPts val="3000"/>
+              </a:lnSpc>
+            </a:pPr>
+            <a:r>
+              <a:rPr lang="ru-RU" sz="2400" dirty="0" smtClean="0"/>
+              <a:t>Перенос </a:t>
+            </a:r>
+            <a:r>
+              <a:rPr lang="ru-RU" sz="2400" dirty="0"/>
+              <a:t>обработанных данных из </a:t>
+            </a:r>
+            <a:r>
+              <a:rPr lang="en-US" sz="2400" dirty="0"/>
+              <a:t>Hive </a:t>
+            </a:r>
+            <a:r>
+              <a:rPr lang="ru-RU" sz="2400" dirty="0"/>
+              <a:t>в массивно-параллельную СУБД </a:t>
+            </a:r>
+            <a:r>
+              <a:rPr lang="en-US" sz="2400" dirty="0"/>
+              <a:t>GreenPlum</a:t>
+            </a:r>
+            <a:r>
+              <a:rPr lang="ru-RU" sz="2400" dirty="0"/>
+              <a:t> (компонент </a:t>
+            </a:r>
+            <a:r>
+              <a:rPr lang="en-US" sz="2400" dirty="0"/>
+              <a:t>RT</a:t>
+            </a:r>
+            <a:r>
+              <a:rPr lang="ru-RU" sz="2400" dirty="0"/>
+              <a:t>.</a:t>
+            </a:r>
+            <a:r>
+              <a:rPr lang="en-US" sz="2400" dirty="0"/>
+              <a:t>Warehouse</a:t>
+            </a:r>
+            <a:r>
+              <a:rPr lang="ru-RU" sz="2400" dirty="0" smtClean="0"/>
+              <a:t>) при </a:t>
+            </a:r>
+            <a:r>
+              <a:rPr lang="ru-RU" sz="2400" dirty="0"/>
+              <a:t>помощи </a:t>
+            </a:r>
+            <a:r>
+              <a:rPr lang="en-US" sz="2400" dirty="0"/>
+              <a:t>ETL</a:t>
+            </a:r>
+            <a:r>
+              <a:rPr lang="ru-RU" sz="2400" dirty="0"/>
+              <a:t> процесса – ориентированного ациклического графа </a:t>
+            </a:r>
+            <a:r>
+              <a:rPr lang="en-US" sz="2400" dirty="0"/>
+              <a:t>Airflow </a:t>
+            </a:r>
+            <a:r>
+              <a:rPr lang="en-US" sz="2400" dirty="0" smtClean="0"/>
+              <a:t>DAG</a:t>
+            </a:r>
+            <a:r>
+              <a:rPr lang="ru-RU" sz="2400" dirty="0" smtClean="0"/>
+              <a:t>. В </a:t>
+            </a:r>
+            <a:r>
+              <a:rPr lang="en-US" sz="2400" dirty="0" err="1" smtClean="0"/>
+              <a:t>Greenplum</a:t>
+            </a:r>
+            <a:r>
+              <a:rPr lang="en-US" sz="2400" dirty="0" smtClean="0"/>
+              <a:t> SQL</a:t>
+            </a:r>
+            <a:r>
+              <a:rPr lang="ru-RU" sz="2400" dirty="0" smtClean="0"/>
+              <a:t>-диалект свежее и можно построить более сложный запрос – например распределение количества просмотров в разрезе каждого часа.</a:t>
+            </a:r>
+            <a:endParaRPr lang="ru-RU" sz="2400" dirty="0">
+              <a:latin typeface="Arial" panose="020B0604020202020204" pitchFamily="34" charset="0"/>
+              <a:cs typeface="Arial" panose="020B0604020202020204" pitchFamily="34" charset="0"/>
+            </a:endParaRPr>
+          </a:p>
+        </p:txBody>
+      </p:sp>
       <p:pic>
         <p:nvPicPr>
-          <p:cNvPr id="4" name="Рисунок 3"/>
+          <p:cNvPr id="9" name="Рисунок 8"/>
           <p:cNvPicPr>
             <a:picLocks noChangeAspect="1"/>
           </p:cNvPicPr>
@@ -5134,87 +5411,17 @@
         </p:blipFill>
         <p:spPr>
           <a:xfrm>
-            <a:off x="1985389" y="5290423"/>
-            <a:ext cx="8221222" cy="1200318"/>
+            <a:off x="9293906" y="1404936"/>
+            <a:ext cx="2305372" cy="4677428"/>
           </a:xfrm>
           <a:prstGeom prst="rect">
             <a:avLst/>
           </a:prstGeom>
         </p:spPr>
       </p:pic>
-      <p:sp>
-        <p:nvSpPr>
-          <p:cNvPr id="8" name="Прямоугольник 7"/>
-          <p:cNvSpPr/>
-          <p:nvPr/>
-        </p:nvSpPr>
-        <p:spPr>
-          <a:xfrm>
-            <a:off x="7188591" y="1586460"/>
-            <a:ext cx="4410687" cy="3046988"/>
-          </a:xfrm>
-          <a:prstGeom prst="rect">
-            <a:avLst/>
-          </a:prstGeom>
-        </p:spPr>
-        <p:txBody>
-          <a:bodyPr wrap="square">
-            <a:spAutoFit/>
-          </a:bodyPr>
-          <a:lstStyle/>
-          <a:p>
-            <a:pPr algn="r"/>
-            <a:r>
-              <a:rPr lang="ru-RU" sz="2400" dirty="0"/>
-              <a:t>Для агрегации нескольких таблиц в одну </a:t>
-            </a:r>
-            <a:r>
-              <a:rPr lang="ru-RU" sz="2400" dirty="0" smtClean="0"/>
-              <a:t>используется виртуальная таблица. </a:t>
-            </a:r>
-            <a:r>
-              <a:rPr lang="ru-RU" sz="2400" dirty="0"/>
-              <a:t>В ней уже нет колонки со статусом начала и конца сессии, а </a:t>
-            </a:r>
-            <a:r>
-              <a:rPr lang="ru-RU" sz="2400" dirty="0" smtClean="0"/>
-              <a:t> </a:t>
-            </a:r>
-            <a:r>
-              <a:rPr lang="ru-RU" sz="2400" dirty="0"/>
-              <a:t>непосредственно указаны </a:t>
-            </a:r>
-            <a:r>
-              <a:rPr lang="ru-RU" sz="2400" dirty="0" smtClean="0"/>
-              <a:t>ее время </a:t>
-            </a:r>
-            <a:r>
-              <a:rPr lang="ru-RU" sz="2400" dirty="0"/>
-              <a:t>начали и конца. </a:t>
-            </a:r>
-            <a:r>
-              <a:rPr lang="ru-RU" sz="2400" dirty="0" smtClean="0"/>
-              <a:t>Вместо </a:t>
-            </a:r>
-            <a:r>
-              <a:rPr lang="en-US" sz="2400" dirty="0" smtClean="0"/>
-              <a:t>id</a:t>
-            </a:r>
-            <a:r>
-              <a:rPr lang="ru-RU" sz="2400" dirty="0" smtClean="0"/>
-              <a:t> </a:t>
-            </a:r>
-            <a:r>
-              <a:rPr lang="ru-RU" sz="2400" dirty="0"/>
-              <a:t>канала стоит его название.</a:t>
-            </a:r>
-            <a:endParaRPr lang="ru-RU" sz="2400" dirty="0"/>
-          </a:p>
-        </p:txBody>
-      </p:sp>
       <p:pic>
         <p:nvPicPr>
-          <p:cNvPr id="5" name="Рисунок 4"/>
+          <p:cNvPr id="12" name="Рисунок 11"/>
           <p:cNvPicPr>
             <a:picLocks noChangeAspect="1"/>
           </p:cNvPicPr>
@@ -5228,8 +5435,32 @@
         </p:blipFill>
         <p:spPr>
           <a:xfrm>
-            <a:off x="439151" y="1614483"/>
-            <a:ext cx="6382641" cy="3572374"/>
+            <a:off x="5326589" y="4330721"/>
+            <a:ext cx="3572374" cy="1781424"/>
+          </a:xfrm>
+          <a:prstGeom prst="rect">
+            <a:avLst/>
+          </a:prstGeom>
+        </p:spPr>
+      </p:pic>
+      <p:pic>
+        <p:nvPicPr>
+          <p:cNvPr id="3" name="Рисунок 2"/>
+          <p:cNvPicPr>
+            <a:picLocks noChangeAspect="1"/>
+          </p:cNvPicPr>
+          <p:nvPr/>
+        </p:nvPicPr>
+        <p:blipFill>
+          <a:blip r:embed="rId5"/>
+          <a:stretch>
+            <a:fillRect/>
+          </a:stretch>
+        </p:blipFill>
+        <p:spPr>
+          <a:xfrm>
+            <a:off x="515939" y="4330721"/>
+            <a:ext cx="4419600" cy="2162175"/>
           </a:xfrm>
           <a:prstGeom prst="rect">
             <a:avLst/>
@@ -5239,7 +5470,7 @@
     </p:spTree>
     <p:extLst>
       <p:ext uri="{BB962C8B-B14F-4D97-AF65-F5344CB8AC3E}">
-        <p14:creationId xmlns:p14="http://schemas.microsoft.com/office/powerpoint/2010/main" val="3607580541"/>
+        <p14:creationId xmlns:p14="http://schemas.microsoft.com/office/powerpoint/2010/main" val="1214712092"/>
       </p:ext>
     </p:extLst>
   </p:cSld>
@@ -5342,7 +5573,7 @@
       </p:sp>
       <p:sp>
         <p:nvSpPr>
-          <p:cNvPr id="6" name="Заголовок 1">
+          <p:cNvPr id="5" name="Заголовок 1">
             <a:extLst>
               <a:ext uri="{FF2B5EF4-FFF2-40B4-BE49-F238E27FC236}">
                 <a16:creationId xmlns:a16="http://schemas.microsoft.com/office/drawing/2014/main" id="{26F3F6DE-0B95-4A88-A2DE-D547275A4F55}"/>
@@ -5356,8 +5587,77 @@
         </p:nvSpPr>
         <p:spPr>
           <a:xfrm>
+            <a:off x="439151" y="1189997"/>
+            <a:ext cx="4930708" cy="512961"/>
+          </a:xfrm>
+          <a:prstGeom prst="rect">
+            <a:avLst/>
+          </a:prstGeom>
+        </p:spPr>
+        <p:txBody>
+          <a:bodyPr wrap="square" lIns="0" tIns="0" rIns="0" bIns="0" anchor="t" anchorCtr="0">
+            <a:spAutoFit/>
+          </a:bodyPr>
+          <a:lstStyle>
+            <a:defPPr>
+              <a:defRPr lang="ru-RU"/>
+            </a:defPPr>
+            <a:lvl1pPr>
+              <a:lnSpc>
+                <a:spcPts val="4000"/>
+              </a:lnSpc>
+              <a:spcBef>
+                <a:spcPct val="0"/>
+              </a:spcBef>
+              <a:buNone/>
+              <a:defRPr sz="2800" b="0">
+                <a:effectLst/>
+                <a:latin typeface="Rostelecom Basis Medium" panose="020B0603030604040103" pitchFamily="34" charset="0"/>
+                <a:ea typeface="+mj-ea"/>
+                <a:cs typeface="+mj-cs"/>
+              </a:defRPr>
+            </a:lvl1pPr>
+          </a:lstStyle>
+          <a:p>
+            <a:r>
+              <a:rPr lang="ru-RU" sz="2000" dirty="0" smtClean="0">
+                <a:latin typeface="Arial" panose="020B0604020202020204" pitchFamily="34" charset="0"/>
+                <a:cs typeface="Arial" panose="020B0604020202020204" pitchFamily="34" charset="0"/>
+              </a:rPr>
+              <a:t>Загружаем виртуальную таблицу из </a:t>
+            </a:r>
+            <a:r>
+              <a:rPr lang="en-US" sz="2000" dirty="0" smtClean="0">
+                <a:latin typeface="Arial" panose="020B0604020202020204" pitchFamily="34" charset="0"/>
+                <a:cs typeface="Arial" panose="020B0604020202020204" pitchFamily="34" charset="0"/>
+              </a:rPr>
+              <a:t>Hive</a:t>
+            </a:r>
+            <a:endParaRPr lang="ru-RU" sz="2000" dirty="0">
+              <a:latin typeface="Arial" panose="020B0604020202020204" pitchFamily="34" charset="0"/>
+              <a:cs typeface="Arial" panose="020B0604020202020204" pitchFamily="34" charset="0"/>
+            </a:endParaRPr>
+          </a:p>
+        </p:txBody>
+      </p:sp>
+      <p:sp>
+        <p:nvSpPr>
+          <p:cNvPr id="6" name="Заголовок 1">
+            <a:extLst>
+              <a:ext uri="{FF2B5EF4-FFF2-40B4-BE49-F238E27FC236}">
+                <a16:creationId xmlns:a16="http://schemas.microsoft.com/office/drawing/2014/main" id="{26F3F6DE-0B95-4A88-A2DE-D547275A4F55}"/>
+              </a:ext>
+            </a:extLst>
+          </p:cNvPr>
+          <p:cNvSpPr txBox="1">
+            <a:spLocks/>
+          </p:cNvSpPr>
+          <p:nvPr/>
+        </p:nvSpPr>
+        <p:spPr>
+          <a:xfrm>
             <a:off x="439151" y="560538"/>
-            <a:ext cx="11160127" cy="1025922"/>
+            <a:ext cx="11160127" cy="512961"/>
           </a:xfrm>
           <a:prstGeom prst="rect">
             <a:avLst/>
@@ -5395,49 +5695,38 @@
           </a:lstStyle>
           <a:p>
             <a:r>
-              <a:rPr lang="ru-RU" sz="2800" dirty="0">
-                <a:effectLst/>
-                <a:latin typeface="Arial" panose="020B0604020202020204" pitchFamily="34" charset="0"/>
-                <a:cs typeface="Arial" panose="020B0604020202020204" pitchFamily="34" charset="0"/>
-              </a:rPr>
-              <a:t>Обработка и агрегация данных с использованием</a:t>
-            </a:r>
-          </a:p>
-          <a:p>
-            <a:r>
-              <a:rPr lang="ru-RU" sz="2800" dirty="0">
-                <a:effectLst/>
-                <a:latin typeface="Arial" panose="020B0604020202020204" pitchFamily="34" charset="0"/>
-                <a:cs typeface="Arial" panose="020B0604020202020204" pitchFamily="34" charset="0"/>
-              </a:rPr>
-              <a:t>Apache Hive в</a:t>
-            </a:r>
-            <a:r>
-              <a:rPr lang="en-US" sz="2800" dirty="0">
-                <a:effectLst/>
-                <a:latin typeface="Arial" panose="020B0604020202020204" pitchFamily="34" charset="0"/>
-                <a:cs typeface="Arial" panose="020B0604020202020204" pitchFamily="34" charset="0"/>
-              </a:rPr>
-              <a:t> </a:t>
-            </a:r>
-            <a:r>
-              <a:rPr lang="en-US" sz="2800" dirty="0" smtClean="0">
-                <a:effectLst/>
-                <a:latin typeface="Arial" panose="020B0604020202020204" pitchFamily="34" charset="0"/>
-                <a:cs typeface="Arial" panose="020B0604020202020204" pitchFamily="34" charset="0"/>
-              </a:rPr>
-              <a:t>RT.DataLake</a:t>
-            </a:r>
-            <a:r>
-              <a:rPr lang="ru-RU" sz="2800" dirty="0" smtClean="0">
-                <a:effectLst/>
-                <a:latin typeface="Arial" panose="020B0604020202020204" pitchFamily="34" charset="0"/>
-                <a:cs typeface="Arial" panose="020B0604020202020204" pitchFamily="34" charset="0"/>
-              </a:rPr>
-              <a:t>. Аналитические запросы.</a:t>
-            </a:r>
-            <a:endParaRPr lang="ru-RU" sz="2800" dirty="0">
-              <a:effectLst/>
+              <a:rPr lang="ru-RU" sz="3200" dirty="0">
+                <a:effectLst/>
+                <a:latin typeface="Arial" panose="020B0604020202020204" pitchFamily="34" charset="0"/>
+                <a:cs typeface="Arial" panose="020B0604020202020204" pitchFamily="34" charset="0"/>
+              </a:rPr>
+              <a:t>Аналитика </a:t>
+            </a:r>
+            <a:r>
+              <a:rPr lang="ru-RU" sz="3200" dirty="0" smtClean="0">
+                <a:effectLst/>
+                <a:latin typeface="Arial" panose="020B0604020202020204" pitchFamily="34" charset="0"/>
+                <a:cs typeface="Arial" panose="020B0604020202020204" pitchFamily="34" charset="0"/>
+              </a:rPr>
+              <a:t>(</a:t>
+            </a:r>
+            <a:r>
+              <a:rPr lang="ru-RU" sz="3200" dirty="0">
+                <a:effectLst/>
+                <a:latin typeface="Arial" panose="020B0604020202020204" pitchFamily="34" charset="0"/>
+                <a:cs typeface="Arial" panose="020B0604020202020204" pitchFamily="34" charset="0"/>
+              </a:rPr>
+              <a:t>Apache Zeppelin + Apache </a:t>
+            </a:r>
+            <a:r>
+              <a:rPr lang="ru-RU" sz="3200" dirty="0" smtClean="0">
+                <a:effectLst/>
+                <a:latin typeface="Arial" panose="020B0604020202020204" pitchFamily="34" charset="0"/>
+                <a:cs typeface="Arial" panose="020B0604020202020204" pitchFamily="34" charset="0"/>
+              </a:rPr>
+              <a:t>Spark)</a:t>
+            </a:r>
+            <a:endParaRPr lang="ru-RU" sz="3200" b="1" dirty="0">
               <a:latin typeface="Arial" panose="020B0604020202020204" pitchFamily="34" charset="0"/>
               <a:cs typeface="Arial" panose="020B0604020202020204" pitchFamily="34" charset="0"/>
             </a:endParaRPr>
@@ -5476,7 +5765,7 @@
       </p:pic>
       <p:pic>
         <p:nvPicPr>
-          <p:cNvPr id="5" name="Рисунок 4"/>
+          <p:cNvPr id="8" name="Рисунок 7"/>
           <p:cNvPicPr>
             <a:picLocks noChangeAspect="1"/>
           </p:cNvPicPr>
@@ -5490,8 +5779,8 @@
         </p:blipFill>
         <p:spPr>
           <a:xfrm>
-            <a:off x="7645851" y="2083225"/>
-            <a:ext cx="3953427" cy="1171739"/>
+            <a:off x="5931112" y="1696804"/>
+            <a:ext cx="5668166" cy="4696480"/>
           </a:xfrm>
           <a:prstGeom prst="rect">
             <a:avLst/>
@@ -5500,7 +5789,7 @@
       </p:pic>
       <p:pic>
         <p:nvPicPr>
-          <p:cNvPr id="8" name="Рисунок 7"/>
+          <p:cNvPr id="2" name="Рисунок 1"/>
           <p:cNvPicPr>
             <a:picLocks noChangeAspect="1"/>
           </p:cNvPicPr>
@@ -5514,32 +5803,8 @@
         </p:blipFill>
         <p:spPr>
           <a:xfrm>
-            <a:off x="7736351" y="3841376"/>
-            <a:ext cx="3772426" cy="1771897"/>
-          </a:xfrm>
-          <a:prstGeom prst="rect">
-            <a:avLst/>
-          </a:prstGeom>
-        </p:spPr>
-      </p:pic>
-      <p:pic>
-        <p:nvPicPr>
-          <p:cNvPr id="2" name="Рисунок 1"/>
-          <p:cNvPicPr>
-            <a:picLocks noChangeAspect="1"/>
-          </p:cNvPicPr>
-          <p:nvPr/>
-        </p:nvPicPr>
-        <p:blipFill>
-          <a:blip r:embed="rId5"/>
-          <a:stretch>
-            <a:fillRect/>
-          </a:stretch>
-        </p:blipFill>
-        <p:spPr>
-          <a:xfrm>
-            <a:off x="693996" y="2150183"/>
-            <a:ext cx="5325218" cy="3238952"/>
+            <a:off x="439151" y="2039751"/>
+            <a:ext cx="5001323" cy="4353533"/>
           </a:xfrm>
           <a:prstGeom prst="rect">
             <a:avLst/>
@@ -5549,7 +5814,7 @@
     </p:spTree>
     <p:extLst>
       <p:ext uri="{BB962C8B-B14F-4D97-AF65-F5344CB8AC3E}">
-        <p14:creationId xmlns:p14="http://schemas.microsoft.com/office/powerpoint/2010/main" val="4232252842"/>
+        <p14:creationId xmlns:p14="http://schemas.microsoft.com/office/powerpoint/2010/main" val="929180253"/>
       </p:ext>
     </p:extLst>
   </p:cSld>
@@ -5705,13 +5970,14 @@
           </a:lstStyle>
           <a:p>
             <a:r>
-              <a:rPr lang="ru-RU" sz="2800" dirty="0">
-                <a:effectLst/>
-              </a:rPr>
-              <a:t>Перенос данных в GreenPlum (RT.Warehouse)</a:t>
-            </a:r>
-            <a:endParaRPr lang="ru-RU" sz="2800" b="1" dirty="0">
-              <a:effectLst/>
+              <a:rPr lang="ru-RU" sz="3200" dirty="0">
+                <a:effectLst/>
+                <a:latin typeface="Arial" panose="020B0604020202020204" pitchFamily="34" charset="0"/>
+                <a:cs typeface="Arial" panose="020B0604020202020204" pitchFamily="34" charset="0"/>
+              </a:rPr>
+              <a:t>Аналитика (Apache Zeppelin + Apache Spark)</a:t>
+            </a:r>
+            <a:endParaRPr lang="ru-RU" sz="3200" b="1" dirty="0">
               <a:latin typeface="Arial" panose="020B0604020202020204" pitchFamily="34" charset="0"/>
               <a:cs typeface="Arial" panose="020B0604020202020204" pitchFamily="34" charset="0"/>
             </a:endParaRPr>
@@ -5748,146 +6014,6 @@
           </a:prstGeom>
         </p:spPr>
       </p:pic>
-      <p:sp>
-        <p:nvSpPr>
-          <p:cNvPr id="8" name="Заголовок 1">
-            <a:extLst>
-              <a:ext uri="{FF2B5EF4-FFF2-40B4-BE49-F238E27FC236}">
-                <a16:creationId xmlns:a16="http://schemas.microsoft.com/office/drawing/2014/main" id="{26F3F6DE-0B95-4A88-A2DE-D547275A4F55}"/>
-              </a:ext>
-            </a:extLst>
-          </p:cNvPr>
-          <p:cNvSpPr txBox="1">
-            <a:spLocks/>
-          </p:cNvSpPr>
-          <p:nvPr/>
-        </p:nvSpPr>
-        <p:spPr>
-          <a:xfrm>
-            <a:off x="515939" y="1212575"/>
-            <a:ext cx="8276369" cy="3050450"/>
-          </a:xfrm>
-          <a:prstGeom prst="rect">
-            <a:avLst/>
-          </a:prstGeom>
-        </p:spPr>
-        <p:txBody>
-          <a:bodyPr wrap="square" lIns="0" tIns="0" rIns="0" bIns="0" anchor="t" anchorCtr="0">
-            <a:spAutoFit/>
-          </a:bodyPr>
-          <a:lstStyle>
-            <a:defPPr>
-              <a:defRPr lang="ru-RU"/>
-            </a:defPPr>
-            <a:lvl1pPr>
-              <a:lnSpc>
-                <a:spcPts val="4000"/>
-              </a:lnSpc>
-              <a:spcBef>
-                <a:spcPct val="0"/>
-              </a:spcBef>
-              <a:buNone/>
-              <a:defRPr sz="2800" b="0">
-                <a:effectLst/>
-                <a:latin typeface="Rostelecom Basis Medium" panose="020B0603030604040103" pitchFamily="34" charset="0"/>
-                <a:ea typeface="+mj-ea"/>
-                <a:cs typeface="+mj-cs"/>
-              </a:defRPr>
-            </a:lvl1pPr>
-          </a:lstStyle>
-          <a:p>
-            <a:pPr>
-              <a:lnSpc>
-                <a:spcPts val="3000"/>
-              </a:lnSpc>
-            </a:pPr>
-            <a:r>
-              <a:rPr lang="ru-RU" sz="2400" dirty="0" smtClean="0"/>
-              <a:t>Перенос </a:t>
-            </a:r>
-            <a:r>
-              <a:rPr lang="ru-RU" sz="2400" dirty="0"/>
-              <a:t>обработанных данных из </a:t>
-            </a:r>
-            <a:r>
-              <a:rPr lang="en-US" sz="2400" dirty="0"/>
-              <a:t>Hive </a:t>
-            </a:r>
-            <a:r>
-              <a:rPr lang="ru-RU" sz="2400" dirty="0"/>
-              <a:t>в массивно-параллельную СУБД </a:t>
-            </a:r>
-            <a:r>
-              <a:rPr lang="en-US" sz="2400" dirty="0"/>
-              <a:t>GreenPlum</a:t>
-            </a:r>
-            <a:r>
-              <a:rPr lang="ru-RU" sz="2400" dirty="0"/>
-              <a:t> (компонент </a:t>
-            </a:r>
-            <a:r>
-              <a:rPr lang="en-US" sz="2400" dirty="0"/>
-              <a:t>RT</a:t>
-            </a:r>
-            <a:r>
-              <a:rPr lang="ru-RU" sz="2400" dirty="0"/>
-              <a:t>.</a:t>
-            </a:r>
-            <a:r>
-              <a:rPr lang="en-US" sz="2400" dirty="0"/>
-              <a:t>Warehouse</a:t>
-            </a:r>
-            <a:r>
-              <a:rPr lang="ru-RU" sz="2400" dirty="0" smtClean="0"/>
-              <a:t>) </a:t>
-            </a:r>
-            <a:r>
-              <a:rPr lang="ru-RU" sz="2400" dirty="0" smtClean="0"/>
-              <a:t>реализован при </a:t>
-            </a:r>
-            <a:r>
-              <a:rPr lang="ru-RU" sz="2400" dirty="0"/>
-              <a:t>помощи </a:t>
-            </a:r>
-            <a:r>
-              <a:rPr lang="en-US" sz="2400" dirty="0"/>
-              <a:t>ETL</a:t>
-            </a:r>
-            <a:r>
-              <a:rPr lang="ru-RU" sz="2400" dirty="0"/>
-              <a:t> процесса – ориентированного ациклического графа </a:t>
-            </a:r>
-            <a:r>
-              <a:rPr lang="en-US" sz="2400" dirty="0"/>
-              <a:t>Airflow </a:t>
-            </a:r>
-            <a:r>
-              <a:rPr lang="en-US" sz="2400" dirty="0" smtClean="0"/>
-              <a:t>DAG</a:t>
-            </a:r>
-            <a:r>
-              <a:rPr lang="ru-RU" sz="2400" dirty="0" smtClean="0"/>
-              <a:t>. В </a:t>
-            </a:r>
-            <a:r>
-              <a:rPr lang="en-US" sz="2400" dirty="0" err="1" smtClean="0"/>
-              <a:t>Greenplum</a:t>
-            </a:r>
-            <a:r>
-              <a:rPr lang="en-US" sz="2400" dirty="0" smtClean="0"/>
-              <a:t> SQL</a:t>
-            </a:r>
-            <a:r>
-              <a:rPr lang="ru-RU" sz="2400" dirty="0" smtClean="0"/>
-              <a:t>-диалект свежее и можно построить более сложный запрос – например распределение количества просмотров в разрезе каждого часа.</a:t>
-            </a:r>
-            <a:endParaRPr lang="ru-RU" sz="2400" dirty="0">
-              <a:latin typeface="Arial" panose="020B0604020202020204" pitchFamily="34" charset="0"/>
-              <a:cs typeface="Arial" panose="020B0604020202020204" pitchFamily="34" charset="0"/>
-            </a:endParaRPr>
-          </a:p>
-        </p:txBody>
-      </p:sp>
       <p:pic>
         <p:nvPicPr>
           <p:cNvPr id="9" name="Рисунок 8"/>
@@ -5904,8 +6030,8 @@
         </p:blipFill>
         <p:spPr>
           <a:xfrm>
-            <a:off x="9293906" y="1404936"/>
-            <a:ext cx="2305372" cy="4677428"/>
+            <a:off x="5909313" y="1324792"/>
+            <a:ext cx="5572903" cy="1324160"/>
           </a:xfrm>
           <a:prstGeom prst="rect">
             <a:avLst/>
@@ -5914,7 +6040,7 @@
       </p:pic>
       <p:pic>
         <p:nvPicPr>
-          <p:cNvPr id="12" name="Рисунок 11"/>
+          <p:cNvPr id="10" name="Рисунок 9"/>
           <p:cNvPicPr>
             <a:picLocks noChangeAspect="1"/>
           </p:cNvPicPr>
@@ -5928,8 +6054,8 @@
         </p:blipFill>
         <p:spPr>
           <a:xfrm>
-            <a:off x="5326589" y="4330721"/>
-            <a:ext cx="3572374" cy="1781424"/>
+            <a:off x="5909313" y="2820426"/>
+            <a:ext cx="5830114" cy="3715268"/>
           </a:xfrm>
           <a:prstGeom prst="rect">
             <a:avLst/>
@@ -5952,8 +6078,32 @@
         </p:blipFill>
         <p:spPr>
           <a:xfrm>
-            <a:off x="515939" y="4330721"/>
-            <a:ext cx="4419600" cy="2162175"/>
+            <a:off x="515939" y="1220003"/>
+            <a:ext cx="4277322" cy="1428949"/>
+          </a:xfrm>
+          <a:prstGeom prst="rect">
+            <a:avLst/>
+          </a:prstGeom>
+        </p:spPr>
+      </p:pic>
+      <p:pic>
+        <p:nvPicPr>
+          <p:cNvPr id="5" name="Рисунок 4"/>
+          <p:cNvPicPr>
+            <a:picLocks noChangeAspect="1"/>
+          </p:cNvPicPr>
+          <p:nvPr/>
+        </p:nvPicPr>
+        <p:blipFill>
+          <a:blip r:embed="rId6"/>
+          <a:stretch>
+            <a:fillRect/>
+          </a:stretch>
+        </p:blipFill>
+        <p:spPr>
+          <a:xfrm>
+            <a:off x="963676" y="2939747"/>
+            <a:ext cx="3381847" cy="3162741"/>
           </a:xfrm>
           <a:prstGeom prst="rect">
             <a:avLst/>
@@ -5963,7 +6113,7 @@
     </p:spTree>
     <p:extLst>
       <p:ext uri="{BB962C8B-B14F-4D97-AF65-F5344CB8AC3E}">
-        <p14:creationId xmlns:p14="http://schemas.microsoft.com/office/powerpoint/2010/main" val="1214712092"/>
+        <p14:creationId xmlns:p14="http://schemas.microsoft.com/office/powerpoint/2010/main" val="2997639442"/>
       </p:ext>
     </p:extLst>
   </p:cSld>
@@ -6119,12 +6269,24 @@
           </a:lstStyle>
           <a:p>
             <a:r>
-              <a:rPr lang="ru-RU" sz="2800" dirty="0">
-                <a:effectLst/>
-              </a:rPr>
-              <a:t>Перенос данных в GreenPlum (RT.Warehouse)</a:t>
-            </a:r>
-            <a:endParaRPr lang="ru-RU" sz="2800" b="1" dirty="0">
+              <a:rPr lang="ru-RU" sz="3200" dirty="0">
+                <a:effectLst/>
+              </a:rPr>
+              <a:t>Визуализация данных </a:t>
+            </a:r>
+            <a:r>
+              <a:rPr lang="ru-RU" sz="3200" dirty="0" smtClean="0">
+                <a:effectLst/>
+              </a:rPr>
+              <a:t>в Apache </a:t>
+            </a:r>
+            <a:r>
+              <a:rPr lang="ru-RU" sz="3200" dirty="0">
+                <a:effectLst/>
+              </a:rPr>
+              <a:t>Superset</a:t>
+            </a:r>
+            <a:endParaRPr lang="ru-RU" sz="3200" b="1" dirty="0">
               <a:effectLst/>
               <a:latin typeface="Arial" panose="020B0604020202020204" pitchFamily="34" charset="0"/>
               <a:cs typeface="Arial" panose="020B0604020202020204" pitchFamily="34" charset="0"/>
@@ -6178,32 +6340,8 @@
         </p:blipFill>
         <p:spPr>
           <a:xfrm>
-            <a:off x="515939" y="1073499"/>
-            <a:ext cx="4752573" cy="5242976"/>
-          </a:xfrm>
-          <a:prstGeom prst="rect">
-            <a:avLst/>
-          </a:prstGeom>
-        </p:spPr>
-      </p:pic>
-      <p:pic>
-        <p:nvPicPr>
-          <p:cNvPr id="3" name="Рисунок 2"/>
-          <p:cNvPicPr>
-            <a:picLocks noChangeAspect="1"/>
-          </p:cNvPicPr>
-          <p:nvPr/>
-        </p:nvPicPr>
-        <p:blipFill>
-          <a:blip r:embed="rId4"/>
-          <a:stretch>
-            <a:fillRect/>
-          </a:stretch>
-        </p:blipFill>
-        <p:spPr>
-          <a:xfrm>
-            <a:off x="6650964" y="1538310"/>
-            <a:ext cx="4948314" cy="4313354"/>
+            <a:off x="439151" y="1456555"/>
+            <a:ext cx="11160127" cy="4832034"/>
           </a:xfrm>
           <a:prstGeom prst="rect">
             <a:avLst/>
@@ -6213,7 +6351,7 @@
     </p:spTree>
     <p:extLst>
       <p:ext uri="{BB962C8B-B14F-4D97-AF65-F5344CB8AC3E}">
-        <p14:creationId xmlns:p14="http://schemas.microsoft.com/office/powerpoint/2010/main" val="921795148"/>
+        <p14:creationId xmlns:p14="http://schemas.microsoft.com/office/powerpoint/2010/main" val="4091612681"/>
       </p:ext>
     </p:extLst>
   </p:cSld>
@@ -6316,75 +6454,6 @@
       </p:sp>
       <p:sp>
         <p:nvSpPr>
-          <p:cNvPr id="5" name="Заголовок 1">
-            <a:extLst>
-              <a:ext uri="{FF2B5EF4-FFF2-40B4-BE49-F238E27FC236}">
-                <a16:creationId xmlns:a16="http://schemas.microsoft.com/office/drawing/2014/main" id="{26F3F6DE-0B95-4A88-A2DE-D547275A4F55}"/>
-              </a:ext>
-            </a:extLst>
-          </p:cNvPr>
-          <p:cNvSpPr txBox="1">
-            <a:spLocks/>
-          </p:cNvSpPr>
-          <p:nvPr/>
-        </p:nvSpPr>
-        <p:spPr>
-          <a:xfrm>
-            <a:off x="439151" y="1189997"/>
-            <a:ext cx="4930708" cy="512961"/>
-          </a:xfrm>
-          <a:prstGeom prst="rect">
-            <a:avLst/>
-          </a:prstGeom>
-        </p:spPr>
-        <p:txBody>
-          <a:bodyPr wrap="square" lIns="0" tIns="0" rIns="0" bIns="0" anchor="t" anchorCtr="0">
-            <a:spAutoFit/>
-          </a:bodyPr>
-          <a:lstStyle>
-            <a:defPPr>
-              <a:defRPr lang="ru-RU"/>
-            </a:defPPr>
-            <a:lvl1pPr>
-              <a:lnSpc>
-                <a:spcPts val="4000"/>
-              </a:lnSpc>
-              <a:spcBef>
-                <a:spcPct val="0"/>
-              </a:spcBef>
-              <a:buNone/>
-              <a:defRPr sz="2800" b="0">
-                <a:effectLst/>
-                <a:latin typeface="Rostelecom Basis Medium" panose="020B0603030604040103" pitchFamily="34" charset="0"/>
-                <a:ea typeface="+mj-ea"/>
-                <a:cs typeface="+mj-cs"/>
-              </a:defRPr>
-            </a:lvl1pPr>
-          </a:lstStyle>
-          <a:p>
-            <a:r>
-              <a:rPr lang="ru-RU" sz="2000" dirty="0" smtClean="0">
-                <a:latin typeface="Arial" panose="020B0604020202020204" pitchFamily="34" charset="0"/>
-                <a:cs typeface="Arial" panose="020B0604020202020204" pitchFamily="34" charset="0"/>
-              </a:rPr>
-              <a:t>Загружаем виртуальную таблицу из </a:t>
-            </a:r>
-            <a:r>
-              <a:rPr lang="en-US" sz="2000" dirty="0" smtClean="0">
-                <a:latin typeface="Arial" panose="020B0604020202020204" pitchFamily="34" charset="0"/>
-                <a:cs typeface="Arial" panose="020B0604020202020204" pitchFamily="34" charset="0"/>
-              </a:rPr>
-              <a:t>Hive</a:t>
-            </a:r>
-            <a:endParaRPr lang="ru-RU" sz="2000" dirty="0">
-              <a:latin typeface="Arial" panose="020B0604020202020204" pitchFamily="34" charset="0"/>
-              <a:cs typeface="Arial" panose="020B0604020202020204" pitchFamily="34" charset="0"/>
-            </a:endParaRPr>
-          </a:p>
-        </p:txBody>
-      </p:sp>
-      <p:sp>
-        <p:nvSpPr>
           <p:cNvPr id="6" name="Заголовок 1">
             <a:extLst>
               <a:ext uri="{FF2B5EF4-FFF2-40B4-BE49-F238E27FC236}">
@@ -6438,38 +6507,13 @@
           </a:lstStyle>
           <a:p>
             <a:r>
-              <a:rPr lang="ru-RU" sz="3200" dirty="0">
-                <a:effectLst/>
-                <a:latin typeface="Arial" panose="020B0604020202020204" pitchFamily="34" charset="0"/>
-                <a:cs typeface="Arial" panose="020B0604020202020204" pitchFamily="34" charset="0"/>
-              </a:rPr>
-              <a:t>Аналитика </a:t>
-            </a:r>
-            <a:r>
-              <a:rPr lang="ru-RU" sz="3200" dirty="0" smtClean="0">
-                <a:effectLst/>
-                <a:latin typeface="Arial" panose="020B0604020202020204" pitchFamily="34" charset="0"/>
-                <a:cs typeface="Arial" panose="020B0604020202020204" pitchFamily="34" charset="0"/>
-              </a:rPr>
-              <a:t>(</a:t>
-            </a:r>
-            <a:r>
-              <a:rPr lang="ru-RU" sz="3200" dirty="0">
-                <a:effectLst/>
-                <a:latin typeface="Arial" panose="020B0604020202020204" pitchFamily="34" charset="0"/>
-                <a:cs typeface="Arial" panose="020B0604020202020204" pitchFamily="34" charset="0"/>
-              </a:rPr>
-              <a:t>Apache Zeppelin + Apache </a:t>
-            </a:r>
-            <a:r>
-              <a:rPr lang="ru-RU" sz="3200" dirty="0" smtClean="0">
-                <a:effectLst/>
-                <a:latin typeface="Arial" panose="020B0604020202020204" pitchFamily="34" charset="0"/>
-                <a:cs typeface="Arial" panose="020B0604020202020204" pitchFamily="34" charset="0"/>
-              </a:rPr>
-              <a:t>Spark)</a:t>
+              <a:rPr lang="ru-RU" sz="3200">
+                <a:effectLst/>
+              </a:rPr>
+              <a:t>Визуализация данных в Apache Superset</a:t>
             </a:r>
             <a:endParaRPr lang="ru-RU" sz="3200" b="1" dirty="0">
+              <a:effectLst/>
               <a:latin typeface="Arial" panose="020B0604020202020204" pitchFamily="34" charset="0"/>
               <a:cs typeface="Arial" panose="020B0604020202020204" pitchFamily="34" charset="0"/>
             </a:endParaRPr>
@@ -6508,7 +6552,7 @@
       </p:pic>
       <p:pic>
         <p:nvPicPr>
-          <p:cNvPr id="8" name="Рисунок 7"/>
+          <p:cNvPr id="2" name="Рисунок 1"/>
           <p:cNvPicPr>
             <a:picLocks noChangeAspect="1"/>
           </p:cNvPicPr>
@@ -6522,32 +6566,8 @@
         </p:blipFill>
         <p:spPr>
           <a:xfrm>
-            <a:off x="5931112" y="1696804"/>
-            <a:ext cx="5668166" cy="4696480"/>
-          </a:xfrm>
-          <a:prstGeom prst="rect">
-            <a:avLst/>
-          </a:prstGeom>
-        </p:spPr>
-      </p:pic>
-      <p:pic>
-        <p:nvPicPr>
-          <p:cNvPr id="2" name="Рисунок 1"/>
-          <p:cNvPicPr>
-            <a:picLocks noChangeAspect="1"/>
-          </p:cNvPicPr>
-          <p:nvPr/>
-        </p:nvPicPr>
-        <p:blipFill>
-          <a:blip r:embed="rId4"/>
-          <a:stretch>
-            <a:fillRect/>
-          </a:stretch>
-        </p:blipFill>
-        <p:spPr>
-          <a:xfrm>
-            <a:off x="439151" y="2039751"/>
-            <a:ext cx="5001323" cy="4353533"/>
+            <a:off x="515939" y="1417491"/>
+            <a:ext cx="11083339" cy="4840998"/>
           </a:xfrm>
           <a:prstGeom prst="rect">
             <a:avLst/>
@@ -6557,7 +6577,7 @@
     </p:spTree>
     <p:extLst>
       <p:ext uri="{BB962C8B-B14F-4D97-AF65-F5344CB8AC3E}">
-        <p14:creationId xmlns:p14="http://schemas.microsoft.com/office/powerpoint/2010/main" val="929180253"/>
+        <p14:creationId xmlns:p14="http://schemas.microsoft.com/office/powerpoint/2010/main" val="2529837485"/>
       </p:ext>
     </p:extLst>
   </p:cSld>
@@ -6660,7 +6680,7 @@
       </p:sp>
       <p:sp>
         <p:nvSpPr>
-          <p:cNvPr id="6" name="Заголовок 1">
+          <p:cNvPr id="5" name="Заголовок 1">
             <a:extLst>
               <a:ext uri="{FF2B5EF4-FFF2-40B4-BE49-F238E27FC236}">
                 <a16:creationId xmlns:a16="http://schemas.microsoft.com/office/drawing/2014/main" id="{26F3F6DE-0B95-4A88-A2DE-D547275A4F55}"/>
@@ -6674,8 +6694,8 @@
         </p:nvSpPr>
         <p:spPr>
           <a:xfrm>
-            <a:off x="439151" y="560538"/>
-            <a:ext cx="11160127" cy="512961"/>
+            <a:off x="439151" y="1288608"/>
+            <a:ext cx="11160127" cy="1923604"/>
           </a:xfrm>
           <a:prstGeom prst="rect">
             <a:avLst/>
@@ -6712,15 +6732,260 @@
             </a:lvl1pPr>
           </a:lstStyle>
           <a:p>
-            <a:r>
-              <a:rPr lang="ru-RU" sz="3200" dirty="0">
-                <a:effectLst/>
-                <a:latin typeface="Arial" panose="020B0604020202020204" pitchFamily="34" charset="0"/>
-                <a:cs typeface="Arial" panose="020B0604020202020204" pitchFamily="34" charset="0"/>
-              </a:rPr>
-              <a:t>Аналитика (Apache Zeppelin + Apache Spark)</a:t>
-            </a:r>
-            <a:endParaRPr lang="ru-RU" sz="3200" b="1" dirty="0">
+            <a:pPr marL="342900" indent="-342900" algn="just">
+              <a:lnSpc>
+                <a:spcPts val="3000"/>
+              </a:lnSpc>
+              <a:buFont typeface="+mj-lt"/>
+              <a:buAutoNum type="arabicPeriod"/>
+            </a:pPr>
+            <a:r>
+              <a:rPr lang="ru-RU" sz="2000" dirty="0" smtClean="0">
+                <a:effectLst/>
+                <a:latin typeface="Arial" panose="020B0604020202020204" pitchFamily="34" charset="0"/>
+                <a:cs typeface="Arial" panose="020B0604020202020204" pitchFamily="34" charset="0"/>
+              </a:rPr>
+              <a:t>Реализовать долгосрочное хранение датасета в </a:t>
+            </a:r>
+            <a:r>
+              <a:rPr lang="en-US" sz="2000" dirty="0" smtClean="0">
+                <a:effectLst/>
+                <a:latin typeface="Arial" panose="020B0604020202020204" pitchFamily="34" charset="0"/>
+                <a:cs typeface="Arial" panose="020B0604020202020204" pitchFamily="34" charset="0"/>
+              </a:rPr>
+              <a:t>AVRO</a:t>
+            </a:r>
+            <a:r>
+              <a:rPr lang="ru-RU" sz="2000" dirty="0" smtClean="0">
+                <a:effectLst/>
+                <a:latin typeface="Arial" panose="020B0604020202020204" pitchFamily="34" charset="0"/>
+                <a:cs typeface="Arial" panose="020B0604020202020204" pitchFamily="34" charset="0"/>
+              </a:rPr>
+              <a:t>-формате.</a:t>
+            </a:r>
+          </a:p>
+          <a:p>
+            <a:pPr marL="342900" indent="-342900" algn="just">
+              <a:lnSpc>
+                <a:spcPts val="3000"/>
+              </a:lnSpc>
+              <a:buFont typeface="+mj-lt"/>
+              <a:buAutoNum type="arabicPeriod"/>
+            </a:pPr>
+            <a:r>
+              <a:rPr lang="ru-RU" sz="2000" dirty="0" smtClean="0">
+                <a:effectLst/>
+                <a:latin typeface="Arial" panose="020B0604020202020204" pitchFamily="34" charset="0"/>
+                <a:cs typeface="Arial" panose="020B0604020202020204" pitchFamily="34" charset="0"/>
+              </a:rPr>
+              <a:t>Реализовать </a:t>
+            </a:r>
+            <a:r>
+              <a:rPr lang="ru-RU" sz="2000" dirty="0" err="1" smtClean="0">
+                <a:effectLst/>
+                <a:latin typeface="Arial" panose="020B0604020202020204" pitchFamily="34" charset="0"/>
+                <a:cs typeface="Arial" panose="020B0604020202020204" pitchFamily="34" charset="0"/>
+              </a:rPr>
+              <a:t>стриминг</a:t>
+            </a:r>
+            <a:r>
+              <a:rPr lang="ru-RU" sz="2000" dirty="0" smtClean="0">
+                <a:effectLst/>
+                <a:latin typeface="Arial" panose="020B0604020202020204" pitchFamily="34" charset="0"/>
+                <a:cs typeface="Arial" panose="020B0604020202020204" pitchFamily="34" charset="0"/>
+              </a:rPr>
+              <a:t> так, чтоб данные одновременно попадали на </a:t>
+            </a:r>
+            <a:r>
+              <a:rPr lang="en-US" sz="2000" dirty="0" smtClean="0">
+                <a:effectLst/>
+                <a:latin typeface="Arial" panose="020B0604020202020204" pitchFamily="34" charset="0"/>
+                <a:cs typeface="Arial" panose="020B0604020202020204" pitchFamily="34" charset="0"/>
+              </a:rPr>
+              <a:t>HDFS </a:t>
+            </a:r>
+            <a:r>
+              <a:rPr lang="ru-RU" sz="2000" dirty="0" smtClean="0">
+                <a:effectLst/>
+                <a:latin typeface="Arial" panose="020B0604020202020204" pitchFamily="34" charset="0"/>
+                <a:cs typeface="Arial" panose="020B0604020202020204" pitchFamily="34" charset="0"/>
+              </a:rPr>
+              <a:t>и </a:t>
+            </a:r>
+            <a:r>
+              <a:rPr lang="en-US" sz="2000" dirty="0" smtClean="0">
+                <a:effectLst/>
+                <a:latin typeface="Arial" panose="020B0604020202020204" pitchFamily="34" charset="0"/>
+                <a:cs typeface="Arial" panose="020B0604020202020204" pitchFamily="34" charset="0"/>
+              </a:rPr>
+              <a:t>ClickHouse</a:t>
+            </a:r>
+            <a:r>
+              <a:rPr lang="ru-RU" sz="2000" dirty="0" smtClean="0">
+                <a:effectLst/>
+                <a:latin typeface="Arial" panose="020B0604020202020204" pitchFamily="34" charset="0"/>
+                <a:cs typeface="Arial" panose="020B0604020202020204" pitchFamily="34" charset="0"/>
+              </a:rPr>
+              <a:t>.</a:t>
+            </a:r>
+            <a:endParaRPr lang="en-US" sz="2000" dirty="0" smtClean="0">
+              <a:effectLst/>
+              <a:latin typeface="Arial" panose="020B0604020202020204" pitchFamily="34" charset="0"/>
+              <a:cs typeface="Arial" panose="020B0604020202020204" pitchFamily="34" charset="0"/>
+            </a:endParaRPr>
+          </a:p>
+          <a:p>
+            <a:pPr marL="342900" indent="-342900" algn="just">
+              <a:lnSpc>
+                <a:spcPts val="3000"/>
+              </a:lnSpc>
+              <a:buFont typeface="+mj-lt"/>
+              <a:buAutoNum type="arabicPeriod"/>
+            </a:pPr>
+            <a:r>
+              <a:rPr lang="ru-RU" sz="2000" dirty="0" smtClean="0">
+                <a:effectLst/>
+                <a:latin typeface="Arial" panose="020B0604020202020204" pitchFamily="34" charset="0"/>
+                <a:cs typeface="Arial" panose="020B0604020202020204" pitchFamily="34" charset="0"/>
+              </a:rPr>
+              <a:t>Реализовать загрузку датасета непосредственно из </a:t>
+            </a:r>
+            <a:r>
+              <a:rPr lang="en-US" sz="2000" dirty="0" smtClean="0">
+                <a:effectLst/>
+                <a:latin typeface="Arial" panose="020B0604020202020204" pitchFamily="34" charset="0"/>
+                <a:cs typeface="Arial" panose="020B0604020202020204" pitchFamily="34" charset="0"/>
+              </a:rPr>
+              <a:t>HDFS </a:t>
+            </a:r>
+            <a:r>
+              <a:rPr lang="ru-RU" sz="2000" dirty="0" smtClean="0">
+                <a:effectLst/>
+                <a:latin typeface="Arial" panose="020B0604020202020204" pitchFamily="34" charset="0"/>
+                <a:cs typeface="Arial" panose="020B0604020202020204" pitchFamily="34" charset="0"/>
+              </a:rPr>
+              <a:t>в </a:t>
+            </a:r>
+            <a:r>
+              <a:rPr lang="en-US" sz="2000" dirty="0" smtClean="0">
+                <a:effectLst/>
+                <a:latin typeface="Arial" panose="020B0604020202020204" pitchFamily="34" charset="0"/>
+                <a:cs typeface="Arial" panose="020B0604020202020204" pitchFamily="34" charset="0"/>
+              </a:rPr>
+              <a:t>Hive, Spark, GreenPlum</a:t>
+            </a:r>
+            <a:r>
+              <a:rPr lang="ru-RU" sz="2000" dirty="0" smtClean="0">
+                <a:effectLst/>
+                <a:latin typeface="Arial" panose="020B0604020202020204" pitchFamily="34" charset="0"/>
+                <a:cs typeface="Arial" panose="020B0604020202020204" pitchFamily="34" charset="0"/>
+              </a:rPr>
+              <a:t>.</a:t>
+            </a:r>
+          </a:p>
+          <a:p>
+            <a:pPr marL="342900" indent="-342900" algn="just">
+              <a:lnSpc>
+                <a:spcPts val="3000"/>
+              </a:lnSpc>
+              <a:buFont typeface="+mj-lt"/>
+              <a:buAutoNum type="arabicPeriod"/>
+            </a:pPr>
+            <a:r>
+              <a:rPr lang="ru-RU" sz="2000" dirty="0" smtClean="0">
+                <a:effectLst/>
+                <a:latin typeface="Arial" panose="020B0604020202020204" pitchFamily="34" charset="0"/>
+                <a:cs typeface="Arial" panose="020B0604020202020204" pitchFamily="34" charset="0"/>
+              </a:rPr>
+              <a:t>Реализация расширенной части задания не должна влиять на выполнение основной части.</a:t>
+            </a:r>
+            <a:endParaRPr lang="ru-RU" sz="2000" dirty="0">
+              <a:effectLst/>
+              <a:latin typeface="Arial" panose="020B0604020202020204" pitchFamily="34" charset="0"/>
+              <a:cs typeface="Arial" panose="020B0604020202020204" pitchFamily="34" charset="0"/>
+            </a:endParaRPr>
+          </a:p>
+        </p:txBody>
+      </p:sp>
+      <p:sp>
+        <p:nvSpPr>
+          <p:cNvPr id="6" name="Заголовок 1">
+            <a:extLst>
+              <a:ext uri="{FF2B5EF4-FFF2-40B4-BE49-F238E27FC236}">
+                <a16:creationId xmlns:a16="http://schemas.microsoft.com/office/drawing/2014/main" id="{26F3F6DE-0B95-4A88-A2DE-D547275A4F55}"/>
+              </a:ext>
+            </a:extLst>
+          </p:cNvPr>
+          <p:cNvSpPr txBox="1">
+            <a:spLocks/>
+          </p:cNvSpPr>
+          <p:nvPr/>
+        </p:nvSpPr>
+        <p:spPr>
+          <a:xfrm>
+            <a:off x="439151" y="560538"/>
+            <a:ext cx="11160127" cy="523220"/>
+          </a:xfrm>
+          <a:prstGeom prst="rect">
+            <a:avLst/>
+          </a:prstGeom>
+        </p:spPr>
+        <p:txBody>
+          <a:bodyPr lIns="0" tIns="0" rIns="0" bIns="0" anchor="t" anchorCtr="0">
+            <a:spAutoFit/>
+          </a:bodyPr>
+          <a:lstStyle>
+            <a:lvl1pPr algn="l" defTabSz="914400" rtl="0" eaLnBrk="1" latinLnBrk="0" hangingPunct="1">
+              <a:lnSpc>
+                <a:spcPts val="4000"/>
+              </a:lnSpc>
+              <a:spcBef>
+                <a:spcPct val="0"/>
+              </a:spcBef>
+              <a:buNone/>
+              <a:defRPr sz="3600" b="0" kern="1200">
+                <a:solidFill>
+                  <a:schemeClr val="tx1"/>
+                </a:solidFill>
+                <a:effectLst>
+                  <a:outerShdw blurRad="38100" dist="38100" dir="2700000" algn="tl">
+                    <a:srgbClr val="000000">
+                      <a:alpha val="43137"/>
+                    </a:srgbClr>
+                  </a:outerShdw>
+                </a:effectLst>
+                <a:latin typeface="Rostelecom Basis Medium" panose="020B0603030604040103" pitchFamily="34" charset="0"/>
+                <a:ea typeface="+mj-ea"/>
+                <a:cs typeface="+mj-cs"/>
+              </a:defRPr>
+            </a:lvl1pPr>
+          </a:lstStyle>
+          <a:p>
+            <a:r>
+              <a:rPr lang="ru-RU" dirty="0" smtClean="0">
+                <a:effectLst/>
+                <a:latin typeface="Arial" panose="020B0604020202020204" pitchFamily="34" charset="0"/>
+                <a:cs typeface="Arial" panose="020B0604020202020204" pitchFamily="34" charset="0"/>
+              </a:rPr>
+              <a:t>Расширенные</a:t>
+            </a:r>
+            <a:r>
+              <a:rPr lang="ru-RU" dirty="0" smtClean="0">
+                <a:effectLst/>
+                <a:latin typeface="Arial" panose="020B0604020202020204" pitchFamily="34" charset="0"/>
+                <a:cs typeface="Arial" panose="020B0604020202020204" pitchFamily="34" charset="0"/>
+              </a:rPr>
+              <a:t> </a:t>
+            </a:r>
+            <a:r>
+              <a:rPr lang="ru-RU" dirty="0">
+                <a:effectLst/>
+                <a:latin typeface="Arial" panose="020B0604020202020204" pitchFamily="34" charset="0"/>
+                <a:cs typeface="Arial" panose="020B0604020202020204" pitchFamily="34" charset="0"/>
+              </a:rPr>
+              <a:t>задачи</a:t>
+            </a:r>
+            <a:endParaRPr lang="ru-RU" dirty="0">
               <a:latin typeface="Arial" panose="020B0604020202020204" pitchFamily="34" charset="0"/>
               <a:cs typeface="Arial" panose="020B0604020202020204" pitchFamily="34" charset="0"/>
             </a:endParaRPr>
@@ -6757,106 +7022,10 @@
           </a:prstGeom>
         </p:spPr>
       </p:pic>
-      <p:pic>
-        <p:nvPicPr>
-          <p:cNvPr id="9" name="Рисунок 8"/>
-          <p:cNvPicPr>
-            <a:picLocks noChangeAspect="1"/>
-          </p:cNvPicPr>
-          <p:nvPr/>
-        </p:nvPicPr>
-        <p:blipFill>
-          <a:blip r:embed="rId3"/>
-          <a:stretch>
-            <a:fillRect/>
-          </a:stretch>
-        </p:blipFill>
-        <p:spPr>
-          <a:xfrm>
-            <a:off x="5909313" y="1324792"/>
-            <a:ext cx="5572903" cy="1324160"/>
-          </a:xfrm>
-          <a:prstGeom prst="rect">
-            <a:avLst/>
-          </a:prstGeom>
-        </p:spPr>
-      </p:pic>
-      <p:pic>
-        <p:nvPicPr>
-          <p:cNvPr id="10" name="Рисунок 9"/>
-          <p:cNvPicPr>
-            <a:picLocks noChangeAspect="1"/>
-          </p:cNvPicPr>
-          <p:nvPr/>
-        </p:nvPicPr>
-        <p:blipFill>
-          <a:blip r:embed="rId4"/>
-          <a:stretch>
-            <a:fillRect/>
-          </a:stretch>
-        </p:blipFill>
-        <p:spPr>
-          <a:xfrm>
-            <a:off x="5909313" y="2820426"/>
-            <a:ext cx="5830114" cy="3715268"/>
-          </a:xfrm>
-          <a:prstGeom prst="rect">
-            <a:avLst/>
-          </a:prstGeom>
-        </p:spPr>
-      </p:pic>
-      <p:pic>
-        <p:nvPicPr>
-          <p:cNvPr id="3" name="Рисунок 2"/>
-          <p:cNvPicPr>
-            <a:picLocks noChangeAspect="1"/>
-          </p:cNvPicPr>
-          <p:nvPr/>
-        </p:nvPicPr>
-        <p:blipFill>
-          <a:blip r:embed="rId5"/>
-          <a:stretch>
-            <a:fillRect/>
-          </a:stretch>
-        </p:blipFill>
-        <p:spPr>
-          <a:xfrm>
-            <a:off x="515939" y="1220003"/>
-            <a:ext cx="4277322" cy="1428949"/>
-          </a:xfrm>
-          <a:prstGeom prst="rect">
-            <a:avLst/>
-          </a:prstGeom>
-        </p:spPr>
-      </p:pic>
-      <p:pic>
-        <p:nvPicPr>
-          <p:cNvPr id="5" name="Рисунок 4"/>
-          <p:cNvPicPr>
-            <a:picLocks noChangeAspect="1"/>
-          </p:cNvPicPr>
-          <p:nvPr/>
-        </p:nvPicPr>
-        <p:blipFill>
-          <a:blip r:embed="rId6"/>
-          <a:stretch>
-            <a:fillRect/>
-          </a:stretch>
-        </p:blipFill>
-        <p:spPr>
-          <a:xfrm>
-            <a:off x="963676" y="2939747"/>
-            <a:ext cx="3381847" cy="3162741"/>
-          </a:xfrm>
-          <a:prstGeom prst="rect">
-            <a:avLst/>
-          </a:prstGeom>
-        </p:spPr>
-      </p:pic>
     </p:spTree>
     <p:extLst>
       <p:ext uri="{BB962C8B-B14F-4D97-AF65-F5344CB8AC3E}">
-        <p14:creationId xmlns:p14="http://schemas.microsoft.com/office/powerpoint/2010/main" val="2997639442"/>
+        <p14:creationId xmlns:p14="http://schemas.microsoft.com/office/powerpoint/2010/main" val="3032467200"/>
       </p:ext>
     </p:extLst>
   </p:cSld>
@@ -6974,7 +7143,7 @@
         <p:spPr>
           <a:xfrm>
             <a:off x="439151" y="560538"/>
-            <a:ext cx="11160127" cy="512961"/>
+            <a:ext cx="11160127" cy="523220"/>
           </a:xfrm>
           <a:prstGeom prst="rect">
             <a:avLst/>
@@ -7012,25 +7181,30 @@
           </a:lstStyle>
           <a:p>
             <a:r>
-              <a:rPr lang="ru-RU" sz="3200" dirty="0">
-                <a:effectLst/>
-              </a:rPr>
-              <a:t>Визуализация данных </a:t>
-            </a:r>
-            <a:r>
-              <a:rPr lang="ru-RU" sz="3200" dirty="0" smtClean="0">
-                <a:effectLst/>
-              </a:rPr>
-              <a:t>в Apache </a:t>
-            </a:r>
-            <a:r>
-              <a:rPr lang="ru-RU" sz="3200" dirty="0">
-                <a:effectLst/>
-              </a:rPr>
-              <a:t>Superset</a:t>
-            </a:r>
-            <a:endParaRPr lang="ru-RU" sz="3200" b="1" dirty="0">
-              <a:effectLst/>
+              <a:rPr lang="ru-RU" dirty="0" smtClean="0">
+                <a:effectLst/>
+                <a:latin typeface="Arial" panose="020B0604020202020204" pitchFamily="34" charset="0"/>
+                <a:cs typeface="Arial" panose="020B0604020202020204" pitchFamily="34" charset="0"/>
+              </a:rPr>
+              <a:t>Архитектура </a:t>
+            </a:r>
+            <a:r>
+              <a:rPr lang="en-US" dirty="0" smtClean="0">
+                <a:effectLst/>
+                <a:latin typeface="Arial" panose="020B0604020202020204" pitchFamily="34" charset="0"/>
+                <a:cs typeface="Arial" panose="020B0604020202020204" pitchFamily="34" charset="0"/>
+              </a:rPr>
+              <a:t>MVP - </a:t>
+            </a:r>
+            <a:r>
+              <a:rPr lang="ru-RU" dirty="0" smtClean="0">
+                <a:effectLst/>
+                <a:latin typeface="Arial" panose="020B0604020202020204" pitchFamily="34" charset="0"/>
+                <a:cs typeface="Arial" panose="020B0604020202020204" pitchFamily="34" charset="0"/>
+              </a:rPr>
+              <a:t>расширенная</a:t>
+            </a:r>
+            <a:endParaRPr lang="ru-RU" dirty="0">
               <a:latin typeface="Arial" panose="020B0604020202020204" pitchFamily="34" charset="0"/>
               <a:cs typeface="Arial" panose="020B0604020202020204" pitchFamily="34" charset="0"/>
             </a:endParaRPr>
@@ -7083,8 +7257,8 @@
         </p:blipFill>
         <p:spPr>
           <a:xfrm>
-            <a:off x="439151" y="1456555"/>
-            <a:ext cx="11160127" cy="4832034"/>
+            <a:off x="2247978" y="1199167"/>
+            <a:ext cx="7542472" cy="5658833"/>
           </a:xfrm>
           <a:prstGeom prst="rect">
             <a:avLst/>
@@ -7094,7 +7268,7 @@
     </p:spTree>
     <p:extLst>
       <p:ext uri="{BB962C8B-B14F-4D97-AF65-F5344CB8AC3E}">
-        <p14:creationId xmlns:p14="http://schemas.microsoft.com/office/powerpoint/2010/main" val="4091612681"/>
+        <p14:creationId xmlns:p14="http://schemas.microsoft.com/office/powerpoint/2010/main" val="1688625458"/>
       </p:ext>
     </p:extLst>
   </p:cSld>
@@ -7281,7 +7455,7 @@
         <p:spPr>
           <a:xfrm>
             <a:off x="439150" y="2199638"/>
-            <a:ext cx="11160127" cy="3077766"/>
+            <a:ext cx="11160127" cy="2564805"/>
           </a:xfrm>
           <a:prstGeom prst="rect">
             <a:avLst/>
@@ -7318,7 +7492,7 @@
             </a:lvl1pPr>
           </a:lstStyle>
           <a:p>
-            <a:pPr algn="just"/>
+            <a:pPr indent="457200" algn="just"/>
             <a:r>
               <a:rPr lang="ru-RU" sz="2800" dirty="0" smtClean="0">
                 <a:effectLst/>
@@ -7357,42 +7531,32 @@
                 <a:latin typeface="Arial" panose="020B0604020202020204" pitchFamily="34" charset="0"/>
                 <a:cs typeface="Arial" panose="020B0604020202020204" pitchFamily="34" charset="0"/>
               </a:rPr>
-              <a:t>телевидения, предоставляемой </a:t>
-            </a:r>
-            <a:r>
-              <a:rPr lang="ru-RU" sz="2800" dirty="0">
-                <a:effectLst/>
-                <a:latin typeface="Arial" panose="020B0604020202020204" pitchFamily="34" charset="0"/>
-                <a:cs typeface="Arial" panose="020B0604020202020204" pitchFamily="34" charset="0"/>
-              </a:rPr>
-              <a:t>компанией Ростелеком. Система должна дать представление </a:t>
-            </a:r>
+              <a:t>телевидения</a:t>
+            </a:r>
+            <a:r>
+              <a:rPr lang="en-US" sz="2800" dirty="0" smtClean="0">
+                <a:effectLst/>
+                <a:latin typeface="Arial" panose="020B0604020202020204" pitchFamily="34" charset="0"/>
+                <a:cs typeface="Arial" panose="020B0604020202020204" pitchFamily="34" charset="0"/>
+              </a:rPr>
+              <a:t>.</a:t>
+            </a:r>
+          </a:p>
+          <a:p>
+            <a:pPr indent="457200" algn="just"/>
             <a:r>
               <a:rPr lang="ru-RU" sz="2800" dirty="0" smtClean="0">
                 <a:effectLst/>
                 <a:latin typeface="Arial" panose="020B0604020202020204" pitchFamily="34" charset="0"/>
                 <a:cs typeface="Arial" panose="020B0604020202020204" pitchFamily="34" charset="0"/>
               </a:rPr>
-              <a:t>о поведении </a:t>
-            </a:r>
-            <a:r>
-              <a:rPr lang="ru-RU" sz="2800" dirty="0">
-                <a:effectLst/>
-                <a:latin typeface="Arial" panose="020B0604020202020204" pitchFamily="34" charset="0"/>
-                <a:cs typeface="Arial" panose="020B0604020202020204" pitchFamily="34" charset="0"/>
-              </a:rPr>
-              <a:t>пользователей, популярности контента, частоте и длительности сессий</a:t>
-            </a:r>
-          </a:p>
-          <a:p>
-            <a:r>
-              <a:rPr lang="ru-RU" sz="2800" dirty="0">
-                <a:effectLst/>
-                <a:latin typeface="Arial" panose="020B0604020202020204" pitchFamily="34" charset="0"/>
-                <a:cs typeface="Arial" panose="020B0604020202020204" pitchFamily="34" charset="0"/>
-              </a:rPr>
-              <a:t>просмотра.</a:t>
-            </a:r>
+              <a:t>Дополнительная цель – в рамках основной цели использование всех компонентов кластера.</a:t>
+            </a:r>
+            <a:endParaRPr lang="ru-RU" sz="2800" dirty="0">
+              <a:effectLst/>
+              <a:latin typeface="Arial" panose="020B0604020202020204" pitchFamily="34" charset="0"/>
+              <a:cs typeface="Arial" panose="020B0604020202020204" pitchFamily="34" charset="0"/>
+            </a:endParaRPr>
           </a:p>
         </p:txBody>
       </p:sp>
@@ -7547,7 +7711,7 @@
         <p:spPr>
           <a:xfrm>
             <a:off x="439151" y="560538"/>
-            <a:ext cx="11160127" cy="512961"/>
+            <a:ext cx="11160127" cy="523220"/>
           </a:xfrm>
           <a:prstGeom prst="rect">
             <a:avLst/>
@@ -7585,13 +7749,14 @@
           </a:lstStyle>
           <a:p>
             <a:r>
-              <a:rPr lang="ru-RU" sz="3200">
-                <a:effectLst/>
-              </a:rPr>
-              <a:t>Визуализация данных в Apache Superset</a:t>
-            </a:r>
-            <a:endParaRPr lang="ru-RU" sz="3200" b="1" dirty="0">
-              <a:effectLst/>
+              <a:rPr lang="ru-RU" dirty="0" smtClean="0">
+                <a:effectLst/>
+                <a:latin typeface="Arial" panose="020B0604020202020204" pitchFamily="34" charset="0"/>
+                <a:cs typeface="Arial" panose="020B0604020202020204" pitchFamily="34" charset="0"/>
+              </a:rPr>
+              <a:t>Расширенная часть задания</a:t>
+            </a:r>
+            <a:endParaRPr lang="ru-RU" dirty="0">
               <a:latin typeface="Arial" panose="020B0604020202020204" pitchFamily="34" charset="0"/>
               <a:cs typeface="Arial" panose="020B0604020202020204" pitchFamily="34" charset="0"/>
             </a:endParaRPr>
@@ -7628,24 +7793,111 @@
           </a:prstGeom>
         </p:spPr>
       </p:pic>
+      <p:grpSp>
+        <p:nvGrpSpPr>
+          <p:cNvPr id="5" name="Группа 4"/>
+          <p:cNvGrpSpPr/>
+          <p:nvPr/>
+        </p:nvGrpSpPr>
+        <p:grpSpPr>
+          <a:xfrm>
+            <a:off x="439151" y="1417622"/>
+            <a:ext cx="3858164" cy="762106"/>
+            <a:chOff x="802992" y="1783924"/>
+            <a:chExt cx="3858164" cy="762106"/>
+          </a:xfrm>
+        </p:grpSpPr>
+        <p:pic>
+          <p:nvPicPr>
+            <p:cNvPr id="3" name="Рисунок 2"/>
+            <p:cNvPicPr>
+              <a:picLocks noChangeAspect="1"/>
+            </p:cNvPicPr>
+            <p:nvPr/>
+          </p:nvPicPr>
+          <p:blipFill>
+            <a:blip r:embed="rId3"/>
+            <a:stretch>
+              <a:fillRect/>
+            </a:stretch>
+          </p:blipFill>
+          <p:spPr>
+            <a:xfrm>
+              <a:off x="802992" y="1783924"/>
+              <a:ext cx="2715004" cy="762106"/>
+            </a:xfrm>
+            <a:prstGeom prst="rect">
+              <a:avLst/>
+            </a:prstGeom>
+          </p:spPr>
+        </p:pic>
+        <p:pic>
+          <p:nvPicPr>
+            <p:cNvPr id="4" name="Рисунок 3"/>
+            <p:cNvPicPr>
+              <a:picLocks noChangeAspect="1"/>
+            </p:cNvPicPr>
+            <p:nvPr/>
+          </p:nvPicPr>
+          <p:blipFill>
+            <a:blip r:embed="rId4"/>
+            <a:stretch>
+              <a:fillRect/>
+            </a:stretch>
+          </p:blipFill>
+          <p:spPr>
+            <a:xfrm>
+              <a:off x="3517996" y="1792889"/>
+              <a:ext cx="1143160" cy="743054"/>
+            </a:xfrm>
+            <a:prstGeom prst="rect">
+              <a:avLst/>
+            </a:prstGeom>
+          </p:spPr>
+        </p:pic>
+      </p:grpSp>
       <p:pic>
         <p:nvPicPr>
-          <p:cNvPr id="2" name="Рисунок 1"/>
+          <p:cNvPr id="8" name="Рисунок 7"/>
           <p:cNvPicPr>
             <a:picLocks noChangeAspect="1"/>
           </p:cNvPicPr>
           <p:nvPr/>
         </p:nvPicPr>
         <p:blipFill>
-          <a:blip r:embed="rId3"/>
+          <a:blip r:embed="rId5"/>
           <a:stretch>
             <a:fillRect/>
           </a:stretch>
         </p:blipFill>
         <p:spPr>
           <a:xfrm>
-            <a:off x="515939" y="1417491"/>
-            <a:ext cx="11083339" cy="4840998"/>
+            <a:off x="6350270" y="1426587"/>
+            <a:ext cx="5249008" cy="609685"/>
+          </a:xfrm>
+          <a:prstGeom prst="rect">
+            <a:avLst/>
+          </a:prstGeom>
+        </p:spPr>
+      </p:pic>
+      <p:pic>
+        <p:nvPicPr>
+          <p:cNvPr id="9" name="Рисунок 8"/>
+          <p:cNvPicPr>
+            <a:picLocks noChangeAspect="1"/>
+          </p:cNvPicPr>
+          <p:nvPr/>
+        </p:nvPicPr>
+        <p:blipFill>
+          <a:blip r:embed="rId6"/>
+          <a:stretch>
+            <a:fillRect/>
+          </a:stretch>
+        </p:blipFill>
+        <p:spPr>
+          <a:xfrm>
+            <a:off x="2469314" y="2403056"/>
+            <a:ext cx="7099799" cy="3856859"/>
           </a:xfrm>
           <a:prstGeom prst="rect">
             <a:avLst/>
@@ -7655,7 +7907,7 @@
     </p:spTree>
     <p:extLst>
       <p:ext uri="{BB962C8B-B14F-4D97-AF65-F5344CB8AC3E}">
-        <p14:creationId xmlns:p14="http://schemas.microsoft.com/office/powerpoint/2010/main" val="2529837485"/>
+        <p14:creationId xmlns:p14="http://schemas.microsoft.com/office/powerpoint/2010/main" val="3431794603"/>
       </p:ext>
     </p:extLst>
   </p:cSld>
@@ -8000,7 +8252,7 @@
     </p:spTree>
     <p:extLst>
       <p:ext uri="{BB962C8B-B14F-4D97-AF65-F5344CB8AC3E}">
-        <p14:creationId xmlns:p14="http://schemas.microsoft.com/office/powerpoint/2010/main" val="2679751434"/>
+        <p14:creationId xmlns:p14="http://schemas.microsoft.com/office/powerpoint/2010/main" val="441575488"/>
       </p:ext>
     </p:extLst>
   </p:cSld>
@@ -10184,12 +10436,12 @@
           </a:lstStyle>
           <a:p>
             <a:r>
-              <a:rPr lang="ru-RU" dirty="0">
-                <a:effectLst/>
-                <a:latin typeface="Arial" panose="020B0604020202020204" pitchFamily="34" charset="0"/>
-                <a:cs typeface="Arial" panose="020B0604020202020204" pitchFamily="34" charset="0"/>
-              </a:rPr>
-              <a:t>Поставленные задачи</a:t>
+              <a:rPr lang="ru-RU" dirty="0" smtClean="0">
+                <a:effectLst/>
+                <a:latin typeface="Arial" panose="020B0604020202020204" pitchFamily="34" charset="0"/>
+                <a:cs typeface="Arial" panose="020B0604020202020204" pitchFamily="34" charset="0"/>
+              </a:rPr>
+              <a:t>Концептуальная схема</a:t>
             </a:r>
             <a:endParaRPr lang="ru-RU" dirty="0">
               <a:latin typeface="Arial" panose="020B0604020202020204" pitchFamily="34" charset="0"/>
@@ -10230,7 +10482,7 @@
       </p:pic>
       <p:pic>
         <p:nvPicPr>
-          <p:cNvPr id="3" name="Рисунок 2"/>
+          <p:cNvPr id="2" name="Рисунок 1"/>
           <p:cNvPicPr>
             <a:picLocks noChangeAspect="1"/>
           </p:cNvPicPr>
@@ -10244,607 +10496,14 @@
         </p:blipFill>
         <p:spPr>
           <a:xfrm>
-            <a:off x="515940" y="1406769"/>
-            <a:ext cx="3624230" cy="2686929"/>
+            <a:off x="2270240" y="1310472"/>
+            <a:ext cx="7008231" cy="5082812"/>
           </a:xfrm>
           <a:prstGeom prst="rect">
             <a:avLst/>
           </a:prstGeom>
         </p:spPr>
       </p:pic>
-      <p:sp>
-        <p:nvSpPr>
-          <p:cNvPr id="8" name="Объект 2"/>
-          <p:cNvSpPr txBox="1">
-            <a:spLocks/>
-          </p:cNvSpPr>
-          <p:nvPr/>
-        </p:nvSpPr>
-        <p:spPr>
-          <a:xfrm>
-            <a:off x="4262512" y="1203059"/>
-            <a:ext cx="7456778" cy="3376247"/>
-          </a:xfrm>
-          <a:prstGeom prst="rect">
-            <a:avLst/>
-          </a:prstGeom>
-        </p:spPr>
-        <p:txBody>
-          <a:bodyPr>
-            <a:normAutofit/>
-          </a:bodyPr>
-          <a:lstStyle>
-            <a:lvl1pPr marL="228600" indent="-228600" algn="l" defTabSz="914400" rtl="0" eaLnBrk="1" latinLnBrk="0" hangingPunct="1">
-              <a:lnSpc>
-                <a:spcPct val="90000"/>
-              </a:lnSpc>
-              <a:spcBef>
-                <a:spcPts val="1000"/>
-              </a:spcBef>
-              <a:buFont typeface="Arial" panose="020B0604020202020204" pitchFamily="34" charset="0"/>
-              <a:buChar char="•"/>
-              <a:defRPr sz="2800" kern="1200">
-                <a:solidFill>
-                  <a:schemeClr val="tx1"/>
-                </a:solidFill>
-                <a:latin typeface="+mn-lt"/>
-                <a:ea typeface="+mn-ea"/>
-                <a:cs typeface="+mn-cs"/>
-              </a:defRPr>
-            </a:lvl1pPr>
-            <a:lvl2pPr marL="685800" indent="-228600" algn="l" defTabSz="914400" rtl="0" eaLnBrk="1" latinLnBrk="0" hangingPunct="1">
-              <a:lnSpc>
-                <a:spcPct val="90000"/>
-              </a:lnSpc>
-              <a:spcBef>
-                <a:spcPts val="500"/>
-              </a:spcBef>
-              <a:buFont typeface="Arial" panose="020B0604020202020204" pitchFamily="34" charset="0"/>
-              <a:buChar char="•"/>
-              <a:defRPr sz="2400" kern="1200">
-                <a:solidFill>
-                  <a:schemeClr val="tx1"/>
-                </a:solidFill>
-                <a:latin typeface="+mn-lt"/>
-                <a:ea typeface="+mn-ea"/>
-                <a:cs typeface="+mn-cs"/>
-              </a:defRPr>
-            </a:lvl2pPr>
-            <a:lvl3pPr marL="1143000" indent="-228600" algn="l" defTabSz="914400" rtl="0" eaLnBrk="1" latinLnBrk="0" hangingPunct="1">
-              <a:lnSpc>
-                <a:spcPct val="90000"/>
-              </a:lnSpc>
-              <a:spcBef>
-                <a:spcPts val="500"/>
-              </a:spcBef>
-              <a:buFont typeface="Arial" panose="020B0604020202020204" pitchFamily="34" charset="0"/>
-              <a:buChar char="•"/>
-              <a:defRPr sz="2000" kern="1200">
-                <a:solidFill>
-                  <a:schemeClr val="tx1"/>
-                </a:solidFill>
-                <a:latin typeface="+mn-lt"/>
-                <a:ea typeface="+mn-ea"/>
-                <a:cs typeface="+mn-cs"/>
-              </a:defRPr>
-            </a:lvl3pPr>
-            <a:lvl4pPr marL="1600200" indent="-228600" algn="l" defTabSz="914400" rtl="0" eaLnBrk="1" latinLnBrk="0" hangingPunct="1">
-              <a:lnSpc>
-                <a:spcPct val="90000"/>
-              </a:lnSpc>
-              <a:spcBef>
-                <a:spcPts val="500"/>
-              </a:spcBef>
-              <a:buFont typeface="Arial" panose="020B0604020202020204" pitchFamily="34" charset="0"/>
-              <a:buChar char="•"/>
-              <a:defRPr sz="1800" kern="1200">
-                <a:solidFill>
-                  <a:schemeClr val="tx1"/>
-                </a:solidFill>
-                <a:latin typeface="+mn-lt"/>
-                <a:ea typeface="+mn-ea"/>
-                <a:cs typeface="+mn-cs"/>
-              </a:defRPr>
-            </a:lvl4pPr>
-            <a:lvl5pPr marL="2057400" indent="-228600" algn="l" defTabSz="914400" rtl="0" eaLnBrk="1" latinLnBrk="0" hangingPunct="1">
-              <a:lnSpc>
-                <a:spcPct val="90000"/>
-              </a:lnSpc>
-              <a:spcBef>
-                <a:spcPts val="500"/>
-              </a:spcBef>
-              <a:buFont typeface="Arial" panose="020B0604020202020204" pitchFamily="34" charset="0"/>
-              <a:buChar char="•"/>
-              <a:defRPr sz="1800" kern="1200">
-                <a:solidFill>
-                  <a:schemeClr val="tx1"/>
-                </a:solidFill>
-                <a:latin typeface="+mn-lt"/>
-                <a:ea typeface="+mn-ea"/>
-                <a:cs typeface="+mn-cs"/>
-              </a:defRPr>
-            </a:lvl5pPr>
-            <a:lvl6pPr marL="2514600" indent="-228600" algn="l" defTabSz="914400" rtl="0" eaLnBrk="1" latinLnBrk="0" hangingPunct="1">
-              <a:lnSpc>
-                <a:spcPct val="90000"/>
-              </a:lnSpc>
-              <a:spcBef>
-                <a:spcPts val="500"/>
-              </a:spcBef>
-              <a:buFont typeface="Arial" panose="020B0604020202020204" pitchFamily="34" charset="0"/>
-              <a:buChar char="•"/>
-              <a:defRPr sz="1800" kern="1200">
-                <a:solidFill>
-                  <a:schemeClr val="tx1"/>
-                </a:solidFill>
-                <a:latin typeface="+mn-lt"/>
-                <a:ea typeface="+mn-ea"/>
-                <a:cs typeface="+mn-cs"/>
-              </a:defRPr>
-            </a:lvl6pPr>
-            <a:lvl7pPr marL="2971800" indent="-228600" algn="l" defTabSz="914400" rtl="0" eaLnBrk="1" latinLnBrk="0" hangingPunct="1">
-              <a:lnSpc>
-                <a:spcPct val="90000"/>
-              </a:lnSpc>
-              <a:spcBef>
-                <a:spcPts val="500"/>
-              </a:spcBef>
-              <a:buFont typeface="Arial" panose="020B0604020202020204" pitchFamily="34" charset="0"/>
-              <a:buChar char="•"/>
-              <a:defRPr sz="1800" kern="1200">
-                <a:solidFill>
-                  <a:schemeClr val="tx1"/>
-                </a:solidFill>
-                <a:latin typeface="+mn-lt"/>
-                <a:ea typeface="+mn-ea"/>
-                <a:cs typeface="+mn-cs"/>
-              </a:defRPr>
-            </a:lvl7pPr>
-            <a:lvl8pPr marL="3429000" indent="-228600" algn="l" defTabSz="914400" rtl="0" eaLnBrk="1" latinLnBrk="0" hangingPunct="1">
-              <a:lnSpc>
-                <a:spcPct val="90000"/>
-              </a:lnSpc>
-              <a:spcBef>
-                <a:spcPts val="500"/>
-              </a:spcBef>
-              <a:buFont typeface="Arial" panose="020B0604020202020204" pitchFamily="34" charset="0"/>
-              <a:buChar char="•"/>
-              <a:defRPr sz="1800" kern="1200">
-                <a:solidFill>
-                  <a:schemeClr val="tx1"/>
-                </a:solidFill>
-                <a:latin typeface="+mn-lt"/>
-                <a:ea typeface="+mn-ea"/>
-                <a:cs typeface="+mn-cs"/>
-              </a:defRPr>
-            </a:lvl8pPr>
-            <a:lvl9pPr marL="3886200" indent="-228600" algn="l" defTabSz="914400" rtl="0" eaLnBrk="1" latinLnBrk="0" hangingPunct="1">
-              <a:lnSpc>
-                <a:spcPct val="90000"/>
-              </a:lnSpc>
-              <a:spcBef>
-                <a:spcPts val="500"/>
-              </a:spcBef>
-              <a:buFont typeface="Arial" panose="020B0604020202020204" pitchFamily="34" charset="0"/>
-              <a:buChar char="•"/>
-              <a:defRPr sz="1800" kern="1200">
-                <a:solidFill>
-                  <a:schemeClr val="tx1"/>
-                </a:solidFill>
-                <a:latin typeface="+mn-lt"/>
-                <a:ea typeface="+mn-ea"/>
-                <a:cs typeface="+mn-cs"/>
-              </a:defRPr>
-            </a:lvl9pPr>
-          </a:lstStyle>
-          <a:p>
-            <a:pPr lvl="0">
-              <a:spcBef>
-                <a:spcPts val="600"/>
-              </a:spcBef>
-            </a:pPr>
-            <a:r>
-              <a:rPr lang="ru-RU" sz="2400" dirty="0"/>
-              <a:t>сбор данных с использованием распределенного программного брокера сообщений </a:t>
-            </a:r>
-            <a:r>
-              <a:rPr lang="en-US" sz="2400" dirty="0"/>
-              <a:t>Apache Kafka</a:t>
-            </a:r>
-            <a:r>
-              <a:rPr lang="ru-RU" sz="2400" dirty="0"/>
-              <a:t>, являющегося компонентом продукта </a:t>
-            </a:r>
-            <a:r>
-              <a:rPr lang="en-US" sz="2400" dirty="0"/>
-              <a:t>RT</a:t>
-            </a:r>
-            <a:r>
-              <a:rPr lang="ru-RU" sz="2400" dirty="0"/>
-              <a:t>.</a:t>
-            </a:r>
-            <a:r>
-              <a:rPr lang="en-US" sz="2400" dirty="0"/>
-              <a:t>Streaming</a:t>
-            </a:r>
-            <a:r>
-              <a:rPr lang="ru-RU" sz="2400" dirty="0"/>
-              <a:t>;</a:t>
-            </a:r>
-          </a:p>
-          <a:p>
-            <a:pPr lvl="0">
-              <a:spcBef>
-                <a:spcPts val="600"/>
-              </a:spcBef>
-            </a:pPr>
-            <a:r>
-              <a:rPr lang="ru-RU" sz="2400" dirty="0"/>
-              <a:t>хранение собранных данных в распределенной файловой системе </a:t>
-            </a:r>
-            <a:r>
-              <a:rPr lang="en-US" sz="2400" dirty="0"/>
-              <a:t>HDFS</a:t>
-            </a:r>
-            <a:r>
-              <a:rPr lang="ru-RU" sz="2400" dirty="0"/>
-              <a:t>, являющейся элементом корпоративного хранилища данных </a:t>
-            </a:r>
-            <a:r>
-              <a:rPr lang="en-US" sz="2400" dirty="0"/>
-              <a:t>RT</a:t>
-            </a:r>
-            <a:r>
-              <a:rPr lang="ru-RU" sz="2400" dirty="0"/>
-              <a:t>.</a:t>
-            </a:r>
-            <a:r>
-              <a:rPr lang="en-US" sz="2400" dirty="0" err="1"/>
-              <a:t>DataLake</a:t>
-            </a:r>
-            <a:r>
-              <a:rPr lang="ru-RU" sz="2400" dirty="0"/>
-              <a:t>;</a:t>
-            </a:r>
-          </a:p>
-          <a:p>
-            <a:pPr lvl="0">
-              <a:spcBef>
-                <a:spcPts val="600"/>
-              </a:spcBef>
-            </a:pPr>
-            <a:r>
-              <a:rPr lang="ru-RU" sz="2400" dirty="0"/>
-              <a:t>обработка и агрегация данных с использованием СУБД Apache Hive, так же являющейся компонентом корпоративного хранилища данных </a:t>
-            </a:r>
-            <a:r>
-              <a:rPr lang="en-US" sz="2400" dirty="0"/>
-              <a:t>RT</a:t>
-            </a:r>
-            <a:r>
-              <a:rPr lang="ru-RU" sz="2400" dirty="0"/>
-              <a:t>.</a:t>
-            </a:r>
-            <a:r>
-              <a:rPr lang="en-US" sz="2400" dirty="0" err="1"/>
-              <a:t>DataLake</a:t>
-            </a:r>
-            <a:r>
-              <a:rPr lang="ru-RU" sz="2400" dirty="0" smtClean="0"/>
-              <a:t>;</a:t>
-            </a:r>
-            <a:endParaRPr lang="ru-RU" sz="2400" dirty="0"/>
-          </a:p>
-        </p:txBody>
-      </p:sp>
-      <p:sp>
-        <p:nvSpPr>
-          <p:cNvPr id="9" name="Объект 2"/>
-          <p:cNvSpPr txBox="1">
-            <a:spLocks/>
-          </p:cNvSpPr>
-          <p:nvPr/>
-        </p:nvSpPr>
-        <p:spPr>
-          <a:xfrm>
-            <a:off x="534123" y="4458910"/>
-            <a:ext cx="11065155" cy="2383928"/>
-          </a:xfrm>
-          <a:prstGeom prst="rect">
-            <a:avLst/>
-          </a:prstGeom>
-        </p:spPr>
-        <p:txBody>
-          <a:bodyPr>
-            <a:normAutofit/>
-          </a:bodyPr>
-          <a:lstStyle>
-            <a:lvl1pPr marL="228600" indent="-228600" algn="l" defTabSz="914400" rtl="0" eaLnBrk="1" latinLnBrk="0" hangingPunct="1">
-              <a:lnSpc>
-                <a:spcPct val="90000"/>
-              </a:lnSpc>
-              <a:spcBef>
-                <a:spcPts val="1000"/>
-              </a:spcBef>
-              <a:buFont typeface="Arial" panose="020B0604020202020204" pitchFamily="34" charset="0"/>
-              <a:buChar char="•"/>
-              <a:defRPr sz="2800" kern="1200">
-                <a:solidFill>
-                  <a:schemeClr val="tx1"/>
-                </a:solidFill>
-                <a:latin typeface="+mn-lt"/>
-                <a:ea typeface="+mn-ea"/>
-                <a:cs typeface="+mn-cs"/>
-              </a:defRPr>
-            </a:lvl1pPr>
-            <a:lvl2pPr marL="685800" indent="-228600" algn="l" defTabSz="914400" rtl="0" eaLnBrk="1" latinLnBrk="0" hangingPunct="1">
-              <a:lnSpc>
-                <a:spcPct val="90000"/>
-              </a:lnSpc>
-              <a:spcBef>
-                <a:spcPts val="500"/>
-              </a:spcBef>
-              <a:buFont typeface="Arial" panose="020B0604020202020204" pitchFamily="34" charset="0"/>
-              <a:buChar char="•"/>
-              <a:defRPr sz="2400" kern="1200">
-                <a:solidFill>
-                  <a:schemeClr val="tx1"/>
-                </a:solidFill>
-                <a:latin typeface="+mn-lt"/>
-                <a:ea typeface="+mn-ea"/>
-                <a:cs typeface="+mn-cs"/>
-              </a:defRPr>
-            </a:lvl2pPr>
-            <a:lvl3pPr marL="1143000" indent="-228600" algn="l" defTabSz="914400" rtl="0" eaLnBrk="1" latinLnBrk="0" hangingPunct="1">
-              <a:lnSpc>
-                <a:spcPct val="90000"/>
-              </a:lnSpc>
-              <a:spcBef>
-                <a:spcPts val="500"/>
-              </a:spcBef>
-              <a:buFont typeface="Arial" panose="020B0604020202020204" pitchFamily="34" charset="0"/>
-              <a:buChar char="•"/>
-              <a:defRPr sz="2000" kern="1200">
-                <a:solidFill>
-                  <a:schemeClr val="tx1"/>
-                </a:solidFill>
-                <a:latin typeface="+mn-lt"/>
-                <a:ea typeface="+mn-ea"/>
-                <a:cs typeface="+mn-cs"/>
-              </a:defRPr>
-            </a:lvl3pPr>
-            <a:lvl4pPr marL="1600200" indent="-228600" algn="l" defTabSz="914400" rtl="0" eaLnBrk="1" latinLnBrk="0" hangingPunct="1">
-              <a:lnSpc>
-                <a:spcPct val="90000"/>
-              </a:lnSpc>
-              <a:spcBef>
-                <a:spcPts val="500"/>
-              </a:spcBef>
-              <a:buFont typeface="Arial" panose="020B0604020202020204" pitchFamily="34" charset="0"/>
-              <a:buChar char="•"/>
-              <a:defRPr sz="1800" kern="1200">
-                <a:solidFill>
-                  <a:schemeClr val="tx1"/>
-                </a:solidFill>
-                <a:latin typeface="+mn-lt"/>
-                <a:ea typeface="+mn-ea"/>
-                <a:cs typeface="+mn-cs"/>
-              </a:defRPr>
-            </a:lvl4pPr>
-            <a:lvl5pPr marL="2057400" indent="-228600" algn="l" defTabSz="914400" rtl="0" eaLnBrk="1" latinLnBrk="0" hangingPunct="1">
-              <a:lnSpc>
-                <a:spcPct val="90000"/>
-              </a:lnSpc>
-              <a:spcBef>
-                <a:spcPts val="500"/>
-              </a:spcBef>
-              <a:buFont typeface="Arial" panose="020B0604020202020204" pitchFamily="34" charset="0"/>
-              <a:buChar char="•"/>
-              <a:defRPr sz="1800" kern="1200">
-                <a:solidFill>
-                  <a:schemeClr val="tx1"/>
-                </a:solidFill>
-                <a:latin typeface="+mn-lt"/>
-                <a:ea typeface="+mn-ea"/>
-                <a:cs typeface="+mn-cs"/>
-              </a:defRPr>
-            </a:lvl5pPr>
-            <a:lvl6pPr marL="2514600" indent="-228600" algn="l" defTabSz="914400" rtl="0" eaLnBrk="1" latinLnBrk="0" hangingPunct="1">
-              <a:lnSpc>
-                <a:spcPct val="90000"/>
-              </a:lnSpc>
-              <a:spcBef>
-                <a:spcPts val="500"/>
-              </a:spcBef>
-              <a:buFont typeface="Arial" panose="020B0604020202020204" pitchFamily="34" charset="0"/>
-              <a:buChar char="•"/>
-              <a:defRPr sz="1800" kern="1200">
-                <a:solidFill>
-                  <a:schemeClr val="tx1"/>
-                </a:solidFill>
-                <a:latin typeface="+mn-lt"/>
-                <a:ea typeface="+mn-ea"/>
-                <a:cs typeface="+mn-cs"/>
-              </a:defRPr>
-            </a:lvl6pPr>
-            <a:lvl7pPr marL="2971800" indent="-228600" algn="l" defTabSz="914400" rtl="0" eaLnBrk="1" latinLnBrk="0" hangingPunct="1">
-              <a:lnSpc>
-                <a:spcPct val="90000"/>
-              </a:lnSpc>
-              <a:spcBef>
-                <a:spcPts val="500"/>
-              </a:spcBef>
-              <a:buFont typeface="Arial" panose="020B0604020202020204" pitchFamily="34" charset="0"/>
-              <a:buChar char="•"/>
-              <a:defRPr sz="1800" kern="1200">
-                <a:solidFill>
-                  <a:schemeClr val="tx1"/>
-                </a:solidFill>
-                <a:latin typeface="+mn-lt"/>
-                <a:ea typeface="+mn-ea"/>
-                <a:cs typeface="+mn-cs"/>
-              </a:defRPr>
-            </a:lvl7pPr>
-            <a:lvl8pPr marL="3429000" indent="-228600" algn="l" defTabSz="914400" rtl="0" eaLnBrk="1" latinLnBrk="0" hangingPunct="1">
-              <a:lnSpc>
-                <a:spcPct val="90000"/>
-              </a:lnSpc>
-              <a:spcBef>
-                <a:spcPts val="500"/>
-              </a:spcBef>
-              <a:buFont typeface="Arial" panose="020B0604020202020204" pitchFamily="34" charset="0"/>
-              <a:buChar char="•"/>
-              <a:defRPr sz="1800" kern="1200">
-                <a:solidFill>
-                  <a:schemeClr val="tx1"/>
-                </a:solidFill>
-                <a:latin typeface="+mn-lt"/>
-                <a:ea typeface="+mn-ea"/>
-                <a:cs typeface="+mn-cs"/>
-              </a:defRPr>
-            </a:lvl8pPr>
-            <a:lvl9pPr marL="3886200" indent="-228600" algn="l" defTabSz="914400" rtl="0" eaLnBrk="1" latinLnBrk="0" hangingPunct="1">
-              <a:lnSpc>
-                <a:spcPct val="90000"/>
-              </a:lnSpc>
-              <a:spcBef>
-                <a:spcPts val="500"/>
-              </a:spcBef>
-              <a:buFont typeface="Arial" panose="020B0604020202020204" pitchFamily="34" charset="0"/>
-              <a:buChar char="•"/>
-              <a:defRPr sz="1800" kern="1200">
-                <a:solidFill>
-                  <a:schemeClr val="tx1"/>
-                </a:solidFill>
-                <a:latin typeface="+mn-lt"/>
-                <a:ea typeface="+mn-ea"/>
-                <a:cs typeface="+mn-cs"/>
-              </a:defRPr>
-            </a:lvl9pPr>
-          </a:lstStyle>
-          <a:p>
-            <a:pPr lvl="0">
-              <a:spcBef>
-                <a:spcPts val="600"/>
-              </a:spcBef>
-            </a:pPr>
-            <a:r>
-              <a:rPr lang="ru-RU" sz="2400" dirty="0"/>
-              <a:t>перенос данных в массивно-параллельную СУБД </a:t>
-            </a:r>
-            <a:r>
-              <a:rPr lang="en-US" sz="2400" dirty="0"/>
-              <a:t>GreenPlum</a:t>
-            </a:r>
-            <a:r>
-              <a:rPr lang="ru-RU" sz="2400" dirty="0"/>
-              <a:t> (компонент </a:t>
-            </a:r>
-            <a:r>
-              <a:rPr lang="en-US" sz="2400" dirty="0"/>
-              <a:t>RT</a:t>
-            </a:r>
-            <a:r>
-              <a:rPr lang="ru-RU" sz="2400" dirty="0"/>
-              <a:t>.</a:t>
-            </a:r>
-            <a:r>
-              <a:rPr lang="en-US" sz="2400" dirty="0"/>
-              <a:t>Warehouse</a:t>
-            </a:r>
-            <a:r>
-              <a:rPr lang="ru-RU" sz="2400" dirty="0"/>
-              <a:t>);</a:t>
-            </a:r>
-          </a:p>
-          <a:p>
-            <a:pPr lvl="0">
-              <a:spcBef>
-                <a:spcPts val="600"/>
-              </a:spcBef>
-            </a:pPr>
-            <a:r>
-              <a:rPr lang="ru-RU" sz="2400" dirty="0"/>
-              <a:t>аналитика с помощью </a:t>
-            </a:r>
-            <a:r>
-              <a:rPr lang="ru-RU" sz="2400" dirty="0" err="1"/>
-              <a:t>фреймворка</a:t>
-            </a:r>
-            <a:r>
-              <a:rPr lang="ru-RU" sz="2400" dirty="0"/>
-              <a:t> </a:t>
-            </a:r>
-            <a:r>
-              <a:rPr lang="en-US" sz="2400" dirty="0"/>
-              <a:t>Apache Spark</a:t>
-            </a:r>
-            <a:r>
-              <a:rPr lang="ru-RU" sz="2400" dirty="0"/>
-              <a:t>, так же являющимся элементом корпоративного хранилища данных </a:t>
-            </a:r>
-            <a:r>
-              <a:rPr lang="en-US" sz="2400" dirty="0"/>
-              <a:t>RT</a:t>
-            </a:r>
-            <a:r>
-              <a:rPr lang="ru-RU" sz="2400" dirty="0"/>
-              <a:t>.</a:t>
-            </a:r>
-            <a:r>
-              <a:rPr lang="en-US" sz="2400" dirty="0" err="1"/>
-              <a:t>DataLake</a:t>
-            </a:r>
-            <a:r>
-              <a:rPr lang="ru-RU" sz="2400" dirty="0"/>
-              <a:t>;</a:t>
-            </a:r>
-          </a:p>
-          <a:p>
-            <a:pPr lvl="0">
-              <a:spcBef>
-                <a:spcPts val="600"/>
-              </a:spcBef>
-            </a:pPr>
-            <a:r>
-              <a:rPr lang="ru-RU" sz="2400" dirty="0"/>
-              <a:t>визуализация и построение </a:t>
-            </a:r>
-            <a:r>
-              <a:rPr lang="ru-RU" sz="2400" dirty="0" err="1"/>
-              <a:t>дашборда</a:t>
-            </a:r>
-            <a:r>
-              <a:rPr lang="ru-RU" sz="2400" dirty="0"/>
-              <a:t> при помощи платформы </a:t>
-            </a:r>
-            <a:r>
-              <a:rPr lang="en-US" sz="2400" dirty="0"/>
-              <a:t>Apache Superset</a:t>
-            </a:r>
-            <a:r>
-              <a:rPr lang="ru-RU" sz="2400" dirty="0"/>
-              <a:t>, являющейся компонентом продукта </a:t>
-            </a:r>
-            <a:r>
-              <a:rPr lang="en-US" sz="2400" dirty="0"/>
-              <a:t>RT</a:t>
-            </a:r>
-            <a:r>
-              <a:rPr lang="ru-RU" sz="2400" dirty="0"/>
-              <a:t>.</a:t>
-            </a:r>
-            <a:r>
-              <a:rPr lang="en-US" sz="2400" dirty="0" err="1"/>
-              <a:t>Datavision</a:t>
-            </a:r>
-            <a:r>
-              <a:rPr lang="ru-RU" sz="2400" dirty="0"/>
-              <a:t>.</a:t>
-            </a:r>
-          </a:p>
-        </p:txBody>
-      </p:sp>
     </p:spTree>
     <p:extLst>
       <p:ext uri="{BB962C8B-B14F-4D97-AF65-F5344CB8AC3E}">
@@ -10966,7 +10625,7 @@
         <p:spPr>
           <a:xfrm>
             <a:off x="439151" y="560538"/>
-            <a:ext cx="11160127" cy="478144"/>
+            <a:ext cx="11160127" cy="523220"/>
           </a:xfrm>
           <a:prstGeom prst="rect">
             <a:avLst/>
@@ -11004,14 +10663,22 @@
           </a:lstStyle>
           <a:p>
             <a:r>
-              <a:rPr lang="ru-RU" sz="3000" dirty="0" smtClean="0">
-                <a:effectLst/>
-                <a:latin typeface="Arial" panose="020B0604020202020204" pitchFamily="34" charset="0"/>
-                <a:cs typeface="Arial" panose="020B0604020202020204" pitchFamily="34" charset="0"/>
-              </a:rPr>
-              <a:t>Генерация датасета за предыдущую неделю</a:t>
-            </a:r>
-            <a:endParaRPr lang="ru-RU" sz="3000" dirty="0">
+              <a:rPr lang="ru-RU" dirty="0" smtClean="0">
+                <a:effectLst/>
+                <a:latin typeface="Arial" panose="020B0604020202020204" pitchFamily="34" charset="0"/>
+                <a:cs typeface="Arial" panose="020B0604020202020204" pitchFamily="34" charset="0"/>
+              </a:rPr>
+              <a:t>Архитектура </a:t>
+            </a:r>
+            <a:r>
+              <a:rPr lang="en-US" dirty="0" smtClean="0">
+                <a:effectLst/>
+                <a:latin typeface="Arial" panose="020B0604020202020204" pitchFamily="34" charset="0"/>
+                <a:cs typeface="Arial" panose="020B0604020202020204" pitchFamily="34" charset="0"/>
+              </a:rPr>
+              <a:t>MVP</a:t>
+            </a:r>
+            <a:endParaRPr lang="ru-RU" dirty="0">
               <a:latin typeface="Arial" panose="020B0604020202020204" pitchFamily="34" charset="0"/>
               <a:cs typeface="Arial" panose="020B0604020202020204" pitchFamily="34" charset="0"/>
             </a:endParaRPr>
@@ -11050,7 +10717,7 @@
       </p:pic>
       <p:pic>
         <p:nvPicPr>
-          <p:cNvPr id="16" name="Рисунок 15"/>
+          <p:cNvPr id="3" name="Рисунок 2"/>
           <p:cNvPicPr>
             <a:picLocks noChangeAspect="1"/>
           </p:cNvPicPr>
@@ -11064,153 +10731,18 @@
         </p:blipFill>
         <p:spPr>
           <a:xfrm>
-            <a:off x="6508248" y="4768416"/>
-            <a:ext cx="1781424" cy="1381318"/>
+            <a:off x="2233564" y="1320845"/>
+            <a:ext cx="7571300" cy="5072439"/>
           </a:xfrm>
           <a:prstGeom prst="rect">
             <a:avLst/>
           </a:prstGeom>
-          <a:ln w="15875">
-            <a:solidFill>
-              <a:schemeClr val="accent1"/>
-            </a:solidFill>
-          </a:ln>
-        </p:spPr>
-      </p:pic>
-      <p:pic>
-        <p:nvPicPr>
-          <p:cNvPr id="17" name="Рисунок 16"/>
-          <p:cNvPicPr>
-            <a:picLocks noChangeAspect="1"/>
-          </p:cNvPicPr>
-          <p:nvPr/>
-        </p:nvPicPr>
-        <p:blipFill>
-          <a:blip r:embed="rId4"/>
-          <a:stretch>
-            <a:fillRect/>
-          </a:stretch>
-        </p:blipFill>
-        <p:spPr>
-          <a:xfrm>
-            <a:off x="8956515" y="4758890"/>
-            <a:ext cx="2810267" cy="1390844"/>
-          </a:xfrm>
-          <a:prstGeom prst="rect">
-            <a:avLst/>
-          </a:prstGeom>
-          <a:ln w="15875">
-            <a:solidFill>
-              <a:schemeClr val="accent1"/>
-            </a:solidFill>
-          </a:ln>
-        </p:spPr>
-      </p:pic>
-      <p:pic>
-        <p:nvPicPr>
-          <p:cNvPr id="8" name="Рисунок 7"/>
-          <p:cNvPicPr>
-            <a:picLocks noChangeAspect="1"/>
-          </p:cNvPicPr>
-          <p:nvPr/>
-        </p:nvPicPr>
-        <p:blipFill>
-          <a:blip r:embed="rId5"/>
-          <a:stretch>
-            <a:fillRect/>
-          </a:stretch>
-        </p:blipFill>
-        <p:spPr>
-          <a:xfrm>
-            <a:off x="6762147" y="1201656"/>
-            <a:ext cx="4620270" cy="1705213"/>
-          </a:xfrm>
-          <a:prstGeom prst="rect">
-            <a:avLst/>
-          </a:prstGeom>
-        </p:spPr>
-      </p:pic>
-      <p:pic>
-        <p:nvPicPr>
-          <p:cNvPr id="9" name="Рисунок 8"/>
-          <p:cNvPicPr>
-            <a:picLocks noChangeAspect="1"/>
-          </p:cNvPicPr>
-          <p:nvPr/>
-        </p:nvPicPr>
-        <p:blipFill>
-          <a:blip r:embed="rId6"/>
-          <a:stretch>
-            <a:fillRect/>
-          </a:stretch>
-        </p:blipFill>
-        <p:spPr>
-          <a:xfrm>
-            <a:off x="327587" y="1399642"/>
-            <a:ext cx="5891177" cy="2313184"/>
-          </a:xfrm>
-          <a:prstGeom prst="rect">
-            <a:avLst/>
-          </a:prstGeom>
-        </p:spPr>
-      </p:pic>
-      <p:pic>
-        <p:nvPicPr>
-          <p:cNvPr id="14" name="Рисунок 13"/>
-          <p:cNvPicPr>
-            <a:picLocks noChangeAspect="1"/>
-          </p:cNvPicPr>
-          <p:nvPr/>
-        </p:nvPicPr>
-        <p:blipFill>
-          <a:blip r:embed="rId7"/>
-          <a:stretch>
-            <a:fillRect/>
-          </a:stretch>
-        </p:blipFill>
-        <p:spPr>
-          <a:xfrm>
-            <a:off x="327587" y="3881316"/>
-            <a:ext cx="5877745" cy="2343477"/>
-          </a:xfrm>
-          <a:prstGeom prst="rect">
-            <a:avLst/>
-          </a:prstGeom>
-        </p:spPr>
-      </p:pic>
-      <p:pic>
-        <p:nvPicPr>
-          <p:cNvPr id="3" name="Рисунок 2"/>
-          <p:cNvPicPr>
-            <a:picLocks noChangeAspect="1"/>
-          </p:cNvPicPr>
-          <p:nvPr/>
-        </p:nvPicPr>
-        <p:blipFill>
-          <a:blip r:embed="rId8"/>
-          <a:stretch>
-            <a:fillRect/>
-          </a:stretch>
-        </p:blipFill>
-        <p:spPr>
-          <a:xfrm>
-            <a:off x="6508248" y="3024767"/>
-            <a:ext cx="5239481" cy="1190791"/>
-          </a:xfrm>
-          <a:prstGeom prst="rect">
-            <a:avLst/>
-          </a:prstGeom>
-          <a:ln w="15875">
-            <a:solidFill>
-              <a:schemeClr val="accent1"/>
-            </a:solidFill>
-          </a:ln>
         </p:spPr>
       </p:pic>
     </p:spTree>
     <p:extLst>
       <p:ext uri="{BB962C8B-B14F-4D97-AF65-F5344CB8AC3E}">
-        <p14:creationId xmlns:p14="http://schemas.microsoft.com/office/powerpoint/2010/main" val="797357854"/>
+        <p14:creationId xmlns:p14="http://schemas.microsoft.com/office/powerpoint/2010/main" val="2439349552"/>
       </p:ext>
     </p:extLst>
   </p:cSld>
@@ -11328,7 +10860,7 @@
         <p:spPr>
           <a:xfrm>
             <a:off x="439151" y="560538"/>
-            <a:ext cx="11160127" cy="523220"/>
+            <a:ext cx="11160127" cy="478144"/>
           </a:xfrm>
           <a:prstGeom prst="rect">
             <a:avLst/>
@@ -11366,14 +10898,14 @@
           </a:lstStyle>
           <a:p>
             <a:r>
-              <a:rPr lang="ru-RU" dirty="0" smtClean="0">
-                <a:effectLst/>
-                <a:latin typeface="Arial" panose="020B0604020202020204" pitchFamily="34" charset="0"/>
-                <a:cs typeface="Arial" panose="020B0604020202020204" pitchFamily="34" charset="0"/>
-              </a:rPr>
-              <a:t>Генерация датасета - код</a:t>
-            </a:r>
-            <a:endParaRPr lang="ru-RU" dirty="0">
+              <a:rPr lang="ru-RU" sz="3000" dirty="0" smtClean="0">
+                <a:effectLst/>
+                <a:latin typeface="Arial" panose="020B0604020202020204" pitchFamily="34" charset="0"/>
+                <a:cs typeface="Arial" panose="020B0604020202020204" pitchFamily="34" charset="0"/>
+              </a:rPr>
+              <a:t>Генерация датасета за предыдущую неделю</a:t>
+            </a:r>
+            <a:endParaRPr lang="ru-RU" sz="3000" dirty="0">
               <a:latin typeface="Arial" panose="020B0604020202020204" pitchFamily="34" charset="0"/>
               <a:cs typeface="Arial" panose="020B0604020202020204" pitchFamily="34" charset="0"/>
             </a:endParaRPr>
@@ -11412,7 +10944,7 @@
       </p:pic>
       <p:pic>
         <p:nvPicPr>
-          <p:cNvPr id="15" name="Рисунок 14"/>
+          <p:cNvPr id="16" name="Рисунок 15"/>
           <p:cNvPicPr>
             <a:picLocks noChangeAspect="1"/>
           </p:cNvPicPr>
@@ -11426,17 +10958,22 @@
         </p:blipFill>
         <p:spPr>
           <a:xfrm>
-            <a:off x="515939" y="1552140"/>
-            <a:ext cx="5405915" cy="4515285"/>
+            <a:off x="6508248" y="4768416"/>
+            <a:ext cx="1781424" cy="1381318"/>
           </a:xfrm>
           <a:prstGeom prst="rect">
             <a:avLst/>
           </a:prstGeom>
+          <a:ln w="15875">
+            <a:solidFill>
+              <a:schemeClr val="accent1"/>
+            </a:solidFill>
+          </a:ln>
         </p:spPr>
       </p:pic>
       <p:pic>
         <p:nvPicPr>
-          <p:cNvPr id="16" name="Рисунок 15"/>
+          <p:cNvPr id="17" name="Рисунок 16"/>
           <p:cNvPicPr>
             <a:picLocks noChangeAspect="1"/>
           </p:cNvPicPr>
@@ -11450,18 +10987,124 @@
         </p:blipFill>
         <p:spPr>
           <a:xfrm>
-            <a:off x="6172200" y="1552140"/>
-            <a:ext cx="5427078" cy="4522565"/>
+            <a:off x="8956515" y="4758890"/>
+            <a:ext cx="2810267" cy="1390844"/>
           </a:xfrm>
           <a:prstGeom prst="rect">
             <a:avLst/>
           </a:prstGeom>
+          <a:ln w="15875">
+            <a:solidFill>
+              <a:schemeClr val="accent1"/>
+            </a:solidFill>
+          </a:ln>
+        </p:spPr>
+      </p:pic>
+      <p:pic>
+        <p:nvPicPr>
+          <p:cNvPr id="8" name="Рисунок 7"/>
+          <p:cNvPicPr>
+            <a:picLocks noChangeAspect="1"/>
+          </p:cNvPicPr>
+          <p:nvPr/>
+        </p:nvPicPr>
+        <p:blipFill>
+          <a:blip r:embed="rId5"/>
+          <a:stretch>
+            <a:fillRect/>
+          </a:stretch>
+        </p:blipFill>
+        <p:spPr>
+          <a:xfrm>
+            <a:off x="6762147" y="1201656"/>
+            <a:ext cx="4620270" cy="1705213"/>
+          </a:xfrm>
+          <a:prstGeom prst="rect">
+            <a:avLst/>
+          </a:prstGeom>
+        </p:spPr>
+      </p:pic>
+      <p:pic>
+        <p:nvPicPr>
+          <p:cNvPr id="9" name="Рисунок 8"/>
+          <p:cNvPicPr>
+            <a:picLocks noChangeAspect="1"/>
+          </p:cNvPicPr>
+          <p:nvPr/>
+        </p:nvPicPr>
+        <p:blipFill>
+          <a:blip r:embed="rId6"/>
+          <a:stretch>
+            <a:fillRect/>
+          </a:stretch>
+        </p:blipFill>
+        <p:spPr>
+          <a:xfrm>
+            <a:off x="327587" y="1399642"/>
+            <a:ext cx="5891177" cy="2313184"/>
+          </a:xfrm>
+          <a:prstGeom prst="rect">
+            <a:avLst/>
+          </a:prstGeom>
+        </p:spPr>
+      </p:pic>
+      <p:pic>
+        <p:nvPicPr>
+          <p:cNvPr id="14" name="Рисунок 13"/>
+          <p:cNvPicPr>
+            <a:picLocks noChangeAspect="1"/>
+          </p:cNvPicPr>
+          <p:nvPr/>
+        </p:nvPicPr>
+        <p:blipFill>
+          <a:blip r:embed="rId7"/>
+          <a:stretch>
+            <a:fillRect/>
+          </a:stretch>
+        </p:blipFill>
+        <p:spPr>
+          <a:xfrm>
+            <a:off x="327587" y="3881316"/>
+            <a:ext cx="5877745" cy="2343477"/>
+          </a:xfrm>
+          <a:prstGeom prst="rect">
+            <a:avLst/>
+          </a:prstGeom>
+        </p:spPr>
+      </p:pic>
+      <p:pic>
+        <p:nvPicPr>
+          <p:cNvPr id="3" name="Рисунок 2"/>
+          <p:cNvPicPr>
+            <a:picLocks noChangeAspect="1"/>
+          </p:cNvPicPr>
+          <p:nvPr/>
+        </p:nvPicPr>
+        <p:blipFill>
+          <a:blip r:embed="rId8"/>
+          <a:stretch>
+            <a:fillRect/>
+          </a:stretch>
+        </p:blipFill>
+        <p:spPr>
+          <a:xfrm>
+            <a:off x="6508248" y="3024767"/>
+            <a:ext cx="5239481" cy="1190791"/>
+          </a:xfrm>
+          <a:prstGeom prst="rect">
+            <a:avLst/>
+          </a:prstGeom>
+          <a:ln w="15875">
+            <a:solidFill>
+              <a:schemeClr val="accent1"/>
+            </a:solidFill>
+          </a:ln>
         </p:spPr>
       </p:pic>
     </p:spTree>
     <p:extLst>
       <p:ext uri="{BB962C8B-B14F-4D97-AF65-F5344CB8AC3E}">
-        <p14:creationId xmlns:p14="http://schemas.microsoft.com/office/powerpoint/2010/main" val="2476784764"/>
+        <p14:creationId xmlns:p14="http://schemas.microsoft.com/office/powerpoint/2010/main" val="797357854"/>
       </p:ext>
     </p:extLst>
   </p:cSld>
@@ -11521,7 +11164,7 @@
         </p:spPr>
         <p:txBody>
           <a:bodyPr>
-            <a:normAutofit lnSpcReduction="10000"/>
+            <a:normAutofit/>
           </a:bodyPr>
           <a:lstStyle/>
           <a:p>
@@ -11538,7 +11181,7 @@
             </a:r>
             <a:r>
               <a:rPr lang="ru-RU" dirty="0" smtClean="0"/>
-              <a:t>реализован с </a:t>
+              <a:t>с </a:t>
             </a:r>
             <a:r>
               <a:rPr lang="ru-RU" dirty="0"/>
@@ -11602,7 +11245,7 @@
         </p:spPr>
         <p:txBody>
           <a:bodyPr>
-            <a:normAutofit lnSpcReduction="10000"/>
+            <a:normAutofit/>
           </a:bodyPr>
           <a:lstStyle/>
           <a:p>
@@ -11916,7 +11559,7 @@
       </p:sp>
       <p:sp>
         <p:nvSpPr>
-          <p:cNvPr id="6" name="Заголовок 1">
+          <p:cNvPr id="5" name="Заголовок 1">
             <a:extLst>
               <a:ext uri="{FF2B5EF4-FFF2-40B4-BE49-F238E27FC236}">
                 <a16:creationId xmlns:a16="http://schemas.microsoft.com/office/drawing/2014/main" id="{26F3F6DE-0B95-4A88-A2DE-D547275A4F55}"/>
@@ -11930,8 +11573,128 @@
         </p:nvSpPr>
         <p:spPr>
           <a:xfrm>
+            <a:off x="107458" y="1301711"/>
+            <a:ext cx="11491820" cy="1923604"/>
+          </a:xfrm>
+          <a:prstGeom prst="rect">
+            <a:avLst/>
+          </a:prstGeom>
+        </p:spPr>
+        <p:txBody>
+          <a:bodyPr wrap="square" lIns="0" tIns="0" rIns="0" bIns="0" anchor="t" anchorCtr="0">
+            <a:spAutoFit/>
+          </a:bodyPr>
+          <a:lstStyle>
+            <a:defPPr>
+              <a:defRPr lang="ru-RU"/>
+            </a:defPPr>
+            <a:lvl1pPr>
+              <a:lnSpc>
+                <a:spcPts val="4000"/>
+              </a:lnSpc>
+              <a:spcBef>
+                <a:spcPct val="0"/>
+              </a:spcBef>
+              <a:buNone/>
+              <a:defRPr sz="2800" b="0">
+                <a:effectLst/>
+                <a:latin typeface="Rostelecom Basis Medium" panose="020B0603030604040103" pitchFamily="34" charset="0"/>
+                <a:ea typeface="+mj-ea"/>
+                <a:cs typeface="+mj-cs"/>
+              </a:defRPr>
+            </a:lvl1pPr>
+          </a:lstStyle>
+          <a:p>
+            <a:pPr marL="342000" algn="just">
+              <a:lnSpc>
+                <a:spcPts val="3000"/>
+              </a:lnSpc>
+            </a:pPr>
+            <a:r>
+              <a:rPr lang="ru-RU" sz="2400" dirty="0" smtClean="0"/>
+              <a:t>Хранение </a:t>
+            </a:r>
+            <a:r>
+              <a:rPr lang="ru-RU" sz="2400" dirty="0"/>
+              <a:t>собранных данных </a:t>
+            </a:r>
+            <a:r>
+              <a:rPr lang="ru-RU" sz="2400" dirty="0" smtClean="0"/>
+              <a:t>в </a:t>
+            </a:r>
+            <a:r>
+              <a:rPr lang="ru-RU" sz="2400" dirty="0"/>
+              <a:t>распределенной файловой системе </a:t>
+            </a:r>
+            <a:r>
+              <a:rPr lang="en-US" sz="2400" dirty="0"/>
+              <a:t>HDFS</a:t>
+            </a:r>
+            <a:r>
+              <a:rPr lang="ru-RU" sz="2400" dirty="0"/>
+              <a:t>, являющейся элементом корпоративного хранилища данных </a:t>
+            </a:r>
+            <a:r>
+              <a:rPr lang="en-US" sz="2400" dirty="0"/>
+              <a:t>RT</a:t>
+            </a:r>
+            <a:r>
+              <a:rPr lang="ru-RU" sz="2400" dirty="0"/>
+              <a:t>.</a:t>
+            </a:r>
+            <a:r>
+              <a:rPr lang="en-US" sz="2400" dirty="0" err="1" smtClean="0"/>
+              <a:t>DataLake</a:t>
+            </a:r>
+            <a:r>
+              <a:rPr lang="ru-RU" sz="2400" dirty="0" smtClean="0"/>
+              <a:t>. Хранение </a:t>
+            </a:r>
+            <a:r>
+              <a:rPr lang="ru-RU" sz="2400" dirty="0"/>
+              <a:t>осуществляется с помощью потребителя на Python, который читает данные с </a:t>
+            </a:r>
+            <a:r>
+              <a:rPr lang="en-US" sz="2400" dirty="0"/>
+              <a:t>Kafka </a:t>
+            </a:r>
+            <a:r>
+              <a:rPr lang="ru-RU" sz="2400" dirty="0"/>
+              <a:t>и сохраняет их в HDFS в формате </a:t>
+            </a:r>
+            <a:r>
+              <a:rPr lang="en-US" sz="2400" dirty="0" smtClean="0"/>
+              <a:t>CSV</a:t>
+            </a:r>
+            <a:r>
+              <a:rPr lang="ru-RU" sz="2400" dirty="0" smtClean="0"/>
+              <a:t>.</a:t>
+            </a:r>
+            <a:endParaRPr lang="ru-RU" sz="2400" dirty="0">
+              <a:latin typeface="Arial" panose="020B0604020202020204" pitchFamily="34" charset="0"/>
+              <a:cs typeface="Arial" panose="020B0604020202020204" pitchFamily="34" charset="0"/>
+            </a:endParaRPr>
+          </a:p>
+        </p:txBody>
+      </p:sp>
+      <p:sp>
+        <p:nvSpPr>
+          <p:cNvPr id="6" name="Заголовок 1">
+            <a:extLst>
+              <a:ext uri="{FF2B5EF4-FFF2-40B4-BE49-F238E27FC236}">
+                <a16:creationId xmlns:a16="http://schemas.microsoft.com/office/drawing/2014/main" id="{26F3F6DE-0B95-4A88-A2DE-D547275A4F55}"/>
+              </a:ext>
+            </a:extLst>
+          </p:cNvPr>
+          <p:cNvSpPr txBox="1">
+            <a:spLocks/>
+          </p:cNvSpPr>
+          <p:nvPr/>
+        </p:nvSpPr>
+        <p:spPr>
+          <a:xfrm>
             <a:off x="439151" y="560538"/>
-            <a:ext cx="11160127" cy="459357"/>
+            <a:ext cx="11160127" cy="512961"/>
           </a:xfrm>
           <a:prstGeom prst="rect">
             <a:avLst/>
@@ -11969,19 +11732,22 @@
           </a:lstStyle>
           <a:p>
             <a:r>
-              <a:rPr lang="ru-RU" sz="2600" dirty="0">
-                <a:effectLst/>
-              </a:rPr>
-              <a:t>Сбор данных с использованием </a:t>
-            </a:r>
-            <a:r>
-              <a:rPr lang="ru-RU" sz="2600" dirty="0" smtClean="0">
-                <a:effectLst/>
-              </a:rPr>
-              <a:t>RT.Streaming - код</a:t>
-            </a:r>
-            <a:endParaRPr lang="ru-RU" sz="2600" b="1" dirty="0">
-              <a:effectLst/>
+              <a:rPr lang="ru-RU" dirty="0">
+                <a:effectLst/>
+                <a:latin typeface="Arial" panose="020B0604020202020204" pitchFamily="34" charset="0"/>
+                <a:cs typeface="Arial" panose="020B0604020202020204" pitchFamily="34" charset="0"/>
+              </a:rPr>
+              <a:t>Хранение сырых данных в</a:t>
+            </a:r>
+            <a:r>
+              <a:rPr lang="en-US" dirty="0">
+                <a:effectLst/>
+                <a:latin typeface="Arial" panose="020B0604020202020204" pitchFamily="34" charset="0"/>
+                <a:cs typeface="Arial" panose="020B0604020202020204" pitchFamily="34" charset="0"/>
+              </a:rPr>
+              <a:t> RT.DataLake</a:t>
+            </a:r>
+            <a:endParaRPr lang="ru-RU" b="1" dirty="0">
               <a:latin typeface="Arial" panose="020B0604020202020204" pitchFamily="34" charset="0"/>
               <a:cs typeface="Arial" panose="020B0604020202020204" pitchFamily="34" charset="0"/>
             </a:endParaRPr>
@@ -12020,7 +11786,7 @@
       </p:pic>
       <p:pic>
         <p:nvPicPr>
-          <p:cNvPr id="8" name="Рисунок 7"/>
+          <p:cNvPr id="2" name="Рисунок 1"/>
           <p:cNvPicPr>
             <a:picLocks noChangeAspect="1"/>
           </p:cNvPicPr>
@@ -12034,32 +11800,8 @@
         </p:blipFill>
         <p:spPr>
           <a:xfrm>
-            <a:off x="439151" y="1228166"/>
-            <a:ext cx="5317281" cy="4484454"/>
-          </a:xfrm>
-          <a:prstGeom prst="rect">
-            <a:avLst/>
-          </a:prstGeom>
-        </p:spPr>
-      </p:pic>
-      <p:pic>
-        <p:nvPicPr>
-          <p:cNvPr id="9" name="Рисунок 8"/>
-          <p:cNvPicPr>
-            <a:picLocks noChangeAspect="1"/>
-          </p:cNvPicPr>
-          <p:nvPr/>
-        </p:nvPicPr>
-        <p:blipFill>
-          <a:blip r:embed="rId4"/>
-          <a:stretch>
-            <a:fillRect/>
-          </a:stretch>
-        </p:blipFill>
-        <p:spPr>
-          <a:xfrm>
-            <a:off x="5923110" y="1228167"/>
-            <a:ext cx="5592553" cy="4484454"/>
+            <a:off x="597903" y="3453527"/>
+            <a:ext cx="11001375" cy="2705100"/>
           </a:xfrm>
           <a:prstGeom prst="rect">
             <a:avLst/>
@@ -12069,7 +11811,7 @@
     </p:spTree>
     <p:extLst>
       <p:ext uri="{BB962C8B-B14F-4D97-AF65-F5344CB8AC3E}">
-        <p14:creationId xmlns:p14="http://schemas.microsoft.com/office/powerpoint/2010/main" val="1231678755"/>
+        <p14:creationId xmlns:p14="http://schemas.microsoft.com/office/powerpoint/2010/main" val="2207802164"/>
       </p:ext>
     </p:extLst>
   </p:cSld>

</xml_diff>